<commit_message>
Add slides to Github to facilitate creating a tiny URL to them to make it easier for those so inclined to follow along using their computer / tablet / phone / whatever.
</commit_message>
<xml_diff>
--- a/Learning to Love the Lambda in the Stream.pptx
+++ b/Learning to Love the Lambda in the Stream.pptx
@@ -6,10 +6,11 @@
   </p:sldMasterIdLst>
   <p:sldIdLst>
     <p:sldId id="256" r:id="rId2"/>
-    <p:sldId id="257" r:id="rId3"/>
-    <p:sldId id="258" r:id="rId4"/>
-    <p:sldId id="259" r:id="rId5"/>
-    <p:sldId id="260" r:id="rId6"/>
+    <p:sldId id="261" r:id="rId3"/>
+    <p:sldId id="257" r:id="rId4"/>
+    <p:sldId id="258" r:id="rId5"/>
+    <p:sldId id="259" r:id="rId6"/>
+    <p:sldId id="260" r:id="rId7"/>
   </p:sldIdLst>
   <p:sldSz cx="12192000" cy="6858000"/>
   <p:notesSz cx="6858000" cy="9144000"/>
@@ -839,7 +840,7 @@
             <a:fld id="{B61BEF0D-F0BB-DE4B-95CE-6DB70DBA9567}" type="datetimeFigureOut">
               <a:rPr lang="en-US" dirty="0"/>
               <a:pPr/>
-              <a:t>4/30/2017</a:t>
+              <a:t>5/2/2017</a:t>
             </a:fld>
             <a:endParaRPr lang="en-US" dirty="0"/>
           </a:p>
@@ -1087,7 +1088,7 @@
             <a:fld id="{B61BEF0D-F0BB-DE4B-95CE-6DB70DBA9567}" type="datetimeFigureOut">
               <a:rPr lang="en-US" dirty="0"/>
               <a:pPr/>
-              <a:t>4/30/2017</a:t>
+              <a:t>5/2/2017</a:t>
             </a:fld>
             <a:endParaRPr lang="en-US" dirty="0"/>
           </a:p>
@@ -1398,7 +1399,7 @@
             <a:fld id="{B61BEF0D-F0BB-DE4B-95CE-6DB70DBA9567}" type="datetimeFigureOut">
               <a:rPr lang="en-US" dirty="0"/>
               <a:pPr/>
-              <a:t>4/30/2017</a:t>
+              <a:t>5/2/2017</a:t>
             </a:fld>
             <a:endParaRPr lang="en-US" dirty="0"/>
           </a:p>
@@ -1736,7 +1737,7 @@
             <a:fld id="{B61BEF0D-F0BB-DE4B-95CE-6DB70DBA9567}" type="datetimeFigureOut">
               <a:rPr lang="en-US" dirty="0"/>
               <a:pPr/>
-              <a:t>4/30/2017</a:t>
+              <a:t>5/2/2017</a:t>
             </a:fld>
             <a:endParaRPr lang="en-US" dirty="0"/>
           </a:p>
@@ -2047,7 +2048,7 @@
             <a:fld id="{B61BEF0D-F0BB-DE4B-95CE-6DB70DBA9567}" type="datetimeFigureOut">
               <a:rPr lang="en-US" dirty="0"/>
               <a:pPr/>
-              <a:t>4/30/2017</a:t>
+              <a:t>5/2/2017</a:t>
             </a:fld>
             <a:endParaRPr lang="en-US" dirty="0"/>
           </a:p>
@@ -2437,7 +2438,7 @@
             <a:fld id="{B61BEF0D-F0BB-DE4B-95CE-6DB70DBA9567}" type="datetimeFigureOut">
               <a:rPr lang="en-US" dirty="0"/>
               <a:pPr/>
-              <a:t>4/30/2017</a:t>
+              <a:t>5/2/2017</a:t>
             </a:fld>
             <a:endParaRPr lang="en-US" dirty="0"/>
           </a:p>
@@ -2603,7 +2604,7 @@
           <a:p>
             <a:fld id="{55C6B4A9-1611-4792-9094-5F34BCA07E0B}" type="datetimeFigureOut">
               <a:rPr lang="en-US" dirty="0"/>
-              <a:t>4/30/2017</a:t>
+              <a:t>5/2/2017</a:t>
             </a:fld>
             <a:endParaRPr lang="en-US" dirty="0"/>
           </a:p>
@@ -2779,7 +2780,7 @@
             <a:fld id="{B61BEF0D-F0BB-DE4B-95CE-6DB70DBA9567}" type="datetimeFigureOut">
               <a:rPr lang="en-US" dirty="0"/>
               <a:pPr/>
-              <a:t>4/30/2017</a:t>
+              <a:t>5/2/2017</a:t>
             </a:fld>
             <a:endParaRPr lang="en-US" dirty="0"/>
           </a:p>
@@ -2952,7 +2953,7 @@
             <a:fld id="{B61BEF0D-F0BB-DE4B-95CE-6DB70DBA9567}" type="datetimeFigureOut">
               <a:rPr lang="en-US" dirty="0"/>
               <a:pPr/>
-              <a:t>4/30/2017</a:t>
+              <a:t>5/2/2017</a:t>
             </a:fld>
             <a:endParaRPr lang="en-US" dirty="0"/>
           </a:p>
@@ -3196,7 +3197,7 @@
             <a:fld id="{B61BEF0D-F0BB-DE4B-95CE-6DB70DBA9567}" type="datetimeFigureOut">
               <a:rPr lang="en-US" dirty="0"/>
               <a:pPr/>
-              <a:t>4/30/2017</a:t>
+              <a:t>5/2/2017</a:t>
             </a:fld>
             <a:endParaRPr lang="en-US" dirty="0"/>
           </a:p>
@@ -3424,7 +3425,7 @@
           <a:p>
             <a:fld id="{EB712588-04B1-427B-82EE-E8DB90309F08}" type="datetimeFigureOut">
               <a:rPr lang="en-US" dirty="0"/>
-              <a:t>4/30/2017</a:t>
+              <a:t>5/2/2017</a:t>
             </a:fld>
             <a:endParaRPr lang="en-US" dirty="0"/>
           </a:p>
@@ -3794,7 +3795,7 @@
             <a:fld id="{B61BEF0D-F0BB-DE4B-95CE-6DB70DBA9567}" type="datetimeFigureOut">
               <a:rPr lang="en-US" dirty="0"/>
               <a:pPr/>
-              <a:t>4/30/2017</a:t>
+              <a:t>5/2/2017</a:t>
             </a:fld>
             <a:endParaRPr lang="en-US" dirty="0"/>
           </a:p>
@@ -3914,7 +3915,7 @@
             <a:fld id="{B61BEF0D-F0BB-DE4B-95CE-6DB70DBA9567}" type="datetimeFigureOut">
               <a:rPr lang="en-US" dirty="0"/>
               <a:pPr/>
-              <a:t>4/30/2017</a:t>
+              <a:t>5/2/2017</a:t>
             </a:fld>
             <a:endParaRPr lang="en-US" dirty="0"/>
           </a:p>
@@ -4006,7 +4007,7 @@
             <a:fld id="{B61BEF0D-F0BB-DE4B-95CE-6DB70DBA9567}" type="datetimeFigureOut">
               <a:rPr lang="en-US" dirty="0"/>
               <a:pPr/>
-              <a:t>4/30/2017</a:t>
+              <a:t>5/2/2017</a:t>
             </a:fld>
             <a:endParaRPr lang="en-US" dirty="0"/>
           </a:p>
@@ -4257,7 +4258,7 @@
           <a:p>
             <a:fld id="{42A54C80-263E-416B-A8E0-580EDEADCBDC}" type="datetimeFigureOut">
               <a:rPr lang="en-US" dirty="0"/>
-              <a:t>4/30/2017</a:t>
+              <a:t>5/2/2017</a:t>
             </a:fld>
             <a:endParaRPr lang="en-US" dirty="0"/>
           </a:p>
@@ -4516,7 +4517,7 @@
             <a:fld id="{B61BEF0D-F0BB-DE4B-95CE-6DB70DBA9567}" type="datetimeFigureOut">
               <a:rPr lang="en-US" dirty="0"/>
               <a:pPr/>
-              <a:t>4/30/2017</a:t>
+              <a:t>5/2/2017</a:t>
             </a:fld>
             <a:endParaRPr lang="en-US" dirty="0"/>
           </a:p>
@@ -5256,7 +5257,7 @@
             <a:fld id="{B61BEF0D-F0BB-DE4B-95CE-6DB70DBA9567}" type="datetimeFigureOut">
               <a:rPr lang="en-US" dirty="0"/>
               <a:pPr/>
-              <a:t>4/30/2017</a:t>
+              <a:t>5/2/2017</a:t>
             </a:fld>
             <a:endParaRPr lang="en-US" dirty="0"/>
           </a:p>
@@ -5869,7 +5870,7 @@
           <a:p>
             <a:r>
               <a:rPr lang="en-US" dirty="0" smtClean="0"/>
-              <a:t>What is a Lambda Expression?</a:t>
+              <a:t>Speaker Introduction</a:t>
             </a:r>
             <a:endParaRPr lang="en-US" dirty="0"/>
           </a:p>
@@ -5894,387 +5895,75 @@
           <a:p>
             <a:r>
               <a:rPr lang="en-US" sz="2400" dirty="0" smtClean="0"/>
-              <a:t>In Java, it is an unnamed function that may be bound to an interface as an object.</a:t>
-            </a:r>
+              <a:t>Richard </a:t>
+            </a:r>
+            <a:r>
+              <a:rPr lang="en-US" sz="2400" dirty="0" err="1" smtClean="0"/>
+              <a:t>Roda</a:t>
+            </a:r>
+            <a:endParaRPr lang="en-US" sz="2400" dirty="0" smtClean="0"/>
           </a:p>
           <a:p>
             <a:r>
               <a:rPr lang="en-US" sz="2400" dirty="0" smtClean="0"/>
-              <a:t>Example 1</a:t>
+              <a:t>Sr. Technical Lead at DXC Technology</a:t>
+            </a:r>
+          </a:p>
+          <a:p>
+            <a:r>
+              <a:rPr lang="en-US" sz="2400" dirty="0" smtClean="0"/>
+              <a:t>Over 15 years of Java development experience</a:t>
+            </a:r>
+          </a:p>
+          <a:p>
+            <a:r>
+              <a:rPr lang="en-US" sz="2400" dirty="0" smtClean="0"/>
+              <a:t>OCA Java and Security+ certifications</a:t>
+            </a:r>
+          </a:p>
+          <a:p>
+            <a:r>
+              <a:rPr lang="en-US" sz="2400" dirty="0" smtClean="0"/>
+              <a:t>Linked In</a:t>
+            </a:r>
+            <a:r>
+              <a:rPr lang="en-US" sz="2400" dirty="0"/>
+              <a:t>: </a:t>
+            </a:r>
+            <a:r>
+              <a:rPr lang="en-US" sz="2400" dirty="0">
+                <a:hlinkClick r:id="rId2"/>
+              </a:rPr>
+              <a:t>https://</a:t>
+            </a:r>
+            <a:r>
+              <a:rPr lang="en-US" sz="2400" dirty="0" smtClean="0">
+                <a:hlinkClick r:id="rId2"/>
+              </a:rPr>
+              <a:t>www.linkedin.com/in/richardroda</a:t>
+            </a:r>
+            <a:r>
+              <a:rPr lang="en-US" sz="2400" dirty="0" smtClean="0"/>
+              <a:t> </a:t>
+            </a:r>
+          </a:p>
+          <a:p>
+            <a:r>
+              <a:rPr lang="en-US" sz="2400" dirty="0" smtClean="0"/>
+              <a:t>Twitter: @</a:t>
+            </a:r>
+            <a:r>
+              <a:rPr lang="en-US" sz="2400" dirty="0" err="1" smtClean="0"/>
+              <a:t>Richard_Roda</a:t>
             </a:r>
             <a:endParaRPr lang="en-US" sz="2400" dirty="0" smtClean="0"/>
           </a:p>
           <a:p>
             <a:r>
-              <a:rPr lang="en-US" sz="2400" dirty="0">
-                <a:solidFill>
-                  <a:srgbClr val="000000"/>
-                </a:solidFill>
-                <a:latin typeface="Courier New" panose="02070309020205020404" pitchFamily="49" charset="0"/>
-              </a:rPr>
-              <a:t>Predicate</a:t>
-            </a:r>
-            <a:r>
-              <a:rPr lang="en-US" sz="2400" b="1" dirty="0">
-                <a:solidFill>
-                  <a:srgbClr val="000080"/>
-                </a:solidFill>
-                <a:latin typeface="Courier New" panose="02070309020205020404" pitchFamily="49" charset="0"/>
-              </a:rPr>
-              <a:t>&lt;</a:t>
-            </a:r>
-            <a:r>
-              <a:rPr lang="en-US" sz="2400" dirty="0">
-                <a:solidFill>
-                  <a:srgbClr val="000000"/>
-                </a:solidFill>
-                <a:latin typeface="Courier New" panose="02070309020205020404" pitchFamily="49" charset="0"/>
-              </a:rPr>
-              <a:t>Integer</a:t>
-            </a:r>
-            <a:r>
-              <a:rPr lang="en-US" sz="2400" b="1" dirty="0">
-                <a:solidFill>
-                  <a:srgbClr val="000080"/>
-                </a:solidFill>
-                <a:latin typeface="Courier New" panose="02070309020205020404" pitchFamily="49" charset="0"/>
-              </a:rPr>
-              <a:t>&gt;</a:t>
-            </a:r>
-            <a:r>
-              <a:rPr lang="en-US" sz="2400" dirty="0">
-                <a:solidFill>
-                  <a:srgbClr val="000000"/>
-                </a:solidFill>
-                <a:latin typeface="Courier New" panose="02070309020205020404" pitchFamily="49" charset="0"/>
-              </a:rPr>
-              <a:t> </a:t>
-            </a:r>
-            <a:r>
-              <a:rPr lang="en-US" sz="2400" dirty="0" err="1">
-                <a:solidFill>
-                  <a:srgbClr val="000000"/>
-                </a:solidFill>
-                <a:latin typeface="Courier New" panose="02070309020205020404" pitchFamily="49" charset="0"/>
-              </a:rPr>
-              <a:t>isFive</a:t>
-            </a:r>
-            <a:r>
-              <a:rPr lang="en-US" sz="2400" dirty="0">
-                <a:solidFill>
-                  <a:srgbClr val="000000"/>
-                </a:solidFill>
-                <a:latin typeface="Courier New" panose="02070309020205020404" pitchFamily="49" charset="0"/>
-              </a:rPr>
-              <a:t> </a:t>
-            </a:r>
-            <a:r>
-              <a:rPr lang="en-US" sz="2400" b="1" dirty="0">
-                <a:solidFill>
-                  <a:srgbClr val="000080"/>
-                </a:solidFill>
-                <a:latin typeface="Courier New" panose="02070309020205020404" pitchFamily="49" charset="0"/>
-              </a:rPr>
-              <a:t>=</a:t>
-            </a:r>
-            <a:r>
-              <a:rPr lang="en-US" sz="2400" dirty="0">
-                <a:solidFill>
-                  <a:srgbClr val="000000"/>
-                </a:solidFill>
-                <a:latin typeface="Courier New" panose="02070309020205020404" pitchFamily="49" charset="0"/>
-              </a:rPr>
-              <a:t> n </a:t>
-            </a:r>
-            <a:r>
-              <a:rPr lang="en-US" sz="2400" b="1" dirty="0">
-                <a:solidFill>
-                  <a:srgbClr val="000080"/>
-                </a:solidFill>
-                <a:latin typeface="Courier New" panose="02070309020205020404" pitchFamily="49" charset="0"/>
-              </a:rPr>
-              <a:t>-&gt;</a:t>
-            </a:r>
-            <a:r>
-              <a:rPr lang="en-US" sz="2400" dirty="0">
-                <a:solidFill>
-                  <a:srgbClr val="000000"/>
-                </a:solidFill>
-                <a:latin typeface="Courier New" panose="02070309020205020404" pitchFamily="49" charset="0"/>
-              </a:rPr>
-              <a:t> </a:t>
-            </a:r>
-            <a:r>
-              <a:rPr lang="en-US" sz="2400" dirty="0" smtClean="0">
-                <a:solidFill>
-                  <a:srgbClr val="000000"/>
-                </a:solidFill>
-                <a:latin typeface="Courier New" panose="02070309020205020404" pitchFamily="49" charset="0"/>
-              </a:rPr>
-              <a:t>n </a:t>
-            </a:r>
-            <a:r>
-              <a:rPr lang="en-US" sz="2400" b="1" dirty="0">
-                <a:solidFill>
-                  <a:srgbClr val="000080"/>
-                </a:solidFill>
-                <a:latin typeface="Courier New" panose="02070309020205020404" pitchFamily="49" charset="0"/>
-              </a:rPr>
-              <a:t>==</a:t>
-            </a:r>
-            <a:r>
-              <a:rPr lang="en-US" sz="2400" dirty="0">
-                <a:solidFill>
-                  <a:srgbClr val="000000"/>
-                </a:solidFill>
-                <a:latin typeface="Courier New" panose="02070309020205020404" pitchFamily="49" charset="0"/>
-              </a:rPr>
-              <a:t> </a:t>
-            </a:r>
-            <a:r>
-              <a:rPr lang="en-US" sz="2400" dirty="0">
-                <a:solidFill>
-                  <a:srgbClr val="FF8000"/>
-                </a:solidFill>
-                <a:latin typeface="Courier New" panose="02070309020205020404" pitchFamily="49" charset="0"/>
-              </a:rPr>
-              <a:t>5</a:t>
-            </a:r>
-            <a:r>
-              <a:rPr lang="en-US" sz="2400" b="1" dirty="0">
-                <a:solidFill>
-                  <a:srgbClr val="000080"/>
-                </a:solidFill>
-                <a:latin typeface="Courier New" panose="02070309020205020404" pitchFamily="49" charset="0"/>
-              </a:rPr>
-              <a:t>;</a:t>
-            </a:r>
-            <a:r>
-              <a:rPr lang="en-US" sz="2400" dirty="0">
-                <a:solidFill>
-                  <a:srgbClr val="000000"/>
-                </a:solidFill>
-                <a:latin typeface="Courier New" panose="02070309020205020404" pitchFamily="49" charset="0"/>
-              </a:rPr>
-              <a:t> </a:t>
-            </a:r>
-            <a:r>
-              <a:rPr lang="en-US" sz="2400" dirty="0" err="1">
-                <a:solidFill>
-                  <a:srgbClr val="000000"/>
-                </a:solidFill>
-                <a:latin typeface="Courier New" panose="02070309020205020404" pitchFamily="49" charset="0"/>
-              </a:rPr>
-              <a:t>System</a:t>
-            </a:r>
-            <a:r>
-              <a:rPr lang="en-US" sz="2400" b="1" dirty="0" err="1">
-                <a:solidFill>
-                  <a:srgbClr val="000080"/>
-                </a:solidFill>
-                <a:latin typeface="Courier New" panose="02070309020205020404" pitchFamily="49" charset="0"/>
-              </a:rPr>
-              <a:t>.</a:t>
-            </a:r>
-            <a:r>
-              <a:rPr lang="en-US" sz="2400" dirty="0" err="1">
-                <a:solidFill>
-                  <a:srgbClr val="000000"/>
-                </a:solidFill>
-                <a:latin typeface="Courier New" panose="02070309020205020404" pitchFamily="49" charset="0"/>
-              </a:rPr>
-              <a:t>out</a:t>
-            </a:r>
-            <a:r>
-              <a:rPr lang="en-US" sz="2400" b="1" dirty="0" err="1">
-                <a:solidFill>
-                  <a:srgbClr val="000080"/>
-                </a:solidFill>
-                <a:latin typeface="Courier New" panose="02070309020205020404" pitchFamily="49" charset="0"/>
-              </a:rPr>
-              <a:t>.</a:t>
-            </a:r>
-            <a:r>
-              <a:rPr lang="en-US" sz="2400" dirty="0" err="1">
-                <a:solidFill>
-                  <a:srgbClr val="000000"/>
-                </a:solidFill>
-                <a:latin typeface="Courier New" panose="02070309020205020404" pitchFamily="49" charset="0"/>
-              </a:rPr>
-              <a:t>println</a:t>
-            </a:r>
-            <a:r>
-              <a:rPr lang="en-US" sz="2400" b="1" dirty="0">
-                <a:solidFill>
-                  <a:srgbClr val="000080"/>
-                </a:solidFill>
-                <a:latin typeface="Courier New" panose="02070309020205020404" pitchFamily="49" charset="0"/>
-              </a:rPr>
-              <a:t>(</a:t>
-            </a:r>
-            <a:r>
-              <a:rPr lang="en-US" sz="2400" dirty="0" err="1">
-                <a:solidFill>
-                  <a:srgbClr val="000000"/>
-                </a:solidFill>
-                <a:latin typeface="Courier New" panose="02070309020205020404" pitchFamily="49" charset="0"/>
-              </a:rPr>
-              <a:t>isFive</a:t>
-            </a:r>
-            <a:r>
-              <a:rPr lang="en-US" sz="2400" b="1" dirty="0" err="1">
-                <a:solidFill>
-                  <a:srgbClr val="000080"/>
-                </a:solidFill>
-                <a:latin typeface="Courier New" panose="02070309020205020404" pitchFamily="49" charset="0"/>
-              </a:rPr>
-              <a:t>.</a:t>
-            </a:r>
-            <a:r>
-              <a:rPr lang="en-US" sz="2400" dirty="0" err="1">
-                <a:solidFill>
-                  <a:srgbClr val="000000"/>
-                </a:solidFill>
-                <a:latin typeface="Courier New" panose="02070309020205020404" pitchFamily="49" charset="0"/>
-              </a:rPr>
-              <a:t>test</a:t>
-            </a:r>
-            <a:r>
-              <a:rPr lang="en-US" sz="2400" b="1" dirty="0">
-                <a:solidFill>
-                  <a:srgbClr val="000080"/>
-                </a:solidFill>
-                <a:latin typeface="Courier New" panose="02070309020205020404" pitchFamily="49" charset="0"/>
-              </a:rPr>
-              <a:t>(</a:t>
-            </a:r>
-            <a:r>
-              <a:rPr lang="en-US" sz="2400" dirty="0">
-                <a:solidFill>
-                  <a:srgbClr val="FF8000"/>
-                </a:solidFill>
-                <a:latin typeface="Courier New" panose="02070309020205020404" pitchFamily="49" charset="0"/>
-              </a:rPr>
-              <a:t>4</a:t>
-            </a:r>
-            <a:r>
-              <a:rPr lang="en-US" sz="2400" b="1" dirty="0">
-                <a:solidFill>
-                  <a:srgbClr val="000080"/>
-                </a:solidFill>
-                <a:latin typeface="Courier New" panose="02070309020205020404" pitchFamily="49" charset="0"/>
-              </a:rPr>
-              <a:t>));</a:t>
-            </a:r>
-            <a:r>
-              <a:rPr lang="en-US" sz="2400" dirty="0">
-                <a:solidFill>
-                  <a:srgbClr val="000000"/>
-                </a:solidFill>
-                <a:latin typeface="Courier New" panose="02070309020205020404" pitchFamily="49" charset="0"/>
-              </a:rPr>
-              <a:t> </a:t>
-            </a:r>
-            <a:r>
-              <a:rPr lang="en-US" sz="2400" dirty="0">
-                <a:solidFill>
-                  <a:srgbClr val="008000"/>
-                </a:solidFill>
-                <a:latin typeface="Courier New" panose="02070309020205020404" pitchFamily="49" charset="0"/>
-              </a:rPr>
-              <a:t>// false </a:t>
-            </a:r>
-            <a:endParaRPr lang="en-US" sz="2400" dirty="0"/>
-          </a:p>
-          <a:p>
-            <a:r>
-              <a:rPr lang="en-US" sz="2400" dirty="0" smtClean="0"/>
-              <a:t>Lambdas may only exist when assigned to a Functional Interface</a:t>
-            </a:r>
-          </a:p>
-          <a:p>
-            <a:r>
-              <a:rPr lang="en-US" sz="2400" dirty="0">
-                <a:solidFill>
-                  <a:srgbClr val="000000"/>
-                </a:solidFill>
-                <a:latin typeface="Courier New" panose="02070309020205020404" pitchFamily="49" charset="0"/>
-              </a:rPr>
-              <a:t>n </a:t>
-            </a:r>
-            <a:r>
-              <a:rPr lang="en-US" sz="2400" b="1" dirty="0">
-                <a:solidFill>
-                  <a:srgbClr val="000080"/>
-                </a:solidFill>
-                <a:latin typeface="Courier New" panose="02070309020205020404" pitchFamily="49" charset="0"/>
-              </a:rPr>
-              <a:t>-&gt;</a:t>
-            </a:r>
-            <a:r>
-              <a:rPr lang="en-US" sz="2400" dirty="0">
-                <a:solidFill>
-                  <a:srgbClr val="000000"/>
-                </a:solidFill>
-                <a:latin typeface="Courier New" panose="02070309020205020404" pitchFamily="49" charset="0"/>
-              </a:rPr>
-              <a:t> n </a:t>
-            </a:r>
-            <a:r>
-              <a:rPr lang="en-US" sz="2400" b="1" dirty="0">
-                <a:solidFill>
-                  <a:srgbClr val="000080"/>
-                </a:solidFill>
-                <a:latin typeface="Courier New" panose="02070309020205020404" pitchFamily="49" charset="0"/>
-              </a:rPr>
-              <a:t>==</a:t>
-            </a:r>
-            <a:r>
-              <a:rPr lang="en-US" sz="2400" dirty="0">
-                <a:solidFill>
-                  <a:srgbClr val="000000"/>
-                </a:solidFill>
-                <a:latin typeface="Courier New" panose="02070309020205020404" pitchFamily="49" charset="0"/>
-              </a:rPr>
-              <a:t> </a:t>
-            </a:r>
-            <a:r>
-              <a:rPr lang="en-US" sz="2400" dirty="0">
-                <a:solidFill>
-                  <a:srgbClr val="FF8000"/>
-                </a:solidFill>
-                <a:latin typeface="Courier New" panose="02070309020205020404" pitchFamily="49" charset="0"/>
-              </a:rPr>
-              <a:t>6</a:t>
-            </a:r>
-            <a:r>
-              <a:rPr lang="en-US" sz="2400" b="1" dirty="0">
-                <a:solidFill>
-                  <a:srgbClr val="000080"/>
-                </a:solidFill>
-                <a:latin typeface="Courier New" panose="02070309020205020404" pitchFamily="49" charset="0"/>
-              </a:rPr>
-              <a:t>;</a:t>
-            </a:r>
-            <a:r>
-              <a:rPr lang="en-US" sz="2400" dirty="0">
-                <a:solidFill>
-                  <a:srgbClr val="000000"/>
-                </a:solidFill>
-                <a:latin typeface="Courier New" panose="02070309020205020404" pitchFamily="49" charset="0"/>
-              </a:rPr>
-              <a:t> </a:t>
-            </a:r>
-            <a:r>
-              <a:rPr lang="en-US" sz="2400" dirty="0">
-                <a:solidFill>
-                  <a:srgbClr val="008000"/>
-                </a:solidFill>
-                <a:latin typeface="Courier New" panose="02070309020205020404" pitchFamily="49" charset="0"/>
-              </a:rPr>
-              <a:t>// Does not compile</a:t>
-            </a:r>
-            <a:endParaRPr lang="en-US" sz="2400" dirty="0"/>
+              <a:rPr lang="en-US" sz="2400" smtClean="0"/>
+              <a:t>These slides (pdf): </a:t>
+            </a:r>
+            <a:endParaRPr lang="en-US" sz="2400" dirty="0" smtClean="0"/>
           </a:p>
           <a:p>
             <a:endParaRPr lang="en-US" sz="2400" dirty="0"/>
@@ -6284,7 +5973,7 @@
     </p:spTree>
     <p:extLst>
       <p:ext uri="{BB962C8B-B14F-4D97-AF65-F5344CB8AC3E}">
-        <p14:creationId xmlns:p14="http://schemas.microsoft.com/office/powerpoint/2010/main" val="2934893548"/>
+        <p14:creationId xmlns:p14="http://schemas.microsoft.com/office/powerpoint/2010/main" val="70859332"/>
       </p:ext>
     </p:extLst>
   </p:cSld>
@@ -6328,7 +6017,7 @@
           <a:p>
             <a:r>
               <a:rPr lang="en-US" dirty="0" smtClean="0"/>
-              <a:t>Functional Interface (FI) in Java 8</a:t>
+              <a:t>What is a Lambda Expression?</a:t>
             </a:r>
             <a:endParaRPr lang="en-US" dirty="0"/>
           </a:p>
@@ -6344,12 +6033,7 @@
             <p:ph idx="1"/>
           </p:nvPr>
         </p:nvSpPr>
-        <p:spPr>
-          <a:xfrm>
-            <a:off x="677334" y="1627095"/>
-            <a:ext cx="8596668" cy="4809564"/>
-          </a:xfrm>
-        </p:spPr>
+        <p:spPr/>
         <p:txBody>
           <a:bodyPr>
             <a:normAutofit/>
@@ -6357,790 +6041,397 @@
           <a:lstStyle/>
           <a:p>
             <a:r>
-              <a:rPr lang="en-US" sz="2100" dirty="0"/>
-              <a:t>“A functional interface is any interface that contains only one abstract method</a:t>
-            </a:r>
-            <a:r>
-              <a:rPr lang="en-US" sz="2100" dirty="0" smtClean="0"/>
-              <a:t>.” -- </a:t>
-            </a:r>
-            <a:r>
-              <a:rPr lang="en-US" sz="2100" dirty="0" smtClean="0">
-                <a:hlinkClick r:id="rId2"/>
-              </a:rPr>
-              <a:t>Oracle Java Tutorial</a:t>
-            </a:r>
-            <a:endParaRPr lang="en-US" sz="2100" dirty="0" smtClean="0"/>
-          </a:p>
-          <a:p>
-            <a:r>
-              <a:rPr lang="en-US" sz="2100" dirty="0" smtClean="0"/>
-              <a:t>Example 2- Valid Functional Interface</a:t>
-            </a:r>
-          </a:p>
-          <a:p>
-            <a:pPr marL="0" indent="0">
-              <a:buNone/>
-            </a:pPr>
-            <a:r>
-              <a:rPr lang="en-US" sz="2100" dirty="0">
-                <a:solidFill>
-                  <a:srgbClr val="000000"/>
-                </a:solidFill>
-                <a:highlight>
-                  <a:srgbClr val="FFFFFF"/>
-                </a:highlight>
-                <a:latin typeface="Courier New" panose="02070309020205020404" pitchFamily="49" charset="0"/>
-              </a:rPr>
-              <a:t>@</a:t>
-            </a:r>
-            <a:r>
-              <a:rPr lang="en-US" sz="2100" dirty="0" err="1">
-                <a:solidFill>
-                  <a:srgbClr val="000000"/>
-                </a:solidFill>
-                <a:highlight>
-                  <a:srgbClr val="FFFFFF"/>
-                </a:highlight>
-                <a:latin typeface="Courier New" panose="02070309020205020404" pitchFamily="49" charset="0"/>
-              </a:rPr>
-              <a:t>FunctionalInterface</a:t>
-            </a:r>
-            <a:r>
-              <a:rPr lang="en-US" sz="2100" dirty="0">
-                <a:solidFill>
-                  <a:srgbClr val="000000"/>
-                </a:solidFill>
-                <a:highlight>
-                  <a:srgbClr val="FFFFFF"/>
-                </a:highlight>
+              <a:rPr lang="en-US" sz="2400" dirty="0" smtClean="0"/>
+              <a:t>In Java, it is an unnamed function that may be bound to an interface as an object.</a:t>
+            </a:r>
+          </a:p>
+          <a:p>
+            <a:r>
+              <a:rPr lang="en-US" sz="2400" dirty="0" smtClean="0"/>
+              <a:t>Example 1</a:t>
+            </a:r>
+          </a:p>
+          <a:p>
+            <a:r>
+              <a:rPr lang="en-US" sz="2400" dirty="0">
+                <a:solidFill>
+                  <a:srgbClr val="000000"/>
+                </a:solidFill>
+                <a:latin typeface="Courier New" panose="02070309020205020404" pitchFamily="49" charset="0"/>
+              </a:rPr>
+              <a:t>Predicate</a:t>
+            </a:r>
+            <a:r>
+              <a:rPr lang="en-US" sz="2400" b="1" dirty="0">
+                <a:solidFill>
+                  <a:srgbClr val="000080"/>
+                </a:solidFill>
+                <a:latin typeface="Courier New" panose="02070309020205020404" pitchFamily="49" charset="0"/>
+              </a:rPr>
+              <a:t>&lt;</a:t>
+            </a:r>
+            <a:r>
+              <a:rPr lang="en-US" sz="2400" dirty="0">
+                <a:solidFill>
+                  <a:srgbClr val="000000"/>
+                </a:solidFill>
+                <a:latin typeface="Courier New" panose="02070309020205020404" pitchFamily="49" charset="0"/>
+              </a:rPr>
+              <a:t>Integer</a:t>
+            </a:r>
+            <a:r>
+              <a:rPr lang="en-US" sz="2400" b="1" dirty="0">
+                <a:solidFill>
+                  <a:srgbClr val="000080"/>
+                </a:solidFill>
+                <a:latin typeface="Courier New" panose="02070309020205020404" pitchFamily="49" charset="0"/>
+              </a:rPr>
+              <a:t>&gt;</a:t>
+            </a:r>
+            <a:r>
+              <a:rPr lang="en-US" sz="2400" dirty="0">
+                <a:solidFill>
+                  <a:srgbClr val="000000"/>
+                </a:solidFill>
                 <a:latin typeface="Courier New" panose="02070309020205020404" pitchFamily="49" charset="0"/>
               </a:rPr>
               <a:t> </a:t>
             </a:r>
             <a:r>
-              <a:rPr lang="en-US" sz="2100" dirty="0">
+              <a:rPr lang="en-US" sz="2400" dirty="0" err="1">
+                <a:solidFill>
+                  <a:srgbClr val="000000"/>
+                </a:solidFill>
+                <a:latin typeface="Courier New" panose="02070309020205020404" pitchFamily="49" charset="0"/>
+              </a:rPr>
+              <a:t>isFive</a:t>
+            </a:r>
+            <a:r>
+              <a:rPr lang="en-US" sz="2400" dirty="0">
+                <a:solidFill>
+                  <a:srgbClr val="000000"/>
+                </a:solidFill>
+                <a:latin typeface="Courier New" panose="02070309020205020404" pitchFamily="49" charset="0"/>
+              </a:rPr>
+              <a:t> </a:t>
+            </a:r>
+            <a:r>
+              <a:rPr lang="en-US" sz="2400" b="1" dirty="0">
+                <a:solidFill>
+                  <a:srgbClr val="000080"/>
+                </a:solidFill>
+                <a:latin typeface="Courier New" panose="02070309020205020404" pitchFamily="49" charset="0"/>
+              </a:rPr>
+              <a:t>=</a:t>
+            </a:r>
+            <a:r>
+              <a:rPr lang="en-US" sz="2400" dirty="0">
+                <a:solidFill>
+                  <a:srgbClr val="000000"/>
+                </a:solidFill>
+                <a:latin typeface="Courier New" panose="02070309020205020404" pitchFamily="49" charset="0"/>
+              </a:rPr>
+              <a:t> n </a:t>
+            </a:r>
+            <a:r>
+              <a:rPr lang="en-US" sz="2400" b="1" dirty="0">
+                <a:solidFill>
+                  <a:srgbClr val="000080"/>
+                </a:solidFill>
+                <a:latin typeface="Courier New" panose="02070309020205020404" pitchFamily="49" charset="0"/>
+              </a:rPr>
+              <a:t>-&gt;</a:t>
+            </a:r>
+            <a:r>
+              <a:rPr lang="en-US" sz="2400" dirty="0">
+                <a:solidFill>
+                  <a:srgbClr val="000000"/>
+                </a:solidFill>
+                <a:latin typeface="Courier New" panose="02070309020205020404" pitchFamily="49" charset="0"/>
+              </a:rPr>
+              <a:t> </a:t>
+            </a:r>
+            <a:r>
+              <a:rPr lang="en-US" sz="2400" dirty="0" smtClean="0">
+                <a:solidFill>
+                  <a:srgbClr val="000000"/>
+                </a:solidFill>
+                <a:latin typeface="Courier New" panose="02070309020205020404" pitchFamily="49" charset="0"/>
+              </a:rPr>
+              <a:t>n </a:t>
+            </a:r>
+            <a:r>
+              <a:rPr lang="en-US" sz="2400" b="1" dirty="0">
+                <a:solidFill>
+                  <a:srgbClr val="000080"/>
+                </a:solidFill>
+                <a:latin typeface="Courier New" panose="02070309020205020404" pitchFamily="49" charset="0"/>
+              </a:rPr>
+              <a:t>==</a:t>
+            </a:r>
+            <a:r>
+              <a:rPr lang="en-US" sz="2400" dirty="0">
+                <a:solidFill>
+                  <a:srgbClr val="000000"/>
+                </a:solidFill>
+                <a:latin typeface="Courier New" panose="02070309020205020404" pitchFamily="49" charset="0"/>
+              </a:rPr>
+              <a:t> </a:t>
+            </a:r>
+            <a:r>
+              <a:rPr lang="en-US" sz="2400" dirty="0">
+                <a:solidFill>
+                  <a:srgbClr val="FF8000"/>
+                </a:solidFill>
+                <a:latin typeface="Courier New" panose="02070309020205020404" pitchFamily="49" charset="0"/>
+              </a:rPr>
+              <a:t>5</a:t>
+            </a:r>
+            <a:r>
+              <a:rPr lang="en-US" sz="2400" b="1" dirty="0">
+                <a:solidFill>
+                  <a:srgbClr val="000080"/>
+                </a:solidFill>
+                <a:latin typeface="Courier New" panose="02070309020205020404" pitchFamily="49" charset="0"/>
+              </a:rPr>
+              <a:t>;</a:t>
+            </a:r>
+            <a:r>
+              <a:rPr lang="en-US" sz="2400" dirty="0">
+                <a:solidFill>
+                  <a:srgbClr val="000000"/>
+                </a:solidFill>
+                <a:latin typeface="Courier New" panose="02070309020205020404" pitchFamily="49" charset="0"/>
+              </a:rPr>
+              <a:t> </a:t>
+            </a:r>
+            <a:r>
+              <a:rPr lang="en-US" sz="2400" dirty="0" err="1">
+                <a:solidFill>
+                  <a:srgbClr val="000000"/>
+                </a:solidFill>
+                <a:latin typeface="Courier New" panose="02070309020205020404" pitchFamily="49" charset="0"/>
+              </a:rPr>
+              <a:t>System</a:t>
+            </a:r>
+            <a:r>
+              <a:rPr lang="en-US" sz="2400" b="1" dirty="0" err="1">
+                <a:solidFill>
+                  <a:srgbClr val="000080"/>
+                </a:solidFill>
+                <a:latin typeface="Courier New" panose="02070309020205020404" pitchFamily="49" charset="0"/>
+              </a:rPr>
+              <a:t>.</a:t>
+            </a:r>
+            <a:r>
+              <a:rPr lang="en-US" sz="2400" dirty="0" err="1">
+                <a:solidFill>
+                  <a:srgbClr val="000000"/>
+                </a:solidFill>
+                <a:latin typeface="Courier New" panose="02070309020205020404" pitchFamily="49" charset="0"/>
+              </a:rPr>
+              <a:t>out</a:t>
+            </a:r>
+            <a:r>
+              <a:rPr lang="en-US" sz="2400" b="1" dirty="0" err="1">
+                <a:solidFill>
+                  <a:srgbClr val="000080"/>
+                </a:solidFill>
+                <a:latin typeface="Courier New" panose="02070309020205020404" pitchFamily="49" charset="0"/>
+              </a:rPr>
+              <a:t>.</a:t>
+            </a:r>
+            <a:r>
+              <a:rPr lang="en-US" sz="2400" dirty="0" err="1">
+                <a:solidFill>
+                  <a:srgbClr val="000000"/>
+                </a:solidFill>
+                <a:latin typeface="Courier New" panose="02070309020205020404" pitchFamily="49" charset="0"/>
+              </a:rPr>
+              <a:t>println</a:t>
+            </a:r>
+            <a:r>
+              <a:rPr lang="en-US" sz="2400" b="1" dirty="0">
+                <a:solidFill>
+                  <a:srgbClr val="000080"/>
+                </a:solidFill>
+                <a:latin typeface="Courier New" panose="02070309020205020404" pitchFamily="49" charset="0"/>
+              </a:rPr>
+              <a:t>(</a:t>
+            </a:r>
+            <a:r>
+              <a:rPr lang="en-US" sz="2400" dirty="0" err="1">
+                <a:solidFill>
+                  <a:srgbClr val="000000"/>
+                </a:solidFill>
+                <a:latin typeface="Courier New" panose="02070309020205020404" pitchFamily="49" charset="0"/>
+              </a:rPr>
+              <a:t>isFive</a:t>
+            </a:r>
+            <a:r>
+              <a:rPr lang="en-US" sz="2400" b="1" dirty="0" err="1">
+                <a:solidFill>
+                  <a:srgbClr val="000080"/>
+                </a:solidFill>
+                <a:latin typeface="Courier New" panose="02070309020205020404" pitchFamily="49" charset="0"/>
+              </a:rPr>
+              <a:t>.</a:t>
+            </a:r>
+            <a:r>
+              <a:rPr lang="en-US" sz="2400" dirty="0" err="1">
+                <a:solidFill>
+                  <a:srgbClr val="000000"/>
+                </a:solidFill>
+                <a:latin typeface="Courier New" panose="02070309020205020404" pitchFamily="49" charset="0"/>
+              </a:rPr>
+              <a:t>test</a:t>
+            </a:r>
+            <a:r>
+              <a:rPr lang="en-US" sz="2400" b="1" dirty="0">
+                <a:solidFill>
+                  <a:srgbClr val="000080"/>
+                </a:solidFill>
+                <a:latin typeface="Courier New" panose="02070309020205020404" pitchFamily="49" charset="0"/>
+              </a:rPr>
+              <a:t>(</a:t>
+            </a:r>
+            <a:r>
+              <a:rPr lang="en-US" sz="2400" dirty="0">
+                <a:solidFill>
+                  <a:srgbClr val="FF8000"/>
+                </a:solidFill>
+                <a:latin typeface="Courier New" panose="02070309020205020404" pitchFamily="49" charset="0"/>
+              </a:rPr>
+              <a:t>4</a:t>
+            </a:r>
+            <a:r>
+              <a:rPr lang="en-US" sz="2400" b="1" dirty="0">
+                <a:solidFill>
+                  <a:srgbClr val="000080"/>
+                </a:solidFill>
+                <a:latin typeface="Courier New" panose="02070309020205020404" pitchFamily="49" charset="0"/>
+              </a:rPr>
+              <a:t>));</a:t>
+            </a:r>
+            <a:r>
+              <a:rPr lang="en-US" sz="2400" dirty="0">
+                <a:solidFill>
+                  <a:srgbClr val="000000"/>
+                </a:solidFill>
+                <a:latin typeface="Courier New" panose="02070309020205020404" pitchFamily="49" charset="0"/>
+              </a:rPr>
+              <a:t> </a:t>
+            </a:r>
+            <a:r>
+              <a:rPr lang="en-US" sz="2400" dirty="0">
                 <a:solidFill>
                   <a:srgbClr val="008000"/>
                 </a:solidFill>
-                <a:highlight>
-                  <a:srgbClr val="FFFFFF"/>
-                </a:highlight>
-                <a:latin typeface="Courier New" panose="02070309020205020404" pitchFamily="49" charset="0"/>
-              </a:rPr>
-              <a:t>// Optional</a:t>
-            </a:r>
-          </a:p>
-          <a:p>
-            <a:pPr marL="0" indent="0">
-              <a:buNone/>
-            </a:pPr>
-            <a:r>
-              <a:rPr lang="en-US" sz="2100" dirty="0">
-                <a:solidFill>
-                  <a:srgbClr val="8000FF"/>
-                </a:solidFill>
-                <a:highlight>
-                  <a:srgbClr val="FFFFFF"/>
-                </a:highlight>
-                <a:latin typeface="Courier New" panose="02070309020205020404" pitchFamily="49" charset="0"/>
-              </a:rPr>
-              <a:t>public</a:t>
-            </a:r>
-            <a:r>
-              <a:rPr lang="en-US" sz="2100" dirty="0">
-                <a:solidFill>
-                  <a:srgbClr val="000000"/>
-                </a:solidFill>
-                <a:highlight>
-                  <a:srgbClr val="FFFFFF"/>
-                </a:highlight>
+                <a:latin typeface="Courier New" panose="02070309020205020404" pitchFamily="49" charset="0"/>
+              </a:rPr>
+              <a:t>// false </a:t>
+            </a:r>
+            <a:endParaRPr lang="en-US" sz="2400" dirty="0"/>
+          </a:p>
+          <a:p>
+            <a:r>
+              <a:rPr lang="en-US" sz="2400" dirty="0" smtClean="0"/>
+              <a:t>Lambdas may only exist when assigned to a Functional Interface</a:t>
+            </a:r>
+          </a:p>
+          <a:p>
+            <a:r>
+              <a:rPr lang="en-US" sz="2400" dirty="0">
+                <a:solidFill>
+                  <a:srgbClr val="000000"/>
+                </a:solidFill>
+                <a:latin typeface="Courier New" panose="02070309020205020404" pitchFamily="49" charset="0"/>
+              </a:rPr>
+              <a:t>n </a:t>
+            </a:r>
+            <a:r>
+              <a:rPr lang="en-US" sz="2400" b="1" dirty="0">
+                <a:solidFill>
+                  <a:srgbClr val="000080"/>
+                </a:solidFill>
+                <a:latin typeface="Courier New" panose="02070309020205020404" pitchFamily="49" charset="0"/>
+              </a:rPr>
+              <a:t>-&gt;</a:t>
+            </a:r>
+            <a:r>
+              <a:rPr lang="en-US" sz="2400" dirty="0">
+                <a:solidFill>
+                  <a:srgbClr val="000000"/>
+                </a:solidFill>
+                <a:latin typeface="Courier New" panose="02070309020205020404" pitchFamily="49" charset="0"/>
+              </a:rPr>
+              <a:t> n </a:t>
+            </a:r>
+            <a:r>
+              <a:rPr lang="en-US" sz="2400" b="1" dirty="0">
+                <a:solidFill>
+                  <a:srgbClr val="000080"/>
+                </a:solidFill>
+                <a:latin typeface="Courier New" panose="02070309020205020404" pitchFamily="49" charset="0"/>
+              </a:rPr>
+              <a:t>==</a:t>
+            </a:r>
+            <a:r>
+              <a:rPr lang="en-US" sz="2400" dirty="0">
+                <a:solidFill>
+                  <a:srgbClr val="000000"/>
+                </a:solidFill>
                 <a:latin typeface="Courier New" panose="02070309020205020404" pitchFamily="49" charset="0"/>
               </a:rPr>
               <a:t> </a:t>
             </a:r>
             <a:r>
-              <a:rPr lang="en-US" sz="2100" dirty="0">
-                <a:solidFill>
-                  <a:srgbClr val="8000FF"/>
-                </a:solidFill>
-                <a:highlight>
-                  <a:srgbClr val="FFFFFF"/>
-                </a:highlight>
-                <a:latin typeface="Courier New" panose="02070309020205020404" pitchFamily="49" charset="0"/>
-              </a:rPr>
-              <a:t>interface</a:t>
-            </a:r>
-            <a:r>
-              <a:rPr lang="en-US" sz="2100" dirty="0">
-                <a:solidFill>
-                  <a:srgbClr val="000000"/>
-                </a:solidFill>
-                <a:highlight>
-                  <a:srgbClr val="FFFFFF"/>
-                </a:highlight>
-                <a:latin typeface="Courier New" panose="02070309020205020404" pitchFamily="49" charset="0"/>
-              </a:rPr>
-              <a:t> Example2 </a:t>
-            </a:r>
-            <a:r>
-              <a:rPr lang="en-US" sz="2100" b="1" dirty="0">
+              <a:rPr lang="en-US" sz="2400" dirty="0">
+                <a:solidFill>
+                  <a:srgbClr val="FF8000"/>
+                </a:solidFill>
+                <a:latin typeface="Courier New" panose="02070309020205020404" pitchFamily="49" charset="0"/>
+              </a:rPr>
+              <a:t>6</a:t>
+            </a:r>
+            <a:r>
+              <a:rPr lang="en-US" sz="2400" b="1" dirty="0">
                 <a:solidFill>
                   <a:srgbClr val="000080"/>
                 </a:solidFill>
-                <a:highlight>
-                  <a:srgbClr val="FFFFFF"/>
-                </a:highlight>
-                <a:latin typeface="Courier New" panose="02070309020205020404" pitchFamily="49" charset="0"/>
-              </a:rPr>
-              <a:t>{</a:t>
-            </a:r>
-            <a:endParaRPr lang="en-US" sz="2100" dirty="0">
-              <a:solidFill>
-                <a:srgbClr val="000000"/>
-              </a:solidFill>
-              <a:highlight>
-                <a:srgbClr val="FFFFFF"/>
-              </a:highlight>
-              <a:latin typeface="Courier New" panose="02070309020205020404" pitchFamily="49" charset="0"/>
-            </a:endParaRPr>
-          </a:p>
-          <a:p>
-            <a:pPr marL="0" indent="0">
-              <a:buNone/>
-            </a:pPr>
-            <a:r>
-              <a:rPr lang="en-US" sz="2100" dirty="0">
-                <a:solidFill>
-                  <a:srgbClr val="000000"/>
-                </a:solidFill>
-                <a:highlight>
-                  <a:srgbClr val="FFFFFF"/>
-                </a:highlight>
-                <a:latin typeface="Courier New" panose="02070309020205020404" pitchFamily="49" charset="0"/>
-              </a:rPr>
-              <a:t>    </a:t>
-            </a:r>
-            <a:r>
-              <a:rPr lang="en-US" sz="2100" dirty="0" err="1">
-                <a:solidFill>
-                  <a:srgbClr val="8000FF"/>
-                </a:solidFill>
-                <a:highlight>
-                  <a:srgbClr val="FFFFFF"/>
-                </a:highlight>
-                <a:latin typeface="Courier New" panose="02070309020205020404" pitchFamily="49" charset="0"/>
-              </a:rPr>
-              <a:t>boolean</a:t>
-            </a:r>
-            <a:r>
-              <a:rPr lang="en-US" sz="2100" dirty="0">
-                <a:solidFill>
-                  <a:srgbClr val="000000"/>
-                </a:solidFill>
-                <a:highlight>
-                  <a:srgbClr val="FFFFFF"/>
-                </a:highlight>
-                <a:latin typeface="Courier New" panose="02070309020205020404" pitchFamily="49" charset="0"/>
-              </a:rPr>
-              <a:t> equals</a:t>
-            </a:r>
-            <a:r>
-              <a:rPr lang="en-US" sz="2100" b="1" dirty="0">
-                <a:solidFill>
-                  <a:srgbClr val="000080"/>
-                </a:solidFill>
-                <a:highlight>
-                  <a:srgbClr val="FFFFFF"/>
-                </a:highlight>
-                <a:latin typeface="Courier New" panose="02070309020205020404" pitchFamily="49" charset="0"/>
-              </a:rPr>
-              <a:t>(</a:t>
-            </a:r>
-            <a:r>
-              <a:rPr lang="en-US" sz="2100" dirty="0">
-                <a:solidFill>
-                  <a:srgbClr val="000000"/>
-                </a:solidFill>
-                <a:highlight>
-                  <a:srgbClr val="FFFFFF"/>
-                </a:highlight>
-                <a:latin typeface="Courier New" panose="02070309020205020404" pitchFamily="49" charset="0"/>
-              </a:rPr>
-              <a:t>Object other</a:t>
-            </a:r>
-            <a:r>
-              <a:rPr lang="en-US" sz="2100" b="1" dirty="0">
-                <a:solidFill>
-                  <a:srgbClr val="000080"/>
-                </a:solidFill>
-                <a:highlight>
-                  <a:srgbClr val="FFFFFF"/>
-                </a:highlight>
-                <a:latin typeface="Courier New" panose="02070309020205020404" pitchFamily="49" charset="0"/>
-              </a:rPr>
-              <a:t>);</a:t>
-            </a:r>
-            <a:r>
-              <a:rPr lang="en-US" sz="2100" dirty="0">
-                <a:solidFill>
-                  <a:srgbClr val="000000"/>
-                </a:solidFill>
-                <a:highlight>
-                  <a:srgbClr val="FFFFFF"/>
-                </a:highlight>
+                <a:latin typeface="Courier New" panose="02070309020205020404" pitchFamily="49" charset="0"/>
+              </a:rPr>
+              <a:t>;</a:t>
+            </a:r>
+            <a:r>
+              <a:rPr lang="en-US" sz="2400" dirty="0">
+                <a:solidFill>
+                  <a:srgbClr val="000000"/>
+                </a:solidFill>
                 <a:latin typeface="Courier New" panose="02070309020205020404" pitchFamily="49" charset="0"/>
               </a:rPr>
               <a:t> </a:t>
             </a:r>
             <a:r>
-              <a:rPr lang="en-US" sz="2100" dirty="0">
+              <a:rPr lang="en-US" sz="2400" dirty="0">
                 <a:solidFill>
                   <a:srgbClr val="008000"/>
                 </a:solidFill>
-                <a:highlight>
-                  <a:srgbClr val="FFFFFF"/>
-                </a:highlight>
-                <a:latin typeface="Courier New" panose="02070309020205020404" pitchFamily="49" charset="0"/>
-              </a:rPr>
-              <a:t>// In Object</a:t>
-            </a:r>
-          </a:p>
-          <a:p>
-            <a:pPr marL="0" indent="0">
-              <a:buNone/>
-            </a:pPr>
-            <a:r>
-              <a:rPr lang="en-US" sz="2100" dirty="0">
-                <a:solidFill>
-                  <a:srgbClr val="000000"/>
-                </a:solidFill>
-                <a:highlight>
-                  <a:srgbClr val="FFFFFF"/>
-                </a:highlight>
-                <a:latin typeface="Courier New" panose="02070309020205020404" pitchFamily="49" charset="0"/>
-              </a:rPr>
-              <a:t>    </a:t>
-            </a:r>
-            <a:r>
-              <a:rPr lang="en-US" sz="2100" dirty="0" err="1">
-                <a:solidFill>
-                  <a:srgbClr val="8000FF"/>
-                </a:solidFill>
-                <a:highlight>
-                  <a:srgbClr val="FFFFFF"/>
-                </a:highlight>
-                <a:latin typeface="Courier New" panose="02070309020205020404" pitchFamily="49" charset="0"/>
-              </a:rPr>
-              <a:t>int</a:t>
-            </a:r>
-            <a:r>
-              <a:rPr lang="en-US" sz="2100" dirty="0">
-                <a:solidFill>
-                  <a:srgbClr val="000000"/>
-                </a:solidFill>
-                <a:highlight>
-                  <a:srgbClr val="FFFFFF"/>
-                </a:highlight>
-                <a:latin typeface="Courier New" panose="02070309020205020404" pitchFamily="49" charset="0"/>
-              </a:rPr>
-              <a:t> </a:t>
-            </a:r>
-            <a:r>
-              <a:rPr lang="en-US" sz="2100" dirty="0" err="1">
-                <a:solidFill>
-                  <a:srgbClr val="000000"/>
-                </a:solidFill>
-                <a:highlight>
-                  <a:srgbClr val="FFFFFF"/>
-                </a:highlight>
-                <a:latin typeface="Courier New" panose="02070309020205020404" pitchFamily="49" charset="0"/>
-              </a:rPr>
-              <a:t>hashCode</a:t>
-            </a:r>
-            <a:r>
-              <a:rPr lang="en-US" sz="2100" b="1" dirty="0">
-                <a:solidFill>
-                  <a:srgbClr val="000080"/>
-                </a:solidFill>
-                <a:highlight>
-                  <a:srgbClr val="FFFFFF"/>
-                </a:highlight>
-                <a:latin typeface="Courier New" panose="02070309020205020404" pitchFamily="49" charset="0"/>
-              </a:rPr>
-              <a:t>();</a:t>
-            </a:r>
-            <a:r>
-              <a:rPr lang="en-US" sz="2100" dirty="0">
-                <a:solidFill>
-                  <a:srgbClr val="000000"/>
-                </a:solidFill>
-                <a:highlight>
-                  <a:srgbClr val="FFFFFF"/>
-                </a:highlight>
-                <a:latin typeface="Courier New" panose="02070309020205020404" pitchFamily="49" charset="0"/>
-              </a:rPr>
-              <a:t> </a:t>
-            </a:r>
-            <a:r>
-              <a:rPr lang="en-US" sz="2100" dirty="0">
-                <a:solidFill>
-                  <a:srgbClr val="008000"/>
-                </a:solidFill>
-                <a:highlight>
-                  <a:srgbClr val="FFFFFF"/>
-                </a:highlight>
-                <a:latin typeface="Courier New" panose="02070309020205020404" pitchFamily="49" charset="0"/>
-              </a:rPr>
-              <a:t>// In Object</a:t>
-            </a:r>
-          </a:p>
-          <a:p>
-            <a:pPr marL="0" indent="0">
-              <a:buNone/>
-            </a:pPr>
-            <a:r>
-              <a:rPr lang="en-US" sz="2100" dirty="0">
-                <a:solidFill>
-                  <a:srgbClr val="000000"/>
-                </a:solidFill>
-                <a:highlight>
-                  <a:srgbClr val="FFFFFF"/>
-                </a:highlight>
-                <a:latin typeface="Courier New" panose="02070309020205020404" pitchFamily="49" charset="0"/>
-              </a:rPr>
-              <a:t>    </a:t>
-            </a:r>
-            <a:r>
-              <a:rPr lang="en-US" sz="2100" dirty="0" err="1">
-                <a:solidFill>
-                  <a:srgbClr val="8000FF"/>
-                </a:solidFill>
-                <a:highlight>
-                  <a:srgbClr val="FFFFFF"/>
-                </a:highlight>
-                <a:latin typeface="Courier New" panose="02070309020205020404" pitchFamily="49" charset="0"/>
-              </a:rPr>
-              <a:t>int</a:t>
-            </a:r>
-            <a:r>
-              <a:rPr lang="en-US" sz="2100" dirty="0">
-                <a:solidFill>
-                  <a:srgbClr val="000000"/>
-                </a:solidFill>
-                <a:highlight>
-                  <a:srgbClr val="FFFFFF"/>
-                </a:highlight>
-                <a:latin typeface="Courier New" panose="02070309020205020404" pitchFamily="49" charset="0"/>
-              </a:rPr>
-              <a:t> </a:t>
-            </a:r>
-            <a:r>
-              <a:rPr lang="en-US" sz="2100" dirty="0" err="1">
-                <a:solidFill>
-                  <a:srgbClr val="000000"/>
-                </a:solidFill>
-                <a:highlight>
-                  <a:srgbClr val="FFFFFF"/>
-                </a:highlight>
-                <a:latin typeface="Courier New" panose="02070309020205020404" pitchFamily="49" charset="0"/>
-              </a:rPr>
-              <a:t>myMethod</a:t>
-            </a:r>
-            <a:r>
-              <a:rPr lang="en-US" sz="2100" b="1" dirty="0">
-                <a:solidFill>
-                  <a:srgbClr val="000080"/>
-                </a:solidFill>
-                <a:highlight>
-                  <a:srgbClr val="FFFFFF"/>
-                </a:highlight>
-                <a:latin typeface="Courier New" panose="02070309020205020404" pitchFamily="49" charset="0"/>
-              </a:rPr>
-              <a:t>();</a:t>
-            </a:r>
-            <a:r>
-              <a:rPr lang="en-US" sz="2100" dirty="0">
-                <a:solidFill>
-                  <a:srgbClr val="000000"/>
-                </a:solidFill>
-                <a:highlight>
-                  <a:srgbClr val="FFFFFF"/>
-                </a:highlight>
-                <a:latin typeface="Courier New" panose="02070309020205020404" pitchFamily="49" charset="0"/>
-              </a:rPr>
-              <a:t> </a:t>
-            </a:r>
-            <a:r>
-              <a:rPr lang="en-US" sz="2100" dirty="0">
-                <a:solidFill>
-                  <a:srgbClr val="008000"/>
-                </a:solidFill>
-                <a:highlight>
-                  <a:srgbClr val="FFFFFF"/>
-                </a:highlight>
-                <a:latin typeface="Courier New" panose="02070309020205020404" pitchFamily="49" charset="0"/>
-              </a:rPr>
-              <a:t>// Abstract.</a:t>
-            </a:r>
-          </a:p>
-          <a:p>
-            <a:pPr marL="0" indent="0">
-              <a:buNone/>
-            </a:pPr>
-            <a:r>
-              <a:rPr lang="en-US" sz="2100" dirty="0">
-                <a:solidFill>
-                  <a:srgbClr val="000000"/>
-                </a:solidFill>
-                <a:highlight>
-                  <a:srgbClr val="FFFFFF"/>
-                </a:highlight>
-                <a:latin typeface="Courier New" panose="02070309020205020404" pitchFamily="49" charset="0"/>
-              </a:rPr>
-              <a:t>    </a:t>
-            </a:r>
-            <a:r>
-              <a:rPr lang="en-US" sz="2100" b="1" dirty="0">
-                <a:solidFill>
-                  <a:srgbClr val="0000FF"/>
-                </a:solidFill>
-                <a:highlight>
-                  <a:srgbClr val="FFFFFF"/>
-                </a:highlight>
-                <a:latin typeface="Courier New" panose="02070309020205020404" pitchFamily="49" charset="0"/>
-              </a:rPr>
-              <a:t>default</a:t>
-            </a:r>
-            <a:r>
-              <a:rPr lang="en-US" sz="2100" dirty="0">
-                <a:solidFill>
-                  <a:srgbClr val="000000"/>
-                </a:solidFill>
-                <a:highlight>
-                  <a:srgbClr val="FFFFFF"/>
-                </a:highlight>
-                <a:latin typeface="Courier New" panose="02070309020205020404" pitchFamily="49" charset="0"/>
-              </a:rPr>
-              <a:t> </a:t>
-            </a:r>
-            <a:r>
-              <a:rPr lang="en-US" sz="2100" dirty="0" err="1">
-                <a:solidFill>
-                  <a:srgbClr val="8000FF"/>
-                </a:solidFill>
-                <a:highlight>
-                  <a:srgbClr val="FFFFFF"/>
-                </a:highlight>
-                <a:latin typeface="Courier New" panose="02070309020205020404" pitchFamily="49" charset="0"/>
-              </a:rPr>
-              <a:t>int</a:t>
-            </a:r>
-            <a:r>
-              <a:rPr lang="en-US" sz="2100" dirty="0">
-                <a:solidFill>
-                  <a:srgbClr val="000000"/>
-                </a:solidFill>
-                <a:highlight>
-                  <a:srgbClr val="FFFFFF"/>
-                </a:highlight>
-                <a:latin typeface="Courier New" panose="02070309020205020404" pitchFamily="49" charset="0"/>
-              </a:rPr>
-              <a:t> myMethod2</a:t>
-            </a:r>
-            <a:r>
-              <a:rPr lang="en-US" sz="2100" b="1" dirty="0">
-                <a:solidFill>
-                  <a:srgbClr val="000080"/>
-                </a:solidFill>
-                <a:highlight>
-                  <a:srgbClr val="FFFFFF"/>
-                </a:highlight>
-                <a:latin typeface="Courier New" panose="02070309020205020404" pitchFamily="49" charset="0"/>
-              </a:rPr>
-              <a:t>()</a:t>
-            </a:r>
-            <a:r>
-              <a:rPr lang="en-US" sz="2100" dirty="0">
-                <a:solidFill>
-                  <a:srgbClr val="000000"/>
-                </a:solidFill>
-                <a:highlight>
-                  <a:srgbClr val="FFFFFF"/>
-                </a:highlight>
-                <a:latin typeface="Courier New" panose="02070309020205020404" pitchFamily="49" charset="0"/>
-              </a:rPr>
-              <a:t> </a:t>
-            </a:r>
-            <a:r>
-              <a:rPr lang="en-US" sz="2100" b="1" dirty="0">
-                <a:solidFill>
-                  <a:srgbClr val="000080"/>
-                </a:solidFill>
-                <a:highlight>
-                  <a:srgbClr val="FFFFFF"/>
-                </a:highlight>
-                <a:latin typeface="Courier New" panose="02070309020205020404" pitchFamily="49" charset="0"/>
-              </a:rPr>
-              <a:t>{</a:t>
-            </a:r>
-            <a:r>
-              <a:rPr lang="en-US" sz="2100" b="1" dirty="0">
-                <a:solidFill>
-                  <a:srgbClr val="0000FF"/>
-                </a:solidFill>
-                <a:highlight>
-                  <a:srgbClr val="FFFFFF"/>
-                </a:highlight>
-                <a:latin typeface="Courier New" panose="02070309020205020404" pitchFamily="49" charset="0"/>
-              </a:rPr>
-              <a:t>return</a:t>
-            </a:r>
-            <a:r>
-              <a:rPr lang="en-US" sz="2100" dirty="0">
-                <a:solidFill>
-                  <a:srgbClr val="000000"/>
-                </a:solidFill>
-                <a:highlight>
-                  <a:srgbClr val="FFFFFF"/>
-                </a:highlight>
-                <a:latin typeface="Courier New" panose="02070309020205020404" pitchFamily="49" charset="0"/>
-              </a:rPr>
-              <a:t> </a:t>
-            </a:r>
-            <a:r>
-              <a:rPr lang="en-US" sz="2100" dirty="0" err="1">
-                <a:solidFill>
-                  <a:srgbClr val="000000"/>
-                </a:solidFill>
-                <a:highlight>
-                  <a:srgbClr val="FFFFFF"/>
-                </a:highlight>
-                <a:latin typeface="Courier New" panose="02070309020205020404" pitchFamily="49" charset="0"/>
-              </a:rPr>
-              <a:t>myMethod</a:t>
-            </a:r>
-            <a:r>
-              <a:rPr lang="en-US" sz="2100" b="1" dirty="0">
-                <a:solidFill>
-                  <a:srgbClr val="000080"/>
-                </a:solidFill>
-                <a:highlight>
-                  <a:srgbClr val="FFFFFF"/>
-                </a:highlight>
-                <a:latin typeface="Courier New" panose="02070309020205020404" pitchFamily="49" charset="0"/>
-              </a:rPr>
-              <a:t>();}</a:t>
-            </a:r>
-            <a:endParaRPr lang="en-US" sz="2100" dirty="0">
-              <a:solidFill>
-                <a:srgbClr val="000000"/>
-              </a:solidFill>
-              <a:highlight>
-                <a:srgbClr val="FFFFFF"/>
-              </a:highlight>
-              <a:latin typeface="Courier New" panose="02070309020205020404" pitchFamily="49" charset="0"/>
-            </a:endParaRPr>
-          </a:p>
-          <a:p>
-            <a:pPr marL="0" indent="0">
-              <a:buNone/>
-            </a:pPr>
-            <a:r>
-              <a:rPr lang="en-US" sz="2100" dirty="0">
-                <a:solidFill>
-                  <a:srgbClr val="000000"/>
-                </a:solidFill>
-                <a:highlight>
-                  <a:srgbClr val="FFFFFF"/>
-                </a:highlight>
-                <a:latin typeface="Courier New" panose="02070309020205020404" pitchFamily="49" charset="0"/>
-              </a:rPr>
-              <a:t>    </a:t>
-            </a:r>
-            <a:r>
-              <a:rPr lang="en-US" sz="2100" dirty="0">
-                <a:solidFill>
-                  <a:srgbClr val="8000FF"/>
-                </a:solidFill>
-                <a:highlight>
-                  <a:srgbClr val="FFFFFF"/>
-                </a:highlight>
-                <a:latin typeface="Courier New" panose="02070309020205020404" pitchFamily="49" charset="0"/>
-              </a:rPr>
-              <a:t>static</a:t>
-            </a:r>
-            <a:r>
-              <a:rPr lang="en-US" sz="2100" dirty="0">
-                <a:solidFill>
-                  <a:srgbClr val="000000"/>
-                </a:solidFill>
-                <a:highlight>
-                  <a:srgbClr val="FFFFFF"/>
-                </a:highlight>
-                <a:latin typeface="Courier New" panose="02070309020205020404" pitchFamily="49" charset="0"/>
-              </a:rPr>
-              <a:t> </a:t>
-            </a:r>
-            <a:r>
-              <a:rPr lang="en-US" sz="2100" dirty="0" err="1">
-                <a:solidFill>
-                  <a:srgbClr val="8000FF"/>
-                </a:solidFill>
-                <a:highlight>
-                  <a:srgbClr val="FFFFFF"/>
-                </a:highlight>
-                <a:latin typeface="Courier New" panose="02070309020205020404" pitchFamily="49" charset="0"/>
-              </a:rPr>
-              <a:t>int</a:t>
-            </a:r>
-            <a:r>
-              <a:rPr lang="en-US" sz="2100" dirty="0">
-                <a:solidFill>
-                  <a:srgbClr val="000000"/>
-                </a:solidFill>
-                <a:highlight>
-                  <a:srgbClr val="FFFFFF"/>
-                </a:highlight>
-                <a:latin typeface="Courier New" panose="02070309020205020404" pitchFamily="49" charset="0"/>
-              </a:rPr>
-              <a:t> myMethod3</a:t>
-            </a:r>
-            <a:r>
-              <a:rPr lang="en-US" sz="2100" b="1" dirty="0">
-                <a:solidFill>
-                  <a:srgbClr val="000080"/>
-                </a:solidFill>
-                <a:highlight>
-                  <a:srgbClr val="FFFFFF"/>
-                </a:highlight>
-                <a:latin typeface="Courier New" panose="02070309020205020404" pitchFamily="49" charset="0"/>
-              </a:rPr>
-              <a:t>()</a:t>
-            </a:r>
-            <a:r>
-              <a:rPr lang="en-US" sz="2100" dirty="0">
-                <a:solidFill>
-                  <a:srgbClr val="000000"/>
-                </a:solidFill>
-                <a:highlight>
-                  <a:srgbClr val="FFFFFF"/>
-                </a:highlight>
-                <a:latin typeface="Courier New" panose="02070309020205020404" pitchFamily="49" charset="0"/>
-              </a:rPr>
-              <a:t> </a:t>
-            </a:r>
-            <a:r>
-              <a:rPr lang="en-US" sz="2100" b="1" dirty="0">
-                <a:solidFill>
-                  <a:srgbClr val="000080"/>
-                </a:solidFill>
-                <a:highlight>
-                  <a:srgbClr val="FFFFFF"/>
-                </a:highlight>
-                <a:latin typeface="Courier New" panose="02070309020205020404" pitchFamily="49" charset="0"/>
-              </a:rPr>
-              <a:t>{</a:t>
-            </a:r>
-            <a:r>
-              <a:rPr lang="en-US" sz="2100" b="1" dirty="0">
-                <a:solidFill>
-                  <a:srgbClr val="0000FF"/>
-                </a:solidFill>
-                <a:highlight>
-                  <a:srgbClr val="FFFFFF"/>
-                </a:highlight>
-                <a:latin typeface="Courier New" panose="02070309020205020404" pitchFamily="49" charset="0"/>
-              </a:rPr>
-              <a:t>return</a:t>
-            </a:r>
-            <a:r>
-              <a:rPr lang="en-US" sz="2100" dirty="0">
-                <a:solidFill>
-                  <a:srgbClr val="000000"/>
-                </a:solidFill>
-                <a:highlight>
-                  <a:srgbClr val="FFFFFF"/>
-                </a:highlight>
-                <a:latin typeface="Courier New" panose="02070309020205020404" pitchFamily="49" charset="0"/>
-              </a:rPr>
-              <a:t> </a:t>
-            </a:r>
-            <a:r>
-              <a:rPr lang="en-US" sz="2100" dirty="0">
-                <a:solidFill>
-                  <a:srgbClr val="FF8000"/>
-                </a:solidFill>
-                <a:highlight>
-                  <a:srgbClr val="FFFFFF"/>
-                </a:highlight>
-                <a:latin typeface="Courier New" panose="02070309020205020404" pitchFamily="49" charset="0"/>
-              </a:rPr>
-              <a:t>0</a:t>
-            </a:r>
-            <a:r>
-              <a:rPr lang="en-US" sz="2100" b="1" dirty="0">
-                <a:solidFill>
-                  <a:srgbClr val="000080"/>
-                </a:solidFill>
-                <a:highlight>
-                  <a:srgbClr val="FFFFFF"/>
-                </a:highlight>
-                <a:latin typeface="Courier New" panose="02070309020205020404" pitchFamily="49" charset="0"/>
-              </a:rPr>
-              <a:t>;}</a:t>
-            </a:r>
-            <a:endParaRPr lang="en-US" sz="2100" dirty="0">
-              <a:solidFill>
-                <a:srgbClr val="000000"/>
-              </a:solidFill>
-              <a:highlight>
-                <a:srgbClr val="FFFFFF"/>
-              </a:highlight>
-              <a:latin typeface="Courier New" panose="02070309020205020404" pitchFamily="49" charset="0"/>
-            </a:endParaRPr>
-          </a:p>
-          <a:p>
-            <a:pPr marL="0" indent="0">
-              <a:buNone/>
-            </a:pPr>
-            <a:r>
-              <a:rPr lang="en-US" sz="2100" b="1" dirty="0">
-                <a:solidFill>
-                  <a:srgbClr val="000080"/>
-                </a:solidFill>
-                <a:highlight>
-                  <a:srgbClr val="FFFFFF"/>
-                </a:highlight>
-                <a:latin typeface="Courier New" panose="02070309020205020404" pitchFamily="49" charset="0"/>
-              </a:rPr>
-              <a:t>}</a:t>
-            </a:r>
-            <a:endParaRPr lang="en-US" sz="2100" dirty="0">
-              <a:solidFill>
-                <a:srgbClr val="000000"/>
-              </a:solidFill>
-              <a:highlight>
-                <a:srgbClr val="FFFFFF"/>
-              </a:highlight>
-              <a:latin typeface="Courier New" panose="02070309020205020404" pitchFamily="49" charset="0"/>
-            </a:endParaRPr>
-          </a:p>
-          <a:p>
-            <a:endParaRPr lang="en-US" dirty="0" smtClean="0"/>
-          </a:p>
-          <a:p>
-            <a:endParaRPr lang="en-US" dirty="0" smtClean="0"/>
-          </a:p>
-          <a:p>
-            <a:endParaRPr lang="en-US" dirty="0"/>
+                <a:latin typeface="Courier New" panose="02070309020205020404" pitchFamily="49" charset="0"/>
+              </a:rPr>
+              <a:t>// Does not compile</a:t>
+            </a:r>
+            <a:endParaRPr lang="en-US" sz="2400" dirty="0"/>
+          </a:p>
+          <a:p>
+            <a:endParaRPr lang="en-US" sz="2400" dirty="0"/>
           </a:p>
         </p:txBody>
       </p:sp>
     </p:spTree>
     <p:extLst>
       <p:ext uri="{BB962C8B-B14F-4D97-AF65-F5344CB8AC3E}">
-        <p14:creationId xmlns:p14="http://schemas.microsoft.com/office/powerpoint/2010/main" val="2543171153"/>
+        <p14:creationId xmlns:p14="http://schemas.microsoft.com/office/powerpoint/2010/main" val="2934893548"/>
       </p:ext>
     </p:extLst>
   </p:cSld>
@@ -7177,6 +6468,862 @@
             <p:ph type="title"/>
           </p:nvPr>
         </p:nvSpPr>
+        <p:spPr/>
+        <p:txBody>
+          <a:bodyPr/>
+          <a:lstStyle/>
+          <a:p>
+            <a:r>
+              <a:rPr lang="en-US" dirty="0" smtClean="0"/>
+              <a:t>Functional Interface (FI) in Java 8</a:t>
+            </a:r>
+            <a:endParaRPr lang="en-US" dirty="0"/>
+          </a:p>
+        </p:txBody>
+      </p:sp>
+      <p:sp>
+        <p:nvSpPr>
+          <p:cNvPr id="3" name="Content Placeholder 2"/>
+          <p:cNvSpPr>
+            <a:spLocks noGrp="1"/>
+          </p:cNvSpPr>
+          <p:nvPr>
+            <p:ph idx="1"/>
+          </p:nvPr>
+        </p:nvSpPr>
+        <p:spPr>
+          <a:xfrm>
+            <a:off x="677334" y="1627095"/>
+            <a:ext cx="8596668" cy="4809564"/>
+          </a:xfrm>
+        </p:spPr>
+        <p:txBody>
+          <a:bodyPr>
+            <a:normAutofit/>
+          </a:bodyPr>
+          <a:lstStyle/>
+          <a:p>
+            <a:r>
+              <a:rPr lang="en-US" sz="2100" dirty="0"/>
+              <a:t>“A functional interface is any interface that contains only one abstract method</a:t>
+            </a:r>
+            <a:r>
+              <a:rPr lang="en-US" sz="2100" dirty="0" smtClean="0"/>
+              <a:t>.” -- </a:t>
+            </a:r>
+            <a:r>
+              <a:rPr lang="en-US" sz="2100" dirty="0" smtClean="0">
+                <a:hlinkClick r:id="rId2"/>
+              </a:rPr>
+              <a:t>Oracle Java Tutorial</a:t>
+            </a:r>
+            <a:endParaRPr lang="en-US" sz="2100" dirty="0" smtClean="0"/>
+          </a:p>
+          <a:p>
+            <a:r>
+              <a:rPr lang="en-US" sz="2100" dirty="0" smtClean="0"/>
+              <a:t>Example 2- Valid Functional Interface</a:t>
+            </a:r>
+          </a:p>
+          <a:p>
+            <a:pPr marL="0" indent="0">
+              <a:buNone/>
+            </a:pPr>
+            <a:r>
+              <a:rPr lang="en-US" sz="2100" dirty="0">
+                <a:solidFill>
+                  <a:srgbClr val="000000"/>
+                </a:solidFill>
+                <a:highlight>
+                  <a:srgbClr val="FFFFFF"/>
+                </a:highlight>
+                <a:latin typeface="Courier New" panose="02070309020205020404" pitchFamily="49" charset="0"/>
+              </a:rPr>
+              <a:t>@</a:t>
+            </a:r>
+            <a:r>
+              <a:rPr lang="en-US" sz="2100" dirty="0" err="1">
+                <a:solidFill>
+                  <a:srgbClr val="000000"/>
+                </a:solidFill>
+                <a:highlight>
+                  <a:srgbClr val="FFFFFF"/>
+                </a:highlight>
+                <a:latin typeface="Courier New" panose="02070309020205020404" pitchFamily="49" charset="0"/>
+              </a:rPr>
+              <a:t>FunctionalInterface</a:t>
+            </a:r>
+            <a:r>
+              <a:rPr lang="en-US" sz="2100" dirty="0">
+                <a:solidFill>
+                  <a:srgbClr val="000000"/>
+                </a:solidFill>
+                <a:highlight>
+                  <a:srgbClr val="FFFFFF"/>
+                </a:highlight>
+                <a:latin typeface="Courier New" panose="02070309020205020404" pitchFamily="49" charset="0"/>
+              </a:rPr>
+              <a:t> </a:t>
+            </a:r>
+            <a:r>
+              <a:rPr lang="en-US" sz="2100" dirty="0">
+                <a:solidFill>
+                  <a:srgbClr val="008000"/>
+                </a:solidFill>
+                <a:highlight>
+                  <a:srgbClr val="FFFFFF"/>
+                </a:highlight>
+                <a:latin typeface="Courier New" panose="02070309020205020404" pitchFamily="49" charset="0"/>
+              </a:rPr>
+              <a:t>// Optional</a:t>
+            </a:r>
+          </a:p>
+          <a:p>
+            <a:pPr marL="0" indent="0">
+              <a:buNone/>
+            </a:pPr>
+            <a:r>
+              <a:rPr lang="en-US" sz="2100" dirty="0">
+                <a:solidFill>
+                  <a:srgbClr val="8000FF"/>
+                </a:solidFill>
+                <a:highlight>
+                  <a:srgbClr val="FFFFFF"/>
+                </a:highlight>
+                <a:latin typeface="Courier New" panose="02070309020205020404" pitchFamily="49" charset="0"/>
+              </a:rPr>
+              <a:t>public</a:t>
+            </a:r>
+            <a:r>
+              <a:rPr lang="en-US" sz="2100" dirty="0">
+                <a:solidFill>
+                  <a:srgbClr val="000000"/>
+                </a:solidFill>
+                <a:highlight>
+                  <a:srgbClr val="FFFFFF"/>
+                </a:highlight>
+                <a:latin typeface="Courier New" panose="02070309020205020404" pitchFamily="49" charset="0"/>
+              </a:rPr>
+              <a:t> </a:t>
+            </a:r>
+            <a:r>
+              <a:rPr lang="en-US" sz="2100" dirty="0">
+                <a:solidFill>
+                  <a:srgbClr val="8000FF"/>
+                </a:solidFill>
+                <a:highlight>
+                  <a:srgbClr val="FFFFFF"/>
+                </a:highlight>
+                <a:latin typeface="Courier New" panose="02070309020205020404" pitchFamily="49" charset="0"/>
+              </a:rPr>
+              <a:t>interface</a:t>
+            </a:r>
+            <a:r>
+              <a:rPr lang="en-US" sz="2100" dirty="0">
+                <a:solidFill>
+                  <a:srgbClr val="000000"/>
+                </a:solidFill>
+                <a:highlight>
+                  <a:srgbClr val="FFFFFF"/>
+                </a:highlight>
+                <a:latin typeface="Courier New" panose="02070309020205020404" pitchFamily="49" charset="0"/>
+              </a:rPr>
+              <a:t> Example2 </a:t>
+            </a:r>
+            <a:r>
+              <a:rPr lang="en-US" sz="2100" b="1" dirty="0">
+                <a:solidFill>
+                  <a:srgbClr val="000080"/>
+                </a:solidFill>
+                <a:highlight>
+                  <a:srgbClr val="FFFFFF"/>
+                </a:highlight>
+                <a:latin typeface="Courier New" panose="02070309020205020404" pitchFamily="49" charset="0"/>
+              </a:rPr>
+              <a:t>{</a:t>
+            </a:r>
+            <a:endParaRPr lang="en-US" sz="2100" dirty="0">
+              <a:solidFill>
+                <a:srgbClr val="000000"/>
+              </a:solidFill>
+              <a:highlight>
+                <a:srgbClr val="FFFFFF"/>
+              </a:highlight>
+              <a:latin typeface="Courier New" panose="02070309020205020404" pitchFamily="49" charset="0"/>
+            </a:endParaRPr>
+          </a:p>
+          <a:p>
+            <a:pPr marL="0" indent="0">
+              <a:buNone/>
+            </a:pPr>
+            <a:r>
+              <a:rPr lang="en-US" sz="2100" dirty="0">
+                <a:solidFill>
+                  <a:srgbClr val="000000"/>
+                </a:solidFill>
+                <a:highlight>
+                  <a:srgbClr val="FFFFFF"/>
+                </a:highlight>
+                <a:latin typeface="Courier New" panose="02070309020205020404" pitchFamily="49" charset="0"/>
+              </a:rPr>
+              <a:t>    </a:t>
+            </a:r>
+            <a:r>
+              <a:rPr lang="en-US" sz="2100" dirty="0" err="1">
+                <a:solidFill>
+                  <a:srgbClr val="8000FF"/>
+                </a:solidFill>
+                <a:highlight>
+                  <a:srgbClr val="FFFFFF"/>
+                </a:highlight>
+                <a:latin typeface="Courier New" panose="02070309020205020404" pitchFamily="49" charset="0"/>
+              </a:rPr>
+              <a:t>boolean</a:t>
+            </a:r>
+            <a:r>
+              <a:rPr lang="en-US" sz="2100" dirty="0">
+                <a:solidFill>
+                  <a:srgbClr val="000000"/>
+                </a:solidFill>
+                <a:highlight>
+                  <a:srgbClr val="FFFFFF"/>
+                </a:highlight>
+                <a:latin typeface="Courier New" panose="02070309020205020404" pitchFamily="49" charset="0"/>
+              </a:rPr>
+              <a:t> equals</a:t>
+            </a:r>
+            <a:r>
+              <a:rPr lang="en-US" sz="2100" b="1" dirty="0">
+                <a:solidFill>
+                  <a:srgbClr val="000080"/>
+                </a:solidFill>
+                <a:highlight>
+                  <a:srgbClr val="FFFFFF"/>
+                </a:highlight>
+                <a:latin typeface="Courier New" panose="02070309020205020404" pitchFamily="49" charset="0"/>
+              </a:rPr>
+              <a:t>(</a:t>
+            </a:r>
+            <a:r>
+              <a:rPr lang="en-US" sz="2100" dirty="0">
+                <a:solidFill>
+                  <a:srgbClr val="000000"/>
+                </a:solidFill>
+                <a:highlight>
+                  <a:srgbClr val="FFFFFF"/>
+                </a:highlight>
+                <a:latin typeface="Courier New" panose="02070309020205020404" pitchFamily="49" charset="0"/>
+              </a:rPr>
+              <a:t>Object other</a:t>
+            </a:r>
+            <a:r>
+              <a:rPr lang="en-US" sz="2100" b="1" dirty="0">
+                <a:solidFill>
+                  <a:srgbClr val="000080"/>
+                </a:solidFill>
+                <a:highlight>
+                  <a:srgbClr val="FFFFFF"/>
+                </a:highlight>
+                <a:latin typeface="Courier New" panose="02070309020205020404" pitchFamily="49" charset="0"/>
+              </a:rPr>
+              <a:t>);</a:t>
+            </a:r>
+            <a:r>
+              <a:rPr lang="en-US" sz="2100" dirty="0">
+                <a:solidFill>
+                  <a:srgbClr val="000000"/>
+                </a:solidFill>
+                <a:highlight>
+                  <a:srgbClr val="FFFFFF"/>
+                </a:highlight>
+                <a:latin typeface="Courier New" panose="02070309020205020404" pitchFamily="49" charset="0"/>
+              </a:rPr>
+              <a:t> </a:t>
+            </a:r>
+            <a:r>
+              <a:rPr lang="en-US" sz="2100" dirty="0">
+                <a:solidFill>
+                  <a:srgbClr val="008000"/>
+                </a:solidFill>
+                <a:highlight>
+                  <a:srgbClr val="FFFFFF"/>
+                </a:highlight>
+                <a:latin typeface="Courier New" panose="02070309020205020404" pitchFamily="49" charset="0"/>
+              </a:rPr>
+              <a:t>// In Object</a:t>
+            </a:r>
+          </a:p>
+          <a:p>
+            <a:pPr marL="0" indent="0">
+              <a:buNone/>
+            </a:pPr>
+            <a:r>
+              <a:rPr lang="en-US" sz="2100" dirty="0">
+                <a:solidFill>
+                  <a:srgbClr val="000000"/>
+                </a:solidFill>
+                <a:highlight>
+                  <a:srgbClr val="FFFFFF"/>
+                </a:highlight>
+                <a:latin typeface="Courier New" panose="02070309020205020404" pitchFamily="49" charset="0"/>
+              </a:rPr>
+              <a:t>    </a:t>
+            </a:r>
+            <a:r>
+              <a:rPr lang="en-US" sz="2100" dirty="0" err="1">
+                <a:solidFill>
+                  <a:srgbClr val="8000FF"/>
+                </a:solidFill>
+                <a:highlight>
+                  <a:srgbClr val="FFFFFF"/>
+                </a:highlight>
+                <a:latin typeface="Courier New" panose="02070309020205020404" pitchFamily="49" charset="0"/>
+              </a:rPr>
+              <a:t>int</a:t>
+            </a:r>
+            <a:r>
+              <a:rPr lang="en-US" sz="2100" dirty="0">
+                <a:solidFill>
+                  <a:srgbClr val="000000"/>
+                </a:solidFill>
+                <a:highlight>
+                  <a:srgbClr val="FFFFFF"/>
+                </a:highlight>
+                <a:latin typeface="Courier New" panose="02070309020205020404" pitchFamily="49" charset="0"/>
+              </a:rPr>
+              <a:t> </a:t>
+            </a:r>
+            <a:r>
+              <a:rPr lang="en-US" sz="2100" dirty="0" err="1">
+                <a:solidFill>
+                  <a:srgbClr val="000000"/>
+                </a:solidFill>
+                <a:highlight>
+                  <a:srgbClr val="FFFFFF"/>
+                </a:highlight>
+                <a:latin typeface="Courier New" panose="02070309020205020404" pitchFamily="49" charset="0"/>
+              </a:rPr>
+              <a:t>hashCode</a:t>
+            </a:r>
+            <a:r>
+              <a:rPr lang="en-US" sz="2100" b="1" dirty="0">
+                <a:solidFill>
+                  <a:srgbClr val="000080"/>
+                </a:solidFill>
+                <a:highlight>
+                  <a:srgbClr val="FFFFFF"/>
+                </a:highlight>
+                <a:latin typeface="Courier New" panose="02070309020205020404" pitchFamily="49" charset="0"/>
+              </a:rPr>
+              <a:t>();</a:t>
+            </a:r>
+            <a:r>
+              <a:rPr lang="en-US" sz="2100" dirty="0">
+                <a:solidFill>
+                  <a:srgbClr val="000000"/>
+                </a:solidFill>
+                <a:highlight>
+                  <a:srgbClr val="FFFFFF"/>
+                </a:highlight>
+                <a:latin typeface="Courier New" panose="02070309020205020404" pitchFamily="49" charset="0"/>
+              </a:rPr>
+              <a:t> </a:t>
+            </a:r>
+            <a:r>
+              <a:rPr lang="en-US" sz="2100" dirty="0">
+                <a:solidFill>
+                  <a:srgbClr val="008000"/>
+                </a:solidFill>
+                <a:highlight>
+                  <a:srgbClr val="FFFFFF"/>
+                </a:highlight>
+                <a:latin typeface="Courier New" panose="02070309020205020404" pitchFamily="49" charset="0"/>
+              </a:rPr>
+              <a:t>// In Object</a:t>
+            </a:r>
+          </a:p>
+          <a:p>
+            <a:pPr marL="0" indent="0">
+              <a:buNone/>
+            </a:pPr>
+            <a:r>
+              <a:rPr lang="en-US" sz="2100" dirty="0">
+                <a:solidFill>
+                  <a:srgbClr val="000000"/>
+                </a:solidFill>
+                <a:highlight>
+                  <a:srgbClr val="FFFFFF"/>
+                </a:highlight>
+                <a:latin typeface="Courier New" panose="02070309020205020404" pitchFamily="49" charset="0"/>
+              </a:rPr>
+              <a:t>    </a:t>
+            </a:r>
+            <a:r>
+              <a:rPr lang="en-US" sz="2100" dirty="0" err="1">
+                <a:solidFill>
+                  <a:srgbClr val="8000FF"/>
+                </a:solidFill>
+                <a:highlight>
+                  <a:srgbClr val="FFFFFF"/>
+                </a:highlight>
+                <a:latin typeface="Courier New" panose="02070309020205020404" pitchFamily="49" charset="0"/>
+              </a:rPr>
+              <a:t>int</a:t>
+            </a:r>
+            <a:r>
+              <a:rPr lang="en-US" sz="2100" dirty="0">
+                <a:solidFill>
+                  <a:srgbClr val="000000"/>
+                </a:solidFill>
+                <a:highlight>
+                  <a:srgbClr val="FFFFFF"/>
+                </a:highlight>
+                <a:latin typeface="Courier New" panose="02070309020205020404" pitchFamily="49" charset="0"/>
+              </a:rPr>
+              <a:t> </a:t>
+            </a:r>
+            <a:r>
+              <a:rPr lang="en-US" sz="2100" dirty="0" err="1">
+                <a:solidFill>
+                  <a:srgbClr val="000000"/>
+                </a:solidFill>
+                <a:highlight>
+                  <a:srgbClr val="FFFFFF"/>
+                </a:highlight>
+                <a:latin typeface="Courier New" panose="02070309020205020404" pitchFamily="49" charset="0"/>
+              </a:rPr>
+              <a:t>myMethod</a:t>
+            </a:r>
+            <a:r>
+              <a:rPr lang="en-US" sz="2100" b="1" dirty="0">
+                <a:solidFill>
+                  <a:srgbClr val="000080"/>
+                </a:solidFill>
+                <a:highlight>
+                  <a:srgbClr val="FFFFFF"/>
+                </a:highlight>
+                <a:latin typeface="Courier New" panose="02070309020205020404" pitchFamily="49" charset="0"/>
+              </a:rPr>
+              <a:t>();</a:t>
+            </a:r>
+            <a:r>
+              <a:rPr lang="en-US" sz="2100" dirty="0">
+                <a:solidFill>
+                  <a:srgbClr val="000000"/>
+                </a:solidFill>
+                <a:highlight>
+                  <a:srgbClr val="FFFFFF"/>
+                </a:highlight>
+                <a:latin typeface="Courier New" panose="02070309020205020404" pitchFamily="49" charset="0"/>
+              </a:rPr>
+              <a:t> </a:t>
+            </a:r>
+            <a:r>
+              <a:rPr lang="en-US" sz="2100" dirty="0">
+                <a:solidFill>
+                  <a:srgbClr val="008000"/>
+                </a:solidFill>
+                <a:highlight>
+                  <a:srgbClr val="FFFFFF"/>
+                </a:highlight>
+                <a:latin typeface="Courier New" panose="02070309020205020404" pitchFamily="49" charset="0"/>
+              </a:rPr>
+              <a:t>// Abstract.</a:t>
+            </a:r>
+          </a:p>
+          <a:p>
+            <a:pPr marL="0" indent="0">
+              <a:buNone/>
+            </a:pPr>
+            <a:r>
+              <a:rPr lang="en-US" sz="2100" dirty="0">
+                <a:solidFill>
+                  <a:srgbClr val="000000"/>
+                </a:solidFill>
+                <a:highlight>
+                  <a:srgbClr val="FFFFFF"/>
+                </a:highlight>
+                <a:latin typeface="Courier New" panose="02070309020205020404" pitchFamily="49" charset="0"/>
+              </a:rPr>
+              <a:t>    </a:t>
+            </a:r>
+            <a:r>
+              <a:rPr lang="en-US" sz="2100" b="1" dirty="0">
+                <a:solidFill>
+                  <a:srgbClr val="0000FF"/>
+                </a:solidFill>
+                <a:highlight>
+                  <a:srgbClr val="FFFFFF"/>
+                </a:highlight>
+                <a:latin typeface="Courier New" panose="02070309020205020404" pitchFamily="49" charset="0"/>
+              </a:rPr>
+              <a:t>default</a:t>
+            </a:r>
+            <a:r>
+              <a:rPr lang="en-US" sz="2100" dirty="0">
+                <a:solidFill>
+                  <a:srgbClr val="000000"/>
+                </a:solidFill>
+                <a:highlight>
+                  <a:srgbClr val="FFFFFF"/>
+                </a:highlight>
+                <a:latin typeface="Courier New" panose="02070309020205020404" pitchFamily="49" charset="0"/>
+              </a:rPr>
+              <a:t> </a:t>
+            </a:r>
+            <a:r>
+              <a:rPr lang="en-US" sz="2100" dirty="0" err="1">
+                <a:solidFill>
+                  <a:srgbClr val="8000FF"/>
+                </a:solidFill>
+                <a:highlight>
+                  <a:srgbClr val="FFFFFF"/>
+                </a:highlight>
+                <a:latin typeface="Courier New" panose="02070309020205020404" pitchFamily="49" charset="0"/>
+              </a:rPr>
+              <a:t>int</a:t>
+            </a:r>
+            <a:r>
+              <a:rPr lang="en-US" sz="2100" dirty="0">
+                <a:solidFill>
+                  <a:srgbClr val="000000"/>
+                </a:solidFill>
+                <a:highlight>
+                  <a:srgbClr val="FFFFFF"/>
+                </a:highlight>
+                <a:latin typeface="Courier New" panose="02070309020205020404" pitchFamily="49" charset="0"/>
+              </a:rPr>
+              <a:t> myMethod2</a:t>
+            </a:r>
+            <a:r>
+              <a:rPr lang="en-US" sz="2100" b="1" dirty="0">
+                <a:solidFill>
+                  <a:srgbClr val="000080"/>
+                </a:solidFill>
+                <a:highlight>
+                  <a:srgbClr val="FFFFFF"/>
+                </a:highlight>
+                <a:latin typeface="Courier New" panose="02070309020205020404" pitchFamily="49" charset="0"/>
+              </a:rPr>
+              <a:t>()</a:t>
+            </a:r>
+            <a:r>
+              <a:rPr lang="en-US" sz="2100" dirty="0">
+                <a:solidFill>
+                  <a:srgbClr val="000000"/>
+                </a:solidFill>
+                <a:highlight>
+                  <a:srgbClr val="FFFFFF"/>
+                </a:highlight>
+                <a:latin typeface="Courier New" panose="02070309020205020404" pitchFamily="49" charset="0"/>
+              </a:rPr>
+              <a:t> </a:t>
+            </a:r>
+            <a:r>
+              <a:rPr lang="en-US" sz="2100" b="1" dirty="0">
+                <a:solidFill>
+                  <a:srgbClr val="000080"/>
+                </a:solidFill>
+                <a:highlight>
+                  <a:srgbClr val="FFFFFF"/>
+                </a:highlight>
+                <a:latin typeface="Courier New" panose="02070309020205020404" pitchFamily="49" charset="0"/>
+              </a:rPr>
+              <a:t>{</a:t>
+            </a:r>
+            <a:r>
+              <a:rPr lang="en-US" sz="2100" b="1" dirty="0">
+                <a:solidFill>
+                  <a:srgbClr val="0000FF"/>
+                </a:solidFill>
+                <a:highlight>
+                  <a:srgbClr val="FFFFFF"/>
+                </a:highlight>
+                <a:latin typeface="Courier New" panose="02070309020205020404" pitchFamily="49" charset="0"/>
+              </a:rPr>
+              <a:t>return</a:t>
+            </a:r>
+            <a:r>
+              <a:rPr lang="en-US" sz="2100" dirty="0">
+                <a:solidFill>
+                  <a:srgbClr val="000000"/>
+                </a:solidFill>
+                <a:highlight>
+                  <a:srgbClr val="FFFFFF"/>
+                </a:highlight>
+                <a:latin typeface="Courier New" panose="02070309020205020404" pitchFamily="49" charset="0"/>
+              </a:rPr>
+              <a:t> </a:t>
+            </a:r>
+            <a:r>
+              <a:rPr lang="en-US" sz="2100" dirty="0" err="1">
+                <a:solidFill>
+                  <a:srgbClr val="000000"/>
+                </a:solidFill>
+                <a:highlight>
+                  <a:srgbClr val="FFFFFF"/>
+                </a:highlight>
+                <a:latin typeface="Courier New" panose="02070309020205020404" pitchFamily="49" charset="0"/>
+              </a:rPr>
+              <a:t>myMethod</a:t>
+            </a:r>
+            <a:r>
+              <a:rPr lang="en-US" sz="2100" b="1" dirty="0">
+                <a:solidFill>
+                  <a:srgbClr val="000080"/>
+                </a:solidFill>
+                <a:highlight>
+                  <a:srgbClr val="FFFFFF"/>
+                </a:highlight>
+                <a:latin typeface="Courier New" panose="02070309020205020404" pitchFamily="49" charset="0"/>
+              </a:rPr>
+              <a:t>();}</a:t>
+            </a:r>
+            <a:endParaRPr lang="en-US" sz="2100" dirty="0">
+              <a:solidFill>
+                <a:srgbClr val="000000"/>
+              </a:solidFill>
+              <a:highlight>
+                <a:srgbClr val="FFFFFF"/>
+              </a:highlight>
+              <a:latin typeface="Courier New" panose="02070309020205020404" pitchFamily="49" charset="0"/>
+            </a:endParaRPr>
+          </a:p>
+          <a:p>
+            <a:pPr marL="0" indent="0">
+              <a:buNone/>
+            </a:pPr>
+            <a:r>
+              <a:rPr lang="en-US" sz="2100" dirty="0">
+                <a:solidFill>
+                  <a:srgbClr val="000000"/>
+                </a:solidFill>
+                <a:highlight>
+                  <a:srgbClr val="FFFFFF"/>
+                </a:highlight>
+                <a:latin typeface="Courier New" panose="02070309020205020404" pitchFamily="49" charset="0"/>
+              </a:rPr>
+              <a:t>    </a:t>
+            </a:r>
+            <a:r>
+              <a:rPr lang="en-US" sz="2100" dirty="0">
+                <a:solidFill>
+                  <a:srgbClr val="8000FF"/>
+                </a:solidFill>
+                <a:highlight>
+                  <a:srgbClr val="FFFFFF"/>
+                </a:highlight>
+                <a:latin typeface="Courier New" panose="02070309020205020404" pitchFamily="49" charset="0"/>
+              </a:rPr>
+              <a:t>static</a:t>
+            </a:r>
+            <a:r>
+              <a:rPr lang="en-US" sz="2100" dirty="0">
+                <a:solidFill>
+                  <a:srgbClr val="000000"/>
+                </a:solidFill>
+                <a:highlight>
+                  <a:srgbClr val="FFFFFF"/>
+                </a:highlight>
+                <a:latin typeface="Courier New" panose="02070309020205020404" pitchFamily="49" charset="0"/>
+              </a:rPr>
+              <a:t> </a:t>
+            </a:r>
+            <a:r>
+              <a:rPr lang="en-US" sz="2100" dirty="0" err="1">
+                <a:solidFill>
+                  <a:srgbClr val="8000FF"/>
+                </a:solidFill>
+                <a:highlight>
+                  <a:srgbClr val="FFFFFF"/>
+                </a:highlight>
+                <a:latin typeface="Courier New" panose="02070309020205020404" pitchFamily="49" charset="0"/>
+              </a:rPr>
+              <a:t>int</a:t>
+            </a:r>
+            <a:r>
+              <a:rPr lang="en-US" sz="2100" dirty="0">
+                <a:solidFill>
+                  <a:srgbClr val="000000"/>
+                </a:solidFill>
+                <a:highlight>
+                  <a:srgbClr val="FFFFFF"/>
+                </a:highlight>
+                <a:latin typeface="Courier New" panose="02070309020205020404" pitchFamily="49" charset="0"/>
+              </a:rPr>
+              <a:t> myMethod3</a:t>
+            </a:r>
+            <a:r>
+              <a:rPr lang="en-US" sz="2100" b="1" dirty="0">
+                <a:solidFill>
+                  <a:srgbClr val="000080"/>
+                </a:solidFill>
+                <a:highlight>
+                  <a:srgbClr val="FFFFFF"/>
+                </a:highlight>
+                <a:latin typeface="Courier New" panose="02070309020205020404" pitchFamily="49" charset="0"/>
+              </a:rPr>
+              <a:t>()</a:t>
+            </a:r>
+            <a:r>
+              <a:rPr lang="en-US" sz="2100" dirty="0">
+                <a:solidFill>
+                  <a:srgbClr val="000000"/>
+                </a:solidFill>
+                <a:highlight>
+                  <a:srgbClr val="FFFFFF"/>
+                </a:highlight>
+                <a:latin typeface="Courier New" panose="02070309020205020404" pitchFamily="49" charset="0"/>
+              </a:rPr>
+              <a:t> </a:t>
+            </a:r>
+            <a:r>
+              <a:rPr lang="en-US" sz="2100" b="1" dirty="0">
+                <a:solidFill>
+                  <a:srgbClr val="000080"/>
+                </a:solidFill>
+                <a:highlight>
+                  <a:srgbClr val="FFFFFF"/>
+                </a:highlight>
+                <a:latin typeface="Courier New" panose="02070309020205020404" pitchFamily="49" charset="0"/>
+              </a:rPr>
+              <a:t>{</a:t>
+            </a:r>
+            <a:r>
+              <a:rPr lang="en-US" sz="2100" b="1" dirty="0">
+                <a:solidFill>
+                  <a:srgbClr val="0000FF"/>
+                </a:solidFill>
+                <a:highlight>
+                  <a:srgbClr val="FFFFFF"/>
+                </a:highlight>
+                <a:latin typeface="Courier New" panose="02070309020205020404" pitchFamily="49" charset="0"/>
+              </a:rPr>
+              <a:t>return</a:t>
+            </a:r>
+            <a:r>
+              <a:rPr lang="en-US" sz="2100" dirty="0">
+                <a:solidFill>
+                  <a:srgbClr val="000000"/>
+                </a:solidFill>
+                <a:highlight>
+                  <a:srgbClr val="FFFFFF"/>
+                </a:highlight>
+                <a:latin typeface="Courier New" panose="02070309020205020404" pitchFamily="49" charset="0"/>
+              </a:rPr>
+              <a:t> </a:t>
+            </a:r>
+            <a:r>
+              <a:rPr lang="en-US" sz="2100" dirty="0">
+                <a:solidFill>
+                  <a:srgbClr val="FF8000"/>
+                </a:solidFill>
+                <a:highlight>
+                  <a:srgbClr val="FFFFFF"/>
+                </a:highlight>
+                <a:latin typeface="Courier New" panose="02070309020205020404" pitchFamily="49" charset="0"/>
+              </a:rPr>
+              <a:t>0</a:t>
+            </a:r>
+            <a:r>
+              <a:rPr lang="en-US" sz="2100" b="1" dirty="0">
+                <a:solidFill>
+                  <a:srgbClr val="000080"/>
+                </a:solidFill>
+                <a:highlight>
+                  <a:srgbClr val="FFFFFF"/>
+                </a:highlight>
+                <a:latin typeface="Courier New" panose="02070309020205020404" pitchFamily="49" charset="0"/>
+              </a:rPr>
+              <a:t>;}</a:t>
+            </a:r>
+            <a:endParaRPr lang="en-US" sz="2100" dirty="0">
+              <a:solidFill>
+                <a:srgbClr val="000000"/>
+              </a:solidFill>
+              <a:highlight>
+                <a:srgbClr val="FFFFFF"/>
+              </a:highlight>
+              <a:latin typeface="Courier New" panose="02070309020205020404" pitchFamily="49" charset="0"/>
+            </a:endParaRPr>
+          </a:p>
+          <a:p>
+            <a:pPr marL="0" indent="0">
+              <a:buNone/>
+            </a:pPr>
+            <a:r>
+              <a:rPr lang="en-US" sz="2100" b="1" dirty="0">
+                <a:solidFill>
+                  <a:srgbClr val="000080"/>
+                </a:solidFill>
+                <a:highlight>
+                  <a:srgbClr val="FFFFFF"/>
+                </a:highlight>
+                <a:latin typeface="Courier New" panose="02070309020205020404" pitchFamily="49" charset="0"/>
+              </a:rPr>
+              <a:t>}</a:t>
+            </a:r>
+            <a:endParaRPr lang="en-US" sz="2100" dirty="0">
+              <a:solidFill>
+                <a:srgbClr val="000000"/>
+              </a:solidFill>
+              <a:highlight>
+                <a:srgbClr val="FFFFFF"/>
+              </a:highlight>
+              <a:latin typeface="Courier New" panose="02070309020205020404" pitchFamily="49" charset="0"/>
+            </a:endParaRPr>
+          </a:p>
+          <a:p>
+            <a:endParaRPr lang="en-US" dirty="0" smtClean="0"/>
+          </a:p>
+          <a:p>
+            <a:endParaRPr lang="en-US" dirty="0" smtClean="0"/>
+          </a:p>
+          <a:p>
+            <a:endParaRPr lang="en-US" dirty="0"/>
+          </a:p>
+        </p:txBody>
+      </p:sp>
+    </p:spTree>
+    <p:extLst>
+      <p:ext uri="{BB962C8B-B14F-4D97-AF65-F5344CB8AC3E}">
+        <p14:creationId xmlns:p14="http://schemas.microsoft.com/office/powerpoint/2010/main" val="2543171153"/>
+      </p:ext>
+    </p:extLst>
+  </p:cSld>
+  <p:clrMapOvr>
+    <a:masterClrMapping/>
+  </p:clrMapOvr>
+</p:sld>
+</file>
+
+<file path=ppt/slides/slide5.xml><?xml version="1.0" encoding="utf-8"?>
+<p:sld xmlns:a="http://schemas.openxmlformats.org/drawingml/2006/main" xmlns:r="http://schemas.openxmlformats.org/officeDocument/2006/relationships" xmlns:p="http://schemas.openxmlformats.org/presentationml/2006/main">
+  <p:cSld>
+    <p:spTree>
+      <p:nvGrpSpPr>
+        <p:cNvPr id="1" name=""/>
+        <p:cNvGrpSpPr/>
+        <p:nvPr/>
+      </p:nvGrpSpPr>
+      <p:grpSpPr>
+        <a:xfrm>
+          <a:off x="0" y="0"/>
+          <a:ext cx="0" cy="0"/>
+          <a:chOff x="0" y="0"/>
+          <a:chExt cx="0" cy="0"/>
+        </a:xfrm>
+      </p:grpSpPr>
+      <p:sp>
+        <p:nvSpPr>
+          <p:cNvPr id="2" name="Title 1"/>
+          <p:cNvSpPr>
+            <a:spLocks noGrp="1"/>
+          </p:cNvSpPr>
+          <p:nvPr>
+            <p:ph type="title"/>
+          </p:nvPr>
+        </p:nvSpPr>
         <p:spPr>
           <a:xfrm>
             <a:off x="677334" y="170330"/>
@@ -8475,7 +8622,7 @@
 </p:sld>
 </file>
 
-<file path=ppt/slides/slide5.xml><?xml version="1.0" encoding="utf-8"?>
+<file path=ppt/slides/slide6.xml><?xml version="1.0" encoding="utf-8"?>
 <p:sld xmlns:a="http://schemas.openxmlformats.org/drawingml/2006/main" xmlns:r="http://schemas.openxmlformats.org/officeDocument/2006/relationships" xmlns:p="http://schemas.openxmlformats.org/presentationml/2006/main">
   <p:cSld>
     <p:spTree>

</xml_diff>

<commit_message>
Add shortened URL to .pdf version of this presentation.
</commit_message>
<xml_diff>
--- a/Learning to Love the Lambda in the Stream.pptx
+++ b/Learning to Love the Lambda in the Stream.pptx
@@ -840,7 +840,7 @@
             <a:fld id="{B61BEF0D-F0BB-DE4B-95CE-6DB70DBA9567}" type="datetimeFigureOut">
               <a:rPr lang="en-US" dirty="0"/>
               <a:pPr/>
-              <a:t>5/2/2017</a:t>
+              <a:t>5/3/2017</a:t>
             </a:fld>
             <a:endParaRPr lang="en-US" dirty="0"/>
           </a:p>
@@ -1088,7 +1088,7 @@
             <a:fld id="{B61BEF0D-F0BB-DE4B-95CE-6DB70DBA9567}" type="datetimeFigureOut">
               <a:rPr lang="en-US" dirty="0"/>
               <a:pPr/>
-              <a:t>5/2/2017</a:t>
+              <a:t>5/3/2017</a:t>
             </a:fld>
             <a:endParaRPr lang="en-US" dirty="0"/>
           </a:p>
@@ -1399,7 +1399,7 @@
             <a:fld id="{B61BEF0D-F0BB-DE4B-95CE-6DB70DBA9567}" type="datetimeFigureOut">
               <a:rPr lang="en-US" dirty="0"/>
               <a:pPr/>
-              <a:t>5/2/2017</a:t>
+              <a:t>5/3/2017</a:t>
             </a:fld>
             <a:endParaRPr lang="en-US" dirty="0"/>
           </a:p>
@@ -1737,7 +1737,7 @@
             <a:fld id="{B61BEF0D-F0BB-DE4B-95CE-6DB70DBA9567}" type="datetimeFigureOut">
               <a:rPr lang="en-US" dirty="0"/>
               <a:pPr/>
-              <a:t>5/2/2017</a:t>
+              <a:t>5/3/2017</a:t>
             </a:fld>
             <a:endParaRPr lang="en-US" dirty="0"/>
           </a:p>
@@ -2048,7 +2048,7 @@
             <a:fld id="{B61BEF0D-F0BB-DE4B-95CE-6DB70DBA9567}" type="datetimeFigureOut">
               <a:rPr lang="en-US" dirty="0"/>
               <a:pPr/>
-              <a:t>5/2/2017</a:t>
+              <a:t>5/3/2017</a:t>
             </a:fld>
             <a:endParaRPr lang="en-US" dirty="0"/>
           </a:p>
@@ -2438,7 +2438,7 @@
             <a:fld id="{B61BEF0D-F0BB-DE4B-95CE-6DB70DBA9567}" type="datetimeFigureOut">
               <a:rPr lang="en-US" dirty="0"/>
               <a:pPr/>
-              <a:t>5/2/2017</a:t>
+              <a:t>5/3/2017</a:t>
             </a:fld>
             <a:endParaRPr lang="en-US" dirty="0"/>
           </a:p>
@@ -2604,7 +2604,7 @@
           <a:p>
             <a:fld id="{55C6B4A9-1611-4792-9094-5F34BCA07E0B}" type="datetimeFigureOut">
               <a:rPr lang="en-US" dirty="0"/>
-              <a:t>5/2/2017</a:t>
+              <a:t>5/3/2017</a:t>
             </a:fld>
             <a:endParaRPr lang="en-US" dirty="0"/>
           </a:p>
@@ -2780,7 +2780,7 @@
             <a:fld id="{B61BEF0D-F0BB-DE4B-95CE-6DB70DBA9567}" type="datetimeFigureOut">
               <a:rPr lang="en-US" dirty="0"/>
               <a:pPr/>
-              <a:t>5/2/2017</a:t>
+              <a:t>5/3/2017</a:t>
             </a:fld>
             <a:endParaRPr lang="en-US" dirty="0"/>
           </a:p>
@@ -2953,7 +2953,7 @@
             <a:fld id="{B61BEF0D-F0BB-DE4B-95CE-6DB70DBA9567}" type="datetimeFigureOut">
               <a:rPr lang="en-US" dirty="0"/>
               <a:pPr/>
-              <a:t>5/2/2017</a:t>
+              <a:t>5/3/2017</a:t>
             </a:fld>
             <a:endParaRPr lang="en-US" dirty="0"/>
           </a:p>
@@ -3197,7 +3197,7 @@
             <a:fld id="{B61BEF0D-F0BB-DE4B-95CE-6DB70DBA9567}" type="datetimeFigureOut">
               <a:rPr lang="en-US" dirty="0"/>
               <a:pPr/>
-              <a:t>5/2/2017</a:t>
+              <a:t>5/3/2017</a:t>
             </a:fld>
             <a:endParaRPr lang="en-US" dirty="0"/>
           </a:p>
@@ -3425,7 +3425,7 @@
           <a:p>
             <a:fld id="{EB712588-04B1-427B-82EE-E8DB90309F08}" type="datetimeFigureOut">
               <a:rPr lang="en-US" dirty="0"/>
-              <a:t>5/2/2017</a:t>
+              <a:t>5/3/2017</a:t>
             </a:fld>
             <a:endParaRPr lang="en-US" dirty="0"/>
           </a:p>
@@ -3795,7 +3795,7 @@
             <a:fld id="{B61BEF0D-F0BB-DE4B-95CE-6DB70DBA9567}" type="datetimeFigureOut">
               <a:rPr lang="en-US" dirty="0"/>
               <a:pPr/>
-              <a:t>5/2/2017</a:t>
+              <a:t>5/3/2017</a:t>
             </a:fld>
             <a:endParaRPr lang="en-US" dirty="0"/>
           </a:p>
@@ -3915,7 +3915,7 @@
             <a:fld id="{B61BEF0D-F0BB-DE4B-95CE-6DB70DBA9567}" type="datetimeFigureOut">
               <a:rPr lang="en-US" dirty="0"/>
               <a:pPr/>
-              <a:t>5/2/2017</a:t>
+              <a:t>5/3/2017</a:t>
             </a:fld>
             <a:endParaRPr lang="en-US" dirty="0"/>
           </a:p>
@@ -4007,7 +4007,7 @@
             <a:fld id="{B61BEF0D-F0BB-DE4B-95CE-6DB70DBA9567}" type="datetimeFigureOut">
               <a:rPr lang="en-US" dirty="0"/>
               <a:pPr/>
-              <a:t>5/2/2017</a:t>
+              <a:t>5/3/2017</a:t>
             </a:fld>
             <a:endParaRPr lang="en-US" dirty="0"/>
           </a:p>
@@ -4258,7 +4258,7 @@
           <a:p>
             <a:fld id="{42A54C80-263E-416B-A8E0-580EDEADCBDC}" type="datetimeFigureOut">
               <a:rPr lang="en-US" dirty="0"/>
-              <a:t>5/2/2017</a:t>
+              <a:t>5/3/2017</a:t>
             </a:fld>
             <a:endParaRPr lang="en-US" dirty="0"/>
           </a:p>
@@ -4517,7 +4517,7 @@
             <a:fld id="{B61BEF0D-F0BB-DE4B-95CE-6DB70DBA9567}" type="datetimeFigureOut">
               <a:rPr lang="en-US" dirty="0"/>
               <a:pPr/>
-              <a:t>5/2/2017</a:t>
+              <a:t>5/3/2017</a:t>
             </a:fld>
             <a:endParaRPr lang="en-US" dirty="0"/>
           </a:p>
@@ -5257,7 +5257,7 @@
             <a:fld id="{B61BEF0D-F0BB-DE4B-95CE-6DB70DBA9567}" type="datetimeFigureOut">
               <a:rPr lang="en-US" dirty="0"/>
               <a:pPr/>
-              <a:t>5/2/2017</a:t>
+              <a:t>5/3/2017</a:t>
             </a:fld>
             <a:endParaRPr lang="en-US" dirty="0"/>
           </a:p>
@@ -5960,8 +5960,24 @@
           </a:p>
           <a:p>
             <a:r>
-              <a:rPr lang="en-US" sz="2400" smtClean="0"/>
+              <a:rPr lang="en-US" sz="2400" dirty="0" smtClean="0"/>
               <a:t>These slides (pdf): </a:t>
+            </a:r>
+            <a:r>
+              <a:rPr lang="en-US" sz="2400" dirty="0">
+                <a:hlinkClick r:id="rId3"/>
+              </a:rPr>
+              <a:t>https://</a:t>
+            </a:r>
+            <a:r>
+              <a:rPr lang="en-US" sz="2400" dirty="0" smtClean="0">
+                <a:hlinkClick r:id="rId3"/>
+              </a:rPr>
+              <a:t>tinyurl.com/love-lambda</a:t>
+            </a:r>
+            <a:r>
+              <a:rPr lang="en-US" sz="2400" dirty="0" smtClean="0"/>
+              <a:t> </a:t>
             </a:r>
             <a:endParaRPr lang="en-US" sz="2400" dirty="0" smtClean="0"/>
           </a:p>
@@ -6859,7 +6875,7 @@
               <a:t>    </a:t>
             </a:r>
             <a:r>
-              <a:rPr lang="en-US" sz="2100" dirty="0" err="1">
+              <a:rPr lang="en-US" sz="2400" b="1" dirty="0" err="1">
                 <a:solidFill>
                   <a:srgbClr val="8000FF"/>
                 </a:solidFill>
@@ -6867,35 +6883,38 @@
                   <a:srgbClr val="FFFFFF"/>
                 </a:highlight>
                 <a:latin typeface="Courier New" panose="02070309020205020404" pitchFamily="49" charset="0"/>
+                <a:cs typeface="Courier New" panose="02070309020205020404" pitchFamily="49" charset="0"/>
               </a:rPr>
               <a:t>int</a:t>
             </a:r>
             <a:r>
-              <a:rPr lang="en-US" sz="2100" dirty="0">
-                <a:solidFill>
-                  <a:srgbClr val="000000"/>
-                </a:solidFill>
-                <a:highlight>
-                  <a:srgbClr val="FFFFFF"/>
-                </a:highlight>
-                <a:latin typeface="Courier New" panose="02070309020205020404" pitchFamily="49" charset="0"/>
+              <a:rPr lang="en-US" sz="2400" b="1" dirty="0">
+                <a:solidFill>
+                  <a:srgbClr val="000000"/>
+                </a:solidFill>
+                <a:highlight>
+                  <a:srgbClr val="FFFFFF"/>
+                </a:highlight>
+                <a:latin typeface="Courier New" panose="02070309020205020404" pitchFamily="49" charset="0"/>
+                <a:cs typeface="Courier New" panose="02070309020205020404" pitchFamily="49" charset="0"/>
               </a:rPr>
               <a:t> </a:t>
             </a:r>
             <a:r>
-              <a:rPr lang="en-US" sz="2100" dirty="0" err="1">
-                <a:solidFill>
-                  <a:srgbClr val="000000"/>
-                </a:solidFill>
-                <a:highlight>
-                  <a:srgbClr val="FFFFFF"/>
-                </a:highlight>
-                <a:latin typeface="Courier New" panose="02070309020205020404" pitchFamily="49" charset="0"/>
+              <a:rPr lang="en-US" sz="2400" b="1" dirty="0" err="1">
+                <a:solidFill>
+                  <a:srgbClr val="000000"/>
+                </a:solidFill>
+                <a:highlight>
+                  <a:srgbClr val="FFFFFF"/>
+                </a:highlight>
+                <a:latin typeface="Courier New" panose="02070309020205020404" pitchFamily="49" charset="0"/>
+                <a:cs typeface="Courier New" panose="02070309020205020404" pitchFamily="49" charset="0"/>
               </a:rPr>
               <a:t>myMethod</a:t>
             </a:r>
             <a:r>
-              <a:rPr lang="en-US" sz="2100" b="1" dirty="0">
+              <a:rPr lang="en-US" sz="2400" b="1" dirty="0">
                 <a:solidFill>
                   <a:srgbClr val="000080"/>
                 </a:solidFill>
@@ -6903,23 +6922,25 @@
                   <a:srgbClr val="FFFFFF"/>
                 </a:highlight>
                 <a:latin typeface="Courier New" panose="02070309020205020404" pitchFamily="49" charset="0"/>
+                <a:cs typeface="Courier New" panose="02070309020205020404" pitchFamily="49" charset="0"/>
               </a:rPr>
               <a:t>();</a:t>
             </a:r>
             <a:r>
-              <a:rPr lang="en-US" sz="2100" dirty="0">
-                <a:solidFill>
-                  <a:srgbClr val="000000"/>
-                </a:solidFill>
-                <a:highlight>
-                  <a:srgbClr val="FFFFFF"/>
-                </a:highlight>
-                <a:latin typeface="Courier New" panose="02070309020205020404" pitchFamily="49" charset="0"/>
+              <a:rPr lang="en-US" sz="2400" b="1" dirty="0">
+                <a:solidFill>
+                  <a:srgbClr val="000000"/>
+                </a:solidFill>
+                <a:highlight>
+                  <a:srgbClr val="FFFFFF"/>
+                </a:highlight>
+                <a:latin typeface="Courier New" panose="02070309020205020404" pitchFamily="49" charset="0"/>
+                <a:cs typeface="Courier New" panose="02070309020205020404" pitchFamily="49" charset="0"/>
               </a:rPr>
               <a:t> </a:t>
             </a:r>
             <a:r>
-              <a:rPr lang="en-US" sz="2100" dirty="0">
+              <a:rPr lang="en-US" sz="2400" b="1" dirty="0">
                 <a:solidFill>
                   <a:srgbClr val="008000"/>
                 </a:solidFill>
@@ -6927,6 +6948,7 @@
                   <a:srgbClr val="FFFFFF"/>
                 </a:highlight>
                 <a:latin typeface="Courier New" panose="02070309020205020404" pitchFamily="49" charset="0"/>
+                <a:cs typeface="Courier New" panose="02070309020205020404" pitchFamily="49" charset="0"/>
               </a:rPr>
               <a:t>// Abstract.</a:t>
             </a:r>
@@ -8684,8 +8706,21 @@
           <a:p>
             <a:r>
               <a:rPr lang="en-US" dirty="0" smtClean="0"/>
-              <a:t>The following conventions apply for type variables used by Java 8 FIs.</a:t>
-            </a:r>
+              <a:t>The following conventions apply for </a:t>
+            </a:r>
+            <a:r>
+              <a:rPr lang="en-US" dirty="0" smtClean="0"/>
+              <a:t>type </a:t>
+            </a:r>
+            <a:r>
+              <a:rPr lang="en-US" dirty="0" smtClean="0"/>
+              <a:t>variables used by Java 8 </a:t>
+            </a:r>
+            <a:r>
+              <a:rPr lang="en-US" dirty="0" smtClean="0"/>
+              <a:t>FIs:</a:t>
+            </a:r>
+            <a:endParaRPr lang="en-US" dirty="0" smtClean="0"/>
           </a:p>
           <a:p>
             <a:r>
@@ -8708,8 +8743,23 @@
           <a:p>
             <a:r>
               <a:rPr lang="en-US" dirty="0" smtClean="0"/>
-              <a:t>Any of the above are omitted if not used.</a:t>
-            </a:r>
+              <a:t>Any of the above are omitted if not </a:t>
+            </a:r>
+            <a:r>
+              <a:rPr lang="en-US" dirty="0" smtClean="0"/>
+              <a:t>used</a:t>
+            </a:r>
+            <a:r>
+              <a:rPr lang="en-US" dirty="0" smtClean="0"/>
+              <a:t>.</a:t>
+            </a:r>
+          </a:p>
+          <a:p>
+            <a:r>
+              <a:rPr lang="en-US" dirty="0" smtClean="0"/>
+              <a:t>If an FI lacks an argument, T is used for the return value instead of R.</a:t>
+            </a:r>
+            <a:endParaRPr lang="en-US" dirty="0" smtClean="0"/>
           </a:p>
           <a:p>
             <a:endParaRPr lang="en-US" dirty="0"/>

</xml_diff>

<commit_message>
Add Example4.java.  Clean up definition of stream.  Example will be on next slide showing the lambda in the stream.
</commit_message>
<xml_diff>
--- a/Learning to Love the Lambda in the Stream.pptx
+++ b/Learning to Love the Lambda in the Stream.pptx
@@ -18,7 +18,9 @@
     <p:sldId id="266" r:id="rId12"/>
     <p:sldId id="267" r:id="rId13"/>
     <p:sldId id="268" r:id="rId14"/>
-    <p:sldId id="269" r:id="rId15"/>
+    <p:sldId id="270" r:id="rId15"/>
+    <p:sldId id="269" r:id="rId16"/>
+    <p:sldId id="271" r:id="rId17"/>
   </p:sldIdLst>
   <p:sldSz cx="12192000" cy="6858000"/>
   <p:notesSz cx="6858000" cy="9144000"/>
@@ -5903,25 +5905,8 @@
           <a:p>
             <a:r>
               <a:rPr lang="en-US" sz="2400" dirty="0" smtClean="0"/>
-              <a:t>Accepts </a:t>
-            </a:r>
-            <a:r>
-              <a:rPr lang="en-US" sz="2400" dirty="0" smtClean="0"/>
-              <a:t>an </a:t>
-            </a:r>
-            <a:r>
-              <a:rPr lang="en-US" sz="2400" dirty="0" smtClean="0"/>
-              <a:t>argument.  Returns </a:t>
-            </a:r>
-            <a:r>
-              <a:rPr lang="en-US" sz="2400" dirty="0" smtClean="0"/>
-              <a:t>no value (void)</a:t>
-            </a:r>
-            <a:r>
-              <a:rPr lang="en-US" sz="2400" dirty="0" smtClean="0"/>
-              <a:t>.</a:t>
-            </a:r>
-            <a:endParaRPr lang="en-US" sz="2400" dirty="0" smtClean="0"/>
+              <a:t>Accepts an argument.  Returns no value (void).</a:t>
+            </a:r>
           </a:p>
           <a:p>
             <a:r>
@@ -6652,6 +6637,82 @@
       </p:grpSpPr>
       <p:sp>
         <p:nvSpPr>
+          <p:cNvPr id="4" name="Title 3"/>
+          <p:cNvSpPr>
+            <a:spLocks noGrp="1"/>
+          </p:cNvSpPr>
+          <p:nvPr>
+            <p:ph type="ctrTitle"/>
+          </p:nvPr>
+        </p:nvSpPr>
+        <p:spPr/>
+        <p:txBody>
+          <a:bodyPr/>
+          <a:lstStyle/>
+          <a:p>
+            <a:r>
+              <a:rPr lang="en-US" dirty="0" smtClean="0"/>
+              <a:t>Stream</a:t>
+            </a:r>
+            <a:endParaRPr lang="en-US" dirty="0"/>
+          </a:p>
+        </p:txBody>
+      </p:sp>
+      <p:sp>
+        <p:nvSpPr>
+          <p:cNvPr id="5" name="Subtitle 4"/>
+          <p:cNvSpPr>
+            <a:spLocks noGrp="1"/>
+          </p:cNvSpPr>
+          <p:nvPr>
+            <p:ph type="subTitle" idx="1"/>
+          </p:nvPr>
+        </p:nvSpPr>
+        <p:spPr/>
+        <p:txBody>
+          <a:bodyPr/>
+          <a:lstStyle/>
+          <a:p>
+            <a:r>
+              <a:rPr lang="en-US" dirty="0" smtClean="0"/>
+              <a:t>Not to be confused with IO Streams</a:t>
+            </a:r>
+            <a:endParaRPr lang="en-US" dirty="0"/>
+          </a:p>
+        </p:txBody>
+      </p:sp>
+    </p:spTree>
+    <p:extLst>
+      <p:ext uri="{BB962C8B-B14F-4D97-AF65-F5344CB8AC3E}">
+        <p14:creationId xmlns:p14="http://schemas.microsoft.com/office/powerpoint/2010/main" val="2389831980"/>
+      </p:ext>
+    </p:extLst>
+  </p:cSld>
+  <p:clrMapOvr>
+    <a:masterClrMapping/>
+  </p:clrMapOvr>
+</p:sld>
+</file>
+
+<file path=ppt/slides/slide15.xml><?xml version="1.0" encoding="utf-8"?>
+<p:sld xmlns:a="http://schemas.openxmlformats.org/drawingml/2006/main" xmlns:r="http://schemas.openxmlformats.org/officeDocument/2006/relationships" xmlns:p="http://schemas.openxmlformats.org/presentationml/2006/main">
+  <p:cSld>
+    <p:spTree>
+      <p:nvGrpSpPr>
+        <p:cNvPr id="1" name=""/>
+        <p:cNvGrpSpPr/>
+        <p:nvPr/>
+      </p:nvGrpSpPr>
+      <p:grpSpPr>
+        <a:xfrm>
+          <a:off x="0" y="0"/>
+          <a:ext cx="0" cy="0"/>
+          <a:chOff x="0" y="0"/>
+          <a:chExt cx="0" cy="0"/>
+        </a:xfrm>
+      </p:grpSpPr>
+      <p:sp>
+        <p:nvSpPr>
           <p:cNvPr id="2" name="Title 1"/>
           <p:cNvSpPr>
             <a:spLocks noGrp="1"/>
@@ -6663,7 +6724,7 @@
         <p:spPr>
           <a:xfrm>
             <a:off x="677334" y="609600"/>
-            <a:ext cx="8596668" cy="923365"/>
+            <a:ext cx="8596668" cy="748553"/>
           </a:xfrm>
         </p:spPr>
         <p:txBody>
@@ -6672,7 +6733,7 @@
           <a:p>
             <a:r>
               <a:rPr lang="en-US" dirty="0" smtClean="0"/>
-              <a:t>Streams</a:t>
+              <a:t>Definition</a:t>
             </a:r>
             <a:endParaRPr lang="en-US" dirty="0"/>
           </a:p>
@@ -6690,20 +6751,33 @@
         </p:nvSpPr>
         <p:spPr>
           <a:xfrm>
-            <a:off x="677334" y="1304365"/>
-            <a:ext cx="8596668" cy="5091953"/>
+            <a:off x="677334" y="1604682"/>
+            <a:ext cx="8596668" cy="4791636"/>
           </a:xfrm>
         </p:spPr>
         <p:txBody>
           <a:bodyPr>
-            <a:normAutofit lnSpcReduction="10000"/>
+            <a:normAutofit/>
           </a:bodyPr>
           <a:lstStyle/>
           <a:p>
             <a:r>
               <a:rPr lang="en-US" dirty="0" smtClean="0"/>
-              <a:t>Abstraction for computation of elements.  Is not a data structure, but rather a computation structure.</a:t>
-            </a:r>
+              <a:t>Abstraction for computation of elements.  Is not a data structure, but rather a </a:t>
+            </a:r>
+            <a:r>
+              <a:rPr lang="en-US" dirty="0" smtClean="0"/>
+              <a:t>computation </a:t>
+            </a:r>
+            <a:r>
+              <a:rPr lang="en-US" dirty="0" smtClean="0"/>
+              <a:t>structure</a:t>
+            </a:r>
+            <a:r>
+              <a:rPr lang="en-US" dirty="0" smtClean="0"/>
+              <a:t>.</a:t>
+            </a:r>
+            <a:endParaRPr lang="en-US" dirty="0" smtClean="0"/>
           </a:p>
           <a:p>
             <a:r>
@@ -6718,21 +6792,16 @@
             </a:pPr>
             <a:r>
               <a:rPr lang="en-US" dirty="0" smtClean="0"/>
-              <a:t>A data source, such as a collection, file, or computation.  May be infinite, such as the set of numbers starting at 0.  A data </a:t>
-            </a:r>
-            <a:r>
-              <a:rPr lang="en-US" smtClean="0"/>
-              <a:t>source is </a:t>
-            </a:r>
-            <a:r>
-              <a:rPr lang="en-US" i="1" smtClean="0"/>
+              <a:t>A data source, such as a collection, file, or computation.  May be infinite, such as the set of numbers starting at 0.  A data source is </a:t>
+            </a:r>
+            <a:r>
+              <a:rPr lang="en-US" i="1" dirty="0" smtClean="0"/>
               <a:t>lazy</a:t>
             </a:r>
             <a:r>
-              <a:rPr lang="en-US" smtClean="0"/>
+              <a:rPr lang="en-US" dirty="0" smtClean="0"/>
               <a:t>.</a:t>
             </a:r>
-            <a:endParaRPr lang="en-US" dirty="0" smtClean="0"/>
           </a:p>
           <a:p>
             <a:pPr marL="800100" lvl="1" indent="-342900">
@@ -6748,8 +6817,13 @@
             <a:pPr marL="1200150" lvl="2" indent="-342900"/>
             <a:r>
               <a:rPr lang="en-US" dirty="0" smtClean="0"/>
-              <a:t>Accepts a stream and returns a new stream with the operation appended to it</a:t>
-            </a:r>
+              <a:t>Accepts a stream and returns a new stream with the operation appended to </a:t>
+            </a:r>
+            <a:r>
+              <a:rPr lang="en-US" dirty="0" smtClean="0"/>
+              <a:t>it.</a:t>
+            </a:r>
+            <a:endParaRPr lang="en-US" dirty="0" smtClean="0"/>
           </a:p>
           <a:p>
             <a:pPr marL="1200150" lvl="2" indent="-342900"/>
@@ -6799,397 +6873,27 @@
             </a:r>
             <a:r>
               <a:rPr lang="en-US" dirty="0" smtClean="0"/>
-              <a:t>Applying a terminal operation to a stream begins the process of pulling data from the data source, and applying the intermediate operations.</a:t>
-            </a:r>
-          </a:p>
-          <a:p>
-            <a:pPr marL="400050"/>
+              <a:t>It requests the elements from the final stream, which has the effect of pulling elements from the data source and applying the intermediate operations to them.  A stream is a passive description of a computation until a terminal operation is applied.</a:t>
+            </a:r>
+          </a:p>
+          <a:p>
+            <a:pPr marL="1200150" lvl="2" indent="-342900"/>
             <a:r>
               <a:rPr lang="en-US" dirty="0" smtClean="0"/>
-              <a:t>Example:</a:t>
-            </a:r>
-          </a:p>
-          <a:p>
-            <a:pPr marL="0" indent="0">
-              <a:buNone/>
-            </a:pPr>
-            <a:r>
-              <a:rPr lang="en-US" dirty="0" err="1">
-                <a:solidFill>
-                  <a:srgbClr val="000000"/>
-                </a:solidFill>
-                <a:highlight>
-                  <a:srgbClr val="FFFFFF"/>
-                </a:highlight>
-                <a:latin typeface="Courier New" panose="02070309020205020404" pitchFamily="49" charset="0"/>
-              </a:rPr>
-              <a:t>System</a:t>
-            </a:r>
-            <a:r>
-              <a:rPr lang="en-US" b="1" dirty="0" err="1">
-                <a:solidFill>
-                  <a:srgbClr val="000080"/>
-                </a:solidFill>
-                <a:highlight>
-                  <a:srgbClr val="FFFFFF"/>
-                </a:highlight>
-                <a:latin typeface="Courier New" panose="02070309020205020404" pitchFamily="49" charset="0"/>
-              </a:rPr>
+              <a:t>Closes the stream.  Any further operations are invalid and result in </a:t>
+            </a:r>
+            <a:r>
+              <a:rPr lang="en-US" dirty="0"/>
+              <a:t>an </a:t>
+            </a:r>
+            <a:r>
+              <a:rPr lang="en-US" dirty="0" err="1"/>
+              <a:t>IllegalStateException</a:t>
+            </a:r>
+            <a:r>
+              <a:rPr lang="en-US" dirty="0"/>
               <a:t>.</a:t>
             </a:r>
-            <a:r>
-              <a:rPr lang="en-US" dirty="0" err="1">
-                <a:solidFill>
-                  <a:srgbClr val="000000"/>
-                </a:solidFill>
-                <a:highlight>
-                  <a:srgbClr val="FFFFFF"/>
-                </a:highlight>
-                <a:latin typeface="Courier New" panose="02070309020205020404" pitchFamily="49" charset="0"/>
-              </a:rPr>
-              <a:t>out</a:t>
-            </a:r>
-            <a:r>
-              <a:rPr lang="en-US" b="1" dirty="0" err="1">
-                <a:solidFill>
-                  <a:srgbClr val="000080"/>
-                </a:solidFill>
-                <a:highlight>
-                  <a:srgbClr val="FFFFFF"/>
-                </a:highlight>
-                <a:latin typeface="Courier New" panose="02070309020205020404" pitchFamily="49" charset="0"/>
-              </a:rPr>
-              <a:t>.</a:t>
-            </a:r>
-            <a:r>
-              <a:rPr lang="en-US" dirty="0" err="1">
-                <a:solidFill>
-                  <a:srgbClr val="000000"/>
-                </a:solidFill>
-                <a:highlight>
-                  <a:srgbClr val="FFFFFF"/>
-                </a:highlight>
-                <a:latin typeface="Courier New" panose="02070309020205020404" pitchFamily="49" charset="0"/>
-              </a:rPr>
-              <a:t>print</a:t>
-            </a:r>
-            <a:r>
-              <a:rPr lang="en-US" b="1" dirty="0">
-                <a:solidFill>
-                  <a:srgbClr val="000080"/>
-                </a:solidFill>
-                <a:highlight>
-                  <a:srgbClr val="FFFFFF"/>
-                </a:highlight>
-                <a:latin typeface="Courier New" panose="02070309020205020404" pitchFamily="49" charset="0"/>
-              </a:rPr>
-              <a:t>(</a:t>
-            </a:r>
-            <a:r>
-              <a:rPr lang="en-US" dirty="0" err="1">
-                <a:solidFill>
-                  <a:srgbClr val="000000"/>
-                </a:solidFill>
-                <a:highlight>
-                  <a:srgbClr val="FFFFFF"/>
-                </a:highlight>
-                <a:latin typeface="Courier New" panose="02070309020205020404" pitchFamily="49" charset="0"/>
-              </a:rPr>
-              <a:t>IntStream</a:t>
-            </a:r>
-            <a:r>
-              <a:rPr lang="en-US" b="1" dirty="0" err="1">
-                <a:solidFill>
-                  <a:srgbClr val="000080"/>
-                </a:solidFill>
-                <a:highlight>
-                  <a:srgbClr val="FFFFFF"/>
-                </a:highlight>
-                <a:latin typeface="Courier New" panose="02070309020205020404" pitchFamily="49" charset="0"/>
-              </a:rPr>
-              <a:t>.</a:t>
-            </a:r>
-            <a:r>
-              <a:rPr lang="en-US" dirty="0" err="1">
-                <a:solidFill>
-                  <a:srgbClr val="000000"/>
-                </a:solidFill>
-                <a:highlight>
-                  <a:srgbClr val="FFFFFF"/>
-                </a:highlight>
-                <a:latin typeface="Courier New" panose="02070309020205020404" pitchFamily="49" charset="0"/>
-              </a:rPr>
-              <a:t>iterate</a:t>
-            </a:r>
-            <a:r>
-              <a:rPr lang="en-US" b="1" dirty="0">
-                <a:solidFill>
-                  <a:srgbClr val="000080"/>
-                </a:solidFill>
-                <a:highlight>
-                  <a:srgbClr val="FFFFFF"/>
-                </a:highlight>
-                <a:latin typeface="Courier New" panose="02070309020205020404" pitchFamily="49" charset="0"/>
-              </a:rPr>
-              <a:t>(</a:t>
-            </a:r>
-            <a:r>
-              <a:rPr lang="en-US" dirty="0">
-                <a:solidFill>
-                  <a:srgbClr val="FF8000"/>
-                </a:solidFill>
-                <a:highlight>
-                  <a:srgbClr val="FFFFFF"/>
-                </a:highlight>
-                <a:latin typeface="Courier New" panose="02070309020205020404" pitchFamily="49" charset="0"/>
-              </a:rPr>
-              <a:t>0</a:t>
-            </a:r>
-            <a:r>
-              <a:rPr lang="en-US" b="1" dirty="0">
-                <a:solidFill>
-                  <a:srgbClr val="000080"/>
-                </a:solidFill>
-                <a:highlight>
-                  <a:srgbClr val="FFFFFF"/>
-                </a:highlight>
-                <a:latin typeface="Courier New" panose="02070309020205020404" pitchFamily="49" charset="0"/>
-              </a:rPr>
-              <a:t>,</a:t>
-            </a:r>
-            <a:r>
-              <a:rPr lang="en-US" dirty="0">
-                <a:solidFill>
-                  <a:srgbClr val="000000"/>
-                </a:solidFill>
-                <a:highlight>
-                  <a:srgbClr val="FFFFFF"/>
-                </a:highlight>
-                <a:latin typeface="Courier New" panose="02070309020205020404" pitchFamily="49" charset="0"/>
-              </a:rPr>
-              <a:t> </a:t>
-            </a:r>
-            <a:r>
-              <a:rPr lang="en-US" dirty="0" err="1">
-                <a:solidFill>
-                  <a:srgbClr val="000000"/>
-                </a:solidFill>
-                <a:highlight>
-                  <a:srgbClr val="FFFFFF"/>
-                </a:highlight>
-                <a:latin typeface="Courier New" panose="02070309020205020404" pitchFamily="49" charset="0"/>
-              </a:rPr>
-              <a:t>i</a:t>
-            </a:r>
-            <a:r>
-              <a:rPr lang="en-US" dirty="0">
-                <a:solidFill>
-                  <a:srgbClr val="000000"/>
-                </a:solidFill>
-                <a:highlight>
-                  <a:srgbClr val="FFFFFF"/>
-                </a:highlight>
-                <a:latin typeface="Courier New" panose="02070309020205020404" pitchFamily="49" charset="0"/>
-              </a:rPr>
-              <a:t> </a:t>
-            </a:r>
-            <a:r>
-              <a:rPr lang="en-US" b="1" dirty="0">
-                <a:solidFill>
-                  <a:srgbClr val="000080"/>
-                </a:solidFill>
-                <a:highlight>
-                  <a:srgbClr val="FFFFFF"/>
-                </a:highlight>
-                <a:latin typeface="Courier New" panose="02070309020205020404" pitchFamily="49" charset="0"/>
-              </a:rPr>
-              <a:t>-&gt;</a:t>
-            </a:r>
-            <a:r>
-              <a:rPr lang="en-US" dirty="0">
-                <a:solidFill>
-                  <a:srgbClr val="000000"/>
-                </a:solidFill>
-                <a:highlight>
-                  <a:srgbClr val="FFFFFF"/>
-                </a:highlight>
-                <a:latin typeface="Courier New" panose="02070309020205020404" pitchFamily="49" charset="0"/>
-              </a:rPr>
-              <a:t> i</a:t>
-            </a:r>
-            <a:r>
-              <a:rPr lang="en-US" b="1" dirty="0">
-                <a:solidFill>
-                  <a:srgbClr val="000080"/>
-                </a:solidFill>
-                <a:highlight>
-                  <a:srgbClr val="FFFFFF"/>
-                </a:highlight>
-                <a:latin typeface="Courier New" panose="02070309020205020404" pitchFamily="49" charset="0"/>
-              </a:rPr>
-              <a:t>+</a:t>
-            </a:r>
-            <a:r>
-              <a:rPr lang="en-US" dirty="0">
-                <a:solidFill>
-                  <a:srgbClr val="FF8000"/>
-                </a:solidFill>
-                <a:highlight>
-                  <a:srgbClr val="FFFFFF"/>
-                </a:highlight>
-                <a:latin typeface="Courier New" panose="02070309020205020404" pitchFamily="49" charset="0"/>
-              </a:rPr>
-              <a:t>1</a:t>
-            </a:r>
-            <a:r>
-              <a:rPr lang="en-US" b="1" dirty="0">
-                <a:solidFill>
-                  <a:srgbClr val="000080"/>
-                </a:solidFill>
-                <a:highlight>
-                  <a:srgbClr val="FFFFFF"/>
-                </a:highlight>
-                <a:latin typeface="Courier New" panose="02070309020205020404" pitchFamily="49" charset="0"/>
-              </a:rPr>
-              <a:t>)</a:t>
-            </a:r>
-            <a:endParaRPr lang="en-US" dirty="0">
-              <a:solidFill>
-                <a:srgbClr val="000000"/>
-              </a:solidFill>
-              <a:highlight>
-                <a:srgbClr val="FFFFFF"/>
-              </a:highlight>
-              <a:latin typeface="Courier New" panose="02070309020205020404" pitchFamily="49" charset="0"/>
-            </a:endParaRPr>
-          </a:p>
-          <a:p>
-            <a:pPr marL="0" indent="0">
-              <a:buNone/>
-            </a:pPr>
-            <a:r>
-              <a:rPr lang="en-US" dirty="0">
-                <a:solidFill>
-                  <a:srgbClr val="000000"/>
-                </a:solidFill>
-                <a:highlight>
-                  <a:srgbClr val="FFFFFF"/>
-                </a:highlight>
-                <a:latin typeface="Courier New" panose="02070309020205020404" pitchFamily="49" charset="0"/>
-              </a:rPr>
-              <a:t>		</a:t>
-            </a:r>
-            <a:r>
-              <a:rPr lang="en-US" b="1" dirty="0">
-                <a:solidFill>
-                  <a:srgbClr val="000080"/>
-                </a:solidFill>
-                <a:highlight>
-                  <a:srgbClr val="FFFFFF"/>
-                </a:highlight>
-                <a:latin typeface="Courier New" panose="02070309020205020404" pitchFamily="49" charset="0"/>
-              </a:rPr>
-              <a:t>.</a:t>
-            </a:r>
-            <a:r>
-              <a:rPr lang="en-US" dirty="0">
-                <a:solidFill>
-                  <a:srgbClr val="000000"/>
-                </a:solidFill>
-                <a:highlight>
-                  <a:srgbClr val="FFFFFF"/>
-                </a:highlight>
-                <a:latin typeface="Courier New" panose="02070309020205020404" pitchFamily="49" charset="0"/>
-              </a:rPr>
-              <a:t>limit</a:t>
-            </a:r>
-            <a:r>
-              <a:rPr lang="en-US" b="1" dirty="0">
-                <a:solidFill>
-                  <a:srgbClr val="000080"/>
-                </a:solidFill>
-                <a:highlight>
-                  <a:srgbClr val="FFFFFF"/>
-                </a:highlight>
-                <a:latin typeface="Courier New" panose="02070309020205020404" pitchFamily="49" charset="0"/>
-              </a:rPr>
-              <a:t>(</a:t>
-            </a:r>
-            <a:r>
-              <a:rPr lang="en-US" dirty="0">
-                <a:solidFill>
-                  <a:srgbClr val="FF8000"/>
-                </a:solidFill>
-                <a:highlight>
-                  <a:srgbClr val="FFFFFF"/>
-                </a:highlight>
-                <a:latin typeface="Courier New" panose="02070309020205020404" pitchFamily="49" charset="0"/>
-              </a:rPr>
-              <a:t>12</a:t>
-            </a:r>
-            <a:r>
-              <a:rPr lang="en-US" b="1" dirty="0">
-                <a:solidFill>
-                  <a:srgbClr val="000080"/>
-                </a:solidFill>
-                <a:highlight>
-                  <a:srgbClr val="FFFFFF"/>
-                </a:highlight>
-                <a:latin typeface="Courier New" panose="02070309020205020404" pitchFamily="49" charset="0"/>
-              </a:rPr>
-              <a:t>).</a:t>
-            </a:r>
-            <a:r>
-              <a:rPr lang="en-US" dirty="0">
-                <a:solidFill>
-                  <a:srgbClr val="000000"/>
-                </a:solidFill>
-                <a:highlight>
-                  <a:srgbClr val="FFFFFF"/>
-                </a:highlight>
-                <a:latin typeface="Courier New" panose="02070309020205020404" pitchFamily="49" charset="0"/>
-              </a:rPr>
-              <a:t>sum</a:t>
-            </a:r>
-            <a:r>
-              <a:rPr lang="en-US" b="1" dirty="0">
-                <a:solidFill>
-                  <a:srgbClr val="000080"/>
-                </a:solidFill>
-                <a:highlight>
-                  <a:srgbClr val="FFFFFF"/>
-                </a:highlight>
-                <a:latin typeface="Courier New" panose="02070309020205020404" pitchFamily="49" charset="0"/>
-              </a:rPr>
-              <a:t>());</a:t>
-            </a:r>
-            <a:r>
-              <a:rPr lang="en-US" dirty="0">
-                <a:solidFill>
-                  <a:srgbClr val="000000"/>
-                </a:solidFill>
-                <a:highlight>
-                  <a:srgbClr val="FFFFFF"/>
-                </a:highlight>
-                <a:latin typeface="Courier New" panose="02070309020205020404" pitchFamily="49" charset="0"/>
-              </a:rPr>
-              <a:t> </a:t>
-            </a:r>
-            <a:r>
-              <a:rPr lang="en-US" dirty="0">
-                <a:solidFill>
-                  <a:srgbClr val="008000"/>
-                </a:solidFill>
-                <a:highlight>
-                  <a:srgbClr val="FFFFFF"/>
-                </a:highlight>
-                <a:latin typeface="Courier New" panose="02070309020205020404" pitchFamily="49" charset="0"/>
-              </a:rPr>
-              <a:t>// 66</a:t>
-            </a:r>
-          </a:p>
-          <a:p>
-            <a:pPr marL="400050"/>
             <a:endParaRPr lang="en-US" dirty="0" smtClean="0"/>
           </a:p>
         </p:txBody>
@@ -7198,6 +6902,74 @@
     <p:extLst>
       <p:ext uri="{BB962C8B-B14F-4D97-AF65-F5344CB8AC3E}">
         <p14:creationId xmlns:p14="http://schemas.microsoft.com/office/powerpoint/2010/main" val="84888869"/>
+      </p:ext>
+    </p:extLst>
+  </p:cSld>
+  <p:clrMapOvr>
+    <a:masterClrMapping/>
+  </p:clrMapOvr>
+</p:sld>
+</file>
+
+<file path=ppt/slides/slide16.xml><?xml version="1.0" encoding="utf-8"?>
+<p:sld xmlns:a="http://schemas.openxmlformats.org/drawingml/2006/main" xmlns:r="http://schemas.openxmlformats.org/officeDocument/2006/relationships" xmlns:p="http://schemas.openxmlformats.org/presentationml/2006/main">
+  <p:cSld>
+    <p:spTree>
+      <p:nvGrpSpPr>
+        <p:cNvPr id="1" name=""/>
+        <p:cNvGrpSpPr/>
+        <p:nvPr/>
+      </p:nvGrpSpPr>
+      <p:grpSpPr>
+        <a:xfrm>
+          <a:off x="0" y="0"/>
+          <a:ext cx="0" cy="0"/>
+          <a:chOff x="0" y="0"/>
+          <a:chExt cx="0" cy="0"/>
+        </a:xfrm>
+      </p:grpSpPr>
+      <p:sp>
+        <p:nvSpPr>
+          <p:cNvPr id="2" name="Title 1"/>
+          <p:cNvSpPr>
+            <a:spLocks noGrp="1"/>
+          </p:cNvSpPr>
+          <p:nvPr>
+            <p:ph type="title"/>
+          </p:nvPr>
+        </p:nvSpPr>
+        <p:spPr/>
+        <p:txBody>
+          <a:bodyPr/>
+          <a:lstStyle/>
+          <a:p>
+            <a:endParaRPr lang="en-US" dirty="0"/>
+          </a:p>
+        </p:txBody>
+      </p:sp>
+      <p:sp>
+        <p:nvSpPr>
+          <p:cNvPr id="3" name="Content Placeholder 2"/>
+          <p:cNvSpPr>
+            <a:spLocks noGrp="1"/>
+          </p:cNvSpPr>
+          <p:nvPr>
+            <p:ph idx="1"/>
+          </p:nvPr>
+        </p:nvSpPr>
+        <p:spPr/>
+        <p:txBody>
+          <a:bodyPr/>
+          <a:lstStyle/>
+          <a:p>
+            <a:endParaRPr lang="en-US"/>
+          </a:p>
+        </p:txBody>
+      </p:sp>
+    </p:spTree>
+    <p:extLst>
+      <p:ext uri="{BB962C8B-B14F-4D97-AF65-F5344CB8AC3E}">
+        <p14:creationId xmlns:p14="http://schemas.microsoft.com/office/powerpoint/2010/main" val="3326645903"/>
       </p:ext>
     </p:extLst>
   </p:cSld>
@@ -10895,11 +10667,7 @@
           <a:p>
             <a:r>
               <a:rPr lang="en-US" sz="2400" dirty="0" smtClean="0"/>
-              <a:t>The </a:t>
-            </a:r>
-            <a:r>
-              <a:rPr lang="en-US" sz="2400" dirty="0" smtClean="0"/>
-              <a:t>following conventions apply for type variables used by Java 8 FIs:</a:t>
+              <a:t>The following conventions apply for type variables used by Java 8 FIs:</a:t>
             </a:r>
           </a:p>
           <a:p>
@@ -10929,19 +10697,7 @@
           <a:p>
             <a:r>
               <a:rPr lang="en-US" sz="2400" dirty="0" smtClean="0"/>
-              <a:t>If an FI lacks an argument, T is </a:t>
-            </a:r>
-            <a:r>
-              <a:rPr lang="en-US" sz="2400" dirty="0" smtClean="0"/>
-              <a:t>sometimes used </a:t>
-            </a:r>
-            <a:r>
-              <a:rPr lang="en-US" sz="2400" dirty="0" smtClean="0"/>
-              <a:t>for the return value instead of R</a:t>
-            </a:r>
-            <a:r>
-              <a:rPr lang="en-US" sz="2400" dirty="0" smtClean="0"/>
-              <a:t>.</a:t>
+              <a:t>If an FI lacks an argument, T is sometimes used for the return value instead of R.</a:t>
             </a:r>
           </a:p>
           <a:p>
@@ -11108,19 +10864,7 @@
           <a:p>
             <a:r>
               <a:rPr lang="en-US" sz="2400" dirty="0" smtClean="0"/>
-              <a:t>Accepts </a:t>
-            </a:r>
-            <a:r>
-              <a:rPr lang="en-US" sz="2400" dirty="0" smtClean="0"/>
-              <a:t>an</a:t>
-            </a:r>
-            <a:r>
-              <a:rPr lang="en-US" sz="2400" dirty="0" smtClean="0"/>
-              <a:t> </a:t>
-            </a:r>
-            <a:r>
-              <a:rPr lang="en-US" sz="2400" dirty="0" smtClean="0"/>
-              <a:t>argument, returns a </a:t>
+              <a:t>Accepts an argument, returns a </a:t>
             </a:r>
             <a:r>
               <a:rPr lang="en-US" sz="2400" dirty="0" err="1" smtClean="0">
@@ -11161,11 +10905,7 @@
           <a:p>
             <a:r>
               <a:rPr lang="en-US" sz="2400" dirty="0" smtClean="0"/>
-              <a:t>Functional method</a:t>
-            </a:r>
-            <a:r>
-              <a:rPr lang="en-US" sz="2400" dirty="0" smtClean="0"/>
-              <a:t>: </a:t>
+              <a:t>Functional method: </a:t>
             </a:r>
             <a:r>
               <a:rPr lang="en-US" sz="2400" dirty="0" err="1">
@@ -11245,11 +10985,7 @@
           <a:p>
             <a:r>
               <a:rPr lang="en-US" sz="2400" dirty="0" smtClean="0"/>
-              <a:t>Related Primitive FIs</a:t>
-            </a:r>
-            <a:r>
-              <a:rPr lang="en-US" sz="2400" dirty="0" smtClean="0"/>
-              <a:t>: </a:t>
+              <a:t>Related Primitive FIs: </a:t>
             </a:r>
             <a:r>
               <a:rPr lang="en-US" sz="2400" dirty="0" err="1" smtClean="0"/>

</xml_diff>

<commit_message>
Clean up lambdas - consistently refer to single abstract method as functional method to be consistent with Oracle's Javadoc.  Add the Comparator as a key functional interface since it is used to control stream sorting.
</commit_message>
<xml_diff>
--- a/Learning to Love the Lambda in the Stream.pptx
+++ b/Learning to Love the Lambda in the Stream.pptx
@@ -18,9 +18,10 @@
     <p:sldId id="266" r:id="rId12"/>
     <p:sldId id="267" r:id="rId13"/>
     <p:sldId id="268" r:id="rId14"/>
-    <p:sldId id="270" r:id="rId15"/>
-    <p:sldId id="269" r:id="rId16"/>
-    <p:sldId id="271" r:id="rId17"/>
+    <p:sldId id="272" r:id="rId15"/>
+    <p:sldId id="270" r:id="rId16"/>
+    <p:sldId id="269" r:id="rId17"/>
+    <p:sldId id="271" r:id="rId18"/>
   </p:sldIdLst>
   <p:sldSz cx="12192000" cy="6858000"/>
   <p:notesSz cx="6858000" cy="9144000"/>
@@ -850,7 +851,7 @@
             <a:fld id="{B61BEF0D-F0BB-DE4B-95CE-6DB70DBA9567}" type="datetimeFigureOut">
               <a:rPr lang="en-US" dirty="0"/>
               <a:pPr/>
-              <a:t>5/6/2017</a:t>
+              <a:t>5/7/2017</a:t>
             </a:fld>
             <a:endParaRPr lang="en-US" dirty="0"/>
           </a:p>
@@ -1098,7 +1099,7 @@
             <a:fld id="{B61BEF0D-F0BB-DE4B-95CE-6DB70DBA9567}" type="datetimeFigureOut">
               <a:rPr lang="en-US" dirty="0"/>
               <a:pPr/>
-              <a:t>5/6/2017</a:t>
+              <a:t>5/7/2017</a:t>
             </a:fld>
             <a:endParaRPr lang="en-US" dirty="0"/>
           </a:p>
@@ -1409,7 +1410,7 @@
             <a:fld id="{B61BEF0D-F0BB-DE4B-95CE-6DB70DBA9567}" type="datetimeFigureOut">
               <a:rPr lang="en-US" dirty="0"/>
               <a:pPr/>
-              <a:t>5/6/2017</a:t>
+              <a:t>5/7/2017</a:t>
             </a:fld>
             <a:endParaRPr lang="en-US" dirty="0"/>
           </a:p>
@@ -1747,7 +1748,7 @@
             <a:fld id="{B61BEF0D-F0BB-DE4B-95CE-6DB70DBA9567}" type="datetimeFigureOut">
               <a:rPr lang="en-US" dirty="0"/>
               <a:pPr/>
-              <a:t>5/6/2017</a:t>
+              <a:t>5/7/2017</a:t>
             </a:fld>
             <a:endParaRPr lang="en-US" dirty="0"/>
           </a:p>
@@ -2058,7 +2059,7 @@
             <a:fld id="{B61BEF0D-F0BB-DE4B-95CE-6DB70DBA9567}" type="datetimeFigureOut">
               <a:rPr lang="en-US" dirty="0"/>
               <a:pPr/>
-              <a:t>5/6/2017</a:t>
+              <a:t>5/7/2017</a:t>
             </a:fld>
             <a:endParaRPr lang="en-US" dirty="0"/>
           </a:p>
@@ -2448,7 +2449,7 @@
             <a:fld id="{B61BEF0D-F0BB-DE4B-95CE-6DB70DBA9567}" type="datetimeFigureOut">
               <a:rPr lang="en-US" dirty="0"/>
               <a:pPr/>
-              <a:t>5/6/2017</a:t>
+              <a:t>5/7/2017</a:t>
             </a:fld>
             <a:endParaRPr lang="en-US" dirty="0"/>
           </a:p>
@@ -2614,7 +2615,7 @@
           <a:p>
             <a:fld id="{55C6B4A9-1611-4792-9094-5F34BCA07E0B}" type="datetimeFigureOut">
               <a:rPr lang="en-US" dirty="0"/>
-              <a:t>5/6/2017</a:t>
+              <a:t>5/7/2017</a:t>
             </a:fld>
             <a:endParaRPr lang="en-US" dirty="0"/>
           </a:p>
@@ -2790,7 +2791,7 @@
             <a:fld id="{B61BEF0D-F0BB-DE4B-95CE-6DB70DBA9567}" type="datetimeFigureOut">
               <a:rPr lang="en-US" dirty="0"/>
               <a:pPr/>
-              <a:t>5/6/2017</a:t>
+              <a:t>5/7/2017</a:t>
             </a:fld>
             <a:endParaRPr lang="en-US" dirty="0"/>
           </a:p>
@@ -2963,7 +2964,7 @@
             <a:fld id="{B61BEF0D-F0BB-DE4B-95CE-6DB70DBA9567}" type="datetimeFigureOut">
               <a:rPr lang="en-US" dirty="0"/>
               <a:pPr/>
-              <a:t>5/6/2017</a:t>
+              <a:t>5/7/2017</a:t>
             </a:fld>
             <a:endParaRPr lang="en-US" dirty="0"/>
           </a:p>
@@ -3207,7 +3208,7 @@
             <a:fld id="{B61BEF0D-F0BB-DE4B-95CE-6DB70DBA9567}" type="datetimeFigureOut">
               <a:rPr lang="en-US" dirty="0"/>
               <a:pPr/>
-              <a:t>5/6/2017</a:t>
+              <a:t>5/7/2017</a:t>
             </a:fld>
             <a:endParaRPr lang="en-US" dirty="0"/>
           </a:p>
@@ -3435,7 +3436,7 @@
           <a:p>
             <a:fld id="{EB712588-04B1-427B-82EE-E8DB90309F08}" type="datetimeFigureOut">
               <a:rPr lang="en-US" dirty="0"/>
-              <a:t>5/6/2017</a:t>
+              <a:t>5/7/2017</a:t>
             </a:fld>
             <a:endParaRPr lang="en-US" dirty="0"/>
           </a:p>
@@ -3805,7 +3806,7 @@
             <a:fld id="{B61BEF0D-F0BB-DE4B-95CE-6DB70DBA9567}" type="datetimeFigureOut">
               <a:rPr lang="en-US" dirty="0"/>
               <a:pPr/>
-              <a:t>5/6/2017</a:t>
+              <a:t>5/7/2017</a:t>
             </a:fld>
             <a:endParaRPr lang="en-US" dirty="0"/>
           </a:p>
@@ -3925,7 +3926,7 @@
             <a:fld id="{B61BEF0D-F0BB-DE4B-95CE-6DB70DBA9567}" type="datetimeFigureOut">
               <a:rPr lang="en-US" dirty="0"/>
               <a:pPr/>
-              <a:t>5/6/2017</a:t>
+              <a:t>5/7/2017</a:t>
             </a:fld>
             <a:endParaRPr lang="en-US" dirty="0"/>
           </a:p>
@@ -4017,7 +4018,7 @@
             <a:fld id="{B61BEF0D-F0BB-DE4B-95CE-6DB70DBA9567}" type="datetimeFigureOut">
               <a:rPr lang="en-US" dirty="0"/>
               <a:pPr/>
-              <a:t>5/6/2017</a:t>
+              <a:t>5/7/2017</a:t>
             </a:fld>
             <a:endParaRPr lang="en-US" dirty="0"/>
           </a:p>
@@ -4268,7 +4269,7 @@
           <a:p>
             <a:fld id="{42A54C80-263E-416B-A8E0-580EDEADCBDC}" type="datetimeFigureOut">
               <a:rPr lang="en-US" dirty="0"/>
-              <a:t>5/6/2017</a:t>
+              <a:t>5/7/2017</a:t>
             </a:fld>
             <a:endParaRPr lang="en-US" dirty="0"/>
           </a:p>
@@ -4527,7 +4528,7 @@
             <a:fld id="{B61BEF0D-F0BB-DE4B-95CE-6DB70DBA9567}" type="datetimeFigureOut">
               <a:rPr lang="en-US" dirty="0"/>
               <a:pPr/>
-              <a:t>5/6/2017</a:t>
+              <a:t>5/7/2017</a:t>
             </a:fld>
             <a:endParaRPr lang="en-US" dirty="0"/>
           </a:p>
@@ -5267,7 +5268,7 @@
             <a:fld id="{B61BEF0D-F0BB-DE4B-95CE-6DB70DBA9567}" type="datetimeFigureOut">
               <a:rPr lang="en-US" dirty="0"/>
               <a:pPr/>
-              <a:t>5/6/2017</a:t>
+              <a:t>5/7/2017</a:t>
             </a:fld>
             <a:endParaRPr lang="en-US" dirty="0"/>
           </a:p>
@@ -6338,12 +6339,85 @@
           <a:p>
             <a:r>
               <a:rPr lang="en-US" sz="2400" dirty="0"/>
-              <a:t>Functional M</a:t>
+              <a:t>Functional </a:t>
             </a:r>
             <a:r>
               <a:rPr lang="en-US" sz="2400" dirty="0" smtClean="0"/>
-              <a:t>ethod: </a:t>
-            </a:r>
+              <a:t>Method:</a:t>
+            </a:r>
+            <a:r>
+              <a:rPr lang="en-US" sz="2400" dirty="0" smtClean="0">
+                <a:solidFill>
+                  <a:srgbClr val="000000"/>
+                </a:solidFill>
+                <a:highlight>
+                  <a:srgbClr val="FFFFFF"/>
+                </a:highlight>
+                <a:latin typeface="Courier New" panose="02070309020205020404" pitchFamily="49" charset="0"/>
+              </a:rPr>
+              <a:t> </a:t>
+            </a:r>
+            <a:r>
+              <a:rPr lang="en-US" sz="2400" dirty="0" smtClean="0">
+                <a:solidFill>
+                  <a:srgbClr val="000000"/>
+                </a:solidFill>
+                <a:highlight>
+                  <a:srgbClr val="FFFFFF"/>
+                </a:highlight>
+                <a:latin typeface="Courier New" panose="02070309020205020404" pitchFamily="49" charset="0"/>
+              </a:rPr>
+              <a:t>R </a:t>
+            </a:r>
+            <a:r>
+              <a:rPr lang="en-US" sz="2400" dirty="0">
+                <a:solidFill>
+                  <a:srgbClr val="000000"/>
+                </a:solidFill>
+                <a:highlight>
+                  <a:srgbClr val="FFFFFF"/>
+                </a:highlight>
+                <a:latin typeface="Courier New" panose="02070309020205020404" pitchFamily="49" charset="0"/>
+              </a:rPr>
+              <a:t>apply</a:t>
+            </a:r>
+            <a:r>
+              <a:rPr lang="en-US" sz="2400" b="1" dirty="0">
+                <a:solidFill>
+                  <a:srgbClr val="000080"/>
+                </a:solidFill>
+                <a:highlight>
+                  <a:srgbClr val="FFFFFF"/>
+                </a:highlight>
+                <a:latin typeface="Courier New" panose="02070309020205020404" pitchFamily="49" charset="0"/>
+              </a:rPr>
+              <a:t>(</a:t>
+            </a:r>
+            <a:r>
+              <a:rPr lang="en-US" sz="2400" dirty="0">
+                <a:solidFill>
+                  <a:srgbClr val="000000"/>
+                </a:solidFill>
+                <a:highlight>
+                  <a:srgbClr val="FFFFFF"/>
+                </a:highlight>
+                <a:latin typeface="Courier New" panose="02070309020205020404" pitchFamily="49" charset="0"/>
+              </a:rPr>
+              <a:t>T t</a:t>
+            </a:r>
+            <a:r>
+              <a:rPr lang="en-US" sz="2400" b="1" dirty="0">
+                <a:solidFill>
+                  <a:srgbClr val="000080"/>
+                </a:solidFill>
+                <a:highlight>
+                  <a:srgbClr val="FFFFFF"/>
+                </a:highlight>
+                <a:latin typeface="Courier New" panose="02070309020205020404" pitchFamily="49" charset="0"/>
+              </a:rPr>
+              <a:t>)</a:t>
+            </a:r>
+            <a:endParaRPr lang="en-US" sz="2400" dirty="0" smtClean="0"/>
           </a:p>
           <a:p>
             <a:r>
@@ -6519,8 +6593,85 @@
           <a:p>
             <a:r>
               <a:rPr lang="en-US" sz="2400" dirty="0" smtClean="0"/>
-              <a:t>Functional Method</a:t>
-            </a:r>
+              <a:t>Functional </a:t>
+            </a:r>
+            <a:r>
+              <a:rPr lang="en-US" sz="2400" dirty="0" smtClean="0"/>
+              <a:t>Method: </a:t>
+            </a:r>
+            <a:r>
+              <a:rPr lang="en-US" sz="2400" dirty="0">
+                <a:solidFill>
+                  <a:srgbClr val="000000"/>
+                </a:solidFill>
+                <a:highlight>
+                  <a:srgbClr val="FFFFFF"/>
+                </a:highlight>
+                <a:latin typeface="Courier New" panose="02070309020205020404" pitchFamily="49" charset="0"/>
+              </a:rPr>
+              <a:t>T</a:t>
+            </a:r>
+            <a:r>
+              <a:rPr lang="en-US" sz="2400" dirty="0" smtClean="0">
+                <a:solidFill>
+                  <a:srgbClr val="000000"/>
+                </a:solidFill>
+                <a:highlight>
+                  <a:srgbClr val="FFFFFF"/>
+                </a:highlight>
+                <a:latin typeface="Courier New" panose="02070309020205020404" pitchFamily="49" charset="0"/>
+              </a:rPr>
+              <a:t> </a:t>
+            </a:r>
+            <a:r>
+              <a:rPr lang="en-US" sz="2400" dirty="0">
+                <a:solidFill>
+                  <a:srgbClr val="000000"/>
+                </a:solidFill>
+                <a:highlight>
+                  <a:srgbClr val="FFFFFF"/>
+                </a:highlight>
+                <a:latin typeface="Courier New" panose="02070309020205020404" pitchFamily="49" charset="0"/>
+              </a:rPr>
+              <a:t>apply</a:t>
+            </a:r>
+            <a:r>
+              <a:rPr lang="en-US" sz="2400" b="1" dirty="0">
+                <a:solidFill>
+                  <a:srgbClr val="000080"/>
+                </a:solidFill>
+                <a:highlight>
+                  <a:srgbClr val="FFFFFF"/>
+                </a:highlight>
+                <a:latin typeface="Courier New" panose="02070309020205020404" pitchFamily="49" charset="0"/>
+              </a:rPr>
+              <a:t>(</a:t>
+            </a:r>
+            <a:r>
+              <a:rPr lang="en-US" sz="2400" dirty="0">
+                <a:solidFill>
+                  <a:srgbClr val="000000"/>
+                </a:solidFill>
+                <a:highlight>
+                  <a:srgbClr val="FFFFFF"/>
+                </a:highlight>
+                <a:latin typeface="Courier New" panose="02070309020205020404" pitchFamily="49" charset="0"/>
+              </a:rPr>
+              <a:t>T t</a:t>
+            </a:r>
+            <a:r>
+              <a:rPr lang="en-US" sz="2400" b="1" dirty="0">
+                <a:solidFill>
+                  <a:srgbClr val="000080"/>
+                </a:solidFill>
+                <a:highlight>
+                  <a:srgbClr val="FFFFFF"/>
+                </a:highlight>
+                <a:latin typeface="Courier New" panose="02070309020205020404" pitchFamily="49" charset="0"/>
+              </a:rPr>
+              <a:t>)</a:t>
+            </a:r>
+            <a:endParaRPr lang="en-US" sz="2400" dirty="0" smtClean="0"/>
           </a:p>
           <a:p>
             <a:r>
@@ -6637,54 +6788,193 @@
       </p:grpSpPr>
       <p:sp>
         <p:nvSpPr>
-          <p:cNvPr id="4" name="Title 3"/>
-          <p:cNvSpPr>
-            <a:spLocks noGrp="1"/>
-          </p:cNvSpPr>
-          <p:nvPr>
-            <p:ph type="ctrTitle"/>
-          </p:nvPr>
-        </p:nvSpPr>
-        <p:spPr/>
+          <p:cNvPr id="2" name="Title 1"/>
+          <p:cNvSpPr>
+            <a:spLocks noGrp="1"/>
+          </p:cNvSpPr>
+          <p:nvPr>
+            <p:ph type="title"/>
+          </p:nvPr>
+        </p:nvSpPr>
+        <p:spPr>
+          <a:xfrm>
+            <a:off x="677334" y="609600"/>
+            <a:ext cx="8596668" cy="856129"/>
+          </a:xfrm>
+        </p:spPr>
         <p:txBody>
           <a:bodyPr/>
           <a:lstStyle/>
           <a:p>
             <a:r>
-              <a:rPr lang="en-US" dirty="0" smtClean="0"/>
-              <a:t>Stream</a:t>
-            </a:r>
-            <a:endParaRPr lang="en-US" dirty="0"/>
-          </a:p>
-        </p:txBody>
-      </p:sp>
-      <p:sp>
-        <p:nvSpPr>
-          <p:cNvPr id="5" name="Subtitle 4"/>
-          <p:cNvSpPr>
-            <a:spLocks noGrp="1"/>
-          </p:cNvSpPr>
-          <p:nvPr>
-            <p:ph type="subTitle" idx="1"/>
+              <a:rPr lang="en-US" dirty="0"/>
+              <a:t>Comparator&lt;T&gt;</a:t>
+            </a:r>
+          </a:p>
+        </p:txBody>
+      </p:sp>
+      <p:sp>
+        <p:nvSpPr>
+          <p:cNvPr id="3" name="Content Placeholder 2"/>
+          <p:cNvSpPr>
+            <a:spLocks noGrp="1"/>
+          </p:cNvSpPr>
+          <p:nvPr>
+            <p:ph idx="1"/>
           </p:nvPr>
         </p:nvSpPr>
         <p:spPr/>
         <p:txBody>
-          <a:bodyPr/>
+          <a:bodyPr>
+            <a:normAutofit/>
+          </a:bodyPr>
           <a:lstStyle/>
           <a:p>
             <a:r>
-              <a:rPr lang="en-US" dirty="0" smtClean="0"/>
-              <a:t>Not to be confused with IO Streams</a:t>
-            </a:r>
-            <a:endParaRPr lang="en-US" dirty="0"/>
+              <a:rPr lang="en-US" sz="2400" dirty="0" smtClean="0"/>
+              <a:t>Accepts two arguments, and returns an integer.</a:t>
+            </a:r>
+          </a:p>
+          <a:p>
+            <a:r>
+              <a:rPr lang="en-US" sz="2400" dirty="0" smtClean="0"/>
+              <a:t>Used to compare to objects, and to impose a </a:t>
+            </a:r>
+            <a:r>
+              <a:rPr lang="en-US" sz="2400" i="1" dirty="0" smtClean="0"/>
+              <a:t>total ordering</a:t>
+            </a:r>
+            <a:r>
+              <a:rPr lang="en-US" sz="2400" dirty="0" smtClean="0"/>
+              <a:t> on a collection of objects.</a:t>
+            </a:r>
+          </a:p>
+          <a:p>
+            <a:r>
+              <a:rPr lang="en-US" sz="2400" dirty="0" smtClean="0"/>
+              <a:t>Functional Interface: </a:t>
+            </a:r>
+            <a:r>
+              <a:rPr lang="fr-FR" sz="2400" dirty="0" err="1">
+                <a:solidFill>
+                  <a:srgbClr val="8000FF"/>
+                </a:solidFill>
+                <a:highlight>
+                  <a:srgbClr val="FFFFFF"/>
+                </a:highlight>
+                <a:latin typeface="Courier New" panose="02070309020205020404" pitchFamily="49" charset="0"/>
+              </a:rPr>
+              <a:t>int</a:t>
+            </a:r>
+            <a:r>
+              <a:rPr lang="fr-FR" sz="2400" dirty="0">
+                <a:solidFill>
+                  <a:srgbClr val="000000"/>
+                </a:solidFill>
+                <a:highlight>
+                  <a:srgbClr val="FFFFFF"/>
+                </a:highlight>
+                <a:latin typeface="Courier New" panose="02070309020205020404" pitchFamily="49" charset="0"/>
+              </a:rPr>
+              <a:t> compare</a:t>
+            </a:r>
+            <a:r>
+              <a:rPr lang="fr-FR" sz="2400" b="1" dirty="0">
+                <a:solidFill>
+                  <a:srgbClr val="000080"/>
+                </a:solidFill>
+                <a:highlight>
+                  <a:srgbClr val="FFFFFF"/>
+                </a:highlight>
+                <a:latin typeface="Courier New" panose="02070309020205020404" pitchFamily="49" charset="0"/>
+              </a:rPr>
+              <a:t>(</a:t>
+            </a:r>
+            <a:r>
+              <a:rPr lang="fr-FR" sz="2400" dirty="0">
+                <a:solidFill>
+                  <a:srgbClr val="000000"/>
+                </a:solidFill>
+                <a:highlight>
+                  <a:srgbClr val="FFFFFF"/>
+                </a:highlight>
+                <a:latin typeface="Courier New" panose="02070309020205020404" pitchFamily="49" charset="0"/>
+              </a:rPr>
+              <a:t>T o1</a:t>
+            </a:r>
+            <a:r>
+              <a:rPr lang="fr-FR" sz="2400" b="1" dirty="0">
+                <a:solidFill>
+                  <a:srgbClr val="000080"/>
+                </a:solidFill>
+                <a:highlight>
+                  <a:srgbClr val="FFFFFF"/>
+                </a:highlight>
+                <a:latin typeface="Courier New" panose="02070309020205020404" pitchFamily="49" charset="0"/>
+              </a:rPr>
+              <a:t>,</a:t>
+            </a:r>
+            <a:r>
+              <a:rPr lang="fr-FR" sz="2400" dirty="0">
+                <a:solidFill>
+                  <a:srgbClr val="000000"/>
+                </a:solidFill>
+                <a:highlight>
+                  <a:srgbClr val="FFFFFF"/>
+                </a:highlight>
+                <a:latin typeface="Courier New" panose="02070309020205020404" pitchFamily="49" charset="0"/>
+              </a:rPr>
+              <a:t> T o2</a:t>
+            </a:r>
+            <a:r>
+              <a:rPr lang="fr-FR" sz="2400" b="1" dirty="0" smtClean="0">
+                <a:solidFill>
+                  <a:srgbClr val="000080"/>
+                </a:solidFill>
+                <a:highlight>
+                  <a:srgbClr val="FFFFFF"/>
+                </a:highlight>
+                <a:latin typeface="Courier New" panose="02070309020205020404" pitchFamily="49" charset="0"/>
+              </a:rPr>
+              <a:t>)</a:t>
+            </a:r>
+          </a:p>
+          <a:p>
+            <a:pPr lvl="1"/>
+            <a:r>
+              <a:rPr lang="en-US" sz="2200" dirty="0" smtClean="0"/>
+              <a:t>When o1 &lt; o2, returns &lt;= -1</a:t>
+            </a:r>
+          </a:p>
+          <a:p>
+            <a:pPr lvl="1"/>
+            <a:r>
+              <a:rPr lang="en-US" sz="2200" dirty="0" smtClean="0"/>
+              <a:t>When o1 = o2, returns 0</a:t>
+            </a:r>
+          </a:p>
+          <a:p>
+            <a:pPr lvl="1"/>
+            <a:r>
+              <a:rPr lang="en-US" sz="2200" dirty="0" smtClean="0"/>
+              <a:t>When o1 &gt; o2, returns &gt;= 1</a:t>
+            </a:r>
+          </a:p>
+          <a:p>
+            <a:endParaRPr lang="en-US" sz="2400" dirty="0" smtClean="0"/>
+          </a:p>
+          <a:p>
+            <a:endParaRPr lang="en-US" sz="2400" dirty="0" smtClean="0"/>
+          </a:p>
+          <a:p>
+            <a:endParaRPr lang="en-US" sz="2400" dirty="0" smtClean="0"/>
           </a:p>
         </p:txBody>
       </p:sp>
     </p:spTree>
     <p:extLst>
       <p:ext uri="{BB962C8B-B14F-4D97-AF65-F5344CB8AC3E}">
-        <p14:creationId xmlns:p14="http://schemas.microsoft.com/office/powerpoint/2010/main" val="2389831980"/>
+        <p14:creationId xmlns:p14="http://schemas.microsoft.com/office/powerpoint/2010/main" val="2513913291"/>
       </p:ext>
     </p:extLst>
   </p:cSld>
@@ -6713,6 +7003,82 @@
       </p:grpSpPr>
       <p:sp>
         <p:nvSpPr>
+          <p:cNvPr id="4" name="Title 3"/>
+          <p:cNvSpPr>
+            <a:spLocks noGrp="1"/>
+          </p:cNvSpPr>
+          <p:nvPr>
+            <p:ph type="ctrTitle"/>
+          </p:nvPr>
+        </p:nvSpPr>
+        <p:spPr/>
+        <p:txBody>
+          <a:bodyPr/>
+          <a:lstStyle/>
+          <a:p>
+            <a:r>
+              <a:rPr lang="en-US" dirty="0" smtClean="0"/>
+              <a:t>Stream</a:t>
+            </a:r>
+            <a:endParaRPr lang="en-US" dirty="0"/>
+          </a:p>
+        </p:txBody>
+      </p:sp>
+      <p:sp>
+        <p:nvSpPr>
+          <p:cNvPr id="5" name="Subtitle 4"/>
+          <p:cNvSpPr>
+            <a:spLocks noGrp="1"/>
+          </p:cNvSpPr>
+          <p:nvPr>
+            <p:ph type="subTitle" idx="1"/>
+          </p:nvPr>
+        </p:nvSpPr>
+        <p:spPr/>
+        <p:txBody>
+          <a:bodyPr/>
+          <a:lstStyle/>
+          <a:p>
+            <a:r>
+              <a:rPr lang="en-US" dirty="0" smtClean="0"/>
+              <a:t>Not to be confused with IO Streams</a:t>
+            </a:r>
+            <a:endParaRPr lang="en-US" dirty="0"/>
+          </a:p>
+        </p:txBody>
+      </p:sp>
+    </p:spTree>
+    <p:extLst>
+      <p:ext uri="{BB962C8B-B14F-4D97-AF65-F5344CB8AC3E}">
+        <p14:creationId xmlns:p14="http://schemas.microsoft.com/office/powerpoint/2010/main" val="2389831980"/>
+      </p:ext>
+    </p:extLst>
+  </p:cSld>
+  <p:clrMapOvr>
+    <a:masterClrMapping/>
+  </p:clrMapOvr>
+</p:sld>
+</file>
+
+<file path=ppt/slides/slide16.xml><?xml version="1.0" encoding="utf-8"?>
+<p:sld xmlns:a="http://schemas.openxmlformats.org/drawingml/2006/main" xmlns:r="http://schemas.openxmlformats.org/officeDocument/2006/relationships" xmlns:p="http://schemas.openxmlformats.org/presentationml/2006/main">
+  <p:cSld>
+    <p:spTree>
+      <p:nvGrpSpPr>
+        <p:cNvPr id="1" name=""/>
+        <p:cNvGrpSpPr/>
+        <p:nvPr/>
+      </p:nvGrpSpPr>
+      <p:grpSpPr>
+        <a:xfrm>
+          <a:off x="0" y="0"/>
+          <a:ext cx="0" cy="0"/>
+          <a:chOff x="0" y="0"/>
+          <a:chExt cx="0" cy="0"/>
+        </a:xfrm>
+      </p:grpSpPr>
+      <p:sp>
+        <p:nvSpPr>
           <p:cNvPr id="2" name="Title 1"/>
           <p:cNvSpPr>
             <a:spLocks noGrp="1"/>
@@ -6763,21 +7129,8 @@
           <a:p>
             <a:r>
               <a:rPr lang="en-US" dirty="0" smtClean="0"/>
-              <a:t>Abstraction for computation of elements.  Is not a data structure, but rather a </a:t>
-            </a:r>
-            <a:r>
-              <a:rPr lang="en-US" dirty="0" smtClean="0"/>
-              <a:t>computation </a:t>
-            </a:r>
-            <a:r>
-              <a:rPr lang="en-US" dirty="0" smtClean="0"/>
-              <a:t>structure</a:t>
-            </a:r>
-            <a:r>
-              <a:rPr lang="en-US" dirty="0" smtClean="0"/>
-              <a:t>.</a:t>
-            </a:r>
-            <a:endParaRPr lang="en-US" dirty="0" smtClean="0"/>
+              <a:t>Abstraction for computation of elements.  Is not a data structure, but rather a computation structure.</a:t>
+            </a:r>
           </a:p>
           <a:p>
             <a:r>
@@ -6817,13 +7170,8 @@
             <a:pPr marL="1200150" lvl="2" indent="-342900"/>
             <a:r>
               <a:rPr lang="en-US" dirty="0" smtClean="0"/>
-              <a:t>Accepts a stream and returns a new stream with the operation appended to </a:t>
-            </a:r>
-            <a:r>
-              <a:rPr lang="en-US" dirty="0" smtClean="0"/>
-              <a:t>it.</a:t>
-            </a:r>
-            <a:endParaRPr lang="en-US" dirty="0" smtClean="0"/>
+              <a:t>Accepts a stream and returns a new stream with the operation appended to it.</a:t>
+            </a:r>
           </a:p>
           <a:p>
             <a:pPr marL="1200150" lvl="2" indent="-342900"/>
@@ -6911,7 +7259,7 @@
 </p:sld>
 </file>
 
-<file path=ppt/slides/slide16.xml><?xml version="1.0" encoding="utf-8"?>
+<file path=ppt/slides/slide17.xml><?xml version="1.0" encoding="utf-8"?>
 <p:sld xmlns:a="http://schemas.openxmlformats.org/drawingml/2006/main" xmlns:r="http://schemas.openxmlformats.org/officeDocument/2006/relationships" xmlns:p="http://schemas.openxmlformats.org/presentationml/2006/main">
   <p:cSld>
     <p:spTree>
@@ -7214,22 +7562,58 @@
               <a:t>Similar to a closure, </a:t>
             </a:r>
             <a:r>
+              <a:rPr lang="en-US" sz="2400" dirty="0" smtClean="0"/>
+              <a:t>class members, </a:t>
+            </a:r>
+            <a:r>
+              <a:rPr lang="en-US" sz="2400" i="1" dirty="0" smtClean="0"/>
+              <a:t>effectively </a:t>
+            </a:r>
+            <a:r>
+              <a:rPr lang="en-US" sz="2400" i="1" dirty="0" smtClean="0"/>
+              <a:t>final </a:t>
+            </a:r>
+            <a:r>
+              <a:rPr lang="en-US" sz="2400" dirty="0" smtClean="0"/>
+              <a:t>arguments and </a:t>
+            </a:r>
+            <a:r>
+              <a:rPr lang="en-US" sz="2400" dirty="0" smtClean="0"/>
+              <a:t>local </a:t>
+            </a:r>
+            <a:r>
+              <a:rPr lang="en-US" sz="2400" dirty="0" smtClean="0"/>
+              <a:t>variables </a:t>
+            </a:r>
+            <a:r>
+              <a:rPr lang="en-US" sz="2400" dirty="0" smtClean="0"/>
+              <a:t>are available to it.</a:t>
+            </a:r>
+          </a:p>
+          <a:p>
+            <a:r>
+              <a:rPr lang="en-US" sz="2400" dirty="0" smtClean="0"/>
+              <a:t>Lambdas may only exist when assigned to a Functional Interface, including being passed in as a parameter</a:t>
+            </a:r>
+            <a:r>
+              <a:rPr lang="en-US" sz="2400" dirty="0" smtClean="0"/>
+              <a:t>.</a:t>
+            </a:r>
+          </a:p>
+          <a:p>
+            <a:r>
+              <a:rPr lang="en-US" sz="2400" dirty="0" smtClean="0"/>
+              <a:t>An </a:t>
+            </a:r>
+            <a:r>
               <a:rPr lang="en-US" sz="2400" i="1" dirty="0" smtClean="0"/>
               <a:t>effectively final </a:t>
             </a:r>
             <a:r>
               <a:rPr lang="en-US" sz="2400" dirty="0" smtClean="0"/>
-              <a:t>arguments, local variables and class members are available to it.</a:t>
-            </a:r>
-          </a:p>
-          <a:p>
-            <a:r>
-              <a:rPr lang="en-US" sz="2400" dirty="0" smtClean="0"/>
-              <a:t>Lambdas may only exist when assigned to a Functional Interface, including being passed in as a parameter.</a:t>
-            </a:r>
-          </a:p>
-          <a:p>
-            <a:endParaRPr lang="en-US" sz="2400" dirty="0" smtClean="0"/>
+              <a:t>local variable or argument is either declared final, or is not changed such that if the final declaration were added, the code remains valid.</a:t>
+            </a:r>
+            <a:endParaRPr lang="en-US" sz="2400" i="1" dirty="0" smtClean="0"/>
           </a:p>
           <a:p>
             <a:endParaRPr lang="en-US" sz="2400" dirty="0"/>
@@ -8465,7 +8849,7 @@
         </p:spPr>
         <p:txBody>
           <a:bodyPr>
-            <a:normAutofit/>
+            <a:normAutofit lnSpcReduction="10000"/>
           </a:bodyPr>
           <a:lstStyle/>
           <a:p>
@@ -8475,13 +8859,38 @@
             </a:r>
             <a:r>
               <a:rPr lang="en-US" sz="2100" dirty="0" smtClean="0"/>
-              <a:t>.” -- </a:t>
+              <a:t>.” </a:t>
+            </a:r>
+            <a:r>
+              <a:rPr lang="en-US" sz="2100" dirty="0" smtClean="0"/>
+              <a:t>—</a:t>
+            </a:r>
+            <a:r>
+              <a:rPr lang="en-US" sz="2100" dirty="0" smtClean="0"/>
+              <a:t> </a:t>
             </a:r>
             <a:r>
               <a:rPr lang="en-US" sz="2100" dirty="0" smtClean="0">
                 <a:hlinkClick r:id="rId2"/>
               </a:rPr>
-              <a:t>Oracle Java Tutorial</a:t>
+              <a:t>Oracle Java </a:t>
+            </a:r>
+            <a:r>
+              <a:rPr lang="en-US" sz="2100" dirty="0" smtClean="0">
+                <a:hlinkClick r:id="rId2"/>
+              </a:rPr>
+              <a:t>Tutorial</a:t>
+            </a:r>
+            <a:endParaRPr lang="en-US" sz="2100" dirty="0" smtClean="0"/>
+          </a:p>
+          <a:p>
+            <a:r>
+              <a:rPr lang="en-US" sz="2100" dirty="0" smtClean="0"/>
+              <a:t>The sole abstract method referred to as the </a:t>
+            </a:r>
+            <a:r>
+              <a:rPr lang="en-US" sz="2100" i="1" dirty="0" smtClean="0"/>
+              <a:t>functional method</a:t>
             </a:r>
             <a:endParaRPr lang="en-US" sz="2100" dirty="0" smtClean="0"/>
           </a:p>
@@ -8717,8 +9126,29 @@
                 </a:highlight>
                 <a:latin typeface="Courier New" panose="02070309020205020404" pitchFamily="49" charset="0"/>
               </a:rPr>
-              <a:t>// Abstract.</a:t>
-            </a:r>
+              <a:t>// </a:t>
+            </a:r>
+            <a:r>
+              <a:rPr lang="en-US" sz="2800" b="1" dirty="0" smtClean="0">
+                <a:solidFill>
+                  <a:srgbClr val="008000"/>
+                </a:solidFill>
+                <a:highlight>
+                  <a:srgbClr val="FFFFFF"/>
+                </a:highlight>
+                <a:latin typeface="Courier New" panose="02070309020205020404" pitchFamily="49" charset="0"/>
+              </a:rPr>
+              <a:t>Functional Method</a:t>
+            </a:r>
+            <a:endParaRPr lang="en-US" sz="2800" b="1" dirty="0">
+              <a:solidFill>
+                <a:srgbClr val="008000"/>
+              </a:solidFill>
+              <a:highlight>
+                <a:srgbClr val="FFFFFF"/>
+              </a:highlight>
+              <a:latin typeface="Courier New" panose="02070309020205020404" pitchFamily="49" charset="0"/>
+            </a:endParaRPr>
           </a:p>
           <a:p>
             <a:pPr marL="0" indent="0">
@@ -9356,7 +9786,19 @@
           <a:p>
             <a:r>
               <a:rPr lang="en-US" sz="3400" dirty="0" smtClean="0"/>
-              <a:t>Since there is exactly one abstract method, method types and return values are inferred from the FI.</a:t>
+              <a:t>Since there is exactly one </a:t>
+            </a:r>
+            <a:r>
+              <a:rPr lang="en-US" sz="3400" dirty="0" smtClean="0"/>
+              <a:t>abstract functional</a:t>
+            </a:r>
+            <a:r>
+              <a:rPr lang="en-US" sz="3400" dirty="0" smtClean="0"/>
+              <a:t> </a:t>
+            </a:r>
+            <a:r>
+              <a:rPr lang="en-US" sz="3400" dirty="0" smtClean="0"/>
+              <a:t>method, method types and return values are inferred from the FI.</a:t>
             </a:r>
           </a:p>
           <a:p>
@@ -10185,8 +10627,29 @@
                 </a:highlight>
                 <a:latin typeface="Courier New" panose="02070309020205020404" pitchFamily="49" charset="0"/>
               </a:rPr>
-              <a:t>// 5 lines of code</a:t>
-            </a:r>
+              <a:t>// 5 lines of </a:t>
+            </a:r>
+            <a:r>
+              <a:rPr lang="en-US" sz="2400" dirty="0" smtClean="0">
+                <a:solidFill>
+                  <a:srgbClr val="008000"/>
+                </a:solidFill>
+                <a:highlight>
+                  <a:srgbClr val="FFFFFF"/>
+                </a:highlight>
+                <a:latin typeface="Courier New" panose="02070309020205020404" pitchFamily="49" charset="0"/>
+              </a:rPr>
+              <a:t>code, 65 chars</a:t>
+            </a:r>
+            <a:endParaRPr lang="en-US" sz="2400" dirty="0">
+              <a:solidFill>
+                <a:srgbClr val="008000"/>
+              </a:solidFill>
+              <a:highlight>
+                <a:srgbClr val="FFFFFF"/>
+              </a:highlight>
+              <a:latin typeface="Courier New" panose="02070309020205020404" pitchFamily="49" charset="0"/>
+            </a:endParaRPr>
           </a:p>
           <a:p>
             <a:pPr marL="0" indent="0">

</xml_diff>

<commit_message>
Add example of adding numbers in a collection.
</commit_message>
<xml_diff>
--- a/Learning to Love the Lambda in the Stream.pptx
+++ b/Learning to Love the Lambda in the Stream.pptx
@@ -22,6 +22,8 @@
     <p:sldId id="270" r:id="rId16"/>
     <p:sldId id="269" r:id="rId17"/>
     <p:sldId id="271" r:id="rId18"/>
+    <p:sldId id="273" r:id="rId19"/>
+    <p:sldId id="274" r:id="rId20"/>
   </p:sldIdLst>
   <p:sldSz cx="12192000" cy="6858000"/>
   <p:notesSz cx="6858000" cy="9144000"/>
@@ -851,7 +853,7 @@
             <a:fld id="{B61BEF0D-F0BB-DE4B-95CE-6DB70DBA9567}" type="datetimeFigureOut">
               <a:rPr lang="en-US" dirty="0"/>
               <a:pPr/>
-              <a:t>5/7/2017</a:t>
+              <a:t>5/9/2017</a:t>
             </a:fld>
             <a:endParaRPr lang="en-US" dirty="0"/>
           </a:p>
@@ -1099,7 +1101,7 @@
             <a:fld id="{B61BEF0D-F0BB-DE4B-95CE-6DB70DBA9567}" type="datetimeFigureOut">
               <a:rPr lang="en-US" dirty="0"/>
               <a:pPr/>
-              <a:t>5/7/2017</a:t>
+              <a:t>5/9/2017</a:t>
             </a:fld>
             <a:endParaRPr lang="en-US" dirty="0"/>
           </a:p>
@@ -1410,7 +1412,7 @@
             <a:fld id="{B61BEF0D-F0BB-DE4B-95CE-6DB70DBA9567}" type="datetimeFigureOut">
               <a:rPr lang="en-US" dirty="0"/>
               <a:pPr/>
-              <a:t>5/7/2017</a:t>
+              <a:t>5/9/2017</a:t>
             </a:fld>
             <a:endParaRPr lang="en-US" dirty="0"/>
           </a:p>
@@ -1748,7 +1750,7 @@
             <a:fld id="{B61BEF0D-F0BB-DE4B-95CE-6DB70DBA9567}" type="datetimeFigureOut">
               <a:rPr lang="en-US" dirty="0"/>
               <a:pPr/>
-              <a:t>5/7/2017</a:t>
+              <a:t>5/9/2017</a:t>
             </a:fld>
             <a:endParaRPr lang="en-US" dirty="0"/>
           </a:p>
@@ -2059,7 +2061,7 @@
             <a:fld id="{B61BEF0D-F0BB-DE4B-95CE-6DB70DBA9567}" type="datetimeFigureOut">
               <a:rPr lang="en-US" dirty="0"/>
               <a:pPr/>
-              <a:t>5/7/2017</a:t>
+              <a:t>5/9/2017</a:t>
             </a:fld>
             <a:endParaRPr lang="en-US" dirty="0"/>
           </a:p>
@@ -2449,7 +2451,7 @@
             <a:fld id="{B61BEF0D-F0BB-DE4B-95CE-6DB70DBA9567}" type="datetimeFigureOut">
               <a:rPr lang="en-US" dirty="0"/>
               <a:pPr/>
-              <a:t>5/7/2017</a:t>
+              <a:t>5/9/2017</a:t>
             </a:fld>
             <a:endParaRPr lang="en-US" dirty="0"/>
           </a:p>
@@ -2615,7 +2617,7 @@
           <a:p>
             <a:fld id="{55C6B4A9-1611-4792-9094-5F34BCA07E0B}" type="datetimeFigureOut">
               <a:rPr lang="en-US" dirty="0"/>
-              <a:t>5/7/2017</a:t>
+              <a:t>5/9/2017</a:t>
             </a:fld>
             <a:endParaRPr lang="en-US" dirty="0"/>
           </a:p>
@@ -2791,7 +2793,7 @@
             <a:fld id="{B61BEF0D-F0BB-DE4B-95CE-6DB70DBA9567}" type="datetimeFigureOut">
               <a:rPr lang="en-US" dirty="0"/>
               <a:pPr/>
-              <a:t>5/7/2017</a:t>
+              <a:t>5/9/2017</a:t>
             </a:fld>
             <a:endParaRPr lang="en-US" dirty="0"/>
           </a:p>
@@ -2964,7 +2966,7 @@
             <a:fld id="{B61BEF0D-F0BB-DE4B-95CE-6DB70DBA9567}" type="datetimeFigureOut">
               <a:rPr lang="en-US" dirty="0"/>
               <a:pPr/>
-              <a:t>5/7/2017</a:t>
+              <a:t>5/9/2017</a:t>
             </a:fld>
             <a:endParaRPr lang="en-US" dirty="0"/>
           </a:p>
@@ -3208,7 +3210,7 @@
             <a:fld id="{B61BEF0D-F0BB-DE4B-95CE-6DB70DBA9567}" type="datetimeFigureOut">
               <a:rPr lang="en-US" dirty="0"/>
               <a:pPr/>
-              <a:t>5/7/2017</a:t>
+              <a:t>5/9/2017</a:t>
             </a:fld>
             <a:endParaRPr lang="en-US" dirty="0"/>
           </a:p>
@@ -3436,7 +3438,7 @@
           <a:p>
             <a:fld id="{EB712588-04B1-427B-82EE-E8DB90309F08}" type="datetimeFigureOut">
               <a:rPr lang="en-US" dirty="0"/>
-              <a:t>5/7/2017</a:t>
+              <a:t>5/9/2017</a:t>
             </a:fld>
             <a:endParaRPr lang="en-US" dirty="0"/>
           </a:p>
@@ -3806,7 +3808,7 @@
             <a:fld id="{B61BEF0D-F0BB-DE4B-95CE-6DB70DBA9567}" type="datetimeFigureOut">
               <a:rPr lang="en-US" dirty="0"/>
               <a:pPr/>
-              <a:t>5/7/2017</a:t>
+              <a:t>5/9/2017</a:t>
             </a:fld>
             <a:endParaRPr lang="en-US" dirty="0"/>
           </a:p>
@@ -3926,7 +3928,7 @@
             <a:fld id="{B61BEF0D-F0BB-DE4B-95CE-6DB70DBA9567}" type="datetimeFigureOut">
               <a:rPr lang="en-US" dirty="0"/>
               <a:pPr/>
-              <a:t>5/7/2017</a:t>
+              <a:t>5/9/2017</a:t>
             </a:fld>
             <a:endParaRPr lang="en-US" dirty="0"/>
           </a:p>
@@ -4018,7 +4020,7 @@
             <a:fld id="{B61BEF0D-F0BB-DE4B-95CE-6DB70DBA9567}" type="datetimeFigureOut">
               <a:rPr lang="en-US" dirty="0"/>
               <a:pPr/>
-              <a:t>5/7/2017</a:t>
+              <a:t>5/9/2017</a:t>
             </a:fld>
             <a:endParaRPr lang="en-US" dirty="0"/>
           </a:p>
@@ -4269,7 +4271,7 @@
           <a:p>
             <a:fld id="{42A54C80-263E-416B-A8E0-580EDEADCBDC}" type="datetimeFigureOut">
               <a:rPr lang="en-US" dirty="0"/>
-              <a:t>5/7/2017</a:t>
+              <a:t>5/9/2017</a:t>
             </a:fld>
             <a:endParaRPr lang="en-US" dirty="0"/>
           </a:p>
@@ -4528,7 +4530,7 @@
             <a:fld id="{B61BEF0D-F0BB-DE4B-95CE-6DB70DBA9567}" type="datetimeFigureOut">
               <a:rPr lang="en-US" dirty="0"/>
               <a:pPr/>
-              <a:t>5/7/2017</a:t>
+              <a:t>5/9/2017</a:t>
             </a:fld>
             <a:endParaRPr lang="en-US" dirty="0"/>
           </a:p>
@@ -5268,7 +5270,7 @@
             <a:fld id="{B61BEF0D-F0BB-DE4B-95CE-6DB70DBA9567}" type="datetimeFigureOut">
               <a:rPr lang="en-US" dirty="0"/>
               <a:pPr/>
-              <a:t>5/7/2017</a:t>
+              <a:t>5/9/2017</a:t>
             </a:fld>
             <a:endParaRPr lang="en-US" dirty="0"/>
           </a:p>
@@ -6355,19 +6357,7 @@
                 </a:highlight>
                 <a:latin typeface="Courier New" panose="02070309020205020404" pitchFamily="49" charset="0"/>
               </a:rPr>
-              <a:t> </a:t>
-            </a:r>
-            <a:r>
-              <a:rPr lang="en-US" sz="2400" dirty="0" smtClean="0">
-                <a:solidFill>
-                  <a:srgbClr val="000000"/>
-                </a:solidFill>
-                <a:highlight>
-                  <a:srgbClr val="FFFFFF"/>
-                </a:highlight>
-                <a:latin typeface="Courier New" panose="02070309020205020404" pitchFamily="49" charset="0"/>
-              </a:rPr>
-              <a:t>R </a:t>
+              <a:t> R </a:t>
             </a:r>
             <a:r>
               <a:rPr lang="en-US" sz="2400" dirty="0">
@@ -6593,11 +6583,7 @@
           <a:p>
             <a:r>
               <a:rPr lang="en-US" sz="2400" dirty="0" smtClean="0"/>
-              <a:t>Functional </a:t>
-            </a:r>
-            <a:r>
-              <a:rPr lang="en-US" sz="2400" dirty="0" smtClean="0"/>
-              <a:t>Method: </a:t>
+              <a:t>Functional Method: </a:t>
             </a:r>
             <a:r>
               <a:rPr lang="en-US" sz="2400" dirty="0">
@@ -6823,7 +6809,12 @@
             <p:ph idx="1"/>
           </p:nvPr>
         </p:nvSpPr>
-        <p:spPr/>
+        <p:spPr>
+          <a:xfrm>
+            <a:off x="677334" y="1685365"/>
+            <a:ext cx="8596668" cy="4589929"/>
+          </a:xfrm>
+        </p:spPr>
         <p:txBody>
           <a:bodyPr>
             <a:normAutofit/>
@@ -6838,7 +6829,15 @@
           <a:p>
             <a:r>
               <a:rPr lang="en-US" sz="2400" dirty="0" smtClean="0"/>
-              <a:t>Used to compare to objects, and to impose a </a:t>
+              <a:t>Used to </a:t>
+            </a:r>
+            <a:r>
+              <a:rPr lang="en-US" sz="2400" dirty="0" smtClean="0"/>
+              <a:t>compare </a:t>
+            </a:r>
+            <a:r>
+              <a:rPr lang="en-US" sz="2400" dirty="0" smtClean="0"/>
+              <a:t>objects, and to impose a </a:t>
             </a:r>
             <a:r>
               <a:rPr lang="en-US" sz="2400" i="1" dirty="0" smtClean="0"/>
@@ -6957,8 +6956,19 @@
             <a:pPr lvl="1"/>
             <a:r>
               <a:rPr lang="en-US" sz="2200" dirty="0" smtClean="0"/>
-              <a:t>When o1 &gt; o2, returns &gt;= 1</a:t>
-            </a:r>
+              <a:t>When o1 &gt; o2, returns &gt;= </a:t>
+            </a:r>
+            <a:r>
+              <a:rPr lang="en-US" sz="2200" dirty="0" smtClean="0"/>
+              <a:t>1</a:t>
+            </a:r>
+          </a:p>
+          <a:p>
+            <a:r>
+              <a:rPr lang="en-US" sz="2400" dirty="0" smtClean="0"/>
+              <a:t>Even though Comparator has been around since the early days, it is a functional interface because it has a single abstract method.</a:t>
+            </a:r>
+            <a:endParaRPr lang="en-US" sz="2400" dirty="0" smtClean="0"/>
           </a:p>
           <a:p>
             <a:endParaRPr lang="en-US" sz="2400" dirty="0" smtClean="0"/>
@@ -7099,7 +7109,7 @@
           <a:p>
             <a:r>
               <a:rPr lang="en-US" dirty="0" smtClean="0"/>
-              <a:t>Definition</a:t>
+              <a:t>Java Stream Definition</a:t>
             </a:r>
             <a:endParaRPr lang="en-US" dirty="0"/>
           </a:p>
@@ -7170,7 +7180,15 @@
             <a:pPr marL="1200150" lvl="2" indent="-342900"/>
             <a:r>
               <a:rPr lang="en-US" dirty="0" smtClean="0"/>
-              <a:t>Accepts a stream and returns a new stream with the operation appended to it.</a:t>
+              <a:t>Accepts a stream and returns a </a:t>
+            </a:r>
+            <a:r>
+              <a:rPr lang="en-US" dirty="0" smtClean="0"/>
+              <a:t>another stream </a:t>
+            </a:r>
+            <a:r>
+              <a:rPr lang="en-US" dirty="0" smtClean="0"/>
+              <a:t>with the operation appended to it.</a:t>
             </a:r>
           </a:p>
           <a:p>
@@ -7291,6 +7309,1920 @@
           <a:bodyPr/>
           <a:lstStyle/>
           <a:p>
+            <a:r>
+              <a:rPr lang="en-US" dirty="0" smtClean="0"/>
+              <a:t>Add a collection of numbers</a:t>
+            </a:r>
+            <a:endParaRPr lang="en-US" dirty="0"/>
+          </a:p>
+        </p:txBody>
+      </p:sp>
+      <p:sp>
+        <p:nvSpPr>
+          <p:cNvPr id="3" name="Content Placeholder 2"/>
+          <p:cNvSpPr>
+            <a:spLocks noGrp="1"/>
+          </p:cNvSpPr>
+          <p:nvPr>
+            <p:ph idx="1"/>
+          </p:nvPr>
+        </p:nvSpPr>
+        <p:spPr>
+          <a:xfrm>
+            <a:off x="677334" y="1837765"/>
+            <a:ext cx="8596668" cy="4203597"/>
+          </a:xfrm>
+        </p:spPr>
+        <p:txBody>
+          <a:bodyPr>
+            <a:normAutofit/>
+          </a:bodyPr>
+          <a:lstStyle/>
+          <a:p>
+            <a:r>
+              <a:rPr lang="en-US" dirty="0" smtClean="0"/>
+              <a:t>Given </a:t>
+            </a:r>
+            <a:r>
+              <a:rPr lang="en-US" dirty="0">
+                <a:solidFill>
+                  <a:srgbClr val="000000"/>
+                </a:solidFill>
+                <a:highlight>
+                  <a:srgbClr val="FFFFFF"/>
+                </a:highlight>
+                <a:latin typeface="Courier New" panose="02070309020205020404" pitchFamily="49" charset="0"/>
+                <a:cs typeface="Courier New" panose="02070309020205020404" pitchFamily="49" charset="0"/>
+              </a:rPr>
+              <a:t>Collection</a:t>
+            </a:r>
+            <a:r>
+              <a:rPr lang="en-US" b="1" dirty="0">
+                <a:solidFill>
+                  <a:srgbClr val="000080"/>
+                </a:solidFill>
+                <a:highlight>
+                  <a:srgbClr val="FFFFFF"/>
+                </a:highlight>
+                <a:latin typeface="Courier New" panose="02070309020205020404" pitchFamily="49" charset="0"/>
+                <a:cs typeface="Courier New" panose="02070309020205020404" pitchFamily="49" charset="0"/>
+              </a:rPr>
+              <a:t>&lt;</a:t>
+            </a:r>
+            <a:r>
+              <a:rPr lang="en-US" dirty="0">
+                <a:solidFill>
+                  <a:srgbClr val="000000"/>
+                </a:solidFill>
+                <a:highlight>
+                  <a:srgbClr val="FFFFFF"/>
+                </a:highlight>
+                <a:latin typeface="Courier New" panose="02070309020205020404" pitchFamily="49" charset="0"/>
+                <a:cs typeface="Courier New" panose="02070309020205020404" pitchFamily="49" charset="0"/>
+              </a:rPr>
+              <a:t>Integer</a:t>
+            </a:r>
+            <a:r>
+              <a:rPr lang="en-US" b="1" dirty="0">
+                <a:solidFill>
+                  <a:srgbClr val="000080"/>
+                </a:solidFill>
+                <a:highlight>
+                  <a:srgbClr val="FFFFFF"/>
+                </a:highlight>
+                <a:latin typeface="Courier New" panose="02070309020205020404" pitchFamily="49" charset="0"/>
+                <a:cs typeface="Courier New" panose="02070309020205020404" pitchFamily="49" charset="0"/>
+              </a:rPr>
+              <a:t>&gt;</a:t>
+            </a:r>
+            <a:r>
+              <a:rPr lang="en-US" dirty="0">
+                <a:solidFill>
+                  <a:srgbClr val="000000"/>
+                </a:solidFill>
+                <a:highlight>
+                  <a:srgbClr val="FFFFFF"/>
+                </a:highlight>
+                <a:latin typeface="Courier New" panose="02070309020205020404" pitchFamily="49" charset="0"/>
+                <a:cs typeface="Courier New" panose="02070309020205020404" pitchFamily="49" charset="0"/>
+              </a:rPr>
+              <a:t> </a:t>
+            </a:r>
+            <a:r>
+              <a:rPr lang="en-US" dirty="0" smtClean="0">
+                <a:solidFill>
+                  <a:srgbClr val="000000"/>
+                </a:solidFill>
+                <a:highlight>
+                  <a:srgbClr val="FFFFFF"/>
+                </a:highlight>
+                <a:latin typeface="Courier New" panose="02070309020205020404" pitchFamily="49" charset="0"/>
+                <a:cs typeface="Courier New" panose="02070309020205020404" pitchFamily="49" charset="0"/>
+              </a:rPr>
+              <a:t>numbers </a:t>
+            </a:r>
+            <a:r>
+              <a:rPr lang="en-US" dirty="0" smtClean="0"/>
+              <a:t>that has integers from 1 to 10, add the collection.</a:t>
+            </a:r>
+          </a:p>
+          <a:p>
+            <a:r>
+              <a:rPr lang="en-US" dirty="0" smtClean="0"/>
+              <a:t>For Loop</a:t>
+            </a:r>
+          </a:p>
+          <a:p>
+            <a:pPr marL="0" indent="0">
+              <a:buNone/>
+            </a:pPr>
+            <a:r>
+              <a:rPr lang="en-US" sz="1600" dirty="0" err="1">
+                <a:solidFill>
+                  <a:srgbClr val="8000FF"/>
+                </a:solidFill>
+                <a:highlight>
+                  <a:srgbClr val="FFFFFF"/>
+                </a:highlight>
+                <a:latin typeface="Courier New" panose="02070309020205020404" pitchFamily="49" charset="0"/>
+                <a:cs typeface="Courier New" panose="02070309020205020404" pitchFamily="49" charset="0"/>
+              </a:rPr>
+              <a:t>int</a:t>
+            </a:r>
+            <a:r>
+              <a:rPr lang="en-US" sz="1600" dirty="0">
+                <a:solidFill>
+                  <a:srgbClr val="000000"/>
+                </a:solidFill>
+                <a:highlight>
+                  <a:srgbClr val="FFFFFF"/>
+                </a:highlight>
+                <a:latin typeface="Courier New" panose="02070309020205020404" pitchFamily="49" charset="0"/>
+                <a:cs typeface="Courier New" panose="02070309020205020404" pitchFamily="49" charset="0"/>
+              </a:rPr>
+              <a:t> total </a:t>
+            </a:r>
+            <a:r>
+              <a:rPr lang="en-US" sz="1600" b="1" dirty="0">
+                <a:solidFill>
+                  <a:srgbClr val="000080"/>
+                </a:solidFill>
+                <a:highlight>
+                  <a:srgbClr val="FFFFFF"/>
+                </a:highlight>
+                <a:latin typeface="Courier New" panose="02070309020205020404" pitchFamily="49" charset="0"/>
+                <a:cs typeface="Courier New" panose="02070309020205020404" pitchFamily="49" charset="0"/>
+              </a:rPr>
+              <a:t>=</a:t>
+            </a:r>
+            <a:r>
+              <a:rPr lang="en-US" sz="1600" dirty="0">
+                <a:solidFill>
+                  <a:srgbClr val="000000"/>
+                </a:solidFill>
+                <a:highlight>
+                  <a:srgbClr val="FFFFFF"/>
+                </a:highlight>
+                <a:latin typeface="Courier New" panose="02070309020205020404" pitchFamily="49" charset="0"/>
+                <a:cs typeface="Courier New" panose="02070309020205020404" pitchFamily="49" charset="0"/>
+              </a:rPr>
+              <a:t> </a:t>
+            </a:r>
+            <a:r>
+              <a:rPr lang="en-US" sz="1600" dirty="0">
+                <a:solidFill>
+                  <a:srgbClr val="FF8000"/>
+                </a:solidFill>
+                <a:highlight>
+                  <a:srgbClr val="FFFFFF"/>
+                </a:highlight>
+                <a:latin typeface="Courier New" panose="02070309020205020404" pitchFamily="49" charset="0"/>
+                <a:cs typeface="Courier New" panose="02070309020205020404" pitchFamily="49" charset="0"/>
+              </a:rPr>
+              <a:t>0</a:t>
+            </a:r>
+            <a:r>
+              <a:rPr lang="en-US" sz="1600" b="1" dirty="0">
+                <a:solidFill>
+                  <a:srgbClr val="000080"/>
+                </a:solidFill>
+                <a:highlight>
+                  <a:srgbClr val="FFFFFF"/>
+                </a:highlight>
+                <a:latin typeface="Courier New" panose="02070309020205020404" pitchFamily="49" charset="0"/>
+                <a:cs typeface="Courier New" panose="02070309020205020404" pitchFamily="49" charset="0"/>
+              </a:rPr>
+              <a:t>;</a:t>
+            </a:r>
+            <a:endParaRPr lang="en-US" sz="1600" dirty="0">
+              <a:solidFill>
+                <a:srgbClr val="000000"/>
+              </a:solidFill>
+              <a:highlight>
+                <a:srgbClr val="FFFFFF"/>
+              </a:highlight>
+              <a:latin typeface="Courier New" panose="02070309020205020404" pitchFamily="49" charset="0"/>
+              <a:cs typeface="Courier New" panose="02070309020205020404" pitchFamily="49" charset="0"/>
+            </a:endParaRPr>
+          </a:p>
+          <a:p>
+            <a:pPr marL="0" indent="0">
+              <a:buNone/>
+            </a:pPr>
+            <a:r>
+              <a:rPr lang="en-US" sz="1600" b="1" dirty="0">
+                <a:solidFill>
+                  <a:srgbClr val="0000FF"/>
+                </a:solidFill>
+                <a:highlight>
+                  <a:srgbClr val="FFFFFF"/>
+                </a:highlight>
+                <a:latin typeface="Courier New" panose="02070309020205020404" pitchFamily="49" charset="0"/>
+                <a:cs typeface="Courier New" panose="02070309020205020404" pitchFamily="49" charset="0"/>
+              </a:rPr>
+              <a:t>for</a:t>
+            </a:r>
+            <a:r>
+              <a:rPr lang="en-US" sz="1600" b="1" dirty="0">
+                <a:solidFill>
+                  <a:srgbClr val="000080"/>
+                </a:solidFill>
+                <a:highlight>
+                  <a:srgbClr val="FFFFFF"/>
+                </a:highlight>
+                <a:latin typeface="Courier New" panose="02070309020205020404" pitchFamily="49" charset="0"/>
+                <a:cs typeface="Courier New" panose="02070309020205020404" pitchFamily="49" charset="0"/>
+              </a:rPr>
+              <a:t>(</a:t>
+            </a:r>
+            <a:r>
+              <a:rPr lang="en-US" sz="1600" dirty="0">
+                <a:solidFill>
+                  <a:srgbClr val="000000"/>
+                </a:solidFill>
+                <a:highlight>
+                  <a:srgbClr val="FFFFFF"/>
+                </a:highlight>
+                <a:latin typeface="Courier New" panose="02070309020205020404" pitchFamily="49" charset="0"/>
+                <a:cs typeface="Courier New" panose="02070309020205020404" pitchFamily="49" charset="0"/>
+              </a:rPr>
+              <a:t>Integer number </a:t>
+            </a:r>
+            <a:r>
+              <a:rPr lang="en-US" sz="1600" b="1" dirty="0">
+                <a:solidFill>
+                  <a:srgbClr val="000080"/>
+                </a:solidFill>
+                <a:highlight>
+                  <a:srgbClr val="FFFFFF"/>
+                </a:highlight>
+                <a:latin typeface="Courier New" panose="02070309020205020404" pitchFamily="49" charset="0"/>
+                <a:cs typeface="Courier New" panose="02070309020205020404" pitchFamily="49" charset="0"/>
+              </a:rPr>
+              <a:t>:</a:t>
+            </a:r>
+            <a:r>
+              <a:rPr lang="en-US" sz="1600" dirty="0">
+                <a:solidFill>
+                  <a:srgbClr val="000000"/>
+                </a:solidFill>
+                <a:highlight>
+                  <a:srgbClr val="FFFFFF"/>
+                </a:highlight>
+                <a:latin typeface="Courier New" panose="02070309020205020404" pitchFamily="49" charset="0"/>
+                <a:cs typeface="Courier New" panose="02070309020205020404" pitchFamily="49" charset="0"/>
+              </a:rPr>
+              <a:t> numbers</a:t>
+            </a:r>
+            <a:r>
+              <a:rPr lang="en-US" sz="1600" b="1" dirty="0">
+                <a:solidFill>
+                  <a:srgbClr val="000080"/>
+                </a:solidFill>
+                <a:highlight>
+                  <a:srgbClr val="FFFFFF"/>
+                </a:highlight>
+                <a:latin typeface="Courier New" panose="02070309020205020404" pitchFamily="49" charset="0"/>
+                <a:cs typeface="Courier New" panose="02070309020205020404" pitchFamily="49" charset="0"/>
+              </a:rPr>
+              <a:t>)</a:t>
+            </a:r>
+            <a:r>
+              <a:rPr lang="en-US" sz="1600" dirty="0">
+                <a:solidFill>
+                  <a:srgbClr val="000000"/>
+                </a:solidFill>
+                <a:highlight>
+                  <a:srgbClr val="FFFFFF"/>
+                </a:highlight>
+                <a:latin typeface="Courier New" panose="02070309020205020404" pitchFamily="49" charset="0"/>
+                <a:cs typeface="Courier New" panose="02070309020205020404" pitchFamily="49" charset="0"/>
+              </a:rPr>
+              <a:t> </a:t>
+            </a:r>
+            <a:r>
+              <a:rPr lang="en-US" sz="1600" b="1" dirty="0" smtClean="0">
+                <a:solidFill>
+                  <a:srgbClr val="000080"/>
+                </a:solidFill>
+                <a:highlight>
+                  <a:srgbClr val="FFFFFF"/>
+                </a:highlight>
+                <a:latin typeface="Courier New" panose="02070309020205020404" pitchFamily="49" charset="0"/>
+                <a:cs typeface="Courier New" panose="02070309020205020404" pitchFamily="49" charset="0"/>
+              </a:rPr>
+              <a:t>{</a:t>
+            </a:r>
+            <a:r>
+              <a:rPr lang="en-US" sz="1600" dirty="0" smtClean="0">
+                <a:solidFill>
+                  <a:srgbClr val="000000"/>
+                </a:solidFill>
+                <a:highlight>
+                  <a:srgbClr val="FFFFFF"/>
+                </a:highlight>
+                <a:latin typeface="Courier New" panose="02070309020205020404" pitchFamily="49" charset="0"/>
+                <a:cs typeface="Courier New" panose="02070309020205020404" pitchFamily="49" charset="0"/>
+              </a:rPr>
+              <a:t>total </a:t>
+            </a:r>
+            <a:r>
+              <a:rPr lang="en-US" sz="1600" b="1" dirty="0">
+                <a:solidFill>
+                  <a:srgbClr val="000080"/>
+                </a:solidFill>
+                <a:highlight>
+                  <a:srgbClr val="FFFFFF"/>
+                </a:highlight>
+                <a:latin typeface="Courier New" panose="02070309020205020404" pitchFamily="49" charset="0"/>
+                <a:cs typeface="Courier New" panose="02070309020205020404" pitchFamily="49" charset="0"/>
+              </a:rPr>
+              <a:t>+=</a:t>
+            </a:r>
+            <a:r>
+              <a:rPr lang="en-US" sz="1600" dirty="0">
+                <a:solidFill>
+                  <a:srgbClr val="000000"/>
+                </a:solidFill>
+                <a:highlight>
+                  <a:srgbClr val="FFFFFF"/>
+                </a:highlight>
+                <a:latin typeface="Courier New" panose="02070309020205020404" pitchFamily="49" charset="0"/>
+                <a:cs typeface="Courier New" panose="02070309020205020404" pitchFamily="49" charset="0"/>
+              </a:rPr>
+              <a:t> number</a:t>
+            </a:r>
+            <a:r>
+              <a:rPr lang="en-US" sz="1600" b="1" dirty="0" smtClean="0">
+                <a:solidFill>
+                  <a:srgbClr val="000080"/>
+                </a:solidFill>
+                <a:highlight>
+                  <a:srgbClr val="FFFFFF"/>
+                </a:highlight>
+                <a:latin typeface="Courier New" panose="02070309020205020404" pitchFamily="49" charset="0"/>
+                <a:cs typeface="Courier New" panose="02070309020205020404" pitchFamily="49" charset="0"/>
+              </a:rPr>
+              <a:t>;}</a:t>
+            </a:r>
+            <a:endParaRPr lang="en-US" sz="1600" dirty="0">
+              <a:solidFill>
+                <a:srgbClr val="000000"/>
+              </a:solidFill>
+              <a:highlight>
+                <a:srgbClr val="FFFFFF"/>
+              </a:highlight>
+              <a:latin typeface="Courier New" panose="02070309020205020404" pitchFamily="49" charset="0"/>
+              <a:cs typeface="Courier New" panose="02070309020205020404" pitchFamily="49" charset="0"/>
+            </a:endParaRPr>
+          </a:p>
+          <a:p>
+            <a:pPr marL="0" indent="0">
+              <a:buNone/>
+            </a:pPr>
+            <a:r>
+              <a:rPr lang="en-US" sz="1600" b="1" dirty="0">
+                <a:solidFill>
+                  <a:srgbClr val="0000FF"/>
+                </a:solidFill>
+                <a:highlight>
+                  <a:srgbClr val="FFFFFF"/>
+                </a:highlight>
+                <a:latin typeface="Courier New" panose="02070309020205020404" pitchFamily="49" charset="0"/>
+                <a:cs typeface="Courier New" panose="02070309020205020404" pitchFamily="49" charset="0"/>
+              </a:rPr>
+              <a:t>return</a:t>
+            </a:r>
+            <a:r>
+              <a:rPr lang="en-US" sz="1600" dirty="0">
+                <a:solidFill>
+                  <a:srgbClr val="000000"/>
+                </a:solidFill>
+                <a:highlight>
+                  <a:srgbClr val="FFFFFF"/>
+                </a:highlight>
+                <a:latin typeface="Courier New" panose="02070309020205020404" pitchFamily="49" charset="0"/>
+                <a:cs typeface="Courier New" panose="02070309020205020404" pitchFamily="49" charset="0"/>
+              </a:rPr>
+              <a:t> total</a:t>
+            </a:r>
+            <a:r>
+              <a:rPr lang="en-US" sz="1600" b="1" dirty="0">
+                <a:solidFill>
+                  <a:srgbClr val="000080"/>
+                </a:solidFill>
+                <a:highlight>
+                  <a:srgbClr val="FFFFFF"/>
+                </a:highlight>
+                <a:latin typeface="Courier New" panose="02070309020205020404" pitchFamily="49" charset="0"/>
+                <a:cs typeface="Courier New" panose="02070309020205020404" pitchFamily="49" charset="0"/>
+              </a:rPr>
+              <a:t>;</a:t>
+            </a:r>
+            <a:r>
+              <a:rPr lang="en-US" sz="1600" dirty="0">
+                <a:solidFill>
+                  <a:srgbClr val="000000"/>
+                </a:solidFill>
+                <a:highlight>
+                  <a:srgbClr val="FFFFFF"/>
+                </a:highlight>
+                <a:latin typeface="Courier New" panose="02070309020205020404" pitchFamily="49" charset="0"/>
+                <a:cs typeface="Courier New" panose="02070309020205020404" pitchFamily="49" charset="0"/>
+              </a:rPr>
+              <a:t> </a:t>
+            </a:r>
+            <a:r>
+              <a:rPr lang="en-US" sz="1600" dirty="0">
+                <a:solidFill>
+                  <a:srgbClr val="008000"/>
+                </a:solidFill>
+                <a:highlight>
+                  <a:srgbClr val="FFFFFF"/>
+                </a:highlight>
+                <a:latin typeface="Courier New" panose="02070309020205020404" pitchFamily="49" charset="0"/>
+                <a:cs typeface="Courier New" panose="02070309020205020404" pitchFamily="49" charset="0"/>
+              </a:rPr>
+              <a:t>// </a:t>
+            </a:r>
+            <a:r>
+              <a:rPr lang="en-US" sz="1600" dirty="0" smtClean="0">
+                <a:solidFill>
+                  <a:srgbClr val="008000"/>
+                </a:solidFill>
+                <a:highlight>
+                  <a:srgbClr val="FFFFFF"/>
+                </a:highlight>
+                <a:latin typeface="Courier New" panose="02070309020205020404" pitchFamily="49" charset="0"/>
+                <a:cs typeface="Courier New" panose="02070309020205020404" pitchFamily="49" charset="0"/>
+              </a:rPr>
+              <a:t>500500</a:t>
+            </a:r>
+            <a:endParaRPr lang="en-US" sz="1600" dirty="0">
+              <a:solidFill>
+                <a:srgbClr val="008000"/>
+              </a:solidFill>
+              <a:highlight>
+                <a:srgbClr val="FFFFFF"/>
+              </a:highlight>
+              <a:latin typeface="Courier New" panose="02070309020205020404" pitchFamily="49" charset="0"/>
+              <a:cs typeface="Courier New" panose="02070309020205020404" pitchFamily="49" charset="0"/>
+            </a:endParaRPr>
+          </a:p>
+          <a:p>
+            <a:r>
+              <a:rPr lang="en-US" dirty="0" smtClean="0"/>
+              <a:t>Stream reduction</a:t>
+            </a:r>
+          </a:p>
+          <a:p>
+            <a:pPr marL="0" indent="0">
+              <a:buNone/>
+            </a:pPr>
+            <a:r>
+              <a:rPr lang="en-US" sz="1600" b="1" dirty="0">
+                <a:solidFill>
+                  <a:srgbClr val="0000FF"/>
+                </a:solidFill>
+                <a:highlight>
+                  <a:srgbClr val="FFFFFF"/>
+                </a:highlight>
+                <a:latin typeface="Courier New" panose="02070309020205020404" pitchFamily="49" charset="0"/>
+                <a:cs typeface="Courier New" panose="02070309020205020404" pitchFamily="49" charset="0"/>
+              </a:rPr>
+              <a:t>return</a:t>
+            </a:r>
+            <a:r>
+              <a:rPr lang="en-US" sz="1600" dirty="0">
+                <a:solidFill>
+                  <a:srgbClr val="000000"/>
+                </a:solidFill>
+                <a:highlight>
+                  <a:srgbClr val="FFFFFF"/>
+                </a:highlight>
+                <a:latin typeface="Courier New" panose="02070309020205020404" pitchFamily="49" charset="0"/>
+                <a:cs typeface="Courier New" panose="02070309020205020404" pitchFamily="49" charset="0"/>
+              </a:rPr>
+              <a:t> </a:t>
+            </a:r>
+            <a:r>
+              <a:rPr lang="en-US" sz="1600" dirty="0" err="1">
+                <a:solidFill>
+                  <a:srgbClr val="000000"/>
+                </a:solidFill>
+                <a:highlight>
+                  <a:srgbClr val="FFFFFF"/>
+                </a:highlight>
+                <a:latin typeface="Courier New" panose="02070309020205020404" pitchFamily="49" charset="0"/>
+                <a:cs typeface="Courier New" panose="02070309020205020404" pitchFamily="49" charset="0"/>
+              </a:rPr>
+              <a:t>numbers</a:t>
+            </a:r>
+            <a:r>
+              <a:rPr lang="en-US" sz="1600" b="1" dirty="0" err="1">
+                <a:solidFill>
+                  <a:srgbClr val="000080"/>
+                </a:solidFill>
+                <a:highlight>
+                  <a:srgbClr val="FFFFFF"/>
+                </a:highlight>
+                <a:latin typeface="Courier New" panose="02070309020205020404" pitchFamily="49" charset="0"/>
+                <a:cs typeface="Courier New" panose="02070309020205020404" pitchFamily="49" charset="0"/>
+              </a:rPr>
+              <a:t>.</a:t>
+            </a:r>
+            <a:r>
+              <a:rPr lang="en-US" sz="1600" dirty="0" err="1">
+                <a:solidFill>
+                  <a:srgbClr val="000000"/>
+                </a:solidFill>
+                <a:highlight>
+                  <a:srgbClr val="FFFFFF"/>
+                </a:highlight>
+                <a:latin typeface="Courier New" panose="02070309020205020404" pitchFamily="49" charset="0"/>
+                <a:cs typeface="Courier New" panose="02070309020205020404" pitchFamily="49" charset="0"/>
+              </a:rPr>
+              <a:t>stream</a:t>
+            </a:r>
+            <a:r>
+              <a:rPr lang="en-US" sz="1600" b="1" dirty="0" smtClean="0">
+                <a:solidFill>
+                  <a:srgbClr val="000080"/>
+                </a:solidFill>
+                <a:highlight>
+                  <a:srgbClr val="FFFFFF"/>
+                </a:highlight>
+                <a:latin typeface="Courier New" panose="02070309020205020404" pitchFamily="49" charset="0"/>
+                <a:cs typeface="Courier New" panose="02070309020205020404" pitchFamily="49" charset="0"/>
+              </a:rPr>
+              <a:t>().</a:t>
+            </a:r>
+            <a:r>
+              <a:rPr lang="en-US" sz="1600" dirty="0">
+                <a:solidFill>
+                  <a:srgbClr val="000000"/>
+                </a:solidFill>
+                <a:highlight>
+                  <a:srgbClr val="FFFFFF"/>
+                </a:highlight>
+                <a:latin typeface="Courier New" panose="02070309020205020404" pitchFamily="49" charset="0"/>
+                <a:cs typeface="Courier New" panose="02070309020205020404" pitchFamily="49" charset="0"/>
+              </a:rPr>
+              <a:t>reduce</a:t>
+            </a:r>
+            <a:r>
+              <a:rPr lang="en-US" sz="1600" b="1" dirty="0">
+                <a:solidFill>
+                  <a:srgbClr val="000080"/>
+                </a:solidFill>
+                <a:highlight>
+                  <a:srgbClr val="FFFFFF"/>
+                </a:highlight>
+                <a:latin typeface="Courier New" panose="02070309020205020404" pitchFamily="49" charset="0"/>
+                <a:cs typeface="Courier New" panose="02070309020205020404" pitchFamily="49" charset="0"/>
+              </a:rPr>
+              <a:t>(</a:t>
+            </a:r>
+            <a:r>
+              <a:rPr lang="en-US" sz="1600" dirty="0">
+                <a:solidFill>
+                  <a:srgbClr val="FF8000"/>
+                </a:solidFill>
+                <a:highlight>
+                  <a:srgbClr val="FFFFFF"/>
+                </a:highlight>
+                <a:latin typeface="Courier New" panose="02070309020205020404" pitchFamily="49" charset="0"/>
+                <a:cs typeface="Courier New" panose="02070309020205020404" pitchFamily="49" charset="0"/>
+              </a:rPr>
+              <a:t>0</a:t>
+            </a:r>
+            <a:r>
+              <a:rPr lang="en-US" sz="1600" b="1" dirty="0">
+                <a:solidFill>
+                  <a:srgbClr val="000080"/>
+                </a:solidFill>
+                <a:highlight>
+                  <a:srgbClr val="FFFFFF"/>
+                </a:highlight>
+                <a:latin typeface="Courier New" panose="02070309020205020404" pitchFamily="49" charset="0"/>
+                <a:cs typeface="Courier New" panose="02070309020205020404" pitchFamily="49" charset="0"/>
+              </a:rPr>
+              <a:t>,</a:t>
+            </a:r>
+            <a:r>
+              <a:rPr lang="en-US" sz="1600" dirty="0">
+                <a:solidFill>
+                  <a:srgbClr val="000000"/>
+                </a:solidFill>
+                <a:highlight>
+                  <a:srgbClr val="FFFFFF"/>
+                </a:highlight>
+                <a:latin typeface="Courier New" panose="02070309020205020404" pitchFamily="49" charset="0"/>
+                <a:cs typeface="Courier New" panose="02070309020205020404" pitchFamily="49" charset="0"/>
+              </a:rPr>
+              <a:t> </a:t>
+            </a:r>
+            <a:r>
+              <a:rPr lang="en-US" sz="1600" b="1" dirty="0">
+                <a:solidFill>
+                  <a:srgbClr val="000080"/>
+                </a:solidFill>
+                <a:highlight>
+                  <a:srgbClr val="FFFFFF"/>
+                </a:highlight>
+                <a:latin typeface="Courier New" panose="02070309020205020404" pitchFamily="49" charset="0"/>
+                <a:cs typeface="Courier New" panose="02070309020205020404" pitchFamily="49" charset="0"/>
+              </a:rPr>
+              <a:t>(</a:t>
+            </a:r>
+            <a:r>
+              <a:rPr lang="en-US" sz="1600" dirty="0" err="1">
+                <a:solidFill>
+                  <a:srgbClr val="000000"/>
+                </a:solidFill>
+                <a:highlight>
+                  <a:srgbClr val="FFFFFF"/>
+                </a:highlight>
+                <a:latin typeface="Courier New" panose="02070309020205020404" pitchFamily="49" charset="0"/>
+                <a:cs typeface="Courier New" panose="02070309020205020404" pitchFamily="49" charset="0"/>
+              </a:rPr>
+              <a:t>i</a:t>
+            </a:r>
+            <a:r>
+              <a:rPr lang="en-US" sz="1600" b="1" dirty="0" err="1">
+                <a:solidFill>
+                  <a:srgbClr val="000080"/>
+                </a:solidFill>
+                <a:highlight>
+                  <a:srgbClr val="FFFFFF"/>
+                </a:highlight>
+                <a:latin typeface="Courier New" panose="02070309020205020404" pitchFamily="49" charset="0"/>
+                <a:cs typeface="Courier New" panose="02070309020205020404" pitchFamily="49" charset="0"/>
+              </a:rPr>
+              <a:t>,</a:t>
+            </a:r>
+            <a:r>
+              <a:rPr lang="en-US" sz="1600" dirty="0" err="1">
+                <a:solidFill>
+                  <a:srgbClr val="000000"/>
+                </a:solidFill>
+                <a:highlight>
+                  <a:srgbClr val="FFFFFF"/>
+                </a:highlight>
+                <a:latin typeface="Courier New" panose="02070309020205020404" pitchFamily="49" charset="0"/>
+                <a:cs typeface="Courier New" panose="02070309020205020404" pitchFamily="49" charset="0"/>
+              </a:rPr>
+              <a:t>sum</a:t>
+            </a:r>
+            <a:r>
+              <a:rPr lang="en-US" sz="1600" b="1" dirty="0">
+                <a:solidFill>
+                  <a:srgbClr val="000080"/>
+                </a:solidFill>
+                <a:highlight>
+                  <a:srgbClr val="FFFFFF"/>
+                </a:highlight>
+                <a:latin typeface="Courier New" panose="02070309020205020404" pitchFamily="49" charset="0"/>
+                <a:cs typeface="Courier New" panose="02070309020205020404" pitchFamily="49" charset="0"/>
+              </a:rPr>
+              <a:t>)</a:t>
+            </a:r>
+            <a:r>
+              <a:rPr lang="en-US" sz="1600" dirty="0">
+                <a:solidFill>
+                  <a:srgbClr val="000000"/>
+                </a:solidFill>
+                <a:highlight>
+                  <a:srgbClr val="FFFFFF"/>
+                </a:highlight>
+                <a:latin typeface="Courier New" panose="02070309020205020404" pitchFamily="49" charset="0"/>
+                <a:cs typeface="Courier New" panose="02070309020205020404" pitchFamily="49" charset="0"/>
+              </a:rPr>
+              <a:t> </a:t>
+            </a:r>
+            <a:r>
+              <a:rPr lang="en-US" sz="1600" b="1" dirty="0">
+                <a:solidFill>
+                  <a:srgbClr val="000080"/>
+                </a:solidFill>
+                <a:highlight>
+                  <a:srgbClr val="FFFFFF"/>
+                </a:highlight>
+                <a:latin typeface="Courier New" panose="02070309020205020404" pitchFamily="49" charset="0"/>
+                <a:cs typeface="Courier New" panose="02070309020205020404" pitchFamily="49" charset="0"/>
+              </a:rPr>
+              <a:t>-&gt;</a:t>
+            </a:r>
+            <a:r>
+              <a:rPr lang="en-US" sz="1600" dirty="0">
+                <a:solidFill>
+                  <a:srgbClr val="000000"/>
+                </a:solidFill>
+                <a:highlight>
+                  <a:srgbClr val="FFFFFF"/>
+                </a:highlight>
+                <a:latin typeface="Courier New" panose="02070309020205020404" pitchFamily="49" charset="0"/>
+                <a:cs typeface="Courier New" panose="02070309020205020404" pitchFamily="49" charset="0"/>
+              </a:rPr>
+              <a:t> </a:t>
+            </a:r>
+            <a:r>
+              <a:rPr lang="en-US" sz="1600" dirty="0" err="1">
+                <a:solidFill>
+                  <a:srgbClr val="000000"/>
+                </a:solidFill>
+                <a:highlight>
+                  <a:srgbClr val="FFFFFF"/>
+                </a:highlight>
+                <a:latin typeface="Courier New" panose="02070309020205020404" pitchFamily="49" charset="0"/>
+                <a:cs typeface="Courier New" panose="02070309020205020404" pitchFamily="49" charset="0"/>
+              </a:rPr>
+              <a:t>i</a:t>
+            </a:r>
+            <a:r>
+              <a:rPr lang="en-US" sz="1600" b="1" dirty="0" err="1">
+                <a:solidFill>
+                  <a:srgbClr val="000080"/>
+                </a:solidFill>
+                <a:highlight>
+                  <a:srgbClr val="FFFFFF"/>
+                </a:highlight>
+                <a:latin typeface="Courier New" panose="02070309020205020404" pitchFamily="49" charset="0"/>
+                <a:cs typeface="Courier New" panose="02070309020205020404" pitchFamily="49" charset="0"/>
+              </a:rPr>
+              <a:t>+</a:t>
+            </a:r>
+            <a:r>
+              <a:rPr lang="en-US" sz="1600" dirty="0" err="1">
+                <a:solidFill>
+                  <a:srgbClr val="000000"/>
+                </a:solidFill>
+                <a:highlight>
+                  <a:srgbClr val="FFFFFF"/>
+                </a:highlight>
+                <a:latin typeface="Courier New" panose="02070309020205020404" pitchFamily="49" charset="0"/>
+                <a:cs typeface="Courier New" panose="02070309020205020404" pitchFamily="49" charset="0"/>
+              </a:rPr>
+              <a:t>sum</a:t>
+            </a:r>
+            <a:r>
+              <a:rPr lang="en-US" sz="1600" b="1" dirty="0">
+                <a:solidFill>
+                  <a:srgbClr val="000080"/>
+                </a:solidFill>
+                <a:highlight>
+                  <a:srgbClr val="FFFFFF"/>
+                </a:highlight>
+                <a:latin typeface="Courier New" panose="02070309020205020404" pitchFamily="49" charset="0"/>
+                <a:cs typeface="Courier New" panose="02070309020205020404" pitchFamily="49" charset="0"/>
+              </a:rPr>
+              <a:t>);</a:t>
+            </a:r>
+            <a:r>
+              <a:rPr lang="en-US" sz="1600" dirty="0">
+                <a:solidFill>
+                  <a:srgbClr val="000000"/>
+                </a:solidFill>
+                <a:highlight>
+                  <a:srgbClr val="FFFFFF"/>
+                </a:highlight>
+                <a:latin typeface="Courier New" panose="02070309020205020404" pitchFamily="49" charset="0"/>
+                <a:cs typeface="Courier New" panose="02070309020205020404" pitchFamily="49" charset="0"/>
+              </a:rPr>
+              <a:t> </a:t>
+            </a:r>
+            <a:r>
+              <a:rPr lang="en-US" sz="1600" dirty="0">
+                <a:solidFill>
+                  <a:srgbClr val="008000"/>
+                </a:solidFill>
+                <a:highlight>
+                  <a:srgbClr val="FFFFFF"/>
+                </a:highlight>
+                <a:latin typeface="Courier New" panose="02070309020205020404" pitchFamily="49" charset="0"/>
+                <a:cs typeface="Courier New" panose="02070309020205020404" pitchFamily="49" charset="0"/>
+              </a:rPr>
+              <a:t>// 500500</a:t>
+            </a:r>
+          </a:p>
+          <a:p>
+            <a:r>
+              <a:rPr lang="en-US" dirty="0" smtClean="0"/>
+              <a:t>Same Sum using an </a:t>
+            </a:r>
+            <a:r>
+              <a:rPr lang="en-US" dirty="0" err="1" smtClean="0"/>
+              <a:t>IntStream</a:t>
+            </a:r>
+            <a:endParaRPr lang="en-US" dirty="0" smtClean="0"/>
+          </a:p>
+          <a:p>
+            <a:pPr marL="0" indent="0">
+              <a:buNone/>
+            </a:pPr>
+            <a:r>
+              <a:rPr lang="en-US" sz="1600" b="1" dirty="0">
+                <a:solidFill>
+                  <a:srgbClr val="0000FF"/>
+                </a:solidFill>
+                <a:highlight>
+                  <a:srgbClr val="FFFFFF"/>
+                </a:highlight>
+                <a:latin typeface="Courier New" panose="02070309020205020404" pitchFamily="49" charset="0"/>
+                <a:cs typeface="Courier New" panose="02070309020205020404" pitchFamily="49" charset="0"/>
+              </a:rPr>
+              <a:t>return</a:t>
+            </a:r>
+            <a:r>
+              <a:rPr lang="en-US" sz="1600" dirty="0">
+                <a:solidFill>
+                  <a:srgbClr val="000000"/>
+                </a:solidFill>
+                <a:highlight>
+                  <a:srgbClr val="FFFFFF"/>
+                </a:highlight>
+                <a:latin typeface="Courier New" panose="02070309020205020404" pitchFamily="49" charset="0"/>
+                <a:cs typeface="Courier New" panose="02070309020205020404" pitchFamily="49" charset="0"/>
+              </a:rPr>
+              <a:t> </a:t>
+            </a:r>
+            <a:r>
+              <a:rPr lang="en-US" sz="1600" dirty="0" err="1">
+                <a:solidFill>
+                  <a:srgbClr val="000000"/>
+                </a:solidFill>
+                <a:highlight>
+                  <a:srgbClr val="FFFFFF"/>
+                </a:highlight>
+                <a:latin typeface="Courier New" panose="02070309020205020404" pitchFamily="49" charset="0"/>
+                <a:cs typeface="Courier New" panose="02070309020205020404" pitchFamily="49" charset="0"/>
+              </a:rPr>
+              <a:t>IntStream</a:t>
+            </a:r>
+            <a:r>
+              <a:rPr lang="en-US" sz="1600" b="1" dirty="0" err="1">
+                <a:solidFill>
+                  <a:srgbClr val="000080"/>
+                </a:solidFill>
+                <a:highlight>
+                  <a:srgbClr val="FFFFFF"/>
+                </a:highlight>
+                <a:latin typeface="Courier New" panose="02070309020205020404" pitchFamily="49" charset="0"/>
+                <a:cs typeface="Courier New" panose="02070309020205020404" pitchFamily="49" charset="0"/>
+              </a:rPr>
+              <a:t>.</a:t>
+            </a:r>
+            <a:r>
+              <a:rPr lang="en-US" sz="1600" dirty="0" err="1">
+                <a:solidFill>
+                  <a:srgbClr val="000000"/>
+                </a:solidFill>
+                <a:highlight>
+                  <a:srgbClr val="FFFFFF"/>
+                </a:highlight>
+                <a:latin typeface="Courier New" panose="02070309020205020404" pitchFamily="49" charset="0"/>
+                <a:cs typeface="Courier New" panose="02070309020205020404" pitchFamily="49" charset="0"/>
+              </a:rPr>
+              <a:t>rangeClosed</a:t>
+            </a:r>
+            <a:r>
+              <a:rPr lang="en-US" sz="1600" b="1" dirty="0">
+                <a:solidFill>
+                  <a:srgbClr val="000080"/>
+                </a:solidFill>
+                <a:highlight>
+                  <a:srgbClr val="FFFFFF"/>
+                </a:highlight>
+                <a:latin typeface="Courier New" panose="02070309020205020404" pitchFamily="49" charset="0"/>
+                <a:cs typeface="Courier New" panose="02070309020205020404" pitchFamily="49" charset="0"/>
+              </a:rPr>
+              <a:t>(</a:t>
+            </a:r>
+            <a:r>
+              <a:rPr lang="en-US" sz="1600" dirty="0">
+                <a:solidFill>
+                  <a:srgbClr val="FF8000"/>
+                </a:solidFill>
+                <a:highlight>
+                  <a:srgbClr val="FFFFFF"/>
+                </a:highlight>
+                <a:latin typeface="Courier New" panose="02070309020205020404" pitchFamily="49" charset="0"/>
+                <a:cs typeface="Courier New" panose="02070309020205020404" pitchFamily="49" charset="0"/>
+              </a:rPr>
+              <a:t>1</a:t>
+            </a:r>
+            <a:r>
+              <a:rPr lang="en-US" sz="1600" b="1" dirty="0">
+                <a:solidFill>
+                  <a:srgbClr val="000080"/>
+                </a:solidFill>
+                <a:highlight>
+                  <a:srgbClr val="FFFFFF"/>
+                </a:highlight>
+                <a:latin typeface="Courier New" panose="02070309020205020404" pitchFamily="49" charset="0"/>
+                <a:cs typeface="Courier New" panose="02070309020205020404" pitchFamily="49" charset="0"/>
+              </a:rPr>
+              <a:t>,</a:t>
+            </a:r>
+            <a:r>
+              <a:rPr lang="en-US" sz="1600" dirty="0">
+                <a:solidFill>
+                  <a:srgbClr val="000000"/>
+                </a:solidFill>
+                <a:highlight>
+                  <a:srgbClr val="FFFFFF"/>
+                </a:highlight>
+                <a:latin typeface="Courier New" panose="02070309020205020404" pitchFamily="49" charset="0"/>
+                <a:cs typeface="Courier New" panose="02070309020205020404" pitchFamily="49" charset="0"/>
+              </a:rPr>
+              <a:t> </a:t>
+            </a:r>
+            <a:r>
+              <a:rPr lang="en-US" sz="1600" dirty="0">
+                <a:solidFill>
+                  <a:srgbClr val="FF8000"/>
+                </a:solidFill>
+                <a:highlight>
+                  <a:srgbClr val="FFFFFF"/>
+                </a:highlight>
+                <a:latin typeface="Courier New" panose="02070309020205020404" pitchFamily="49" charset="0"/>
+                <a:cs typeface="Courier New" panose="02070309020205020404" pitchFamily="49" charset="0"/>
+              </a:rPr>
+              <a:t>1000</a:t>
+            </a:r>
+            <a:r>
+              <a:rPr lang="en-US" sz="1600" b="1" dirty="0">
+                <a:solidFill>
+                  <a:srgbClr val="000080"/>
+                </a:solidFill>
+                <a:highlight>
+                  <a:srgbClr val="FFFFFF"/>
+                </a:highlight>
+                <a:latin typeface="Courier New" panose="02070309020205020404" pitchFamily="49" charset="0"/>
+                <a:cs typeface="Courier New" panose="02070309020205020404" pitchFamily="49" charset="0"/>
+              </a:rPr>
+              <a:t>).</a:t>
+            </a:r>
+            <a:r>
+              <a:rPr lang="en-US" sz="1600" dirty="0">
+                <a:solidFill>
+                  <a:srgbClr val="000000"/>
+                </a:solidFill>
+                <a:highlight>
+                  <a:srgbClr val="FFFFFF"/>
+                </a:highlight>
+                <a:latin typeface="Courier New" panose="02070309020205020404" pitchFamily="49" charset="0"/>
+                <a:cs typeface="Courier New" panose="02070309020205020404" pitchFamily="49" charset="0"/>
+              </a:rPr>
+              <a:t>sum</a:t>
+            </a:r>
+            <a:r>
+              <a:rPr lang="en-US" sz="1600" b="1" dirty="0">
+                <a:solidFill>
+                  <a:srgbClr val="000080"/>
+                </a:solidFill>
+                <a:highlight>
+                  <a:srgbClr val="FFFFFF"/>
+                </a:highlight>
+                <a:latin typeface="Courier New" panose="02070309020205020404" pitchFamily="49" charset="0"/>
+                <a:cs typeface="Courier New" panose="02070309020205020404" pitchFamily="49" charset="0"/>
+              </a:rPr>
+              <a:t>();</a:t>
+            </a:r>
+            <a:r>
+              <a:rPr lang="en-US" sz="1600" dirty="0">
+                <a:solidFill>
+                  <a:srgbClr val="000000"/>
+                </a:solidFill>
+                <a:highlight>
+                  <a:srgbClr val="FFFFFF"/>
+                </a:highlight>
+                <a:latin typeface="Courier New" panose="02070309020205020404" pitchFamily="49" charset="0"/>
+                <a:cs typeface="Courier New" panose="02070309020205020404" pitchFamily="49" charset="0"/>
+              </a:rPr>
+              <a:t> </a:t>
+            </a:r>
+            <a:r>
+              <a:rPr lang="en-US" sz="1600" dirty="0">
+                <a:solidFill>
+                  <a:srgbClr val="008000"/>
+                </a:solidFill>
+                <a:highlight>
+                  <a:srgbClr val="FFFFFF"/>
+                </a:highlight>
+                <a:latin typeface="Courier New" panose="02070309020205020404" pitchFamily="49" charset="0"/>
+                <a:cs typeface="Courier New" panose="02070309020205020404" pitchFamily="49" charset="0"/>
+              </a:rPr>
+              <a:t>// 500500</a:t>
+            </a:r>
+          </a:p>
+          <a:p>
+            <a:endParaRPr lang="en-US" sz="1600" dirty="0">
+              <a:latin typeface="Courier New" panose="02070309020205020404" pitchFamily="49" charset="0"/>
+              <a:cs typeface="Courier New" panose="02070309020205020404" pitchFamily="49" charset="0"/>
+            </a:endParaRPr>
+          </a:p>
+        </p:txBody>
+      </p:sp>
+    </p:spTree>
+    <p:extLst>
+      <p:ext uri="{BB962C8B-B14F-4D97-AF65-F5344CB8AC3E}">
+        <p14:creationId xmlns:p14="http://schemas.microsoft.com/office/powerpoint/2010/main" val="3326645903"/>
+      </p:ext>
+    </p:extLst>
+  </p:cSld>
+  <p:clrMapOvr>
+    <a:masterClrMapping/>
+  </p:clrMapOvr>
+</p:sld>
+</file>
+
+<file path=ppt/slides/slide18.xml><?xml version="1.0" encoding="utf-8"?>
+<p:sld xmlns:a="http://schemas.openxmlformats.org/drawingml/2006/main" xmlns:r="http://schemas.openxmlformats.org/officeDocument/2006/relationships" xmlns:p="http://schemas.openxmlformats.org/presentationml/2006/main">
+  <p:cSld>
+    <p:spTree>
+      <p:nvGrpSpPr>
+        <p:cNvPr id="1" name=""/>
+        <p:cNvGrpSpPr/>
+        <p:nvPr/>
+      </p:nvGrpSpPr>
+      <p:grpSpPr>
+        <a:xfrm>
+          <a:off x="0" y="0"/>
+          <a:ext cx="0" cy="0"/>
+          <a:chOff x="0" y="0"/>
+          <a:chExt cx="0" cy="0"/>
+        </a:xfrm>
+      </p:grpSpPr>
+      <p:sp>
+        <p:nvSpPr>
+          <p:cNvPr id="2" name="Title 1"/>
+          <p:cNvSpPr>
+            <a:spLocks noGrp="1"/>
+          </p:cNvSpPr>
+          <p:nvPr>
+            <p:ph type="title"/>
+          </p:nvPr>
+        </p:nvSpPr>
+        <p:spPr>
+          <a:xfrm>
+            <a:off x="677334" y="497541"/>
+            <a:ext cx="8596668" cy="811306"/>
+          </a:xfrm>
+        </p:spPr>
+        <p:txBody>
+          <a:bodyPr/>
+          <a:lstStyle/>
+          <a:p>
+            <a:r>
+              <a:rPr lang="en-US" dirty="0" smtClean="0"/>
+              <a:t>Breaking Down the Stream</a:t>
+            </a:r>
+            <a:endParaRPr lang="en-US" dirty="0"/>
+          </a:p>
+        </p:txBody>
+      </p:sp>
+      <p:sp>
+        <p:nvSpPr>
+          <p:cNvPr id="3" name="Content Placeholder 2"/>
+          <p:cNvSpPr>
+            <a:spLocks noGrp="1"/>
+          </p:cNvSpPr>
+          <p:nvPr>
+            <p:ph idx="1"/>
+          </p:nvPr>
+        </p:nvSpPr>
+        <p:spPr>
+          <a:xfrm>
+            <a:off x="381499" y="1308847"/>
+            <a:ext cx="8596668" cy="5204011"/>
+          </a:xfrm>
+        </p:spPr>
+        <p:txBody>
+          <a:bodyPr>
+            <a:normAutofit/>
+          </a:bodyPr>
+          <a:lstStyle/>
+          <a:p>
+            <a:pPr marL="0" indent="0">
+              <a:buNone/>
+            </a:pPr>
+            <a:r>
+              <a:rPr lang="en-US" dirty="0">
+                <a:solidFill>
+                  <a:srgbClr val="000000"/>
+                </a:solidFill>
+                <a:highlight>
+                  <a:srgbClr val="FFFFFF"/>
+                </a:highlight>
+                <a:latin typeface="Courier New" panose="02070309020205020404" pitchFamily="49" charset="0"/>
+                <a:cs typeface="Courier New" panose="02070309020205020404" pitchFamily="49" charset="0"/>
+              </a:rPr>
+              <a:t>stream</a:t>
+            </a:r>
+            <a:r>
+              <a:rPr lang="en-US" b="1" dirty="0">
+                <a:solidFill>
+                  <a:srgbClr val="000080"/>
+                </a:solidFill>
+                <a:highlight>
+                  <a:srgbClr val="FFFFFF"/>
+                </a:highlight>
+                <a:latin typeface="Courier New" panose="02070309020205020404" pitchFamily="49" charset="0"/>
+                <a:cs typeface="Courier New" panose="02070309020205020404" pitchFamily="49" charset="0"/>
+              </a:rPr>
+              <a:t>(</a:t>
+            </a:r>
+            <a:r>
+              <a:rPr lang="en-US" dirty="0">
+                <a:solidFill>
+                  <a:srgbClr val="000000"/>
+                </a:solidFill>
+                <a:highlight>
+                  <a:srgbClr val="FFFFFF"/>
+                </a:highlight>
+                <a:latin typeface="Courier New" panose="02070309020205020404" pitchFamily="49" charset="0"/>
+                <a:cs typeface="Courier New" panose="02070309020205020404" pitchFamily="49" charset="0"/>
+              </a:rPr>
+              <a:t>Collection</a:t>
+            </a:r>
+            <a:r>
+              <a:rPr lang="en-US" b="1" dirty="0">
+                <a:solidFill>
+                  <a:srgbClr val="000080"/>
+                </a:solidFill>
+                <a:highlight>
+                  <a:srgbClr val="FFFFFF"/>
+                </a:highlight>
+                <a:latin typeface="Courier New" panose="02070309020205020404" pitchFamily="49" charset="0"/>
+                <a:cs typeface="Courier New" panose="02070309020205020404" pitchFamily="49" charset="0"/>
+              </a:rPr>
+              <a:t>&lt;</a:t>
+            </a:r>
+            <a:r>
+              <a:rPr lang="en-US" dirty="0">
+                <a:solidFill>
+                  <a:srgbClr val="000000"/>
+                </a:solidFill>
+                <a:highlight>
+                  <a:srgbClr val="FFFFFF"/>
+                </a:highlight>
+                <a:latin typeface="Courier New" panose="02070309020205020404" pitchFamily="49" charset="0"/>
+                <a:cs typeface="Courier New" panose="02070309020205020404" pitchFamily="49" charset="0"/>
+              </a:rPr>
+              <a:t>Integer</a:t>
+            </a:r>
+            <a:r>
+              <a:rPr lang="en-US" b="1" dirty="0">
+                <a:solidFill>
+                  <a:srgbClr val="000080"/>
+                </a:solidFill>
+                <a:highlight>
+                  <a:srgbClr val="FFFFFF"/>
+                </a:highlight>
+                <a:latin typeface="Courier New" panose="02070309020205020404" pitchFamily="49" charset="0"/>
+                <a:cs typeface="Courier New" panose="02070309020205020404" pitchFamily="49" charset="0"/>
+              </a:rPr>
+              <a:t>&gt;</a:t>
+            </a:r>
+            <a:r>
+              <a:rPr lang="en-US" dirty="0">
+                <a:solidFill>
+                  <a:srgbClr val="000000"/>
+                </a:solidFill>
+                <a:highlight>
+                  <a:srgbClr val="FFFFFF"/>
+                </a:highlight>
+                <a:latin typeface="Courier New" panose="02070309020205020404" pitchFamily="49" charset="0"/>
+                <a:cs typeface="Courier New" panose="02070309020205020404" pitchFamily="49" charset="0"/>
+              </a:rPr>
+              <a:t> numbers</a:t>
+            </a:r>
+            <a:r>
+              <a:rPr lang="en-US" b="1" dirty="0">
+                <a:solidFill>
+                  <a:srgbClr val="000080"/>
+                </a:solidFill>
+                <a:highlight>
+                  <a:srgbClr val="FFFFFF"/>
+                </a:highlight>
+                <a:latin typeface="Courier New" panose="02070309020205020404" pitchFamily="49" charset="0"/>
+                <a:cs typeface="Courier New" panose="02070309020205020404" pitchFamily="49" charset="0"/>
+              </a:rPr>
+              <a:t>)</a:t>
+            </a:r>
+            <a:r>
+              <a:rPr lang="en-US" dirty="0">
+                <a:solidFill>
+                  <a:srgbClr val="000000"/>
+                </a:solidFill>
+                <a:highlight>
+                  <a:srgbClr val="FFFFFF"/>
+                </a:highlight>
+                <a:latin typeface="Courier New" panose="02070309020205020404" pitchFamily="49" charset="0"/>
+                <a:cs typeface="Courier New" panose="02070309020205020404" pitchFamily="49" charset="0"/>
+              </a:rPr>
+              <a:t> </a:t>
+            </a:r>
+            <a:r>
+              <a:rPr lang="en-US" b="1" dirty="0">
+                <a:solidFill>
+                  <a:srgbClr val="000080"/>
+                </a:solidFill>
+                <a:highlight>
+                  <a:srgbClr val="FFFFFF"/>
+                </a:highlight>
+                <a:latin typeface="Courier New" panose="02070309020205020404" pitchFamily="49" charset="0"/>
+                <a:cs typeface="Courier New" panose="02070309020205020404" pitchFamily="49" charset="0"/>
+              </a:rPr>
+              <a:t>{</a:t>
+            </a:r>
+            <a:endParaRPr lang="en-US" dirty="0">
+              <a:solidFill>
+                <a:srgbClr val="000000"/>
+              </a:solidFill>
+              <a:highlight>
+                <a:srgbClr val="FFFFFF"/>
+              </a:highlight>
+              <a:latin typeface="Courier New" panose="02070309020205020404" pitchFamily="49" charset="0"/>
+              <a:cs typeface="Courier New" panose="02070309020205020404" pitchFamily="49" charset="0"/>
+            </a:endParaRPr>
+          </a:p>
+          <a:p>
+            <a:pPr marL="0" indent="0">
+              <a:buNone/>
+            </a:pPr>
+            <a:r>
+              <a:rPr lang="en-US" dirty="0">
+                <a:solidFill>
+                  <a:srgbClr val="000000"/>
+                </a:solidFill>
+                <a:highlight>
+                  <a:srgbClr val="FFFFFF"/>
+                </a:highlight>
+                <a:latin typeface="Courier New" panose="02070309020205020404" pitchFamily="49" charset="0"/>
+                <a:cs typeface="Courier New" panose="02070309020205020404" pitchFamily="49" charset="0"/>
+              </a:rPr>
+              <a:t>	</a:t>
+            </a:r>
+            <a:r>
+              <a:rPr lang="en-US" b="1" dirty="0">
+                <a:solidFill>
+                  <a:srgbClr val="0000FF"/>
+                </a:solidFill>
+                <a:highlight>
+                  <a:srgbClr val="FFFFFF"/>
+                </a:highlight>
+                <a:latin typeface="Courier New" panose="02070309020205020404" pitchFamily="49" charset="0"/>
+                <a:cs typeface="Courier New" panose="02070309020205020404" pitchFamily="49" charset="0"/>
+              </a:rPr>
+              <a:t>return</a:t>
+            </a:r>
+            <a:r>
+              <a:rPr lang="en-US" dirty="0">
+                <a:solidFill>
+                  <a:srgbClr val="000000"/>
+                </a:solidFill>
+                <a:highlight>
+                  <a:srgbClr val="FFFFFF"/>
+                </a:highlight>
+                <a:latin typeface="Courier New" panose="02070309020205020404" pitchFamily="49" charset="0"/>
+                <a:cs typeface="Courier New" panose="02070309020205020404" pitchFamily="49" charset="0"/>
+              </a:rPr>
+              <a:t> </a:t>
+            </a:r>
+            <a:r>
+              <a:rPr lang="en-US" dirty="0" err="1">
+                <a:solidFill>
+                  <a:srgbClr val="000000"/>
+                </a:solidFill>
+                <a:highlight>
+                  <a:srgbClr val="FFFFFF"/>
+                </a:highlight>
+                <a:latin typeface="Courier New" panose="02070309020205020404" pitchFamily="49" charset="0"/>
+                <a:cs typeface="Courier New" panose="02070309020205020404" pitchFamily="49" charset="0"/>
+              </a:rPr>
+              <a:t>numbers</a:t>
+            </a:r>
+            <a:r>
+              <a:rPr lang="en-US" b="1" dirty="0" err="1">
+                <a:solidFill>
+                  <a:srgbClr val="000080"/>
+                </a:solidFill>
+                <a:highlight>
+                  <a:srgbClr val="FFFFFF"/>
+                </a:highlight>
+                <a:latin typeface="Courier New" panose="02070309020205020404" pitchFamily="49" charset="0"/>
+                <a:cs typeface="Courier New" panose="02070309020205020404" pitchFamily="49" charset="0"/>
+              </a:rPr>
+              <a:t>.</a:t>
+            </a:r>
+            <a:r>
+              <a:rPr lang="en-US" dirty="0" err="1">
+                <a:solidFill>
+                  <a:srgbClr val="000000"/>
+                </a:solidFill>
+                <a:highlight>
+                  <a:srgbClr val="FFFFFF"/>
+                </a:highlight>
+                <a:latin typeface="Courier New" panose="02070309020205020404" pitchFamily="49" charset="0"/>
+                <a:cs typeface="Courier New" panose="02070309020205020404" pitchFamily="49" charset="0"/>
+              </a:rPr>
+              <a:t>stream</a:t>
+            </a:r>
+            <a:r>
+              <a:rPr lang="en-US" b="1" dirty="0">
+                <a:solidFill>
+                  <a:srgbClr val="000080"/>
+                </a:solidFill>
+                <a:highlight>
+                  <a:srgbClr val="FFFFFF"/>
+                </a:highlight>
+                <a:latin typeface="Courier New" panose="02070309020205020404" pitchFamily="49" charset="0"/>
+                <a:cs typeface="Courier New" panose="02070309020205020404" pitchFamily="49" charset="0"/>
+              </a:rPr>
+              <a:t>()</a:t>
+            </a:r>
+            <a:r>
+              <a:rPr lang="en-US" dirty="0">
+                <a:solidFill>
+                  <a:srgbClr val="000000"/>
+                </a:solidFill>
+                <a:highlight>
+                  <a:srgbClr val="FFFFFF"/>
+                </a:highlight>
+                <a:latin typeface="Courier New" panose="02070309020205020404" pitchFamily="49" charset="0"/>
+                <a:cs typeface="Courier New" panose="02070309020205020404" pitchFamily="49" charset="0"/>
+              </a:rPr>
+              <a:t> </a:t>
+            </a:r>
+            <a:r>
+              <a:rPr lang="en-US" dirty="0">
+                <a:solidFill>
+                  <a:srgbClr val="008000"/>
+                </a:solidFill>
+                <a:highlight>
+                  <a:srgbClr val="FFFFFF"/>
+                </a:highlight>
+                <a:latin typeface="Courier New" panose="02070309020205020404" pitchFamily="49" charset="0"/>
+                <a:cs typeface="Courier New" panose="02070309020205020404" pitchFamily="49" charset="0"/>
+              </a:rPr>
+              <a:t>// Data Source</a:t>
+            </a:r>
+          </a:p>
+          <a:p>
+            <a:pPr marL="0" indent="0">
+              <a:buNone/>
+            </a:pPr>
+            <a:r>
+              <a:rPr lang="en-US" dirty="0">
+                <a:solidFill>
+                  <a:srgbClr val="000000"/>
+                </a:solidFill>
+                <a:highlight>
+                  <a:srgbClr val="FFFFFF"/>
+                </a:highlight>
+                <a:latin typeface="Courier New" panose="02070309020205020404" pitchFamily="49" charset="0"/>
+                <a:cs typeface="Courier New" panose="02070309020205020404" pitchFamily="49" charset="0"/>
+              </a:rPr>
+              <a:t>		</a:t>
+            </a:r>
+            <a:r>
+              <a:rPr lang="en-US" b="1" dirty="0">
+                <a:solidFill>
+                  <a:srgbClr val="000080"/>
+                </a:solidFill>
+                <a:highlight>
+                  <a:srgbClr val="FFFFFF"/>
+                </a:highlight>
+                <a:latin typeface="Courier New" panose="02070309020205020404" pitchFamily="49" charset="0"/>
+                <a:cs typeface="Courier New" panose="02070309020205020404" pitchFamily="49" charset="0"/>
+              </a:rPr>
+              <a:t>.</a:t>
+            </a:r>
+            <a:r>
+              <a:rPr lang="en-US" dirty="0">
+                <a:solidFill>
+                  <a:srgbClr val="000000"/>
+                </a:solidFill>
+                <a:highlight>
+                  <a:srgbClr val="FFFFFF"/>
+                </a:highlight>
+                <a:latin typeface="Courier New" panose="02070309020205020404" pitchFamily="49" charset="0"/>
+                <a:cs typeface="Courier New" panose="02070309020205020404" pitchFamily="49" charset="0"/>
+              </a:rPr>
+              <a:t>reduce</a:t>
+            </a:r>
+            <a:r>
+              <a:rPr lang="en-US" b="1" dirty="0">
+                <a:solidFill>
+                  <a:srgbClr val="000080"/>
+                </a:solidFill>
+                <a:highlight>
+                  <a:srgbClr val="FFFFFF"/>
+                </a:highlight>
+                <a:latin typeface="Courier New" panose="02070309020205020404" pitchFamily="49" charset="0"/>
+                <a:cs typeface="Courier New" panose="02070309020205020404" pitchFamily="49" charset="0"/>
+              </a:rPr>
+              <a:t>(</a:t>
+            </a:r>
+            <a:r>
+              <a:rPr lang="en-US" dirty="0">
+                <a:solidFill>
+                  <a:srgbClr val="FF8000"/>
+                </a:solidFill>
+                <a:highlight>
+                  <a:srgbClr val="FFFFFF"/>
+                </a:highlight>
+                <a:latin typeface="Courier New" panose="02070309020205020404" pitchFamily="49" charset="0"/>
+                <a:cs typeface="Courier New" panose="02070309020205020404" pitchFamily="49" charset="0"/>
+              </a:rPr>
+              <a:t>0</a:t>
+            </a:r>
+            <a:r>
+              <a:rPr lang="en-US" b="1" dirty="0">
+                <a:solidFill>
+                  <a:srgbClr val="000080"/>
+                </a:solidFill>
+                <a:highlight>
+                  <a:srgbClr val="FFFFFF"/>
+                </a:highlight>
+                <a:latin typeface="Courier New" panose="02070309020205020404" pitchFamily="49" charset="0"/>
+                <a:cs typeface="Courier New" panose="02070309020205020404" pitchFamily="49" charset="0"/>
+              </a:rPr>
+              <a:t>,</a:t>
+            </a:r>
+            <a:r>
+              <a:rPr lang="en-US" dirty="0">
+                <a:solidFill>
+                  <a:srgbClr val="000000"/>
+                </a:solidFill>
+                <a:highlight>
+                  <a:srgbClr val="FFFFFF"/>
+                </a:highlight>
+                <a:latin typeface="Courier New" panose="02070309020205020404" pitchFamily="49" charset="0"/>
+                <a:cs typeface="Courier New" panose="02070309020205020404" pitchFamily="49" charset="0"/>
+              </a:rPr>
+              <a:t> </a:t>
+            </a:r>
+            <a:r>
+              <a:rPr lang="en-US" b="1" dirty="0">
+                <a:solidFill>
+                  <a:srgbClr val="000080"/>
+                </a:solidFill>
+                <a:highlight>
+                  <a:srgbClr val="FFFFFF"/>
+                </a:highlight>
+                <a:latin typeface="Courier New" panose="02070309020205020404" pitchFamily="49" charset="0"/>
+                <a:cs typeface="Courier New" panose="02070309020205020404" pitchFamily="49" charset="0"/>
+              </a:rPr>
+              <a:t>(</a:t>
+            </a:r>
+            <a:r>
+              <a:rPr lang="en-US" dirty="0" err="1">
+                <a:solidFill>
+                  <a:srgbClr val="000000"/>
+                </a:solidFill>
+                <a:highlight>
+                  <a:srgbClr val="FFFFFF"/>
+                </a:highlight>
+                <a:latin typeface="Courier New" panose="02070309020205020404" pitchFamily="49" charset="0"/>
+                <a:cs typeface="Courier New" panose="02070309020205020404" pitchFamily="49" charset="0"/>
+              </a:rPr>
+              <a:t>i</a:t>
+            </a:r>
+            <a:r>
+              <a:rPr lang="en-US" b="1" dirty="0" err="1">
+                <a:solidFill>
+                  <a:srgbClr val="000080"/>
+                </a:solidFill>
+                <a:highlight>
+                  <a:srgbClr val="FFFFFF"/>
+                </a:highlight>
+                <a:latin typeface="Courier New" panose="02070309020205020404" pitchFamily="49" charset="0"/>
+                <a:cs typeface="Courier New" panose="02070309020205020404" pitchFamily="49" charset="0"/>
+              </a:rPr>
+              <a:t>,</a:t>
+            </a:r>
+            <a:r>
+              <a:rPr lang="en-US" dirty="0" err="1">
+                <a:solidFill>
+                  <a:srgbClr val="000000"/>
+                </a:solidFill>
+                <a:highlight>
+                  <a:srgbClr val="FFFFFF"/>
+                </a:highlight>
+                <a:latin typeface="Courier New" panose="02070309020205020404" pitchFamily="49" charset="0"/>
+                <a:cs typeface="Courier New" panose="02070309020205020404" pitchFamily="49" charset="0"/>
+              </a:rPr>
+              <a:t>sum</a:t>
+            </a:r>
+            <a:r>
+              <a:rPr lang="en-US" b="1" dirty="0">
+                <a:solidFill>
+                  <a:srgbClr val="000080"/>
+                </a:solidFill>
+                <a:highlight>
+                  <a:srgbClr val="FFFFFF"/>
+                </a:highlight>
+                <a:latin typeface="Courier New" panose="02070309020205020404" pitchFamily="49" charset="0"/>
+                <a:cs typeface="Courier New" panose="02070309020205020404" pitchFamily="49" charset="0"/>
+              </a:rPr>
+              <a:t>)</a:t>
+            </a:r>
+            <a:r>
+              <a:rPr lang="en-US" dirty="0">
+                <a:solidFill>
+                  <a:srgbClr val="000000"/>
+                </a:solidFill>
+                <a:highlight>
+                  <a:srgbClr val="FFFFFF"/>
+                </a:highlight>
+                <a:latin typeface="Courier New" panose="02070309020205020404" pitchFamily="49" charset="0"/>
+                <a:cs typeface="Courier New" panose="02070309020205020404" pitchFamily="49" charset="0"/>
+              </a:rPr>
+              <a:t> </a:t>
+            </a:r>
+            <a:r>
+              <a:rPr lang="en-US" b="1" dirty="0">
+                <a:solidFill>
+                  <a:srgbClr val="000080"/>
+                </a:solidFill>
+                <a:highlight>
+                  <a:srgbClr val="FFFFFF"/>
+                </a:highlight>
+                <a:latin typeface="Courier New" panose="02070309020205020404" pitchFamily="49" charset="0"/>
+                <a:cs typeface="Courier New" panose="02070309020205020404" pitchFamily="49" charset="0"/>
+              </a:rPr>
+              <a:t>-&gt;</a:t>
+            </a:r>
+            <a:r>
+              <a:rPr lang="en-US" dirty="0">
+                <a:solidFill>
+                  <a:srgbClr val="000000"/>
+                </a:solidFill>
+                <a:highlight>
+                  <a:srgbClr val="FFFFFF"/>
+                </a:highlight>
+                <a:latin typeface="Courier New" panose="02070309020205020404" pitchFamily="49" charset="0"/>
+                <a:cs typeface="Courier New" panose="02070309020205020404" pitchFamily="49" charset="0"/>
+              </a:rPr>
+              <a:t> </a:t>
+            </a:r>
+            <a:r>
+              <a:rPr lang="en-US" dirty="0" err="1">
+                <a:solidFill>
+                  <a:srgbClr val="000000"/>
+                </a:solidFill>
+                <a:highlight>
+                  <a:srgbClr val="FFFFFF"/>
+                </a:highlight>
+                <a:latin typeface="Courier New" panose="02070309020205020404" pitchFamily="49" charset="0"/>
+                <a:cs typeface="Courier New" panose="02070309020205020404" pitchFamily="49" charset="0"/>
+              </a:rPr>
+              <a:t>i</a:t>
+            </a:r>
+            <a:r>
+              <a:rPr lang="en-US" b="1" dirty="0" err="1">
+                <a:solidFill>
+                  <a:srgbClr val="000080"/>
+                </a:solidFill>
+                <a:highlight>
+                  <a:srgbClr val="FFFFFF"/>
+                </a:highlight>
+                <a:latin typeface="Courier New" panose="02070309020205020404" pitchFamily="49" charset="0"/>
+                <a:cs typeface="Courier New" panose="02070309020205020404" pitchFamily="49" charset="0"/>
+              </a:rPr>
+              <a:t>+</a:t>
+            </a:r>
+            <a:r>
+              <a:rPr lang="en-US" dirty="0" err="1">
+                <a:solidFill>
+                  <a:srgbClr val="000000"/>
+                </a:solidFill>
+                <a:highlight>
+                  <a:srgbClr val="FFFFFF"/>
+                </a:highlight>
+                <a:latin typeface="Courier New" panose="02070309020205020404" pitchFamily="49" charset="0"/>
+                <a:cs typeface="Courier New" panose="02070309020205020404" pitchFamily="49" charset="0"/>
+              </a:rPr>
+              <a:t>sum</a:t>
+            </a:r>
+            <a:r>
+              <a:rPr lang="en-US" b="1" dirty="0">
+                <a:solidFill>
+                  <a:srgbClr val="000080"/>
+                </a:solidFill>
+                <a:highlight>
+                  <a:srgbClr val="FFFFFF"/>
+                </a:highlight>
+                <a:latin typeface="Courier New" panose="02070309020205020404" pitchFamily="49" charset="0"/>
+                <a:cs typeface="Courier New" panose="02070309020205020404" pitchFamily="49" charset="0"/>
+              </a:rPr>
+              <a:t>);</a:t>
+            </a:r>
+            <a:r>
+              <a:rPr lang="en-US" dirty="0">
+                <a:solidFill>
+                  <a:srgbClr val="000000"/>
+                </a:solidFill>
+                <a:highlight>
+                  <a:srgbClr val="FFFFFF"/>
+                </a:highlight>
+                <a:latin typeface="Courier New" panose="02070309020205020404" pitchFamily="49" charset="0"/>
+                <a:cs typeface="Courier New" panose="02070309020205020404" pitchFamily="49" charset="0"/>
+              </a:rPr>
+              <a:t> </a:t>
+            </a:r>
+            <a:r>
+              <a:rPr lang="en-US" dirty="0">
+                <a:solidFill>
+                  <a:srgbClr val="008000"/>
+                </a:solidFill>
+                <a:highlight>
+                  <a:srgbClr val="FFFFFF"/>
+                </a:highlight>
+                <a:latin typeface="Courier New" panose="02070309020205020404" pitchFamily="49" charset="0"/>
+                <a:cs typeface="Courier New" panose="02070309020205020404" pitchFamily="49" charset="0"/>
+              </a:rPr>
+              <a:t>// Terminal Operation</a:t>
+            </a:r>
+          </a:p>
+          <a:p>
+            <a:pPr marL="0" indent="0">
+              <a:buNone/>
+            </a:pPr>
+            <a:r>
+              <a:rPr lang="en-US" b="1" dirty="0" smtClean="0">
+                <a:solidFill>
+                  <a:srgbClr val="000080"/>
+                </a:solidFill>
+                <a:highlight>
+                  <a:srgbClr val="FFFFFF"/>
+                </a:highlight>
+                <a:latin typeface="Courier New" panose="02070309020205020404" pitchFamily="49" charset="0"/>
+                <a:cs typeface="Courier New" panose="02070309020205020404" pitchFamily="49" charset="0"/>
+              </a:rPr>
+              <a:t>}</a:t>
+            </a:r>
+          </a:p>
+          <a:p>
+            <a:r>
+              <a:rPr lang="en-US" dirty="0" smtClean="0">
+                <a:solidFill>
+                  <a:schemeClr val="tx1"/>
+                </a:solidFill>
+                <a:highlight>
+                  <a:srgbClr val="FFFFFF"/>
+                </a:highlight>
+                <a:cs typeface="Courier New" panose="02070309020205020404" pitchFamily="49" charset="0"/>
+              </a:rPr>
+              <a:t>All streams have a data source, zero or more intermediate operations, and a terminal operation.</a:t>
+            </a:r>
+          </a:p>
+          <a:p>
+            <a:r>
+              <a:rPr lang="en-US" dirty="0" smtClean="0">
+                <a:solidFill>
+                  <a:schemeClr val="tx1"/>
+                </a:solidFill>
+                <a:highlight>
+                  <a:srgbClr val="FFFFFF"/>
+                </a:highlight>
+                <a:cs typeface="Courier New" panose="02070309020205020404" pitchFamily="49" charset="0"/>
+              </a:rPr>
+              <a:t>The collection itself is the data source.</a:t>
+            </a:r>
+          </a:p>
+          <a:p>
+            <a:r>
+              <a:rPr lang="en-US" dirty="0" smtClean="0">
+                <a:solidFill>
+                  <a:schemeClr val="tx1"/>
+                </a:solidFill>
+                <a:highlight>
+                  <a:srgbClr val="FFFFFF"/>
+                </a:highlight>
+                <a:cs typeface="Courier New" panose="02070309020205020404" pitchFamily="49" charset="0"/>
+              </a:rPr>
+              <a:t>There is a terminal </a:t>
+            </a:r>
+            <a:r>
+              <a:rPr lang="en-US" i="1" dirty="0" smtClean="0">
+                <a:solidFill>
+                  <a:schemeClr val="tx1"/>
+                </a:solidFill>
+                <a:highlight>
+                  <a:srgbClr val="FFFFFF"/>
+                </a:highlight>
+                <a:cs typeface="Courier New" panose="02070309020205020404" pitchFamily="49" charset="0"/>
+              </a:rPr>
+              <a:t>reduction</a:t>
+            </a:r>
+            <a:r>
+              <a:rPr lang="en-US" dirty="0" smtClean="0">
+                <a:solidFill>
+                  <a:schemeClr val="tx1"/>
+                </a:solidFill>
+                <a:highlight>
+                  <a:srgbClr val="FFFFFF"/>
+                </a:highlight>
+                <a:cs typeface="Courier New" panose="02070309020205020404" pitchFamily="49" charset="0"/>
+              </a:rPr>
+              <a:t> on the stream.</a:t>
+            </a:r>
+          </a:p>
+          <a:p>
+            <a:r>
+              <a:rPr lang="en-US" dirty="0" smtClean="0">
+                <a:solidFill>
+                  <a:schemeClr val="tx1"/>
+                </a:solidFill>
+                <a:highlight>
+                  <a:srgbClr val="FFFFFF"/>
+                </a:highlight>
+                <a:cs typeface="Courier New" panose="02070309020205020404" pitchFamily="49" charset="0"/>
+              </a:rPr>
+              <a:t>A reduction distills all of the values in a given stream to a single value.</a:t>
+            </a:r>
+          </a:p>
+          <a:p>
+            <a:r>
+              <a:rPr lang="en-US" dirty="0" smtClean="0">
+                <a:solidFill>
+                  <a:schemeClr val="tx1"/>
+                </a:solidFill>
+                <a:highlight>
+                  <a:srgbClr val="FFFFFF"/>
+                </a:highlight>
+                <a:cs typeface="Courier New" panose="02070309020205020404" pitchFamily="49" charset="0"/>
+              </a:rPr>
+              <a:t>Integer reduction examples: sum, average, median, min, and max.</a:t>
+            </a:r>
+          </a:p>
+          <a:p>
+            <a:r>
+              <a:rPr lang="en-US" dirty="0" smtClean="0"/>
+              <a:t>The first argument to </a:t>
+            </a:r>
+            <a:r>
+              <a:rPr lang="en-US" dirty="0" smtClean="0">
+                <a:latin typeface="Courier New" panose="02070309020205020404" pitchFamily="49" charset="0"/>
+                <a:cs typeface="Courier New" panose="02070309020205020404" pitchFamily="49" charset="0"/>
+              </a:rPr>
+              <a:t>reduce</a:t>
+            </a:r>
+            <a:r>
+              <a:rPr lang="en-US" dirty="0" smtClean="0"/>
+              <a:t> the identity argument.  For addition, it is 0.  For a multiplication lambda it would be 1.</a:t>
+            </a:r>
+          </a:p>
+          <a:p>
+            <a:r>
+              <a:rPr lang="en-US" dirty="0" smtClean="0"/>
+              <a:t>The lambda is a </a:t>
+            </a:r>
+            <a:r>
+              <a:rPr lang="en-US" dirty="0" err="1" smtClean="0">
+                <a:latin typeface="Courier New" panose="02070309020205020404" pitchFamily="49" charset="0"/>
+                <a:cs typeface="Courier New" panose="02070309020205020404" pitchFamily="49" charset="0"/>
+              </a:rPr>
+              <a:t>BinaryOperator</a:t>
+            </a:r>
+            <a:r>
+              <a:rPr lang="en-US" b="1" dirty="0">
+                <a:solidFill>
+                  <a:srgbClr val="000080"/>
+                </a:solidFill>
+                <a:highlight>
+                  <a:srgbClr val="FFFFFF"/>
+                </a:highlight>
+                <a:latin typeface="Courier New" panose="02070309020205020404" pitchFamily="49" charset="0"/>
+                <a:cs typeface="Courier New" panose="02070309020205020404" pitchFamily="49" charset="0"/>
+              </a:rPr>
+              <a:t>&lt;</a:t>
+            </a:r>
+            <a:r>
+              <a:rPr lang="en-US" dirty="0">
+                <a:solidFill>
+                  <a:srgbClr val="000000"/>
+                </a:solidFill>
+                <a:highlight>
+                  <a:srgbClr val="FFFFFF"/>
+                </a:highlight>
+                <a:latin typeface="Courier New" panose="02070309020205020404" pitchFamily="49" charset="0"/>
+                <a:cs typeface="Courier New" panose="02070309020205020404" pitchFamily="49" charset="0"/>
+              </a:rPr>
+              <a:t>Integer</a:t>
+            </a:r>
+            <a:r>
+              <a:rPr lang="en-US" b="1" dirty="0">
+                <a:solidFill>
+                  <a:srgbClr val="000080"/>
+                </a:solidFill>
+                <a:highlight>
+                  <a:srgbClr val="FFFFFF"/>
+                </a:highlight>
+                <a:latin typeface="Courier New" panose="02070309020205020404" pitchFamily="49" charset="0"/>
+                <a:cs typeface="Courier New" panose="02070309020205020404" pitchFamily="49" charset="0"/>
+              </a:rPr>
+              <a:t>&gt;</a:t>
+            </a:r>
+            <a:r>
+              <a:rPr lang="en-US" dirty="0">
+                <a:solidFill>
+                  <a:srgbClr val="000000"/>
+                </a:solidFill>
+                <a:highlight>
+                  <a:srgbClr val="FFFFFF"/>
+                </a:highlight>
+                <a:latin typeface="Courier New" panose="02070309020205020404" pitchFamily="49" charset="0"/>
+                <a:cs typeface="Courier New" panose="02070309020205020404" pitchFamily="49" charset="0"/>
+              </a:rPr>
+              <a:t> </a:t>
+            </a:r>
+            <a:r>
+              <a:rPr lang="en-US" dirty="0" smtClean="0"/>
+              <a:t> that is given a running total and the current element.  They are processed by adding them together.</a:t>
+            </a:r>
+            <a:endParaRPr lang="en-US" dirty="0"/>
+          </a:p>
+        </p:txBody>
+      </p:sp>
+    </p:spTree>
+    <p:extLst>
+      <p:ext uri="{BB962C8B-B14F-4D97-AF65-F5344CB8AC3E}">
+        <p14:creationId xmlns:p14="http://schemas.microsoft.com/office/powerpoint/2010/main" val="642348128"/>
+      </p:ext>
+    </p:extLst>
+  </p:cSld>
+  <p:clrMapOvr>
+    <a:masterClrMapping/>
+  </p:clrMapOvr>
+</p:sld>
+</file>
+
+<file path=ppt/slides/slide19.xml><?xml version="1.0" encoding="utf-8"?>
+<p:sld xmlns:a="http://schemas.openxmlformats.org/drawingml/2006/main" xmlns:r="http://schemas.openxmlformats.org/officeDocument/2006/relationships" xmlns:p="http://schemas.openxmlformats.org/presentationml/2006/main">
+  <p:cSld>
+    <p:spTree>
+      <p:nvGrpSpPr>
+        <p:cNvPr id="1" name=""/>
+        <p:cNvGrpSpPr/>
+        <p:nvPr/>
+      </p:nvGrpSpPr>
+      <p:grpSpPr>
+        <a:xfrm>
+          <a:off x="0" y="0"/>
+          <a:ext cx="0" cy="0"/>
+          <a:chOff x="0" y="0"/>
+          <a:chExt cx="0" cy="0"/>
+        </a:xfrm>
+      </p:grpSpPr>
+      <p:sp>
+        <p:nvSpPr>
+          <p:cNvPr id="2" name="Title 1"/>
+          <p:cNvSpPr>
+            <a:spLocks noGrp="1"/>
+          </p:cNvSpPr>
+          <p:nvPr>
+            <p:ph type="title"/>
+          </p:nvPr>
+        </p:nvSpPr>
+        <p:spPr>
+          <a:xfrm>
+            <a:off x="677334" y="609600"/>
+            <a:ext cx="8596668" cy="878541"/>
+          </a:xfrm>
+        </p:spPr>
+        <p:txBody>
+          <a:bodyPr/>
+          <a:lstStyle/>
+          <a:p>
+            <a:r>
+              <a:rPr lang="en-US" dirty="0" smtClean="0"/>
+              <a:t>New Requirement</a:t>
+            </a:r>
             <a:endParaRPr lang="en-US" dirty="0"/>
           </a:p>
         </p:txBody>
@@ -7310,14 +9242,22 @@
           <a:bodyPr/>
           <a:lstStyle/>
           <a:p>
-            <a:endParaRPr lang="en-US"/>
+            <a:r>
+              <a:rPr lang="en-US" dirty="0" smtClean="0"/>
+              <a:t>Only process </a:t>
+            </a:r>
+            <a:r>
+              <a:rPr lang="en-US" smtClean="0"/>
+              <a:t>numbers divisible by 4.</a:t>
+            </a:r>
+            <a:endParaRPr lang="en-US" dirty="0"/>
           </a:p>
         </p:txBody>
       </p:sp>
     </p:spTree>
     <p:extLst>
       <p:ext uri="{BB962C8B-B14F-4D97-AF65-F5344CB8AC3E}">
-        <p14:creationId xmlns:p14="http://schemas.microsoft.com/office/powerpoint/2010/main" val="3326645903"/>
+        <p14:creationId xmlns:p14="http://schemas.microsoft.com/office/powerpoint/2010/main" val="3747314882"/>
       </p:ext>
     </p:extLst>
   </p:cSld>
@@ -7559,45 +9499,21 @@
           <a:p>
             <a:r>
               <a:rPr lang="en-US" sz="2400" dirty="0" smtClean="0"/>
-              <a:t>Similar to a closure, </a:t>
+              <a:t>Similar to a closure, class members, </a:t>
+            </a:r>
+            <a:r>
+              <a:rPr lang="en-US" sz="2400" i="1" dirty="0" smtClean="0"/>
+              <a:t>effectively final </a:t>
             </a:r>
             <a:r>
               <a:rPr lang="en-US" sz="2400" dirty="0" smtClean="0"/>
-              <a:t>class members, </a:t>
-            </a:r>
-            <a:r>
-              <a:rPr lang="en-US" sz="2400" i="1" dirty="0" smtClean="0"/>
-              <a:t>effectively </a:t>
-            </a:r>
-            <a:r>
-              <a:rPr lang="en-US" sz="2400" i="1" dirty="0" smtClean="0"/>
-              <a:t>final </a:t>
-            </a:r>
+              <a:t>arguments and local variables are available to it.</a:t>
+            </a:r>
+          </a:p>
+          <a:p>
             <a:r>
               <a:rPr lang="en-US" sz="2400" dirty="0" smtClean="0"/>
-              <a:t>arguments and </a:t>
-            </a:r>
-            <a:r>
-              <a:rPr lang="en-US" sz="2400" dirty="0" smtClean="0"/>
-              <a:t>local </a:t>
-            </a:r>
-            <a:r>
-              <a:rPr lang="en-US" sz="2400" dirty="0" smtClean="0"/>
-              <a:t>variables </a:t>
-            </a:r>
-            <a:r>
-              <a:rPr lang="en-US" sz="2400" dirty="0" smtClean="0"/>
-              <a:t>are available to it.</a:t>
-            </a:r>
-          </a:p>
-          <a:p>
-            <a:r>
-              <a:rPr lang="en-US" sz="2400" dirty="0" smtClean="0"/>
-              <a:t>Lambdas may only exist when assigned to a Functional Interface, including being passed in as a parameter</a:t>
-            </a:r>
-            <a:r>
-              <a:rPr lang="en-US" sz="2400" dirty="0" smtClean="0"/>
-              <a:t>.</a:t>
+              <a:t>Lambdas may only exist when assigned to a Functional Interface, including being passed in as a parameter.</a:t>
             </a:r>
           </a:p>
           <a:p>
@@ -8859,27 +10775,13 @@
             </a:r>
             <a:r>
               <a:rPr lang="en-US" sz="2100" dirty="0" smtClean="0"/>
-              <a:t>.” </a:t>
-            </a:r>
-            <a:r>
-              <a:rPr lang="en-US" sz="2100" dirty="0" smtClean="0"/>
-              <a:t>—</a:t>
-            </a:r>
-            <a:r>
-              <a:rPr lang="en-US" sz="2100" dirty="0" smtClean="0"/>
-              <a:t> </a:t>
+              <a:t>.” — </a:t>
             </a:r>
             <a:r>
               <a:rPr lang="en-US" sz="2100" dirty="0" smtClean="0">
                 <a:hlinkClick r:id="rId2"/>
               </a:rPr>
-              <a:t>Oracle Java </a:t>
-            </a:r>
-            <a:r>
-              <a:rPr lang="en-US" sz="2100" dirty="0" smtClean="0">
-                <a:hlinkClick r:id="rId2"/>
-              </a:rPr>
-              <a:t>Tutorial</a:t>
+              <a:t>Oracle Java Tutorial</a:t>
             </a:r>
             <a:endParaRPr lang="en-US" sz="2100" dirty="0" smtClean="0"/>
           </a:p>
@@ -9786,19 +11688,7 @@
           <a:p>
             <a:r>
               <a:rPr lang="en-US" sz="3400" dirty="0" smtClean="0"/>
-              <a:t>Since there is exactly one </a:t>
-            </a:r>
-            <a:r>
-              <a:rPr lang="en-US" sz="3400" dirty="0" smtClean="0"/>
-              <a:t>abstract functional</a:t>
-            </a:r>
-            <a:r>
-              <a:rPr lang="en-US" sz="3400" dirty="0" smtClean="0"/>
-              <a:t> </a:t>
-            </a:r>
-            <a:r>
-              <a:rPr lang="en-US" sz="3400" dirty="0" smtClean="0"/>
-              <a:t>method, method types and return values are inferred from the FI.</a:t>
+              <a:t>Since there is exactly one abstract functional method, method types and return values are inferred from the FI.</a:t>
             </a:r>
           </a:p>
           <a:p>

</xml_diff>

<commit_message>
Add predicate to filter results in the stream.  TODO: Clean up previous slides: Make all mentions of Java classes use the Courier new font with syntax highlighting to be consistent with other code mentions.  Next up: partitioning and grouping the stream.
</commit_message>
<xml_diff>
--- a/Learning to Love the Lambda in the Stream.pptx
+++ b/Learning to Love the Lambda in the Stream.pptx
@@ -23,7 +23,8 @@
     <p:sldId id="269" r:id="rId17"/>
     <p:sldId id="271" r:id="rId18"/>
     <p:sldId id="273" r:id="rId19"/>
-    <p:sldId id="274" r:id="rId20"/>
+    <p:sldId id="275" r:id="rId20"/>
+    <p:sldId id="274" r:id="rId21"/>
   </p:sldIdLst>
   <p:sldSz cx="12192000" cy="6858000"/>
   <p:notesSz cx="6858000" cy="9144000"/>
@@ -853,7 +854,7 @@
             <a:fld id="{B61BEF0D-F0BB-DE4B-95CE-6DB70DBA9567}" type="datetimeFigureOut">
               <a:rPr lang="en-US" dirty="0"/>
               <a:pPr/>
-              <a:t>5/9/2017</a:t>
+              <a:t>5/10/2017</a:t>
             </a:fld>
             <a:endParaRPr lang="en-US" dirty="0"/>
           </a:p>
@@ -1101,7 +1102,7 @@
             <a:fld id="{B61BEF0D-F0BB-DE4B-95CE-6DB70DBA9567}" type="datetimeFigureOut">
               <a:rPr lang="en-US" dirty="0"/>
               <a:pPr/>
-              <a:t>5/9/2017</a:t>
+              <a:t>5/10/2017</a:t>
             </a:fld>
             <a:endParaRPr lang="en-US" dirty="0"/>
           </a:p>
@@ -1412,7 +1413,7 @@
             <a:fld id="{B61BEF0D-F0BB-DE4B-95CE-6DB70DBA9567}" type="datetimeFigureOut">
               <a:rPr lang="en-US" dirty="0"/>
               <a:pPr/>
-              <a:t>5/9/2017</a:t>
+              <a:t>5/10/2017</a:t>
             </a:fld>
             <a:endParaRPr lang="en-US" dirty="0"/>
           </a:p>
@@ -1750,7 +1751,7 @@
             <a:fld id="{B61BEF0D-F0BB-DE4B-95CE-6DB70DBA9567}" type="datetimeFigureOut">
               <a:rPr lang="en-US" dirty="0"/>
               <a:pPr/>
-              <a:t>5/9/2017</a:t>
+              <a:t>5/10/2017</a:t>
             </a:fld>
             <a:endParaRPr lang="en-US" dirty="0"/>
           </a:p>
@@ -2061,7 +2062,7 @@
             <a:fld id="{B61BEF0D-F0BB-DE4B-95CE-6DB70DBA9567}" type="datetimeFigureOut">
               <a:rPr lang="en-US" dirty="0"/>
               <a:pPr/>
-              <a:t>5/9/2017</a:t>
+              <a:t>5/10/2017</a:t>
             </a:fld>
             <a:endParaRPr lang="en-US" dirty="0"/>
           </a:p>
@@ -2451,7 +2452,7 @@
             <a:fld id="{B61BEF0D-F0BB-DE4B-95CE-6DB70DBA9567}" type="datetimeFigureOut">
               <a:rPr lang="en-US" dirty="0"/>
               <a:pPr/>
-              <a:t>5/9/2017</a:t>
+              <a:t>5/10/2017</a:t>
             </a:fld>
             <a:endParaRPr lang="en-US" dirty="0"/>
           </a:p>
@@ -2617,7 +2618,7 @@
           <a:p>
             <a:fld id="{55C6B4A9-1611-4792-9094-5F34BCA07E0B}" type="datetimeFigureOut">
               <a:rPr lang="en-US" dirty="0"/>
-              <a:t>5/9/2017</a:t>
+              <a:t>5/10/2017</a:t>
             </a:fld>
             <a:endParaRPr lang="en-US" dirty="0"/>
           </a:p>
@@ -2793,7 +2794,7 @@
             <a:fld id="{B61BEF0D-F0BB-DE4B-95CE-6DB70DBA9567}" type="datetimeFigureOut">
               <a:rPr lang="en-US" dirty="0"/>
               <a:pPr/>
-              <a:t>5/9/2017</a:t>
+              <a:t>5/10/2017</a:t>
             </a:fld>
             <a:endParaRPr lang="en-US" dirty="0"/>
           </a:p>
@@ -2966,7 +2967,7 @@
             <a:fld id="{B61BEF0D-F0BB-DE4B-95CE-6DB70DBA9567}" type="datetimeFigureOut">
               <a:rPr lang="en-US" dirty="0"/>
               <a:pPr/>
-              <a:t>5/9/2017</a:t>
+              <a:t>5/10/2017</a:t>
             </a:fld>
             <a:endParaRPr lang="en-US" dirty="0"/>
           </a:p>
@@ -3210,7 +3211,7 @@
             <a:fld id="{B61BEF0D-F0BB-DE4B-95CE-6DB70DBA9567}" type="datetimeFigureOut">
               <a:rPr lang="en-US" dirty="0"/>
               <a:pPr/>
-              <a:t>5/9/2017</a:t>
+              <a:t>5/10/2017</a:t>
             </a:fld>
             <a:endParaRPr lang="en-US" dirty="0"/>
           </a:p>
@@ -3438,7 +3439,7 @@
           <a:p>
             <a:fld id="{EB712588-04B1-427B-82EE-E8DB90309F08}" type="datetimeFigureOut">
               <a:rPr lang="en-US" dirty="0"/>
-              <a:t>5/9/2017</a:t>
+              <a:t>5/10/2017</a:t>
             </a:fld>
             <a:endParaRPr lang="en-US" dirty="0"/>
           </a:p>
@@ -3808,7 +3809,7 @@
             <a:fld id="{B61BEF0D-F0BB-DE4B-95CE-6DB70DBA9567}" type="datetimeFigureOut">
               <a:rPr lang="en-US" dirty="0"/>
               <a:pPr/>
-              <a:t>5/9/2017</a:t>
+              <a:t>5/10/2017</a:t>
             </a:fld>
             <a:endParaRPr lang="en-US" dirty="0"/>
           </a:p>
@@ -3928,7 +3929,7 @@
             <a:fld id="{B61BEF0D-F0BB-DE4B-95CE-6DB70DBA9567}" type="datetimeFigureOut">
               <a:rPr lang="en-US" dirty="0"/>
               <a:pPr/>
-              <a:t>5/9/2017</a:t>
+              <a:t>5/10/2017</a:t>
             </a:fld>
             <a:endParaRPr lang="en-US" dirty="0"/>
           </a:p>
@@ -4020,7 +4021,7 @@
             <a:fld id="{B61BEF0D-F0BB-DE4B-95CE-6DB70DBA9567}" type="datetimeFigureOut">
               <a:rPr lang="en-US" dirty="0"/>
               <a:pPr/>
-              <a:t>5/9/2017</a:t>
+              <a:t>5/10/2017</a:t>
             </a:fld>
             <a:endParaRPr lang="en-US" dirty="0"/>
           </a:p>
@@ -4271,7 +4272,7 @@
           <a:p>
             <a:fld id="{42A54C80-263E-416B-A8E0-580EDEADCBDC}" type="datetimeFigureOut">
               <a:rPr lang="en-US" dirty="0"/>
-              <a:t>5/9/2017</a:t>
+              <a:t>5/10/2017</a:t>
             </a:fld>
             <a:endParaRPr lang="en-US" dirty="0"/>
           </a:p>
@@ -4530,7 +4531,7 @@
             <a:fld id="{B61BEF0D-F0BB-DE4B-95CE-6DB70DBA9567}" type="datetimeFigureOut">
               <a:rPr lang="en-US" dirty="0"/>
               <a:pPr/>
-              <a:t>5/9/2017</a:t>
+              <a:t>5/10/2017</a:t>
             </a:fld>
             <a:endParaRPr lang="en-US" dirty="0"/>
           </a:p>
@@ -5270,7 +5271,7 @@
             <a:fld id="{B61BEF0D-F0BB-DE4B-95CE-6DB70DBA9567}" type="datetimeFigureOut">
               <a:rPr lang="en-US" dirty="0"/>
               <a:pPr/>
-              <a:t>5/9/2017</a:t>
+              <a:t>5/10/2017</a:t>
             </a:fld>
             <a:endParaRPr lang="en-US" dirty="0"/>
           </a:p>
@@ -6829,15 +6830,7 @@
           <a:p>
             <a:r>
               <a:rPr lang="en-US" sz="2400" dirty="0" smtClean="0"/>
-              <a:t>Used to </a:t>
-            </a:r>
-            <a:r>
-              <a:rPr lang="en-US" sz="2400" dirty="0" smtClean="0"/>
-              <a:t>compare </a:t>
-            </a:r>
-            <a:r>
-              <a:rPr lang="en-US" sz="2400" dirty="0" smtClean="0"/>
-              <a:t>objects, and to impose a </a:t>
+              <a:t>Used to compare objects, and to impose a </a:t>
             </a:r>
             <a:r>
               <a:rPr lang="en-US" sz="2400" i="1" dirty="0" smtClean="0"/>
@@ -6956,11 +6949,7 @@
             <a:pPr lvl="1"/>
             <a:r>
               <a:rPr lang="en-US" sz="2200" dirty="0" smtClean="0"/>
-              <a:t>When o1 &gt; o2, returns &gt;= </a:t>
-            </a:r>
-            <a:r>
-              <a:rPr lang="en-US" sz="2200" dirty="0" smtClean="0"/>
-              <a:t>1</a:t>
+              <a:t>When o1 &gt; o2, returns &gt;= 1</a:t>
             </a:r>
           </a:p>
           <a:p>
@@ -6968,7 +6957,6 @@
               <a:rPr lang="en-US" sz="2400" dirty="0" smtClean="0"/>
               <a:t>Even though Comparator has been around since the early days, it is a functional interface because it has a single abstract method.</a:t>
             </a:r>
-            <a:endParaRPr lang="en-US" sz="2400" dirty="0" smtClean="0"/>
           </a:p>
           <a:p>
             <a:endParaRPr lang="en-US" sz="2400" dirty="0" smtClean="0"/>
@@ -7180,15 +7168,7 @@
             <a:pPr marL="1200150" lvl="2" indent="-342900"/>
             <a:r>
               <a:rPr lang="en-US" dirty="0" smtClean="0"/>
-              <a:t>Accepts a stream and returns a </a:t>
-            </a:r>
-            <a:r>
-              <a:rPr lang="en-US" dirty="0" smtClean="0"/>
-              <a:t>another stream </a:t>
-            </a:r>
-            <a:r>
-              <a:rPr lang="en-US" dirty="0" smtClean="0"/>
-              <a:t>with the operation appended to it.</a:t>
+              <a:t>Accepts a stream and returns a another stream with the operation appended to it.</a:t>
             </a:r>
           </a:p>
           <a:p>
@@ -8333,8 +8313,36 @@
                 <a:latin typeface="Courier New" panose="02070309020205020404" pitchFamily="49" charset="0"/>
                 <a:cs typeface="Courier New" panose="02070309020205020404" pitchFamily="49" charset="0"/>
               </a:rPr>
-              <a:t>// 500500</a:t>
-            </a:r>
+              <a:t>// </a:t>
+            </a:r>
+            <a:r>
+              <a:rPr lang="en-US" sz="1600" dirty="0" smtClean="0">
+                <a:solidFill>
+                  <a:srgbClr val="008000"/>
+                </a:solidFill>
+                <a:highlight>
+                  <a:srgbClr val="FFFFFF"/>
+                </a:highlight>
+                <a:latin typeface="Courier New" panose="02070309020205020404" pitchFamily="49" charset="0"/>
+                <a:cs typeface="Courier New" panose="02070309020205020404" pitchFamily="49" charset="0"/>
+              </a:rPr>
+              <a:t>500500</a:t>
+            </a:r>
+          </a:p>
+          <a:p>
+            <a:pPr marL="0" indent="0">
+              <a:buNone/>
+            </a:pPr>
+            <a:endParaRPr lang="en-US" sz="1600" dirty="0">
+              <a:solidFill>
+                <a:srgbClr val="008000"/>
+              </a:solidFill>
+              <a:highlight>
+                <a:srgbClr val="FFFFFF"/>
+              </a:highlight>
+              <a:latin typeface="Courier New" panose="02070309020205020404" pitchFamily="49" charset="0"/>
+              <a:cs typeface="Courier New" panose="02070309020205020404" pitchFamily="49" charset="0"/>
+            </a:endParaRPr>
           </a:p>
           <a:p>
             <a:endParaRPr lang="en-US" sz="1600" dirty="0">
@@ -8386,7 +8394,7 @@
         </p:nvSpPr>
         <p:spPr>
           <a:xfrm>
-            <a:off x="677334" y="497541"/>
+            <a:off x="677334" y="313765"/>
             <a:ext cx="8596668" cy="811306"/>
           </a:xfrm>
         </p:spPr>
@@ -8414,7 +8422,7 @@
         </p:nvSpPr>
         <p:spPr>
           <a:xfrm>
-            <a:off x="381499" y="1308847"/>
+            <a:off x="381499" y="1174376"/>
             <a:ext cx="8596668" cy="5204011"/>
           </a:xfrm>
         </p:spPr>
@@ -9002,6 +9010,19 @@
           </a:p>
           <a:p>
             <a:r>
+              <a:rPr lang="en-US" dirty="0">
+                <a:solidFill>
+                  <a:srgbClr val="000000"/>
+                </a:solidFill>
+                <a:highlight>
+                  <a:srgbClr val="FFFFFF"/>
+                </a:highlight>
+                <a:latin typeface="Courier New" panose="02070309020205020404" pitchFamily="49" charset="0"/>
+                <a:cs typeface="Courier New" panose="02070309020205020404" pitchFamily="49" charset="0"/>
+              </a:rPr>
+              <a:t>numbers</a:t>
+            </a:r>
+            <a:r>
               <a:rPr lang="en-US" dirty="0" smtClean="0">
                 <a:solidFill>
                   <a:schemeClr val="tx1"/>
@@ -9011,10 +9032,8 @@
                 </a:highlight>
                 <a:cs typeface="Courier New" panose="02070309020205020404" pitchFamily="49" charset="0"/>
               </a:rPr>
-              <a:t>The collection itself is the data source.</a:t>
-            </a:r>
-          </a:p>
-          <a:p>
+              <a:t> collection is the </a:t>
+            </a:r>
             <a:r>
               <a:rPr lang="en-US" dirty="0" smtClean="0">
                 <a:solidFill>
@@ -9025,7 +9044,58 @@
                 </a:highlight>
                 <a:cs typeface="Courier New" panose="02070309020205020404" pitchFamily="49" charset="0"/>
               </a:rPr>
-              <a:t>There is a terminal </a:t>
+              <a:t>data source.</a:t>
+            </a:r>
+          </a:p>
+          <a:p>
+            <a:r>
+              <a:rPr lang="en-US" dirty="0" smtClean="0">
+                <a:solidFill>
+                  <a:srgbClr val="000000"/>
+                </a:solidFill>
+                <a:highlight>
+                  <a:srgbClr val="FFFFFF"/>
+                </a:highlight>
+                <a:latin typeface="Courier New" panose="02070309020205020404" pitchFamily="49" charset="0"/>
+                <a:cs typeface="Courier New" panose="02070309020205020404" pitchFamily="49" charset="0"/>
+              </a:rPr>
+              <a:t>reduce</a:t>
+            </a:r>
+            <a:r>
+              <a:rPr lang="en-US" dirty="0" smtClean="0">
+                <a:solidFill>
+                  <a:srgbClr val="000000"/>
+                </a:solidFill>
+                <a:highlight>
+                  <a:srgbClr val="FFFFFF"/>
+                </a:highlight>
+                <a:cs typeface="Courier New" panose="02070309020205020404" pitchFamily="49" charset="0"/>
+              </a:rPr>
+              <a:t> </a:t>
+            </a:r>
+            <a:r>
+              <a:rPr lang="en-US" dirty="0" smtClean="0">
+                <a:solidFill>
+                  <a:schemeClr val="tx1"/>
+                </a:solidFill>
+                <a:highlight>
+                  <a:srgbClr val="FFFFFF"/>
+                </a:highlight>
+                <a:cs typeface="Courier New" panose="02070309020205020404" pitchFamily="49" charset="0"/>
+              </a:rPr>
+              <a:t>is </a:t>
+            </a:r>
+            <a:r>
+              <a:rPr lang="en-US" dirty="0" smtClean="0">
+                <a:solidFill>
+                  <a:schemeClr val="tx1"/>
+                </a:solidFill>
+                <a:highlight>
+                  <a:srgbClr val="FFFFFF"/>
+                </a:highlight>
+                <a:cs typeface="Courier New" panose="02070309020205020404" pitchFamily="49" charset="0"/>
+              </a:rPr>
+              <a:t>a terminal </a:t>
             </a:r>
             <a:r>
               <a:rPr lang="en-US" i="1" dirty="0" smtClean="0">
@@ -9094,7 +9164,15 @@
             </a:r>
             <a:r>
               <a:rPr lang="en-US" dirty="0" smtClean="0"/>
-              <a:t> the identity argument.  For addition, it is 0.  For a multiplication lambda it would be 1.</a:t>
+              <a:t> </a:t>
+            </a:r>
+            <a:r>
+              <a:rPr lang="en-US" dirty="0" smtClean="0"/>
+              <a:t>is the identity </a:t>
+            </a:r>
+            <a:r>
+              <a:rPr lang="en-US" dirty="0" smtClean="0"/>
+              <a:t>argument.  For addition, it is 0.  For a multiplication lambda it would be 1.</a:t>
             </a:r>
           </a:p>
           <a:p>
@@ -9209,19 +9287,14 @@
             <p:ph type="title"/>
           </p:nvPr>
         </p:nvSpPr>
-        <p:spPr>
-          <a:xfrm>
-            <a:off x="677334" y="609600"/>
-            <a:ext cx="8596668" cy="878541"/>
-          </a:xfrm>
-        </p:spPr>
+        <p:spPr/>
         <p:txBody>
           <a:bodyPr/>
           <a:lstStyle/>
           <a:p>
             <a:r>
               <a:rPr lang="en-US" dirty="0" smtClean="0"/>
-              <a:t>New Requirement</a:t>
+              <a:t>Primitive Streams</a:t>
             </a:r>
             <a:endParaRPr lang="en-US" dirty="0"/>
           </a:p>
@@ -9237,27 +9310,904 @@
             <p:ph idx="1"/>
           </p:nvPr>
         </p:nvSpPr>
-        <p:spPr/>
+        <p:spPr>
+          <a:xfrm>
+            <a:off x="677334" y="1878107"/>
+            <a:ext cx="8596668" cy="4240306"/>
+          </a:xfrm>
+        </p:spPr>
         <p:txBody>
-          <a:bodyPr/>
+          <a:bodyPr>
+            <a:normAutofit/>
+          </a:bodyPr>
           <a:lstStyle/>
           <a:p>
             <a:r>
+              <a:rPr lang="en-US" dirty="0" err="1" smtClean="0">
+                <a:latin typeface="Courier New" panose="02070309020205020404" pitchFamily="49" charset="0"/>
+                <a:cs typeface="Courier New" panose="02070309020205020404" pitchFamily="49" charset="0"/>
+              </a:rPr>
+              <a:t>IntStream</a:t>
+            </a:r>
+            <a:r>
               <a:rPr lang="en-US" dirty="0" smtClean="0"/>
-              <a:t>Only process </a:t>
-            </a:r>
-            <a:r>
-              <a:rPr lang="en-US" smtClean="0"/>
-              <a:t>numbers divisible by 4.</a:t>
-            </a:r>
-            <a:endParaRPr lang="en-US" dirty="0"/>
+              <a:t>, </a:t>
+            </a:r>
+            <a:r>
+              <a:rPr lang="en-US" dirty="0" err="1" smtClean="0">
+                <a:latin typeface="Courier New" panose="02070309020205020404" pitchFamily="49" charset="0"/>
+                <a:cs typeface="Courier New" panose="02070309020205020404" pitchFamily="49" charset="0"/>
+              </a:rPr>
+              <a:t>LongStream</a:t>
+            </a:r>
+            <a:r>
+              <a:rPr lang="en-US" dirty="0" smtClean="0"/>
+              <a:t>, and </a:t>
+            </a:r>
+            <a:r>
+              <a:rPr lang="en-US" dirty="0" err="1" smtClean="0">
+                <a:latin typeface="Courier New" panose="02070309020205020404" pitchFamily="49" charset="0"/>
+                <a:cs typeface="Courier New" panose="02070309020205020404" pitchFamily="49" charset="0"/>
+              </a:rPr>
+              <a:t>DoubleStream</a:t>
+            </a:r>
+            <a:endParaRPr lang="en-US" dirty="0" smtClean="0">
+              <a:latin typeface="Courier New" panose="02070309020205020404" pitchFamily="49" charset="0"/>
+              <a:cs typeface="Courier New" panose="02070309020205020404" pitchFamily="49" charset="0"/>
+            </a:endParaRPr>
+          </a:p>
+          <a:p>
+            <a:r>
+              <a:rPr lang="en-US" dirty="0" smtClean="0"/>
+              <a:t>Offers a performance benefit over generic stream by avoiding boxing of primitive computations.</a:t>
+            </a:r>
+          </a:p>
+          <a:p>
+            <a:r>
+              <a:rPr lang="en-US" dirty="0" smtClean="0"/>
+              <a:t>Offers additional methods, such as </a:t>
+            </a:r>
+            <a:r>
+              <a:rPr lang="en-US" dirty="0">
+                <a:solidFill>
+                  <a:srgbClr val="000000"/>
+                </a:solidFill>
+                <a:highlight>
+                  <a:srgbClr val="FFFFFF"/>
+                </a:highlight>
+                <a:latin typeface="Courier New" panose="02070309020205020404" pitchFamily="49" charset="0"/>
+                <a:cs typeface="Courier New" panose="02070309020205020404" pitchFamily="49" charset="0"/>
+              </a:rPr>
+              <a:t>sum</a:t>
+            </a:r>
+            <a:r>
+              <a:rPr lang="en-US" b="1" dirty="0" smtClean="0">
+                <a:solidFill>
+                  <a:srgbClr val="000080"/>
+                </a:solidFill>
+                <a:highlight>
+                  <a:srgbClr val="FFFFFF"/>
+                </a:highlight>
+                <a:latin typeface="Courier New" panose="02070309020205020404" pitchFamily="49" charset="0"/>
+                <a:cs typeface="Courier New" panose="02070309020205020404" pitchFamily="49" charset="0"/>
+              </a:rPr>
+              <a:t>()</a:t>
+            </a:r>
+            <a:r>
+              <a:rPr lang="en-US" dirty="0" smtClean="0"/>
+              <a:t>,</a:t>
+            </a:r>
+            <a:r>
+              <a:rPr lang="en-US" dirty="0" smtClean="0">
+                <a:solidFill>
+                  <a:srgbClr val="000000"/>
+                </a:solidFill>
+                <a:highlight>
+                  <a:srgbClr val="FFFFFF"/>
+                </a:highlight>
+                <a:latin typeface="Courier New" panose="02070309020205020404" pitchFamily="49" charset="0"/>
+                <a:cs typeface="Courier New" panose="02070309020205020404" pitchFamily="49" charset="0"/>
+              </a:rPr>
+              <a:t> </a:t>
+            </a:r>
+            <a:r>
+              <a:rPr lang="en-US" dirty="0">
+                <a:solidFill>
+                  <a:srgbClr val="000000"/>
+                </a:solidFill>
+                <a:highlight>
+                  <a:srgbClr val="FFFFFF"/>
+                </a:highlight>
+                <a:latin typeface="Courier New" panose="02070309020205020404" pitchFamily="49" charset="0"/>
+                <a:cs typeface="Courier New" panose="02070309020205020404" pitchFamily="49" charset="0"/>
+              </a:rPr>
+              <a:t>min</a:t>
+            </a:r>
+            <a:r>
+              <a:rPr lang="en-US" b="1" dirty="0" smtClean="0">
+                <a:solidFill>
+                  <a:srgbClr val="000080"/>
+                </a:solidFill>
+                <a:highlight>
+                  <a:srgbClr val="FFFFFF"/>
+                </a:highlight>
+                <a:latin typeface="Courier New" panose="02070309020205020404" pitchFamily="49" charset="0"/>
+                <a:cs typeface="Courier New" panose="02070309020205020404" pitchFamily="49" charset="0"/>
+              </a:rPr>
+              <a:t>()</a:t>
+            </a:r>
+            <a:r>
+              <a:rPr lang="en-US" dirty="0" smtClean="0"/>
+              <a:t>,</a:t>
+            </a:r>
+            <a:r>
+              <a:rPr lang="en-US" dirty="0" smtClean="0">
+                <a:solidFill>
+                  <a:srgbClr val="000000"/>
+                </a:solidFill>
+                <a:highlight>
+                  <a:srgbClr val="FFFFFF"/>
+                </a:highlight>
+                <a:latin typeface="Courier New" panose="02070309020205020404" pitchFamily="49" charset="0"/>
+                <a:cs typeface="Courier New" panose="02070309020205020404" pitchFamily="49" charset="0"/>
+              </a:rPr>
+              <a:t> </a:t>
+            </a:r>
+            <a:r>
+              <a:rPr lang="en-US" dirty="0">
+                <a:solidFill>
+                  <a:srgbClr val="000000"/>
+                </a:solidFill>
+                <a:highlight>
+                  <a:srgbClr val="FFFFFF"/>
+                </a:highlight>
+                <a:latin typeface="Courier New" panose="02070309020205020404" pitchFamily="49" charset="0"/>
+                <a:cs typeface="Courier New" panose="02070309020205020404" pitchFamily="49" charset="0"/>
+              </a:rPr>
+              <a:t>max</a:t>
+            </a:r>
+            <a:r>
+              <a:rPr lang="en-US" b="1" dirty="0" smtClean="0">
+                <a:solidFill>
+                  <a:srgbClr val="000080"/>
+                </a:solidFill>
+                <a:highlight>
+                  <a:srgbClr val="FFFFFF"/>
+                </a:highlight>
+                <a:latin typeface="Courier New" panose="02070309020205020404" pitchFamily="49" charset="0"/>
+                <a:cs typeface="Courier New" panose="02070309020205020404" pitchFamily="49" charset="0"/>
+              </a:rPr>
+              <a:t>()</a:t>
+            </a:r>
+            <a:r>
+              <a:rPr lang="en-US" dirty="0" smtClean="0"/>
+              <a:t>,</a:t>
+            </a:r>
+            <a:r>
+              <a:rPr lang="en-US" dirty="0" smtClean="0">
+                <a:solidFill>
+                  <a:srgbClr val="000000"/>
+                </a:solidFill>
+                <a:highlight>
+                  <a:srgbClr val="FFFFFF"/>
+                </a:highlight>
+                <a:latin typeface="Courier New" panose="02070309020205020404" pitchFamily="49" charset="0"/>
+                <a:cs typeface="Courier New" panose="02070309020205020404" pitchFamily="49" charset="0"/>
+              </a:rPr>
+              <a:t> </a:t>
+            </a:r>
+            <a:r>
+              <a:rPr lang="en-US" dirty="0">
+                <a:solidFill>
+                  <a:srgbClr val="000000"/>
+                </a:solidFill>
+                <a:highlight>
+                  <a:srgbClr val="FFFFFF"/>
+                </a:highlight>
+                <a:latin typeface="Courier New" panose="02070309020205020404" pitchFamily="49" charset="0"/>
+                <a:cs typeface="Courier New" panose="02070309020205020404" pitchFamily="49" charset="0"/>
+              </a:rPr>
+              <a:t>average</a:t>
+            </a:r>
+            <a:r>
+              <a:rPr lang="en-US" b="1" dirty="0" smtClean="0">
+                <a:solidFill>
+                  <a:srgbClr val="000080"/>
+                </a:solidFill>
+                <a:highlight>
+                  <a:srgbClr val="FFFFFF"/>
+                </a:highlight>
+                <a:latin typeface="Courier New" panose="02070309020205020404" pitchFamily="49" charset="0"/>
+                <a:cs typeface="Courier New" panose="02070309020205020404" pitchFamily="49" charset="0"/>
+              </a:rPr>
+              <a:t>()</a:t>
+            </a:r>
+            <a:r>
+              <a:rPr lang="en-US" dirty="0" smtClean="0"/>
+              <a:t>,</a:t>
+            </a:r>
+            <a:r>
+              <a:rPr lang="en-US" dirty="0" smtClean="0">
+                <a:solidFill>
+                  <a:srgbClr val="000000"/>
+                </a:solidFill>
+                <a:highlight>
+                  <a:srgbClr val="FFFFFF"/>
+                </a:highlight>
+                <a:latin typeface="Courier New" panose="02070309020205020404" pitchFamily="49" charset="0"/>
+                <a:cs typeface="Courier New" panose="02070309020205020404" pitchFamily="49" charset="0"/>
+              </a:rPr>
+              <a:t> </a:t>
+            </a:r>
+            <a:r>
+              <a:rPr lang="en-US" dirty="0"/>
+              <a:t>and </a:t>
+            </a:r>
+            <a:r>
+              <a:rPr lang="en-US" dirty="0" err="1" smtClean="0">
+                <a:solidFill>
+                  <a:srgbClr val="000000"/>
+                </a:solidFill>
+                <a:highlight>
+                  <a:srgbClr val="FFFFFF"/>
+                </a:highlight>
+                <a:latin typeface="Courier New" panose="02070309020205020404" pitchFamily="49" charset="0"/>
+                <a:cs typeface="Courier New" panose="02070309020205020404" pitchFamily="49" charset="0"/>
+              </a:rPr>
+              <a:t>summaryStatistics</a:t>
+            </a:r>
+            <a:r>
+              <a:rPr lang="en-US" b="1" dirty="0" smtClean="0">
+                <a:solidFill>
+                  <a:srgbClr val="000080"/>
+                </a:solidFill>
+                <a:highlight>
+                  <a:srgbClr val="FFFFFF"/>
+                </a:highlight>
+                <a:latin typeface="Courier New" panose="02070309020205020404" pitchFamily="49" charset="0"/>
+                <a:cs typeface="Courier New" panose="02070309020205020404" pitchFamily="49" charset="0"/>
+              </a:rPr>
+              <a:t>()</a:t>
+            </a:r>
+            <a:r>
+              <a:rPr lang="en-US" dirty="0" smtClean="0"/>
+              <a:t>.</a:t>
+            </a:r>
+            <a:endParaRPr lang="en-US" b="1" dirty="0" smtClean="0">
+              <a:solidFill>
+                <a:srgbClr val="000080"/>
+              </a:solidFill>
+              <a:highlight>
+                <a:srgbClr val="FFFFFF"/>
+              </a:highlight>
+              <a:latin typeface="Courier New" panose="02070309020205020404" pitchFamily="49" charset="0"/>
+              <a:cs typeface="Courier New" panose="02070309020205020404" pitchFamily="49" charset="0"/>
+            </a:endParaRPr>
+          </a:p>
+          <a:p>
+            <a:r>
+              <a:rPr lang="en-US" dirty="0" smtClean="0"/>
+              <a:t>Can replace a traditional for loop</a:t>
+            </a:r>
+          </a:p>
+          <a:p>
+            <a:pPr marL="0" indent="0">
+              <a:buNone/>
+            </a:pPr>
+            <a:r>
+              <a:rPr lang="en-US" sz="1650" dirty="0" err="1" smtClean="0">
+                <a:solidFill>
+                  <a:srgbClr val="000000"/>
+                </a:solidFill>
+                <a:highlight>
+                  <a:srgbClr val="FFFFFF"/>
+                </a:highlight>
+                <a:latin typeface="Courier New" panose="02070309020205020404" pitchFamily="49" charset="0"/>
+                <a:cs typeface="Courier New" panose="02070309020205020404" pitchFamily="49" charset="0"/>
+              </a:rPr>
+              <a:t>IntStream</a:t>
+            </a:r>
+            <a:r>
+              <a:rPr lang="en-US" sz="1650" b="1" dirty="0" err="1" smtClean="0">
+                <a:solidFill>
+                  <a:srgbClr val="000080"/>
+                </a:solidFill>
+                <a:highlight>
+                  <a:srgbClr val="FFFFFF"/>
+                </a:highlight>
+                <a:latin typeface="Courier New" panose="02070309020205020404" pitchFamily="49" charset="0"/>
+                <a:cs typeface="Courier New" panose="02070309020205020404" pitchFamily="49" charset="0"/>
+              </a:rPr>
+              <a:t>.</a:t>
+            </a:r>
+            <a:r>
+              <a:rPr lang="en-US" sz="1650" dirty="0" err="1" smtClean="0">
+                <a:solidFill>
+                  <a:srgbClr val="000000"/>
+                </a:solidFill>
+                <a:highlight>
+                  <a:srgbClr val="FFFFFF"/>
+                </a:highlight>
+                <a:latin typeface="Courier New" panose="02070309020205020404" pitchFamily="49" charset="0"/>
+                <a:cs typeface="Courier New" panose="02070309020205020404" pitchFamily="49" charset="0"/>
+              </a:rPr>
+              <a:t>range</a:t>
+            </a:r>
+            <a:r>
+              <a:rPr lang="en-US" sz="1650" b="1" dirty="0" smtClean="0">
+                <a:solidFill>
+                  <a:srgbClr val="000080"/>
+                </a:solidFill>
+                <a:highlight>
+                  <a:srgbClr val="FFFFFF"/>
+                </a:highlight>
+                <a:latin typeface="Courier New" panose="02070309020205020404" pitchFamily="49" charset="0"/>
+                <a:cs typeface="Courier New" panose="02070309020205020404" pitchFamily="49" charset="0"/>
+              </a:rPr>
+              <a:t>(</a:t>
+            </a:r>
+            <a:r>
+              <a:rPr lang="en-US" sz="1650" dirty="0" smtClean="0">
+                <a:solidFill>
+                  <a:srgbClr val="FF8000"/>
+                </a:solidFill>
+                <a:highlight>
+                  <a:srgbClr val="FFFFFF"/>
+                </a:highlight>
+                <a:latin typeface="Courier New" panose="02070309020205020404" pitchFamily="49" charset="0"/>
+                <a:cs typeface="Courier New" panose="02070309020205020404" pitchFamily="49" charset="0"/>
+              </a:rPr>
+              <a:t>0</a:t>
+            </a:r>
+            <a:r>
+              <a:rPr lang="en-US" sz="1650" b="1" dirty="0">
+                <a:solidFill>
+                  <a:srgbClr val="000080"/>
+                </a:solidFill>
+                <a:highlight>
+                  <a:srgbClr val="FFFFFF"/>
+                </a:highlight>
+                <a:latin typeface="Courier New" panose="02070309020205020404" pitchFamily="49" charset="0"/>
+                <a:cs typeface="Courier New" panose="02070309020205020404" pitchFamily="49" charset="0"/>
+              </a:rPr>
+              <a:t>,</a:t>
+            </a:r>
+            <a:r>
+              <a:rPr lang="en-US" sz="1650" dirty="0">
+                <a:solidFill>
+                  <a:srgbClr val="000000"/>
+                </a:solidFill>
+                <a:highlight>
+                  <a:srgbClr val="FFFFFF"/>
+                </a:highlight>
+                <a:latin typeface="Courier New" panose="02070309020205020404" pitchFamily="49" charset="0"/>
+                <a:cs typeface="Courier New" panose="02070309020205020404" pitchFamily="49" charset="0"/>
+              </a:rPr>
+              <a:t> </a:t>
+            </a:r>
+            <a:r>
+              <a:rPr lang="en-US" sz="1650" dirty="0">
+                <a:solidFill>
+                  <a:srgbClr val="FF8000"/>
+                </a:solidFill>
+                <a:highlight>
+                  <a:srgbClr val="FFFFFF"/>
+                </a:highlight>
+                <a:latin typeface="Courier New" panose="02070309020205020404" pitchFamily="49" charset="0"/>
+                <a:cs typeface="Courier New" panose="02070309020205020404" pitchFamily="49" charset="0"/>
+              </a:rPr>
+              <a:t>10</a:t>
+            </a:r>
+            <a:r>
+              <a:rPr lang="en-US" sz="1650" b="1" dirty="0">
+                <a:solidFill>
+                  <a:srgbClr val="000080"/>
+                </a:solidFill>
+                <a:highlight>
+                  <a:srgbClr val="FFFFFF"/>
+                </a:highlight>
+                <a:latin typeface="Courier New" panose="02070309020205020404" pitchFamily="49" charset="0"/>
+                <a:cs typeface="Courier New" panose="02070309020205020404" pitchFamily="49" charset="0"/>
+              </a:rPr>
+              <a:t>).</a:t>
+            </a:r>
+            <a:r>
+              <a:rPr lang="en-US" sz="1650" dirty="0" err="1">
+                <a:solidFill>
+                  <a:srgbClr val="000000"/>
+                </a:solidFill>
+                <a:highlight>
+                  <a:srgbClr val="FFFFFF"/>
+                </a:highlight>
+                <a:latin typeface="Courier New" panose="02070309020205020404" pitchFamily="49" charset="0"/>
+                <a:cs typeface="Courier New" panose="02070309020205020404" pitchFamily="49" charset="0"/>
+              </a:rPr>
+              <a:t>forEach</a:t>
+            </a:r>
+            <a:r>
+              <a:rPr lang="en-US" sz="1650" b="1" dirty="0">
+                <a:solidFill>
+                  <a:srgbClr val="000080"/>
+                </a:solidFill>
+                <a:highlight>
+                  <a:srgbClr val="FFFFFF"/>
+                </a:highlight>
+                <a:latin typeface="Courier New" panose="02070309020205020404" pitchFamily="49" charset="0"/>
+                <a:cs typeface="Courier New" panose="02070309020205020404" pitchFamily="49" charset="0"/>
+              </a:rPr>
+              <a:t>(</a:t>
+            </a:r>
+            <a:r>
+              <a:rPr lang="en-US" sz="1650" dirty="0" err="1">
+                <a:solidFill>
+                  <a:srgbClr val="000000"/>
+                </a:solidFill>
+                <a:highlight>
+                  <a:srgbClr val="FFFFFF"/>
+                </a:highlight>
+                <a:latin typeface="Courier New" panose="02070309020205020404" pitchFamily="49" charset="0"/>
+                <a:cs typeface="Courier New" panose="02070309020205020404" pitchFamily="49" charset="0"/>
+              </a:rPr>
+              <a:t>System</a:t>
+            </a:r>
+            <a:r>
+              <a:rPr lang="en-US" sz="1650" b="1" dirty="0" err="1">
+                <a:solidFill>
+                  <a:srgbClr val="000080"/>
+                </a:solidFill>
+                <a:highlight>
+                  <a:srgbClr val="FFFFFF"/>
+                </a:highlight>
+                <a:latin typeface="Courier New" panose="02070309020205020404" pitchFamily="49" charset="0"/>
+                <a:cs typeface="Courier New" panose="02070309020205020404" pitchFamily="49" charset="0"/>
+              </a:rPr>
+              <a:t>.</a:t>
+            </a:r>
+            <a:r>
+              <a:rPr lang="en-US" sz="1650" dirty="0" err="1">
+                <a:solidFill>
+                  <a:srgbClr val="000000"/>
+                </a:solidFill>
+                <a:highlight>
+                  <a:srgbClr val="FFFFFF"/>
+                </a:highlight>
+                <a:latin typeface="Courier New" panose="02070309020205020404" pitchFamily="49" charset="0"/>
+                <a:cs typeface="Courier New" panose="02070309020205020404" pitchFamily="49" charset="0"/>
+              </a:rPr>
+              <a:t>out</a:t>
+            </a:r>
+            <a:r>
+              <a:rPr lang="en-US" sz="1650" b="1" dirty="0">
+                <a:solidFill>
+                  <a:srgbClr val="000080"/>
+                </a:solidFill>
+                <a:highlight>
+                  <a:srgbClr val="FFFFFF"/>
+                </a:highlight>
+                <a:latin typeface="Courier New" panose="02070309020205020404" pitchFamily="49" charset="0"/>
+                <a:cs typeface="Courier New" panose="02070309020205020404" pitchFamily="49" charset="0"/>
+              </a:rPr>
+              <a:t>::</a:t>
+            </a:r>
+            <a:r>
+              <a:rPr lang="en-US" sz="1650" dirty="0" err="1">
+                <a:solidFill>
+                  <a:srgbClr val="000000"/>
+                </a:solidFill>
+                <a:highlight>
+                  <a:srgbClr val="FFFFFF"/>
+                </a:highlight>
+                <a:latin typeface="Courier New" panose="02070309020205020404" pitchFamily="49" charset="0"/>
+                <a:cs typeface="Courier New" panose="02070309020205020404" pitchFamily="49" charset="0"/>
+              </a:rPr>
+              <a:t>println</a:t>
+            </a:r>
+            <a:r>
+              <a:rPr lang="en-US" sz="1650" b="1" dirty="0">
+                <a:solidFill>
+                  <a:srgbClr val="000080"/>
+                </a:solidFill>
+                <a:highlight>
+                  <a:srgbClr val="FFFFFF"/>
+                </a:highlight>
+                <a:latin typeface="Courier New" panose="02070309020205020404" pitchFamily="49" charset="0"/>
+                <a:cs typeface="Courier New" panose="02070309020205020404" pitchFamily="49" charset="0"/>
+              </a:rPr>
+              <a:t>);</a:t>
+            </a:r>
+            <a:r>
+              <a:rPr lang="en-US" sz="1650" dirty="0">
+                <a:solidFill>
+                  <a:srgbClr val="000000"/>
+                </a:solidFill>
+                <a:highlight>
+                  <a:srgbClr val="FFFFFF"/>
+                </a:highlight>
+                <a:latin typeface="Courier New" panose="02070309020205020404" pitchFamily="49" charset="0"/>
+                <a:cs typeface="Courier New" panose="02070309020205020404" pitchFamily="49" charset="0"/>
+              </a:rPr>
+              <a:t> </a:t>
+            </a:r>
+            <a:r>
+              <a:rPr lang="en-US" sz="1650" dirty="0">
+                <a:solidFill>
+                  <a:srgbClr val="008000"/>
+                </a:solidFill>
+                <a:highlight>
+                  <a:srgbClr val="FFFFFF"/>
+                </a:highlight>
+                <a:latin typeface="Courier New" panose="02070309020205020404" pitchFamily="49" charset="0"/>
+                <a:cs typeface="Courier New" panose="02070309020205020404" pitchFamily="49" charset="0"/>
+              </a:rPr>
+              <a:t>// Print </a:t>
+            </a:r>
+            <a:r>
+              <a:rPr lang="en-US" sz="1650" dirty="0" smtClean="0">
+                <a:solidFill>
+                  <a:srgbClr val="008000"/>
+                </a:solidFill>
+                <a:highlight>
+                  <a:srgbClr val="FFFFFF"/>
+                </a:highlight>
+                <a:latin typeface="Courier New" panose="02070309020205020404" pitchFamily="49" charset="0"/>
+                <a:cs typeface="Courier New" panose="02070309020205020404" pitchFamily="49" charset="0"/>
+              </a:rPr>
+              <a:t>0-9</a:t>
+            </a:r>
+          </a:p>
+          <a:p>
+            <a:r>
+              <a:rPr lang="en-US" dirty="0" smtClean="0"/>
+              <a:t>Use </a:t>
+            </a:r>
+            <a:r>
+              <a:rPr lang="en-US" dirty="0" err="1">
+                <a:solidFill>
+                  <a:srgbClr val="000000"/>
+                </a:solidFill>
+                <a:highlight>
+                  <a:srgbClr val="FFFFFF"/>
+                </a:highlight>
+                <a:latin typeface="Courier New" panose="02070309020205020404" pitchFamily="49" charset="0"/>
+                <a:cs typeface="Courier New" panose="02070309020205020404" pitchFamily="49" charset="0"/>
+              </a:rPr>
+              <a:t>mapToInt</a:t>
+            </a:r>
+            <a:r>
+              <a:rPr lang="en-US" dirty="0"/>
+              <a:t>, </a:t>
+            </a:r>
+            <a:r>
+              <a:rPr lang="en-US" dirty="0" err="1">
+                <a:latin typeface="Courier New" panose="02070309020205020404" pitchFamily="49" charset="0"/>
+                <a:cs typeface="Courier New" panose="02070309020205020404" pitchFamily="49" charset="0"/>
+              </a:rPr>
+              <a:t>mapToLong</a:t>
+            </a:r>
+            <a:r>
+              <a:rPr lang="en-US" dirty="0"/>
+              <a:t>, </a:t>
+            </a:r>
+            <a:r>
+              <a:rPr lang="en-US" dirty="0" err="1" smtClean="0">
+                <a:latin typeface="Courier New" panose="02070309020205020404" pitchFamily="49" charset="0"/>
+                <a:cs typeface="Courier New" panose="02070309020205020404" pitchFamily="49" charset="0"/>
+              </a:rPr>
+              <a:t>mapToDouble</a:t>
+            </a:r>
+            <a:r>
+              <a:rPr lang="en-US" dirty="0" smtClean="0"/>
+              <a:t>, and </a:t>
+            </a:r>
+            <a:r>
+              <a:rPr lang="en-US" dirty="0" err="1" smtClean="0">
+                <a:latin typeface="Courier New" panose="02070309020205020404" pitchFamily="49" charset="0"/>
+                <a:cs typeface="Courier New" panose="02070309020205020404" pitchFamily="49" charset="0"/>
+              </a:rPr>
+              <a:t>mapToObj</a:t>
+            </a:r>
+            <a:r>
+              <a:rPr lang="en-US" dirty="0" smtClean="0">
+                <a:cs typeface="Courier New" panose="02070309020205020404" pitchFamily="49" charset="0"/>
+              </a:rPr>
+              <a:t> to convert an existing stream to an </a:t>
+            </a:r>
+            <a:r>
+              <a:rPr lang="en-US" dirty="0" err="1" smtClean="0">
+                <a:latin typeface="Courier New" panose="02070309020205020404" pitchFamily="49" charset="0"/>
+                <a:cs typeface="Courier New" panose="02070309020205020404" pitchFamily="49" charset="0"/>
+              </a:rPr>
+              <a:t>IntStream</a:t>
+            </a:r>
+            <a:r>
+              <a:rPr lang="en-US" dirty="0"/>
+              <a:t>, </a:t>
+            </a:r>
+            <a:r>
+              <a:rPr lang="en-US" dirty="0" err="1">
+                <a:latin typeface="Courier New" panose="02070309020205020404" pitchFamily="49" charset="0"/>
+                <a:cs typeface="Courier New" panose="02070309020205020404" pitchFamily="49" charset="0"/>
+              </a:rPr>
+              <a:t>LongStream</a:t>
+            </a:r>
+            <a:r>
+              <a:rPr lang="en-US" dirty="0"/>
+              <a:t>, </a:t>
+            </a:r>
+            <a:r>
+              <a:rPr lang="en-US" dirty="0" err="1" smtClean="0">
+                <a:latin typeface="Courier New" panose="02070309020205020404" pitchFamily="49" charset="0"/>
+                <a:cs typeface="Courier New" panose="02070309020205020404" pitchFamily="49" charset="0"/>
+              </a:rPr>
+              <a:t>DoubleStream</a:t>
+            </a:r>
+            <a:r>
+              <a:rPr lang="en-US" dirty="0" smtClean="0"/>
+              <a:t>, </a:t>
+            </a:r>
+            <a:r>
+              <a:rPr lang="en-US" dirty="0"/>
+              <a:t>and </a:t>
+            </a:r>
+            <a:r>
+              <a:rPr lang="en-US" dirty="0" smtClean="0">
+                <a:latin typeface="Courier New" panose="02070309020205020404" pitchFamily="49" charset="0"/>
+                <a:cs typeface="Courier New" panose="02070309020205020404" pitchFamily="49" charset="0"/>
+              </a:rPr>
+              <a:t>Stream</a:t>
+            </a:r>
+            <a:r>
+              <a:rPr lang="en-US" b="1" dirty="0">
+                <a:solidFill>
+                  <a:srgbClr val="000080"/>
+                </a:solidFill>
+                <a:highlight>
+                  <a:srgbClr val="FFFFFF"/>
+                </a:highlight>
+                <a:latin typeface="Courier New" panose="02070309020205020404" pitchFamily="49" charset="0"/>
+                <a:cs typeface="Courier New" panose="02070309020205020404" pitchFamily="49" charset="0"/>
+              </a:rPr>
+              <a:t>&lt;</a:t>
+            </a:r>
+            <a:r>
+              <a:rPr lang="en-US" dirty="0">
+                <a:solidFill>
+                  <a:srgbClr val="000000"/>
+                </a:solidFill>
+                <a:highlight>
+                  <a:srgbClr val="FFFFFF"/>
+                </a:highlight>
+                <a:latin typeface="Courier New" panose="02070309020205020404" pitchFamily="49" charset="0"/>
+                <a:cs typeface="Courier New" panose="02070309020205020404" pitchFamily="49" charset="0"/>
+              </a:rPr>
+              <a:t>T</a:t>
+            </a:r>
+            <a:r>
+              <a:rPr lang="en-US" b="1" dirty="0">
+                <a:solidFill>
+                  <a:srgbClr val="000080"/>
+                </a:solidFill>
+                <a:highlight>
+                  <a:srgbClr val="FFFFFF"/>
+                </a:highlight>
+                <a:latin typeface="Courier New" panose="02070309020205020404" pitchFamily="49" charset="0"/>
+                <a:cs typeface="Courier New" panose="02070309020205020404" pitchFamily="49" charset="0"/>
+              </a:rPr>
+              <a:t>&gt;</a:t>
+            </a:r>
+            <a:r>
+              <a:rPr lang="en-US" dirty="0">
+                <a:solidFill>
+                  <a:schemeClr val="tx1"/>
+                </a:solidFill>
+                <a:highlight>
+                  <a:srgbClr val="FFFFFF"/>
+                </a:highlight>
+                <a:cs typeface="Courier New" panose="02070309020205020404" pitchFamily="49" charset="0"/>
+              </a:rPr>
+              <a:t> </a:t>
+            </a:r>
+            <a:r>
+              <a:rPr lang="en-US" dirty="0" smtClean="0"/>
+              <a:t>respectively.</a:t>
+            </a:r>
+          </a:p>
+          <a:p>
+            <a:r>
+              <a:rPr lang="en-US" dirty="0" smtClean="0"/>
+              <a:t>The </a:t>
+            </a:r>
+            <a:r>
+              <a:rPr lang="en-US" dirty="0" err="1" smtClean="0">
+                <a:latin typeface="Courier New" panose="02070309020205020404" pitchFamily="49" charset="0"/>
+                <a:cs typeface="Courier New" panose="02070309020205020404" pitchFamily="49" charset="0"/>
+              </a:rPr>
+              <a:t>mapToObj</a:t>
+            </a:r>
+            <a:r>
+              <a:rPr lang="en-US" dirty="0">
+                <a:cs typeface="Courier New" panose="02070309020205020404" pitchFamily="49" charset="0"/>
+              </a:rPr>
+              <a:t> </a:t>
+            </a:r>
+            <a:r>
+              <a:rPr lang="en-US" dirty="0" smtClean="0">
+                <a:cs typeface="Courier New" panose="02070309020205020404" pitchFamily="49" charset="0"/>
+              </a:rPr>
+              <a:t>can also convert </a:t>
+            </a:r>
+            <a:r>
+              <a:rPr lang="en-US" dirty="0" smtClean="0">
+                <a:latin typeface="Courier New" panose="02070309020205020404" pitchFamily="49" charset="0"/>
+                <a:cs typeface="Courier New" panose="02070309020205020404" pitchFamily="49" charset="0"/>
+              </a:rPr>
+              <a:t>Stream</a:t>
+            </a:r>
+            <a:r>
+              <a:rPr lang="en-US" b="1" dirty="0">
+                <a:solidFill>
+                  <a:srgbClr val="000080"/>
+                </a:solidFill>
+                <a:highlight>
+                  <a:srgbClr val="FFFFFF"/>
+                </a:highlight>
+                <a:latin typeface="Courier New" panose="02070309020205020404" pitchFamily="49" charset="0"/>
+                <a:cs typeface="Courier New" panose="02070309020205020404" pitchFamily="49" charset="0"/>
+              </a:rPr>
+              <a:t>&lt;</a:t>
+            </a:r>
+            <a:r>
+              <a:rPr lang="en-US" dirty="0">
+                <a:solidFill>
+                  <a:srgbClr val="000000"/>
+                </a:solidFill>
+                <a:highlight>
+                  <a:srgbClr val="FFFFFF"/>
+                </a:highlight>
+                <a:latin typeface="Courier New" panose="02070309020205020404" pitchFamily="49" charset="0"/>
+                <a:cs typeface="Courier New" panose="02070309020205020404" pitchFamily="49" charset="0"/>
+              </a:rPr>
+              <a:t>T</a:t>
+            </a:r>
+            <a:r>
+              <a:rPr lang="en-US" b="1" dirty="0">
+                <a:solidFill>
+                  <a:srgbClr val="000080"/>
+                </a:solidFill>
+                <a:highlight>
+                  <a:srgbClr val="FFFFFF"/>
+                </a:highlight>
+                <a:latin typeface="Courier New" panose="02070309020205020404" pitchFamily="49" charset="0"/>
+                <a:cs typeface="Courier New" panose="02070309020205020404" pitchFamily="49" charset="0"/>
+              </a:rPr>
+              <a:t>&gt;</a:t>
+            </a:r>
+            <a:r>
+              <a:rPr lang="en-US" dirty="0">
+                <a:solidFill>
+                  <a:schemeClr val="tx1"/>
+                </a:solidFill>
+                <a:highlight>
+                  <a:srgbClr val="FFFFFF"/>
+                </a:highlight>
+                <a:cs typeface="Courier New" panose="02070309020205020404" pitchFamily="49" charset="0"/>
+              </a:rPr>
+              <a:t> </a:t>
+            </a:r>
+            <a:r>
+              <a:rPr lang="en-US" dirty="0" smtClean="0">
+                <a:cs typeface="Courier New" panose="02070309020205020404" pitchFamily="49" charset="0"/>
+              </a:rPr>
+              <a:t>to </a:t>
+            </a:r>
+            <a:r>
+              <a:rPr lang="en-US" dirty="0" smtClean="0">
+                <a:latin typeface="Courier New" panose="02070309020205020404" pitchFamily="49" charset="0"/>
+                <a:cs typeface="Courier New" panose="02070309020205020404" pitchFamily="49" charset="0"/>
+              </a:rPr>
+              <a:t>Stream</a:t>
+            </a:r>
+            <a:r>
+              <a:rPr lang="en-US" b="1" dirty="0" smtClean="0">
+                <a:solidFill>
+                  <a:srgbClr val="000080"/>
+                </a:solidFill>
+                <a:highlight>
+                  <a:srgbClr val="FFFFFF"/>
+                </a:highlight>
+                <a:latin typeface="Courier New" panose="02070309020205020404" pitchFamily="49" charset="0"/>
+                <a:cs typeface="Courier New" panose="02070309020205020404" pitchFamily="49" charset="0"/>
+              </a:rPr>
+              <a:t>&lt;</a:t>
+            </a:r>
+            <a:r>
+              <a:rPr lang="en-US" dirty="0" smtClean="0">
+                <a:solidFill>
+                  <a:srgbClr val="000000"/>
+                </a:solidFill>
+                <a:highlight>
+                  <a:srgbClr val="FFFFFF"/>
+                </a:highlight>
+                <a:latin typeface="Courier New" panose="02070309020205020404" pitchFamily="49" charset="0"/>
+                <a:cs typeface="Courier New" panose="02070309020205020404" pitchFamily="49" charset="0"/>
+              </a:rPr>
+              <a:t>R</a:t>
+            </a:r>
+            <a:r>
+              <a:rPr lang="en-US" b="1" dirty="0" smtClean="0">
+                <a:solidFill>
+                  <a:srgbClr val="000080"/>
+                </a:solidFill>
+                <a:highlight>
+                  <a:srgbClr val="FFFFFF"/>
+                </a:highlight>
+                <a:latin typeface="Courier New" panose="02070309020205020404" pitchFamily="49" charset="0"/>
+                <a:cs typeface="Courier New" panose="02070309020205020404" pitchFamily="49" charset="0"/>
+              </a:rPr>
+              <a:t>&gt;</a:t>
+            </a:r>
+            <a:r>
+              <a:rPr lang="en-US" dirty="0" smtClean="0">
+                <a:solidFill>
+                  <a:schemeClr val="tx1"/>
+                </a:solidFill>
+                <a:highlight>
+                  <a:srgbClr val="FFFFFF"/>
+                </a:highlight>
+                <a:cs typeface="Courier New" panose="02070309020205020404" pitchFamily="49" charset="0"/>
+              </a:rPr>
+              <a:t> </a:t>
+            </a:r>
+            <a:r>
+              <a:rPr lang="en-US" dirty="0" smtClean="0"/>
+              <a:t>where </a:t>
+            </a:r>
+            <a:r>
+              <a:rPr lang="en-US" dirty="0" smtClean="0">
+                <a:latin typeface="Courier New" panose="02070309020205020404" pitchFamily="49" charset="0"/>
+                <a:cs typeface="Courier New" panose="02070309020205020404" pitchFamily="49" charset="0"/>
+              </a:rPr>
+              <a:t>T</a:t>
+            </a:r>
+            <a:r>
+              <a:rPr lang="en-US" dirty="0"/>
+              <a:t> and </a:t>
+            </a:r>
+            <a:r>
+              <a:rPr lang="en-US" dirty="0" smtClean="0">
+                <a:latin typeface="Courier New" panose="02070309020205020404" pitchFamily="49" charset="0"/>
+                <a:cs typeface="Courier New" panose="02070309020205020404" pitchFamily="49" charset="0"/>
+              </a:rPr>
+              <a:t>R</a:t>
+            </a:r>
+            <a:r>
+              <a:rPr lang="en-US" dirty="0"/>
+              <a:t> </a:t>
+            </a:r>
+            <a:r>
+              <a:rPr lang="en-US" dirty="0" smtClean="0"/>
+              <a:t>are different types.</a:t>
+            </a:r>
+            <a:endParaRPr lang="en-US" dirty="0">
+              <a:latin typeface="Courier New" panose="02070309020205020404" pitchFamily="49" charset="0"/>
+              <a:cs typeface="Courier New" panose="02070309020205020404" pitchFamily="49" charset="0"/>
+            </a:endParaRPr>
+          </a:p>
+          <a:p>
+            <a:pPr marL="0" indent="0">
+              <a:buNone/>
+            </a:pPr>
+            <a:endParaRPr lang="en-US" sz="1600" dirty="0">
+              <a:latin typeface="Courier New" panose="02070309020205020404" pitchFamily="49" charset="0"/>
+              <a:cs typeface="Courier New" panose="02070309020205020404" pitchFamily="49" charset="0"/>
+            </a:endParaRPr>
           </a:p>
         </p:txBody>
       </p:sp>
     </p:spTree>
     <p:extLst>
       <p:ext uri="{BB962C8B-B14F-4D97-AF65-F5344CB8AC3E}">
-        <p14:creationId xmlns:p14="http://schemas.microsoft.com/office/powerpoint/2010/main" val="3747314882"/>
+        <p14:creationId xmlns:p14="http://schemas.microsoft.com/office/powerpoint/2010/main" val="3790102651"/>
       </p:ext>
     </p:extLst>
   </p:cSld>
@@ -9420,6 +10370,708 @@
     <p:extLst>
       <p:ext uri="{BB962C8B-B14F-4D97-AF65-F5344CB8AC3E}">
         <p14:creationId xmlns:p14="http://schemas.microsoft.com/office/powerpoint/2010/main" val="70859332"/>
+      </p:ext>
+    </p:extLst>
+  </p:cSld>
+  <p:clrMapOvr>
+    <a:masterClrMapping/>
+  </p:clrMapOvr>
+</p:sld>
+</file>
+
+<file path=ppt/slides/slide20.xml><?xml version="1.0" encoding="utf-8"?>
+<p:sld xmlns:a="http://schemas.openxmlformats.org/drawingml/2006/main" xmlns:r="http://schemas.openxmlformats.org/officeDocument/2006/relationships" xmlns:p="http://schemas.openxmlformats.org/presentationml/2006/main">
+  <p:cSld>
+    <p:spTree>
+      <p:nvGrpSpPr>
+        <p:cNvPr id="1" name=""/>
+        <p:cNvGrpSpPr/>
+        <p:nvPr/>
+      </p:nvGrpSpPr>
+      <p:grpSpPr>
+        <a:xfrm>
+          <a:off x="0" y="0"/>
+          <a:ext cx="0" cy="0"/>
+          <a:chOff x="0" y="0"/>
+          <a:chExt cx="0" cy="0"/>
+        </a:xfrm>
+      </p:grpSpPr>
+      <p:sp>
+        <p:nvSpPr>
+          <p:cNvPr id="2" name="Title 1"/>
+          <p:cNvSpPr>
+            <a:spLocks noGrp="1"/>
+          </p:cNvSpPr>
+          <p:nvPr>
+            <p:ph type="title"/>
+          </p:nvPr>
+        </p:nvSpPr>
+        <p:spPr>
+          <a:xfrm>
+            <a:off x="677334" y="609600"/>
+            <a:ext cx="8596668" cy="1376082"/>
+          </a:xfrm>
+        </p:spPr>
+        <p:txBody>
+          <a:bodyPr>
+            <a:normAutofit/>
+          </a:bodyPr>
+          <a:lstStyle/>
+          <a:p>
+            <a:r>
+              <a:rPr lang="en-US" dirty="0" smtClean="0"/>
+              <a:t>New </a:t>
+            </a:r>
+            <a:r>
+              <a:rPr lang="en-US" dirty="0" smtClean="0"/>
+              <a:t>Requirement</a:t>
+            </a:r>
+            <a:br>
+              <a:rPr lang="en-US" dirty="0" smtClean="0"/>
+            </a:br>
+            <a:r>
+              <a:rPr lang="en-US" sz="2400" dirty="0" smtClean="0"/>
+              <a:t>Only Process Numbers divisible by 4</a:t>
+            </a:r>
+            <a:endParaRPr lang="en-US" dirty="0"/>
+          </a:p>
+        </p:txBody>
+      </p:sp>
+      <p:sp>
+        <p:nvSpPr>
+          <p:cNvPr id="3" name="Content Placeholder 2"/>
+          <p:cNvSpPr>
+            <a:spLocks noGrp="1"/>
+          </p:cNvSpPr>
+          <p:nvPr>
+            <p:ph idx="1"/>
+          </p:nvPr>
+        </p:nvSpPr>
+        <p:spPr/>
+        <p:txBody>
+          <a:bodyPr/>
+          <a:lstStyle/>
+          <a:p>
+            <a:r>
+              <a:rPr lang="en-US" dirty="0" smtClean="0"/>
+              <a:t>Only process numbers divisible by 4</a:t>
+            </a:r>
+            <a:r>
+              <a:rPr lang="en-US" dirty="0" smtClean="0"/>
+              <a:t>.</a:t>
+            </a:r>
+          </a:p>
+          <a:p>
+            <a:r>
+              <a:rPr lang="en-US" dirty="0" smtClean="0"/>
+              <a:t>The </a:t>
+            </a:r>
+            <a:r>
+              <a:rPr lang="en-US" dirty="0" smtClean="0">
+                <a:latin typeface="Courier New" panose="02070309020205020404" pitchFamily="49" charset="0"/>
+                <a:cs typeface="Courier New" panose="02070309020205020404" pitchFamily="49" charset="0"/>
+              </a:rPr>
+              <a:t>filter</a:t>
+            </a:r>
+            <a:r>
+              <a:rPr lang="en-US" dirty="0" smtClean="0">
+                <a:cs typeface="Courier New" panose="02070309020205020404" pitchFamily="49" charset="0"/>
+              </a:rPr>
+              <a:t> intermediate operation creates a new stream with the contents of the previous stream where the </a:t>
+            </a:r>
+            <a:r>
+              <a:rPr lang="en-US" dirty="0">
+                <a:solidFill>
+                  <a:srgbClr val="000000"/>
+                </a:solidFill>
+                <a:highlight>
+                  <a:srgbClr val="FFFFFF"/>
+                </a:highlight>
+                <a:latin typeface="Courier New" panose="02070309020205020404" pitchFamily="49" charset="0"/>
+                <a:cs typeface="Courier New" panose="02070309020205020404" pitchFamily="49" charset="0"/>
+              </a:rPr>
+              <a:t>Predicate</a:t>
+            </a:r>
+            <a:r>
+              <a:rPr lang="en-US" b="1" dirty="0">
+                <a:solidFill>
+                  <a:srgbClr val="000080"/>
+                </a:solidFill>
+                <a:highlight>
+                  <a:srgbClr val="FFFFFF"/>
+                </a:highlight>
+                <a:latin typeface="Courier New" panose="02070309020205020404" pitchFamily="49" charset="0"/>
+                <a:cs typeface="Courier New" panose="02070309020205020404" pitchFamily="49" charset="0"/>
+              </a:rPr>
+              <a:t>&lt;</a:t>
+            </a:r>
+            <a:r>
+              <a:rPr lang="en-US" dirty="0">
+                <a:solidFill>
+                  <a:srgbClr val="000000"/>
+                </a:solidFill>
+                <a:highlight>
+                  <a:srgbClr val="FFFFFF"/>
+                </a:highlight>
+                <a:latin typeface="Courier New" panose="02070309020205020404" pitchFamily="49" charset="0"/>
+                <a:cs typeface="Courier New" panose="02070309020205020404" pitchFamily="49" charset="0"/>
+              </a:rPr>
+              <a:t>T</a:t>
+            </a:r>
+            <a:r>
+              <a:rPr lang="en-US" b="1" dirty="0" smtClean="0">
+                <a:solidFill>
+                  <a:srgbClr val="000080"/>
+                </a:solidFill>
+                <a:highlight>
+                  <a:srgbClr val="FFFFFF"/>
+                </a:highlight>
+                <a:latin typeface="Courier New" panose="02070309020205020404" pitchFamily="49" charset="0"/>
+                <a:cs typeface="Courier New" panose="02070309020205020404" pitchFamily="49" charset="0"/>
+              </a:rPr>
+              <a:t>&gt;</a:t>
+            </a:r>
+            <a:r>
+              <a:rPr lang="en-US" dirty="0" smtClean="0">
+                <a:solidFill>
+                  <a:schemeClr val="tx1"/>
+                </a:solidFill>
+                <a:highlight>
+                  <a:srgbClr val="FFFFFF"/>
+                </a:highlight>
+                <a:cs typeface="Courier New" panose="02070309020205020404" pitchFamily="49" charset="0"/>
+              </a:rPr>
+              <a:t> or primitive predicate is </a:t>
+            </a:r>
+            <a:r>
+              <a:rPr lang="en-US" dirty="0" smtClean="0">
+                <a:solidFill>
+                  <a:schemeClr val="tx1"/>
+                </a:solidFill>
+                <a:highlight>
+                  <a:srgbClr val="FFFFFF"/>
+                </a:highlight>
+                <a:latin typeface="Courier New" panose="02070309020205020404" pitchFamily="49" charset="0"/>
+                <a:cs typeface="Courier New" panose="02070309020205020404" pitchFamily="49" charset="0"/>
+              </a:rPr>
+              <a:t>true.</a:t>
+            </a:r>
+          </a:p>
+          <a:p>
+            <a:pPr marL="0" indent="0">
+              <a:buNone/>
+            </a:pPr>
+            <a:r>
+              <a:rPr lang="en-US" dirty="0" err="1">
+                <a:solidFill>
+                  <a:srgbClr val="8000FF"/>
+                </a:solidFill>
+                <a:latin typeface="Courier New" panose="02070309020205020404" pitchFamily="49" charset="0"/>
+              </a:rPr>
+              <a:t>int</a:t>
+            </a:r>
+            <a:r>
+              <a:rPr lang="en-US" dirty="0">
+                <a:solidFill>
+                  <a:srgbClr val="000000"/>
+                </a:solidFill>
+                <a:latin typeface="Courier New" panose="02070309020205020404" pitchFamily="49" charset="0"/>
+              </a:rPr>
+              <a:t> sum </a:t>
+            </a:r>
+            <a:r>
+              <a:rPr lang="en-US" b="1" dirty="0">
+                <a:solidFill>
+                  <a:srgbClr val="000080"/>
+                </a:solidFill>
+                <a:latin typeface="Courier New" panose="02070309020205020404" pitchFamily="49" charset="0"/>
+              </a:rPr>
+              <a:t>=</a:t>
+            </a:r>
+            <a:r>
+              <a:rPr lang="en-US" dirty="0">
+                <a:solidFill>
+                  <a:srgbClr val="000000"/>
+                </a:solidFill>
+                <a:latin typeface="Courier New" panose="02070309020205020404" pitchFamily="49" charset="0"/>
+              </a:rPr>
+              <a:t> </a:t>
+            </a:r>
+            <a:r>
+              <a:rPr lang="en-US" dirty="0" err="1">
+                <a:solidFill>
+                  <a:srgbClr val="000000"/>
+                </a:solidFill>
+                <a:latin typeface="Courier New" panose="02070309020205020404" pitchFamily="49" charset="0"/>
+              </a:rPr>
+              <a:t>IntStream</a:t>
+            </a:r>
+            <a:r>
+              <a:rPr lang="en-US" b="1" dirty="0" err="1">
+                <a:solidFill>
+                  <a:srgbClr val="000080"/>
+                </a:solidFill>
+                <a:latin typeface="Courier New" panose="02070309020205020404" pitchFamily="49" charset="0"/>
+              </a:rPr>
+              <a:t>.</a:t>
+            </a:r>
+            <a:r>
+              <a:rPr lang="en-US" dirty="0" err="1">
+                <a:solidFill>
+                  <a:srgbClr val="000000"/>
+                </a:solidFill>
+                <a:latin typeface="Courier New" panose="02070309020205020404" pitchFamily="49" charset="0"/>
+              </a:rPr>
+              <a:t>range</a:t>
+            </a:r>
+            <a:r>
+              <a:rPr lang="en-US" b="1" dirty="0">
+                <a:solidFill>
+                  <a:srgbClr val="000080"/>
+                </a:solidFill>
+                <a:latin typeface="Courier New" panose="02070309020205020404" pitchFamily="49" charset="0"/>
+              </a:rPr>
+              <a:t>(</a:t>
+            </a:r>
+            <a:r>
+              <a:rPr lang="en-US" dirty="0">
+                <a:solidFill>
+                  <a:srgbClr val="FF8000"/>
+                </a:solidFill>
+                <a:latin typeface="Courier New" panose="02070309020205020404" pitchFamily="49" charset="0"/>
+              </a:rPr>
+              <a:t>0</a:t>
+            </a:r>
+            <a:r>
+              <a:rPr lang="en-US" b="1" dirty="0">
+                <a:solidFill>
+                  <a:srgbClr val="000080"/>
+                </a:solidFill>
+                <a:latin typeface="Courier New" panose="02070309020205020404" pitchFamily="49" charset="0"/>
+              </a:rPr>
+              <a:t>,</a:t>
+            </a:r>
+            <a:r>
+              <a:rPr lang="en-US" dirty="0">
+                <a:solidFill>
+                  <a:srgbClr val="000000"/>
+                </a:solidFill>
+                <a:latin typeface="Courier New" panose="02070309020205020404" pitchFamily="49" charset="0"/>
+              </a:rPr>
+              <a:t> </a:t>
+            </a:r>
+            <a:r>
+              <a:rPr lang="en-US" dirty="0">
+                <a:solidFill>
+                  <a:srgbClr val="FF8000"/>
+                </a:solidFill>
+                <a:latin typeface="Courier New" panose="02070309020205020404" pitchFamily="49" charset="0"/>
+              </a:rPr>
+              <a:t>1000</a:t>
+            </a:r>
+            <a:r>
+              <a:rPr lang="en-US" b="1" dirty="0">
+                <a:solidFill>
+                  <a:srgbClr val="000080"/>
+                </a:solidFill>
+                <a:latin typeface="Courier New" panose="02070309020205020404" pitchFamily="49" charset="0"/>
+              </a:rPr>
+              <a:t>)</a:t>
+            </a:r>
+            <a:r>
+              <a:rPr lang="en-US" dirty="0">
+                <a:solidFill>
+                  <a:srgbClr val="000000"/>
+                </a:solidFill>
+                <a:latin typeface="Courier New" panose="02070309020205020404" pitchFamily="49" charset="0"/>
+              </a:rPr>
+              <a:t> </a:t>
+            </a:r>
+            <a:r>
+              <a:rPr lang="en-US" dirty="0">
+                <a:solidFill>
+                  <a:srgbClr val="008000"/>
+                </a:solidFill>
+                <a:latin typeface="Courier New" panose="02070309020205020404" pitchFamily="49" charset="0"/>
+              </a:rPr>
+              <a:t>// Data </a:t>
+            </a:r>
+            <a:r>
+              <a:rPr lang="en-US" dirty="0" smtClean="0">
+                <a:solidFill>
+                  <a:srgbClr val="008000"/>
+                </a:solidFill>
+                <a:latin typeface="Courier New" panose="02070309020205020404" pitchFamily="49" charset="0"/>
+              </a:rPr>
+              <a:t>Source</a:t>
+            </a:r>
+          </a:p>
+          <a:p>
+            <a:pPr marL="0" indent="0">
+              <a:buNone/>
+            </a:pPr>
+            <a:r>
+              <a:rPr lang="en-US" b="1" dirty="0" smtClean="0">
+                <a:solidFill>
+                  <a:srgbClr val="000080"/>
+                </a:solidFill>
+                <a:latin typeface="Courier New" panose="02070309020205020404" pitchFamily="49" charset="0"/>
+              </a:rPr>
+              <a:t>.</a:t>
+            </a:r>
+            <a:r>
+              <a:rPr lang="en-US" dirty="0" smtClean="0">
+                <a:solidFill>
+                  <a:srgbClr val="000000"/>
+                </a:solidFill>
+                <a:latin typeface="Courier New" panose="02070309020205020404" pitchFamily="49" charset="0"/>
+              </a:rPr>
+              <a:t>filter</a:t>
+            </a:r>
+            <a:r>
+              <a:rPr lang="en-US" b="1" dirty="0" smtClean="0">
+                <a:solidFill>
+                  <a:srgbClr val="000080"/>
+                </a:solidFill>
+                <a:latin typeface="Courier New" panose="02070309020205020404" pitchFamily="49" charset="0"/>
+              </a:rPr>
+              <a:t>(</a:t>
+            </a:r>
+            <a:r>
+              <a:rPr lang="en-US" dirty="0" err="1" smtClean="0">
+                <a:solidFill>
+                  <a:srgbClr val="000000"/>
+                </a:solidFill>
+                <a:latin typeface="Courier New" panose="02070309020205020404" pitchFamily="49" charset="0"/>
+              </a:rPr>
+              <a:t>i</a:t>
+            </a:r>
+            <a:r>
+              <a:rPr lang="en-US" dirty="0" smtClean="0">
+                <a:solidFill>
+                  <a:srgbClr val="000000"/>
+                </a:solidFill>
+                <a:latin typeface="Courier New" panose="02070309020205020404" pitchFamily="49" charset="0"/>
+              </a:rPr>
+              <a:t> </a:t>
+            </a:r>
+            <a:r>
+              <a:rPr lang="en-US" b="1" dirty="0">
+                <a:solidFill>
+                  <a:srgbClr val="000080"/>
+                </a:solidFill>
+                <a:latin typeface="Courier New" panose="02070309020205020404" pitchFamily="49" charset="0"/>
+              </a:rPr>
+              <a:t>-&gt;</a:t>
+            </a:r>
+            <a:r>
+              <a:rPr lang="en-US" dirty="0">
+                <a:solidFill>
+                  <a:srgbClr val="000000"/>
+                </a:solidFill>
+                <a:latin typeface="Courier New" panose="02070309020205020404" pitchFamily="49" charset="0"/>
+              </a:rPr>
+              <a:t> </a:t>
+            </a:r>
+            <a:r>
+              <a:rPr lang="en-US" dirty="0" err="1">
+                <a:solidFill>
+                  <a:srgbClr val="000000"/>
+                </a:solidFill>
+                <a:latin typeface="Courier New" panose="02070309020205020404" pitchFamily="49" charset="0"/>
+              </a:rPr>
+              <a:t>i</a:t>
+            </a:r>
+            <a:r>
+              <a:rPr lang="en-US" dirty="0">
+                <a:solidFill>
+                  <a:srgbClr val="000000"/>
+                </a:solidFill>
+                <a:latin typeface="Courier New" panose="02070309020205020404" pitchFamily="49" charset="0"/>
+              </a:rPr>
+              <a:t> </a:t>
+            </a:r>
+            <a:r>
+              <a:rPr lang="en-US" b="1" dirty="0" smtClean="0">
+                <a:solidFill>
+                  <a:srgbClr val="000080"/>
+                </a:solidFill>
+                <a:latin typeface="Courier New" panose="02070309020205020404" pitchFamily="49" charset="0"/>
+              </a:rPr>
+              <a:t>% </a:t>
+            </a:r>
+            <a:r>
+              <a:rPr lang="en-US" dirty="0" smtClean="0">
+                <a:solidFill>
+                  <a:srgbClr val="FF8000"/>
+                </a:solidFill>
+                <a:latin typeface="Courier New" panose="02070309020205020404" pitchFamily="49" charset="0"/>
+              </a:rPr>
+              <a:t>4</a:t>
+            </a:r>
+            <a:r>
+              <a:rPr lang="en-US" dirty="0" smtClean="0">
+                <a:solidFill>
+                  <a:srgbClr val="000000"/>
+                </a:solidFill>
+                <a:latin typeface="Courier New" panose="02070309020205020404" pitchFamily="49" charset="0"/>
+              </a:rPr>
+              <a:t> </a:t>
+            </a:r>
+            <a:r>
+              <a:rPr lang="en-US" b="1" dirty="0">
+                <a:solidFill>
+                  <a:srgbClr val="000080"/>
+                </a:solidFill>
+                <a:latin typeface="Courier New" panose="02070309020205020404" pitchFamily="49" charset="0"/>
+              </a:rPr>
+              <a:t>==</a:t>
+            </a:r>
+            <a:r>
+              <a:rPr lang="en-US" dirty="0">
+                <a:solidFill>
+                  <a:srgbClr val="000000"/>
+                </a:solidFill>
+                <a:latin typeface="Courier New" panose="02070309020205020404" pitchFamily="49" charset="0"/>
+              </a:rPr>
+              <a:t> </a:t>
+            </a:r>
+            <a:r>
+              <a:rPr lang="en-US" dirty="0">
+                <a:solidFill>
+                  <a:srgbClr val="FF8000"/>
+                </a:solidFill>
+                <a:latin typeface="Courier New" panose="02070309020205020404" pitchFamily="49" charset="0"/>
+              </a:rPr>
+              <a:t>0</a:t>
+            </a:r>
+            <a:r>
+              <a:rPr lang="en-US" b="1" dirty="0">
+                <a:solidFill>
+                  <a:srgbClr val="000080"/>
+                </a:solidFill>
+                <a:latin typeface="Courier New" panose="02070309020205020404" pitchFamily="49" charset="0"/>
+              </a:rPr>
+              <a:t>)</a:t>
+            </a:r>
+            <a:r>
+              <a:rPr lang="en-US" dirty="0">
+                <a:solidFill>
+                  <a:srgbClr val="000000"/>
+                </a:solidFill>
+                <a:latin typeface="Courier New" panose="02070309020205020404" pitchFamily="49" charset="0"/>
+              </a:rPr>
+              <a:t> </a:t>
+            </a:r>
+            <a:r>
+              <a:rPr lang="en-US" dirty="0">
+                <a:solidFill>
+                  <a:srgbClr val="008000"/>
+                </a:solidFill>
+                <a:latin typeface="Courier New" panose="02070309020205020404" pitchFamily="49" charset="0"/>
+              </a:rPr>
+              <a:t>// Intermediate </a:t>
+            </a:r>
+            <a:r>
+              <a:rPr lang="en-US" dirty="0" smtClean="0">
+                <a:solidFill>
+                  <a:srgbClr val="008000"/>
+                </a:solidFill>
+                <a:latin typeface="Courier New" panose="02070309020205020404" pitchFamily="49" charset="0"/>
+              </a:rPr>
+              <a:t>Operation</a:t>
+            </a:r>
+          </a:p>
+          <a:p>
+            <a:pPr marL="0" indent="0">
+              <a:buNone/>
+            </a:pPr>
+            <a:r>
+              <a:rPr lang="en-US" b="1" dirty="0" smtClean="0">
+                <a:solidFill>
+                  <a:srgbClr val="000080"/>
+                </a:solidFill>
+                <a:latin typeface="Courier New" panose="02070309020205020404" pitchFamily="49" charset="0"/>
+              </a:rPr>
+              <a:t>.</a:t>
+            </a:r>
+            <a:r>
+              <a:rPr lang="en-US" dirty="0" smtClean="0">
+                <a:solidFill>
+                  <a:srgbClr val="000000"/>
+                </a:solidFill>
+                <a:latin typeface="Courier New" panose="02070309020205020404" pitchFamily="49" charset="0"/>
+              </a:rPr>
+              <a:t>sum</a:t>
+            </a:r>
+            <a:r>
+              <a:rPr lang="en-US" b="1" dirty="0">
+                <a:solidFill>
+                  <a:srgbClr val="000080"/>
+                </a:solidFill>
+                <a:latin typeface="Courier New" panose="02070309020205020404" pitchFamily="49" charset="0"/>
+              </a:rPr>
+              <a:t>();</a:t>
+            </a:r>
+            <a:r>
+              <a:rPr lang="en-US" dirty="0">
+                <a:solidFill>
+                  <a:srgbClr val="000000"/>
+                </a:solidFill>
+                <a:latin typeface="Courier New" panose="02070309020205020404" pitchFamily="49" charset="0"/>
+              </a:rPr>
+              <a:t> </a:t>
+            </a:r>
+            <a:r>
+              <a:rPr lang="en-US" dirty="0">
+                <a:solidFill>
+                  <a:srgbClr val="008000"/>
+                </a:solidFill>
+                <a:latin typeface="Courier New" panose="02070309020205020404" pitchFamily="49" charset="0"/>
+              </a:rPr>
+              <a:t>// Reduction - Terminal </a:t>
+            </a:r>
+            <a:r>
+              <a:rPr lang="en-US" dirty="0" smtClean="0">
+                <a:solidFill>
+                  <a:srgbClr val="008000"/>
+                </a:solidFill>
+                <a:latin typeface="Courier New" panose="02070309020205020404" pitchFamily="49" charset="0"/>
+              </a:rPr>
+              <a:t>Operation</a:t>
+            </a:r>
+          </a:p>
+          <a:p>
+            <a:pPr marL="0" indent="0">
+              <a:buNone/>
+            </a:pPr>
+            <a:r>
+              <a:rPr lang="en-US" dirty="0" err="1" smtClean="0">
+                <a:solidFill>
+                  <a:srgbClr val="000000"/>
+                </a:solidFill>
+                <a:latin typeface="Courier New" panose="02070309020205020404" pitchFamily="49" charset="0"/>
+              </a:rPr>
+              <a:t>System</a:t>
+            </a:r>
+            <a:r>
+              <a:rPr lang="en-US" b="1" dirty="0" err="1" smtClean="0">
+                <a:solidFill>
+                  <a:srgbClr val="000080"/>
+                </a:solidFill>
+                <a:latin typeface="Courier New" panose="02070309020205020404" pitchFamily="49" charset="0"/>
+              </a:rPr>
+              <a:t>.</a:t>
+            </a:r>
+            <a:r>
+              <a:rPr lang="en-US" dirty="0" err="1" smtClean="0">
+                <a:solidFill>
+                  <a:srgbClr val="000000"/>
+                </a:solidFill>
+                <a:latin typeface="Courier New" panose="02070309020205020404" pitchFamily="49" charset="0"/>
+              </a:rPr>
+              <a:t>out</a:t>
+            </a:r>
+            <a:r>
+              <a:rPr lang="en-US" b="1" dirty="0" err="1" smtClean="0">
+                <a:solidFill>
+                  <a:srgbClr val="000080"/>
+                </a:solidFill>
+                <a:latin typeface="Courier New" panose="02070309020205020404" pitchFamily="49" charset="0"/>
+              </a:rPr>
+              <a:t>.</a:t>
+            </a:r>
+            <a:r>
+              <a:rPr lang="en-US" dirty="0" err="1" smtClean="0">
+                <a:solidFill>
+                  <a:srgbClr val="000000"/>
+                </a:solidFill>
+                <a:latin typeface="Courier New" panose="02070309020205020404" pitchFamily="49" charset="0"/>
+              </a:rPr>
+              <a:t>println</a:t>
+            </a:r>
+            <a:r>
+              <a:rPr lang="en-US" b="1" dirty="0" smtClean="0">
+                <a:solidFill>
+                  <a:srgbClr val="000080"/>
+                </a:solidFill>
+                <a:latin typeface="Courier New" panose="02070309020205020404" pitchFamily="49" charset="0"/>
+              </a:rPr>
+              <a:t>(</a:t>
+            </a:r>
+            <a:r>
+              <a:rPr lang="en-US" dirty="0" smtClean="0">
+                <a:solidFill>
+                  <a:srgbClr val="000000"/>
+                </a:solidFill>
+                <a:latin typeface="Courier New" panose="02070309020205020404" pitchFamily="49" charset="0"/>
+              </a:rPr>
+              <a:t>sum</a:t>
+            </a:r>
+            <a:r>
+              <a:rPr lang="en-US" b="1" dirty="0">
+                <a:solidFill>
+                  <a:srgbClr val="000080"/>
+                </a:solidFill>
+                <a:latin typeface="Courier New" panose="02070309020205020404" pitchFamily="49" charset="0"/>
+              </a:rPr>
+              <a:t>);</a:t>
+            </a:r>
+            <a:r>
+              <a:rPr lang="en-US" dirty="0">
+                <a:solidFill>
+                  <a:srgbClr val="000000"/>
+                </a:solidFill>
+                <a:latin typeface="Courier New" panose="02070309020205020404" pitchFamily="49" charset="0"/>
+              </a:rPr>
+              <a:t> </a:t>
+            </a:r>
+            <a:r>
+              <a:rPr lang="en-US" dirty="0">
+                <a:solidFill>
+                  <a:srgbClr val="008000"/>
+                </a:solidFill>
+                <a:latin typeface="Courier New" panose="02070309020205020404" pitchFamily="49" charset="0"/>
+              </a:rPr>
+              <a:t>// 124500 </a:t>
+            </a:r>
+            <a:endParaRPr lang="en-US" dirty="0"/>
+          </a:p>
+          <a:p>
+            <a:pPr marL="0" indent="0">
+              <a:buNone/>
+            </a:pPr>
+            <a:endParaRPr lang="en-US" dirty="0">
+              <a:solidFill>
+                <a:srgbClr val="000000"/>
+              </a:solidFill>
+              <a:latin typeface="Courier New" panose="02070309020205020404" pitchFamily="49" charset="0"/>
+            </a:endParaRPr>
+          </a:p>
+          <a:p>
+            <a:endParaRPr lang="en-US" dirty="0" smtClean="0">
+              <a:solidFill>
+                <a:schemeClr val="tx1"/>
+              </a:solidFill>
+              <a:highlight>
+                <a:srgbClr val="FFFFFF"/>
+              </a:highlight>
+              <a:latin typeface="Courier New" panose="02070309020205020404" pitchFamily="49" charset="0"/>
+              <a:cs typeface="Courier New" panose="02070309020205020404" pitchFamily="49" charset="0"/>
+            </a:endParaRPr>
+          </a:p>
+          <a:p>
+            <a:endParaRPr lang="en-US" dirty="0">
+              <a:latin typeface="Courier New" panose="02070309020205020404" pitchFamily="49" charset="0"/>
+              <a:cs typeface="Courier New" panose="02070309020205020404" pitchFamily="49" charset="0"/>
+            </a:endParaRPr>
+          </a:p>
+        </p:txBody>
+      </p:sp>
+    </p:spTree>
+    <p:extLst>
+      <p:ext uri="{BB962C8B-B14F-4D97-AF65-F5344CB8AC3E}">
+        <p14:creationId xmlns:p14="http://schemas.microsoft.com/office/powerpoint/2010/main" val="3747314882"/>
       </p:ext>
     </p:extLst>
   </p:cSld>

</xml_diff>

<commit_message>
Add example for constructor method reference.  Add StreamCollect.java and StreamGroupJoin.java.
</commit_message>
<xml_diff>
--- a/Learning to Love the Lambda in the Stream.pptx
+++ b/Learning to Love the Lambda in the Stream.pptx
@@ -918,7 +918,7 @@
             <a:fld id="{B61BEF0D-F0BB-DE4B-95CE-6DB70DBA9567}" type="datetimeFigureOut">
               <a:rPr lang="en-US" dirty="0"/>
               <a:pPr/>
-              <a:t>5/14/2017</a:t>
+              <a:t>5/15/2017</a:t>
             </a:fld>
             <a:endParaRPr lang="en-US" dirty="0"/>
           </a:p>
@@ -1166,7 +1166,7 @@
             <a:fld id="{B61BEF0D-F0BB-DE4B-95CE-6DB70DBA9567}" type="datetimeFigureOut">
               <a:rPr lang="en-US" dirty="0"/>
               <a:pPr/>
-              <a:t>5/14/2017</a:t>
+              <a:t>5/15/2017</a:t>
             </a:fld>
             <a:endParaRPr lang="en-US" dirty="0"/>
           </a:p>
@@ -1477,7 +1477,7 @@
             <a:fld id="{B61BEF0D-F0BB-DE4B-95CE-6DB70DBA9567}" type="datetimeFigureOut">
               <a:rPr lang="en-US" dirty="0"/>
               <a:pPr/>
-              <a:t>5/14/2017</a:t>
+              <a:t>5/15/2017</a:t>
             </a:fld>
             <a:endParaRPr lang="en-US" dirty="0"/>
           </a:p>
@@ -1815,7 +1815,7 @@
             <a:fld id="{B61BEF0D-F0BB-DE4B-95CE-6DB70DBA9567}" type="datetimeFigureOut">
               <a:rPr lang="en-US" dirty="0"/>
               <a:pPr/>
-              <a:t>5/14/2017</a:t>
+              <a:t>5/15/2017</a:t>
             </a:fld>
             <a:endParaRPr lang="en-US" dirty="0"/>
           </a:p>
@@ -2126,7 +2126,7 @@
             <a:fld id="{B61BEF0D-F0BB-DE4B-95CE-6DB70DBA9567}" type="datetimeFigureOut">
               <a:rPr lang="en-US" dirty="0"/>
               <a:pPr/>
-              <a:t>5/14/2017</a:t>
+              <a:t>5/15/2017</a:t>
             </a:fld>
             <a:endParaRPr lang="en-US" dirty="0"/>
           </a:p>
@@ -2516,7 +2516,7 @@
             <a:fld id="{B61BEF0D-F0BB-DE4B-95CE-6DB70DBA9567}" type="datetimeFigureOut">
               <a:rPr lang="en-US" dirty="0"/>
               <a:pPr/>
-              <a:t>5/14/2017</a:t>
+              <a:t>5/15/2017</a:t>
             </a:fld>
             <a:endParaRPr lang="en-US" dirty="0"/>
           </a:p>
@@ -2682,7 +2682,7 @@
           <a:p>
             <a:fld id="{55C6B4A9-1611-4792-9094-5F34BCA07E0B}" type="datetimeFigureOut">
               <a:rPr lang="en-US" dirty="0"/>
-              <a:t>5/14/2017</a:t>
+              <a:t>5/15/2017</a:t>
             </a:fld>
             <a:endParaRPr lang="en-US" dirty="0"/>
           </a:p>
@@ -2858,7 +2858,7 @@
             <a:fld id="{B61BEF0D-F0BB-DE4B-95CE-6DB70DBA9567}" type="datetimeFigureOut">
               <a:rPr lang="en-US" dirty="0"/>
               <a:pPr/>
-              <a:t>5/14/2017</a:t>
+              <a:t>5/15/2017</a:t>
             </a:fld>
             <a:endParaRPr lang="en-US" dirty="0"/>
           </a:p>
@@ -3031,7 +3031,7 @@
             <a:fld id="{B61BEF0D-F0BB-DE4B-95CE-6DB70DBA9567}" type="datetimeFigureOut">
               <a:rPr lang="en-US" dirty="0"/>
               <a:pPr/>
-              <a:t>5/14/2017</a:t>
+              <a:t>5/15/2017</a:t>
             </a:fld>
             <a:endParaRPr lang="en-US" dirty="0"/>
           </a:p>
@@ -3275,7 +3275,7 @@
             <a:fld id="{B61BEF0D-F0BB-DE4B-95CE-6DB70DBA9567}" type="datetimeFigureOut">
               <a:rPr lang="en-US" dirty="0"/>
               <a:pPr/>
-              <a:t>5/14/2017</a:t>
+              <a:t>5/15/2017</a:t>
             </a:fld>
             <a:endParaRPr lang="en-US" dirty="0"/>
           </a:p>
@@ -3503,7 +3503,7 @@
           <a:p>
             <a:fld id="{EB712588-04B1-427B-82EE-E8DB90309F08}" type="datetimeFigureOut">
               <a:rPr lang="en-US" dirty="0"/>
-              <a:t>5/14/2017</a:t>
+              <a:t>5/15/2017</a:t>
             </a:fld>
             <a:endParaRPr lang="en-US" dirty="0"/>
           </a:p>
@@ -3873,7 +3873,7 @@
             <a:fld id="{B61BEF0D-F0BB-DE4B-95CE-6DB70DBA9567}" type="datetimeFigureOut">
               <a:rPr lang="en-US" dirty="0"/>
               <a:pPr/>
-              <a:t>5/14/2017</a:t>
+              <a:t>5/15/2017</a:t>
             </a:fld>
             <a:endParaRPr lang="en-US" dirty="0"/>
           </a:p>
@@ -3993,7 +3993,7 @@
             <a:fld id="{B61BEF0D-F0BB-DE4B-95CE-6DB70DBA9567}" type="datetimeFigureOut">
               <a:rPr lang="en-US" dirty="0"/>
               <a:pPr/>
-              <a:t>5/14/2017</a:t>
+              <a:t>5/15/2017</a:t>
             </a:fld>
             <a:endParaRPr lang="en-US" dirty="0"/>
           </a:p>
@@ -4085,7 +4085,7 @@
             <a:fld id="{B61BEF0D-F0BB-DE4B-95CE-6DB70DBA9567}" type="datetimeFigureOut">
               <a:rPr lang="en-US" dirty="0"/>
               <a:pPr/>
-              <a:t>5/14/2017</a:t>
+              <a:t>5/15/2017</a:t>
             </a:fld>
             <a:endParaRPr lang="en-US" dirty="0"/>
           </a:p>
@@ -4336,7 +4336,7 @@
           <a:p>
             <a:fld id="{42A54C80-263E-416B-A8E0-580EDEADCBDC}" type="datetimeFigureOut">
               <a:rPr lang="en-US" dirty="0"/>
-              <a:t>5/14/2017</a:t>
+              <a:t>5/15/2017</a:t>
             </a:fld>
             <a:endParaRPr lang="en-US" dirty="0"/>
           </a:p>
@@ -4595,7 +4595,7 @@
             <a:fld id="{B61BEF0D-F0BB-DE4B-95CE-6DB70DBA9567}" type="datetimeFigureOut">
               <a:rPr lang="en-US" dirty="0"/>
               <a:pPr/>
-              <a:t>5/14/2017</a:t>
+              <a:t>5/15/2017</a:t>
             </a:fld>
             <a:endParaRPr lang="en-US" dirty="0"/>
           </a:p>
@@ -5335,7 +5335,7 @@
             <a:fld id="{B61BEF0D-F0BB-DE4B-95CE-6DB70DBA9567}" type="datetimeFigureOut">
               <a:rPr lang="en-US" dirty="0"/>
               <a:pPr/>
-              <a:t>5/14/2017</a:t>
+              <a:t>5/15/2017</a:t>
             </a:fld>
             <a:endParaRPr lang="en-US" dirty="0"/>
           </a:p>
@@ -19885,8 +19885,8 @@
         </p:nvSpPr>
         <p:spPr>
           <a:xfrm>
-            <a:off x="533400" y="2160589"/>
-            <a:ext cx="8740602" cy="4316411"/>
+            <a:off x="461683" y="1367118"/>
+            <a:ext cx="8740602" cy="5123329"/>
           </a:xfrm>
         </p:spPr>
         <p:txBody>
@@ -20334,14 +20334,179 @@
           <a:p>
             <a:r>
               <a:rPr lang="en-US" dirty="0" smtClean="0"/>
-              <a:t>For all other cases, each argument is passed into the method in order.</a:t>
-            </a:r>
-            <a:endParaRPr lang="en-US" dirty="0"/>
+              <a:t>For all other cases, each argument is passed into the method in order</a:t>
+            </a:r>
+            <a:r>
+              <a:rPr lang="en-US" dirty="0" smtClean="0"/>
+              <a:t>.  The constructor </a:t>
+            </a:r>
+            <a:r>
+              <a:rPr lang="en-US" dirty="0" smtClean="0"/>
+              <a:t>returns a new instance of the class it is called on.</a:t>
+            </a:r>
           </a:p>
           <a:p>
             <a:pPr marL="0" indent="0">
               <a:buNone/>
             </a:pPr>
+            <a:r>
+              <a:rPr lang="en-US" dirty="0">
+                <a:solidFill>
+                  <a:srgbClr val="000000"/>
+                </a:solidFill>
+                <a:latin typeface="Courier New" panose="02070309020205020404" pitchFamily="49" charset="0"/>
+              </a:rPr>
+              <a:t>Supplier</a:t>
+            </a:r>
+            <a:r>
+              <a:rPr lang="en-US" b="1" dirty="0">
+                <a:solidFill>
+                  <a:srgbClr val="000080"/>
+                </a:solidFill>
+                <a:latin typeface="Courier New" panose="02070309020205020404" pitchFamily="49" charset="0"/>
+              </a:rPr>
+              <a:t>&lt;</a:t>
+            </a:r>
+            <a:r>
+              <a:rPr lang="en-US" dirty="0" err="1">
+                <a:solidFill>
+                  <a:srgbClr val="000000"/>
+                </a:solidFill>
+                <a:latin typeface="Courier New" panose="02070309020205020404" pitchFamily="49" charset="0"/>
+              </a:rPr>
+              <a:t>StringBuilder</a:t>
+            </a:r>
+            <a:r>
+              <a:rPr lang="en-US" b="1" dirty="0">
+                <a:solidFill>
+                  <a:srgbClr val="000080"/>
+                </a:solidFill>
+                <a:latin typeface="Courier New" panose="02070309020205020404" pitchFamily="49" charset="0"/>
+              </a:rPr>
+              <a:t>&gt;</a:t>
+            </a:r>
+            <a:r>
+              <a:rPr lang="en-US" dirty="0">
+                <a:solidFill>
+                  <a:srgbClr val="000000"/>
+                </a:solidFill>
+                <a:latin typeface="Courier New" panose="02070309020205020404" pitchFamily="49" charset="0"/>
+              </a:rPr>
+              <a:t> </a:t>
+            </a:r>
+            <a:r>
+              <a:rPr lang="en-US" dirty="0" err="1">
+                <a:solidFill>
+                  <a:srgbClr val="000000"/>
+                </a:solidFill>
+                <a:latin typeface="Courier New" panose="02070309020205020404" pitchFamily="49" charset="0"/>
+              </a:rPr>
+              <a:t>supp</a:t>
+            </a:r>
+            <a:r>
+              <a:rPr lang="en-US" dirty="0">
+                <a:solidFill>
+                  <a:srgbClr val="000000"/>
+                </a:solidFill>
+                <a:latin typeface="Courier New" panose="02070309020205020404" pitchFamily="49" charset="0"/>
+              </a:rPr>
+              <a:t> </a:t>
+            </a:r>
+            <a:r>
+              <a:rPr lang="en-US" b="1" dirty="0">
+                <a:solidFill>
+                  <a:srgbClr val="000080"/>
+                </a:solidFill>
+                <a:latin typeface="Courier New" panose="02070309020205020404" pitchFamily="49" charset="0"/>
+              </a:rPr>
+              <a:t>=</a:t>
+            </a:r>
+            <a:r>
+              <a:rPr lang="en-US" dirty="0">
+                <a:solidFill>
+                  <a:srgbClr val="000000"/>
+                </a:solidFill>
+                <a:latin typeface="Courier New" panose="02070309020205020404" pitchFamily="49" charset="0"/>
+              </a:rPr>
+              <a:t> </a:t>
+            </a:r>
+            <a:r>
+              <a:rPr lang="en-US" dirty="0" err="1">
+                <a:solidFill>
+                  <a:srgbClr val="000000"/>
+                </a:solidFill>
+                <a:latin typeface="Courier New" panose="02070309020205020404" pitchFamily="49" charset="0"/>
+              </a:rPr>
+              <a:t>StringBuilder</a:t>
+            </a:r>
+            <a:r>
+              <a:rPr lang="en-US" b="1" dirty="0">
+                <a:solidFill>
+                  <a:srgbClr val="000080"/>
+                </a:solidFill>
+                <a:latin typeface="Courier New" panose="02070309020205020404" pitchFamily="49" charset="0"/>
+              </a:rPr>
+              <a:t>::</a:t>
+            </a:r>
+            <a:r>
+              <a:rPr lang="en-US" b="1" dirty="0">
+                <a:solidFill>
+                  <a:srgbClr val="0000FF"/>
+                </a:solidFill>
+                <a:latin typeface="Courier New" panose="02070309020205020404" pitchFamily="49" charset="0"/>
+              </a:rPr>
+              <a:t>new</a:t>
+            </a:r>
+            <a:r>
+              <a:rPr lang="en-US" b="1" dirty="0" smtClean="0">
+                <a:solidFill>
+                  <a:srgbClr val="000080"/>
+                </a:solidFill>
+                <a:latin typeface="Courier New" panose="02070309020205020404" pitchFamily="49" charset="0"/>
+              </a:rPr>
+              <a:t>;</a:t>
+            </a:r>
+          </a:p>
+          <a:p>
+            <a:pPr marL="0" indent="0">
+              <a:buNone/>
+            </a:pPr>
+            <a:r>
+              <a:rPr lang="en-US" dirty="0">
+                <a:solidFill>
+                  <a:srgbClr val="008000"/>
+                </a:solidFill>
+                <a:latin typeface="Courier New" panose="02070309020205020404" pitchFamily="49" charset="0"/>
+              </a:rPr>
+              <a:t>// Creates a new empty </a:t>
+            </a:r>
+            <a:r>
+              <a:rPr lang="en-US" dirty="0" err="1">
+                <a:solidFill>
+                  <a:srgbClr val="008000"/>
+                </a:solidFill>
+                <a:latin typeface="Courier New" panose="02070309020205020404" pitchFamily="49" charset="0"/>
+              </a:rPr>
+              <a:t>StringBuilder</a:t>
+            </a:r>
+            <a:r>
+              <a:rPr lang="en-US" dirty="0">
+                <a:solidFill>
+                  <a:srgbClr val="008000"/>
+                </a:solidFill>
+                <a:latin typeface="Courier New" panose="02070309020205020404" pitchFamily="49" charset="0"/>
+              </a:rPr>
+              <a:t>.</a:t>
+            </a:r>
+            <a:endParaRPr lang="en-US" dirty="0"/>
+          </a:p>
+          <a:p>
+            <a:pPr marL="0" indent="0">
+              <a:buNone/>
+            </a:pPr>
+            <a:endParaRPr lang="en-US" dirty="0" smtClean="0"/>
+          </a:p>
+          <a:p>
             <a:endParaRPr lang="en-US" dirty="0"/>
           </a:p>
         </p:txBody>

</xml_diff>

<commit_message>
Final updates and presenter notes for Code PaLOUsa 2017
</commit_message>
<xml_diff>
--- a/Learning to Love the Lambda in the Stream.pptx
+++ b/Learning to Love the Lambda in the Stream.pptx
@@ -4,6 +4,9 @@
   <p:sldMasterIdLst>
     <p:sldMasterId id="2147483648" r:id="rId1"/>
   </p:sldMasterIdLst>
+  <p:notesMasterIdLst>
+    <p:notesMasterId r:id="rId39"/>
+  </p:notesMasterIdLst>
   <p:sldIdLst>
     <p:sldId id="256" r:id="rId2"/>
     <p:sldId id="261" r:id="rId3"/>
@@ -215,6 +218,2621 @@
     </p:ext>
   </p:extLst>
 </p:presentation>
+</file>
+
+<file path=ppt/notesMasters/notesMaster1.xml><?xml version="1.0" encoding="utf-8"?>
+<p:notesMaster xmlns:a="http://schemas.openxmlformats.org/drawingml/2006/main" xmlns:r="http://schemas.openxmlformats.org/officeDocument/2006/relationships" xmlns:p="http://schemas.openxmlformats.org/presentationml/2006/main">
+  <p:cSld>
+    <p:bg>
+      <p:bgRef idx="1001">
+        <a:schemeClr val="bg1"/>
+      </p:bgRef>
+    </p:bg>
+    <p:spTree>
+      <p:nvGrpSpPr>
+        <p:cNvPr id="1" name=""/>
+        <p:cNvGrpSpPr/>
+        <p:nvPr/>
+      </p:nvGrpSpPr>
+      <p:grpSpPr>
+        <a:xfrm>
+          <a:off x="0" y="0"/>
+          <a:ext cx="0" cy="0"/>
+          <a:chOff x="0" y="0"/>
+          <a:chExt cx="0" cy="0"/>
+        </a:xfrm>
+      </p:grpSpPr>
+      <p:sp>
+        <p:nvSpPr>
+          <p:cNvPr id="2" name="Header Placeholder 1"/>
+          <p:cNvSpPr>
+            <a:spLocks noGrp="1"/>
+          </p:cNvSpPr>
+          <p:nvPr>
+            <p:ph type="hdr" sz="quarter"/>
+          </p:nvPr>
+        </p:nvSpPr>
+        <p:spPr>
+          <a:xfrm>
+            <a:off x="0" y="0"/>
+            <a:ext cx="2971800" cy="458788"/>
+          </a:xfrm>
+          <a:prstGeom prst="rect">
+            <a:avLst/>
+          </a:prstGeom>
+        </p:spPr>
+        <p:txBody>
+          <a:bodyPr vert="horz" lIns="91440" tIns="45720" rIns="91440" bIns="45720" rtlCol="0"/>
+          <a:lstStyle>
+            <a:lvl1pPr algn="l">
+              <a:defRPr sz="1200"/>
+            </a:lvl1pPr>
+          </a:lstStyle>
+          <a:p>
+            <a:endParaRPr lang="en-US"/>
+          </a:p>
+        </p:txBody>
+      </p:sp>
+      <p:sp>
+        <p:nvSpPr>
+          <p:cNvPr id="3" name="Date Placeholder 2"/>
+          <p:cNvSpPr>
+            <a:spLocks noGrp="1"/>
+          </p:cNvSpPr>
+          <p:nvPr>
+            <p:ph type="dt" idx="1"/>
+          </p:nvPr>
+        </p:nvSpPr>
+        <p:spPr>
+          <a:xfrm>
+            <a:off x="3884613" y="0"/>
+            <a:ext cx="2971800" cy="458788"/>
+          </a:xfrm>
+          <a:prstGeom prst="rect">
+            <a:avLst/>
+          </a:prstGeom>
+        </p:spPr>
+        <p:txBody>
+          <a:bodyPr vert="horz" lIns="91440" tIns="45720" rIns="91440" bIns="45720" rtlCol="0"/>
+          <a:lstStyle>
+            <a:lvl1pPr algn="r">
+              <a:defRPr sz="1200"/>
+            </a:lvl1pPr>
+          </a:lstStyle>
+          <a:p>
+            <a:fld id="{00F927AF-B093-4AD4-B894-C7B744C95185}" type="datetimeFigureOut">
+              <a:rPr lang="en-US" smtClean="0"/>
+              <a:t>6/8/2017</a:t>
+            </a:fld>
+            <a:endParaRPr lang="en-US"/>
+          </a:p>
+        </p:txBody>
+      </p:sp>
+      <p:sp>
+        <p:nvSpPr>
+          <p:cNvPr id="4" name="Slide Image Placeholder 3"/>
+          <p:cNvSpPr>
+            <a:spLocks noGrp="1" noRot="1" noChangeAspect="1"/>
+          </p:cNvSpPr>
+          <p:nvPr>
+            <p:ph type="sldImg" idx="2"/>
+          </p:nvPr>
+        </p:nvSpPr>
+        <p:spPr>
+          <a:xfrm>
+            <a:off x="685800" y="1143000"/>
+            <a:ext cx="5486400" cy="3086100"/>
+          </a:xfrm>
+          <a:prstGeom prst="rect">
+            <a:avLst/>
+          </a:prstGeom>
+          <a:noFill/>
+          <a:ln w="12700">
+            <a:solidFill>
+              <a:prstClr val="black"/>
+            </a:solidFill>
+          </a:ln>
+        </p:spPr>
+        <p:txBody>
+          <a:bodyPr vert="horz" lIns="91440" tIns="45720" rIns="91440" bIns="45720" rtlCol="0" anchor="ctr"/>
+          <a:lstStyle/>
+          <a:p>
+            <a:endParaRPr lang="en-US"/>
+          </a:p>
+        </p:txBody>
+      </p:sp>
+      <p:sp>
+        <p:nvSpPr>
+          <p:cNvPr id="5" name="Notes Placeholder 4"/>
+          <p:cNvSpPr>
+            <a:spLocks noGrp="1"/>
+          </p:cNvSpPr>
+          <p:nvPr>
+            <p:ph type="body" sz="quarter" idx="3"/>
+          </p:nvPr>
+        </p:nvSpPr>
+        <p:spPr>
+          <a:xfrm>
+            <a:off x="685800" y="4400550"/>
+            <a:ext cx="5486400" cy="3600450"/>
+          </a:xfrm>
+          <a:prstGeom prst="rect">
+            <a:avLst/>
+          </a:prstGeom>
+        </p:spPr>
+        <p:txBody>
+          <a:bodyPr vert="horz" lIns="91440" tIns="45720" rIns="91440" bIns="45720" rtlCol="0"/>
+          <a:lstStyle/>
+          <a:p>
+            <a:pPr lvl="0"/>
+            <a:r>
+              <a:rPr lang="en-US" smtClean="0"/>
+              <a:t>Click to edit Master text styles</a:t>
+            </a:r>
+          </a:p>
+          <a:p>
+            <a:pPr lvl="1"/>
+            <a:r>
+              <a:rPr lang="en-US" smtClean="0"/>
+              <a:t>Second level</a:t>
+            </a:r>
+          </a:p>
+          <a:p>
+            <a:pPr lvl="2"/>
+            <a:r>
+              <a:rPr lang="en-US" smtClean="0"/>
+              <a:t>Third level</a:t>
+            </a:r>
+          </a:p>
+          <a:p>
+            <a:pPr lvl="3"/>
+            <a:r>
+              <a:rPr lang="en-US" smtClean="0"/>
+              <a:t>Fourth level</a:t>
+            </a:r>
+          </a:p>
+          <a:p>
+            <a:pPr lvl="4"/>
+            <a:r>
+              <a:rPr lang="en-US" smtClean="0"/>
+              <a:t>Fifth level</a:t>
+            </a:r>
+            <a:endParaRPr lang="en-US"/>
+          </a:p>
+        </p:txBody>
+      </p:sp>
+      <p:sp>
+        <p:nvSpPr>
+          <p:cNvPr id="6" name="Footer Placeholder 5"/>
+          <p:cNvSpPr>
+            <a:spLocks noGrp="1"/>
+          </p:cNvSpPr>
+          <p:nvPr>
+            <p:ph type="ftr" sz="quarter" idx="4"/>
+          </p:nvPr>
+        </p:nvSpPr>
+        <p:spPr>
+          <a:xfrm>
+            <a:off x="0" y="8685213"/>
+            <a:ext cx="2971800" cy="458787"/>
+          </a:xfrm>
+          <a:prstGeom prst="rect">
+            <a:avLst/>
+          </a:prstGeom>
+        </p:spPr>
+        <p:txBody>
+          <a:bodyPr vert="horz" lIns="91440" tIns="45720" rIns="91440" bIns="45720" rtlCol="0" anchor="b"/>
+          <a:lstStyle>
+            <a:lvl1pPr algn="l">
+              <a:defRPr sz="1200"/>
+            </a:lvl1pPr>
+          </a:lstStyle>
+          <a:p>
+            <a:endParaRPr lang="en-US"/>
+          </a:p>
+        </p:txBody>
+      </p:sp>
+      <p:sp>
+        <p:nvSpPr>
+          <p:cNvPr id="7" name="Slide Number Placeholder 6"/>
+          <p:cNvSpPr>
+            <a:spLocks noGrp="1"/>
+          </p:cNvSpPr>
+          <p:nvPr>
+            <p:ph type="sldNum" sz="quarter" idx="5"/>
+          </p:nvPr>
+        </p:nvSpPr>
+        <p:spPr>
+          <a:xfrm>
+            <a:off x="3884613" y="8685213"/>
+            <a:ext cx="2971800" cy="458787"/>
+          </a:xfrm>
+          <a:prstGeom prst="rect">
+            <a:avLst/>
+          </a:prstGeom>
+        </p:spPr>
+        <p:txBody>
+          <a:bodyPr vert="horz" lIns="91440" tIns="45720" rIns="91440" bIns="45720" rtlCol="0" anchor="b"/>
+          <a:lstStyle>
+            <a:lvl1pPr algn="r">
+              <a:defRPr sz="1200"/>
+            </a:lvl1pPr>
+          </a:lstStyle>
+          <a:p>
+            <a:fld id="{9B9A5078-34A5-4200-8953-1FDEE337BA82}" type="slidenum">
+              <a:rPr lang="en-US" smtClean="0"/>
+              <a:t>‹#›</a:t>
+            </a:fld>
+            <a:endParaRPr lang="en-US"/>
+          </a:p>
+        </p:txBody>
+      </p:sp>
+    </p:spTree>
+    <p:extLst>
+      <p:ext uri="{BB962C8B-B14F-4D97-AF65-F5344CB8AC3E}">
+        <p14:creationId xmlns:p14="http://schemas.microsoft.com/office/powerpoint/2010/main" val="1970358324"/>
+      </p:ext>
+    </p:extLst>
+  </p:cSld>
+  <p:clrMap bg1="lt1" tx1="dk1" bg2="lt2" tx2="dk2" accent1="accent1" accent2="accent2" accent3="accent3" accent4="accent4" accent5="accent5" accent6="accent6" hlink="hlink" folHlink="folHlink"/>
+  <p:notesStyle>
+    <a:lvl1pPr marL="0" algn="l" defTabSz="914400" rtl="0" eaLnBrk="1" latinLnBrk="0" hangingPunct="1">
+      <a:defRPr sz="1200" kern="1200">
+        <a:solidFill>
+          <a:schemeClr val="tx1"/>
+        </a:solidFill>
+        <a:latin typeface="+mn-lt"/>
+        <a:ea typeface="+mn-ea"/>
+        <a:cs typeface="+mn-cs"/>
+      </a:defRPr>
+    </a:lvl1pPr>
+    <a:lvl2pPr marL="457200" algn="l" defTabSz="914400" rtl="0" eaLnBrk="1" latinLnBrk="0" hangingPunct="1">
+      <a:defRPr sz="1200" kern="1200">
+        <a:solidFill>
+          <a:schemeClr val="tx1"/>
+        </a:solidFill>
+        <a:latin typeface="+mn-lt"/>
+        <a:ea typeface="+mn-ea"/>
+        <a:cs typeface="+mn-cs"/>
+      </a:defRPr>
+    </a:lvl2pPr>
+    <a:lvl3pPr marL="914400" algn="l" defTabSz="914400" rtl="0" eaLnBrk="1" latinLnBrk="0" hangingPunct="1">
+      <a:defRPr sz="1200" kern="1200">
+        <a:solidFill>
+          <a:schemeClr val="tx1"/>
+        </a:solidFill>
+        <a:latin typeface="+mn-lt"/>
+        <a:ea typeface="+mn-ea"/>
+        <a:cs typeface="+mn-cs"/>
+      </a:defRPr>
+    </a:lvl3pPr>
+    <a:lvl4pPr marL="1371600" algn="l" defTabSz="914400" rtl="0" eaLnBrk="1" latinLnBrk="0" hangingPunct="1">
+      <a:defRPr sz="1200" kern="1200">
+        <a:solidFill>
+          <a:schemeClr val="tx1"/>
+        </a:solidFill>
+        <a:latin typeface="+mn-lt"/>
+        <a:ea typeface="+mn-ea"/>
+        <a:cs typeface="+mn-cs"/>
+      </a:defRPr>
+    </a:lvl4pPr>
+    <a:lvl5pPr marL="1828800" algn="l" defTabSz="914400" rtl="0" eaLnBrk="1" latinLnBrk="0" hangingPunct="1">
+      <a:defRPr sz="1200" kern="1200">
+        <a:solidFill>
+          <a:schemeClr val="tx1"/>
+        </a:solidFill>
+        <a:latin typeface="+mn-lt"/>
+        <a:ea typeface="+mn-ea"/>
+        <a:cs typeface="+mn-cs"/>
+      </a:defRPr>
+    </a:lvl5pPr>
+    <a:lvl6pPr marL="2286000" algn="l" defTabSz="914400" rtl="0" eaLnBrk="1" latinLnBrk="0" hangingPunct="1">
+      <a:defRPr sz="1200" kern="1200">
+        <a:solidFill>
+          <a:schemeClr val="tx1"/>
+        </a:solidFill>
+        <a:latin typeface="+mn-lt"/>
+        <a:ea typeface="+mn-ea"/>
+        <a:cs typeface="+mn-cs"/>
+      </a:defRPr>
+    </a:lvl6pPr>
+    <a:lvl7pPr marL="2743200" algn="l" defTabSz="914400" rtl="0" eaLnBrk="1" latinLnBrk="0" hangingPunct="1">
+      <a:defRPr sz="1200" kern="1200">
+        <a:solidFill>
+          <a:schemeClr val="tx1"/>
+        </a:solidFill>
+        <a:latin typeface="+mn-lt"/>
+        <a:ea typeface="+mn-ea"/>
+        <a:cs typeface="+mn-cs"/>
+      </a:defRPr>
+    </a:lvl7pPr>
+    <a:lvl8pPr marL="3200400" algn="l" defTabSz="914400" rtl="0" eaLnBrk="1" latinLnBrk="0" hangingPunct="1">
+      <a:defRPr sz="1200" kern="1200">
+        <a:solidFill>
+          <a:schemeClr val="tx1"/>
+        </a:solidFill>
+        <a:latin typeface="+mn-lt"/>
+        <a:ea typeface="+mn-ea"/>
+        <a:cs typeface="+mn-cs"/>
+      </a:defRPr>
+    </a:lvl8pPr>
+    <a:lvl9pPr marL="3657600" algn="l" defTabSz="914400" rtl="0" eaLnBrk="1" latinLnBrk="0" hangingPunct="1">
+      <a:defRPr sz="1200" kern="1200">
+        <a:solidFill>
+          <a:schemeClr val="tx1"/>
+        </a:solidFill>
+        <a:latin typeface="+mn-lt"/>
+        <a:ea typeface="+mn-ea"/>
+        <a:cs typeface="+mn-cs"/>
+      </a:defRPr>
+    </a:lvl9pPr>
+  </p:notesStyle>
+</p:notesMaster>
+</file>
+
+<file path=ppt/notesSlides/notesSlide1.xml><?xml version="1.0" encoding="utf-8"?>
+<p:notes xmlns:a="http://schemas.openxmlformats.org/drawingml/2006/main" xmlns:r="http://schemas.openxmlformats.org/officeDocument/2006/relationships" xmlns:p="http://schemas.openxmlformats.org/presentationml/2006/main">
+  <p:cSld>
+    <p:spTree>
+      <p:nvGrpSpPr>
+        <p:cNvPr id="1" name=""/>
+        <p:cNvGrpSpPr/>
+        <p:nvPr/>
+      </p:nvGrpSpPr>
+      <p:grpSpPr>
+        <a:xfrm>
+          <a:off x="0" y="0"/>
+          <a:ext cx="0" cy="0"/>
+          <a:chOff x="0" y="0"/>
+          <a:chExt cx="0" cy="0"/>
+        </a:xfrm>
+      </p:grpSpPr>
+      <p:sp>
+        <p:nvSpPr>
+          <p:cNvPr id="2" name="Slide Image Placeholder 1"/>
+          <p:cNvSpPr>
+            <a:spLocks noGrp="1" noRot="1" noChangeAspect="1"/>
+          </p:cNvSpPr>
+          <p:nvPr>
+            <p:ph type="sldImg"/>
+          </p:nvPr>
+        </p:nvSpPr>
+        <p:spPr/>
+      </p:sp>
+      <p:sp>
+        <p:nvSpPr>
+          <p:cNvPr id="3" name="Notes Placeholder 2"/>
+          <p:cNvSpPr>
+            <a:spLocks noGrp="1"/>
+          </p:cNvSpPr>
+          <p:nvPr>
+            <p:ph type="body" idx="1"/>
+          </p:nvPr>
+        </p:nvSpPr>
+        <p:spPr/>
+        <p:txBody>
+          <a:bodyPr/>
+          <a:lstStyle/>
+          <a:p>
+            <a:r>
+              <a:rPr lang="en-US" dirty="0" smtClean="0"/>
+              <a:t>Ask who has heard</a:t>
+            </a:r>
+            <a:r>
+              <a:rPr lang="en-US" baseline="0" dirty="0" smtClean="0"/>
+              <a:t> of DXC technology.  Sparse response might build case as to why DXC should sponsor Code </a:t>
+            </a:r>
+            <a:r>
+              <a:rPr lang="en-US" baseline="0" dirty="0" err="1" smtClean="0"/>
+              <a:t>PaLOUsa</a:t>
+            </a:r>
+            <a:r>
+              <a:rPr lang="en-US" baseline="0" dirty="0" smtClean="0"/>
+              <a:t> in future.</a:t>
+            </a:r>
+            <a:endParaRPr lang="en-US" dirty="0"/>
+          </a:p>
+        </p:txBody>
+      </p:sp>
+      <p:sp>
+        <p:nvSpPr>
+          <p:cNvPr id="4" name="Slide Number Placeholder 3"/>
+          <p:cNvSpPr>
+            <a:spLocks noGrp="1"/>
+          </p:cNvSpPr>
+          <p:nvPr>
+            <p:ph type="sldNum" sz="quarter" idx="10"/>
+          </p:nvPr>
+        </p:nvSpPr>
+        <p:spPr/>
+        <p:txBody>
+          <a:bodyPr/>
+          <a:lstStyle/>
+          <a:p>
+            <a:fld id="{9B9A5078-34A5-4200-8953-1FDEE337BA82}" type="slidenum">
+              <a:rPr lang="en-US" smtClean="0"/>
+              <a:t>2</a:t>
+            </a:fld>
+            <a:endParaRPr lang="en-US"/>
+          </a:p>
+        </p:txBody>
+      </p:sp>
+    </p:spTree>
+    <p:extLst>
+      <p:ext uri="{BB962C8B-B14F-4D97-AF65-F5344CB8AC3E}">
+        <p14:creationId xmlns:p14="http://schemas.microsoft.com/office/powerpoint/2010/main" val="4188218854"/>
+      </p:ext>
+    </p:extLst>
+  </p:cSld>
+  <p:clrMapOvr>
+    <a:masterClrMapping/>
+  </p:clrMapOvr>
+</p:notes>
+</file>
+
+<file path=ppt/notesSlides/notesSlide10.xml><?xml version="1.0" encoding="utf-8"?>
+<p:notes xmlns:a="http://schemas.openxmlformats.org/drawingml/2006/main" xmlns:r="http://schemas.openxmlformats.org/officeDocument/2006/relationships" xmlns:p="http://schemas.openxmlformats.org/presentationml/2006/main">
+  <p:cSld>
+    <p:spTree>
+      <p:nvGrpSpPr>
+        <p:cNvPr id="1" name=""/>
+        <p:cNvGrpSpPr/>
+        <p:nvPr/>
+      </p:nvGrpSpPr>
+      <p:grpSpPr>
+        <a:xfrm>
+          <a:off x="0" y="0"/>
+          <a:ext cx="0" cy="0"/>
+          <a:chOff x="0" y="0"/>
+          <a:chExt cx="0" cy="0"/>
+        </a:xfrm>
+      </p:grpSpPr>
+      <p:sp>
+        <p:nvSpPr>
+          <p:cNvPr id="2" name="Slide Image Placeholder 1"/>
+          <p:cNvSpPr>
+            <a:spLocks noGrp="1" noRot="1" noChangeAspect="1"/>
+          </p:cNvSpPr>
+          <p:nvPr>
+            <p:ph type="sldImg"/>
+          </p:nvPr>
+        </p:nvSpPr>
+        <p:spPr/>
+      </p:sp>
+      <p:sp>
+        <p:nvSpPr>
+          <p:cNvPr id="3" name="Notes Placeholder 2"/>
+          <p:cNvSpPr>
+            <a:spLocks noGrp="1"/>
+          </p:cNvSpPr>
+          <p:nvPr>
+            <p:ph type="body" idx="1"/>
+          </p:nvPr>
+        </p:nvSpPr>
+        <p:spPr/>
+        <p:txBody>
+          <a:bodyPr/>
+          <a:lstStyle/>
+          <a:p>
+            <a:r>
+              <a:rPr lang="en-US" dirty="0" smtClean="0"/>
+              <a:t>Lambdas and FIs</a:t>
+            </a:r>
+            <a:r>
+              <a:rPr lang="en-US" baseline="0" dirty="0" smtClean="0"/>
+              <a:t> can be used as lightweight building blocks for pattern based development: instead of needing a constellation of classes to implement various factories, the Supplier FI and lambdas can do the job instead.</a:t>
+            </a:r>
+            <a:endParaRPr lang="en-US" dirty="0"/>
+          </a:p>
+        </p:txBody>
+      </p:sp>
+      <p:sp>
+        <p:nvSpPr>
+          <p:cNvPr id="4" name="Slide Number Placeholder 3"/>
+          <p:cNvSpPr>
+            <a:spLocks noGrp="1"/>
+          </p:cNvSpPr>
+          <p:nvPr>
+            <p:ph type="sldNum" sz="quarter" idx="10"/>
+          </p:nvPr>
+        </p:nvSpPr>
+        <p:spPr/>
+        <p:txBody>
+          <a:bodyPr/>
+          <a:lstStyle/>
+          <a:p>
+            <a:fld id="{9B9A5078-34A5-4200-8953-1FDEE337BA82}" type="slidenum">
+              <a:rPr lang="en-US" smtClean="0"/>
+              <a:t>12</a:t>
+            </a:fld>
+            <a:endParaRPr lang="en-US"/>
+          </a:p>
+        </p:txBody>
+      </p:sp>
+    </p:spTree>
+    <p:extLst>
+      <p:ext uri="{BB962C8B-B14F-4D97-AF65-F5344CB8AC3E}">
+        <p14:creationId xmlns:p14="http://schemas.microsoft.com/office/powerpoint/2010/main" val="1304488161"/>
+      </p:ext>
+    </p:extLst>
+  </p:cSld>
+  <p:clrMapOvr>
+    <a:masterClrMapping/>
+  </p:clrMapOvr>
+</p:notes>
+</file>
+
+<file path=ppt/notesSlides/notesSlide11.xml><?xml version="1.0" encoding="utf-8"?>
+<p:notes xmlns:a="http://schemas.openxmlformats.org/drawingml/2006/main" xmlns:r="http://schemas.openxmlformats.org/officeDocument/2006/relationships" xmlns:p="http://schemas.openxmlformats.org/presentationml/2006/main">
+  <p:cSld>
+    <p:spTree>
+      <p:nvGrpSpPr>
+        <p:cNvPr id="1" name=""/>
+        <p:cNvGrpSpPr/>
+        <p:nvPr/>
+      </p:nvGrpSpPr>
+      <p:grpSpPr>
+        <a:xfrm>
+          <a:off x="0" y="0"/>
+          <a:ext cx="0" cy="0"/>
+          <a:chOff x="0" y="0"/>
+          <a:chExt cx="0" cy="0"/>
+        </a:xfrm>
+      </p:grpSpPr>
+      <p:sp>
+        <p:nvSpPr>
+          <p:cNvPr id="2" name="Slide Image Placeholder 1"/>
+          <p:cNvSpPr>
+            <a:spLocks noGrp="1" noRot="1" noChangeAspect="1"/>
+          </p:cNvSpPr>
+          <p:nvPr>
+            <p:ph type="sldImg"/>
+          </p:nvPr>
+        </p:nvSpPr>
+        <p:spPr/>
+      </p:sp>
+      <p:sp>
+        <p:nvSpPr>
+          <p:cNvPr id="3" name="Notes Placeholder 2"/>
+          <p:cNvSpPr>
+            <a:spLocks noGrp="1"/>
+          </p:cNvSpPr>
+          <p:nvPr>
+            <p:ph type="body" idx="1"/>
+          </p:nvPr>
+        </p:nvSpPr>
+        <p:spPr/>
+        <p:txBody>
+          <a:bodyPr/>
+          <a:lstStyle/>
+          <a:p>
+            <a:r>
+              <a:rPr lang="en-US" dirty="0" smtClean="0"/>
+              <a:t>There are many variations of primitive</a:t>
+            </a:r>
+            <a:r>
+              <a:rPr lang="en-US" baseline="0" dirty="0" smtClean="0"/>
+              <a:t> Functions because the cross product of going to and from each primitive are supported.</a:t>
+            </a:r>
+            <a:endParaRPr lang="en-US" dirty="0"/>
+          </a:p>
+        </p:txBody>
+      </p:sp>
+      <p:sp>
+        <p:nvSpPr>
+          <p:cNvPr id="4" name="Slide Number Placeholder 3"/>
+          <p:cNvSpPr>
+            <a:spLocks noGrp="1"/>
+          </p:cNvSpPr>
+          <p:nvPr>
+            <p:ph type="sldNum" sz="quarter" idx="10"/>
+          </p:nvPr>
+        </p:nvSpPr>
+        <p:spPr/>
+        <p:txBody>
+          <a:bodyPr/>
+          <a:lstStyle/>
+          <a:p>
+            <a:fld id="{9B9A5078-34A5-4200-8953-1FDEE337BA82}" type="slidenum">
+              <a:rPr lang="en-US" smtClean="0"/>
+              <a:t>13</a:t>
+            </a:fld>
+            <a:endParaRPr lang="en-US"/>
+          </a:p>
+        </p:txBody>
+      </p:sp>
+    </p:spTree>
+    <p:extLst>
+      <p:ext uri="{BB962C8B-B14F-4D97-AF65-F5344CB8AC3E}">
+        <p14:creationId xmlns:p14="http://schemas.microsoft.com/office/powerpoint/2010/main" val="1758702557"/>
+      </p:ext>
+    </p:extLst>
+  </p:cSld>
+  <p:clrMapOvr>
+    <a:masterClrMapping/>
+  </p:clrMapOvr>
+</p:notes>
+</file>
+
+<file path=ppt/notesSlides/notesSlide12.xml><?xml version="1.0" encoding="utf-8"?>
+<p:notes xmlns:a="http://schemas.openxmlformats.org/drawingml/2006/main" xmlns:r="http://schemas.openxmlformats.org/officeDocument/2006/relationships" xmlns:p="http://schemas.openxmlformats.org/presentationml/2006/main">
+  <p:cSld>
+    <p:spTree>
+      <p:nvGrpSpPr>
+        <p:cNvPr id="1" name=""/>
+        <p:cNvGrpSpPr/>
+        <p:nvPr/>
+      </p:nvGrpSpPr>
+      <p:grpSpPr>
+        <a:xfrm>
+          <a:off x="0" y="0"/>
+          <a:ext cx="0" cy="0"/>
+          <a:chOff x="0" y="0"/>
+          <a:chExt cx="0" cy="0"/>
+        </a:xfrm>
+      </p:grpSpPr>
+      <p:sp>
+        <p:nvSpPr>
+          <p:cNvPr id="2" name="Slide Image Placeholder 1"/>
+          <p:cNvSpPr>
+            <a:spLocks noGrp="1" noRot="1" noChangeAspect="1"/>
+          </p:cNvSpPr>
+          <p:nvPr>
+            <p:ph type="sldImg"/>
+          </p:nvPr>
+        </p:nvSpPr>
+        <p:spPr/>
+      </p:sp>
+      <p:sp>
+        <p:nvSpPr>
+          <p:cNvPr id="3" name="Notes Placeholder 2"/>
+          <p:cNvSpPr>
+            <a:spLocks noGrp="1"/>
+          </p:cNvSpPr>
+          <p:nvPr>
+            <p:ph type="body" idx="1"/>
+          </p:nvPr>
+        </p:nvSpPr>
+        <p:spPr/>
+        <p:txBody>
+          <a:bodyPr/>
+          <a:lstStyle/>
+          <a:p>
+            <a:r>
+              <a:rPr lang="en-US" dirty="0" smtClean="0"/>
+              <a:t>Operators</a:t>
+            </a:r>
+            <a:r>
+              <a:rPr lang="en-US" baseline="0" dirty="0" smtClean="0"/>
+              <a:t> are specializations of Functions that require the return type and all argument types to be identical. </a:t>
+            </a:r>
+            <a:endParaRPr lang="en-US" dirty="0"/>
+          </a:p>
+        </p:txBody>
+      </p:sp>
+      <p:sp>
+        <p:nvSpPr>
+          <p:cNvPr id="4" name="Slide Number Placeholder 3"/>
+          <p:cNvSpPr>
+            <a:spLocks noGrp="1"/>
+          </p:cNvSpPr>
+          <p:nvPr>
+            <p:ph type="sldNum" sz="quarter" idx="10"/>
+          </p:nvPr>
+        </p:nvSpPr>
+        <p:spPr/>
+        <p:txBody>
+          <a:bodyPr/>
+          <a:lstStyle/>
+          <a:p>
+            <a:fld id="{9B9A5078-34A5-4200-8953-1FDEE337BA82}" type="slidenum">
+              <a:rPr lang="en-US" smtClean="0"/>
+              <a:t>14</a:t>
+            </a:fld>
+            <a:endParaRPr lang="en-US"/>
+          </a:p>
+        </p:txBody>
+      </p:sp>
+    </p:spTree>
+    <p:extLst>
+      <p:ext uri="{BB962C8B-B14F-4D97-AF65-F5344CB8AC3E}">
+        <p14:creationId xmlns:p14="http://schemas.microsoft.com/office/powerpoint/2010/main" val="3200112247"/>
+      </p:ext>
+    </p:extLst>
+  </p:cSld>
+  <p:clrMapOvr>
+    <a:masterClrMapping/>
+  </p:clrMapOvr>
+</p:notes>
+</file>
+
+<file path=ppt/notesSlides/notesSlide13.xml><?xml version="1.0" encoding="utf-8"?>
+<p:notes xmlns:a="http://schemas.openxmlformats.org/drawingml/2006/main" xmlns:r="http://schemas.openxmlformats.org/officeDocument/2006/relationships" xmlns:p="http://schemas.openxmlformats.org/presentationml/2006/main">
+  <p:cSld>
+    <p:spTree>
+      <p:nvGrpSpPr>
+        <p:cNvPr id="1" name=""/>
+        <p:cNvGrpSpPr/>
+        <p:nvPr/>
+      </p:nvGrpSpPr>
+      <p:grpSpPr>
+        <a:xfrm>
+          <a:off x="0" y="0"/>
+          <a:ext cx="0" cy="0"/>
+          <a:chOff x="0" y="0"/>
+          <a:chExt cx="0" cy="0"/>
+        </a:xfrm>
+      </p:grpSpPr>
+      <p:sp>
+        <p:nvSpPr>
+          <p:cNvPr id="2" name="Slide Image Placeholder 1"/>
+          <p:cNvSpPr>
+            <a:spLocks noGrp="1" noRot="1" noChangeAspect="1"/>
+          </p:cNvSpPr>
+          <p:nvPr>
+            <p:ph type="sldImg"/>
+          </p:nvPr>
+        </p:nvSpPr>
+        <p:spPr/>
+      </p:sp>
+      <p:sp>
+        <p:nvSpPr>
+          <p:cNvPr id="3" name="Notes Placeholder 2"/>
+          <p:cNvSpPr>
+            <a:spLocks noGrp="1"/>
+          </p:cNvSpPr>
+          <p:nvPr>
+            <p:ph type="body" idx="1"/>
+          </p:nvPr>
+        </p:nvSpPr>
+        <p:spPr/>
+        <p:txBody>
+          <a:bodyPr/>
+          <a:lstStyle/>
+          <a:p>
+            <a:r>
+              <a:rPr lang="en-US" dirty="0" smtClean="0"/>
+              <a:t>Although Comparator</a:t>
+            </a:r>
+            <a:r>
+              <a:rPr lang="en-US" baseline="0" dirty="0" smtClean="0"/>
+              <a:t> has been around since the early days of Java, it is a functional interface that is used by the stream framework for sorting data.</a:t>
+            </a:r>
+            <a:endParaRPr lang="en-US" dirty="0"/>
+          </a:p>
+        </p:txBody>
+      </p:sp>
+      <p:sp>
+        <p:nvSpPr>
+          <p:cNvPr id="4" name="Slide Number Placeholder 3"/>
+          <p:cNvSpPr>
+            <a:spLocks noGrp="1"/>
+          </p:cNvSpPr>
+          <p:nvPr>
+            <p:ph type="sldNum" sz="quarter" idx="10"/>
+          </p:nvPr>
+        </p:nvSpPr>
+        <p:spPr/>
+        <p:txBody>
+          <a:bodyPr/>
+          <a:lstStyle/>
+          <a:p>
+            <a:fld id="{9B9A5078-34A5-4200-8953-1FDEE337BA82}" type="slidenum">
+              <a:rPr lang="en-US" smtClean="0"/>
+              <a:t>15</a:t>
+            </a:fld>
+            <a:endParaRPr lang="en-US"/>
+          </a:p>
+        </p:txBody>
+      </p:sp>
+    </p:spTree>
+    <p:extLst>
+      <p:ext uri="{BB962C8B-B14F-4D97-AF65-F5344CB8AC3E}">
+        <p14:creationId xmlns:p14="http://schemas.microsoft.com/office/powerpoint/2010/main" val="3904807390"/>
+      </p:ext>
+    </p:extLst>
+  </p:cSld>
+  <p:clrMapOvr>
+    <a:masterClrMapping/>
+  </p:clrMapOvr>
+</p:notes>
+</file>
+
+<file path=ppt/notesSlides/notesSlide14.xml><?xml version="1.0" encoding="utf-8"?>
+<p:notes xmlns:a="http://schemas.openxmlformats.org/drawingml/2006/main" xmlns:r="http://schemas.openxmlformats.org/officeDocument/2006/relationships" xmlns:p="http://schemas.openxmlformats.org/presentationml/2006/main">
+  <p:cSld>
+    <p:spTree>
+      <p:nvGrpSpPr>
+        <p:cNvPr id="1" name=""/>
+        <p:cNvGrpSpPr/>
+        <p:nvPr/>
+      </p:nvGrpSpPr>
+      <p:grpSpPr>
+        <a:xfrm>
+          <a:off x="0" y="0"/>
+          <a:ext cx="0" cy="0"/>
+          <a:chOff x="0" y="0"/>
+          <a:chExt cx="0" cy="0"/>
+        </a:xfrm>
+      </p:grpSpPr>
+      <p:sp>
+        <p:nvSpPr>
+          <p:cNvPr id="2" name="Slide Image Placeholder 1"/>
+          <p:cNvSpPr>
+            <a:spLocks noGrp="1" noRot="1" noChangeAspect="1"/>
+          </p:cNvSpPr>
+          <p:nvPr>
+            <p:ph type="sldImg"/>
+          </p:nvPr>
+        </p:nvSpPr>
+        <p:spPr/>
+      </p:sp>
+      <p:sp>
+        <p:nvSpPr>
+          <p:cNvPr id="3" name="Notes Placeholder 2"/>
+          <p:cNvSpPr>
+            <a:spLocks noGrp="1"/>
+          </p:cNvSpPr>
+          <p:nvPr>
+            <p:ph type="body" idx="1"/>
+          </p:nvPr>
+        </p:nvSpPr>
+        <p:spPr/>
+        <p:txBody>
+          <a:bodyPr/>
+          <a:lstStyle/>
+          <a:p>
+            <a:r>
+              <a:rPr lang="en-US" dirty="0" smtClean="0"/>
+              <a:t>Remember that </a:t>
+            </a:r>
+            <a:r>
+              <a:rPr lang="en-US" dirty="0" err="1" smtClean="0"/>
+              <a:t>forEach</a:t>
+            </a:r>
+            <a:r>
+              <a:rPr lang="en-US" baseline="0" dirty="0" smtClean="0"/>
+              <a:t> is a method on a collection or stream that processes each element with a consumer.</a:t>
+            </a:r>
+            <a:endParaRPr lang="en-US" dirty="0"/>
+          </a:p>
+        </p:txBody>
+      </p:sp>
+      <p:sp>
+        <p:nvSpPr>
+          <p:cNvPr id="4" name="Slide Number Placeholder 3"/>
+          <p:cNvSpPr>
+            <a:spLocks noGrp="1"/>
+          </p:cNvSpPr>
+          <p:nvPr>
+            <p:ph type="sldNum" sz="quarter" idx="10"/>
+          </p:nvPr>
+        </p:nvSpPr>
+        <p:spPr/>
+        <p:txBody>
+          <a:bodyPr/>
+          <a:lstStyle/>
+          <a:p>
+            <a:fld id="{9B9A5078-34A5-4200-8953-1FDEE337BA82}" type="slidenum">
+              <a:rPr lang="en-US" smtClean="0"/>
+              <a:t>19</a:t>
+            </a:fld>
+            <a:endParaRPr lang="en-US"/>
+          </a:p>
+        </p:txBody>
+      </p:sp>
+    </p:spTree>
+    <p:extLst>
+      <p:ext uri="{BB962C8B-B14F-4D97-AF65-F5344CB8AC3E}">
+        <p14:creationId xmlns:p14="http://schemas.microsoft.com/office/powerpoint/2010/main" val="1326230080"/>
+      </p:ext>
+    </p:extLst>
+  </p:cSld>
+  <p:clrMapOvr>
+    <a:masterClrMapping/>
+  </p:clrMapOvr>
+</p:notes>
+</file>
+
+<file path=ppt/notesSlides/notesSlide15.xml><?xml version="1.0" encoding="utf-8"?>
+<p:notes xmlns:a="http://schemas.openxmlformats.org/drawingml/2006/main" xmlns:r="http://schemas.openxmlformats.org/officeDocument/2006/relationships" xmlns:p="http://schemas.openxmlformats.org/presentationml/2006/main">
+  <p:cSld>
+    <p:spTree>
+      <p:nvGrpSpPr>
+        <p:cNvPr id="1" name=""/>
+        <p:cNvGrpSpPr/>
+        <p:nvPr/>
+      </p:nvGrpSpPr>
+      <p:grpSpPr>
+        <a:xfrm>
+          <a:off x="0" y="0"/>
+          <a:ext cx="0" cy="0"/>
+          <a:chOff x="0" y="0"/>
+          <a:chExt cx="0" cy="0"/>
+        </a:xfrm>
+      </p:grpSpPr>
+      <p:sp>
+        <p:nvSpPr>
+          <p:cNvPr id="2" name="Slide Image Placeholder 1"/>
+          <p:cNvSpPr>
+            <a:spLocks noGrp="1" noRot="1" noChangeAspect="1"/>
+          </p:cNvSpPr>
+          <p:nvPr>
+            <p:ph type="sldImg"/>
+          </p:nvPr>
+        </p:nvSpPr>
+        <p:spPr/>
+      </p:sp>
+      <p:sp>
+        <p:nvSpPr>
+          <p:cNvPr id="3" name="Notes Placeholder 2"/>
+          <p:cNvSpPr>
+            <a:spLocks noGrp="1"/>
+          </p:cNvSpPr>
+          <p:nvPr>
+            <p:ph type="body" idx="1"/>
+          </p:nvPr>
+        </p:nvSpPr>
+        <p:spPr/>
+        <p:txBody>
+          <a:bodyPr/>
+          <a:lstStyle/>
+          <a:p>
+            <a:r>
+              <a:rPr lang="en-US" dirty="0" smtClean="0"/>
+              <a:t>A</a:t>
+            </a:r>
+            <a:r>
+              <a:rPr lang="en-US" baseline="0" dirty="0" smtClean="0"/>
+              <a:t> collection is a structure to store data.  A stream is a structure to store a computation.  Nothing on the stream actually “exists” until a terminal operation is run.</a:t>
+            </a:r>
+            <a:endParaRPr lang="en-US" dirty="0"/>
+          </a:p>
+        </p:txBody>
+      </p:sp>
+      <p:sp>
+        <p:nvSpPr>
+          <p:cNvPr id="4" name="Slide Number Placeholder 3"/>
+          <p:cNvSpPr>
+            <a:spLocks noGrp="1"/>
+          </p:cNvSpPr>
+          <p:nvPr>
+            <p:ph type="sldNum" sz="quarter" idx="10"/>
+          </p:nvPr>
+        </p:nvSpPr>
+        <p:spPr/>
+        <p:txBody>
+          <a:bodyPr/>
+          <a:lstStyle/>
+          <a:p>
+            <a:fld id="{9B9A5078-34A5-4200-8953-1FDEE337BA82}" type="slidenum">
+              <a:rPr lang="en-US" smtClean="0"/>
+              <a:t>23</a:t>
+            </a:fld>
+            <a:endParaRPr lang="en-US"/>
+          </a:p>
+        </p:txBody>
+      </p:sp>
+    </p:spTree>
+    <p:extLst>
+      <p:ext uri="{BB962C8B-B14F-4D97-AF65-F5344CB8AC3E}">
+        <p14:creationId xmlns:p14="http://schemas.microsoft.com/office/powerpoint/2010/main" val="2994213747"/>
+      </p:ext>
+    </p:extLst>
+  </p:cSld>
+  <p:clrMapOvr>
+    <a:masterClrMapping/>
+  </p:clrMapOvr>
+</p:notes>
+</file>
+
+<file path=ppt/notesSlides/notesSlide16.xml><?xml version="1.0" encoding="utf-8"?>
+<p:notes xmlns:a="http://schemas.openxmlformats.org/drawingml/2006/main" xmlns:r="http://schemas.openxmlformats.org/officeDocument/2006/relationships" xmlns:p="http://schemas.openxmlformats.org/presentationml/2006/main">
+  <p:cSld>
+    <p:spTree>
+      <p:nvGrpSpPr>
+        <p:cNvPr id="1" name=""/>
+        <p:cNvGrpSpPr/>
+        <p:nvPr/>
+      </p:nvGrpSpPr>
+      <p:grpSpPr>
+        <a:xfrm>
+          <a:off x="0" y="0"/>
+          <a:ext cx="0" cy="0"/>
+          <a:chOff x="0" y="0"/>
+          <a:chExt cx="0" cy="0"/>
+        </a:xfrm>
+      </p:grpSpPr>
+      <p:sp>
+        <p:nvSpPr>
+          <p:cNvPr id="2" name="Slide Image Placeholder 1"/>
+          <p:cNvSpPr>
+            <a:spLocks noGrp="1" noRot="1" noChangeAspect="1"/>
+          </p:cNvSpPr>
+          <p:nvPr>
+            <p:ph type="sldImg"/>
+          </p:nvPr>
+        </p:nvSpPr>
+        <p:spPr/>
+      </p:sp>
+      <p:sp>
+        <p:nvSpPr>
+          <p:cNvPr id="3" name="Notes Placeholder 2"/>
+          <p:cNvSpPr>
+            <a:spLocks noGrp="1"/>
+          </p:cNvSpPr>
+          <p:nvPr>
+            <p:ph type="body" idx="1"/>
+          </p:nvPr>
+        </p:nvSpPr>
+        <p:spPr/>
+        <p:txBody>
+          <a:bodyPr/>
+          <a:lstStyle/>
+          <a:p>
+            <a:r>
+              <a:rPr lang="en-US" dirty="0" smtClean="0"/>
+              <a:t>Next slide breaks this down</a:t>
+            </a:r>
+            <a:endParaRPr lang="en-US" dirty="0"/>
+          </a:p>
+        </p:txBody>
+      </p:sp>
+      <p:sp>
+        <p:nvSpPr>
+          <p:cNvPr id="4" name="Slide Number Placeholder 3"/>
+          <p:cNvSpPr>
+            <a:spLocks noGrp="1"/>
+          </p:cNvSpPr>
+          <p:nvPr>
+            <p:ph type="sldNum" sz="quarter" idx="10"/>
+          </p:nvPr>
+        </p:nvSpPr>
+        <p:spPr/>
+        <p:txBody>
+          <a:bodyPr/>
+          <a:lstStyle/>
+          <a:p>
+            <a:fld id="{9B9A5078-34A5-4200-8953-1FDEE337BA82}" type="slidenum">
+              <a:rPr lang="en-US" smtClean="0"/>
+              <a:t>24</a:t>
+            </a:fld>
+            <a:endParaRPr lang="en-US"/>
+          </a:p>
+        </p:txBody>
+      </p:sp>
+    </p:spTree>
+    <p:extLst>
+      <p:ext uri="{BB962C8B-B14F-4D97-AF65-F5344CB8AC3E}">
+        <p14:creationId xmlns:p14="http://schemas.microsoft.com/office/powerpoint/2010/main" val="1815872958"/>
+      </p:ext>
+    </p:extLst>
+  </p:cSld>
+  <p:clrMapOvr>
+    <a:masterClrMapping/>
+  </p:clrMapOvr>
+</p:notes>
+</file>
+
+<file path=ppt/notesSlides/notesSlide17.xml><?xml version="1.0" encoding="utf-8"?>
+<p:notes xmlns:a="http://schemas.openxmlformats.org/drawingml/2006/main" xmlns:r="http://schemas.openxmlformats.org/officeDocument/2006/relationships" xmlns:p="http://schemas.openxmlformats.org/presentationml/2006/main">
+  <p:cSld>
+    <p:spTree>
+      <p:nvGrpSpPr>
+        <p:cNvPr id="1" name=""/>
+        <p:cNvGrpSpPr/>
+        <p:nvPr/>
+      </p:nvGrpSpPr>
+      <p:grpSpPr>
+        <a:xfrm>
+          <a:off x="0" y="0"/>
+          <a:ext cx="0" cy="0"/>
+          <a:chOff x="0" y="0"/>
+          <a:chExt cx="0" cy="0"/>
+        </a:xfrm>
+      </p:grpSpPr>
+      <p:sp>
+        <p:nvSpPr>
+          <p:cNvPr id="2" name="Slide Image Placeholder 1"/>
+          <p:cNvSpPr>
+            <a:spLocks noGrp="1" noRot="1" noChangeAspect="1"/>
+          </p:cNvSpPr>
+          <p:nvPr>
+            <p:ph type="sldImg"/>
+          </p:nvPr>
+        </p:nvSpPr>
+        <p:spPr/>
+      </p:sp>
+      <p:sp>
+        <p:nvSpPr>
+          <p:cNvPr id="3" name="Notes Placeholder 2"/>
+          <p:cNvSpPr>
+            <a:spLocks noGrp="1"/>
+          </p:cNvSpPr>
+          <p:nvPr>
+            <p:ph type="body" idx="1"/>
+          </p:nvPr>
+        </p:nvSpPr>
+        <p:spPr/>
+        <p:txBody>
+          <a:bodyPr/>
+          <a:lstStyle/>
+          <a:p>
+            <a:r>
+              <a:rPr lang="en-US" dirty="0" smtClean="0"/>
+              <a:t>In</a:t>
+            </a:r>
+            <a:r>
+              <a:rPr lang="en-US" baseline="0" dirty="0" smtClean="0"/>
+              <a:t> mathematics, an identity property is a number such that when it is applied with an operator it does not change the value of the other operand.  0 + X = X, 1 * X = X, “” + X = X, etc.</a:t>
+            </a:r>
+            <a:endParaRPr lang="en-US" dirty="0"/>
+          </a:p>
+        </p:txBody>
+      </p:sp>
+      <p:sp>
+        <p:nvSpPr>
+          <p:cNvPr id="4" name="Slide Number Placeholder 3"/>
+          <p:cNvSpPr>
+            <a:spLocks noGrp="1"/>
+          </p:cNvSpPr>
+          <p:nvPr>
+            <p:ph type="sldNum" sz="quarter" idx="10"/>
+          </p:nvPr>
+        </p:nvSpPr>
+        <p:spPr/>
+        <p:txBody>
+          <a:bodyPr/>
+          <a:lstStyle/>
+          <a:p>
+            <a:fld id="{9B9A5078-34A5-4200-8953-1FDEE337BA82}" type="slidenum">
+              <a:rPr lang="en-US" smtClean="0"/>
+              <a:t>25</a:t>
+            </a:fld>
+            <a:endParaRPr lang="en-US"/>
+          </a:p>
+        </p:txBody>
+      </p:sp>
+    </p:spTree>
+    <p:extLst>
+      <p:ext uri="{BB962C8B-B14F-4D97-AF65-F5344CB8AC3E}">
+        <p14:creationId xmlns:p14="http://schemas.microsoft.com/office/powerpoint/2010/main" val="2894588663"/>
+      </p:ext>
+    </p:extLst>
+  </p:cSld>
+  <p:clrMapOvr>
+    <a:masterClrMapping/>
+  </p:clrMapOvr>
+</p:notes>
+</file>
+
+<file path=ppt/notesSlides/notesSlide18.xml><?xml version="1.0" encoding="utf-8"?>
+<p:notes xmlns:a="http://schemas.openxmlformats.org/drawingml/2006/main" xmlns:r="http://schemas.openxmlformats.org/officeDocument/2006/relationships" xmlns:p="http://schemas.openxmlformats.org/presentationml/2006/main">
+  <p:cSld>
+    <p:spTree>
+      <p:nvGrpSpPr>
+        <p:cNvPr id="1" name=""/>
+        <p:cNvGrpSpPr/>
+        <p:nvPr/>
+      </p:nvGrpSpPr>
+      <p:grpSpPr>
+        <a:xfrm>
+          <a:off x="0" y="0"/>
+          <a:ext cx="0" cy="0"/>
+          <a:chOff x="0" y="0"/>
+          <a:chExt cx="0" cy="0"/>
+        </a:xfrm>
+      </p:grpSpPr>
+      <p:sp>
+        <p:nvSpPr>
+          <p:cNvPr id="2" name="Slide Image Placeholder 1"/>
+          <p:cNvSpPr>
+            <a:spLocks noGrp="1" noRot="1" noChangeAspect="1"/>
+          </p:cNvSpPr>
+          <p:nvPr>
+            <p:ph type="sldImg"/>
+          </p:nvPr>
+        </p:nvSpPr>
+        <p:spPr/>
+      </p:sp>
+      <p:sp>
+        <p:nvSpPr>
+          <p:cNvPr id="3" name="Notes Placeholder 2"/>
+          <p:cNvSpPr>
+            <a:spLocks noGrp="1"/>
+          </p:cNvSpPr>
+          <p:nvPr>
+            <p:ph type="body" idx="1"/>
+          </p:nvPr>
+        </p:nvSpPr>
+        <p:spPr/>
+        <p:txBody>
+          <a:bodyPr/>
+          <a:lstStyle/>
+          <a:p>
+            <a:r>
+              <a:rPr lang="en-US" dirty="0" smtClean="0"/>
+              <a:t>Don’t think</a:t>
+            </a:r>
+            <a:r>
+              <a:rPr lang="en-US" baseline="0" dirty="0" smtClean="0"/>
+              <a:t> </a:t>
+            </a:r>
+            <a:r>
+              <a:rPr lang="en-US" baseline="0" dirty="0" err="1" smtClean="0"/>
+              <a:t>java.util.Map</a:t>
+            </a:r>
+            <a:r>
+              <a:rPr lang="en-US" baseline="0" dirty="0" smtClean="0"/>
+              <a:t> from the collections framework!  Map is a reference to the mathematical concept that any function may be thought of as a means of mapping its input values to output values.  They should be deterministic and avoid side-effects.</a:t>
+            </a:r>
+            <a:endParaRPr lang="en-US" dirty="0"/>
+          </a:p>
+        </p:txBody>
+      </p:sp>
+      <p:sp>
+        <p:nvSpPr>
+          <p:cNvPr id="4" name="Slide Number Placeholder 3"/>
+          <p:cNvSpPr>
+            <a:spLocks noGrp="1"/>
+          </p:cNvSpPr>
+          <p:nvPr>
+            <p:ph type="sldNum" sz="quarter" idx="10"/>
+          </p:nvPr>
+        </p:nvSpPr>
+        <p:spPr/>
+        <p:txBody>
+          <a:bodyPr/>
+          <a:lstStyle/>
+          <a:p>
+            <a:fld id="{9B9A5078-34A5-4200-8953-1FDEE337BA82}" type="slidenum">
+              <a:rPr lang="en-US" smtClean="0"/>
+              <a:t>27</a:t>
+            </a:fld>
+            <a:endParaRPr lang="en-US"/>
+          </a:p>
+        </p:txBody>
+      </p:sp>
+    </p:spTree>
+    <p:extLst>
+      <p:ext uri="{BB962C8B-B14F-4D97-AF65-F5344CB8AC3E}">
+        <p14:creationId xmlns:p14="http://schemas.microsoft.com/office/powerpoint/2010/main" val="2396374942"/>
+      </p:ext>
+    </p:extLst>
+  </p:cSld>
+  <p:clrMapOvr>
+    <a:masterClrMapping/>
+  </p:clrMapOvr>
+</p:notes>
+</file>
+
+<file path=ppt/notesSlides/notesSlide19.xml><?xml version="1.0" encoding="utf-8"?>
+<p:notes xmlns:a="http://schemas.openxmlformats.org/drawingml/2006/main" xmlns:r="http://schemas.openxmlformats.org/officeDocument/2006/relationships" xmlns:p="http://schemas.openxmlformats.org/presentationml/2006/main">
+  <p:cSld>
+    <p:spTree>
+      <p:nvGrpSpPr>
+        <p:cNvPr id="1" name=""/>
+        <p:cNvGrpSpPr/>
+        <p:nvPr/>
+      </p:nvGrpSpPr>
+      <p:grpSpPr>
+        <a:xfrm>
+          <a:off x="0" y="0"/>
+          <a:ext cx="0" cy="0"/>
+          <a:chOff x="0" y="0"/>
+          <a:chExt cx="0" cy="0"/>
+        </a:xfrm>
+      </p:grpSpPr>
+      <p:sp>
+        <p:nvSpPr>
+          <p:cNvPr id="2" name="Slide Image Placeholder 1"/>
+          <p:cNvSpPr>
+            <a:spLocks noGrp="1" noRot="1" noChangeAspect="1"/>
+          </p:cNvSpPr>
+          <p:nvPr>
+            <p:ph type="sldImg"/>
+          </p:nvPr>
+        </p:nvSpPr>
+        <p:spPr/>
+      </p:sp>
+      <p:sp>
+        <p:nvSpPr>
+          <p:cNvPr id="3" name="Notes Placeholder 2"/>
+          <p:cNvSpPr>
+            <a:spLocks noGrp="1"/>
+          </p:cNvSpPr>
+          <p:nvPr>
+            <p:ph type="body" idx="1"/>
+          </p:nvPr>
+        </p:nvSpPr>
+        <p:spPr/>
+        <p:txBody>
+          <a:bodyPr/>
+          <a:lstStyle/>
+          <a:p>
+            <a:r>
+              <a:rPr lang="en-US" dirty="0" smtClean="0"/>
+              <a:t>The</a:t>
+            </a:r>
+            <a:r>
+              <a:rPr lang="en-US" baseline="0" dirty="0" smtClean="0"/>
+              <a:t> </a:t>
+            </a:r>
+            <a:r>
+              <a:rPr lang="en-US" baseline="0" dirty="0" err="1" smtClean="0"/>
+              <a:t>Collections.toCollection</a:t>
+            </a:r>
+            <a:r>
+              <a:rPr lang="en-US" baseline="0" dirty="0" smtClean="0"/>
+              <a:t> allows full control over the collection type provided and how it is created by using a Supplier lambda.  In this example a method reference to </a:t>
+            </a:r>
+            <a:r>
+              <a:rPr lang="en-US" baseline="0" dirty="0" err="1" smtClean="0"/>
+              <a:t>LinkedHashSet’s</a:t>
+            </a:r>
+            <a:r>
+              <a:rPr lang="en-US" baseline="0" dirty="0" smtClean="0"/>
+              <a:t> constructor was used as the supplier.</a:t>
+            </a:r>
+            <a:endParaRPr lang="en-US" dirty="0"/>
+          </a:p>
+        </p:txBody>
+      </p:sp>
+      <p:sp>
+        <p:nvSpPr>
+          <p:cNvPr id="4" name="Slide Number Placeholder 3"/>
+          <p:cNvSpPr>
+            <a:spLocks noGrp="1"/>
+          </p:cNvSpPr>
+          <p:nvPr>
+            <p:ph type="sldNum" sz="quarter" idx="10"/>
+          </p:nvPr>
+        </p:nvSpPr>
+        <p:spPr/>
+        <p:txBody>
+          <a:bodyPr/>
+          <a:lstStyle/>
+          <a:p>
+            <a:fld id="{9B9A5078-34A5-4200-8953-1FDEE337BA82}" type="slidenum">
+              <a:rPr lang="en-US" smtClean="0"/>
+              <a:t>29</a:t>
+            </a:fld>
+            <a:endParaRPr lang="en-US"/>
+          </a:p>
+        </p:txBody>
+      </p:sp>
+    </p:spTree>
+    <p:extLst>
+      <p:ext uri="{BB962C8B-B14F-4D97-AF65-F5344CB8AC3E}">
+        <p14:creationId xmlns:p14="http://schemas.microsoft.com/office/powerpoint/2010/main" val="3625490707"/>
+      </p:ext>
+    </p:extLst>
+  </p:cSld>
+  <p:clrMapOvr>
+    <a:masterClrMapping/>
+  </p:clrMapOvr>
+</p:notes>
+</file>
+
+<file path=ppt/notesSlides/notesSlide2.xml><?xml version="1.0" encoding="utf-8"?>
+<p:notes xmlns:a="http://schemas.openxmlformats.org/drawingml/2006/main" xmlns:r="http://schemas.openxmlformats.org/officeDocument/2006/relationships" xmlns:p="http://schemas.openxmlformats.org/presentationml/2006/main">
+  <p:cSld>
+    <p:spTree>
+      <p:nvGrpSpPr>
+        <p:cNvPr id="1" name=""/>
+        <p:cNvGrpSpPr/>
+        <p:nvPr/>
+      </p:nvGrpSpPr>
+      <p:grpSpPr>
+        <a:xfrm>
+          <a:off x="0" y="0"/>
+          <a:ext cx="0" cy="0"/>
+          <a:chOff x="0" y="0"/>
+          <a:chExt cx="0" cy="0"/>
+        </a:xfrm>
+      </p:grpSpPr>
+      <p:sp>
+        <p:nvSpPr>
+          <p:cNvPr id="2" name="Slide Image Placeholder 1"/>
+          <p:cNvSpPr>
+            <a:spLocks noGrp="1" noRot="1" noChangeAspect="1"/>
+          </p:cNvSpPr>
+          <p:nvPr>
+            <p:ph type="sldImg"/>
+          </p:nvPr>
+        </p:nvSpPr>
+        <p:spPr/>
+      </p:sp>
+      <p:sp>
+        <p:nvSpPr>
+          <p:cNvPr id="3" name="Notes Placeholder 2"/>
+          <p:cNvSpPr>
+            <a:spLocks noGrp="1"/>
+          </p:cNvSpPr>
+          <p:nvPr>
+            <p:ph type="body" idx="1"/>
+          </p:nvPr>
+        </p:nvSpPr>
+        <p:spPr/>
+        <p:txBody>
+          <a:bodyPr/>
+          <a:lstStyle/>
+          <a:p>
+            <a:r>
+              <a:rPr lang="en-US" dirty="0" smtClean="0"/>
+              <a:t>More on these points to follow.  If</a:t>
+            </a:r>
+            <a:r>
+              <a:rPr lang="en-US" baseline="0" dirty="0" smtClean="0"/>
+              <a:t> you can take a local variable or argument, and add the keyword “final” without breaking compilation, it is effectively final.  The compiler infers that the variable is final even if it is not declared as such.</a:t>
+            </a:r>
+            <a:endParaRPr lang="en-US" dirty="0"/>
+          </a:p>
+        </p:txBody>
+      </p:sp>
+      <p:sp>
+        <p:nvSpPr>
+          <p:cNvPr id="4" name="Slide Number Placeholder 3"/>
+          <p:cNvSpPr>
+            <a:spLocks noGrp="1"/>
+          </p:cNvSpPr>
+          <p:nvPr>
+            <p:ph type="sldNum" sz="quarter" idx="10"/>
+          </p:nvPr>
+        </p:nvSpPr>
+        <p:spPr/>
+        <p:txBody>
+          <a:bodyPr/>
+          <a:lstStyle/>
+          <a:p>
+            <a:fld id="{9B9A5078-34A5-4200-8953-1FDEE337BA82}" type="slidenum">
+              <a:rPr lang="en-US" smtClean="0"/>
+              <a:t>3</a:t>
+            </a:fld>
+            <a:endParaRPr lang="en-US"/>
+          </a:p>
+        </p:txBody>
+      </p:sp>
+    </p:spTree>
+    <p:extLst>
+      <p:ext uri="{BB962C8B-B14F-4D97-AF65-F5344CB8AC3E}">
+        <p14:creationId xmlns:p14="http://schemas.microsoft.com/office/powerpoint/2010/main" val="1778087452"/>
+      </p:ext>
+    </p:extLst>
+  </p:cSld>
+  <p:clrMapOvr>
+    <a:masterClrMapping/>
+  </p:clrMapOvr>
+</p:notes>
+</file>
+
+<file path=ppt/notesSlides/notesSlide20.xml><?xml version="1.0" encoding="utf-8"?>
+<p:notes xmlns:a="http://schemas.openxmlformats.org/drawingml/2006/main" xmlns:r="http://schemas.openxmlformats.org/officeDocument/2006/relationships" xmlns:p="http://schemas.openxmlformats.org/presentationml/2006/main">
+  <p:cSld>
+    <p:spTree>
+      <p:nvGrpSpPr>
+        <p:cNvPr id="1" name=""/>
+        <p:cNvGrpSpPr/>
+        <p:nvPr/>
+      </p:nvGrpSpPr>
+      <p:grpSpPr>
+        <a:xfrm>
+          <a:off x="0" y="0"/>
+          <a:ext cx="0" cy="0"/>
+          <a:chOff x="0" y="0"/>
+          <a:chExt cx="0" cy="0"/>
+        </a:xfrm>
+      </p:grpSpPr>
+      <p:sp>
+        <p:nvSpPr>
+          <p:cNvPr id="2" name="Slide Image Placeholder 1"/>
+          <p:cNvSpPr>
+            <a:spLocks noGrp="1" noRot="1" noChangeAspect="1"/>
+          </p:cNvSpPr>
+          <p:nvPr>
+            <p:ph type="sldImg"/>
+          </p:nvPr>
+        </p:nvSpPr>
+        <p:spPr/>
+      </p:sp>
+      <p:sp>
+        <p:nvSpPr>
+          <p:cNvPr id="3" name="Notes Placeholder 2"/>
+          <p:cNvSpPr>
+            <a:spLocks noGrp="1"/>
+          </p:cNvSpPr>
+          <p:nvPr>
+            <p:ph type="body" idx="1"/>
+          </p:nvPr>
+        </p:nvSpPr>
+        <p:spPr/>
+        <p:txBody>
+          <a:bodyPr/>
+          <a:lstStyle/>
+          <a:p>
+            <a:r>
+              <a:rPr lang="en-US" dirty="0" smtClean="0"/>
+              <a:t>Downstream collectors are collectors that</a:t>
+            </a:r>
+            <a:r>
+              <a:rPr lang="en-US" baseline="0" dirty="0" smtClean="0"/>
+              <a:t> are called from other collectors to process or reduce the values.  In this case, we produce a map with the keys and sum of the values, instead of a map with they keys and values as a collection.</a:t>
+            </a:r>
+            <a:endParaRPr lang="en-US" dirty="0"/>
+          </a:p>
+        </p:txBody>
+      </p:sp>
+      <p:sp>
+        <p:nvSpPr>
+          <p:cNvPr id="4" name="Slide Number Placeholder 3"/>
+          <p:cNvSpPr>
+            <a:spLocks noGrp="1"/>
+          </p:cNvSpPr>
+          <p:nvPr>
+            <p:ph type="sldNum" sz="quarter" idx="10"/>
+          </p:nvPr>
+        </p:nvSpPr>
+        <p:spPr/>
+        <p:txBody>
+          <a:bodyPr/>
+          <a:lstStyle/>
+          <a:p>
+            <a:fld id="{9B9A5078-34A5-4200-8953-1FDEE337BA82}" type="slidenum">
+              <a:rPr lang="en-US" smtClean="0"/>
+              <a:t>30</a:t>
+            </a:fld>
+            <a:endParaRPr lang="en-US"/>
+          </a:p>
+        </p:txBody>
+      </p:sp>
+    </p:spTree>
+    <p:extLst>
+      <p:ext uri="{BB962C8B-B14F-4D97-AF65-F5344CB8AC3E}">
+        <p14:creationId xmlns:p14="http://schemas.microsoft.com/office/powerpoint/2010/main" val="756589879"/>
+      </p:ext>
+    </p:extLst>
+  </p:cSld>
+  <p:clrMapOvr>
+    <a:masterClrMapping/>
+  </p:clrMapOvr>
+</p:notes>
+</file>
+
+<file path=ppt/notesSlides/notesSlide21.xml><?xml version="1.0" encoding="utf-8"?>
+<p:notes xmlns:a="http://schemas.openxmlformats.org/drawingml/2006/main" xmlns:r="http://schemas.openxmlformats.org/officeDocument/2006/relationships" xmlns:p="http://schemas.openxmlformats.org/presentationml/2006/main">
+  <p:cSld>
+    <p:spTree>
+      <p:nvGrpSpPr>
+        <p:cNvPr id="1" name=""/>
+        <p:cNvGrpSpPr/>
+        <p:nvPr/>
+      </p:nvGrpSpPr>
+      <p:grpSpPr>
+        <a:xfrm>
+          <a:off x="0" y="0"/>
+          <a:ext cx="0" cy="0"/>
+          <a:chOff x="0" y="0"/>
+          <a:chExt cx="0" cy="0"/>
+        </a:xfrm>
+      </p:grpSpPr>
+      <p:sp>
+        <p:nvSpPr>
+          <p:cNvPr id="2" name="Slide Image Placeholder 1"/>
+          <p:cNvSpPr>
+            <a:spLocks noGrp="1" noRot="1" noChangeAspect="1"/>
+          </p:cNvSpPr>
+          <p:nvPr>
+            <p:ph type="sldImg"/>
+          </p:nvPr>
+        </p:nvSpPr>
+        <p:spPr/>
+      </p:sp>
+      <p:sp>
+        <p:nvSpPr>
+          <p:cNvPr id="3" name="Notes Placeholder 2"/>
+          <p:cNvSpPr>
+            <a:spLocks noGrp="1"/>
+          </p:cNvSpPr>
+          <p:nvPr>
+            <p:ph type="body" idx="1"/>
+          </p:nvPr>
+        </p:nvSpPr>
+        <p:spPr/>
+        <p:txBody>
+          <a:bodyPr/>
+          <a:lstStyle/>
+          <a:p>
+            <a:r>
+              <a:rPr lang="en-US" dirty="0" smtClean="0"/>
+              <a:t>This example groups the</a:t>
+            </a:r>
+            <a:r>
+              <a:rPr lang="en-US" baseline="0" dirty="0" smtClean="0"/>
+              <a:t> words by their starting letter, listing each word with its letter.  In another twist, we use a </a:t>
+            </a:r>
+            <a:r>
+              <a:rPr lang="en-US" baseline="0" dirty="0" err="1" smtClean="0"/>
+              <a:t>TreeMap</a:t>
+            </a:r>
+            <a:r>
+              <a:rPr lang="en-US" baseline="0" dirty="0" smtClean="0"/>
+              <a:t> and </a:t>
+            </a:r>
+            <a:r>
+              <a:rPr lang="en-US" baseline="0" dirty="0" err="1" smtClean="0"/>
+              <a:t>TreeSet</a:t>
+            </a:r>
+            <a:r>
+              <a:rPr lang="en-US" baseline="0" dirty="0" smtClean="0"/>
+              <a:t> to demonstrate the flexibility offered by specifying the collection implementation: with very little effort on our part, we have produced an ordered map with a set of ordered values for each letter.</a:t>
+            </a:r>
+            <a:endParaRPr lang="en-US" dirty="0"/>
+          </a:p>
+        </p:txBody>
+      </p:sp>
+      <p:sp>
+        <p:nvSpPr>
+          <p:cNvPr id="4" name="Slide Number Placeholder 3"/>
+          <p:cNvSpPr>
+            <a:spLocks noGrp="1"/>
+          </p:cNvSpPr>
+          <p:nvPr>
+            <p:ph type="sldNum" sz="quarter" idx="10"/>
+          </p:nvPr>
+        </p:nvSpPr>
+        <p:spPr/>
+        <p:txBody>
+          <a:bodyPr/>
+          <a:lstStyle/>
+          <a:p>
+            <a:fld id="{9B9A5078-34A5-4200-8953-1FDEE337BA82}" type="slidenum">
+              <a:rPr lang="en-US" smtClean="0"/>
+              <a:t>31</a:t>
+            </a:fld>
+            <a:endParaRPr lang="en-US"/>
+          </a:p>
+        </p:txBody>
+      </p:sp>
+    </p:spTree>
+    <p:extLst>
+      <p:ext uri="{BB962C8B-B14F-4D97-AF65-F5344CB8AC3E}">
+        <p14:creationId xmlns:p14="http://schemas.microsoft.com/office/powerpoint/2010/main" val="3867908227"/>
+      </p:ext>
+    </p:extLst>
+  </p:cSld>
+  <p:clrMapOvr>
+    <a:masterClrMapping/>
+  </p:clrMapOvr>
+</p:notes>
+</file>
+
+<file path=ppt/notesSlides/notesSlide22.xml><?xml version="1.0" encoding="utf-8"?>
+<p:notes xmlns:a="http://schemas.openxmlformats.org/drawingml/2006/main" xmlns:r="http://schemas.openxmlformats.org/officeDocument/2006/relationships" xmlns:p="http://schemas.openxmlformats.org/presentationml/2006/main">
+  <p:cSld>
+    <p:spTree>
+      <p:nvGrpSpPr>
+        <p:cNvPr id="1" name=""/>
+        <p:cNvGrpSpPr/>
+        <p:nvPr/>
+      </p:nvGrpSpPr>
+      <p:grpSpPr>
+        <a:xfrm>
+          <a:off x="0" y="0"/>
+          <a:ext cx="0" cy="0"/>
+          <a:chOff x="0" y="0"/>
+          <a:chExt cx="0" cy="0"/>
+        </a:xfrm>
+      </p:grpSpPr>
+      <p:sp>
+        <p:nvSpPr>
+          <p:cNvPr id="2" name="Slide Image Placeholder 1"/>
+          <p:cNvSpPr>
+            <a:spLocks noGrp="1" noRot="1" noChangeAspect="1"/>
+          </p:cNvSpPr>
+          <p:nvPr>
+            <p:ph type="sldImg"/>
+          </p:nvPr>
+        </p:nvSpPr>
+        <p:spPr/>
+      </p:sp>
+      <p:sp>
+        <p:nvSpPr>
+          <p:cNvPr id="3" name="Notes Placeholder 2"/>
+          <p:cNvSpPr>
+            <a:spLocks noGrp="1"/>
+          </p:cNvSpPr>
+          <p:nvPr>
+            <p:ph type="body" idx="1"/>
+          </p:nvPr>
+        </p:nvSpPr>
+        <p:spPr/>
+        <p:txBody>
+          <a:bodyPr/>
+          <a:lstStyle/>
+          <a:p>
+            <a:r>
+              <a:rPr lang="en-US" dirty="0" smtClean="0"/>
+              <a:t>This</a:t>
+            </a:r>
+            <a:r>
+              <a:rPr lang="en-US" baseline="0" dirty="0" smtClean="0"/>
+              <a:t> is a rewrite of the Grouping By to work with concurrent processing.  Note that we had to switch out the </a:t>
+            </a:r>
+            <a:r>
+              <a:rPr lang="en-US" baseline="0" dirty="0" err="1" smtClean="0"/>
+              <a:t>TreeMap</a:t>
+            </a:r>
+            <a:r>
+              <a:rPr lang="en-US" baseline="0" dirty="0" smtClean="0"/>
+              <a:t> and </a:t>
+            </a:r>
+            <a:r>
+              <a:rPr lang="en-US" baseline="0" dirty="0" err="1" smtClean="0"/>
+              <a:t>TreeSet</a:t>
+            </a:r>
+            <a:r>
+              <a:rPr lang="en-US" baseline="0" dirty="0" smtClean="0"/>
+              <a:t> with the “</a:t>
+            </a:r>
+            <a:r>
+              <a:rPr lang="en-US" baseline="0" dirty="0" err="1" smtClean="0"/>
+              <a:t>ConcurrentSkipList</a:t>
+            </a:r>
+            <a:r>
+              <a:rPr lang="en-US" baseline="0" dirty="0" smtClean="0"/>
+              <a:t>” versions to support the concurrent processing.  We also have a version using a downstream collector to count the number of </a:t>
+            </a:r>
+            <a:r>
+              <a:rPr lang="en-US" baseline="0" dirty="0" err="1" smtClean="0"/>
+              <a:t>occurances</a:t>
+            </a:r>
+            <a:r>
+              <a:rPr lang="en-US" baseline="0" dirty="0" smtClean="0"/>
+              <a:t> of each word.</a:t>
+            </a:r>
+            <a:endParaRPr lang="en-US" dirty="0"/>
+          </a:p>
+        </p:txBody>
+      </p:sp>
+      <p:sp>
+        <p:nvSpPr>
+          <p:cNvPr id="4" name="Slide Number Placeholder 3"/>
+          <p:cNvSpPr>
+            <a:spLocks noGrp="1"/>
+          </p:cNvSpPr>
+          <p:nvPr>
+            <p:ph type="sldNum" sz="quarter" idx="10"/>
+          </p:nvPr>
+        </p:nvSpPr>
+        <p:spPr/>
+        <p:txBody>
+          <a:bodyPr/>
+          <a:lstStyle/>
+          <a:p>
+            <a:fld id="{9B9A5078-34A5-4200-8953-1FDEE337BA82}" type="slidenum">
+              <a:rPr lang="en-US" smtClean="0"/>
+              <a:t>32</a:t>
+            </a:fld>
+            <a:endParaRPr lang="en-US"/>
+          </a:p>
+        </p:txBody>
+      </p:sp>
+    </p:spTree>
+    <p:extLst>
+      <p:ext uri="{BB962C8B-B14F-4D97-AF65-F5344CB8AC3E}">
+        <p14:creationId xmlns:p14="http://schemas.microsoft.com/office/powerpoint/2010/main" val="1393649253"/>
+      </p:ext>
+    </p:extLst>
+  </p:cSld>
+  <p:clrMapOvr>
+    <a:masterClrMapping/>
+  </p:clrMapOvr>
+</p:notes>
+</file>
+
+<file path=ppt/notesSlides/notesSlide23.xml><?xml version="1.0" encoding="utf-8"?>
+<p:notes xmlns:a="http://schemas.openxmlformats.org/drawingml/2006/main" xmlns:r="http://schemas.openxmlformats.org/officeDocument/2006/relationships" xmlns:p="http://schemas.openxmlformats.org/presentationml/2006/main">
+  <p:cSld>
+    <p:spTree>
+      <p:nvGrpSpPr>
+        <p:cNvPr id="1" name=""/>
+        <p:cNvGrpSpPr/>
+        <p:nvPr/>
+      </p:nvGrpSpPr>
+      <p:grpSpPr>
+        <a:xfrm>
+          <a:off x="0" y="0"/>
+          <a:ext cx="0" cy="0"/>
+          <a:chOff x="0" y="0"/>
+          <a:chExt cx="0" cy="0"/>
+        </a:xfrm>
+      </p:grpSpPr>
+      <p:sp>
+        <p:nvSpPr>
+          <p:cNvPr id="2" name="Slide Image Placeholder 1"/>
+          <p:cNvSpPr>
+            <a:spLocks noGrp="1" noRot="1" noChangeAspect="1"/>
+          </p:cNvSpPr>
+          <p:nvPr>
+            <p:ph type="sldImg"/>
+          </p:nvPr>
+        </p:nvSpPr>
+        <p:spPr/>
+      </p:sp>
+      <p:sp>
+        <p:nvSpPr>
+          <p:cNvPr id="3" name="Notes Placeholder 2"/>
+          <p:cNvSpPr>
+            <a:spLocks noGrp="1"/>
+          </p:cNvSpPr>
+          <p:nvPr>
+            <p:ph type="body" idx="1"/>
+          </p:nvPr>
+        </p:nvSpPr>
+        <p:spPr/>
+        <p:txBody>
+          <a:bodyPr/>
+          <a:lstStyle/>
+          <a:p>
+            <a:r>
+              <a:rPr lang="en-US" dirty="0" smtClean="0"/>
+              <a:t>The</a:t>
+            </a:r>
+            <a:r>
+              <a:rPr lang="en-US" baseline="0" dirty="0" smtClean="0"/>
+              <a:t> argument to </a:t>
+            </a:r>
+            <a:r>
+              <a:rPr lang="en-US" baseline="0" dirty="0" err="1" smtClean="0"/>
+              <a:t>Collectors.joining</a:t>
+            </a:r>
+            <a:r>
+              <a:rPr lang="en-US" baseline="0" dirty="0" smtClean="0"/>
+              <a:t> is the character to separate each part of the string.  In this case it is a space.</a:t>
+            </a:r>
+            <a:endParaRPr lang="en-US" dirty="0"/>
+          </a:p>
+        </p:txBody>
+      </p:sp>
+      <p:sp>
+        <p:nvSpPr>
+          <p:cNvPr id="4" name="Slide Number Placeholder 3"/>
+          <p:cNvSpPr>
+            <a:spLocks noGrp="1"/>
+          </p:cNvSpPr>
+          <p:nvPr>
+            <p:ph type="sldNum" sz="quarter" idx="10"/>
+          </p:nvPr>
+        </p:nvSpPr>
+        <p:spPr/>
+        <p:txBody>
+          <a:bodyPr/>
+          <a:lstStyle/>
+          <a:p>
+            <a:fld id="{9B9A5078-34A5-4200-8953-1FDEE337BA82}" type="slidenum">
+              <a:rPr lang="en-US" smtClean="0"/>
+              <a:t>33</a:t>
+            </a:fld>
+            <a:endParaRPr lang="en-US"/>
+          </a:p>
+        </p:txBody>
+      </p:sp>
+    </p:spTree>
+    <p:extLst>
+      <p:ext uri="{BB962C8B-B14F-4D97-AF65-F5344CB8AC3E}">
+        <p14:creationId xmlns:p14="http://schemas.microsoft.com/office/powerpoint/2010/main" val="963626535"/>
+      </p:ext>
+    </p:extLst>
+  </p:cSld>
+  <p:clrMapOvr>
+    <a:masterClrMapping/>
+  </p:clrMapOvr>
+</p:notes>
+</file>
+
+<file path=ppt/notesSlides/notesSlide3.xml><?xml version="1.0" encoding="utf-8"?>
+<p:notes xmlns:a="http://schemas.openxmlformats.org/drawingml/2006/main" xmlns:r="http://schemas.openxmlformats.org/officeDocument/2006/relationships" xmlns:p="http://schemas.openxmlformats.org/presentationml/2006/main">
+  <p:cSld>
+    <p:spTree>
+      <p:nvGrpSpPr>
+        <p:cNvPr id="1" name=""/>
+        <p:cNvGrpSpPr/>
+        <p:nvPr/>
+      </p:nvGrpSpPr>
+      <p:grpSpPr>
+        <a:xfrm>
+          <a:off x="0" y="0"/>
+          <a:ext cx="0" cy="0"/>
+          <a:chOff x="0" y="0"/>
+          <a:chExt cx="0" cy="0"/>
+        </a:xfrm>
+      </p:grpSpPr>
+      <p:sp>
+        <p:nvSpPr>
+          <p:cNvPr id="2" name="Slide Image Placeholder 1"/>
+          <p:cNvSpPr>
+            <a:spLocks noGrp="1" noRot="1" noChangeAspect="1"/>
+          </p:cNvSpPr>
+          <p:nvPr>
+            <p:ph type="sldImg"/>
+          </p:nvPr>
+        </p:nvSpPr>
+        <p:spPr/>
+      </p:sp>
+      <p:sp>
+        <p:nvSpPr>
+          <p:cNvPr id="3" name="Notes Placeholder 2"/>
+          <p:cNvSpPr>
+            <a:spLocks noGrp="1"/>
+          </p:cNvSpPr>
+          <p:nvPr>
+            <p:ph type="body" idx="1"/>
+          </p:nvPr>
+        </p:nvSpPr>
+        <p:spPr/>
+        <p:txBody>
+          <a:bodyPr/>
+          <a:lstStyle/>
+          <a:p>
+            <a:r>
+              <a:rPr lang="en-US" dirty="0" smtClean="0"/>
+              <a:t>-&gt; is not a typo.  Lambda</a:t>
+            </a:r>
+            <a:r>
+              <a:rPr lang="en-US" baseline="0" dirty="0" smtClean="0"/>
+              <a:t> operator is =&gt; is most other languages, but Oracle decided on -&gt; apparently to confuse people.  Perhaps they thought =&gt; might get confused with &gt;=?</a:t>
+            </a:r>
+            <a:endParaRPr lang="en-US" dirty="0"/>
+          </a:p>
+        </p:txBody>
+      </p:sp>
+      <p:sp>
+        <p:nvSpPr>
+          <p:cNvPr id="4" name="Slide Number Placeholder 3"/>
+          <p:cNvSpPr>
+            <a:spLocks noGrp="1"/>
+          </p:cNvSpPr>
+          <p:nvPr>
+            <p:ph type="sldNum" sz="quarter" idx="10"/>
+          </p:nvPr>
+        </p:nvSpPr>
+        <p:spPr/>
+        <p:txBody>
+          <a:bodyPr/>
+          <a:lstStyle/>
+          <a:p>
+            <a:fld id="{9B9A5078-34A5-4200-8953-1FDEE337BA82}" type="slidenum">
+              <a:rPr lang="en-US" smtClean="0"/>
+              <a:t>4</a:t>
+            </a:fld>
+            <a:endParaRPr lang="en-US"/>
+          </a:p>
+        </p:txBody>
+      </p:sp>
+    </p:spTree>
+    <p:extLst>
+      <p:ext uri="{BB962C8B-B14F-4D97-AF65-F5344CB8AC3E}">
+        <p14:creationId xmlns:p14="http://schemas.microsoft.com/office/powerpoint/2010/main" val="1825397302"/>
+      </p:ext>
+    </p:extLst>
+  </p:cSld>
+  <p:clrMapOvr>
+    <a:masterClrMapping/>
+  </p:clrMapOvr>
+</p:notes>
+</file>
+
+<file path=ppt/notesSlides/notesSlide4.xml><?xml version="1.0" encoding="utf-8"?>
+<p:notes xmlns:a="http://schemas.openxmlformats.org/drawingml/2006/main" xmlns:r="http://schemas.openxmlformats.org/officeDocument/2006/relationships" xmlns:p="http://schemas.openxmlformats.org/presentationml/2006/main">
+  <p:cSld>
+    <p:spTree>
+      <p:nvGrpSpPr>
+        <p:cNvPr id="1" name=""/>
+        <p:cNvGrpSpPr/>
+        <p:nvPr/>
+      </p:nvGrpSpPr>
+      <p:grpSpPr>
+        <a:xfrm>
+          <a:off x="0" y="0"/>
+          <a:ext cx="0" cy="0"/>
+          <a:chOff x="0" y="0"/>
+          <a:chExt cx="0" cy="0"/>
+        </a:xfrm>
+      </p:grpSpPr>
+      <p:sp>
+        <p:nvSpPr>
+          <p:cNvPr id="2" name="Slide Image Placeholder 1"/>
+          <p:cNvSpPr>
+            <a:spLocks noGrp="1" noRot="1" noChangeAspect="1"/>
+          </p:cNvSpPr>
+          <p:nvPr>
+            <p:ph type="sldImg"/>
+          </p:nvPr>
+        </p:nvSpPr>
+        <p:spPr/>
+      </p:sp>
+      <p:sp>
+        <p:nvSpPr>
+          <p:cNvPr id="3" name="Notes Placeholder 2"/>
+          <p:cNvSpPr>
+            <a:spLocks noGrp="1"/>
+          </p:cNvSpPr>
+          <p:nvPr>
+            <p:ph type="body" idx="1"/>
+          </p:nvPr>
+        </p:nvSpPr>
+        <p:spPr/>
+        <p:txBody>
+          <a:bodyPr/>
+          <a:lstStyle/>
+          <a:p>
+            <a:r>
+              <a:rPr lang="en-US" dirty="0" smtClean="0"/>
+              <a:t>Unlike other programming languages, the value</a:t>
+            </a:r>
+            <a:r>
+              <a:rPr lang="en-US" baseline="0" dirty="0" smtClean="0"/>
+              <a:t> of the lambda is not automatically the last expression executed.  The return value is necessary unless the single statement form is used.  The forms with argument type names can be useful to resolve ambiguous lambda expressions.  These occur when a lambda is passed to an overloaded method and more than 1 match.</a:t>
+            </a:r>
+            <a:endParaRPr lang="en-US" dirty="0"/>
+          </a:p>
+        </p:txBody>
+      </p:sp>
+      <p:sp>
+        <p:nvSpPr>
+          <p:cNvPr id="4" name="Slide Number Placeholder 3"/>
+          <p:cNvSpPr>
+            <a:spLocks noGrp="1"/>
+          </p:cNvSpPr>
+          <p:nvPr>
+            <p:ph type="sldNum" sz="quarter" idx="10"/>
+          </p:nvPr>
+        </p:nvSpPr>
+        <p:spPr/>
+        <p:txBody>
+          <a:bodyPr/>
+          <a:lstStyle/>
+          <a:p>
+            <a:fld id="{9B9A5078-34A5-4200-8953-1FDEE337BA82}" type="slidenum">
+              <a:rPr lang="en-US" smtClean="0"/>
+              <a:t>5</a:t>
+            </a:fld>
+            <a:endParaRPr lang="en-US"/>
+          </a:p>
+        </p:txBody>
+      </p:sp>
+    </p:spTree>
+    <p:extLst>
+      <p:ext uri="{BB962C8B-B14F-4D97-AF65-F5344CB8AC3E}">
+        <p14:creationId xmlns:p14="http://schemas.microsoft.com/office/powerpoint/2010/main" val="2754617997"/>
+      </p:ext>
+    </p:extLst>
+  </p:cSld>
+  <p:clrMapOvr>
+    <a:masterClrMapping/>
+  </p:clrMapOvr>
+</p:notes>
+</file>
+
+<file path=ppt/notesSlides/notesSlide5.xml><?xml version="1.0" encoding="utf-8"?>
+<p:notes xmlns:a="http://schemas.openxmlformats.org/drawingml/2006/main" xmlns:r="http://schemas.openxmlformats.org/officeDocument/2006/relationships" xmlns:p="http://schemas.openxmlformats.org/presentationml/2006/main">
+  <p:cSld>
+    <p:spTree>
+      <p:nvGrpSpPr>
+        <p:cNvPr id="1" name=""/>
+        <p:cNvGrpSpPr/>
+        <p:nvPr/>
+      </p:nvGrpSpPr>
+      <p:grpSpPr>
+        <a:xfrm>
+          <a:off x="0" y="0"/>
+          <a:ext cx="0" cy="0"/>
+          <a:chOff x="0" y="0"/>
+          <a:chExt cx="0" cy="0"/>
+        </a:xfrm>
+      </p:grpSpPr>
+      <p:sp>
+        <p:nvSpPr>
+          <p:cNvPr id="2" name="Slide Image Placeholder 1"/>
+          <p:cNvSpPr>
+            <a:spLocks noGrp="1" noRot="1" noChangeAspect="1"/>
+          </p:cNvSpPr>
+          <p:nvPr>
+            <p:ph type="sldImg"/>
+          </p:nvPr>
+        </p:nvSpPr>
+        <p:spPr/>
+      </p:sp>
+      <p:sp>
+        <p:nvSpPr>
+          <p:cNvPr id="3" name="Notes Placeholder 2"/>
+          <p:cNvSpPr>
+            <a:spLocks noGrp="1"/>
+          </p:cNvSpPr>
+          <p:nvPr>
+            <p:ph type="body" idx="1"/>
+          </p:nvPr>
+        </p:nvSpPr>
+        <p:spPr/>
+        <p:txBody>
+          <a:bodyPr/>
+          <a:lstStyle/>
+          <a:p>
+            <a:r>
+              <a:rPr lang="en-US" dirty="0" smtClean="0"/>
+              <a:t>The default and static methods are not abstract because they define a body.  Equals and </a:t>
+            </a:r>
+            <a:r>
+              <a:rPr lang="en-US" dirty="0" err="1" smtClean="0"/>
+              <a:t>hashCode</a:t>
+            </a:r>
+            <a:r>
+              <a:rPr lang="en-US" baseline="0" dirty="0" smtClean="0"/>
+              <a:t> are not abstract because they are defined by Object.  The optional @</a:t>
+            </a:r>
+            <a:r>
+              <a:rPr lang="en-US" baseline="0" dirty="0" err="1" smtClean="0"/>
+              <a:t>FunctionalInterface</a:t>
+            </a:r>
+            <a:r>
+              <a:rPr lang="en-US" baseline="0" dirty="0" smtClean="0"/>
+              <a:t> annotation causes the compiler to verify and enforce that there is exactly 1 abstract method. </a:t>
+            </a:r>
+            <a:endParaRPr lang="en-US" dirty="0"/>
+          </a:p>
+        </p:txBody>
+      </p:sp>
+      <p:sp>
+        <p:nvSpPr>
+          <p:cNvPr id="4" name="Slide Number Placeholder 3"/>
+          <p:cNvSpPr>
+            <a:spLocks noGrp="1"/>
+          </p:cNvSpPr>
+          <p:nvPr>
+            <p:ph type="sldNum" sz="quarter" idx="10"/>
+          </p:nvPr>
+        </p:nvSpPr>
+        <p:spPr/>
+        <p:txBody>
+          <a:bodyPr/>
+          <a:lstStyle/>
+          <a:p>
+            <a:fld id="{9B9A5078-34A5-4200-8953-1FDEE337BA82}" type="slidenum">
+              <a:rPr lang="en-US" smtClean="0"/>
+              <a:t>6</a:t>
+            </a:fld>
+            <a:endParaRPr lang="en-US"/>
+          </a:p>
+        </p:txBody>
+      </p:sp>
+    </p:spTree>
+    <p:extLst>
+      <p:ext uri="{BB962C8B-B14F-4D97-AF65-F5344CB8AC3E}">
+        <p14:creationId xmlns:p14="http://schemas.microsoft.com/office/powerpoint/2010/main" val="669756766"/>
+      </p:ext>
+    </p:extLst>
+  </p:cSld>
+  <p:clrMapOvr>
+    <a:masterClrMapping/>
+  </p:clrMapOvr>
+</p:notes>
+</file>
+
+<file path=ppt/notesSlides/notesSlide6.xml><?xml version="1.0" encoding="utf-8"?>
+<p:notes xmlns:a="http://schemas.openxmlformats.org/drawingml/2006/main" xmlns:r="http://schemas.openxmlformats.org/officeDocument/2006/relationships" xmlns:p="http://schemas.openxmlformats.org/presentationml/2006/main">
+  <p:cSld>
+    <p:spTree>
+      <p:nvGrpSpPr>
+        <p:cNvPr id="1" name=""/>
+        <p:cNvGrpSpPr/>
+        <p:nvPr/>
+      </p:nvGrpSpPr>
+      <p:grpSpPr>
+        <a:xfrm>
+          <a:off x="0" y="0"/>
+          <a:ext cx="0" cy="0"/>
+          <a:chOff x="0" y="0"/>
+          <a:chExt cx="0" cy="0"/>
+        </a:xfrm>
+      </p:grpSpPr>
+      <p:sp>
+        <p:nvSpPr>
+          <p:cNvPr id="2" name="Slide Image Placeholder 1"/>
+          <p:cNvSpPr>
+            <a:spLocks noGrp="1" noRot="1" noChangeAspect="1"/>
+          </p:cNvSpPr>
+          <p:nvPr>
+            <p:ph type="sldImg"/>
+          </p:nvPr>
+        </p:nvSpPr>
+        <p:spPr/>
+      </p:sp>
+      <p:sp>
+        <p:nvSpPr>
+          <p:cNvPr id="3" name="Notes Placeholder 2"/>
+          <p:cNvSpPr>
+            <a:spLocks noGrp="1"/>
+          </p:cNvSpPr>
+          <p:nvPr>
+            <p:ph type="body" idx="1"/>
+          </p:nvPr>
+        </p:nvSpPr>
+        <p:spPr/>
+        <p:txBody>
+          <a:bodyPr/>
+          <a:lstStyle/>
+          <a:p>
+            <a:r>
+              <a:rPr lang="en-US" dirty="0" smtClean="0"/>
+              <a:t>Java 8 uses type inference</a:t>
+            </a:r>
+            <a:r>
+              <a:rPr lang="en-US" baseline="0" dirty="0" smtClean="0"/>
+              <a:t> to produce a lambda with the correct return value and argument.  Saves much code.  Note how much more readable lambda is than </a:t>
+            </a:r>
+            <a:r>
+              <a:rPr lang="en-US" baseline="0" dirty="0" err="1" smtClean="0"/>
+              <a:t>innerClass</a:t>
+            </a:r>
+            <a:r>
+              <a:rPr lang="en-US" baseline="0" dirty="0" smtClean="0"/>
+              <a:t>. </a:t>
+            </a:r>
+            <a:endParaRPr lang="en-US" dirty="0"/>
+          </a:p>
+        </p:txBody>
+      </p:sp>
+      <p:sp>
+        <p:nvSpPr>
+          <p:cNvPr id="4" name="Slide Number Placeholder 3"/>
+          <p:cNvSpPr>
+            <a:spLocks noGrp="1"/>
+          </p:cNvSpPr>
+          <p:nvPr>
+            <p:ph type="sldNum" sz="quarter" idx="10"/>
+          </p:nvPr>
+        </p:nvSpPr>
+        <p:spPr/>
+        <p:txBody>
+          <a:bodyPr/>
+          <a:lstStyle/>
+          <a:p>
+            <a:fld id="{9B9A5078-34A5-4200-8953-1FDEE337BA82}" type="slidenum">
+              <a:rPr lang="en-US" smtClean="0"/>
+              <a:t>7</a:t>
+            </a:fld>
+            <a:endParaRPr lang="en-US"/>
+          </a:p>
+        </p:txBody>
+      </p:sp>
+    </p:spTree>
+    <p:extLst>
+      <p:ext uri="{BB962C8B-B14F-4D97-AF65-F5344CB8AC3E}">
+        <p14:creationId xmlns:p14="http://schemas.microsoft.com/office/powerpoint/2010/main" val="1205666790"/>
+      </p:ext>
+    </p:extLst>
+  </p:cSld>
+  <p:clrMapOvr>
+    <a:masterClrMapping/>
+  </p:clrMapOvr>
+</p:notes>
+</file>
+
+<file path=ppt/notesSlides/notesSlide7.xml><?xml version="1.0" encoding="utf-8"?>
+<p:notes xmlns:a="http://schemas.openxmlformats.org/drawingml/2006/main" xmlns:r="http://schemas.openxmlformats.org/officeDocument/2006/relationships" xmlns:p="http://schemas.openxmlformats.org/presentationml/2006/main">
+  <p:cSld>
+    <p:spTree>
+      <p:nvGrpSpPr>
+        <p:cNvPr id="1" name=""/>
+        <p:cNvGrpSpPr/>
+        <p:nvPr/>
+      </p:nvGrpSpPr>
+      <p:grpSpPr>
+        <a:xfrm>
+          <a:off x="0" y="0"/>
+          <a:ext cx="0" cy="0"/>
+          <a:chOff x="0" y="0"/>
+          <a:chExt cx="0" cy="0"/>
+        </a:xfrm>
+      </p:grpSpPr>
+      <p:sp>
+        <p:nvSpPr>
+          <p:cNvPr id="2" name="Slide Image Placeholder 1"/>
+          <p:cNvSpPr>
+            <a:spLocks noGrp="1" noRot="1" noChangeAspect="1"/>
+          </p:cNvSpPr>
+          <p:nvPr>
+            <p:ph type="sldImg"/>
+          </p:nvPr>
+        </p:nvSpPr>
+        <p:spPr/>
+      </p:sp>
+      <p:sp>
+        <p:nvSpPr>
+          <p:cNvPr id="3" name="Notes Placeholder 2"/>
+          <p:cNvSpPr>
+            <a:spLocks noGrp="1"/>
+          </p:cNvSpPr>
+          <p:nvPr>
+            <p:ph type="body" idx="1"/>
+          </p:nvPr>
+        </p:nvSpPr>
+        <p:spPr/>
+        <p:txBody>
+          <a:bodyPr/>
+          <a:lstStyle/>
+          <a:p>
+            <a:r>
+              <a:rPr lang="en-US" dirty="0" smtClean="0"/>
+              <a:t>This introduces key functional interfaces defined in</a:t>
+            </a:r>
+            <a:r>
+              <a:rPr lang="en-US" baseline="0" dirty="0" smtClean="0"/>
+              <a:t> Java 8.  Although any interface with exactly 1 abstract method is a Functional Interface, these are used by the Stream framework.</a:t>
+            </a:r>
+            <a:endParaRPr lang="en-US" dirty="0"/>
+          </a:p>
+        </p:txBody>
+      </p:sp>
+      <p:sp>
+        <p:nvSpPr>
+          <p:cNvPr id="4" name="Slide Number Placeholder 3"/>
+          <p:cNvSpPr>
+            <a:spLocks noGrp="1"/>
+          </p:cNvSpPr>
+          <p:nvPr>
+            <p:ph type="sldNum" sz="quarter" idx="10"/>
+          </p:nvPr>
+        </p:nvSpPr>
+        <p:spPr/>
+        <p:txBody>
+          <a:bodyPr/>
+          <a:lstStyle/>
+          <a:p>
+            <a:fld id="{9B9A5078-34A5-4200-8953-1FDEE337BA82}" type="slidenum">
+              <a:rPr lang="en-US" smtClean="0"/>
+              <a:t>8</a:t>
+            </a:fld>
+            <a:endParaRPr lang="en-US"/>
+          </a:p>
+        </p:txBody>
+      </p:sp>
+    </p:spTree>
+    <p:extLst>
+      <p:ext uri="{BB962C8B-B14F-4D97-AF65-F5344CB8AC3E}">
+        <p14:creationId xmlns:p14="http://schemas.microsoft.com/office/powerpoint/2010/main" val="3102681863"/>
+      </p:ext>
+    </p:extLst>
+  </p:cSld>
+  <p:clrMapOvr>
+    <a:masterClrMapping/>
+  </p:clrMapOvr>
+</p:notes>
+</file>
+
+<file path=ppt/notesSlides/notesSlide8.xml><?xml version="1.0" encoding="utf-8"?>
+<p:notes xmlns:a="http://schemas.openxmlformats.org/drawingml/2006/main" xmlns:r="http://schemas.openxmlformats.org/officeDocument/2006/relationships" xmlns:p="http://schemas.openxmlformats.org/presentationml/2006/main">
+  <p:cSld>
+    <p:spTree>
+      <p:nvGrpSpPr>
+        <p:cNvPr id="1" name=""/>
+        <p:cNvGrpSpPr/>
+        <p:nvPr/>
+      </p:nvGrpSpPr>
+      <p:grpSpPr>
+        <a:xfrm>
+          <a:off x="0" y="0"/>
+          <a:ext cx="0" cy="0"/>
+          <a:chOff x="0" y="0"/>
+          <a:chExt cx="0" cy="0"/>
+        </a:xfrm>
+      </p:grpSpPr>
+      <p:sp>
+        <p:nvSpPr>
+          <p:cNvPr id="2" name="Slide Image Placeholder 1"/>
+          <p:cNvSpPr>
+            <a:spLocks noGrp="1" noRot="1" noChangeAspect="1"/>
+          </p:cNvSpPr>
+          <p:nvPr>
+            <p:ph type="sldImg"/>
+          </p:nvPr>
+        </p:nvSpPr>
+        <p:spPr/>
+      </p:sp>
+      <p:sp>
+        <p:nvSpPr>
+          <p:cNvPr id="3" name="Notes Placeholder 2"/>
+          <p:cNvSpPr>
+            <a:spLocks noGrp="1"/>
+          </p:cNvSpPr>
+          <p:nvPr>
+            <p:ph type="body" idx="1"/>
+          </p:nvPr>
+        </p:nvSpPr>
+        <p:spPr/>
+        <p:txBody>
+          <a:bodyPr/>
+          <a:lstStyle/>
+          <a:p>
+            <a:r>
+              <a:rPr lang="en-US" dirty="0" smtClean="0"/>
+              <a:t>Used</a:t>
+            </a:r>
+            <a:r>
+              <a:rPr lang="en-US" baseline="0" dirty="0" smtClean="0"/>
+              <a:t> for true/false, yes/no answers.  Primitive FIs are like their generic counterparts except that they either accept or return a primitive value of double, </a:t>
+            </a:r>
+            <a:r>
+              <a:rPr lang="en-US" baseline="0" dirty="0" err="1" smtClean="0"/>
+              <a:t>int</a:t>
+            </a:r>
+            <a:r>
+              <a:rPr lang="en-US" baseline="0" dirty="0" smtClean="0"/>
+              <a:t> or long.</a:t>
+            </a:r>
+            <a:endParaRPr lang="en-US" dirty="0"/>
+          </a:p>
+        </p:txBody>
+      </p:sp>
+      <p:sp>
+        <p:nvSpPr>
+          <p:cNvPr id="4" name="Slide Number Placeholder 3"/>
+          <p:cNvSpPr>
+            <a:spLocks noGrp="1"/>
+          </p:cNvSpPr>
+          <p:nvPr>
+            <p:ph type="sldNum" sz="quarter" idx="10"/>
+          </p:nvPr>
+        </p:nvSpPr>
+        <p:spPr/>
+        <p:txBody>
+          <a:bodyPr/>
+          <a:lstStyle/>
+          <a:p>
+            <a:fld id="{9B9A5078-34A5-4200-8953-1FDEE337BA82}" type="slidenum">
+              <a:rPr lang="en-US" smtClean="0"/>
+              <a:t>10</a:t>
+            </a:fld>
+            <a:endParaRPr lang="en-US"/>
+          </a:p>
+        </p:txBody>
+      </p:sp>
+    </p:spTree>
+    <p:extLst>
+      <p:ext uri="{BB962C8B-B14F-4D97-AF65-F5344CB8AC3E}">
+        <p14:creationId xmlns:p14="http://schemas.microsoft.com/office/powerpoint/2010/main" val="4241097965"/>
+      </p:ext>
+    </p:extLst>
+  </p:cSld>
+  <p:clrMapOvr>
+    <a:masterClrMapping/>
+  </p:clrMapOvr>
+</p:notes>
+</file>
+
+<file path=ppt/notesSlides/notesSlide9.xml><?xml version="1.0" encoding="utf-8"?>
+<p:notes xmlns:a="http://schemas.openxmlformats.org/drawingml/2006/main" xmlns:r="http://schemas.openxmlformats.org/officeDocument/2006/relationships" xmlns:p="http://schemas.openxmlformats.org/presentationml/2006/main">
+  <p:cSld>
+    <p:spTree>
+      <p:nvGrpSpPr>
+        <p:cNvPr id="1" name=""/>
+        <p:cNvGrpSpPr/>
+        <p:nvPr/>
+      </p:nvGrpSpPr>
+      <p:grpSpPr>
+        <a:xfrm>
+          <a:off x="0" y="0"/>
+          <a:ext cx="0" cy="0"/>
+          <a:chOff x="0" y="0"/>
+          <a:chExt cx="0" cy="0"/>
+        </a:xfrm>
+      </p:grpSpPr>
+      <p:sp>
+        <p:nvSpPr>
+          <p:cNvPr id="2" name="Slide Image Placeholder 1"/>
+          <p:cNvSpPr>
+            <a:spLocks noGrp="1" noRot="1" noChangeAspect="1"/>
+          </p:cNvSpPr>
+          <p:nvPr>
+            <p:ph type="sldImg"/>
+          </p:nvPr>
+        </p:nvSpPr>
+        <p:spPr/>
+      </p:sp>
+      <p:sp>
+        <p:nvSpPr>
+          <p:cNvPr id="3" name="Notes Placeholder 2"/>
+          <p:cNvSpPr>
+            <a:spLocks noGrp="1"/>
+          </p:cNvSpPr>
+          <p:nvPr>
+            <p:ph type="body" idx="1"/>
+          </p:nvPr>
+        </p:nvSpPr>
+        <p:spPr/>
+        <p:txBody>
+          <a:bodyPr/>
+          <a:lstStyle/>
+          <a:p>
+            <a:pPr marL="0" marR="0" lvl="0" indent="0" algn="l" defTabSz="914400" rtl="0" eaLnBrk="1" fontAlgn="auto" latinLnBrk="0" hangingPunct="1">
+              <a:lnSpc>
+                <a:spcPct val="100000"/>
+              </a:lnSpc>
+              <a:spcBef>
+                <a:spcPts val="0"/>
+              </a:spcBef>
+              <a:spcAft>
+                <a:spcPts val="0"/>
+              </a:spcAft>
+              <a:buClrTx/>
+              <a:buSzTx/>
+              <a:buFontTx/>
+              <a:buNone/>
+              <a:tabLst/>
+              <a:defRPr/>
+            </a:pPr>
+            <a:r>
+              <a:rPr lang="en-US" dirty="0" smtClean="0"/>
+              <a:t>The </a:t>
+            </a:r>
+            <a:r>
+              <a:rPr lang="en-US" dirty="0" err="1" smtClean="0"/>
+              <a:t>forEach</a:t>
+            </a:r>
+            <a:r>
+              <a:rPr lang="en-US" dirty="0" smtClean="0"/>
+              <a:t> method may</a:t>
+            </a:r>
+            <a:r>
+              <a:rPr lang="en-US" baseline="0" dirty="0" smtClean="0"/>
+              <a:t> be used as a replacement for the imperative for loop in many cases. </a:t>
+            </a:r>
+            <a:r>
+              <a:rPr lang="en-US" dirty="0" smtClean="0"/>
+              <a:t>Lambdas and FIs</a:t>
+            </a:r>
+            <a:r>
+              <a:rPr lang="en-US" baseline="0" dirty="0" smtClean="0"/>
+              <a:t> can be used as lightweight building blocks for pattern based development: instead of needing a constellation of classes to implement various visitors, the Consumer FI and lambdas can do the job instead.</a:t>
+            </a:r>
+            <a:endParaRPr lang="en-US" dirty="0" smtClean="0"/>
+          </a:p>
+        </p:txBody>
+      </p:sp>
+      <p:sp>
+        <p:nvSpPr>
+          <p:cNvPr id="4" name="Slide Number Placeholder 3"/>
+          <p:cNvSpPr>
+            <a:spLocks noGrp="1"/>
+          </p:cNvSpPr>
+          <p:nvPr>
+            <p:ph type="sldNum" sz="quarter" idx="10"/>
+          </p:nvPr>
+        </p:nvSpPr>
+        <p:spPr/>
+        <p:txBody>
+          <a:bodyPr/>
+          <a:lstStyle/>
+          <a:p>
+            <a:fld id="{9B9A5078-34A5-4200-8953-1FDEE337BA82}" type="slidenum">
+              <a:rPr lang="en-US" smtClean="0"/>
+              <a:t>11</a:t>
+            </a:fld>
+            <a:endParaRPr lang="en-US"/>
+          </a:p>
+        </p:txBody>
+      </p:sp>
+    </p:spTree>
+    <p:extLst>
+      <p:ext uri="{BB962C8B-B14F-4D97-AF65-F5344CB8AC3E}">
+        <p14:creationId xmlns:p14="http://schemas.microsoft.com/office/powerpoint/2010/main" val="2666960812"/>
+      </p:ext>
+    </p:extLst>
+  </p:cSld>
+  <p:clrMapOvr>
+    <a:masterClrMapping/>
+  </p:clrMapOvr>
+</p:notes>
 </file>
 
 <file path=ppt/slideLayouts/slideLayout1.xml><?xml version="1.0" encoding="utf-8"?>
@@ -940,7 +3558,7 @@
             <a:fld id="{B61BEF0D-F0BB-DE4B-95CE-6DB70DBA9567}" type="datetimeFigureOut">
               <a:rPr lang="en-US" dirty="0"/>
               <a:pPr/>
-              <a:t>5/16/2017</a:t>
+              <a:t>6/8/2017</a:t>
             </a:fld>
             <a:endParaRPr lang="en-US" dirty="0"/>
           </a:p>
@@ -1188,7 +3806,7 @@
             <a:fld id="{B61BEF0D-F0BB-DE4B-95CE-6DB70DBA9567}" type="datetimeFigureOut">
               <a:rPr lang="en-US" dirty="0"/>
               <a:pPr/>
-              <a:t>5/16/2017</a:t>
+              <a:t>6/8/2017</a:t>
             </a:fld>
             <a:endParaRPr lang="en-US" dirty="0"/>
           </a:p>
@@ -1499,7 +4117,7 @@
             <a:fld id="{B61BEF0D-F0BB-DE4B-95CE-6DB70DBA9567}" type="datetimeFigureOut">
               <a:rPr lang="en-US" dirty="0"/>
               <a:pPr/>
-              <a:t>5/16/2017</a:t>
+              <a:t>6/8/2017</a:t>
             </a:fld>
             <a:endParaRPr lang="en-US" dirty="0"/>
           </a:p>
@@ -1837,7 +4455,7 @@
             <a:fld id="{B61BEF0D-F0BB-DE4B-95CE-6DB70DBA9567}" type="datetimeFigureOut">
               <a:rPr lang="en-US" dirty="0"/>
               <a:pPr/>
-              <a:t>5/16/2017</a:t>
+              <a:t>6/8/2017</a:t>
             </a:fld>
             <a:endParaRPr lang="en-US" dirty="0"/>
           </a:p>
@@ -2148,7 +4766,7 @@
             <a:fld id="{B61BEF0D-F0BB-DE4B-95CE-6DB70DBA9567}" type="datetimeFigureOut">
               <a:rPr lang="en-US" dirty="0"/>
               <a:pPr/>
-              <a:t>5/16/2017</a:t>
+              <a:t>6/8/2017</a:t>
             </a:fld>
             <a:endParaRPr lang="en-US" dirty="0"/>
           </a:p>
@@ -2538,7 +5156,7 @@
             <a:fld id="{B61BEF0D-F0BB-DE4B-95CE-6DB70DBA9567}" type="datetimeFigureOut">
               <a:rPr lang="en-US" dirty="0"/>
               <a:pPr/>
-              <a:t>5/16/2017</a:t>
+              <a:t>6/8/2017</a:t>
             </a:fld>
             <a:endParaRPr lang="en-US" dirty="0"/>
           </a:p>
@@ -2704,7 +5322,7 @@
           <a:p>
             <a:fld id="{55C6B4A9-1611-4792-9094-5F34BCA07E0B}" type="datetimeFigureOut">
               <a:rPr lang="en-US" dirty="0"/>
-              <a:t>5/16/2017</a:t>
+              <a:t>6/8/2017</a:t>
             </a:fld>
             <a:endParaRPr lang="en-US" dirty="0"/>
           </a:p>
@@ -2880,7 +5498,7 @@
             <a:fld id="{B61BEF0D-F0BB-DE4B-95CE-6DB70DBA9567}" type="datetimeFigureOut">
               <a:rPr lang="en-US" dirty="0"/>
               <a:pPr/>
-              <a:t>5/16/2017</a:t>
+              <a:t>6/8/2017</a:t>
             </a:fld>
             <a:endParaRPr lang="en-US" dirty="0"/>
           </a:p>
@@ -3053,7 +5671,7 @@
             <a:fld id="{B61BEF0D-F0BB-DE4B-95CE-6DB70DBA9567}" type="datetimeFigureOut">
               <a:rPr lang="en-US" dirty="0"/>
               <a:pPr/>
-              <a:t>5/16/2017</a:t>
+              <a:t>6/8/2017</a:t>
             </a:fld>
             <a:endParaRPr lang="en-US" dirty="0"/>
           </a:p>
@@ -3297,7 +5915,7 @@
             <a:fld id="{B61BEF0D-F0BB-DE4B-95CE-6DB70DBA9567}" type="datetimeFigureOut">
               <a:rPr lang="en-US" dirty="0"/>
               <a:pPr/>
-              <a:t>5/16/2017</a:t>
+              <a:t>6/8/2017</a:t>
             </a:fld>
             <a:endParaRPr lang="en-US" dirty="0"/>
           </a:p>
@@ -3525,7 +6143,7 @@
           <a:p>
             <a:fld id="{EB712588-04B1-427B-82EE-E8DB90309F08}" type="datetimeFigureOut">
               <a:rPr lang="en-US" dirty="0"/>
-              <a:t>5/16/2017</a:t>
+              <a:t>6/8/2017</a:t>
             </a:fld>
             <a:endParaRPr lang="en-US" dirty="0"/>
           </a:p>
@@ -3895,7 +6513,7 @@
             <a:fld id="{B61BEF0D-F0BB-DE4B-95CE-6DB70DBA9567}" type="datetimeFigureOut">
               <a:rPr lang="en-US" dirty="0"/>
               <a:pPr/>
-              <a:t>5/16/2017</a:t>
+              <a:t>6/8/2017</a:t>
             </a:fld>
             <a:endParaRPr lang="en-US" dirty="0"/>
           </a:p>
@@ -4015,7 +6633,7 @@
             <a:fld id="{B61BEF0D-F0BB-DE4B-95CE-6DB70DBA9567}" type="datetimeFigureOut">
               <a:rPr lang="en-US" dirty="0"/>
               <a:pPr/>
-              <a:t>5/16/2017</a:t>
+              <a:t>6/8/2017</a:t>
             </a:fld>
             <a:endParaRPr lang="en-US" dirty="0"/>
           </a:p>
@@ -4107,7 +6725,7 @@
             <a:fld id="{B61BEF0D-F0BB-DE4B-95CE-6DB70DBA9567}" type="datetimeFigureOut">
               <a:rPr lang="en-US" dirty="0"/>
               <a:pPr/>
-              <a:t>5/16/2017</a:t>
+              <a:t>6/8/2017</a:t>
             </a:fld>
             <a:endParaRPr lang="en-US" dirty="0"/>
           </a:p>
@@ -4358,7 +6976,7 @@
           <a:p>
             <a:fld id="{42A54C80-263E-416B-A8E0-580EDEADCBDC}" type="datetimeFigureOut">
               <a:rPr lang="en-US" dirty="0"/>
-              <a:t>5/16/2017</a:t>
+              <a:t>6/8/2017</a:t>
             </a:fld>
             <a:endParaRPr lang="en-US" dirty="0"/>
           </a:p>
@@ -4617,7 +7235,7 @@
             <a:fld id="{B61BEF0D-F0BB-DE4B-95CE-6DB70DBA9567}" type="datetimeFigureOut">
               <a:rPr lang="en-US" dirty="0"/>
               <a:pPr/>
-              <a:t>5/16/2017</a:t>
+              <a:t>6/8/2017</a:t>
             </a:fld>
             <a:endParaRPr lang="en-US" dirty="0"/>
           </a:p>
@@ -5357,7 +7975,7 @@
             <a:fld id="{B61BEF0D-F0BB-DE4B-95CE-6DB70DBA9567}" type="datetimeFigureOut">
               <a:rPr lang="en-US" dirty="0"/>
               <a:pPr/>
-              <a:t>5/16/2017</a:t>
+              <a:t>6/8/2017</a:t>
             </a:fld>
             <a:endParaRPr lang="en-US" dirty="0"/>
           </a:p>
@@ -8264,11 +10882,7 @@
           <a:p>
             <a:r>
               <a:rPr lang="en-US" dirty="0" smtClean="0"/>
-              <a:t>Method </a:t>
-            </a:r>
-            <a:r>
-              <a:rPr lang="en-US" dirty="0" smtClean="0"/>
-              <a:t>Reference</a:t>
+              <a:t>Method Reference</a:t>
             </a:r>
             <a:endParaRPr lang="en-US" dirty="0"/>
           </a:p>
@@ -9796,19 +12410,19 @@
             </a:r>
             <a:r>
               <a:rPr lang="en-US" sz="2600" dirty="0" smtClean="0">
-                <a:hlinkClick r:id="rId2"/>
+                <a:hlinkClick r:id="rId3"/>
               </a:rPr>
               <a:t>https</a:t>
             </a:r>
             <a:r>
               <a:rPr lang="en-US" sz="2600" dirty="0">
-                <a:hlinkClick r:id="rId2"/>
+                <a:hlinkClick r:id="rId3"/>
               </a:rPr>
               <a:t>://</a:t>
             </a:r>
             <a:r>
               <a:rPr lang="en-US" sz="2600" dirty="0" smtClean="0">
-                <a:hlinkClick r:id="rId2"/>
+                <a:hlinkClick r:id="rId3"/>
               </a:rPr>
               <a:t>www.linkedin.com/in/richardroda</a:t>
             </a:r>
@@ -9835,19 +12449,19 @@
             </a:r>
             <a:r>
               <a:rPr lang="en-US" sz="2600" dirty="0" smtClean="0">
-                <a:hlinkClick r:id="rId3"/>
+                <a:hlinkClick r:id="rId4"/>
               </a:rPr>
               <a:t>https</a:t>
             </a:r>
             <a:r>
               <a:rPr lang="en-US" sz="2600" dirty="0">
-                <a:hlinkClick r:id="rId3"/>
+                <a:hlinkClick r:id="rId4"/>
               </a:rPr>
               <a:t>://</a:t>
             </a:r>
             <a:r>
               <a:rPr lang="en-US" sz="2600" dirty="0" smtClean="0">
-                <a:hlinkClick r:id="rId3"/>
+                <a:hlinkClick r:id="rId4"/>
               </a:rPr>
               <a:t>tinyurl.com/love-lambda</a:t>
             </a:r>
@@ -10353,7 +12967,19 @@
           <a:p>
             <a:r>
               <a:rPr lang="en-US" sz="2000" dirty="0" smtClean="0"/>
-              <a:t>Must be bound to a lambda that has a non-void return type.</a:t>
+              <a:t>Must be bound to a </a:t>
+            </a:r>
+            <a:r>
+              <a:rPr lang="en-US" sz="2000" dirty="0" smtClean="0"/>
+              <a:t>functional interface</a:t>
+            </a:r>
+            <a:r>
+              <a:rPr lang="en-US" sz="2000" dirty="0" smtClean="0"/>
+              <a:t> </a:t>
+            </a:r>
+            <a:r>
+              <a:rPr lang="en-US" sz="2000" dirty="0" smtClean="0"/>
+              <a:t>that has a non-void return type.</a:t>
             </a:r>
             <a:endParaRPr lang="en-US" sz="2000" dirty="0"/>
           </a:p>
@@ -10953,7 +13579,7 @@
           <a:p>
             <a:r>
               <a:rPr lang="en-US" dirty="0" smtClean="0"/>
-              <a:t>Java Stream Definition</a:t>
+              <a:t>What is a Java Stream?</a:t>
             </a:r>
             <a:endParaRPr lang="en-US" dirty="0"/>
           </a:p>
@@ -13020,8 +15646,25 @@
             </a:r>
             <a:r>
               <a:rPr lang="en-US" dirty="0" smtClean="0"/>
-              <a:t> is the identity argument.  For addition, it is 0.  For a multiplication it is 1.</a:t>
-            </a:r>
+              <a:t> is the identity </a:t>
+            </a:r>
+            <a:r>
+              <a:rPr lang="en-US" dirty="0" smtClean="0"/>
+              <a:t>property</a:t>
+            </a:r>
+            <a:r>
+              <a:rPr lang="en-US" dirty="0" smtClean="0"/>
+              <a:t>.  </a:t>
+            </a:r>
+            <a:r>
+              <a:rPr lang="en-US" dirty="0" smtClean="0"/>
+              <a:t>For addition, it is 0.  For a multiplication it is </a:t>
+            </a:r>
+            <a:r>
+              <a:rPr lang="en-US" dirty="0" smtClean="0"/>
+              <a:t>1, for strings it is “” (empty string).</a:t>
+            </a:r>
+            <a:endParaRPr lang="en-US" dirty="0" smtClean="0"/>
           </a:p>
           <a:p>
             <a:r>
@@ -14266,19 +16909,29 @@
         </p:nvSpPr>
         <p:spPr>
           <a:xfrm>
-            <a:off x="677334" y="1640541"/>
+            <a:off x="524934" y="1521478"/>
             <a:ext cx="8596668" cy="4400821"/>
           </a:xfrm>
         </p:spPr>
         <p:txBody>
           <a:bodyPr>
-            <a:normAutofit/>
+            <a:normAutofit lnSpcReduction="10000"/>
           </a:bodyPr>
           <a:lstStyle/>
           <a:p>
             <a:r>
               <a:rPr lang="en-US" sz="2400" dirty="0" smtClean="0"/>
-              <a:t>Apply a computation on stream elements.</a:t>
+              <a:t>Intermediate operation</a:t>
+            </a:r>
+          </a:p>
+          <a:p>
+            <a:r>
+              <a:rPr lang="en-US" sz="2400" dirty="0" smtClean="0"/>
+              <a:t>Apply </a:t>
+            </a:r>
+            <a:r>
+              <a:rPr lang="en-US" sz="2400" dirty="0" smtClean="0"/>
+              <a:t>a computation on stream elements.</a:t>
             </a:r>
           </a:p>
           <a:p>
@@ -15512,23 +18165,8 @@
                 </a:solidFill>
                 <a:latin typeface="Courier New" panose="02070309020205020404" pitchFamily="49" charset="0"/>
               </a:rPr>
-              <a:t>Operation</a:t>
-            </a:r>
-            <a:r>
-              <a:rPr lang="en-US" sz="2400" dirty="0" smtClean="0">
-                <a:solidFill>
-                  <a:srgbClr val="008000"/>
-                </a:solidFill>
-                <a:latin typeface="Courier New" panose="02070309020205020404" pitchFamily="49" charset="0"/>
-              </a:rPr>
-              <a:t> </a:t>
-            </a:r>
-            <a:endParaRPr lang="en-US" sz="2400" dirty="0" smtClean="0">
-              <a:solidFill>
-                <a:srgbClr val="008000"/>
-              </a:solidFill>
-              <a:latin typeface="Courier New" panose="02070309020205020404" pitchFamily="49" charset="0"/>
-            </a:endParaRPr>
+              <a:t>Operation </a:t>
+            </a:r>
           </a:p>
           <a:p>
             <a:pPr marL="0" indent="0">
@@ -17400,15 +20038,7 @@
           <a:p>
             <a:r>
               <a:rPr lang="en-US" sz="2400" dirty="0" smtClean="0"/>
-              <a:t>Similar to a </a:t>
-            </a:r>
-            <a:r>
-              <a:rPr lang="en-US" sz="2400" dirty="0" smtClean="0"/>
-              <a:t>closure: </a:t>
-            </a:r>
-            <a:r>
-              <a:rPr lang="en-US" sz="2400" dirty="0" smtClean="0"/>
-              <a:t>class members, </a:t>
+              <a:t>Similar to a closure: class members, </a:t>
             </a:r>
             <a:r>
               <a:rPr lang="en-US" sz="2400" i="1" dirty="0" smtClean="0"/>
@@ -17422,8 +20052,13 @@
           <a:p>
             <a:r>
               <a:rPr lang="en-US" sz="2400" dirty="0" smtClean="0"/>
-              <a:t>Lambdas may only exist when assigned to a Functional Interface, including being passed in as a parameter.</a:t>
-            </a:r>
+              <a:t>Lambdas may only exist when assigned to a Functional Interface, including being passed in as a </a:t>
+            </a:r>
+            <a:r>
+              <a:rPr lang="en-US" sz="2400" dirty="0" smtClean="0"/>
+              <a:t>parameter or returned as a result.</a:t>
+            </a:r>
+            <a:endParaRPr lang="en-US" sz="2400" dirty="0" smtClean="0"/>
           </a:p>
           <a:p>
             <a:r>
@@ -22858,26 +25493,16 @@
               <a:t> </a:t>
             </a:r>
             <a:r>
-              <a:rPr lang="en-US" b="1" dirty="0" smtClean="0">
-                <a:solidFill>
-                  <a:srgbClr val="000080"/>
-                </a:solidFill>
-                <a:latin typeface="Courier New" panose="02070309020205020404" pitchFamily="49" charset="0"/>
-              </a:rPr>
-              <a:t>(</a:t>
-            </a:r>
-            <a:r>
               <a:rPr lang="en-US" i="1" dirty="0" smtClean="0"/>
-              <a:t>[Argument List]</a:t>
-            </a:r>
-            <a:r>
-              <a:rPr lang="en-US" b="1" dirty="0" smtClean="0">
-                <a:solidFill>
-                  <a:srgbClr val="000080"/>
-                </a:solidFill>
-                <a:latin typeface="Courier New" panose="02070309020205020404" pitchFamily="49" charset="0"/>
-              </a:rPr>
-              <a:t>)</a:t>
+              <a:t>[</a:t>
+            </a:r>
+            <a:r>
+              <a:rPr lang="en-US" i="1" dirty="0" smtClean="0"/>
+              <a:t>Argument List</a:t>
+            </a:r>
+            <a:r>
+              <a:rPr lang="en-US" i="1" dirty="0" smtClean="0"/>
+              <a:t>]</a:t>
             </a:r>
             <a:r>
               <a:rPr lang="en-US" dirty="0" smtClean="0">
@@ -22908,32 +25533,23 @@
             </a:r>
             <a:r>
               <a:rPr lang="en-US" i="1" dirty="0" smtClean="0"/>
-              <a:t>statement</a:t>
-            </a:r>
+              <a:t>statement </a:t>
+            </a:r>
+            <a:endParaRPr lang="en-US" i="1" dirty="0" smtClean="0"/>
           </a:p>
           <a:p>
             <a:pPr lvl="1"/>
             <a:r>
-              <a:rPr lang="en-US" b="1" dirty="0" smtClean="0">
-                <a:solidFill>
-                  <a:srgbClr val="000080"/>
-                </a:solidFill>
-                <a:latin typeface="Courier New" panose="02070309020205020404" pitchFamily="49" charset="0"/>
-              </a:rPr>
-              <a:t>(</a:t>
-            </a:r>
-            <a:r>
               <a:rPr lang="en-US" i="1" dirty="0" smtClean="0"/>
-              <a:t>[Argument List]</a:t>
-            </a:r>
-            <a:r>
-              <a:rPr lang="en-US" b="1" dirty="0" smtClean="0">
-                <a:solidFill>
-                  <a:srgbClr val="000080"/>
-                </a:solidFill>
-                <a:latin typeface="Courier New" panose="02070309020205020404" pitchFamily="49" charset="0"/>
-              </a:rPr>
-              <a:t>)</a:t>
+              <a:t> [</a:t>
+            </a:r>
+            <a:r>
+              <a:rPr lang="en-US" i="1" dirty="0" smtClean="0"/>
+              <a:t>Argument List</a:t>
+            </a:r>
+            <a:r>
+              <a:rPr lang="en-US" i="1" dirty="0" smtClean="0"/>
+              <a:t>]</a:t>
             </a:r>
             <a:r>
               <a:rPr lang="en-US" dirty="0" smtClean="0">
@@ -23115,7 +25731,11 @@
             </a:r>
             <a:r>
               <a:rPr lang="en-US" dirty="0" smtClean="0"/>
-              <a:t> form, the return is optional for a void return value.  When using a </a:t>
+              <a:t> form, the return is optional for a void return value.  When using </a:t>
+            </a:r>
+            <a:r>
+              <a:rPr lang="en-US" dirty="0" smtClean="0"/>
+              <a:t>a single </a:t>
             </a:r>
             <a:r>
               <a:rPr lang="en-US" i="1" dirty="0" smtClean="0"/>
@@ -23220,7 +25840,7 @@
             </a:r>
             <a:r>
               <a:rPr lang="en-US" sz="2100" dirty="0" smtClean="0">
-                <a:hlinkClick r:id="rId2"/>
+                <a:hlinkClick r:id="rId3"/>
               </a:rPr>
               <a:t>Oracle Java Tutorial</a:t>
             </a:r>
@@ -25455,6 +28075,10 @@
           <a:bodyPr/>
           <a:lstStyle/>
           <a:p>
+            <a:r>
+              <a:rPr lang="en-US" dirty="0" smtClean="0"/>
+              <a:t>Used by Streams</a:t>
+            </a:r>
             <a:endParaRPr lang="en-US" dirty="0"/>
           </a:p>
         </p:txBody>
@@ -25590,7 +28214,11 @@
           <a:p>
             <a:r>
               <a:rPr lang="en-US" sz="2400" dirty="0" smtClean="0"/>
-              <a:t>May FIs that take one argument have a corresponding two argument version prefixed with “Bi”.</a:t>
+              <a:t>Many </a:t>
+            </a:r>
+            <a:r>
+              <a:rPr lang="en-US" sz="2400" dirty="0" smtClean="0"/>
+              <a:t>FIs that take one argument have a corresponding two argument version prefixed with “Bi”.</a:t>
             </a:r>
           </a:p>
           <a:p>
@@ -25876,4 +28504,265 @@
     </a:ext>
   </a:extLst>
 </a:theme>
+</file>
+
+<file path=ppt/theme/theme2.xml><?xml version="1.0" encoding="utf-8"?>
+<a:theme xmlns:a="http://schemas.openxmlformats.org/drawingml/2006/main" name="Office Theme">
+  <a:themeElements>
+    <a:clrScheme name="Office">
+      <a:dk1>
+        <a:sysClr val="windowText" lastClr="000000"/>
+      </a:dk1>
+      <a:lt1>
+        <a:sysClr val="window" lastClr="FFFFFF"/>
+      </a:lt1>
+      <a:dk2>
+        <a:srgbClr val="44546A"/>
+      </a:dk2>
+      <a:lt2>
+        <a:srgbClr val="E7E6E6"/>
+      </a:lt2>
+      <a:accent1>
+        <a:srgbClr val="5B9BD5"/>
+      </a:accent1>
+      <a:accent2>
+        <a:srgbClr val="ED7D31"/>
+      </a:accent2>
+      <a:accent3>
+        <a:srgbClr val="A5A5A5"/>
+      </a:accent3>
+      <a:accent4>
+        <a:srgbClr val="FFC000"/>
+      </a:accent4>
+      <a:accent5>
+        <a:srgbClr val="4472C4"/>
+      </a:accent5>
+      <a:accent6>
+        <a:srgbClr val="70AD47"/>
+      </a:accent6>
+      <a:hlink>
+        <a:srgbClr val="0563C1"/>
+      </a:hlink>
+      <a:folHlink>
+        <a:srgbClr val="954F72"/>
+      </a:folHlink>
+    </a:clrScheme>
+    <a:fontScheme name="Office">
+      <a:majorFont>
+        <a:latin typeface="Calibri Light" panose="020F0302020204030204"/>
+        <a:ea typeface=""/>
+        <a:cs typeface=""/>
+        <a:font script="Jpan" typeface="ＭＳ Ｐゴシック"/>
+        <a:font script="Hang" typeface="맑은 고딕"/>
+        <a:font script="Hans" typeface="宋体"/>
+        <a:font script="Hant" typeface="新細明體"/>
+        <a:font script="Arab" typeface="Times New Roman"/>
+        <a:font script="Hebr" typeface="Times New Roman"/>
+        <a:font script="Thai" typeface="Angsana New"/>
+        <a:font script="Ethi" typeface="Nyala"/>
+        <a:font script="Beng" typeface="Vrinda"/>
+        <a:font script="Gujr" typeface="Shruti"/>
+        <a:font script="Khmr" typeface="MoolBoran"/>
+        <a:font script="Knda" typeface="Tunga"/>
+        <a:font script="Guru" typeface="Raavi"/>
+        <a:font script="Cans" typeface="Euphemia"/>
+        <a:font script="Cher" typeface="Plantagenet Cherokee"/>
+        <a:font script="Yiii" typeface="Microsoft Yi Baiti"/>
+        <a:font script="Tibt" typeface="Microsoft Himalaya"/>
+        <a:font script="Thaa" typeface="MV Boli"/>
+        <a:font script="Deva" typeface="Mangal"/>
+        <a:font script="Telu" typeface="Gautami"/>
+        <a:font script="Taml" typeface="Latha"/>
+        <a:font script="Syrc" typeface="Estrangelo Edessa"/>
+        <a:font script="Orya" typeface="Kalinga"/>
+        <a:font script="Mlym" typeface="Kartika"/>
+        <a:font script="Laoo" typeface="DokChampa"/>
+        <a:font script="Sinh" typeface="Iskoola Pota"/>
+        <a:font script="Mong" typeface="Mongolian Baiti"/>
+        <a:font script="Viet" typeface="Times New Roman"/>
+        <a:font script="Uigh" typeface="Microsoft Uighur"/>
+        <a:font script="Geor" typeface="Sylfaen"/>
+      </a:majorFont>
+      <a:minorFont>
+        <a:latin typeface="Calibri" panose="020F0502020204030204"/>
+        <a:ea typeface=""/>
+        <a:cs typeface=""/>
+        <a:font script="Jpan" typeface="ＭＳ Ｐゴシック"/>
+        <a:font script="Hang" typeface="맑은 고딕"/>
+        <a:font script="Hans" typeface="宋体"/>
+        <a:font script="Hant" typeface="新細明體"/>
+        <a:font script="Arab" typeface="Arial"/>
+        <a:font script="Hebr" typeface="Arial"/>
+        <a:font script="Thai" typeface="Cordia New"/>
+        <a:font script="Ethi" typeface="Nyala"/>
+        <a:font script="Beng" typeface="Vrinda"/>
+        <a:font script="Gujr" typeface="Shruti"/>
+        <a:font script="Khmr" typeface="DaunPenh"/>
+        <a:font script="Knda" typeface="Tunga"/>
+        <a:font script="Guru" typeface="Raavi"/>
+        <a:font script="Cans" typeface="Euphemia"/>
+        <a:font script="Cher" typeface="Plantagenet Cherokee"/>
+        <a:font script="Yiii" typeface="Microsoft Yi Baiti"/>
+        <a:font script="Tibt" typeface="Microsoft Himalaya"/>
+        <a:font script="Thaa" typeface="MV Boli"/>
+        <a:font script="Deva" typeface="Mangal"/>
+        <a:font script="Telu" typeface="Gautami"/>
+        <a:font script="Taml" typeface="Latha"/>
+        <a:font script="Syrc" typeface="Estrangelo Edessa"/>
+        <a:font script="Orya" typeface="Kalinga"/>
+        <a:font script="Mlym" typeface="Kartika"/>
+        <a:font script="Laoo" typeface="DokChampa"/>
+        <a:font script="Sinh" typeface="Iskoola Pota"/>
+        <a:font script="Mong" typeface="Mongolian Baiti"/>
+        <a:font script="Viet" typeface="Arial"/>
+        <a:font script="Uigh" typeface="Microsoft Uighur"/>
+        <a:font script="Geor" typeface="Sylfaen"/>
+      </a:minorFont>
+    </a:fontScheme>
+    <a:fmtScheme name="Office">
+      <a:fillStyleLst>
+        <a:solidFill>
+          <a:schemeClr val="phClr"/>
+        </a:solidFill>
+        <a:gradFill rotWithShape="1">
+          <a:gsLst>
+            <a:gs pos="0">
+              <a:schemeClr val="phClr">
+                <a:lumMod val="110000"/>
+                <a:satMod val="105000"/>
+                <a:tint val="67000"/>
+              </a:schemeClr>
+            </a:gs>
+            <a:gs pos="50000">
+              <a:schemeClr val="phClr">
+                <a:lumMod val="105000"/>
+                <a:satMod val="103000"/>
+                <a:tint val="73000"/>
+              </a:schemeClr>
+            </a:gs>
+            <a:gs pos="100000">
+              <a:schemeClr val="phClr">
+                <a:lumMod val="105000"/>
+                <a:satMod val="109000"/>
+                <a:tint val="81000"/>
+              </a:schemeClr>
+            </a:gs>
+          </a:gsLst>
+          <a:lin ang="5400000" scaled="0"/>
+        </a:gradFill>
+        <a:gradFill rotWithShape="1">
+          <a:gsLst>
+            <a:gs pos="0">
+              <a:schemeClr val="phClr">
+                <a:satMod val="103000"/>
+                <a:lumMod val="102000"/>
+                <a:tint val="94000"/>
+              </a:schemeClr>
+            </a:gs>
+            <a:gs pos="50000">
+              <a:schemeClr val="phClr">
+                <a:satMod val="110000"/>
+                <a:lumMod val="100000"/>
+                <a:shade val="100000"/>
+              </a:schemeClr>
+            </a:gs>
+            <a:gs pos="100000">
+              <a:schemeClr val="phClr">
+                <a:lumMod val="99000"/>
+                <a:satMod val="120000"/>
+                <a:shade val="78000"/>
+              </a:schemeClr>
+            </a:gs>
+          </a:gsLst>
+          <a:lin ang="5400000" scaled="0"/>
+        </a:gradFill>
+      </a:fillStyleLst>
+      <a:lnStyleLst>
+        <a:ln w="6350" cap="flat" cmpd="sng" algn="ctr">
+          <a:solidFill>
+            <a:schemeClr val="phClr"/>
+          </a:solidFill>
+          <a:prstDash val="solid"/>
+          <a:miter lim="800000"/>
+        </a:ln>
+        <a:ln w="12700" cap="flat" cmpd="sng" algn="ctr">
+          <a:solidFill>
+            <a:schemeClr val="phClr"/>
+          </a:solidFill>
+          <a:prstDash val="solid"/>
+          <a:miter lim="800000"/>
+        </a:ln>
+        <a:ln w="19050" cap="flat" cmpd="sng" algn="ctr">
+          <a:solidFill>
+            <a:schemeClr val="phClr"/>
+          </a:solidFill>
+          <a:prstDash val="solid"/>
+          <a:miter lim="800000"/>
+        </a:ln>
+      </a:lnStyleLst>
+      <a:effectStyleLst>
+        <a:effectStyle>
+          <a:effectLst/>
+        </a:effectStyle>
+        <a:effectStyle>
+          <a:effectLst/>
+        </a:effectStyle>
+        <a:effectStyle>
+          <a:effectLst>
+            <a:outerShdw blurRad="57150" dist="19050" dir="5400000" algn="ctr" rotWithShape="0">
+              <a:srgbClr val="000000">
+                <a:alpha val="63000"/>
+              </a:srgbClr>
+            </a:outerShdw>
+          </a:effectLst>
+        </a:effectStyle>
+      </a:effectStyleLst>
+      <a:bgFillStyleLst>
+        <a:solidFill>
+          <a:schemeClr val="phClr"/>
+        </a:solidFill>
+        <a:solidFill>
+          <a:schemeClr val="phClr">
+            <a:tint val="95000"/>
+            <a:satMod val="170000"/>
+          </a:schemeClr>
+        </a:solidFill>
+        <a:gradFill rotWithShape="1">
+          <a:gsLst>
+            <a:gs pos="0">
+              <a:schemeClr val="phClr">
+                <a:tint val="93000"/>
+                <a:satMod val="150000"/>
+                <a:shade val="98000"/>
+                <a:lumMod val="102000"/>
+              </a:schemeClr>
+            </a:gs>
+            <a:gs pos="50000">
+              <a:schemeClr val="phClr">
+                <a:tint val="98000"/>
+                <a:satMod val="130000"/>
+                <a:shade val="90000"/>
+                <a:lumMod val="103000"/>
+              </a:schemeClr>
+            </a:gs>
+            <a:gs pos="100000">
+              <a:schemeClr val="phClr">
+                <a:shade val="63000"/>
+                <a:satMod val="120000"/>
+              </a:schemeClr>
+            </a:gs>
+          </a:gsLst>
+          <a:lin ang="5400000" scaled="0"/>
+        </a:gradFill>
+      </a:bgFillStyleLst>
+    </a:fmtScheme>
+  </a:themeElements>
+  <a:objectDefaults/>
+  <a:extraClrSchemeLst/>
+  <a:extLst>
+    <a:ext uri="{05A4C25C-085E-4340-85A3-A5531E510DB2}">
+      <thm15:themeFamily xmlns:thm15="http://schemas.microsoft.com/office/thememl/2012/main" name="Office Theme" id="{62F939B6-93AF-4DB8-9C6B-D6C7DFDC589F}" vid="{4A3C46E8-61CC-4603-A589-7422A47A8E4A}"/>
+    </a:ext>
+  </a:extLst>
+</a:theme>
 </file>
</xml_diff>

<commit_message>
Add slide explaining what Fibonacci numbers are, and a link to Oracle's quick start guide for lambdas.
</commit_message>
<xml_diff>
--- a/Learning to Love the Lambda in the Stream.pptx
+++ b/Learning to Love the Lambda in the Stream.pptx
@@ -5,7 +5,7 @@
     <p:sldMasterId id="2147483648" r:id="rId1"/>
   </p:sldMasterIdLst>
   <p:notesMasterIdLst>
-    <p:notesMasterId r:id="rId42"/>
+    <p:notesMasterId r:id="rId43"/>
   </p:notesMasterIdLst>
   <p:sldIdLst>
     <p:sldId id="256" r:id="rId2"/>
@@ -45,9 +45,10 @@
     <p:sldId id="280" r:id="rId36"/>
     <p:sldId id="281" r:id="rId37"/>
     <p:sldId id="282" r:id="rId38"/>
-    <p:sldId id="283" r:id="rId39"/>
-    <p:sldId id="284" r:id="rId40"/>
-    <p:sldId id="291" r:id="rId41"/>
+    <p:sldId id="296" r:id="rId39"/>
+    <p:sldId id="283" r:id="rId40"/>
+    <p:sldId id="284" r:id="rId41"/>
+    <p:sldId id="291" r:id="rId42"/>
   </p:sldIdLst>
   <p:sldSz cx="12192000" cy="6858000"/>
   <p:notesSz cx="6858000" cy="9144000"/>
@@ -208,6 +209,7 @@
         <p14:section name="Unit Testing a Stream" id="{30359A68-2953-4021-9A41-FAA25B40E841}">
           <p14:sldIdLst>
             <p14:sldId id="282"/>
+            <p14:sldId id="296"/>
             <p14:sldId id="283"/>
             <p14:sldId id="284"/>
           </p14:sldIdLst>
@@ -308,7 +310,7 @@
           <a:p>
             <a:fld id="{00F927AF-B093-4AD4-B894-C7B744C95185}" type="datetimeFigureOut">
               <a:rPr lang="en-US" smtClean="0"/>
-              <a:t>6/10/2017</a:t>
+              <a:t>6/11/2017</a:t>
             </a:fld>
             <a:endParaRPr lang="en-US"/>
           </a:p>
@@ -3636,7 +3638,7 @@
             <a:fld id="{B61BEF0D-F0BB-DE4B-95CE-6DB70DBA9567}" type="datetimeFigureOut">
               <a:rPr lang="en-US" dirty="0"/>
               <a:pPr/>
-              <a:t>6/10/2017</a:t>
+              <a:t>6/11/2017</a:t>
             </a:fld>
             <a:endParaRPr lang="en-US" dirty="0"/>
           </a:p>
@@ -3884,7 +3886,7 @@
             <a:fld id="{B61BEF0D-F0BB-DE4B-95CE-6DB70DBA9567}" type="datetimeFigureOut">
               <a:rPr lang="en-US" dirty="0"/>
               <a:pPr/>
-              <a:t>6/10/2017</a:t>
+              <a:t>6/11/2017</a:t>
             </a:fld>
             <a:endParaRPr lang="en-US" dirty="0"/>
           </a:p>
@@ -4195,7 +4197,7 @@
             <a:fld id="{B61BEF0D-F0BB-DE4B-95CE-6DB70DBA9567}" type="datetimeFigureOut">
               <a:rPr lang="en-US" dirty="0"/>
               <a:pPr/>
-              <a:t>6/10/2017</a:t>
+              <a:t>6/11/2017</a:t>
             </a:fld>
             <a:endParaRPr lang="en-US" dirty="0"/>
           </a:p>
@@ -4533,7 +4535,7 @@
             <a:fld id="{B61BEF0D-F0BB-DE4B-95CE-6DB70DBA9567}" type="datetimeFigureOut">
               <a:rPr lang="en-US" dirty="0"/>
               <a:pPr/>
-              <a:t>6/10/2017</a:t>
+              <a:t>6/11/2017</a:t>
             </a:fld>
             <a:endParaRPr lang="en-US" dirty="0"/>
           </a:p>
@@ -4844,7 +4846,7 @@
             <a:fld id="{B61BEF0D-F0BB-DE4B-95CE-6DB70DBA9567}" type="datetimeFigureOut">
               <a:rPr lang="en-US" dirty="0"/>
               <a:pPr/>
-              <a:t>6/10/2017</a:t>
+              <a:t>6/11/2017</a:t>
             </a:fld>
             <a:endParaRPr lang="en-US" dirty="0"/>
           </a:p>
@@ -5234,7 +5236,7 @@
             <a:fld id="{B61BEF0D-F0BB-DE4B-95CE-6DB70DBA9567}" type="datetimeFigureOut">
               <a:rPr lang="en-US" dirty="0"/>
               <a:pPr/>
-              <a:t>6/10/2017</a:t>
+              <a:t>6/11/2017</a:t>
             </a:fld>
             <a:endParaRPr lang="en-US" dirty="0"/>
           </a:p>
@@ -5400,7 +5402,7 @@
           <a:p>
             <a:fld id="{55C6B4A9-1611-4792-9094-5F34BCA07E0B}" type="datetimeFigureOut">
               <a:rPr lang="en-US" dirty="0"/>
-              <a:t>6/10/2017</a:t>
+              <a:t>6/11/2017</a:t>
             </a:fld>
             <a:endParaRPr lang="en-US" dirty="0"/>
           </a:p>
@@ -5576,7 +5578,7 @@
             <a:fld id="{B61BEF0D-F0BB-DE4B-95CE-6DB70DBA9567}" type="datetimeFigureOut">
               <a:rPr lang="en-US" dirty="0"/>
               <a:pPr/>
-              <a:t>6/10/2017</a:t>
+              <a:t>6/11/2017</a:t>
             </a:fld>
             <a:endParaRPr lang="en-US" dirty="0"/>
           </a:p>
@@ -5749,7 +5751,7 @@
             <a:fld id="{B61BEF0D-F0BB-DE4B-95CE-6DB70DBA9567}" type="datetimeFigureOut">
               <a:rPr lang="en-US" dirty="0"/>
               <a:pPr/>
-              <a:t>6/10/2017</a:t>
+              <a:t>6/11/2017</a:t>
             </a:fld>
             <a:endParaRPr lang="en-US" dirty="0"/>
           </a:p>
@@ -5993,7 +5995,7 @@
             <a:fld id="{B61BEF0D-F0BB-DE4B-95CE-6DB70DBA9567}" type="datetimeFigureOut">
               <a:rPr lang="en-US" dirty="0"/>
               <a:pPr/>
-              <a:t>6/10/2017</a:t>
+              <a:t>6/11/2017</a:t>
             </a:fld>
             <a:endParaRPr lang="en-US" dirty="0"/>
           </a:p>
@@ -6221,7 +6223,7 @@
           <a:p>
             <a:fld id="{EB712588-04B1-427B-82EE-E8DB90309F08}" type="datetimeFigureOut">
               <a:rPr lang="en-US" dirty="0"/>
-              <a:t>6/10/2017</a:t>
+              <a:t>6/11/2017</a:t>
             </a:fld>
             <a:endParaRPr lang="en-US" dirty="0"/>
           </a:p>
@@ -6591,7 +6593,7 @@
             <a:fld id="{B61BEF0D-F0BB-DE4B-95CE-6DB70DBA9567}" type="datetimeFigureOut">
               <a:rPr lang="en-US" dirty="0"/>
               <a:pPr/>
-              <a:t>6/10/2017</a:t>
+              <a:t>6/11/2017</a:t>
             </a:fld>
             <a:endParaRPr lang="en-US" dirty="0"/>
           </a:p>
@@ -6711,7 +6713,7 @@
             <a:fld id="{B61BEF0D-F0BB-DE4B-95CE-6DB70DBA9567}" type="datetimeFigureOut">
               <a:rPr lang="en-US" dirty="0"/>
               <a:pPr/>
-              <a:t>6/10/2017</a:t>
+              <a:t>6/11/2017</a:t>
             </a:fld>
             <a:endParaRPr lang="en-US" dirty="0"/>
           </a:p>
@@ -6803,7 +6805,7 @@
             <a:fld id="{B61BEF0D-F0BB-DE4B-95CE-6DB70DBA9567}" type="datetimeFigureOut">
               <a:rPr lang="en-US" dirty="0"/>
               <a:pPr/>
-              <a:t>6/10/2017</a:t>
+              <a:t>6/11/2017</a:t>
             </a:fld>
             <a:endParaRPr lang="en-US" dirty="0"/>
           </a:p>
@@ -7054,7 +7056,7 @@
           <a:p>
             <a:fld id="{42A54C80-263E-416B-A8E0-580EDEADCBDC}" type="datetimeFigureOut">
               <a:rPr lang="en-US" dirty="0"/>
-              <a:t>6/10/2017</a:t>
+              <a:t>6/11/2017</a:t>
             </a:fld>
             <a:endParaRPr lang="en-US" dirty="0"/>
           </a:p>
@@ -7313,7 +7315,7 @@
             <a:fld id="{B61BEF0D-F0BB-DE4B-95CE-6DB70DBA9567}" type="datetimeFigureOut">
               <a:rPr lang="en-US" dirty="0"/>
               <a:pPr/>
-              <a:t>6/10/2017</a:t>
+              <a:t>6/11/2017</a:t>
             </a:fld>
             <a:endParaRPr lang="en-US" dirty="0"/>
           </a:p>
@@ -8053,7 +8055,7 @@
             <a:fld id="{B61BEF0D-F0BB-DE4B-95CE-6DB70DBA9567}" type="datetimeFigureOut">
               <a:rPr lang="en-US" dirty="0"/>
               <a:pPr/>
-              <a:t>6/10/2017</a:t>
+              <a:t>6/11/2017</a:t>
             </a:fld>
             <a:endParaRPr lang="en-US" dirty="0"/>
           </a:p>
@@ -13375,15 +13377,7 @@
           <a:p>
             <a:r>
               <a:rPr lang="en-US" dirty="0" smtClean="0"/>
-              <a:t>Method </a:t>
-            </a:r>
-            <a:r>
-              <a:rPr lang="en-US" dirty="0" smtClean="0"/>
-              <a:t>Reference on </a:t>
-            </a:r>
-            <a:r>
-              <a:rPr lang="en-US" dirty="0" smtClean="0"/>
-              <a:t>an Instance</a:t>
+              <a:t>Method Reference on an Instance</a:t>
             </a:r>
             <a:endParaRPr lang="en-US" dirty="0"/>
           </a:p>
@@ -13913,11 +13907,7 @@
           <a:p>
             <a:r>
               <a:rPr lang="en-US" dirty="0" smtClean="0"/>
-              <a:t>Constructor </a:t>
-            </a:r>
-            <a:r>
-              <a:rPr lang="en-US" dirty="0" smtClean="0"/>
-              <a:t>Method Reference</a:t>
+              <a:t>Constructor Method Reference</a:t>
             </a:r>
             <a:endParaRPr lang="en-US" dirty="0"/>
           </a:p>
@@ -14407,11 +14397,7 @@
           <a:p>
             <a:r>
               <a:rPr lang="en-US" dirty="0" smtClean="0"/>
-              <a:t>Instance </a:t>
-            </a:r>
-            <a:r>
-              <a:rPr lang="en-US" dirty="0" smtClean="0"/>
-              <a:t>Method Reference</a:t>
+              <a:t>Instance Method Reference</a:t>
             </a:r>
             <a:endParaRPr lang="en-US" dirty="0"/>
           </a:p>
@@ -26233,12 +26219,12 @@
       </p:grpSpPr>
       <p:sp>
         <p:nvSpPr>
-          <p:cNvPr id="4" name="Title 3"/>
+          <p:cNvPr id="2" name="Title 1"/>
           <p:cNvSpPr>
             <a:spLocks noGrp="1"/>
           </p:cNvSpPr>
           <p:nvPr>
-            <p:ph type="ctrTitle"/>
+            <p:ph type="title"/>
           </p:nvPr>
         </p:nvSpPr>
         <p:spPr/>
@@ -26248,52 +26234,162 @@
           <a:p>
             <a:r>
               <a:rPr lang="en-US" dirty="0" smtClean="0"/>
-              <a:t>Unit Test Using Builder</a:t>
-            </a:r>
+              <a:t>Example Lambda: Fibonacci Sequence</a:t>
+            </a:r>
+            <a:r>
+              <a:rPr lang="en-US" dirty="0"/>
+              <a:t/>
+            </a:r>
+            <a:br>
+              <a:rPr lang="en-US" dirty="0"/>
+            </a:br>
             <a:endParaRPr lang="en-US" dirty="0"/>
           </a:p>
         </p:txBody>
       </p:sp>
       <p:sp>
         <p:nvSpPr>
-          <p:cNvPr id="5" name="Subtitle 4"/>
+          <p:cNvPr id="3" name="Content Placeholder 2"/>
           <p:cNvSpPr>
             <a:spLocks noGrp="1"/>
           </p:cNvSpPr>
           <p:nvPr>
-            <p:ph type="subTitle" idx="1"/>
+            <p:ph idx="1"/>
           </p:nvPr>
         </p:nvSpPr>
-        <p:spPr/>
+        <p:spPr>
+          <a:xfrm>
+            <a:off x="677334" y="1666875"/>
+            <a:ext cx="8596668" cy="4810125"/>
+          </a:xfrm>
+        </p:spPr>
         <p:txBody>
-          <a:bodyPr/>
+          <a:bodyPr>
+            <a:normAutofit/>
+          </a:bodyPr>
           <a:lstStyle/>
           <a:p>
             <a:r>
-              <a:rPr lang="en-US" dirty="0" smtClean="0"/>
-              <a:t>Passes through the builder or adds an intermediate operation for testing.</a:t>
-            </a:r>
-            <a:endParaRPr lang="en-US" dirty="0"/>
+              <a:rPr lang="en-US" sz="2400" dirty="0" smtClean="0"/>
+              <a:t>Fibonacci sequence is defined as a sequence of numbers where each number is the sum of the previous two.</a:t>
+            </a:r>
+          </a:p>
+          <a:p>
+            <a:r>
+              <a:rPr lang="en-US" sz="2400" dirty="0" smtClean="0"/>
+              <a:t>The recurrence relation is: F</a:t>
+            </a:r>
+            <a:r>
+              <a:rPr lang="en-US" sz="2400" baseline="-25000" dirty="0" smtClean="0"/>
+              <a:t>0</a:t>
+            </a:r>
+            <a:r>
+              <a:rPr lang="en-US" sz="2400" dirty="0" smtClean="0"/>
+              <a:t> = 0, F</a:t>
+            </a:r>
+            <a:r>
+              <a:rPr lang="en-US" sz="2400" baseline="-25000" dirty="0" smtClean="0"/>
+              <a:t>1</a:t>
+            </a:r>
+            <a:r>
+              <a:rPr lang="en-US" sz="2400" dirty="0" smtClean="0"/>
+              <a:t> = 1, </a:t>
+            </a:r>
+            <a:r>
+              <a:rPr lang="en-US" sz="2400" dirty="0" err="1" smtClean="0"/>
+              <a:t>F</a:t>
+            </a:r>
+            <a:r>
+              <a:rPr lang="en-US" sz="2400" i="1" baseline="-25000" dirty="0" err="1"/>
+              <a:t>n</a:t>
+            </a:r>
+            <a:r>
+              <a:rPr lang="en-US" sz="2400" dirty="0" smtClean="0"/>
+              <a:t> = F</a:t>
+            </a:r>
+            <a:r>
+              <a:rPr lang="en-US" sz="2400" i="1" baseline="-25000" dirty="0" smtClean="0"/>
+              <a:t>n-1</a:t>
+            </a:r>
+            <a:r>
+              <a:rPr lang="en-US" sz="2400" dirty="0" smtClean="0"/>
+              <a:t> + F</a:t>
+            </a:r>
+            <a:r>
+              <a:rPr lang="en-US" sz="2400" i="1" baseline="-25000" dirty="0" smtClean="0"/>
+              <a:t>n-2</a:t>
+            </a:r>
+          </a:p>
+          <a:p>
+            <a:r>
+              <a:rPr lang="en-US" sz="2400" dirty="0" smtClean="0"/>
+              <a:t>The sequence, starting a 0, looks like this:</a:t>
+            </a:r>
+          </a:p>
+          <a:p>
+            <a:r>
+              <a:rPr lang="en-US" sz="2400" dirty="0"/>
+              <a:t>0, 1, 1, 2, 3, 5, 8, 13, 21, 34, 55, 89, 144, </a:t>
+            </a:r>
+            <a:r>
+              <a:rPr lang="en-US" sz="2400" dirty="0" smtClean="0"/>
+              <a:t>…</a:t>
+            </a:r>
+          </a:p>
+          <a:p>
+            <a:r>
+              <a:rPr lang="en-US" sz="2400" dirty="0" smtClean="0"/>
+              <a:t>Example code will compute the </a:t>
+            </a:r>
+            <a:r>
+              <a:rPr lang="en-US" sz="2400" i="1" dirty="0" smtClean="0"/>
+              <a:t>n</a:t>
+            </a:r>
+            <a:r>
+              <a:rPr lang="en-US" sz="2400" baseline="-25000" dirty="0" smtClean="0"/>
+              <a:t>th</a:t>
+            </a:r>
+            <a:r>
+              <a:rPr lang="en-US" sz="2400" dirty="0" smtClean="0"/>
+              <a:t> Fibonacci number and return its value.</a:t>
+            </a:r>
+          </a:p>
+          <a:p>
+            <a:r>
+              <a:rPr lang="en-US" sz="2400" dirty="0" smtClean="0"/>
+              <a:t>Example unit test will verify each Fibonacci number as it is computed.</a:t>
+            </a:r>
+          </a:p>
+          <a:p>
+            <a:r>
+              <a:rPr lang="en-US" sz="2400" dirty="0">
+                <a:hlinkClick r:id="rId2"/>
+              </a:rPr>
+              <a:t>https://</a:t>
+            </a:r>
+            <a:r>
+              <a:rPr lang="en-US" sz="2400" dirty="0" smtClean="0">
+                <a:hlinkClick r:id="rId2"/>
+              </a:rPr>
+              <a:t>en.wikipedia.org/wiki/Fibonacci_number</a:t>
+            </a:r>
+            <a:r>
+              <a:rPr lang="en-US" sz="2400" dirty="0" smtClean="0"/>
+              <a:t> </a:t>
+            </a:r>
           </a:p>
         </p:txBody>
       </p:sp>
     </p:spTree>
     <p:extLst>
       <p:ext uri="{BB962C8B-B14F-4D97-AF65-F5344CB8AC3E}">
-        <p14:creationId xmlns:p14="http://schemas.microsoft.com/office/powerpoint/2010/main" val="3423788809"/>
+        <p14:creationId xmlns:p14="http://schemas.microsoft.com/office/powerpoint/2010/main" val="2747041798"/>
       </p:ext>
     </p:extLst>
   </p:cSld>
   <p:clrMapOvr>
     <a:masterClrMapping/>
   </p:clrMapOvr>
-  <p:timing>
-    <p:tnLst>
-      <p:par>
-        <p:cTn id="1" dur="indefinite" restart="never" nodeType="tmRoot"/>
-      </p:par>
-    </p:tnLst>
-  </p:timing>
 </p:sld>
 </file>
 
@@ -26331,7 +26427,7 @@
           <a:p>
             <a:r>
               <a:rPr lang="en-US" dirty="0" smtClean="0"/>
-              <a:t>Unit Test Using Decorator</a:t>
+              <a:t>Unit Test Using Builder</a:t>
             </a:r>
             <a:endParaRPr lang="en-US" dirty="0"/>
           </a:p>
@@ -26354,7 +26450,7 @@
           <a:p>
             <a:r>
               <a:rPr lang="en-US" dirty="0" smtClean="0"/>
-              <a:t>Decorate the lambdas used in the stream with testing functionality</a:t>
+              <a:t>Passes through the builder or adds an intermediate operation for testing.</a:t>
             </a:r>
             <a:endParaRPr lang="en-US" dirty="0"/>
           </a:p>
@@ -26363,7 +26459,7 @@
     </p:spTree>
     <p:extLst>
       <p:ext uri="{BB962C8B-B14F-4D97-AF65-F5344CB8AC3E}">
-        <p14:creationId xmlns:p14="http://schemas.microsoft.com/office/powerpoint/2010/main" val="941002256"/>
+        <p14:creationId xmlns:p14="http://schemas.microsoft.com/office/powerpoint/2010/main" val="3423788809"/>
       </p:ext>
     </p:extLst>
   </p:cSld>
@@ -27591,6 +27687,89 @@
       </p:grpSpPr>
       <p:sp>
         <p:nvSpPr>
+          <p:cNvPr id="4" name="Title 3"/>
+          <p:cNvSpPr>
+            <a:spLocks noGrp="1"/>
+          </p:cNvSpPr>
+          <p:nvPr>
+            <p:ph type="ctrTitle"/>
+          </p:nvPr>
+        </p:nvSpPr>
+        <p:spPr/>
+        <p:txBody>
+          <a:bodyPr/>
+          <a:lstStyle/>
+          <a:p>
+            <a:r>
+              <a:rPr lang="en-US" dirty="0" smtClean="0"/>
+              <a:t>Unit Test Using Decorator</a:t>
+            </a:r>
+            <a:endParaRPr lang="en-US" dirty="0"/>
+          </a:p>
+        </p:txBody>
+      </p:sp>
+      <p:sp>
+        <p:nvSpPr>
+          <p:cNvPr id="5" name="Subtitle 4"/>
+          <p:cNvSpPr>
+            <a:spLocks noGrp="1"/>
+          </p:cNvSpPr>
+          <p:nvPr>
+            <p:ph type="subTitle" idx="1"/>
+          </p:nvPr>
+        </p:nvSpPr>
+        <p:spPr/>
+        <p:txBody>
+          <a:bodyPr/>
+          <a:lstStyle/>
+          <a:p>
+            <a:r>
+              <a:rPr lang="en-US" dirty="0" smtClean="0"/>
+              <a:t>Decorate the lambdas used in the stream with testing functionality</a:t>
+            </a:r>
+            <a:endParaRPr lang="en-US" dirty="0"/>
+          </a:p>
+        </p:txBody>
+      </p:sp>
+    </p:spTree>
+    <p:extLst>
+      <p:ext uri="{BB962C8B-B14F-4D97-AF65-F5344CB8AC3E}">
+        <p14:creationId xmlns:p14="http://schemas.microsoft.com/office/powerpoint/2010/main" val="941002256"/>
+      </p:ext>
+    </p:extLst>
+  </p:cSld>
+  <p:clrMapOvr>
+    <a:masterClrMapping/>
+  </p:clrMapOvr>
+  <p:timing>
+    <p:tnLst>
+      <p:par>
+        <p:cTn id="1" dur="indefinite" restart="never" nodeType="tmRoot"/>
+      </p:par>
+    </p:tnLst>
+  </p:timing>
+</p:sld>
+</file>
+
+<file path=ppt/slides/slide41.xml><?xml version="1.0" encoding="utf-8"?>
+<p:sld xmlns:a="http://schemas.openxmlformats.org/drawingml/2006/main" xmlns:r="http://schemas.openxmlformats.org/officeDocument/2006/relationships" xmlns:p="http://schemas.openxmlformats.org/presentationml/2006/main">
+  <p:cSld>
+    <p:spTree>
+      <p:nvGrpSpPr>
+        <p:cNvPr id="1" name=""/>
+        <p:cNvGrpSpPr/>
+        <p:nvPr/>
+      </p:nvGrpSpPr>
+      <p:grpSpPr>
+        <a:xfrm>
+          <a:off x="0" y="0"/>
+          <a:ext cx="0" cy="0"/>
+          <a:chOff x="0" y="0"/>
+          <a:chExt cx="0" cy="0"/>
+        </a:xfrm>
+      </p:grpSpPr>
+      <p:sp>
+        <p:nvSpPr>
           <p:cNvPr id="2" name="Title 1"/>
           <p:cNvSpPr>
             <a:spLocks noGrp="1"/>
@@ -27605,7 +27784,7 @@
           <a:lstStyle/>
           <a:p>
             <a:r>
-              <a:rPr lang="en-US" smtClean="0"/>
+              <a:rPr lang="en-US" dirty="0" smtClean="0"/>
               <a:t>Questions</a:t>
             </a:r>
             <a:endParaRPr lang="en-US" dirty="0"/>
@@ -27625,11 +27804,13 @@
         <p:spPr>
           <a:xfrm>
             <a:off x="677334" y="1591235"/>
-            <a:ext cx="8596668" cy="4450127"/>
+            <a:ext cx="8596668" cy="4966728"/>
           </a:xfrm>
         </p:spPr>
         <p:txBody>
-          <a:bodyPr/>
+          <a:bodyPr>
+            <a:normAutofit/>
+          </a:bodyPr>
           <a:lstStyle/>
           <a:p>
             <a:r>
@@ -27717,11 +27898,45 @@
               <a:rPr lang="en-US" sz="2400" dirty="0" smtClean="0">
                 <a:hlinkClick r:id="rId6"/>
               </a:rPr>
-              <a:t>license terms</a:t>
+              <a:t>license </a:t>
+            </a:r>
+            <a:r>
+              <a:rPr lang="en-US" sz="2400" dirty="0" smtClean="0">
+                <a:hlinkClick r:id="rId6"/>
+              </a:rPr>
+              <a:t>terms</a:t>
             </a:r>
             <a:endParaRPr lang="en-US" sz="2400" dirty="0" smtClean="0"/>
           </a:p>
           <a:p>
+            <a:r>
+              <a:rPr lang="en-US" sz="2400" dirty="0" smtClean="0"/>
+              <a:t>Oracle’s </a:t>
+            </a:r>
+            <a:r>
+              <a:rPr lang="en-US" sz="2400" dirty="0"/>
+              <a:t>Lambda </a:t>
+            </a:r>
+            <a:r>
+              <a:rPr lang="en-US" sz="2400" dirty="0" smtClean="0"/>
+              <a:t>Quick Start Guide: </a:t>
+            </a:r>
+            <a:r>
+              <a:rPr lang="en-US" sz="2400" dirty="0">
+                <a:hlinkClick r:id="rId7"/>
+              </a:rPr>
+              <a:t>http://</a:t>
+            </a:r>
+            <a:r>
+              <a:rPr lang="en-US" sz="2400" dirty="0" smtClean="0">
+                <a:hlinkClick r:id="rId7"/>
+              </a:rPr>
+              <a:t>www.oracle.com/webfolder/technetwork/tutorials/obe/java/Lambda-QuickStart/index.html</a:t>
+            </a:r>
+            <a:r>
+              <a:rPr lang="en-US" sz="2400" dirty="0" smtClean="0"/>
+              <a:t> </a:t>
+            </a:r>
             <a:endParaRPr lang="en-US" dirty="0"/>
           </a:p>
         </p:txBody>

</xml_diff>

<commit_message>
Update slide deck to reflect my OCP Java certification instead of OCA.
</commit_message>
<xml_diff>
--- a/Learning to Love the Lambda in the Stream.pptx
+++ b/Learning to Love the Lambda in the Stream.pptx
@@ -310,7 +310,7 @@
           <a:p>
             <a:fld id="{00F927AF-B093-4AD4-B894-C7B744C95185}" type="datetimeFigureOut">
               <a:rPr lang="en-US" smtClean="0"/>
-              <a:t>6/11/2017</a:t>
+              <a:t>1/13/2018</a:t>
             </a:fld>
             <a:endParaRPr lang="en-US"/>
           </a:p>
@@ -3638,7 +3638,7 @@
             <a:fld id="{B61BEF0D-F0BB-DE4B-95CE-6DB70DBA9567}" type="datetimeFigureOut">
               <a:rPr lang="en-US" dirty="0"/>
               <a:pPr/>
-              <a:t>6/11/2017</a:t>
+              <a:t>1/13/2018</a:t>
             </a:fld>
             <a:endParaRPr lang="en-US" dirty="0"/>
           </a:p>
@@ -3886,7 +3886,7 @@
             <a:fld id="{B61BEF0D-F0BB-DE4B-95CE-6DB70DBA9567}" type="datetimeFigureOut">
               <a:rPr lang="en-US" dirty="0"/>
               <a:pPr/>
-              <a:t>6/11/2017</a:t>
+              <a:t>1/13/2018</a:t>
             </a:fld>
             <a:endParaRPr lang="en-US" dirty="0"/>
           </a:p>
@@ -4197,7 +4197,7 @@
             <a:fld id="{B61BEF0D-F0BB-DE4B-95CE-6DB70DBA9567}" type="datetimeFigureOut">
               <a:rPr lang="en-US" dirty="0"/>
               <a:pPr/>
-              <a:t>6/11/2017</a:t>
+              <a:t>1/13/2018</a:t>
             </a:fld>
             <a:endParaRPr lang="en-US" dirty="0"/>
           </a:p>
@@ -4535,7 +4535,7 @@
             <a:fld id="{B61BEF0D-F0BB-DE4B-95CE-6DB70DBA9567}" type="datetimeFigureOut">
               <a:rPr lang="en-US" dirty="0"/>
               <a:pPr/>
-              <a:t>6/11/2017</a:t>
+              <a:t>1/13/2018</a:t>
             </a:fld>
             <a:endParaRPr lang="en-US" dirty="0"/>
           </a:p>
@@ -4846,7 +4846,7 @@
             <a:fld id="{B61BEF0D-F0BB-DE4B-95CE-6DB70DBA9567}" type="datetimeFigureOut">
               <a:rPr lang="en-US" dirty="0"/>
               <a:pPr/>
-              <a:t>6/11/2017</a:t>
+              <a:t>1/13/2018</a:t>
             </a:fld>
             <a:endParaRPr lang="en-US" dirty="0"/>
           </a:p>
@@ -5236,7 +5236,7 @@
             <a:fld id="{B61BEF0D-F0BB-DE4B-95CE-6DB70DBA9567}" type="datetimeFigureOut">
               <a:rPr lang="en-US" dirty="0"/>
               <a:pPr/>
-              <a:t>6/11/2017</a:t>
+              <a:t>1/13/2018</a:t>
             </a:fld>
             <a:endParaRPr lang="en-US" dirty="0"/>
           </a:p>
@@ -5402,7 +5402,7 @@
           <a:p>
             <a:fld id="{55C6B4A9-1611-4792-9094-5F34BCA07E0B}" type="datetimeFigureOut">
               <a:rPr lang="en-US" dirty="0"/>
-              <a:t>6/11/2017</a:t>
+              <a:t>1/13/2018</a:t>
             </a:fld>
             <a:endParaRPr lang="en-US" dirty="0"/>
           </a:p>
@@ -5578,7 +5578,7 @@
             <a:fld id="{B61BEF0D-F0BB-DE4B-95CE-6DB70DBA9567}" type="datetimeFigureOut">
               <a:rPr lang="en-US" dirty="0"/>
               <a:pPr/>
-              <a:t>6/11/2017</a:t>
+              <a:t>1/13/2018</a:t>
             </a:fld>
             <a:endParaRPr lang="en-US" dirty="0"/>
           </a:p>
@@ -5751,7 +5751,7 @@
             <a:fld id="{B61BEF0D-F0BB-DE4B-95CE-6DB70DBA9567}" type="datetimeFigureOut">
               <a:rPr lang="en-US" dirty="0"/>
               <a:pPr/>
-              <a:t>6/11/2017</a:t>
+              <a:t>1/13/2018</a:t>
             </a:fld>
             <a:endParaRPr lang="en-US" dirty="0"/>
           </a:p>
@@ -5995,7 +5995,7 @@
             <a:fld id="{B61BEF0D-F0BB-DE4B-95CE-6DB70DBA9567}" type="datetimeFigureOut">
               <a:rPr lang="en-US" dirty="0"/>
               <a:pPr/>
-              <a:t>6/11/2017</a:t>
+              <a:t>1/13/2018</a:t>
             </a:fld>
             <a:endParaRPr lang="en-US" dirty="0"/>
           </a:p>
@@ -6223,7 +6223,7 @@
           <a:p>
             <a:fld id="{EB712588-04B1-427B-82EE-E8DB90309F08}" type="datetimeFigureOut">
               <a:rPr lang="en-US" dirty="0"/>
-              <a:t>6/11/2017</a:t>
+              <a:t>1/13/2018</a:t>
             </a:fld>
             <a:endParaRPr lang="en-US" dirty="0"/>
           </a:p>
@@ -6593,7 +6593,7 @@
             <a:fld id="{B61BEF0D-F0BB-DE4B-95CE-6DB70DBA9567}" type="datetimeFigureOut">
               <a:rPr lang="en-US" dirty="0"/>
               <a:pPr/>
-              <a:t>6/11/2017</a:t>
+              <a:t>1/13/2018</a:t>
             </a:fld>
             <a:endParaRPr lang="en-US" dirty="0"/>
           </a:p>
@@ -6713,7 +6713,7 @@
             <a:fld id="{B61BEF0D-F0BB-DE4B-95CE-6DB70DBA9567}" type="datetimeFigureOut">
               <a:rPr lang="en-US" dirty="0"/>
               <a:pPr/>
-              <a:t>6/11/2017</a:t>
+              <a:t>1/13/2018</a:t>
             </a:fld>
             <a:endParaRPr lang="en-US" dirty="0"/>
           </a:p>
@@ -6805,7 +6805,7 @@
             <a:fld id="{B61BEF0D-F0BB-DE4B-95CE-6DB70DBA9567}" type="datetimeFigureOut">
               <a:rPr lang="en-US" dirty="0"/>
               <a:pPr/>
-              <a:t>6/11/2017</a:t>
+              <a:t>1/13/2018</a:t>
             </a:fld>
             <a:endParaRPr lang="en-US" dirty="0"/>
           </a:p>
@@ -7056,7 +7056,7 @@
           <a:p>
             <a:fld id="{42A54C80-263E-416B-A8E0-580EDEADCBDC}" type="datetimeFigureOut">
               <a:rPr lang="en-US" dirty="0"/>
-              <a:t>6/11/2017</a:t>
+              <a:t>1/13/2018</a:t>
             </a:fld>
             <a:endParaRPr lang="en-US" dirty="0"/>
           </a:p>
@@ -7315,7 +7315,7 @@
             <a:fld id="{B61BEF0D-F0BB-DE4B-95CE-6DB70DBA9567}" type="datetimeFigureOut">
               <a:rPr lang="en-US" dirty="0"/>
               <a:pPr/>
-              <a:t>6/11/2017</a:t>
+              <a:t>1/13/2018</a:t>
             </a:fld>
             <a:endParaRPr lang="en-US" dirty="0"/>
           </a:p>
@@ -8055,7 +8055,7 @@
             <a:fld id="{B61BEF0D-F0BB-DE4B-95CE-6DB70DBA9567}" type="datetimeFigureOut">
               <a:rPr lang="en-US" dirty="0"/>
               <a:pPr/>
-              <a:t>6/11/2017</a:t>
+              <a:t>1/13/2018</a:t>
             </a:fld>
             <a:endParaRPr lang="en-US" dirty="0"/>
           </a:p>
@@ -9131,7 +9131,7 @@
           <a:p>
             <a:r>
               <a:rPr lang="en-US" sz="2400" dirty="0" smtClean="0"/>
-              <a:t>Useful for implementing a Visitor </a:t>
+              <a:t>Similar to the Visitor </a:t>
             </a:r>
             <a:r>
               <a:rPr lang="en-US" sz="2400" dirty="0"/>
@@ -9467,7 +9467,15 @@
           <a:p>
             <a:r>
               <a:rPr lang="en-US" sz="2400" dirty="0" smtClean="0"/>
-              <a:t>Commonly used to provide an origin value to an algorithm.</a:t>
+              <a:t>Commonly used to provide an </a:t>
+            </a:r>
+            <a:r>
+              <a:rPr lang="en-US" sz="2400" dirty="0" smtClean="0"/>
+              <a:t>initial </a:t>
+            </a:r>
+            <a:r>
+              <a:rPr lang="en-US" sz="2400" dirty="0" smtClean="0"/>
+              <a:t>value to an algorithm.</a:t>
             </a:r>
           </a:p>
           <a:p>
@@ -10883,7 +10891,11 @@
           <a:p>
             <a:r>
               <a:rPr lang="en-US" dirty="0" smtClean="0"/>
-              <a:t>Optional&lt;T&gt;</a:t>
+              <a:t>Optional&lt;T</a:t>
+            </a:r>
+            <a:r>
+              <a:rPr lang="en-US" dirty="0" smtClean="0"/>
+              <a:t>&gt; Class</a:t>
             </a:r>
             <a:endParaRPr lang="en-US" dirty="0"/>
           </a:p>
@@ -10907,13 +10919,21 @@
         </p:spPr>
         <p:txBody>
           <a:bodyPr>
-            <a:normAutofit lnSpcReduction="10000"/>
+            <a:normAutofit/>
           </a:bodyPr>
           <a:lstStyle/>
           <a:p>
             <a:r>
+              <a:rPr lang="en-US" sz="2400" dirty="0"/>
+              <a:t>C</a:t>
+            </a:r>
+            <a:r>
               <a:rPr lang="en-US" sz="2400" dirty="0" smtClean="0"/>
-              <a:t>Not an interface, but a container class returned by various stream methods.</a:t>
+              <a:t>ontainer </a:t>
+            </a:r>
+            <a:r>
+              <a:rPr lang="en-US" sz="2400" dirty="0" smtClean="0"/>
+              <a:t>class returned by various stream methods.</a:t>
             </a:r>
           </a:p>
           <a:p>
@@ -10954,7 +10974,49 @@
                   </a:prstClr>
                 </a:solidFill>
               </a:rPr>
-              <a:t> determines if a value exists, </a:t>
+              <a:t> </a:t>
+            </a:r>
+            <a:r>
+              <a:rPr lang="en-US" sz="2400" dirty="0" smtClean="0">
+                <a:solidFill>
+                  <a:prstClr val="black">
+                    <a:lumMod val="75000"/>
+                    <a:lumOff val="25000"/>
+                  </a:prstClr>
+                </a:solidFill>
+              </a:rPr>
+              <a:t>returns </a:t>
+            </a:r>
+            <a:r>
+              <a:rPr lang="en-US" sz="2400" b="1" dirty="0" smtClean="0">
+                <a:solidFill>
+                  <a:srgbClr val="0000FF"/>
+                </a:solidFill>
+                <a:latin typeface="Courier New" panose="02070309020205020404" pitchFamily="49" charset="0"/>
+              </a:rPr>
+              <a:t>true</a:t>
+            </a:r>
+            <a:r>
+              <a:rPr lang="en-US" sz="2400" dirty="0" smtClean="0">
+                <a:solidFill>
+                  <a:prstClr val="black">
+                    <a:lumMod val="75000"/>
+                    <a:lumOff val="25000"/>
+                  </a:prstClr>
+                </a:solidFill>
+              </a:rPr>
+              <a:t> when a </a:t>
+            </a:r>
+            <a:r>
+              <a:rPr lang="en-US" sz="2400" dirty="0" smtClean="0">
+                <a:solidFill>
+                  <a:prstClr val="black">
+                    <a:lumMod val="75000"/>
+                    <a:lumOff val="25000"/>
+                  </a:prstClr>
+                </a:solidFill>
+              </a:rPr>
+              <a:t>value exists, </a:t>
             </a:r>
             <a:r>
               <a:rPr lang="en-US" sz="2400" dirty="0" err="1" smtClean="0">
@@ -13236,7 +13298,11 @@
           <a:p>
             <a:r>
               <a:rPr lang="en-US" sz="2600" dirty="0" smtClean="0"/>
-              <a:t>OCA Java and Security+ certifications</a:t>
+              <a:t>OCP </a:t>
+            </a:r>
+            <a:r>
+              <a:rPr lang="en-US" sz="2600" dirty="0" smtClean="0"/>
+              <a:t>Java and Security+ certifications</a:t>
             </a:r>
           </a:p>
           <a:p>
@@ -26323,7 +26389,15 @@
           <a:p>
             <a:r>
               <a:rPr lang="en-US" sz="2400" dirty="0" smtClean="0"/>
-              <a:t>The sequence, starting a 0, looks like this:</a:t>
+              <a:t>The sequence, starting </a:t>
+            </a:r>
+            <a:r>
+              <a:rPr lang="en-US" sz="2400" dirty="0" smtClean="0"/>
+              <a:t>at </a:t>
+            </a:r>
+            <a:r>
+              <a:rPr lang="en-US" sz="2400" dirty="0" smtClean="0"/>
+              <a:t>0, looks like this:</a:t>
             </a:r>
           </a:p>
           <a:p>
@@ -27898,13 +27972,7 @@
               <a:rPr lang="en-US" sz="2400" dirty="0" smtClean="0">
                 <a:hlinkClick r:id="rId6"/>
               </a:rPr>
-              <a:t>license </a:t>
-            </a:r>
-            <a:r>
-              <a:rPr lang="en-US" sz="2400" dirty="0" smtClean="0">
-                <a:hlinkClick r:id="rId6"/>
-              </a:rPr>
-              <a:t>terms</a:t>
+              <a:t>license terms</a:t>
             </a:r>
             <a:endParaRPr lang="en-US" sz="2400" dirty="0" smtClean="0"/>
           </a:p>

</xml_diff>

<commit_message>
Add slide that contrasts how imperative focuses on how things are done versus functional streams which focus on what things are done.
</commit_message>
<xml_diff>
--- a/Learning to Love the Lambda in the Stream.pptx
+++ b/Learning to Love the Lambda in the Stream.pptx
@@ -5,7 +5,7 @@
     <p:sldMasterId id="2147483648" r:id="rId1"/>
   </p:sldMasterIdLst>
   <p:notesMasterIdLst>
-    <p:notesMasterId r:id="rId43"/>
+    <p:notesMasterId r:id="rId44"/>
   </p:notesMasterIdLst>
   <p:sldIdLst>
     <p:sldId id="256" r:id="rId2"/>
@@ -44,11 +44,12 @@
     <p:sldId id="279" r:id="rId35"/>
     <p:sldId id="280" r:id="rId36"/>
     <p:sldId id="281" r:id="rId37"/>
-    <p:sldId id="282" r:id="rId38"/>
-    <p:sldId id="296" r:id="rId39"/>
-    <p:sldId id="283" r:id="rId40"/>
-    <p:sldId id="284" r:id="rId41"/>
-    <p:sldId id="291" r:id="rId42"/>
+    <p:sldId id="297" r:id="rId38"/>
+    <p:sldId id="282" r:id="rId39"/>
+    <p:sldId id="296" r:id="rId40"/>
+    <p:sldId id="283" r:id="rId41"/>
+    <p:sldId id="284" r:id="rId42"/>
+    <p:sldId id="291" r:id="rId43"/>
   </p:sldIdLst>
   <p:sldSz cx="12192000" cy="6858000"/>
   <p:notesSz cx="6858000" cy="9144000"/>
@@ -204,6 +205,7 @@
             <p14:sldId id="279"/>
             <p14:sldId id="280"/>
             <p14:sldId id="281"/>
+            <p14:sldId id="297"/>
           </p14:sldIdLst>
         </p14:section>
         <p14:section name="Unit Testing a Stream" id="{30359A68-2953-4021-9A41-FAA25B40E841}">
@@ -9467,15 +9469,7 @@
           <a:p>
             <a:r>
               <a:rPr lang="en-US" sz="2400" dirty="0" smtClean="0"/>
-              <a:t>Commonly used to provide an </a:t>
-            </a:r>
-            <a:r>
-              <a:rPr lang="en-US" sz="2400" dirty="0" smtClean="0"/>
-              <a:t>initial </a:t>
-            </a:r>
-            <a:r>
-              <a:rPr lang="en-US" sz="2400" dirty="0" smtClean="0"/>
-              <a:t>value to an algorithm.</a:t>
+              <a:t>Commonly used to provide an initial value to an algorithm.</a:t>
             </a:r>
           </a:p>
           <a:p>
@@ -10891,11 +10885,7 @@
           <a:p>
             <a:r>
               <a:rPr lang="en-US" dirty="0" smtClean="0"/>
-              <a:t>Optional&lt;T</a:t>
-            </a:r>
-            <a:r>
-              <a:rPr lang="en-US" dirty="0" smtClean="0"/>
-              <a:t>&gt; Class</a:t>
+              <a:t>Optional&lt;T&gt; Class</a:t>
             </a:r>
             <a:endParaRPr lang="en-US" dirty="0"/>
           </a:p>
@@ -10929,11 +10919,7 @@
             </a:r>
             <a:r>
               <a:rPr lang="en-US" sz="2400" dirty="0" smtClean="0"/>
-              <a:t>ontainer </a:t>
-            </a:r>
-            <a:r>
-              <a:rPr lang="en-US" sz="2400" dirty="0" smtClean="0"/>
-              <a:t>class returned by various stream methods.</a:t>
+              <a:t>ontainer class returned by various stream methods.</a:t>
             </a:r>
           </a:p>
           <a:p>
@@ -10974,7 +10960,16 @@
                   </a:prstClr>
                 </a:solidFill>
               </a:rPr>
-              <a:t> </a:t>
+              <a:t> returns </a:t>
+            </a:r>
+            <a:r>
+              <a:rPr lang="en-US" sz="2400" b="1" dirty="0" smtClean="0">
+                <a:solidFill>
+                  <a:srgbClr val="0000FF"/>
+                </a:solidFill>
+                <a:latin typeface="Courier New" panose="02070309020205020404" pitchFamily="49" charset="0"/>
+              </a:rPr>
+              <a:t>true</a:t>
             </a:r>
             <a:r>
               <a:rPr lang="en-US" sz="2400" dirty="0" smtClean="0">
@@ -10985,38 +10980,7 @@
                   </a:prstClr>
                 </a:solidFill>
               </a:rPr>
-              <a:t>returns </a:t>
-            </a:r>
-            <a:r>
-              <a:rPr lang="en-US" sz="2400" b="1" dirty="0" smtClean="0">
-                <a:solidFill>
-                  <a:srgbClr val="0000FF"/>
-                </a:solidFill>
-                <a:latin typeface="Courier New" panose="02070309020205020404" pitchFamily="49" charset="0"/>
-              </a:rPr>
-              <a:t>true</a:t>
-            </a:r>
-            <a:r>
-              <a:rPr lang="en-US" sz="2400" dirty="0" smtClean="0">
-                <a:solidFill>
-                  <a:prstClr val="black">
-                    <a:lumMod val="75000"/>
-                    <a:lumOff val="25000"/>
-                  </a:prstClr>
-                </a:solidFill>
-              </a:rPr>
-              <a:t> when a </a:t>
-            </a:r>
-            <a:r>
-              <a:rPr lang="en-US" sz="2400" dirty="0" smtClean="0">
-                <a:solidFill>
-                  <a:prstClr val="black">
-                    <a:lumMod val="75000"/>
-                    <a:lumOff val="25000"/>
-                  </a:prstClr>
-                </a:solidFill>
-              </a:rPr>
-              <a:t>value exists, </a:t>
+              <a:t> when a value exists, </a:t>
             </a:r>
             <a:r>
               <a:rPr lang="en-US" sz="2400" dirty="0" err="1" smtClean="0">
@@ -13298,11 +13262,7 @@
           <a:p>
             <a:r>
               <a:rPr lang="en-US" sz="2600" dirty="0" smtClean="0"/>
-              <a:t>OCP </a:t>
-            </a:r>
-            <a:r>
-              <a:rPr lang="en-US" sz="2600" dirty="0" smtClean="0"/>
-              <a:t>Java and Security+ certifications</a:t>
+              <a:t>OCP Java and Security+ certifications</a:t>
             </a:r>
           </a:p>
           <a:p>
@@ -26194,6 +26154,132 @@
       </p:grpSpPr>
       <p:sp>
         <p:nvSpPr>
+          <p:cNvPr id="2" name="Title 1"/>
+          <p:cNvSpPr>
+            <a:spLocks noGrp="1"/>
+          </p:cNvSpPr>
+          <p:nvPr>
+            <p:ph type="title"/>
+          </p:nvPr>
+        </p:nvSpPr>
+        <p:spPr/>
+        <p:txBody>
+          <a:bodyPr/>
+          <a:lstStyle/>
+          <a:p>
+            <a:r>
+              <a:rPr lang="en-US" dirty="0" smtClean="0"/>
+              <a:t>Streams vs Imperative Programming</a:t>
+            </a:r>
+            <a:endParaRPr lang="en-US" dirty="0"/>
+          </a:p>
+        </p:txBody>
+      </p:sp>
+      <p:sp>
+        <p:nvSpPr>
+          <p:cNvPr id="3" name="Content Placeholder 2"/>
+          <p:cNvSpPr>
+            <a:spLocks noGrp="1"/>
+          </p:cNvSpPr>
+          <p:nvPr>
+            <p:ph idx="1"/>
+          </p:nvPr>
+        </p:nvSpPr>
+        <p:spPr>
+          <a:xfrm>
+            <a:off x="677334" y="1624013"/>
+            <a:ext cx="8596668" cy="4417349"/>
+          </a:xfrm>
+        </p:spPr>
+        <p:txBody>
+          <a:bodyPr>
+            <a:normAutofit/>
+          </a:bodyPr>
+          <a:lstStyle/>
+          <a:p>
+            <a:r>
+              <a:rPr lang="en-US" sz="2400" dirty="0" smtClean="0"/>
+              <a:t>Imperative Programming focuses on </a:t>
+            </a:r>
+            <a:r>
+              <a:rPr lang="en-US" sz="2400" i="1" dirty="0" smtClean="0"/>
+              <a:t>how</a:t>
+            </a:r>
+            <a:r>
+              <a:rPr lang="en-US" sz="2400" dirty="0" smtClean="0"/>
+              <a:t> a tasks are done.</a:t>
+            </a:r>
+          </a:p>
+          <a:p>
+            <a:r>
+              <a:rPr lang="en-US" sz="2400" dirty="0" smtClean="0"/>
+              <a:t>Each step, including loop structures and task management must be explicit.</a:t>
+            </a:r>
+          </a:p>
+          <a:p>
+            <a:endParaRPr lang="en-US" sz="2400" dirty="0"/>
+          </a:p>
+          <a:p>
+            <a:r>
+              <a:rPr lang="en-US" sz="2400" dirty="0" smtClean="0"/>
+              <a:t>Stream Programming focuses on </a:t>
+            </a:r>
+            <a:r>
+              <a:rPr lang="en-US" sz="2400" i="1" dirty="0" smtClean="0"/>
+              <a:t>what</a:t>
+            </a:r>
+            <a:r>
+              <a:rPr lang="en-US" sz="2400" dirty="0" smtClean="0"/>
+              <a:t> tasks are done.</a:t>
+            </a:r>
+          </a:p>
+          <a:p>
+            <a:r>
+              <a:rPr lang="en-US" sz="2400" dirty="0" smtClean="0"/>
+              <a:t>The coordination of data between the tasks is handled by the stream itself.</a:t>
+            </a:r>
+          </a:p>
+          <a:p>
+            <a:r>
+              <a:rPr lang="en-US" sz="2400" dirty="0" smtClean="0"/>
+              <a:t>Optimizations, such as parallelism, can be introduced to idempotent operations without requiring extensive rewriting of a stream process.</a:t>
+            </a:r>
+            <a:endParaRPr lang="en-US" sz="2400" dirty="0"/>
+          </a:p>
+        </p:txBody>
+      </p:sp>
+    </p:spTree>
+    <p:extLst>
+      <p:ext uri="{BB962C8B-B14F-4D97-AF65-F5344CB8AC3E}">
+        <p14:creationId xmlns:p14="http://schemas.microsoft.com/office/powerpoint/2010/main" val="2926649143"/>
+      </p:ext>
+    </p:extLst>
+  </p:cSld>
+  <p:clrMapOvr>
+    <a:masterClrMapping/>
+  </p:clrMapOvr>
+</p:sld>
+</file>
+
+<file path=ppt/slides/slide38.xml><?xml version="1.0" encoding="utf-8"?>
+<p:sld xmlns:a="http://schemas.openxmlformats.org/drawingml/2006/main" xmlns:r="http://schemas.openxmlformats.org/officeDocument/2006/relationships" xmlns:p="http://schemas.openxmlformats.org/presentationml/2006/main">
+  <p:cSld>
+    <p:spTree>
+      <p:nvGrpSpPr>
+        <p:cNvPr id="1" name=""/>
+        <p:cNvGrpSpPr/>
+        <p:nvPr/>
+      </p:nvGrpSpPr>
+      <p:grpSpPr>
+        <a:xfrm>
+          <a:off x="0" y="0"/>
+          <a:ext cx="0" cy="0"/>
+          <a:chOff x="0" y="0"/>
+          <a:chExt cx="0" cy="0"/>
+        </a:xfrm>
+      </p:grpSpPr>
+      <p:sp>
+        <p:nvSpPr>
           <p:cNvPr id="4" name="Title 3"/>
           <p:cNvSpPr>
             <a:spLocks noGrp="1"/>
@@ -26266,7 +26352,7 @@
 </p:sld>
 </file>
 
-<file path=ppt/slides/slide38.xml><?xml version="1.0" encoding="utf-8"?>
+<file path=ppt/slides/slide39.xml><?xml version="1.0" encoding="utf-8"?>
 <p:sld xmlns:a="http://schemas.openxmlformats.org/drawingml/2006/main" xmlns:r="http://schemas.openxmlformats.org/officeDocument/2006/relationships" xmlns:p="http://schemas.openxmlformats.org/presentationml/2006/main">
   <p:cSld>
     <p:spTree>
@@ -26389,15 +26475,7 @@
           <a:p>
             <a:r>
               <a:rPr lang="en-US" sz="2400" dirty="0" smtClean="0"/>
-              <a:t>The sequence, starting </a:t>
-            </a:r>
-            <a:r>
-              <a:rPr lang="en-US" sz="2400" dirty="0" smtClean="0"/>
-              <a:t>at </a:t>
-            </a:r>
-            <a:r>
-              <a:rPr lang="en-US" sz="2400" dirty="0" smtClean="0"/>
-              <a:t>0, looks like this:</a:t>
+              <a:t>The sequence, starting at 0, looks like this:</a:t>
             </a:r>
           </a:p>
           <a:p>
@@ -26464,89 +26542,6 @@
   <p:clrMapOvr>
     <a:masterClrMapping/>
   </p:clrMapOvr>
-</p:sld>
-</file>
-
-<file path=ppt/slides/slide39.xml><?xml version="1.0" encoding="utf-8"?>
-<p:sld xmlns:a="http://schemas.openxmlformats.org/drawingml/2006/main" xmlns:r="http://schemas.openxmlformats.org/officeDocument/2006/relationships" xmlns:p="http://schemas.openxmlformats.org/presentationml/2006/main">
-  <p:cSld>
-    <p:spTree>
-      <p:nvGrpSpPr>
-        <p:cNvPr id="1" name=""/>
-        <p:cNvGrpSpPr/>
-        <p:nvPr/>
-      </p:nvGrpSpPr>
-      <p:grpSpPr>
-        <a:xfrm>
-          <a:off x="0" y="0"/>
-          <a:ext cx="0" cy="0"/>
-          <a:chOff x="0" y="0"/>
-          <a:chExt cx="0" cy="0"/>
-        </a:xfrm>
-      </p:grpSpPr>
-      <p:sp>
-        <p:nvSpPr>
-          <p:cNvPr id="4" name="Title 3"/>
-          <p:cNvSpPr>
-            <a:spLocks noGrp="1"/>
-          </p:cNvSpPr>
-          <p:nvPr>
-            <p:ph type="ctrTitle"/>
-          </p:nvPr>
-        </p:nvSpPr>
-        <p:spPr/>
-        <p:txBody>
-          <a:bodyPr/>
-          <a:lstStyle/>
-          <a:p>
-            <a:r>
-              <a:rPr lang="en-US" dirty="0" smtClean="0"/>
-              <a:t>Unit Test Using Builder</a:t>
-            </a:r>
-            <a:endParaRPr lang="en-US" dirty="0"/>
-          </a:p>
-        </p:txBody>
-      </p:sp>
-      <p:sp>
-        <p:nvSpPr>
-          <p:cNvPr id="5" name="Subtitle 4"/>
-          <p:cNvSpPr>
-            <a:spLocks noGrp="1"/>
-          </p:cNvSpPr>
-          <p:nvPr>
-            <p:ph type="subTitle" idx="1"/>
-          </p:nvPr>
-        </p:nvSpPr>
-        <p:spPr/>
-        <p:txBody>
-          <a:bodyPr/>
-          <a:lstStyle/>
-          <a:p>
-            <a:r>
-              <a:rPr lang="en-US" dirty="0" smtClean="0"/>
-              <a:t>Passes through the builder or adds an intermediate operation for testing.</a:t>
-            </a:r>
-            <a:endParaRPr lang="en-US" dirty="0"/>
-          </a:p>
-        </p:txBody>
-      </p:sp>
-    </p:spTree>
-    <p:extLst>
-      <p:ext uri="{BB962C8B-B14F-4D97-AF65-F5344CB8AC3E}">
-        <p14:creationId xmlns:p14="http://schemas.microsoft.com/office/powerpoint/2010/main" val="3423788809"/>
-      </p:ext>
-    </p:extLst>
-  </p:cSld>
-  <p:clrMapOvr>
-    <a:masterClrMapping/>
-  </p:clrMapOvr>
-  <p:timing>
-    <p:tnLst>
-      <p:par>
-        <p:cTn id="1" dur="indefinite" restart="never" nodeType="tmRoot"/>
-      </p:par>
-    </p:tnLst>
-  </p:timing>
 </p:sld>
 </file>
 
@@ -27776,6 +27771,89 @@
           <a:p>
             <a:r>
               <a:rPr lang="en-US" dirty="0" smtClean="0"/>
+              <a:t>Unit Test Using Builder</a:t>
+            </a:r>
+            <a:endParaRPr lang="en-US" dirty="0"/>
+          </a:p>
+        </p:txBody>
+      </p:sp>
+      <p:sp>
+        <p:nvSpPr>
+          <p:cNvPr id="5" name="Subtitle 4"/>
+          <p:cNvSpPr>
+            <a:spLocks noGrp="1"/>
+          </p:cNvSpPr>
+          <p:nvPr>
+            <p:ph type="subTitle" idx="1"/>
+          </p:nvPr>
+        </p:nvSpPr>
+        <p:spPr/>
+        <p:txBody>
+          <a:bodyPr/>
+          <a:lstStyle/>
+          <a:p>
+            <a:r>
+              <a:rPr lang="en-US" dirty="0" smtClean="0"/>
+              <a:t>Passes through the builder or adds an intermediate operation for testing.</a:t>
+            </a:r>
+            <a:endParaRPr lang="en-US" dirty="0"/>
+          </a:p>
+        </p:txBody>
+      </p:sp>
+    </p:spTree>
+    <p:extLst>
+      <p:ext uri="{BB962C8B-B14F-4D97-AF65-F5344CB8AC3E}">
+        <p14:creationId xmlns:p14="http://schemas.microsoft.com/office/powerpoint/2010/main" val="3423788809"/>
+      </p:ext>
+    </p:extLst>
+  </p:cSld>
+  <p:clrMapOvr>
+    <a:masterClrMapping/>
+  </p:clrMapOvr>
+  <p:timing>
+    <p:tnLst>
+      <p:par>
+        <p:cTn id="1" dur="indefinite" restart="never" nodeType="tmRoot"/>
+      </p:par>
+    </p:tnLst>
+  </p:timing>
+</p:sld>
+</file>
+
+<file path=ppt/slides/slide41.xml><?xml version="1.0" encoding="utf-8"?>
+<p:sld xmlns:a="http://schemas.openxmlformats.org/drawingml/2006/main" xmlns:r="http://schemas.openxmlformats.org/officeDocument/2006/relationships" xmlns:p="http://schemas.openxmlformats.org/presentationml/2006/main">
+  <p:cSld>
+    <p:spTree>
+      <p:nvGrpSpPr>
+        <p:cNvPr id="1" name=""/>
+        <p:cNvGrpSpPr/>
+        <p:nvPr/>
+      </p:nvGrpSpPr>
+      <p:grpSpPr>
+        <a:xfrm>
+          <a:off x="0" y="0"/>
+          <a:ext cx="0" cy="0"/>
+          <a:chOff x="0" y="0"/>
+          <a:chExt cx="0" cy="0"/>
+        </a:xfrm>
+      </p:grpSpPr>
+      <p:sp>
+        <p:nvSpPr>
+          <p:cNvPr id="4" name="Title 3"/>
+          <p:cNvSpPr>
+            <a:spLocks noGrp="1"/>
+          </p:cNvSpPr>
+          <p:nvPr>
+            <p:ph type="ctrTitle"/>
+          </p:nvPr>
+        </p:nvSpPr>
+        <p:spPr/>
+        <p:txBody>
+          <a:bodyPr/>
+          <a:lstStyle/>
+          <a:p>
+            <a:r>
+              <a:rPr lang="en-US" dirty="0" smtClean="0"/>
               <a:t>Unit Test Using Decorator</a:t>
             </a:r>
             <a:endParaRPr lang="en-US" dirty="0"/>
@@ -27825,7 +27903,7 @@
 </p:sld>
 </file>
 
-<file path=ppt/slides/slide41.xml><?xml version="1.0" encoding="utf-8"?>
+<file path=ppt/slides/slide42.xml><?xml version="1.0" encoding="utf-8"?>
 <p:sld xmlns:a="http://schemas.openxmlformats.org/drawingml/2006/main" xmlns:r="http://schemas.openxmlformats.org/officeDocument/2006/relationships" xmlns:p="http://schemas.openxmlformats.org/presentationml/2006/main">
   <p:cSld>
     <p:spTree>

</xml_diff>

<commit_message>
Update bio.  Mark some slides that should be broken up.
</commit_message>
<xml_diff>
--- a/Learning to Love the Lambda in the Stream.pptx
+++ b/Learning to Love the Lambda in the Stream.pptx
@@ -173,6 +173,10 @@
           <p14:sldIdLst>
             <p14:sldId id="258"/>
             <p14:sldId id="259"/>
+          </p14:sldIdLst>
+        </p14:section>
+        <p14:section name="Key FIs Used by Streams" id="{CB98665B-507C-4C43-9AE7-1B23B294E826}">
+          <p14:sldIdLst>
             <p14:sldId id="263"/>
             <p14:sldId id="260"/>
             <p14:sldId id="264"/>
@@ -240,6 +244,32 @@
 </p:presentation>
 </file>
 
+<file path=ppt/commentAuthors.xml><?xml version="1.0" encoding="utf-8"?>
+<p:cmAuthorLst xmlns:a="http://schemas.openxmlformats.org/drawingml/2006/main" xmlns:r="http://schemas.openxmlformats.org/officeDocument/2006/relationships" xmlns:p="http://schemas.openxmlformats.org/presentationml/2006/main">
+  <p:cmAuthor id="1" name="Richard" initials="RR" lastIdx="1" clrIdx="0">
+    <p:extLst>
+      <p:ext uri="{19B8F6BF-5375-455C-9EA6-DF929625EA0E}">
+        <p15:presenceInfo xmlns:p15="http://schemas.microsoft.com/office/powerpoint/2012/main" userId="Richard" providerId="None"/>
+      </p:ext>
+    </p:extLst>
+  </p:cmAuthor>
+</p:cmAuthorLst>
+</file>
+
+<file path=ppt/comments/comment1.xml><?xml version="1.0" encoding="utf-8"?>
+<p:cmLst xmlns:a="http://schemas.openxmlformats.org/drawingml/2006/main" xmlns:r="http://schemas.openxmlformats.org/officeDocument/2006/relationships" xmlns:p="http://schemas.openxmlformats.org/presentationml/2006/main">
+  <p:cm authorId="1" dt="2019-05-07T23:53:50.502" idx="1">
+    <p:pos x="10" y="10"/>
+    <p:text>This slide should be broken up into 3 more slides illustrating each thing a stream consists of.</p:text>
+    <p:extLst>
+      <p:ext uri="{C676402C-5697-4E1C-873F-D02D1690AC5C}">
+        <p15:threadingInfo xmlns:p15="http://schemas.microsoft.com/office/powerpoint/2012/main" timeZoneBias="240"/>
+      </p:ext>
+    </p:extLst>
+  </p:cm>
+</p:cmLst>
+</file>
+
 <file path=ppt/notesMasters/notesMaster1.xml><?xml version="1.0" encoding="utf-8"?>
 <p:notesMaster xmlns:a="http://schemas.openxmlformats.org/drawingml/2006/main" xmlns:r="http://schemas.openxmlformats.org/officeDocument/2006/relationships" xmlns:p="http://schemas.openxmlformats.org/presentationml/2006/main">
   <p:cSld>
@@ -322,7 +352,7 @@
           <a:p>
             <a:fld id="{00F927AF-B093-4AD4-B894-C7B744C95185}" type="datetimeFigureOut">
               <a:rPr lang="en-US" smtClean="0"/>
-              <a:t>5/4/2019</a:t>
+              <a:t>5/7/2019</a:t>
             </a:fld>
             <a:endParaRPr lang="en-US"/>
           </a:p>
@@ -3650,7 +3680,7 @@
             <a:fld id="{B61BEF0D-F0BB-DE4B-95CE-6DB70DBA9567}" type="datetimeFigureOut">
               <a:rPr lang="en-US" dirty="0"/>
               <a:pPr/>
-              <a:t>5/4/2019</a:t>
+              <a:t>5/7/2019</a:t>
             </a:fld>
             <a:endParaRPr lang="en-US" dirty="0"/>
           </a:p>
@@ -3898,7 +3928,7 @@
             <a:fld id="{B61BEF0D-F0BB-DE4B-95CE-6DB70DBA9567}" type="datetimeFigureOut">
               <a:rPr lang="en-US" dirty="0"/>
               <a:pPr/>
-              <a:t>5/4/2019</a:t>
+              <a:t>5/7/2019</a:t>
             </a:fld>
             <a:endParaRPr lang="en-US" dirty="0"/>
           </a:p>
@@ -4209,7 +4239,7 @@
             <a:fld id="{B61BEF0D-F0BB-DE4B-95CE-6DB70DBA9567}" type="datetimeFigureOut">
               <a:rPr lang="en-US" dirty="0"/>
               <a:pPr/>
-              <a:t>5/4/2019</a:t>
+              <a:t>5/7/2019</a:t>
             </a:fld>
             <a:endParaRPr lang="en-US" dirty="0"/>
           </a:p>
@@ -4547,7 +4577,7 @@
             <a:fld id="{B61BEF0D-F0BB-DE4B-95CE-6DB70DBA9567}" type="datetimeFigureOut">
               <a:rPr lang="en-US" dirty="0"/>
               <a:pPr/>
-              <a:t>5/4/2019</a:t>
+              <a:t>5/7/2019</a:t>
             </a:fld>
             <a:endParaRPr lang="en-US" dirty="0"/>
           </a:p>
@@ -4858,7 +4888,7 @@
             <a:fld id="{B61BEF0D-F0BB-DE4B-95CE-6DB70DBA9567}" type="datetimeFigureOut">
               <a:rPr lang="en-US" dirty="0"/>
               <a:pPr/>
-              <a:t>5/4/2019</a:t>
+              <a:t>5/7/2019</a:t>
             </a:fld>
             <a:endParaRPr lang="en-US" dirty="0"/>
           </a:p>
@@ -5248,7 +5278,7 @@
             <a:fld id="{B61BEF0D-F0BB-DE4B-95CE-6DB70DBA9567}" type="datetimeFigureOut">
               <a:rPr lang="en-US" dirty="0"/>
               <a:pPr/>
-              <a:t>5/4/2019</a:t>
+              <a:t>5/7/2019</a:t>
             </a:fld>
             <a:endParaRPr lang="en-US" dirty="0"/>
           </a:p>
@@ -5414,7 +5444,7 @@
           <a:p>
             <a:fld id="{55C6B4A9-1611-4792-9094-5F34BCA07E0B}" type="datetimeFigureOut">
               <a:rPr lang="en-US" dirty="0"/>
-              <a:t>5/4/2019</a:t>
+              <a:t>5/7/2019</a:t>
             </a:fld>
             <a:endParaRPr lang="en-US" dirty="0"/>
           </a:p>
@@ -5590,7 +5620,7 @@
             <a:fld id="{B61BEF0D-F0BB-DE4B-95CE-6DB70DBA9567}" type="datetimeFigureOut">
               <a:rPr lang="en-US" dirty="0"/>
               <a:pPr/>
-              <a:t>5/4/2019</a:t>
+              <a:t>5/7/2019</a:t>
             </a:fld>
             <a:endParaRPr lang="en-US" dirty="0"/>
           </a:p>
@@ -5763,7 +5793,7 @@
             <a:fld id="{B61BEF0D-F0BB-DE4B-95CE-6DB70DBA9567}" type="datetimeFigureOut">
               <a:rPr lang="en-US" dirty="0"/>
               <a:pPr/>
-              <a:t>5/4/2019</a:t>
+              <a:t>5/7/2019</a:t>
             </a:fld>
             <a:endParaRPr lang="en-US" dirty="0"/>
           </a:p>
@@ -6007,7 +6037,7 @@
             <a:fld id="{B61BEF0D-F0BB-DE4B-95CE-6DB70DBA9567}" type="datetimeFigureOut">
               <a:rPr lang="en-US" dirty="0"/>
               <a:pPr/>
-              <a:t>5/4/2019</a:t>
+              <a:t>5/7/2019</a:t>
             </a:fld>
             <a:endParaRPr lang="en-US" dirty="0"/>
           </a:p>
@@ -6235,7 +6265,7 @@
           <a:p>
             <a:fld id="{EB712588-04B1-427B-82EE-E8DB90309F08}" type="datetimeFigureOut">
               <a:rPr lang="en-US" dirty="0"/>
-              <a:t>5/4/2019</a:t>
+              <a:t>5/7/2019</a:t>
             </a:fld>
             <a:endParaRPr lang="en-US" dirty="0"/>
           </a:p>
@@ -6605,7 +6635,7 @@
             <a:fld id="{B61BEF0D-F0BB-DE4B-95CE-6DB70DBA9567}" type="datetimeFigureOut">
               <a:rPr lang="en-US" dirty="0"/>
               <a:pPr/>
-              <a:t>5/4/2019</a:t>
+              <a:t>5/7/2019</a:t>
             </a:fld>
             <a:endParaRPr lang="en-US" dirty="0"/>
           </a:p>
@@ -6725,7 +6755,7 @@
             <a:fld id="{B61BEF0D-F0BB-DE4B-95CE-6DB70DBA9567}" type="datetimeFigureOut">
               <a:rPr lang="en-US" dirty="0"/>
               <a:pPr/>
-              <a:t>5/4/2019</a:t>
+              <a:t>5/7/2019</a:t>
             </a:fld>
             <a:endParaRPr lang="en-US" dirty="0"/>
           </a:p>
@@ -6817,7 +6847,7 @@
             <a:fld id="{B61BEF0D-F0BB-DE4B-95CE-6DB70DBA9567}" type="datetimeFigureOut">
               <a:rPr lang="en-US" dirty="0"/>
               <a:pPr/>
-              <a:t>5/4/2019</a:t>
+              <a:t>5/7/2019</a:t>
             </a:fld>
             <a:endParaRPr lang="en-US" dirty="0"/>
           </a:p>
@@ -7068,7 +7098,7 @@
           <a:p>
             <a:fld id="{42A54C80-263E-416B-A8E0-580EDEADCBDC}" type="datetimeFigureOut">
               <a:rPr lang="en-US" dirty="0"/>
-              <a:t>5/4/2019</a:t>
+              <a:t>5/7/2019</a:t>
             </a:fld>
             <a:endParaRPr lang="en-US" dirty="0"/>
           </a:p>
@@ -7327,7 +7357,7 @@
             <a:fld id="{B61BEF0D-F0BB-DE4B-95CE-6DB70DBA9567}" type="datetimeFigureOut">
               <a:rPr lang="en-US" dirty="0"/>
               <a:pPr/>
-              <a:t>5/4/2019</a:t>
+              <a:t>5/7/2019</a:t>
             </a:fld>
             <a:endParaRPr lang="en-US" dirty="0"/>
           </a:p>
@@ -8067,7 +8097,7 @@
             <a:fld id="{B61BEF0D-F0BB-DE4B-95CE-6DB70DBA9567}" type="datetimeFigureOut">
               <a:rPr lang="en-US" dirty="0"/>
               <a:pPr/>
-              <a:t>5/4/2019</a:t>
+              <a:t>5/7/2019</a:t>
             </a:fld>
             <a:endParaRPr lang="en-US" dirty="0"/>
           </a:p>
@@ -9143,27 +9173,11 @@
           <a:p>
             <a:r>
               <a:rPr lang="en-US" sz="2400" dirty="0" smtClean="0"/>
-              <a:t>Similar to the Visitor </a:t>
+              <a:t>Functional </a:t>
             </a:r>
             <a:r>
               <a:rPr lang="en-US" sz="2400" dirty="0"/>
-              <a:t>pattern via </a:t>
-            </a:r>
-            <a:r>
-              <a:rPr lang="en-US" sz="2400" dirty="0" err="1" smtClean="0">
-                <a:solidFill>
-                  <a:srgbClr val="000000"/>
-                </a:solidFill>
-                <a:latin typeface="Courier New" panose="02070309020205020404" pitchFamily="49" charset="0"/>
-              </a:rPr>
-              <a:t>forEach</a:t>
-            </a:r>
-            <a:endParaRPr lang="en-US" sz="2400" dirty="0" smtClean="0"/>
-          </a:p>
-          <a:p>
-            <a:r>
-              <a:rPr lang="en-US" sz="2400" dirty="0"/>
-              <a:t>Functional Method</a:t>
+              <a:t>Method</a:t>
             </a:r>
             <a:r>
               <a:rPr lang="en-US" sz="2400" dirty="0" smtClean="0"/>
@@ -13269,8 +13283,13 @@
           <a:p>
             <a:r>
               <a:rPr lang="en-US" sz="2600" dirty="0" smtClean="0"/>
-              <a:t>Sr. Technical Lead at DXC Technology</a:t>
-            </a:r>
+              <a:t>Sr. Technical Lead at </a:t>
+            </a:r>
+            <a:r>
+              <a:rPr lang="en-US" sz="2600" dirty="0" err="1" smtClean="0"/>
+              <a:t>Perspecta</a:t>
+            </a:r>
+            <a:endParaRPr lang="en-US" sz="2600" dirty="0" smtClean="0"/>
           </a:p>
           <a:p>
             <a:r>
@@ -13864,8 +13883,20 @@
             </a:r>
             <a:r>
               <a:rPr lang="en-US" sz="2000" dirty="0" smtClean="0"/>
-              <a:t>variables may be used as a method reference on an instance.</a:t>
-            </a:r>
+              <a:t>variables may be used as a method reference on an instance</a:t>
+            </a:r>
+            <a:r>
+              <a:rPr lang="en-US" sz="2000" dirty="0" smtClean="0"/>
+              <a:t>.</a:t>
+            </a:r>
+          </a:p>
+          <a:p>
+            <a:r>
+              <a:rPr lang="en-US" sz="2000" dirty="0"/>
+              <a:t>Arguments are bound in declaration order.</a:t>
+            </a:r>
+          </a:p>
+          <a:p>
             <a:endParaRPr lang="en-US" sz="2000" dirty="0"/>
           </a:p>
           <a:p>
@@ -14825,8 +14856,13 @@
           <a:p>
             <a:r>
               <a:rPr lang="en-US" sz="2000" dirty="0" smtClean="0"/>
-              <a:t>The first argument of the lambda becomes the instance the method reference operates on.</a:t>
-            </a:r>
+              <a:t>The first argument of the lambda becomes the instance the method reference operates on</a:t>
+            </a:r>
+            <a:r>
+              <a:rPr lang="en-US" sz="2000" dirty="0" smtClean="0"/>
+              <a:t>.</a:t>
+            </a:r>
+            <a:endParaRPr lang="en-US" sz="2000" dirty="0" smtClean="0"/>
           </a:p>
           <a:p>
             <a:r>
@@ -19832,7 +19868,15 @@
           <a:p>
             <a:r>
               <a:rPr lang="en-US" sz="2400" dirty="0" smtClean="0"/>
-              <a:t>In Java, it is an unnamed function that may be bound to an interface as an object.</a:t>
+              <a:t>In Java, it is an unnamed function </a:t>
+            </a:r>
+            <a:r>
+              <a:rPr lang="en-US" sz="2400" dirty="0" smtClean="0"/>
+              <a:t>that is </a:t>
+            </a:r>
+            <a:r>
+              <a:rPr lang="en-US" sz="2400" dirty="0" smtClean="0"/>
+              <a:t>bound to an interface as an object.</a:t>
             </a:r>
           </a:p>
           <a:p>
@@ -28577,15 +28621,7 @@
           <a:p>
             <a:r>
               <a:rPr lang="en-US" sz="2400" dirty="0" smtClean="0"/>
-              <a:t>This may result in the code being littered with </a:t>
-            </a:r>
-            <a:r>
-              <a:rPr lang="en-US" sz="2400" dirty="0" smtClean="0"/>
-              <a:t>catch </a:t>
-            </a:r>
-            <a:r>
-              <a:rPr lang="en-US" sz="2400" dirty="0" smtClean="0"/>
-              <a:t>statements.</a:t>
+              <a:t>This may result in the code being littered with catch statements.</a:t>
             </a:r>
           </a:p>
           <a:p>
@@ -29637,15 +29673,13 @@
           <a:p>
             <a:r>
               <a:rPr lang="en-US" sz="2400" dirty="0" smtClean="0"/>
-              <a:t>The try-with-resources catch clause doesn’t distinguish between close and body exceptions.</a:t>
-            </a:r>
-          </a:p>
-          <a:p>
+              <a:t>The try-with-resources catch clause doesn’t distinguish between close and body </a:t>
+            </a:r>
             <a:r>
               <a:rPr lang="en-US" sz="2400" dirty="0" smtClean="0"/>
-              <a:t>Can we fix that? (Spoiler alert: yes)</a:t>
-            </a:r>
-            <a:endParaRPr lang="en-US" sz="2400" dirty="0"/>
+              <a:t>exceptions.</a:t>
+            </a:r>
+            <a:endParaRPr lang="en-US" sz="2400" dirty="0" smtClean="0"/>
           </a:p>
         </p:txBody>
       </p:sp>
@@ -30216,15 +30250,7 @@
           <a:p>
             <a:r>
               <a:rPr lang="en-US" sz="2400" dirty="0" smtClean="0"/>
-              <a:t>And</a:t>
-            </a:r>
-            <a:r>
-              <a:rPr lang="en-US" sz="2400" dirty="0" smtClean="0"/>
-              <a:t> </a:t>
-            </a:r>
-            <a:r>
-              <a:rPr lang="en-US" sz="2400" dirty="0" smtClean="0"/>
-              <a:t>we have:</a:t>
+              <a:t>And we have:</a:t>
             </a:r>
             <a:endParaRPr lang="en-US" sz="2400" dirty="0" smtClean="0">
               <a:solidFill>
@@ -30247,19 +30273,7 @@
                 </a:highlight>
                 <a:latin typeface="Courier New" panose="02070309020205020404" pitchFamily="49" charset="0"/>
               </a:rPr>
-              <a:t>public </a:t>
-            </a:r>
-            <a:r>
-              <a:rPr lang="en-US" dirty="0" smtClean="0">
-                <a:solidFill>
-                  <a:srgbClr val="8000FF"/>
-                </a:solidFill>
-                <a:highlight>
-                  <a:srgbClr val="FFFFFF"/>
-                </a:highlight>
-                <a:latin typeface="Courier New" panose="02070309020205020404" pitchFamily="49" charset="0"/>
-              </a:rPr>
-              <a:t>static</a:t>
+              <a:t>public static</a:t>
             </a:r>
             <a:r>
               <a:rPr lang="en-US" dirty="0" smtClean="0">

</xml_diff>

<commit_message>
Improve the section on AutoClosable.
</commit_message>
<xml_diff>
--- a/Learning to Love the Lambda in the Stream.pptx
+++ b/Learning to Love the Lambda in the Stream.pptx
@@ -5,7 +5,7 @@
     <p:sldMasterId id="2147483648" r:id="rId1"/>
   </p:sldMasterIdLst>
   <p:notesMasterIdLst>
-    <p:notesMasterId r:id="rId49"/>
+    <p:notesMasterId r:id="rId47"/>
   </p:notesMasterIdLst>
   <p:sldIdLst>
     <p:sldId id="256" r:id="rId2"/>
@@ -51,10 +51,8 @@
     <p:sldId id="301" r:id="rId42"/>
     <p:sldId id="302" r:id="rId43"/>
     <p:sldId id="303" r:id="rId44"/>
-    <p:sldId id="306" r:id="rId45"/>
-    <p:sldId id="304" r:id="rId46"/>
-    <p:sldId id="305" r:id="rId47"/>
-    <p:sldId id="291" r:id="rId48"/>
+    <p:sldId id="304" r:id="rId45"/>
+    <p:sldId id="291" r:id="rId46"/>
   </p:sldIdLst>
   <p:sldSz cx="12192000" cy="6858000"/>
   <p:notesSz cx="6858000" cy="9144000"/>
@@ -225,9 +223,7 @@
             <p14:sldId id="301"/>
             <p14:sldId id="302"/>
             <p14:sldId id="303"/>
-            <p14:sldId id="306"/>
             <p14:sldId id="304"/>
-            <p14:sldId id="305"/>
           </p14:sldIdLst>
         </p14:section>
         <p14:section name="Questions &amp; Licensing" id="{669896EF-53AF-49D1-86E2-0E81FAF6F0AD}">
@@ -352,7 +348,7 @@
           <a:p>
             <a:fld id="{00F927AF-B093-4AD4-B894-C7B744C95185}" type="datetimeFigureOut">
               <a:rPr lang="en-US" smtClean="0"/>
-              <a:t>5/7/2019</a:t>
+              <a:t>7/6/2019</a:t>
             </a:fld>
             <a:endParaRPr lang="en-US"/>
           </a:p>
@@ -3680,7 +3676,7 @@
             <a:fld id="{B61BEF0D-F0BB-DE4B-95CE-6DB70DBA9567}" type="datetimeFigureOut">
               <a:rPr lang="en-US" dirty="0"/>
               <a:pPr/>
-              <a:t>5/7/2019</a:t>
+              <a:t>7/6/2019</a:t>
             </a:fld>
             <a:endParaRPr lang="en-US" dirty="0"/>
           </a:p>
@@ -3928,7 +3924,7 @@
             <a:fld id="{B61BEF0D-F0BB-DE4B-95CE-6DB70DBA9567}" type="datetimeFigureOut">
               <a:rPr lang="en-US" dirty="0"/>
               <a:pPr/>
-              <a:t>5/7/2019</a:t>
+              <a:t>7/6/2019</a:t>
             </a:fld>
             <a:endParaRPr lang="en-US" dirty="0"/>
           </a:p>
@@ -4239,7 +4235,7 @@
             <a:fld id="{B61BEF0D-F0BB-DE4B-95CE-6DB70DBA9567}" type="datetimeFigureOut">
               <a:rPr lang="en-US" dirty="0"/>
               <a:pPr/>
-              <a:t>5/7/2019</a:t>
+              <a:t>7/6/2019</a:t>
             </a:fld>
             <a:endParaRPr lang="en-US" dirty="0"/>
           </a:p>
@@ -4577,7 +4573,7 @@
             <a:fld id="{B61BEF0D-F0BB-DE4B-95CE-6DB70DBA9567}" type="datetimeFigureOut">
               <a:rPr lang="en-US" dirty="0"/>
               <a:pPr/>
-              <a:t>5/7/2019</a:t>
+              <a:t>7/6/2019</a:t>
             </a:fld>
             <a:endParaRPr lang="en-US" dirty="0"/>
           </a:p>
@@ -4888,7 +4884,7 @@
             <a:fld id="{B61BEF0D-F0BB-DE4B-95CE-6DB70DBA9567}" type="datetimeFigureOut">
               <a:rPr lang="en-US" dirty="0"/>
               <a:pPr/>
-              <a:t>5/7/2019</a:t>
+              <a:t>7/6/2019</a:t>
             </a:fld>
             <a:endParaRPr lang="en-US" dirty="0"/>
           </a:p>
@@ -5278,7 +5274,7 @@
             <a:fld id="{B61BEF0D-F0BB-DE4B-95CE-6DB70DBA9567}" type="datetimeFigureOut">
               <a:rPr lang="en-US" dirty="0"/>
               <a:pPr/>
-              <a:t>5/7/2019</a:t>
+              <a:t>7/6/2019</a:t>
             </a:fld>
             <a:endParaRPr lang="en-US" dirty="0"/>
           </a:p>
@@ -5444,7 +5440,7 @@
           <a:p>
             <a:fld id="{55C6B4A9-1611-4792-9094-5F34BCA07E0B}" type="datetimeFigureOut">
               <a:rPr lang="en-US" dirty="0"/>
-              <a:t>5/7/2019</a:t>
+              <a:t>7/6/2019</a:t>
             </a:fld>
             <a:endParaRPr lang="en-US" dirty="0"/>
           </a:p>
@@ -5620,7 +5616,7 @@
             <a:fld id="{B61BEF0D-F0BB-DE4B-95CE-6DB70DBA9567}" type="datetimeFigureOut">
               <a:rPr lang="en-US" dirty="0"/>
               <a:pPr/>
-              <a:t>5/7/2019</a:t>
+              <a:t>7/6/2019</a:t>
             </a:fld>
             <a:endParaRPr lang="en-US" dirty="0"/>
           </a:p>
@@ -5793,7 +5789,7 @@
             <a:fld id="{B61BEF0D-F0BB-DE4B-95CE-6DB70DBA9567}" type="datetimeFigureOut">
               <a:rPr lang="en-US" dirty="0"/>
               <a:pPr/>
-              <a:t>5/7/2019</a:t>
+              <a:t>7/6/2019</a:t>
             </a:fld>
             <a:endParaRPr lang="en-US" dirty="0"/>
           </a:p>
@@ -6037,7 +6033,7 @@
             <a:fld id="{B61BEF0D-F0BB-DE4B-95CE-6DB70DBA9567}" type="datetimeFigureOut">
               <a:rPr lang="en-US" dirty="0"/>
               <a:pPr/>
-              <a:t>5/7/2019</a:t>
+              <a:t>7/6/2019</a:t>
             </a:fld>
             <a:endParaRPr lang="en-US" dirty="0"/>
           </a:p>
@@ -6265,7 +6261,7 @@
           <a:p>
             <a:fld id="{EB712588-04B1-427B-82EE-E8DB90309F08}" type="datetimeFigureOut">
               <a:rPr lang="en-US" dirty="0"/>
-              <a:t>5/7/2019</a:t>
+              <a:t>7/6/2019</a:t>
             </a:fld>
             <a:endParaRPr lang="en-US" dirty="0"/>
           </a:p>
@@ -6635,7 +6631,7 @@
             <a:fld id="{B61BEF0D-F0BB-DE4B-95CE-6DB70DBA9567}" type="datetimeFigureOut">
               <a:rPr lang="en-US" dirty="0"/>
               <a:pPr/>
-              <a:t>5/7/2019</a:t>
+              <a:t>7/6/2019</a:t>
             </a:fld>
             <a:endParaRPr lang="en-US" dirty="0"/>
           </a:p>
@@ -6755,7 +6751,7 @@
             <a:fld id="{B61BEF0D-F0BB-DE4B-95CE-6DB70DBA9567}" type="datetimeFigureOut">
               <a:rPr lang="en-US" dirty="0"/>
               <a:pPr/>
-              <a:t>5/7/2019</a:t>
+              <a:t>7/6/2019</a:t>
             </a:fld>
             <a:endParaRPr lang="en-US" dirty="0"/>
           </a:p>
@@ -6847,7 +6843,7 @@
             <a:fld id="{B61BEF0D-F0BB-DE4B-95CE-6DB70DBA9567}" type="datetimeFigureOut">
               <a:rPr lang="en-US" dirty="0"/>
               <a:pPr/>
-              <a:t>5/7/2019</a:t>
+              <a:t>7/6/2019</a:t>
             </a:fld>
             <a:endParaRPr lang="en-US" dirty="0"/>
           </a:p>
@@ -7098,7 +7094,7 @@
           <a:p>
             <a:fld id="{42A54C80-263E-416B-A8E0-580EDEADCBDC}" type="datetimeFigureOut">
               <a:rPr lang="en-US" dirty="0"/>
-              <a:t>5/7/2019</a:t>
+              <a:t>7/6/2019</a:t>
             </a:fld>
             <a:endParaRPr lang="en-US" dirty="0"/>
           </a:p>
@@ -7357,7 +7353,7 @@
             <a:fld id="{B61BEF0D-F0BB-DE4B-95CE-6DB70DBA9567}" type="datetimeFigureOut">
               <a:rPr lang="en-US" dirty="0"/>
               <a:pPr/>
-              <a:t>5/7/2019</a:t>
+              <a:t>7/6/2019</a:t>
             </a:fld>
             <a:endParaRPr lang="en-US" dirty="0"/>
           </a:p>
@@ -8097,7 +8093,7 @@
             <a:fld id="{B61BEF0D-F0BB-DE4B-95CE-6DB70DBA9567}" type="datetimeFigureOut">
               <a:rPr lang="en-US" dirty="0"/>
               <a:pPr/>
-              <a:t>5/7/2019</a:t>
+              <a:t>7/6/2019</a:t>
             </a:fld>
             <a:endParaRPr lang="en-US" dirty="0"/>
           </a:p>
@@ -12190,6 +12186,13 @@
   <p:clrMapOvr>
     <a:masterClrMapping/>
   </p:clrMapOvr>
+  <p:timing>
+    <p:tnLst>
+      <p:par>
+        <p:cTn id="1" dur="indefinite" restart="never" nodeType="tmRoot"/>
+      </p:par>
+    </p:tnLst>
+  </p:timing>
 </p:sld>
 </file>
 
@@ -12520,7 +12523,23 @@
           <a:p>
             <a:r>
               <a:rPr lang="en-US" sz="2400" dirty="0" smtClean="0"/>
-              <a:t>Once familiarity with syntax is obtained, these can often be read and understood faster.</a:t>
+              <a:t>Once </a:t>
+            </a:r>
+            <a:r>
+              <a:rPr lang="en-US" sz="2400" dirty="0" smtClean="0"/>
+              <a:t>familiar </a:t>
+            </a:r>
+            <a:r>
+              <a:rPr lang="en-US" sz="2400" dirty="0" smtClean="0"/>
+              <a:t>with </a:t>
+            </a:r>
+            <a:r>
+              <a:rPr lang="en-US" sz="2400" dirty="0" smtClean="0"/>
+              <a:t>syntax, </a:t>
+            </a:r>
+            <a:r>
+              <a:rPr lang="en-US" sz="2400" dirty="0" smtClean="0"/>
+              <a:t>these can often be read and understood faster.</a:t>
             </a:r>
           </a:p>
           <a:p>
@@ -13883,11 +13902,7 @@
             </a:r>
             <a:r>
               <a:rPr lang="en-US" sz="2000" dirty="0" smtClean="0"/>
-              <a:t>variables may be used as a method reference on an instance</a:t>
-            </a:r>
-            <a:r>
-              <a:rPr lang="en-US" sz="2000" dirty="0" smtClean="0"/>
-              <a:t>.</a:t>
+              <a:t>variables may be used as a method reference on an instance.</a:t>
             </a:r>
           </a:p>
           <a:p>
@@ -14856,13 +14871,8 @@
           <a:p>
             <a:r>
               <a:rPr lang="en-US" sz="2000" dirty="0" smtClean="0"/>
-              <a:t>The first argument of the lambda becomes the instance the method reference operates on</a:t>
-            </a:r>
-            <a:r>
-              <a:rPr lang="en-US" sz="2000" dirty="0" smtClean="0"/>
-              <a:t>.</a:t>
-            </a:r>
-            <a:endParaRPr lang="en-US" sz="2000" dirty="0" smtClean="0"/>
+              <a:t>The first argument of the lambda becomes the instance the method reference operates on.</a:t>
+            </a:r>
           </a:p>
           <a:p>
             <a:r>
@@ -19868,15 +19878,7 @@
           <a:p>
             <a:r>
               <a:rPr lang="en-US" sz="2400" dirty="0" smtClean="0"/>
-              <a:t>In Java, it is an unnamed function </a:t>
-            </a:r>
-            <a:r>
-              <a:rPr lang="en-US" sz="2400" dirty="0" smtClean="0"/>
-              <a:t>that is </a:t>
-            </a:r>
-            <a:r>
-              <a:rPr lang="en-US" sz="2400" dirty="0" smtClean="0"/>
-              <a:t>bound to an interface as an object.</a:t>
+              <a:t>In Java, it is an unnamed function that is bound to an interface as an object.</a:t>
             </a:r>
           </a:p>
           <a:p>
@@ -20729,6 +20731,13 @@
   <p:clrMapOvr>
     <a:masterClrMapping/>
   </p:clrMapOvr>
+  <p:timing>
+    <p:tnLst>
+      <p:par>
+        <p:cTn id="1" dur="indefinite" restart="never" nodeType="tmRoot"/>
+      </p:par>
+    </p:tnLst>
+  </p:timing>
 </p:sld>
 </file>
 
@@ -20923,6 +20932,13 @@
   <p:clrMapOvr>
     <a:masterClrMapping/>
   </p:clrMapOvr>
+  <p:timing>
+    <p:tnLst>
+      <p:par>
+        <p:cTn id="1" dur="indefinite" restart="never" nodeType="tmRoot"/>
+      </p:par>
+    </p:tnLst>
+  </p:timing>
 </p:sld>
 </file>
 
@@ -26321,6 +26337,13 @@
   <p:clrMapOvr>
     <a:masterClrMapping/>
   </p:clrMapOvr>
+  <p:timing>
+    <p:tnLst>
+      <p:par>
+        <p:cTn id="1" dur="indefinite" restart="never" nodeType="tmRoot"/>
+      </p:par>
+    </p:tnLst>
+  </p:timing>
 </p:sld>
 </file>
 
@@ -26401,6 +26424,13 @@
   <p:clrMapOvr>
     <a:masterClrMapping/>
   </p:clrMapOvr>
+  <p:timing>
+    <p:tnLst>
+      <p:par>
+        <p:cTn id="1" dur="indefinite" restart="never" nodeType="tmRoot"/>
+      </p:par>
+    </p:tnLst>
+  </p:timing>
 </p:sld>
 </file>
 
@@ -26798,6 +26828,13 @@
   <p:clrMapOvr>
     <a:masterClrMapping/>
   </p:clrMapOvr>
+  <p:timing>
+    <p:tnLst>
+      <p:par>
+        <p:cTn id="1" dur="indefinite" restart="never" nodeType="tmRoot"/>
+      </p:par>
+    </p:tnLst>
+  </p:timing>
 </p:sld>
 </file>
 
@@ -28541,6 +28578,13 @@
   <p:clrMapOvr>
     <a:masterClrMapping/>
   </p:clrMapOvr>
+  <p:timing>
+    <p:tnLst>
+      <p:par>
+        <p:cTn id="1" dur="indefinite" restart="never" nodeType="tmRoot"/>
+      </p:par>
+    </p:tnLst>
+  </p:timing>
 </p:sld>
 </file>
 
@@ -28655,6 +28699,13 @@
   <p:clrMapOvr>
     <a:masterClrMapping/>
   </p:clrMapOvr>
+  <p:timing>
+    <p:tnLst>
+      <p:par>
+        <p:cTn id="1" dur="indefinite" restart="never" nodeType="tmRoot"/>
+      </p:par>
+    </p:tnLst>
+  </p:timing>
 </p:sld>
 </file>
 
@@ -29577,6 +29628,13 @@
   <p:clrMapOvr>
     <a:masterClrMapping/>
   </p:clrMapOvr>
+  <p:timing>
+    <p:tnLst>
+      <p:par>
+        <p:cTn id="1" dur="indefinite" restart="never" nodeType="tmRoot"/>
+      </p:par>
+    </p:tnLst>
+  </p:timing>
 </p:sld>
 </file>
 
@@ -29614,7 +29672,15 @@
           <a:p>
             <a:r>
               <a:rPr lang="en-US" dirty="0" smtClean="0"/>
-              <a:t>Close Exception in try-with-resources</a:t>
+              <a:t>Parameterizing </a:t>
+            </a:r>
+            <a:r>
+              <a:rPr lang="en-US" dirty="0" err="1" smtClean="0"/>
+              <a:t>AutoClosable</a:t>
+            </a:r>
+            <a:r>
+              <a:rPr lang="en-US" dirty="0" smtClean="0"/>
+              <a:t> Exceptions</a:t>
             </a:r>
             <a:endParaRPr lang="en-US" dirty="0"/>
           </a:p>
@@ -29630,69 +29696,535 @@
             <p:ph idx="1"/>
           </p:nvPr>
         </p:nvSpPr>
-        <p:spPr/>
+        <p:spPr>
+          <a:xfrm>
+            <a:off x="677334" y="1747837"/>
+            <a:ext cx="8596668" cy="4293525"/>
+          </a:xfrm>
+        </p:spPr>
         <p:txBody>
-          <a:bodyPr>
-            <a:normAutofit/>
-          </a:bodyPr>
+          <a:bodyPr/>
           <a:lstStyle/>
           <a:p>
             <a:r>
-              <a:rPr lang="en-US" sz="2400" dirty="0" smtClean="0"/>
-              <a:t>It would be advantageous to know if an exception occurs in a close method</a:t>
-            </a:r>
-          </a:p>
-          <a:p>
-            <a:r>
-              <a:rPr lang="en-US" sz="2400" dirty="0" smtClean="0"/>
-              <a:t>We may want to handle these exceptions differently</a:t>
-            </a:r>
-          </a:p>
-          <a:p>
-            <a:pPr lvl="1"/>
-            <a:r>
-              <a:rPr lang="en-US" sz="2200" dirty="0" smtClean="0"/>
-              <a:t>Not </a:t>
-            </a:r>
-            <a:r>
-              <a:rPr lang="en-US" sz="2200" dirty="0" err="1" smtClean="0"/>
-              <a:t>rethrow</a:t>
-            </a:r>
-            <a:r>
-              <a:rPr lang="en-US" sz="2200" dirty="0" smtClean="0"/>
-              <a:t> them or fail the operation.</a:t>
-            </a:r>
-          </a:p>
-          <a:p>
-            <a:pPr lvl="1"/>
-            <a:r>
-              <a:rPr lang="en-US" sz="2200" dirty="0" smtClean="0"/>
-              <a:t>Log them so that the root cause may be investigated</a:t>
-            </a:r>
-          </a:p>
-          <a:p>
-            <a:r>
-              <a:rPr lang="en-US" sz="2400" dirty="0" smtClean="0"/>
-              <a:t>The try-with-resources catch clause doesn’t distinguish between close and body </a:t>
-            </a:r>
-            <a:r>
-              <a:rPr lang="en-US" sz="2400" dirty="0" smtClean="0"/>
-              <a:t>exceptions.</a:t>
-            </a:r>
-            <a:endParaRPr lang="en-US" sz="2400" dirty="0" smtClean="0"/>
+              <a:rPr lang="en-US" dirty="0" smtClean="0"/>
+              <a:t>Using generics, it is possible to parameterize the checked exceptions that a sub-interface of </a:t>
+            </a:r>
+            <a:r>
+              <a:rPr lang="en-US" dirty="0" err="1" smtClean="0"/>
+              <a:t>AutoClosable</a:t>
+            </a:r>
+            <a:r>
+              <a:rPr lang="en-US" dirty="0" smtClean="0"/>
+              <a:t> may throw.</a:t>
+            </a:r>
+          </a:p>
+          <a:p>
+            <a:r>
+              <a:rPr lang="en-US" dirty="0" smtClean="0"/>
+              <a:t>This example demonstrates how to parameterize a single checked exception.</a:t>
+            </a:r>
+          </a:p>
+          <a:p>
+            <a:r>
+              <a:rPr lang="en-US" dirty="0">
+                <a:solidFill>
+                  <a:srgbClr val="8000FF"/>
+                </a:solidFill>
+                <a:latin typeface="Courier New" panose="02070309020205020404" pitchFamily="49" charset="0"/>
+              </a:rPr>
+              <a:t>public</a:t>
+            </a:r>
+            <a:r>
+              <a:rPr lang="en-US" dirty="0">
+                <a:solidFill>
+                  <a:srgbClr val="000000"/>
+                </a:solidFill>
+                <a:latin typeface="Courier New" panose="02070309020205020404" pitchFamily="49" charset="0"/>
+              </a:rPr>
+              <a:t> </a:t>
+            </a:r>
+            <a:r>
+              <a:rPr lang="en-US" dirty="0">
+                <a:solidFill>
+                  <a:srgbClr val="8000FF"/>
+                </a:solidFill>
+                <a:latin typeface="Courier New" panose="02070309020205020404" pitchFamily="49" charset="0"/>
+              </a:rPr>
+              <a:t>interface</a:t>
+            </a:r>
+            <a:r>
+              <a:rPr lang="en-US" dirty="0">
+                <a:solidFill>
+                  <a:srgbClr val="000000"/>
+                </a:solidFill>
+                <a:latin typeface="Courier New" panose="02070309020205020404" pitchFamily="49" charset="0"/>
+              </a:rPr>
+              <a:t> CloseIt1</a:t>
+            </a:r>
+            <a:r>
+              <a:rPr lang="en-US" b="1" dirty="0">
+                <a:solidFill>
+                  <a:srgbClr val="000080"/>
+                </a:solidFill>
+                <a:latin typeface="Courier New" panose="02070309020205020404" pitchFamily="49" charset="0"/>
+              </a:rPr>
+              <a:t>&lt;</a:t>
+            </a:r>
+            <a:r>
+              <a:rPr lang="en-US" dirty="0">
+                <a:solidFill>
+                  <a:srgbClr val="000000"/>
+                </a:solidFill>
+                <a:latin typeface="Courier New" panose="02070309020205020404" pitchFamily="49" charset="0"/>
+              </a:rPr>
+              <a:t>E </a:t>
+            </a:r>
+            <a:r>
+              <a:rPr lang="en-US" b="1" dirty="0">
+                <a:solidFill>
+                  <a:srgbClr val="0000FF"/>
+                </a:solidFill>
+                <a:latin typeface="Courier New" panose="02070309020205020404" pitchFamily="49" charset="0"/>
+              </a:rPr>
+              <a:t>extends</a:t>
+            </a:r>
+            <a:r>
+              <a:rPr lang="en-US" dirty="0">
+                <a:solidFill>
+                  <a:srgbClr val="000000"/>
+                </a:solidFill>
+                <a:latin typeface="Courier New" panose="02070309020205020404" pitchFamily="49" charset="0"/>
+              </a:rPr>
+              <a:t> Exception</a:t>
+            </a:r>
+            <a:r>
+              <a:rPr lang="en-US" b="1" dirty="0">
+                <a:solidFill>
+                  <a:srgbClr val="000080"/>
+                </a:solidFill>
+                <a:latin typeface="Courier New" panose="02070309020205020404" pitchFamily="49" charset="0"/>
+              </a:rPr>
+              <a:t>&gt;</a:t>
+            </a:r>
+            <a:r>
+              <a:rPr lang="en-US" dirty="0">
+                <a:solidFill>
+                  <a:srgbClr val="000000"/>
+                </a:solidFill>
+                <a:latin typeface="Courier New" panose="02070309020205020404" pitchFamily="49" charset="0"/>
+              </a:rPr>
+              <a:t> </a:t>
+            </a:r>
+            <a:r>
+              <a:rPr lang="en-US" b="1" dirty="0">
+                <a:solidFill>
+                  <a:srgbClr val="0000FF"/>
+                </a:solidFill>
+                <a:latin typeface="Courier New" panose="02070309020205020404" pitchFamily="49" charset="0"/>
+              </a:rPr>
+              <a:t>extends</a:t>
+            </a:r>
+            <a:r>
+              <a:rPr lang="en-US" dirty="0">
+                <a:solidFill>
+                  <a:srgbClr val="000000"/>
+                </a:solidFill>
+                <a:latin typeface="Courier New" panose="02070309020205020404" pitchFamily="49" charset="0"/>
+              </a:rPr>
+              <a:t> </a:t>
+            </a:r>
+            <a:r>
+              <a:rPr lang="en-US" dirty="0" err="1">
+                <a:solidFill>
+                  <a:srgbClr val="000000"/>
+                </a:solidFill>
+                <a:latin typeface="Courier New" panose="02070309020205020404" pitchFamily="49" charset="0"/>
+              </a:rPr>
+              <a:t>AutoCloseable</a:t>
+            </a:r>
+            <a:r>
+              <a:rPr lang="en-US" dirty="0">
+                <a:solidFill>
+                  <a:srgbClr val="000000"/>
+                </a:solidFill>
+                <a:latin typeface="Courier New" panose="02070309020205020404" pitchFamily="49" charset="0"/>
+              </a:rPr>
+              <a:t> </a:t>
+            </a:r>
+            <a:r>
+              <a:rPr lang="en-US" b="1" dirty="0" smtClean="0">
+                <a:solidFill>
+                  <a:srgbClr val="000080"/>
+                </a:solidFill>
+                <a:latin typeface="Courier New" panose="02070309020205020404" pitchFamily="49" charset="0"/>
+              </a:rPr>
+              <a:t>{</a:t>
+            </a:r>
+            <a:r>
+              <a:rPr lang="en-US" dirty="0" smtClean="0">
+                <a:solidFill>
+                  <a:srgbClr val="000000"/>
+                </a:solidFill>
+                <a:latin typeface="Courier New" panose="02070309020205020404" pitchFamily="49" charset="0"/>
+              </a:rPr>
+              <a:t> </a:t>
+            </a:r>
+          </a:p>
+          <a:p>
+            <a:r>
+              <a:rPr lang="en-US" b="1" dirty="0">
+                <a:solidFill>
+                  <a:srgbClr val="000000"/>
+                </a:solidFill>
+                <a:latin typeface="Courier New" panose="02070309020205020404" pitchFamily="49" charset="0"/>
+              </a:rPr>
+              <a:t> </a:t>
+            </a:r>
+            <a:r>
+              <a:rPr lang="en-US" b="1" dirty="0" smtClean="0">
+                <a:solidFill>
+                  <a:srgbClr val="000000"/>
+                </a:solidFill>
+                <a:latin typeface="Courier New" panose="02070309020205020404" pitchFamily="49" charset="0"/>
+              </a:rPr>
+              <a:t>   </a:t>
+            </a:r>
+            <a:r>
+              <a:rPr lang="en-US" b="1" dirty="0" smtClean="0">
+                <a:solidFill>
+                  <a:srgbClr val="0000FF"/>
+                </a:solidFill>
+                <a:latin typeface="Courier New" panose="02070309020205020404" pitchFamily="49" charset="0"/>
+              </a:rPr>
+              <a:t>default</a:t>
+            </a:r>
+            <a:r>
+              <a:rPr lang="en-US" dirty="0" smtClean="0">
+                <a:solidFill>
+                  <a:srgbClr val="000000"/>
+                </a:solidFill>
+                <a:latin typeface="Courier New" panose="02070309020205020404" pitchFamily="49" charset="0"/>
+              </a:rPr>
+              <a:t> </a:t>
+            </a:r>
+            <a:r>
+              <a:rPr lang="en-US" dirty="0">
+                <a:solidFill>
+                  <a:srgbClr val="8000FF"/>
+                </a:solidFill>
+                <a:latin typeface="Courier New" panose="02070309020205020404" pitchFamily="49" charset="0"/>
+              </a:rPr>
+              <a:t>void</a:t>
+            </a:r>
+            <a:r>
+              <a:rPr lang="en-US" dirty="0">
+                <a:solidFill>
+                  <a:srgbClr val="000000"/>
+                </a:solidFill>
+                <a:latin typeface="Courier New" panose="02070309020205020404" pitchFamily="49" charset="0"/>
+              </a:rPr>
+              <a:t> close</a:t>
+            </a:r>
+            <a:r>
+              <a:rPr lang="en-US" b="1" dirty="0">
+                <a:solidFill>
+                  <a:srgbClr val="000080"/>
+                </a:solidFill>
+                <a:latin typeface="Courier New" panose="02070309020205020404" pitchFamily="49" charset="0"/>
+              </a:rPr>
+              <a:t>()</a:t>
+            </a:r>
+            <a:r>
+              <a:rPr lang="en-US" dirty="0">
+                <a:solidFill>
+                  <a:srgbClr val="000000"/>
+                </a:solidFill>
+                <a:latin typeface="Courier New" panose="02070309020205020404" pitchFamily="49" charset="0"/>
+              </a:rPr>
+              <a:t> </a:t>
+            </a:r>
+            <a:r>
+              <a:rPr lang="en-US" b="1" dirty="0">
+                <a:solidFill>
+                  <a:srgbClr val="0000FF"/>
+                </a:solidFill>
+                <a:latin typeface="Courier New" panose="02070309020205020404" pitchFamily="49" charset="0"/>
+              </a:rPr>
+              <a:t>throws</a:t>
+            </a:r>
+            <a:r>
+              <a:rPr lang="en-US" dirty="0">
+                <a:solidFill>
+                  <a:srgbClr val="000000"/>
+                </a:solidFill>
+                <a:latin typeface="Courier New" panose="02070309020205020404" pitchFamily="49" charset="0"/>
+              </a:rPr>
+              <a:t> E </a:t>
+            </a:r>
+            <a:r>
+              <a:rPr lang="en-US" b="1" dirty="0">
+                <a:solidFill>
+                  <a:srgbClr val="000080"/>
+                </a:solidFill>
+                <a:latin typeface="Courier New" panose="02070309020205020404" pitchFamily="49" charset="0"/>
+              </a:rPr>
+              <a:t>{</a:t>
+            </a:r>
+            <a:r>
+              <a:rPr lang="en-US" dirty="0">
+                <a:solidFill>
+                  <a:srgbClr val="000000"/>
+                </a:solidFill>
+                <a:latin typeface="Courier New" panose="02070309020205020404" pitchFamily="49" charset="0"/>
+              </a:rPr>
+              <a:t> </a:t>
+            </a:r>
+            <a:r>
+              <a:rPr lang="en-US" dirty="0" err="1">
+                <a:solidFill>
+                  <a:srgbClr val="000000"/>
+                </a:solidFill>
+                <a:latin typeface="Courier New" panose="02070309020205020404" pitchFamily="49" charset="0"/>
+              </a:rPr>
+              <a:t>closeIt</a:t>
+            </a:r>
+            <a:r>
+              <a:rPr lang="en-US" b="1" dirty="0">
+                <a:solidFill>
+                  <a:srgbClr val="000080"/>
+                </a:solidFill>
+                <a:latin typeface="Courier New" panose="02070309020205020404" pitchFamily="49" charset="0"/>
+              </a:rPr>
+              <a:t>();</a:t>
+            </a:r>
+            <a:r>
+              <a:rPr lang="en-US" dirty="0">
+                <a:solidFill>
+                  <a:srgbClr val="000000"/>
+                </a:solidFill>
+                <a:latin typeface="Courier New" panose="02070309020205020404" pitchFamily="49" charset="0"/>
+              </a:rPr>
+              <a:t> </a:t>
+            </a:r>
+            <a:r>
+              <a:rPr lang="en-US" b="1" dirty="0">
+                <a:solidFill>
+                  <a:srgbClr val="000080"/>
+                </a:solidFill>
+                <a:latin typeface="Courier New" panose="02070309020205020404" pitchFamily="49" charset="0"/>
+              </a:rPr>
+              <a:t>}</a:t>
+            </a:r>
+            <a:r>
+              <a:rPr lang="en-US" dirty="0">
+                <a:solidFill>
+                  <a:srgbClr val="000000"/>
+                </a:solidFill>
+                <a:latin typeface="Courier New" panose="02070309020205020404" pitchFamily="49" charset="0"/>
+              </a:rPr>
+              <a:t> </a:t>
+            </a:r>
+            <a:endParaRPr lang="en-US" dirty="0" smtClean="0">
+              <a:solidFill>
+                <a:srgbClr val="000000"/>
+              </a:solidFill>
+              <a:latin typeface="Courier New" panose="02070309020205020404" pitchFamily="49" charset="0"/>
+            </a:endParaRPr>
+          </a:p>
+          <a:p>
+            <a:r>
+              <a:rPr lang="en-US" dirty="0">
+                <a:solidFill>
+                  <a:srgbClr val="000000"/>
+                </a:solidFill>
+                <a:latin typeface="Courier New" panose="02070309020205020404" pitchFamily="49" charset="0"/>
+              </a:rPr>
+              <a:t> </a:t>
+            </a:r>
+            <a:r>
+              <a:rPr lang="en-US" dirty="0" smtClean="0">
+                <a:solidFill>
+                  <a:srgbClr val="000000"/>
+                </a:solidFill>
+                <a:latin typeface="Courier New" panose="02070309020205020404" pitchFamily="49" charset="0"/>
+              </a:rPr>
+              <a:t>   </a:t>
+            </a:r>
+            <a:r>
+              <a:rPr lang="en-US" dirty="0" smtClean="0">
+                <a:solidFill>
+                  <a:srgbClr val="8000FF"/>
+                </a:solidFill>
+                <a:latin typeface="Courier New" panose="02070309020205020404" pitchFamily="49" charset="0"/>
+              </a:rPr>
+              <a:t>void</a:t>
+            </a:r>
+            <a:r>
+              <a:rPr lang="en-US" dirty="0" smtClean="0">
+                <a:solidFill>
+                  <a:srgbClr val="000000"/>
+                </a:solidFill>
+                <a:latin typeface="Courier New" panose="02070309020205020404" pitchFamily="49" charset="0"/>
+              </a:rPr>
+              <a:t> </a:t>
+            </a:r>
+            <a:r>
+              <a:rPr lang="en-US" dirty="0" err="1">
+                <a:solidFill>
+                  <a:srgbClr val="000000"/>
+                </a:solidFill>
+                <a:latin typeface="Courier New" panose="02070309020205020404" pitchFamily="49" charset="0"/>
+              </a:rPr>
+              <a:t>closeIt</a:t>
+            </a:r>
+            <a:r>
+              <a:rPr lang="en-US" b="1" dirty="0">
+                <a:solidFill>
+                  <a:srgbClr val="000080"/>
+                </a:solidFill>
+                <a:latin typeface="Courier New" panose="02070309020205020404" pitchFamily="49" charset="0"/>
+              </a:rPr>
+              <a:t>()</a:t>
+            </a:r>
+            <a:r>
+              <a:rPr lang="en-US" dirty="0">
+                <a:solidFill>
+                  <a:srgbClr val="000000"/>
+                </a:solidFill>
+                <a:latin typeface="Courier New" panose="02070309020205020404" pitchFamily="49" charset="0"/>
+              </a:rPr>
+              <a:t> </a:t>
+            </a:r>
+            <a:r>
+              <a:rPr lang="en-US" b="1" dirty="0">
+                <a:solidFill>
+                  <a:srgbClr val="0000FF"/>
+                </a:solidFill>
+                <a:latin typeface="Courier New" panose="02070309020205020404" pitchFamily="49" charset="0"/>
+              </a:rPr>
+              <a:t>throws</a:t>
+            </a:r>
+            <a:r>
+              <a:rPr lang="en-US" dirty="0">
+                <a:solidFill>
+                  <a:srgbClr val="000000"/>
+                </a:solidFill>
+                <a:latin typeface="Courier New" panose="02070309020205020404" pitchFamily="49" charset="0"/>
+              </a:rPr>
+              <a:t> E</a:t>
+            </a:r>
+            <a:r>
+              <a:rPr lang="en-US" b="1" dirty="0">
+                <a:solidFill>
+                  <a:srgbClr val="000080"/>
+                </a:solidFill>
+                <a:latin typeface="Courier New" panose="02070309020205020404" pitchFamily="49" charset="0"/>
+              </a:rPr>
+              <a:t>;</a:t>
+            </a:r>
+            <a:r>
+              <a:rPr lang="en-US" dirty="0">
+                <a:solidFill>
+                  <a:srgbClr val="000000"/>
+                </a:solidFill>
+                <a:latin typeface="Courier New" panose="02070309020205020404" pitchFamily="49" charset="0"/>
+              </a:rPr>
+              <a:t> </a:t>
+            </a:r>
+            <a:endParaRPr lang="en-US" dirty="0" smtClean="0">
+              <a:solidFill>
+                <a:srgbClr val="000000"/>
+              </a:solidFill>
+              <a:latin typeface="Courier New" panose="02070309020205020404" pitchFamily="49" charset="0"/>
+            </a:endParaRPr>
+          </a:p>
+          <a:p>
+            <a:r>
+              <a:rPr lang="en-US" b="1" dirty="0" smtClean="0">
+                <a:solidFill>
+                  <a:srgbClr val="000080"/>
+                </a:solidFill>
+                <a:latin typeface="Courier New" panose="02070309020205020404" pitchFamily="49" charset="0"/>
+              </a:rPr>
+              <a:t>}</a:t>
+            </a:r>
+          </a:p>
+          <a:p>
+            <a:r>
+              <a:rPr lang="en-US" dirty="0" smtClean="0"/>
+              <a:t>The default </a:t>
+            </a:r>
+            <a:r>
+              <a:rPr lang="en-US" dirty="0">
+                <a:solidFill>
+                  <a:srgbClr val="000000"/>
+                </a:solidFill>
+                <a:latin typeface="Courier New" panose="02070309020205020404" pitchFamily="49" charset="0"/>
+              </a:rPr>
+              <a:t>close</a:t>
+            </a:r>
+            <a:r>
+              <a:rPr lang="en-US" b="1" dirty="0" smtClean="0">
+                <a:solidFill>
+                  <a:srgbClr val="000080"/>
+                </a:solidFill>
+                <a:latin typeface="Courier New" panose="02070309020205020404" pitchFamily="49" charset="0"/>
+              </a:rPr>
+              <a:t>()</a:t>
+            </a:r>
+            <a:r>
+              <a:rPr lang="en-US" dirty="0" smtClean="0"/>
+              <a:t> method is necessary because applying the generic directly to </a:t>
+            </a:r>
+            <a:r>
+              <a:rPr lang="en-US" dirty="0">
+                <a:solidFill>
+                  <a:srgbClr val="000000"/>
+                </a:solidFill>
+                <a:latin typeface="Courier New" panose="02070309020205020404" pitchFamily="49" charset="0"/>
+              </a:rPr>
+              <a:t>close</a:t>
+            </a:r>
+            <a:r>
+              <a:rPr lang="en-US" b="1" dirty="0">
+                <a:solidFill>
+                  <a:srgbClr val="000080"/>
+                </a:solidFill>
+                <a:latin typeface="Courier New" panose="02070309020205020404" pitchFamily="49" charset="0"/>
+              </a:rPr>
+              <a:t>()</a:t>
+            </a:r>
+            <a:r>
+              <a:rPr lang="en-US" dirty="0" smtClean="0"/>
+              <a:t> results in a compiler error.</a:t>
+            </a:r>
+          </a:p>
+          <a:p>
+            <a:endParaRPr lang="en-US" dirty="0"/>
+          </a:p>
+          <a:p>
+            <a:endParaRPr lang="en-US" dirty="0"/>
           </a:p>
         </p:txBody>
       </p:sp>
     </p:spTree>
     <p:extLst>
       <p:ext uri="{BB962C8B-B14F-4D97-AF65-F5344CB8AC3E}">
-        <p14:creationId xmlns:p14="http://schemas.microsoft.com/office/powerpoint/2010/main" val="2796562128"/>
+        <p14:creationId xmlns:p14="http://schemas.microsoft.com/office/powerpoint/2010/main" val="1855624838"/>
       </p:ext>
     </p:extLst>
   </p:cSld>
   <p:clrMapOvr>
     <a:masterClrMapping/>
   </p:clrMapOvr>
+  <p:timing>
+    <p:tnLst>
+      <p:par>
+        <p:cTn id="1" dur="indefinite" restart="never" nodeType="tmRoot"/>
+      </p:par>
+    </p:tnLst>
+  </p:timing>
 </p:sld>
 </file>
 
@@ -29723,491 +30255,10 @@
             <p:ph type="title"/>
           </p:nvPr>
         </p:nvSpPr>
-        <p:spPr/>
-        <p:txBody>
-          <a:bodyPr/>
-          <a:lstStyle/>
-          <a:p>
-            <a:r>
-              <a:rPr lang="en-US" dirty="0" smtClean="0"/>
-              <a:t>Not Closed Exception Class</a:t>
-            </a:r>
-            <a:endParaRPr lang="en-US" dirty="0"/>
-          </a:p>
-        </p:txBody>
-      </p:sp>
-      <p:sp>
-        <p:nvSpPr>
-          <p:cNvPr id="3" name="Content Placeholder 2"/>
-          <p:cNvSpPr>
-            <a:spLocks noGrp="1"/>
-          </p:cNvSpPr>
-          <p:nvPr>
-            <p:ph idx="1"/>
-          </p:nvPr>
-        </p:nvSpPr>
-        <p:spPr/>
-        <p:txBody>
-          <a:bodyPr/>
-          <a:lstStyle/>
-          <a:p>
-            <a:r>
-              <a:rPr lang="en-US" sz="3200" dirty="0"/>
-              <a:t>If we have:</a:t>
-            </a:r>
-            <a:endParaRPr lang="en-US" sz="3200" dirty="0">
-              <a:solidFill>
-                <a:srgbClr val="8000FF"/>
-              </a:solidFill>
-              <a:highlight>
-                <a:srgbClr val="FFFFFF"/>
-              </a:highlight>
-              <a:latin typeface="Courier New" panose="02070309020205020404" pitchFamily="49" charset="0"/>
-            </a:endParaRPr>
-          </a:p>
-          <a:p>
-            <a:r>
-              <a:rPr lang="en-US" dirty="0">
-                <a:solidFill>
-                  <a:srgbClr val="8000FF"/>
-                </a:solidFill>
-                <a:highlight>
-                  <a:srgbClr val="FFFFFF"/>
-                </a:highlight>
-                <a:latin typeface="Courier New" panose="02070309020205020404" pitchFamily="49" charset="0"/>
-              </a:rPr>
-              <a:t>public</a:t>
-            </a:r>
-            <a:r>
-              <a:rPr lang="en-US" dirty="0">
-                <a:solidFill>
-                  <a:srgbClr val="000000"/>
-                </a:solidFill>
-                <a:highlight>
-                  <a:srgbClr val="FFFFFF"/>
-                </a:highlight>
-                <a:latin typeface="Courier New" panose="02070309020205020404" pitchFamily="49" charset="0"/>
-              </a:rPr>
-              <a:t> </a:t>
-            </a:r>
-            <a:r>
-              <a:rPr lang="en-US" dirty="0">
-                <a:solidFill>
-                  <a:srgbClr val="8000FF"/>
-                </a:solidFill>
-                <a:highlight>
-                  <a:srgbClr val="FFFFFF"/>
-                </a:highlight>
-                <a:latin typeface="Courier New" panose="02070309020205020404" pitchFamily="49" charset="0"/>
-              </a:rPr>
-              <a:t>final</a:t>
-            </a:r>
-            <a:r>
-              <a:rPr lang="en-US" dirty="0">
-                <a:solidFill>
-                  <a:srgbClr val="000000"/>
-                </a:solidFill>
-                <a:highlight>
-                  <a:srgbClr val="FFFFFF"/>
-                </a:highlight>
-                <a:latin typeface="Courier New" panose="02070309020205020404" pitchFamily="49" charset="0"/>
-              </a:rPr>
-              <a:t> </a:t>
-            </a:r>
-            <a:r>
-              <a:rPr lang="en-US" dirty="0">
-                <a:solidFill>
-                  <a:srgbClr val="8000FF"/>
-                </a:solidFill>
-                <a:highlight>
-                  <a:srgbClr val="FFFFFF"/>
-                </a:highlight>
-                <a:latin typeface="Courier New" panose="02070309020205020404" pitchFamily="49" charset="0"/>
-              </a:rPr>
-              <a:t>class</a:t>
-            </a:r>
-            <a:r>
-              <a:rPr lang="en-US" dirty="0">
-                <a:solidFill>
-                  <a:srgbClr val="000000"/>
-                </a:solidFill>
-                <a:highlight>
-                  <a:srgbClr val="FFFFFF"/>
-                </a:highlight>
-                <a:latin typeface="Courier New" panose="02070309020205020404" pitchFamily="49" charset="0"/>
-              </a:rPr>
-              <a:t> </a:t>
-            </a:r>
-            <a:r>
-              <a:rPr lang="en-US" dirty="0" err="1">
-                <a:solidFill>
-                  <a:srgbClr val="000000"/>
-                </a:solidFill>
-                <a:highlight>
-                  <a:srgbClr val="FFFFFF"/>
-                </a:highlight>
-                <a:latin typeface="Courier New" panose="02070309020205020404" pitchFamily="49" charset="0"/>
-              </a:rPr>
-              <a:t>NotClosedException</a:t>
-            </a:r>
-            <a:r>
-              <a:rPr lang="en-US" dirty="0">
-                <a:solidFill>
-                  <a:srgbClr val="000000"/>
-                </a:solidFill>
-                <a:highlight>
-                  <a:srgbClr val="FFFFFF"/>
-                </a:highlight>
-                <a:latin typeface="Courier New" panose="02070309020205020404" pitchFamily="49" charset="0"/>
-              </a:rPr>
-              <a:t> </a:t>
-            </a:r>
-            <a:r>
-              <a:rPr lang="en-US" b="1" dirty="0">
-                <a:solidFill>
-                  <a:srgbClr val="0000FF"/>
-                </a:solidFill>
-                <a:highlight>
-                  <a:srgbClr val="FFFFFF"/>
-                </a:highlight>
-                <a:latin typeface="Courier New" panose="02070309020205020404" pitchFamily="49" charset="0"/>
-              </a:rPr>
-              <a:t>extends</a:t>
-            </a:r>
-            <a:r>
-              <a:rPr lang="en-US" dirty="0">
-                <a:solidFill>
-                  <a:srgbClr val="000000"/>
-                </a:solidFill>
-                <a:highlight>
-                  <a:srgbClr val="FFFFFF"/>
-                </a:highlight>
-                <a:latin typeface="Courier New" panose="02070309020205020404" pitchFamily="49" charset="0"/>
-              </a:rPr>
-              <a:t> </a:t>
-            </a:r>
-            <a:r>
-              <a:rPr lang="en-US" dirty="0" err="1">
-                <a:solidFill>
-                  <a:srgbClr val="000000"/>
-                </a:solidFill>
-                <a:highlight>
-                  <a:srgbClr val="FFFFFF"/>
-                </a:highlight>
-                <a:latin typeface="Courier New" panose="02070309020205020404" pitchFamily="49" charset="0"/>
-              </a:rPr>
-              <a:t>IllegalStateException</a:t>
-            </a:r>
-            <a:r>
-              <a:rPr lang="en-US" dirty="0">
-                <a:solidFill>
-                  <a:srgbClr val="000000"/>
-                </a:solidFill>
-                <a:highlight>
-                  <a:srgbClr val="FFFFFF"/>
-                </a:highlight>
-                <a:latin typeface="Courier New" panose="02070309020205020404" pitchFamily="49" charset="0"/>
-              </a:rPr>
-              <a:t> </a:t>
-            </a:r>
-            <a:r>
-              <a:rPr lang="en-US" b="1" dirty="0">
-                <a:solidFill>
-                  <a:srgbClr val="000080"/>
-                </a:solidFill>
-                <a:highlight>
-                  <a:srgbClr val="FFFFFF"/>
-                </a:highlight>
-                <a:latin typeface="Courier New" panose="02070309020205020404" pitchFamily="49" charset="0"/>
-              </a:rPr>
-              <a:t>{</a:t>
-            </a:r>
-            <a:endParaRPr lang="en-US" dirty="0">
-              <a:solidFill>
-                <a:srgbClr val="000000"/>
-              </a:solidFill>
-              <a:highlight>
-                <a:srgbClr val="FFFFFF"/>
-              </a:highlight>
-              <a:latin typeface="Courier New" panose="02070309020205020404" pitchFamily="49" charset="0"/>
-            </a:endParaRPr>
-          </a:p>
-          <a:p>
-            <a:r>
-              <a:rPr lang="en-US" dirty="0">
-                <a:solidFill>
-                  <a:srgbClr val="000000"/>
-                </a:solidFill>
-                <a:highlight>
-                  <a:srgbClr val="FFFFFF"/>
-                </a:highlight>
-                <a:latin typeface="Courier New" panose="02070309020205020404" pitchFamily="49" charset="0"/>
-              </a:rPr>
-              <a:t>    </a:t>
-            </a:r>
-            <a:r>
-              <a:rPr lang="en-US" dirty="0" err="1">
-                <a:solidFill>
-                  <a:srgbClr val="000000"/>
-                </a:solidFill>
-                <a:highlight>
-                  <a:srgbClr val="FFFFFF"/>
-                </a:highlight>
-                <a:latin typeface="Courier New" panose="02070309020205020404" pitchFamily="49" charset="0"/>
-              </a:rPr>
-              <a:t>NotClosedException</a:t>
-            </a:r>
-            <a:r>
-              <a:rPr lang="en-US" b="1" dirty="0">
-                <a:solidFill>
-                  <a:srgbClr val="000080"/>
-                </a:solidFill>
-                <a:highlight>
-                  <a:srgbClr val="FFFFFF"/>
-                </a:highlight>
-                <a:latin typeface="Courier New" panose="02070309020205020404" pitchFamily="49" charset="0"/>
-              </a:rPr>
-              <a:t>(</a:t>
-            </a:r>
-            <a:r>
-              <a:rPr lang="en-US" dirty="0" err="1">
-                <a:solidFill>
-                  <a:srgbClr val="000000"/>
-                </a:solidFill>
-                <a:highlight>
-                  <a:srgbClr val="FFFFFF"/>
-                </a:highlight>
-                <a:latin typeface="Courier New" panose="02070309020205020404" pitchFamily="49" charset="0"/>
-              </a:rPr>
-              <a:t>Throwable</a:t>
-            </a:r>
-            <a:r>
-              <a:rPr lang="en-US" dirty="0">
-                <a:solidFill>
-                  <a:srgbClr val="000000"/>
-                </a:solidFill>
-                <a:highlight>
-                  <a:srgbClr val="FFFFFF"/>
-                </a:highlight>
-                <a:latin typeface="Courier New" panose="02070309020205020404" pitchFamily="49" charset="0"/>
-              </a:rPr>
-              <a:t> cause</a:t>
-            </a:r>
-            <a:r>
-              <a:rPr lang="en-US" b="1" dirty="0">
-                <a:solidFill>
-                  <a:srgbClr val="000080"/>
-                </a:solidFill>
-                <a:highlight>
-                  <a:srgbClr val="FFFFFF"/>
-                </a:highlight>
-                <a:latin typeface="Courier New" panose="02070309020205020404" pitchFamily="49" charset="0"/>
-              </a:rPr>
-              <a:t>)</a:t>
-            </a:r>
-            <a:r>
-              <a:rPr lang="en-US" dirty="0">
-                <a:solidFill>
-                  <a:srgbClr val="000000"/>
-                </a:solidFill>
-                <a:highlight>
-                  <a:srgbClr val="FFFFFF"/>
-                </a:highlight>
-                <a:latin typeface="Courier New" panose="02070309020205020404" pitchFamily="49" charset="0"/>
-              </a:rPr>
-              <a:t> </a:t>
-            </a:r>
-            <a:r>
-              <a:rPr lang="en-US" b="1" dirty="0">
-                <a:solidFill>
-                  <a:srgbClr val="000080"/>
-                </a:solidFill>
-                <a:highlight>
-                  <a:srgbClr val="FFFFFF"/>
-                </a:highlight>
-                <a:latin typeface="Courier New" panose="02070309020205020404" pitchFamily="49" charset="0"/>
-              </a:rPr>
-              <a:t>{</a:t>
-            </a:r>
-            <a:endParaRPr lang="en-US" dirty="0">
-              <a:solidFill>
-                <a:srgbClr val="000000"/>
-              </a:solidFill>
-              <a:highlight>
-                <a:srgbClr val="FFFFFF"/>
-              </a:highlight>
-              <a:latin typeface="Courier New" panose="02070309020205020404" pitchFamily="49" charset="0"/>
-            </a:endParaRPr>
-          </a:p>
-          <a:p>
-            <a:r>
-              <a:rPr lang="en-US" dirty="0">
-                <a:solidFill>
-                  <a:srgbClr val="000000"/>
-                </a:solidFill>
-                <a:highlight>
-                  <a:srgbClr val="FFFFFF"/>
-                </a:highlight>
-                <a:latin typeface="Courier New" panose="02070309020205020404" pitchFamily="49" charset="0"/>
-              </a:rPr>
-              <a:t>        </a:t>
-            </a:r>
-            <a:r>
-              <a:rPr lang="en-US" b="1" dirty="0">
-                <a:solidFill>
-                  <a:srgbClr val="0000FF"/>
-                </a:solidFill>
-                <a:highlight>
-                  <a:srgbClr val="FFFFFF"/>
-                </a:highlight>
-                <a:latin typeface="Courier New" panose="02070309020205020404" pitchFamily="49" charset="0"/>
-              </a:rPr>
-              <a:t>super</a:t>
-            </a:r>
-            <a:r>
-              <a:rPr lang="en-US" b="1" dirty="0">
-                <a:solidFill>
-                  <a:srgbClr val="000080"/>
-                </a:solidFill>
-                <a:highlight>
-                  <a:srgbClr val="FFFFFF"/>
-                </a:highlight>
-                <a:latin typeface="Courier New" panose="02070309020205020404" pitchFamily="49" charset="0"/>
-              </a:rPr>
-              <a:t>(</a:t>
-            </a:r>
-            <a:r>
-              <a:rPr lang="en-US" dirty="0">
-                <a:solidFill>
-                  <a:srgbClr val="000000"/>
-                </a:solidFill>
-                <a:highlight>
-                  <a:srgbClr val="FFFFFF"/>
-                </a:highlight>
-                <a:latin typeface="Courier New" panose="02070309020205020404" pitchFamily="49" charset="0"/>
-              </a:rPr>
-              <a:t>cause</a:t>
-            </a:r>
-            <a:r>
-              <a:rPr lang="en-US" b="1" dirty="0">
-                <a:solidFill>
-                  <a:srgbClr val="000080"/>
-                </a:solidFill>
-                <a:highlight>
-                  <a:srgbClr val="FFFFFF"/>
-                </a:highlight>
-                <a:latin typeface="Courier New" panose="02070309020205020404" pitchFamily="49" charset="0"/>
-              </a:rPr>
-              <a:t>);</a:t>
-            </a:r>
-            <a:endParaRPr lang="en-US" dirty="0">
-              <a:solidFill>
-                <a:srgbClr val="000000"/>
-              </a:solidFill>
-              <a:highlight>
-                <a:srgbClr val="FFFFFF"/>
-              </a:highlight>
-              <a:latin typeface="Courier New" panose="02070309020205020404" pitchFamily="49" charset="0"/>
-            </a:endParaRPr>
-          </a:p>
-          <a:p>
-            <a:r>
-              <a:rPr lang="en-US" dirty="0">
-                <a:solidFill>
-                  <a:srgbClr val="000000"/>
-                </a:solidFill>
-                <a:highlight>
-                  <a:srgbClr val="FFFFFF"/>
-                </a:highlight>
-                <a:latin typeface="Courier New" panose="02070309020205020404" pitchFamily="49" charset="0"/>
-              </a:rPr>
-              <a:t>    </a:t>
-            </a:r>
-            <a:r>
-              <a:rPr lang="en-US" b="1" dirty="0">
-                <a:solidFill>
-                  <a:srgbClr val="000080"/>
-                </a:solidFill>
-                <a:highlight>
-                  <a:srgbClr val="FFFFFF"/>
-                </a:highlight>
-                <a:latin typeface="Courier New" panose="02070309020205020404" pitchFamily="49" charset="0"/>
-              </a:rPr>
-              <a:t>}</a:t>
-            </a:r>
-            <a:r>
-              <a:rPr lang="en-US" dirty="0">
-                <a:solidFill>
-                  <a:srgbClr val="000000"/>
-                </a:solidFill>
-                <a:highlight>
-                  <a:srgbClr val="FFFFFF"/>
-                </a:highlight>
-                <a:latin typeface="Courier New" panose="02070309020205020404" pitchFamily="49" charset="0"/>
-              </a:rPr>
-              <a:t>    </a:t>
-            </a:r>
-          </a:p>
-          <a:p>
-            <a:r>
-              <a:rPr lang="en-US" b="1" dirty="0">
-                <a:solidFill>
-                  <a:srgbClr val="000080"/>
-                </a:solidFill>
-                <a:highlight>
-                  <a:srgbClr val="FFFFFF"/>
-                </a:highlight>
-                <a:latin typeface="Courier New" panose="02070309020205020404" pitchFamily="49" charset="0"/>
-              </a:rPr>
-              <a:t>}</a:t>
-            </a:r>
-          </a:p>
-        </p:txBody>
-      </p:sp>
-    </p:spTree>
-    <p:extLst>
-      <p:ext uri="{BB962C8B-B14F-4D97-AF65-F5344CB8AC3E}">
-        <p14:creationId xmlns:p14="http://schemas.microsoft.com/office/powerpoint/2010/main" val="316432004"/>
-      </p:ext>
-    </p:extLst>
-  </p:cSld>
-  <p:clrMapOvr>
-    <a:masterClrMapping/>
-  </p:clrMapOvr>
-</p:sld>
-</file>
-
-<file path=ppt/slides/slide45.xml><?xml version="1.0" encoding="utf-8"?>
-<p:sld xmlns:a="http://schemas.openxmlformats.org/drawingml/2006/main" xmlns:r="http://schemas.openxmlformats.org/officeDocument/2006/relationships" xmlns:p="http://schemas.openxmlformats.org/presentationml/2006/main">
-  <p:cSld>
-    <p:spTree>
-      <p:nvGrpSpPr>
-        <p:cNvPr id="1" name=""/>
-        <p:cNvGrpSpPr/>
-        <p:nvPr/>
-      </p:nvGrpSpPr>
-      <p:grpSpPr>
-        <a:xfrm>
-          <a:off x="0" y="0"/>
-          <a:ext cx="0" cy="0"/>
-          <a:chOff x="0" y="0"/>
-          <a:chExt cx="0" cy="0"/>
-        </a:xfrm>
-      </p:grpSpPr>
-      <p:sp>
-        <p:nvSpPr>
-          <p:cNvPr id="2" name="Title 1"/>
-          <p:cNvSpPr>
-            <a:spLocks noGrp="1"/>
-          </p:cNvSpPr>
-          <p:nvPr>
-            <p:ph type="title"/>
-          </p:nvPr>
-        </p:nvSpPr>
         <p:spPr>
           <a:xfrm>
-            <a:off x="677334" y="466724"/>
-            <a:ext cx="8596668" cy="642938"/>
+            <a:off x="677334" y="428625"/>
+            <a:ext cx="8596668" cy="1501775"/>
           </a:xfrm>
         </p:spPr>
         <p:txBody>
@@ -30215,12 +30266,16 @@
           <a:lstStyle/>
           <a:p>
             <a:r>
+              <a:rPr lang="en-US" dirty="0" smtClean="0"/>
+              <a:t>The </a:t>
+            </a:r>
+            <a:r>
               <a:rPr lang="en-US" dirty="0" err="1" smtClean="0"/>
-              <a:t>AutoCloseable</a:t>
+              <a:t>CloseIt</a:t>
             </a:r>
             <a:r>
               <a:rPr lang="en-US" dirty="0" smtClean="0"/>
-              <a:t> Decorator Factory Method</a:t>
+              <a:t> Project</a:t>
             </a:r>
             <a:endParaRPr lang="en-US" dirty="0"/>
           </a:p>
@@ -30238,1895 +30293,154 @@
         </p:nvSpPr>
         <p:spPr>
           <a:xfrm>
-            <a:off x="677334" y="1109662"/>
-            <a:ext cx="8596668" cy="5391152"/>
+            <a:off x="677334" y="1104900"/>
+            <a:ext cx="8596668" cy="5076825"/>
           </a:xfrm>
         </p:spPr>
         <p:txBody>
           <a:bodyPr>
-            <a:normAutofit/>
+            <a:normAutofit fontScale="92500" lnSpcReduction="10000"/>
           </a:bodyPr>
           <a:lstStyle/>
           <a:p>
             <a:r>
-              <a:rPr lang="en-US" sz="2400" dirty="0" smtClean="0"/>
-              <a:t>And we have:</a:t>
-            </a:r>
-            <a:endParaRPr lang="en-US" sz="2400" dirty="0" smtClean="0">
-              <a:solidFill>
-                <a:srgbClr val="8000FF"/>
-              </a:solidFill>
-              <a:highlight>
-                <a:srgbClr val="FFFFFF"/>
-              </a:highlight>
-              <a:latin typeface="Courier New" panose="02070309020205020404" pitchFamily="49" charset="0"/>
-            </a:endParaRPr>
-          </a:p>
-          <a:p>
+              <a:rPr lang="en-US" dirty="0" smtClean="0"/>
+              <a:t>Provides generic functional interfaces to use as the target of try-with-resources statements.  Supports 0-5 checked exceptions.</a:t>
+            </a:r>
+          </a:p>
+          <a:p>
+            <a:r>
+              <a:rPr lang="en-US" dirty="0" smtClean="0"/>
+              <a:t>Provides decorators (</a:t>
+            </a:r>
+            <a:r>
+              <a:rPr lang="en-US" dirty="0">
+                <a:hlinkClick r:id="rId2"/>
+              </a:rPr>
+              <a:t>https://</a:t>
+            </a:r>
             <a:r>
               <a:rPr lang="en-US" dirty="0" smtClean="0">
-                <a:solidFill>
-                  <a:srgbClr val="8000FF"/>
-                </a:solidFill>
-                <a:highlight>
-                  <a:srgbClr val="FFFFFF"/>
-                </a:highlight>
-                <a:latin typeface="Courier New" panose="02070309020205020404" pitchFamily="49" charset="0"/>
-              </a:rPr>
-              <a:t>public static</a:t>
+                <a:hlinkClick r:id="rId2"/>
+              </a:rPr>
+              <a:t>en.wikipedia.org/wiki/Decorator_pattern</a:t>
+            </a:r>
+            <a:r>
+              <a:rPr lang="en-US" dirty="0" smtClean="0"/>
+              <a:t>) for the </a:t>
+            </a:r>
+            <a:r>
+              <a:rPr lang="en-US" dirty="0" err="1" smtClean="0"/>
+              <a:t>AutoClosable</a:t>
+            </a:r>
+            <a:r>
+              <a:rPr lang="en-US" dirty="0" smtClean="0"/>
+              <a:t> to assist with handling exceptions in the close method:</a:t>
+            </a:r>
+          </a:p>
+          <a:p>
+            <a:pPr lvl="1"/>
+            <a:r>
+              <a:rPr lang="en-US" dirty="0" smtClean="0"/>
+              <a:t>Ignore – Pretend the exception never happened.  Discard it.</a:t>
+            </a:r>
+          </a:p>
+          <a:p>
+            <a:pPr lvl="1"/>
+            <a:r>
+              <a:rPr lang="en-US" dirty="0" smtClean="0"/>
+              <a:t>Consume – Do something with the exception, such as log it, and then discard it.</a:t>
+            </a:r>
+          </a:p>
+          <a:p>
+            <a:pPr lvl="1"/>
+            <a:r>
+              <a:rPr lang="en-US" dirty="0" smtClean="0"/>
+              <a:t>Hide – Hide a checked exception from the compiler but throw it anyway.</a:t>
+            </a:r>
+          </a:p>
+          <a:p>
+            <a:pPr lvl="1"/>
+            <a:r>
+              <a:rPr lang="en-US" dirty="0" smtClean="0"/>
+              <a:t>Wrap – Wrap the exception within another exception of a different type.</a:t>
+            </a:r>
+          </a:p>
+          <a:p>
+            <a:pPr lvl="2"/>
+            <a:r>
+              <a:rPr lang="en-US" dirty="0" smtClean="0"/>
+              <a:t>A safer alternative to hide for dispensing with unwanted checked exceptions.</a:t>
+            </a:r>
+          </a:p>
+          <a:p>
+            <a:pPr lvl="2"/>
+            <a:r>
+              <a:rPr lang="en-US" dirty="0" smtClean="0"/>
+              <a:t>Wrapping allows an exception originating within the close method to be caught separately from exceptions originating within the try-with-resources body.</a:t>
+            </a:r>
+          </a:p>
+          <a:p>
+            <a:r>
+              <a:rPr lang="en-US" dirty="0" smtClean="0"/>
+              <a:t>Allows try-with-resources for each resource to become a replacement for the problematic try-finally construct for cleaning up resources.</a:t>
+            </a:r>
+          </a:p>
+          <a:p>
+            <a:r>
+              <a:rPr lang="en-US" dirty="0" smtClean="0"/>
+              <a:t>Published on Maven Central as </a:t>
+            </a:r>
+            <a:r>
+              <a:rPr lang="en-US" dirty="0"/>
+              <a:t>com.github.richardroda.util:closeit:1.4</a:t>
+            </a:r>
+          </a:p>
+          <a:p>
+            <a:r>
+              <a:rPr lang="en-US" dirty="0" smtClean="0"/>
+              <a:t>Usage guide and source code on GitHub at: </a:t>
+            </a:r>
+            <a:r>
+              <a:rPr lang="en-US" dirty="0">
+                <a:hlinkClick r:id="rId3"/>
+              </a:rPr>
+              <a:t>https://</a:t>
             </a:r>
             <a:r>
               <a:rPr lang="en-US" dirty="0" smtClean="0">
-                <a:solidFill>
-                  <a:srgbClr val="000000"/>
-                </a:solidFill>
-                <a:highlight>
-                  <a:srgbClr val="FFFFFF"/>
-                </a:highlight>
-                <a:latin typeface="Courier New" panose="02070309020205020404" pitchFamily="49" charset="0"/>
-              </a:rPr>
-              <a:t> </a:t>
-            </a:r>
-            <a:r>
-              <a:rPr lang="en-US" dirty="0" err="1" smtClean="0">
-                <a:solidFill>
-                  <a:srgbClr val="000000"/>
-                </a:solidFill>
-                <a:highlight>
-                  <a:srgbClr val="FFFFFF"/>
-                </a:highlight>
-                <a:latin typeface="Courier New" panose="02070309020205020404" pitchFamily="49" charset="0"/>
-              </a:rPr>
-              <a:t>NamingClosable</a:t>
-            </a:r>
-            <a:r>
-              <a:rPr lang="en-US" dirty="0" smtClean="0">
-                <a:solidFill>
-                  <a:srgbClr val="000000"/>
-                </a:solidFill>
-                <a:highlight>
-                  <a:srgbClr val="FFFFFF"/>
-                </a:highlight>
-                <a:latin typeface="Courier New" panose="02070309020205020404" pitchFamily="49" charset="0"/>
-              </a:rPr>
-              <a:t> </a:t>
-            </a:r>
-            <a:r>
-              <a:rPr lang="en-US" dirty="0" err="1">
-                <a:solidFill>
-                  <a:srgbClr val="000000"/>
-                </a:solidFill>
-                <a:highlight>
-                  <a:srgbClr val="FFFFFF"/>
-                </a:highlight>
-                <a:latin typeface="Courier New" panose="02070309020205020404" pitchFamily="49" charset="0"/>
-              </a:rPr>
-              <a:t>wrapAllException</a:t>
-            </a:r>
-            <a:r>
-              <a:rPr lang="en-US" b="1" dirty="0">
-                <a:solidFill>
-                  <a:srgbClr val="000080"/>
-                </a:solidFill>
-                <a:highlight>
-                  <a:srgbClr val="FFFFFF"/>
-                </a:highlight>
-                <a:latin typeface="Courier New" panose="02070309020205020404" pitchFamily="49" charset="0"/>
-              </a:rPr>
-              <a:t>(</a:t>
-            </a:r>
-            <a:r>
-              <a:rPr lang="en-US" dirty="0" err="1">
-                <a:solidFill>
-                  <a:srgbClr val="000000"/>
-                </a:solidFill>
-                <a:highlight>
-                  <a:srgbClr val="FFFFFF"/>
-                </a:highlight>
-                <a:latin typeface="Courier New" panose="02070309020205020404" pitchFamily="49" charset="0"/>
-              </a:rPr>
-              <a:t>AutoCloseable</a:t>
-            </a:r>
-            <a:r>
-              <a:rPr lang="en-US" dirty="0">
-                <a:solidFill>
-                  <a:srgbClr val="000000"/>
-                </a:solidFill>
-                <a:highlight>
-                  <a:srgbClr val="FFFFFF"/>
-                </a:highlight>
-                <a:latin typeface="Courier New" panose="02070309020205020404" pitchFamily="49" charset="0"/>
-              </a:rPr>
-              <a:t> </a:t>
-            </a:r>
-            <a:r>
-              <a:rPr lang="en-US" dirty="0" err="1">
-                <a:solidFill>
-                  <a:srgbClr val="000000"/>
-                </a:solidFill>
-                <a:highlight>
-                  <a:srgbClr val="FFFFFF"/>
-                </a:highlight>
-                <a:latin typeface="Courier New" panose="02070309020205020404" pitchFamily="49" charset="0"/>
-              </a:rPr>
-              <a:t>autoCloseable</a:t>
-            </a:r>
-            <a:r>
-              <a:rPr lang="en-US" b="1" dirty="0" smtClean="0">
-                <a:solidFill>
-                  <a:srgbClr val="000080"/>
-                </a:solidFill>
-                <a:highlight>
-                  <a:srgbClr val="FFFFFF"/>
-                </a:highlight>
-                <a:latin typeface="Courier New" panose="02070309020205020404" pitchFamily="49" charset="0"/>
-              </a:rPr>
-              <a:t>)</a:t>
-            </a:r>
-            <a:r>
-              <a:rPr lang="en-US" dirty="0" smtClean="0">
-                <a:solidFill>
-                  <a:srgbClr val="000000"/>
-                </a:solidFill>
-                <a:highlight>
-                  <a:srgbClr val="FFFFFF"/>
-                </a:highlight>
-                <a:latin typeface="Courier New" panose="02070309020205020404" pitchFamily="49" charset="0"/>
-              </a:rPr>
-              <a:t> </a:t>
-            </a:r>
-            <a:r>
-              <a:rPr lang="en-US" b="1" dirty="0" smtClean="0">
-                <a:solidFill>
-                  <a:srgbClr val="000080"/>
-                </a:solidFill>
-                <a:highlight>
-                  <a:srgbClr val="FFFFFF"/>
-                </a:highlight>
-                <a:latin typeface="Courier New" panose="02070309020205020404" pitchFamily="49" charset="0"/>
-              </a:rPr>
-              <a:t>{</a:t>
-            </a:r>
-            <a:endParaRPr lang="en-US" dirty="0">
-              <a:solidFill>
-                <a:srgbClr val="000000"/>
-              </a:solidFill>
-              <a:highlight>
-                <a:srgbClr val="FFFFFF"/>
-              </a:highlight>
-              <a:latin typeface="Courier New" panose="02070309020205020404" pitchFamily="49" charset="0"/>
-            </a:endParaRPr>
-          </a:p>
-          <a:p>
-            <a:r>
-              <a:rPr lang="en-US" dirty="0">
-                <a:solidFill>
-                  <a:srgbClr val="000000"/>
-                </a:solidFill>
-                <a:highlight>
-                  <a:srgbClr val="FFFFFF"/>
-                </a:highlight>
-                <a:latin typeface="Courier New" panose="02070309020205020404" pitchFamily="49" charset="0"/>
-              </a:rPr>
-              <a:t>	</a:t>
-            </a:r>
-            <a:r>
-              <a:rPr lang="en-US" b="1" dirty="0">
-                <a:solidFill>
-                  <a:srgbClr val="0000FF"/>
-                </a:solidFill>
-                <a:highlight>
-                  <a:srgbClr val="FFFFFF"/>
-                </a:highlight>
-                <a:latin typeface="Courier New" panose="02070309020205020404" pitchFamily="49" charset="0"/>
-              </a:rPr>
-              <a:t>return</a:t>
-            </a:r>
-            <a:r>
-              <a:rPr lang="en-US" dirty="0">
-                <a:solidFill>
-                  <a:srgbClr val="000000"/>
-                </a:solidFill>
-                <a:highlight>
-                  <a:srgbClr val="FFFFFF"/>
-                </a:highlight>
-                <a:latin typeface="Courier New" panose="02070309020205020404" pitchFamily="49" charset="0"/>
-              </a:rPr>
-              <a:t> </a:t>
-            </a:r>
-            <a:r>
-              <a:rPr lang="en-US" b="1" dirty="0">
-                <a:solidFill>
-                  <a:srgbClr val="000080"/>
-                </a:solidFill>
-                <a:highlight>
-                  <a:srgbClr val="FFFFFF"/>
-                </a:highlight>
-                <a:latin typeface="Courier New" panose="02070309020205020404" pitchFamily="49" charset="0"/>
-              </a:rPr>
-              <a:t>()</a:t>
-            </a:r>
-            <a:r>
-              <a:rPr lang="en-US" dirty="0">
-                <a:solidFill>
-                  <a:srgbClr val="000000"/>
-                </a:solidFill>
-                <a:highlight>
-                  <a:srgbClr val="FFFFFF"/>
-                </a:highlight>
-                <a:latin typeface="Courier New" panose="02070309020205020404" pitchFamily="49" charset="0"/>
-              </a:rPr>
-              <a:t> </a:t>
-            </a:r>
-            <a:r>
-              <a:rPr lang="en-US" b="1" dirty="0">
-                <a:solidFill>
-                  <a:srgbClr val="000080"/>
-                </a:solidFill>
-                <a:highlight>
-                  <a:srgbClr val="FFFFFF"/>
-                </a:highlight>
-                <a:latin typeface="Courier New" panose="02070309020205020404" pitchFamily="49" charset="0"/>
-              </a:rPr>
-              <a:t>-&gt;</a:t>
-            </a:r>
-            <a:r>
-              <a:rPr lang="en-US" dirty="0">
-                <a:solidFill>
-                  <a:srgbClr val="000000"/>
-                </a:solidFill>
-                <a:highlight>
-                  <a:srgbClr val="FFFFFF"/>
-                </a:highlight>
-                <a:latin typeface="Courier New" panose="02070309020205020404" pitchFamily="49" charset="0"/>
-              </a:rPr>
-              <a:t> </a:t>
-            </a:r>
-            <a:r>
-              <a:rPr lang="en-US" b="1" dirty="0" smtClean="0">
-                <a:solidFill>
-                  <a:srgbClr val="000080"/>
-                </a:solidFill>
-                <a:highlight>
-                  <a:srgbClr val="FFFFFF"/>
-                </a:highlight>
-                <a:latin typeface="Courier New" panose="02070309020205020404" pitchFamily="49" charset="0"/>
-              </a:rPr>
-              <a:t>{</a:t>
-            </a:r>
-            <a:r>
-              <a:rPr lang="en-US" dirty="0">
-                <a:solidFill>
-                  <a:srgbClr val="008000"/>
-                </a:solidFill>
-                <a:highlight>
-                  <a:srgbClr val="FFFFFF"/>
-                </a:highlight>
-                <a:latin typeface="Courier New" panose="02070309020205020404" pitchFamily="49" charset="0"/>
-              </a:rPr>
-              <a:t>// </a:t>
-            </a:r>
-            <a:r>
-              <a:rPr lang="en-US" dirty="0" smtClean="0">
-                <a:solidFill>
-                  <a:srgbClr val="008000"/>
-                </a:solidFill>
-                <a:highlight>
-                  <a:srgbClr val="FFFFFF"/>
-                </a:highlight>
-                <a:latin typeface="Courier New" panose="02070309020205020404" pitchFamily="49" charset="0"/>
-              </a:rPr>
-              <a:t>Decorate </a:t>
-            </a:r>
-            <a:r>
-              <a:rPr lang="en-US" dirty="0" err="1" smtClean="0">
-                <a:solidFill>
-                  <a:srgbClr val="008000"/>
-                </a:solidFill>
-                <a:highlight>
-                  <a:srgbClr val="FFFFFF"/>
-                </a:highlight>
-                <a:latin typeface="Courier New" panose="02070309020205020404" pitchFamily="49" charset="0"/>
-              </a:rPr>
-              <a:t>autoCloseable</a:t>
-            </a:r>
-            <a:endParaRPr lang="en-US" dirty="0">
-              <a:solidFill>
-                <a:srgbClr val="000000"/>
-              </a:solidFill>
-              <a:highlight>
-                <a:srgbClr val="FFFFFF"/>
-              </a:highlight>
-              <a:latin typeface="Courier New" panose="02070309020205020404" pitchFamily="49" charset="0"/>
-            </a:endParaRPr>
-          </a:p>
-          <a:p>
-            <a:r>
-              <a:rPr lang="en-US" dirty="0">
-                <a:solidFill>
-                  <a:srgbClr val="000000"/>
-                </a:solidFill>
-                <a:highlight>
-                  <a:srgbClr val="FFFFFF"/>
-                </a:highlight>
-                <a:latin typeface="Courier New" panose="02070309020205020404" pitchFamily="49" charset="0"/>
-              </a:rPr>
-              <a:t>		</a:t>
-            </a:r>
-            <a:r>
-              <a:rPr lang="en-US" b="1" dirty="0">
-                <a:solidFill>
-                  <a:srgbClr val="0000FF"/>
-                </a:solidFill>
-                <a:highlight>
-                  <a:srgbClr val="FFFFFF"/>
-                </a:highlight>
-                <a:latin typeface="Courier New" panose="02070309020205020404" pitchFamily="49" charset="0"/>
-              </a:rPr>
-              <a:t>try</a:t>
-            </a:r>
-            <a:r>
-              <a:rPr lang="en-US" dirty="0">
-                <a:solidFill>
-                  <a:srgbClr val="000000"/>
-                </a:solidFill>
-                <a:highlight>
-                  <a:srgbClr val="FFFFFF"/>
-                </a:highlight>
-                <a:latin typeface="Courier New" panose="02070309020205020404" pitchFamily="49" charset="0"/>
-              </a:rPr>
-              <a:t> </a:t>
-            </a:r>
-            <a:r>
-              <a:rPr lang="en-US" b="1" dirty="0">
-                <a:solidFill>
-                  <a:srgbClr val="000080"/>
-                </a:solidFill>
-                <a:highlight>
-                  <a:srgbClr val="FFFFFF"/>
-                </a:highlight>
-                <a:latin typeface="Courier New" panose="02070309020205020404" pitchFamily="49" charset="0"/>
-              </a:rPr>
-              <a:t>{</a:t>
-            </a:r>
-            <a:endParaRPr lang="en-US" dirty="0">
-              <a:solidFill>
-                <a:srgbClr val="000000"/>
-              </a:solidFill>
-              <a:highlight>
-                <a:srgbClr val="FFFFFF"/>
-              </a:highlight>
-              <a:latin typeface="Courier New" panose="02070309020205020404" pitchFamily="49" charset="0"/>
-            </a:endParaRPr>
-          </a:p>
-          <a:p>
-            <a:r>
-              <a:rPr lang="en-US" dirty="0">
-                <a:solidFill>
-                  <a:srgbClr val="000000"/>
-                </a:solidFill>
-                <a:highlight>
-                  <a:srgbClr val="FFFFFF"/>
-                </a:highlight>
-                <a:latin typeface="Courier New" panose="02070309020205020404" pitchFamily="49" charset="0"/>
-              </a:rPr>
-              <a:t>			</a:t>
-            </a:r>
-            <a:r>
-              <a:rPr lang="en-US" dirty="0" err="1">
-                <a:solidFill>
-                  <a:srgbClr val="000000"/>
-                </a:solidFill>
-                <a:highlight>
-                  <a:srgbClr val="FFFFFF"/>
-                </a:highlight>
-                <a:latin typeface="Courier New" panose="02070309020205020404" pitchFamily="49" charset="0"/>
-              </a:rPr>
-              <a:t>autoCloseable</a:t>
-            </a:r>
-            <a:r>
-              <a:rPr lang="en-US" b="1" dirty="0" err="1">
-                <a:solidFill>
-                  <a:srgbClr val="000080"/>
-                </a:solidFill>
-                <a:highlight>
-                  <a:srgbClr val="FFFFFF"/>
-                </a:highlight>
-                <a:latin typeface="Courier New" panose="02070309020205020404" pitchFamily="49" charset="0"/>
-              </a:rPr>
-              <a:t>.</a:t>
-            </a:r>
-            <a:r>
-              <a:rPr lang="en-US" dirty="0" err="1">
-                <a:solidFill>
-                  <a:srgbClr val="000000"/>
-                </a:solidFill>
-                <a:highlight>
-                  <a:srgbClr val="FFFFFF"/>
-                </a:highlight>
-                <a:latin typeface="Courier New" panose="02070309020205020404" pitchFamily="49" charset="0"/>
-              </a:rPr>
-              <a:t>close</a:t>
-            </a:r>
-            <a:r>
-              <a:rPr lang="en-US" b="1" dirty="0">
-                <a:solidFill>
-                  <a:srgbClr val="000080"/>
-                </a:solidFill>
-                <a:highlight>
-                  <a:srgbClr val="FFFFFF"/>
-                </a:highlight>
-                <a:latin typeface="Courier New" panose="02070309020205020404" pitchFamily="49" charset="0"/>
-              </a:rPr>
-              <a:t>();</a:t>
-            </a:r>
-            <a:endParaRPr lang="en-US" dirty="0">
-              <a:solidFill>
-                <a:srgbClr val="000000"/>
-              </a:solidFill>
-              <a:highlight>
-                <a:srgbClr val="FFFFFF"/>
-              </a:highlight>
-              <a:latin typeface="Courier New" panose="02070309020205020404" pitchFamily="49" charset="0"/>
-            </a:endParaRPr>
-          </a:p>
-          <a:p>
-            <a:r>
-              <a:rPr lang="en-US" dirty="0">
-                <a:solidFill>
-                  <a:srgbClr val="000000"/>
-                </a:solidFill>
-                <a:highlight>
-                  <a:srgbClr val="FFFFFF"/>
-                </a:highlight>
-                <a:latin typeface="Courier New" panose="02070309020205020404" pitchFamily="49" charset="0"/>
-              </a:rPr>
-              <a:t>		</a:t>
-            </a:r>
-            <a:r>
-              <a:rPr lang="en-US" b="1" dirty="0">
-                <a:solidFill>
-                  <a:srgbClr val="000080"/>
-                </a:solidFill>
-                <a:highlight>
-                  <a:srgbClr val="FFFFFF"/>
-                </a:highlight>
-                <a:latin typeface="Courier New" panose="02070309020205020404" pitchFamily="49" charset="0"/>
-              </a:rPr>
-              <a:t>}</a:t>
-            </a:r>
-            <a:r>
-              <a:rPr lang="en-US" dirty="0">
-                <a:solidFill>
-                  <a:srgbClr val="000000"/>
-                </a:solidFill>
-                <a:highlight>
-                  <a:srgbClr val="FFFFFF"/>
-                </a:highlight>
-                <a:latin typeface="Courier New" panose="02070309020205020404" pitchFamily="49" charset="0"/>
-              </a:rPr>
-              <a:t> </a:t>
-            </a:r>
-            <a:r>
-              <a:rPr lang="en-US" b="1" dirty="0">
-                <a:solidFill>
-                  <a:srgbClr val="0000FF"/>
-                </a:solidFill>
-                <a:highlight>
-                  <a:srgbClr val="FFFFFF"/>
-                </a:highlight>
-                <a:latin typeface="Courier New" panose="02070309020205020404" pitchFamily="49" charset="0"/>
-              </a:rPr>
-              <a:t>catch</a:t>
-            </a:r>
-            <a:r>
-              <a:rPr lang="en-US" dirty="0">
-                <a:solidFill>
-                  <a:srgbClr val="000000"/>
-                </a:solidFill>
-                <a:highlight>
-                  <a:srgbClr val="FFFFFF"/>
-                </a:highlight>
-                <a:latin typeface="Courier New" panose="02070309020205020404" pitchFamily="49" charset="0"/>
-              </a:rPr>
-              <a:t> </a:t>
-            </a:r>
-            <a:r>
-              <a:rPr lang="en-US" b="1" dirty="0">
-                <a:solidFill>
-                  <a:srgbClr val="000080"/>
-                </a:solidFill>
-                <a:highlight>
-                  <a:srgbClr val="FFFFFF"/>
-                </a:highlight>
-                <a:latin typeface="Courier New" panose="02070309020205020404" pitchFamily="49" charset="0"/>
-              </a:rPr>
-              <a:t>(</a:t>
-            </a:r>
-            <a:r>
-              <a:rPr lang="en-US" dirty="0">
-                <a:solidFill>
-                  <a:srgbClr val="000000"/>
-                </a:solidFill>
-                <a:highlight>
-                  <a:srgbClr val="FFFFFF"/>
-                </a:highlight>
-                <a:latin typeface="Courier New" panose="02070309020205020404" pitchFamily="49" charset="0"/>
-              </a:rPr>
-              <a:t>Exception ex</a:t>
-            </a:r>
-            <a:r>
-              <a:rPr lang="en-US" b="1" dirty="0">
-                <a:solidFill>
-                  <a:srgbClr val="000080"/>
-                </a:solidFill>
-                <a:highlight>
-                  <a:srgbClr val="FFFFFF"/>
-                </a:highlight>
-                <a:latin typeface="Courier New" panose="02070309020205020404" pitchFamily="49" charset="0"/>
-              </a:rPr>
-              <a:t>)</a:t>
-            </a:r>
-            <a:r>
-              <a:rPr lang="en-US" dirty="0">
-                <a:solidFill>
-                  <a:srgbClr val="000000"/>
-                </a:solidFill>
-                <a:highlight>
-                  <a:srgbClr val="FFFFFF"/>
-                </a:highlight>
-                <a:latin typeface="Courier New" panose="02070309020205020404" pitchFamily="49" charset="0"/>
-              </a:rPr>
-              <a:t> </a:t>
-            </a:r>
-            <a:r>
-              <a:rPr lang="en-US" b="1" dirty="0">
-                <a:solidFill>
-                  <a:srgbClr val="000080"/>
-                </a:solidFill>
-                <a:highlight>
-                  <a:srgbClr val="FFFFFF"/>
-                </a:highlight>
-                <a:latin typeface="Courier New" panose="02070309020205020404" pitchFamily="49" charset="0"/>
-              </a:rPr>
-              <a:t>{</a:t>
-            </a:r>
-            <a:endParaRPr lang="en-US" dirty="0">
-              <a:solidFill>
-                <a:srgbClr val="000000"/>
-              </a:solidFill>
-              <a:highlight>
-                <a:srgbClr val="FFFFFF"/>
-              </a:highlight>
-              <a:latin typeface="Courier New" panose="02070309020205020404" pitchFamily="49" charset="0"/>
-            </a:endParaRPr>
-          </a:p>
-          <a:p>
-            <a:r>
-              <a:rPr lang="en-US" dirty="0">
-                <a:solidFill>
-                  <a:srgbClr val="000000"/>
-                </a:solidFill>
-                <a:highlight>
-                  <a:srgbClr val="FFFFFF"/>
-                </a:highlight>
-                <a:latin typeface="Courier New" panose="02070309020205020404" pitchFamily="49" charset="0"/>
-              </a:rPr>
-              <a:t>			</a:t>
-            </a:r>
-            <a:r>
-              <a:rPr lang="en-US" b="1" dirty="0">
-                <a:solidFill>
-                  <a:srgbClr val="0000FF"/>
-                </a:solidFill>
-                <a:highlight>
-                  <a:srgbClr val="FFFFFF"/>
-                </a:highlight>
-                <a:latin typeface="Courier New" panose="02070309020205020404" pitchFamily="49" charset="0"/>
-              </a:rPr>
-              <a:t>throw</a:t>
-            </a:r>
-            <a:r>
-              <a:rPr lang="en-US" dirty="0">
-                <a:solidFill>
-                  <a:srgbClr val="000000"/>
-                </a:solidFill>
-                <a:highlight>
-                  <a:srgbClr val="FFFFFF"/>
-                </a:highlight>
-                <a:latin typeface="Courier New" panose="02070309020205020404" pitchFamily="49" charset="0"/>
-              </a:rPr>
-              <a:t> </a:t>
-            </a:r>
-            <a:r>
-              <a:rPr lang="en-US" b="1" dirty="0">
-                <a:solidFill>
-                  <a:srgbClr val="0000FF"/>
-                </a:solidFill>
-                <a:highlight>
-                  <a:srgbClr val="FFFFFF"/>
-                </a:highlight>
-                <a:latin typeface="Courier New" panose="02070309020205020404" pitchFamily="49" charset="0"/>
-              </a:rPr>
-              <a:t>new</a:t>
-            </a:r>
-            <a:r>
-              <a:rPr lang="en-US" dirty="0">
-                <a:solidFill>
-                  <a:srgbClr val="000000"/>
-                </a:solidFill>
-                <a:highlight>
-                  <a:srgbClr val="FFFFFF"/>
-                </a:highlight>
-                <a:latin typeface="Courier New" panose="02070309020205020404" pitchFamily="49" charset="0"/>
-              </a:rPr>
-              <a:t> </a:t>
-            </a:r>
-            <a:r>
-              <a:rPr lang="en-US" dirty="0" err="1">
-                <a:solidFill>
-                  <a:srgbClr val="000000"/>
-                </a:solidFill>
-                <a:highlight>
-                  <a:srgbClr val="FFFFFF"/>
-                </a:highlight>
-                <a:latin typeface="Courier New" panose="02070309020205020404" pitchFamily="49" charset="0"/>
-              </a:rPr>
-              <a:t>NotClosedException</a:t>
-            </a:r>
-            <a:r>
-              <a:rPr lang="en-US" b="1" dirty="0">
-                <a:solidFill>
-                  <a:srgbClr val="000080"/>
-                </a:solidFill>
-                <a:highlight>
-                  <a:srgbClr val="FFFFFF"/>
-                </a:highlight>
-                <a:latin typeface="Courier New" panose="02070309020205020404" pitchFamily="49" charset="0"/>
-              </a:rPr>
-              <a:t>(</a:t>
-            </a:r>
-            <a:r>
-              <a:rPr lang="en-US" dirty="0">
-                <a:solidFill>
-                  <a:srgbClr val="000000"/>
-                </a:solidFill>
-                <a:highlight>
-                  <a:srgbClr val="FFFFFF"/>
-                </a:highlight>
-                <a:latin typeface="Courier New" panose="02070309020205020404" pitchFamily="49" charset="0"/>
-              </a:rPr>
-              <a:t>ex</a:t>
-            </a:r>
-            <a:r>
-              <a:rPr lang="en-US" b="1" dirty="0">
-                <a:solidFill>
-                  <a:srgbClr val="000080"/>
-                </a:solidFill>
-                <a:highlight>
-                  <a:srgbClr val="FFFFFF"/>
-                </a:highlight>
-                <a:latin typeface="Courier New" panose="02070309020205020404" pitchFamily="49" charset="0"/>
-              </a:rPr>
-              <a:t>)</a:t>
-            </a:r>
-            <a:endParaRPr lang="en-US" dirty="0">
-              <a:solidFill>
-                <a:srgbClr val="000000"/>
-              </a:solidFill>
-              <a:highlight>
-                <a:srgbClr val="FFFFFF"/>
-              </a:highlight>
-              <a:latin typeface="Courier New" panose="02070309020205020404" pitchFamily="49" charset="0"/>
-            </a:endParaRPr>
-          </a:p>
-          <a:p>
-            <a:r>
-              <a:rPr lang="en-US" dirty="0">
-                <a:solidFill>
-                  <a:srgbClr val="000000"/>
-                </a:solidFill>
-                <a:highlight>
-                  <a:srgbClr val="FFFFFF"/>
-                </a:highlight>
-                <a:latin typeface="Courier New" panose="02070309020205020404" pitchFamily="49" charset="0"/>
-              </a:rPr>
-              <a:t>		</a:t>
-            </a:r>
-            <a:r>
-              <a:rPr lang="en-US" b="1" dirty="0">
-                <a:solidFill>
-                  <a:srgbClr val="000080"/>
-                </a:solidFill>
-                <a:highlight>
-                  <a:srgbClr val="FFFFFF"/>
-                </a:highlight>
-                <a:latin typeface="Courier New" panose="02070309020205020404" pitchFamily="49" charset="0"/>
-              </a:rPr>
-              <a:t>}</a:t>
-            </a:r>
-            <a:endParaRPr lang="en-US" dirty="0">
-              <a:solidFill>
-                <a:srgbClr val="000000"/>
-              </a:solidFill>
-              <a:highlight>
-                <a:srgbClr val="FFFFFF"/>
-              </a:highlight>
-              <a:latin typeface="Courier New" panose="02070309020205020404" pitchFamily="49" charset="0"/>
-            </a:endParaRPr>
-          </a:p>
-          <a:p>
-            <a:r>
-              <a:rPr lang="en-US" dirty="0">
-                <a:solidFill>
-                  <a:srgbClr val="000000"/>
-                </a:solidFill>
-                <a:highlight>
-                  <a:srgbClr val="FFFFFF"/>
-                </a:highlight>
-                <a:latin typeface="Courier New" panose="02070309020205020404" pitchFamily="49" charset="0"/>
-              </a:rPr>
-              <a:t>	</a:t>
-            </a:r>
-            <a:r>
-              <a:rPr lang="en-US" b="1" dirty="0">
-                <a:solidFill>
-                  <a:srgbClr val="000080"/>
-                </a:solidFill>
-                <a:highlight>
-                  <a:srgbClr val="FFFFFF"/>
-                </a:highlight>
-                <a:latin typeface="Courier New" panose="02070309020205020404" pitchFamily="49" charset="0"/>
-              </a:rPr>
-              <a:t>};</a:t>
-            </a:r>
-            <a:endParaRPr lang="en-US" dirty="0">
-              <a:solidFill>
-                <a:srgbClr val="000000"/>
-              </a:solidFill>
-              <a:highlight>
-                <a:srgbClr val="FFFFFF"/>
-              </a:highlight>
-              <a:latin typeface="Courier New" panose="02070309020205020404" pitchFamily="49" charset="0"/>
-            </a:endParaRPr>
-          </a:p>
-          <a:p>
-            <a:r>
-              <a:rPr lang="en-US" b="1" dirty="0">
-                <a:solidFill>
-                  <a:srgbClr val="000080"/>
-                </a:solidFill>
-                <a:highlight>
-                  <a:srgbClr val="FFFFFF"/>
-                </a:highlight>
-                <a:latin typeface="Courier New" panose="02070309020205020404" pitchFamily="49" charset="0"/>
-              </a:rPr>
-              <a:t>}</a:t>
-            </a:r>
-            <a:r>
-              <a:rPr lang="en-US" dirty="0">
-                <a:solidFill>
-                  <a:srgbClr val="000000"/>
-                </a:solidFill>
-                <a:highlight>
-                  <a:srgbClr val="FFFFFF"/>
-                </a:highlight>
-                <a:latin typeface="Courier New" panose="02070309020205020404" pitchFamily="49" charset="0"/>
-              </a:rPr>
-              <a:t>    </a:t>
-            </a:r>
-          </a:p>
-          <a:p>
-            <a:endParaRPr lang="en-US" sz="1400" dirty="0">
-              <a:solidFill>
-                <a:srgbClr val="000000"/>
-              </a:solidFill>
-              <a:highlight>
-                <a:srgbClr val="FFFFFF"/>
-              </a:highlight>
-              <a:latin typeface="Courier New" panose="02070309020205020404" pitchFamily="49" charset="0"/>
-            </a:endParaRPr>
-          </a:p>
-          <a:p>
-            <a:endParaRPr lang="en-US" dirty="0"/>
+                <a:hlinkClick r:id="rId3"/>
+              </a:rPr>
+              <a:t>github.com/RichardRoda/closeit</a:t>
+            </a:r>
+            <a:endParaRPr lang="en-US" dirty="0" smtClean="0"/>
+          </a:p>
+          <a:p>
+            <a:endParaRPr lang="en-US" dirty="0" smtClean="0"/>
           </a:p>
         </p:txBody>
       </p:sp>
     </p:spTree>
     <p:extLst>
       <p:ext uri="{BB962C8B-B14F-4D97-AF65-F5344CB8AC3E}">
-        <p14:creationId xmlns:p14="http://schemas.microsoft.com/office/powerpoint/2010/main" val="961016585"/>
+        <p14:creationId xmlns:p14="http://schemas.microsoft.com/office/powerpoint/2010/main" val="3261860290"/>
       </p:ext>
     </p:extLst>
   </p:cSld>
   <p:clrMapOvr>
     <a:masterClrMapping/>
   </p:clrMapOvr>
+  <p:timing>
+    <p:tnLst>
+      <p:par>
+        <p:cTn id="1" dur="indefinite" restart="never" nodeType="tmRoot"/>
+      </p:par>
+    </p:tnLst>
+  </p:timing>
 </p:sld>
 </file>
 
-<file path=ppt/slides/slide46.xml><?xml version="1.0" encoding="utf-8"?>
-<p:sld xmlns:a="http://schemas.openxmlformats.org/drawingml/2006/main" xmlns:r="http://schemas.openxmlformats.org/officeDocument/2006/relationships" xmlns:p="http://schemas.openxmlformats.org/presentationml/2006/main">
-  <p:cSld>
-    <p:spTree>
-      <p:nvGrpSpPr>
-        <p:cNvPr id="1" name=""/>
-        <p:cNvGrpSpPr/>
-        <p:nvPr/>
-      </p:nvGrpSpPr>
-      <p:grpSpPr>
-        <a:xfrm>
-          <a:off x="0" y="0"/>
-          <a:ext cx="0" cy="0"/>
-          <a:chOff x="0" y="0"/>
-          <a:chExt cx="0" cy="0"/>
-        </a:xfrm>
-      </p:grpSpPr>
-      <p:sp>
-        <p:nvSpPr>
-          <p:cNvPr id="2" name="Title 1"/>
-          <p:cNvSpPr>
-            <a:spLocks noGrp="1"/>
-          </p:cNvSpPr>
-          <p:nvPr>
-            <p:ph type="title"/>
-          </p:nvPr>
-        </p:nvSpPr>
-        <p:spPr/>
-        <p:txBody>
-          <a:bodyPr/>
-          <a:lstStyle/>
-          <a:p>
-            <a:r>
-              <a:rPr lang="en-US" dirty="0" smtClean="0"/>
-              <a:t>Then We Can Catch the Close Exception</a:t>
-            </a:r>
-            <a:endParaRPr lang="en-US" dirty="0"/>
-          </a:p>
-        </p:txBody>
-      </p:sp>
-      <p:sp>
-        <p:nvSpPr>
-          <p:cNvPr id="3" name="Content Placeholder 2"/>
-          <p:cNvSpPr>
-            <a:spLocks noGrp="1"/>
-          </p:cNvSpPr>
-          <p:nvPr>
-            <p:ph idx="1"/>
-          </p:nvPr>
-        </p:nvSpPr>
-        <p:spPr>
-          <a:xfrm>
-            <a:off x="677334" y="1214438"/>
-            <a:ext cx="8596668" cy="4645949"/>
-          </a:xfrm>
-        </p:spPr>
-        <p:txBody>
-          <a:bodyPr>
-            <a:normAutofit lnSpcReduction="10000"/>
-          </a:bodyPr>
-          <a:lstStyle/>
-          <a:p>
-            <a:endParaRPr lang="en-US" dirty="0" smtClean="0"/>
-          </a:p>
-          <a:p>
-            <a:r>
-              <a:rPr lang="en-US" sz="1600" dirty="0">
-                <a:solidFill>
-                  <a:srgbClr val="8000FF"/>
-                </a:solidFill>
-                <a:highlight>
-                  <a:srgbClr val="FFFFFF"/>
-                </a:highlight>
-                <a:latin typeface="Courier New" panose="02070309020205020404" pitchFamily="49" charset="0"/>
-              </a:rPr>
-              <a:t>public</a:t>
-            </a:r>
-            <a:r>
-              <a:rPr lang="en-US" sz="1600" dirty="0">
-                <a:solidFill>
-                  <a:srgbClr val="000000"/>
-                </a:solidFill>
-                <a:highlight>
-                  <a:srgbClr val="FFFFFF"/>
-                </a:highlight>
-                <a:latin typeface="Courier New" panose="02070309020205020404" pitchFamily="49" charset="0"/>
-              </a:rPr>
-              <a:t> </a:t>
-            </a:r>
-            <a:r>
-              <a:rPr lang="en-US" sz="1600" dirty="0">
-                <a:solidFill>
-                  <a:srgbClr val="8000FF"/>
-                </a:solidFill>
-                <a:highlight>
-                  <a:srgbClr val="FFFFFF"/>
-                </a:highlight>
-                <a:latin typeface="Courier New" panose="02070309020205020404" pitchFamily="49" charset="0"/>
-              </a:rPr>
-              <a:t>void</a:t>
-            </a:r>
-            <a:r>
-              <a:rPr lang="en-US" sz="1600" dirty="0">
-                <a:solidFill>
-                  <a:srgbClr val="000000"/>
-                </a:solidFill>
-                <a:highlight>
-                  <a:srgbClr val="FFFFFF"/>
-                </a:highlight>
-                <a:latin typeface="Courier New" panose="02070309020205020404" pitchFamily="49" charset="0"/>
-              </a:rPr>
-              <a:t> </a:t>
-            </a:r>
-            <a:r>
-              <a:rPr lang="en-US" sz="1600" dirty="0" err="1">
-                <a:solidFill>
-                  <a:srgbClr val="000000"/>
-                </a:solidFill>
-                <a:highlight>
-                  <a:srgbClr val="FFFFFF"/>
-                </a:highlight>
-                <a:latin typeface="Courier New" panose="02070309020205020404" pitchFamily="49" charset="0"/>
-              </a:rPr>
-              <a:t>useContext</a:t>
-            </a:r>
-            <a:r>
-              <a:rPr lang="en-US" sz="1600" b="1" dirty="0">
-                <a:solidFill>
-                  <a:srgbClr val="000080"/>
-                </a:solidFill>
-                <a:highlight>
-                  <a:srgbClr val="FFFFFF"/>
-                </a:highlight>
-                <a:latin typeface="Courier New" panose="02070309020205020404" pitchFamily="49" charset="0"/>
-              </a:rPr>
-              <a:t>(</a:t>
-            </a:r>
-            <a:r>
-              <a:rPr lang="en-US" sz="1600" dirty="0">
-                <a:solidFill>
-                  <a:srgbClr val="000000"/>
-                </a:solidFill>
-                <a:highlight>
-                  <a:srgbClr val="FFFFFF"/>
-                </a:highlight>
-                <a:latin typeface="Courier New" panose="02070309020205020404" pitchFamily="49" charset="0"/>
-              </a:rPr>
-              <a:t>Context </a:t>
-            </a:r>
-            <a:r>
-              <a:rPr lang="en-US" sz="1600" dirty="0" err="1">
-                <a:solidFill>
-                  <a:srgbClr val="000000"/>
-                </a:solidFill>
-                <a:highlight>
-                  <a:srgbClr val="FFFFFF"/>
-                </a:highlight>
-                <a:latin typeface="Courier New" panose="02070309020205020404" pitchFamily="49" charset="0"/>
-              </a:rPr>
-              <a:t>ctx</a:t>
-            </a:r>
-            <a:r>
-              <a:rPr lang="en-US" sz="1600" b="1" dirty="0">
-                <a:solidFill>
-                  <a:srgbClr val="000080"/>
-                </a:solidFill>
-                <a:highlight>
-                  <a:srgbClr val="FFFFFF"/>
-                </a:highlight>
-                <a:latin typeface="Courier New" panose="02070309020205020404" pitchFamily="49" charset="0"/>
-              </a:rPr>
-              <a:t>)</a:t>
-            </a:r>
-            <a:r>
-              <a:rPr lang="en-US" sz="1600" dirty="0">
-                <a:solidFill>
-                  <a:srgbClr val="000000"/>
-                </a:solidFill>
-                <a:highlight>
-                  <a:srgbClr val="FFFFFF"/>
-                </a:highlight>
-                <a:latin typeface="Courier New" panose="02070309020205020404" pitchFamily="49" charset="0"/>
-              </a:rPr>
-              <a:t> </a:t>
-            </a:r>
-            <a:r>
-              <a:rPr lang="en-US" sz="1600" b="1" dirty="0">
-                <a:solidFill>
-                  <a:srgbClr val="0000FF"/>
-                </a:solidFill>
-                <a:highlight>
-                  <a:srgbClr val="FFFFFF"/>
-                </a:highlight>
-                <a:latin typeface="Courier New" panose="02070309020205020404" pitchFamily="49" charset="0"/>
-              </a:rPr>
-              <a:t>throws</a:t>
-            </a:r>
-            <a:r>
-              <a:rPr lang="en-US" sz="1600" dirty="0">
-                <a:solidFill>
-                  <a:srgbClr val="000000"/>
-                </a:solidFill>
-                <a:highlight>
-                  <a:srgbClr val="FFFFFF"/>
-                </a:highlight>
-                <a:latin typeface="Courier New" panose="02070309020205020404" pitchFamily="49" charset="0"/>
-              </a:rPr>
-              <a:t> </a:t>
-            </a:r>
-            <a:r>
-              <a:rPr lang="en-US" sz="1600" dirty="0" err="1">
-                <a:solidFill>
-                  <a:srgbClr val="000000"/>
-                </a:solidFill>
-                <a:highlight>
-                  <a:srgbClr val="FFFFFF"/>
-                </a:highlight>
-                <a:latin typeface="Courier New" panose="02070309020205020404" pitchFamily="49" charset="0"/>
-              </a:rPr>
-              <a:t>NamingException</a:t>
-            </a:r>
-            <a:r>
-              <a:rPr lang="en-US" sz="1600" dirty="0">
-                <a:solidFill>
-                  <a:srgbClr val="000000"/>
-                </a:solidFill>
-                <a:highlight>
-                  <a:srgbClr val="FFFFFF"/>
-                </a:highlight>
-                <a:latin typeface="Courier New" panose="02070309020205020404" pitchFamily="49" charset="0"/>
-              </a:rPr>
-              <a:t> </a:t>
-            </a:r>
-            <a:r>
-              <a:rPr lang="en-US" sz="1600" b="1" dirty="0">
-                <a:solidFill>
-                  <a:srgbClr val="000080"/>
-                </a:solidFill>
-                <a:highlight>
-                  <a:srgbClr val="FFFFFF"/>
-                </a:highlight>
-                <a:latin typeface="Courier New" panose="02070309020205020404" pitchFamily="49" charset="0"/>
-              </a:rPr>
-              <a:t>{</a:t>
-            </a:r>
-            <a:endParaRPr lang="en-US" sz="1600" dirty="0">
-              <a:solidFill>
-                <a:srgbClr val="000000"/>
-              </a:solidFill>
-              <a:highlight>
-                <a:srgbClr val="FFFFFF"/>
-              </a:highlight>
-              <a:latin typeface="Courier New" panose="02070309020205020404" pitchFamily="49" charset="0"/>
-            </a:endParaRPr>
-          </a:p>
-          <a:p>
-            <a:r>
-              <a:rPr lang="en-US" sz="1600" dirty="0">
-                <a:solidFill>
-                  <a:srgbClr val="000000"/>
-                </a:solidFill>
-                <a:highlight>
-                  <a:srgbClr val="FFFFFF"/>
-                </a:highlight>
-                <a:latin typeface="Courier New" panose="02070309020205020404" pitchFamily="49" charset="0"/>
-              </a:rPr>
-              <a:t>    </a:t>
-            </a:r>
-            <a:r>
-              <a:rPr lang="en-US" sz="1600" b="1" dirty="0" smtClean="0">
-                <a:solidFill>
-                  <a:srgbClr val="0000FF"/>
-                </a:solidFill>
-                <a:highlight>
-                  <a:srgbClr val="FFFFFF"/>
-                </a:highlight>
-                <a:latin typeface="Courier New" panose="02070309020205020404" pitchFamily="49" charset="0"/>
-              </a:rPr>
-              <a:t>try </a:t>
-            </a:r>
-            <a:r>
-              <a:rPr lang="en-US" sz="1600" b="1" dirty="0" smtClean="0">
-                <a:solidFill>
-                  <a:srgbClr val="000080"/>
-                </a:solidFill>
-                <a:highlight>
-                  <a:srgbClr val="FFFFFF"/>
-                </a:highlight>
-                <a:latin typeface="Courier New" panose="02070309020205020404" pitchFamily="49" charset="0"/>
-              </a:rPr>
-              <a:t>(</a:t>
-            </a:r>
-            <a:r>
-              <a:rPr lang="en-US" sz="1600" dirty="0" err="1">
-                <a:solidFill>
-                  <a:srgbClr val="000000"/>
-                </a:solidFill>
-                <a:highlight>
-                  <a:srgbClr val="FFFFFF"/>
-                </a:highlight>
-                <a:latin typeface="Courier New" panose="02070309020205020404" pitchFamily="49" charset="0"/>
-              </a:rPr>
-              <a:t>NamingClosable</a:t>
-            </a:r>
-            <a:r>
-              <a:rPr lang="en-US" sz="1600" dirty="0">
-                <a:solidFill>
-                  <a:srgbClr val="000000"/>
-                </a:solidFill>
-                <a:highlight>
-                  <a:srgbClr val="FFFFFF"/>
-                </a:highlight>
-                <a:latin typeface="Courier New" panose="02070309020205020404" pitchFamily="49" charset="0"/>
-              </a:rPr>
-              <a:t> it </a:t>
-            </a:r>
-            <a:r>
-              <a:rPr lang="en-US" sz="1600" b="1" dirty="0">
-                <a:solidFill>
-                  <a:srgbClr val="000080"/>
-                </a:solidFill>
-                <a:highlight>
-                  <a:srgbClr val="FFFFFF"/>
-                </a:highlight>
-                <a:latin typeface="Courier New" panose="02070309020205020404" pitchFamily="49" charset="0"/>
-              </a:rPr>
-              <a:t>=</a:t>
-            </a:r>
-            <a:r>
-              <a:rPr lang="en-US" sz="1600" dirty="0">
-                <a:solidFill>
-                  <a:srgbClr val="000000"/>
-                </a:solidFill>
-                <a:highlight>
-                  <a:srgbClr val="FFFFFF"/>
-                </a:highlight>
-                <a:latin typeface="Courier New" panose="02070309020205020404" pitchFamily="49" charset="0"/>
-              </a:rPr>
-              <a:t> </a:t>
-            </a:r>
-            <a:r>
-              <a:rPr lang="en-US" sz="1600" dirty="0" err="1">
-                <a:solidFill>
-                  <a:srgbClr val="000000"/>
-                </a:solidFill>
-                <a:highlight>
-                  <a:srgbClr val="FFFFFF"/>
-                </a:highlight>
-                <a:latin typeface="Courier New" panose="02070309020205020404" pitchFamily="49" charset="0"/>
-              </a:rPr>
-              <a:t>wrapAllException</a:t>
-            </a:r>
-            <a:r>
-              <a:rPr lang="en-US" sz="1600" b="1" dirty="0">
-                <a:solidFill>
-                  <a:srgbClr val="000080"/>
-                </a:solidFill>
-                <a:highlight>
-                  <a:srgbClr val="FFFFFF"/>
-                </a:highlight>
-                <a:latin typeface="Courier New" panose="02070309020205020404" pitchFamily="49" charset="0"/>
-              </a:rPr>
-              <a:t>(</a:t>
-            </a:r>
-            <a:r>
-              <a:rPr lang="en-US" sz="1600" dirty="0" err="1">
-                <a:solidFill>
-                  <a:srgbClr val="000000"/>
-                </a:solidFill>
-                <a:highlight>
-                  <a:srgbClr val="FFFFFF"/>
-                </a:highlight>
-                <a:latin typeface="Courier New" panose="02070309020205020404" pitchFamily="49" charset="0"/>
-              </a:rPr>
-              <a:t>ctx</a:t>
-            </a:r>
-            <a:r>
-              <a:rPr lang="en-US" sz="1600" b="1" dirty="0">
-                <a:solidFill>
-                  <a:srgbClr val="000080"/>
-                </a:solidFill>
-                <a:highlight>
-                  <a:srgbClr val="FFFFFF"/>
-                </a:highlight>
-                <a:latin typeface="Courier New" panose="02070309020205020404" pitchFamily="49" charset="0"/>
-              </a:rPr>
-              <a:t>::</a:t>
-            </a:r>
-            <a:r>
-              <a:rPr lang="en-US" sz="1600" dirty="0">
-                <a:solidFill>
-                  <a:srgbClr val="000000"/>
-                </a:solidFill>
-                <a:highlight>
-                  <a:srgbClr val="FFFFFF"/>
-                </a:highlight>
-                <a:latin typeface="Courier New" panose="02070309020205020404" pitchFamily="49" charset="0"/>
-              </a:rPr>
-              <a:t>close</a:t>
-            </a:r>
-            <a:r>
-              <a:rPr lang="en-US" sz="1600" b="1" dirty="0">
-                <a:solidFill>
-                  <a:srgbClr val="000080"/>
-                </a:solidFill>
-                <a:highlight>
-                  <a:srgbClr val="FFFFFF"/>
-                </a:highlight>
-                <a:latin typeface="Courier New" panose="02070309020205020404" pitchFamily="49" charset="0"/>
-              </a:rPr>
-              <a:t>))</a:t>
-            </a:r>
-            <a:r>
-              <a:rPr lang="en-US" sz="1600" dirty="0">
-                <a:solidFill>
-                  <a:srgbClr val="000000"/>
-                </a:solidFill>
-                <a:highlight>
-                  <a:srgbClr val="FFFFFF"/>
-                </a:highlight>
-                <a:latin typeface="Courier New" panose="02070309020205020404" pitchFamily="49" charset="0"/>
-              </a:rPr>
-              <a:t> </a:t>
-            </a:r>
-            <a:r>
-              <a:rPr lang="en-US" sz="1600" b="1" dirty="0">
-                <a:solidFill>
-                  <a:srgbClr val="000080"/>
-                </a:solidFill>
-                <a:highlight>
-                  <a:srgbClr val="FFFFFF"/>
-                </a:highlight>
-                <a:latin typeface="Courier New" panose="02070309020205020404" pitchFamily="49" charset="0"/>
-              </a:rPr>
-              <a:t>{</a:t>
-            </a:r>
-            <a:endParaRPr lang="en-US" sz="1600" dirty="0">
-              <a:solidFill>
-                <a:srgbClr val="000000"/>
-              </a:solidFill>
-              <a:highlight>
-                <a:srgbClr val="FFFFFF"/>
-              </a:highlight>
-              <a:latin typeface="Courier New" panose="02070309020205020404" pitchFamily="49" charset="0"/>
-            </a:endParaRPr>
-          </a:p>
-          <a:p>
-            <a:r>
-              <a:rPr lang="en-US" sz="1600" dirty="0">
-                <a:solidFill>
-                  <a:srgbClr val="000000"/>
-                </a:solidFill>
-                <a:highlight>
-                  <a:srgbClr val="FFFFFF"/>
-                </a:highlight>
-                <a:latin typeface="Courier New" panose="02070309020205020404" pitchFamily="49" charset="0"/>
-              </a:rPr>
-              <a:t>        </a:t>
-            </a:r>
-            <a:r>
-              <a:rPr lang="en-US" sz="1600" dirty="0" err="1">
-                <a:solidFill>
-                  <a:srgbClr val="000000"/>
-                </a:solidFill>
-                <a:highlight>
-                  <a:srgbClr val="FFFFFF"/>
-                </a:highlight>
-                <a:latin typeface="Courier New" panose="02070309020205020404" pitchFamily="49" charset="0"/>
-              </a:rPr>
-              <a:t>doSomethingWithContext</a:t>
-            </a:r>
-            <a:r>
-              <a:rPr lang="en-US" sz="1600" b="1" dirty="0">
-                <a:solidFill>
-                  <a:srgbClr val="000080"/>
-                </a:solidFill>
-                <a:highlight>
-                  <a:srgbClr val="FFFFFF"/>
-                </a:highlight>
-                <a:latin typeface="Courier New" panose="02070309020205020404" pitchFamily="49" charset="0"/>
-              </a:rPr>
-              <a:t>(</a:t>
-            </a:r>
-            <a:r>
-              <a:rPr lang="en-US" sz="1600" dirty="0" err="1">
-                <a:solidFill>
-                  <a:srgbClr val="000000"/>
-                </a:solidFill>
-                <a:highlight>
-                  <a:srgbClr val="FFFFFF"/>
-                </a:highlight>
-                <a:latin typeface="Courier New" panose="02070309020205020404" pitchFamily="49" charset="0"/>
-              </a:rPr>
-              <a:t>ctx</a:t>
-            </a:r>
-            <a:r>
-              <a:rPr lang="en-US" sz="1600" b="1" dirty="0">
-                <a:solidFill>
-                  <a:srgbClr val="000080"/>
-                </a:solidFill>
-                <a:highlight>
-                  <a:srgbClr val="FFFFFF"/>
-                </a:highlight>
-                <a:latin typeface="Courier New" panose="02070309020205020404" pitchFamily="49" charset="0"/>
-              </a:rPr>
-              <a:t>);</a:t>
-            </a:r>
-            <a:endParaRPr lang="en-US" sz="1600" dirty="0">
-              <a:solidFill>
-                <a:srgbClr val="000000"/>
-              </a:solidFill>
-              <a:highlight>
-                <a:srgbClr val="FFFFFF"/>
-              </a:highlight>
-              <a:latin typeface="Courier New" panose="02070309020205020404" pitchFamily="49" charset="0"/>
-            </a:endParaRPr>
-          </a:p>
-          <a:p>
-            <a:r>
-              <a:rPr lang="en-US" sz="1600" dirty="0">
-                <a:solidFill>
-                  <a:srgbClr val="000000"/>
-                </a:solidFill>
-                <a:highlight>
-                  <a:srgbClr val="FFFFFF"/>
-                </a:highlight>
-                <a:latin typeface="Courier New" panose="02070309020205020404" pitchFamily="49" charset="0"/>
-              </a:rPr>
-              <a:t>    </a:t>
-            </a:r>
-            <a:r>
-              <a:rPr lang="en-US" sz="1600" b="1" dirty="0">
-                <a:solidFill>
-                  <a:srgbClr val="000080"/>
-                </a:solidFill>
-                <a:highlight>
-                  <a:srgbClr val="FFFFFF"/>
-                </a:highlight>
-                <a:latin typeface="Courier New" panose="02070309020205020404" pitchFamily="49" charset="0"/>
-              </a:rPr>
-              <a:t>}</a:t>
-            </a:r>
-            <a:r>
-              <a:rPr lang="en-US" sz="1600" dirty="0">
-                <a:solidFill>
-                  <a:srgbClr val="000000"/>
-                </a:solidFill>
-                <a:highlight>
-                  <a:srgbClr val="FFFFFF"/>
-                </a:highlight>
-                <a:latin typeface="Courier New" panose="02070309020205020404" pitchFamily="49" charset="0"/>
-              </a:rPr>
-              <a:t> </a:t>
-            </a:r>
-            <a:r>
-              <a:rPr lang="en-US" sz="1600" b="1" dirty="0">
-                <a:solidFill>
-                  <a:srgbClr val="0000FF"/>
-                </a:solidFill>
-                <a:highlight>
-                  <a:srgbClr val="FFFFFF"/>
-                </a:highlight>
-                <a:latin typeface="Courier New" panose="02070309020205020404" pitchFamily="49" charset="0"/>
-              </a:rPr>
-              <a:t>catch</a:t>
-            </a:r>
-            <a:r>
-              <a:rPr lang="en-US" sz="1600" dirty="0">
-                <a:solidFill>
-                  <a:srgbClr val="000000"/>
-                </a:solidFill>
-                <a:highlight>
-                  <a:srgbClr val="FFFFFF"/>
-                </a:highlight>
-                <a:latin typeface="Courier New" panose="02070309020205020404" pitchFamily="49" charset="0"/>
-              </a:rPr>
-              <a:t> </a:t>
-            </a:r>
-            <a:r>
-              <a:rPr lang="en-US" sz="1600" b="1" dirty="0">
-                <a:solidFill>
-                  <a:srgbClr val="000080"/>
-                </a:solidFill>
-                <a:highlight>
-                  <a:srgbClr val="FFFFFF"/>
-                </a:highlight>
-                <a:latin typeface="Courier New" panose="02070309020205020404" pitchFamily="49" charset="0"/>
-              </a:rPr>
-              <a:t>(</a:t>
-            </a:r>
-            <a:r>
-              <a:rPr lang="en-US" sz="1600" dirty="0" err="1">
-                <a:solidFill>
-                  <a:srgbClr val="000000"/>
-                </a:solidFill>
-                <a:highlight>
-                  <a:srgbClr val="FFFFFF"/>
-                </a:highlight>
-                <a:latin typeface="Courier New" panose="02070309020205020404" pitchFamily="49" charset="0"/>
-              </a:rPr>
-              <a:t>NotClosedException</a:t>
-            </a:r>
-            <a:r>
-              <a:rPr lang="en-US" sz="1600" dirty="0">
-                <a:solidFill>
-                  <a:srgbClr val="000000"/>
-                </a:solidFill>
-                <a:highlight>
-                  <a:srgbClr val="FFFFFF"/>
-                </a:highlight>
-                <a:latin typeface="Courier New" panose="02070309020205020404" pitchFamily="49" charset="0"/>
-              </a:rPr>
-              <a:t> ex</a:t>
-            </a:r>
-            <a:r>
-              <a:rPr lang="en-US" sz="1600" b="1" dirty="0">
-                <a:solidFill>
-                  <a:srgbClr val="000080"/>
-                </a:solidFill>
-                <a:highlight>
-                  <a:srgbClr val="FFFFFF"/>
-                </a:highlight>
-                <a:latin typeface="Courier New" panose="02070309020205020404" pitchFamily="49" charset="0"/>
-              </a:rPr>
-              <a:t>)</a:t>
-            </a:r>
-            <a:r>
-              <a:rPr lang="en-US" sz="1600" dirty="0">
-                <a:solidFill>
-                  <a:srgbClr val="000000"/>
-                </a:solidFill>
-                <a:highlight>
-                  <a:srgbClr val="FFFFFF"/>
-                </a:highlight>
-                <a:latin typeface="Courier New" panose="02070309020205020404" pitchFamily="49" charset="0"/>
-              </a:rPr>
-              <a:t> </a:t>
-            </a:r>
-            <a:r>
-              <a:rPr lang="en-US" sz="1600" b="1" dirty="0">
-                <a:solidFill>
-                  <a:srgbClr val="000080"/>
-                </a:solidFill>
-                <a:highlight>
-                  <a:srgbClr val="FFFFFF"/>
-                </a:highlight>
-                <a:latin typeface="Courier New" panose="02070309020205020404" pitchFamily="49" charset="0"/>
-              </a:rPr>
-              <a:t>{</a:t>
-            </a:r>
-            <a:endParaRPr lang="en-US" sz="1600" dirty="0">
-              <a:solidFill>
-                <a:srgbClr val="000000"/>
-              </a:solidFill>
-              <a:highlight>
-                <a:srgbClr val="FFFFFF"/>
-              </a:highlight>
-              <a:latin typeface="Courier New" panose="02070309020205020404" pitchFamily="49" charset="0"/>
-            </a:endParaRPr>
-          </a:p>
-          <a:p>
-            <a:r>
-              <a:rPr lang="en-US" sz="1600" dirty="0">
-                <a:solidFill>
-                  <a:srgbClr val="000000"/>
-                </a:solidFill>
-                <a:highlight>
-                  <a:srgbClr val="FFFFFF"/>
-                </a:highlight>
-                <a:latin typeface="Courier New" panose="02070309020205020404" pitchFamily="49" charset="0"/>
-              </a:rPr>
-              <a:t>        logger</a:t>
-            </a:r>
-            <a:r>
-              <a:rPr lang="en-US" sz="1600" b="1" dirty="0">
-                <a:solidFill>
-                  <a:srgbClr val="000080"/>
-                </a:solidFill>
-                <a:highlight>
-                  <a:srgbClr val="FFFFFF"/>
-                </a:highlight>
-                <a:latin typeface="Courier New" panose="02070309020205020404" pitchFamily="49" charset="0"/>
-              </a:rPr>
-              <a:t>.</a:t>
-            </a:r>
-            <a:r>
-              <a:rPr lang="en-US" sz="1600" dirty="0">
-                <a:solidFill>
-                  <a:srgbClr val="000000"/>
-                </a:solidFill>
-                <a:highlight>
-                  <a:srgbClr val="FFFFFF"/>
-                </a:highlight>
-                <a:latin typeface="Courier New" panose="02070309020205020404" pitchFamily="49" charset="0"/>
-              </a:rPr>
-              <a:t>log</a:t>
-            </a:r>
-            <a:r>
-              <a:rPr lang="en-US" sz="1600" b="1" dirty="0">
-                <a:solidFill>
-                  <a:srgbClr val="000080"/>
-                </a:solidFill>
-                <a:highlight>
-                  <a:srgbClr val="FFFFFF"/>
-                </a:highlight>
-                <a:latin typeface="Courier New" panose="02070309020205020404" pitchFamily="49" charset="0"/>
-              </a:rPr>
-              <a:t>(</a:t>
-            </a:r>
-            <a:r>
-              <a:rPr lang="en-US" sz="1600" dirty="0" err="1">
-                <a:solidFill>
-                  <a:srgbClr val="000000"/>
-                </a:solidFill>
-                <a:highlight>
-                  <a:srgbClr val="FFFFFF"/>
-                </a:highlight>
-                <a:latin typeface="Courier New" panose="02070309020205020404" pitchFamily="49" charset="0"/>
-              </a:rPr>
-              <a:t>Level</a:t>
-            </a:r>
-            <a:r>
-              <a:rPr lang="en-US" sz="1600" b="1" dirty="0" err="1">
-                <a:solidFill>
-                  <a:srgbClr val="000080"/>
-                </a:solidFill>
-                <a:highlight>
-                  <a:srgbClr val="FFFFFF"/>
-                </a:highlight>
-                <a:latin typeface="Courier New" panose="02070309020205020404" pitchFamily="49" charset="0"/>
-              </a:rPr>
-              <a:t>.</a:t>
-            </a:r>
-            <a:r>
-              <a:rPr lang="en-US" sz="1600" dirty="0" err="1">
-                <a:solidFill>
-                  <a:srgbClr val="000000"/>
-                </a:solidFill>
-                <a:highlight>
-                  <a:srgbClr val="FFFFFF"/>
-                </a:highlight>
-                <a:latin typeface="Courier New" panose="02070309020205020404" pitchFamily="49" charset="0"/>
-              </a:rPr>
-              <a:t>WARNING</a:t>
-            </a:r>
-            <a:r>
-              <a:rPr lang="en-US" sz="1600" b="1" dirty="0">
-                <a:solidFill>
-                  <a:srgbClr val="000080"/>
-                </a:solidFill>
-                <a:highlight>
-                  <a:srgbClr val="FFFFFF"/>
-                </a:highlight>
-                <a:latin typeface="Courier New" panose="02070309020205020404" pitchFamily="49" charset="0"/>
-              </a:rPr>
-              <a:t>,</a:t>
-            </a:r>
-            <a:r>
-              <a:rPr lang="en-US" sz="1600" dirty="0">
-                <a:solidFill>
-                  <a:srgbClr val="000000"/>
-                </a:solidFill>
-                <a:highlight>
-                  <a:srgbClr val="FFFFFF"/>
-                </a:highlight>
-                <a:latin typeface="Courier New" panose="02070309020205020404" pitchFamily="49" charset="0"/>
-              </a:rPr>
-              <a:t> </a:t>
-            </a:r>
-            <a:r>
-              <a:rPr lang="en-US" sz="1600" dirty="0" err="1">
-                <a:solidFill>
-                  <a:srgbClr val="000000"/>
-                </a:solidFill>
-                <a:highlight>
-                  <a:srgbClr val="FFFFFF"/>
-                </a:highlight>
-                <a:latin typeface="Courier New" panose="02070309020205020404" pitchFamily="49" charset="0"/>
-              </a:rPr>
-              <a:t>ex</a:t>
-            </a:r>
-            <a:r>
-              <a:rPr lang="en-US" sz="1600" b="1" dirty="0" err="1">
-                <a:solidFill>
-                  <a:srgbClr val="000080"/>
-                </a:solidFill>
-                <a:highlight>
-                  <a:srgbClr val="FFFFFF"/>
-                </a:highlight>
-                <a:latin typeface="Courier New" panose="02070309020205020404" pitchFamily="49" charset="0"/>
-              </a:rPr>
-              <a:t>.</a:t>
-            </a:r>
-            <a:r>
-              <a:rPr lang="en-US" sz="1600" dirty="0" err="1">
-                <a:solidFill>
-                  <a:srgbClr val="000000"/>
-                </a:solidFill>
-                <a:highlight>
-                  <a:srgbClr val="FFFFFF"/>
-                </a:highlight>
-                <a:latin typeface="Courier New" panose="02070309020205020404" pitchFamily="49" charset="0"/>
-              </a:rPr>
-              <a:t>getCause</a:t>
-            </a:r>
-            <a:r>
-              <a:rPr lang="en-US" sz="1600" b="1" dirty="0">
-                <a:solidFill>
-                  <a:srgbClr val="000080"/>
-                </a:solidFill>
-                <a:highlight>
-                  <a:srgbClr val="FFFFFF"/>
-                </a:highlight>
-                <a:latin typeface="Courier New" panose="02070309020205020404" pitchFamily="49" charset="0"/>
-              </a:rPr>
-              <a:t>().</a:t>
-            </a:r>
-            <a:r>
-              <a:rPr lang="en-US" sz="1600" dirty="0" err="1">
-                <a:solidFill>
-                  <a:srgbClr val="000000"/>
-                </a:solidFill>
-                <a:highlight>
-                  <a:srgbClr val="FFFFFF"/>
-                </a:highlight>
-                <a:latin typeface="Courier New" panose="02070309020205020404" pitchFamily="49" charset="0"/>
-              </a:rPr>
-              <a:t>getMessage</a:t>
-            </a:r>
-            <a:r>
-              <a:rPr lang="en-US" sz="1600" b="1" dirty="0">
-                <a:solidFill>
-                  <a:srgbClr val="000080"/>
-                </a:solidFill>
-                <a:highlight>
-                  <a:srgbClr val="FFFFFF"/>
-                </a:highlight>
-                <a:latin typeface="Courier New" panose="02070309020205020404" pitchFamily="49" charset="0"/>
-              </a:rPr>
-              <a:t>(),</a:t>
-            </a:r>
-            <a:r>
-              <a:rPr lang="en-US" sz="1600" dirty="0">
-                <a:solidFill>
-                  <a:srgbClr val="000000"/>
-                </a:solidFill>
-                <a:highlight>
-                  <a:srgbClr val="FFFFFF"/>
-                </a:highlight>
-                <a:latin typeface="Courier New" panose="02070309020205020404" pitchFamily="49" charset="0"/>
-              </a:rPr>
-              <a:t> </a:t>
-            </a:r>
-            <a:r>
-              <a:rPr lang="en-US" sz="1600" dirty="0" err="1">
-                <a:solidFill>
-                  <a:srgbClr val="000000"/>
-                </a:solidFill>
-                <a:highlight>
-                  <a:srgbClr val="FFFFFF"/>
-                </a:highlight>
-                <a:latin typeface="Courier New" panose="02070309020205020404" pitchFamily="49" charset="0"/>
-              </a:rPr>
-              <a:t>ex</a:t>
-            </a:r>
-            <a:r>
-              <a:rPr lang="en-US" sz="1600" b="1" dirty="0" err="1">
-                <a:solidFill>
-                  <a:srgbClr val="000080"/>
-                </a:solidFill>
-                <a:highlight>
-                  <a:srgbClr val="FFFFFF"/>
-                </a:highlight>
-                <a:latin typeface="Courier New" panose="02070309020205020404" pitchFamily="49" charset="0"/>
-              </a:rPr>
-              <a:t>.</a:t>
-            </a:r>
-            <a:r>
-              <a:rPr lang="en-US" sz="1600" dirty="0" err="1">
-                <a:solidFill>
-                  <a:srgbClr val="000000"/>
-                </a:solidFill>
-                <a:highlight>
-                  <a:srgbClr val="FFFFFF"/>
-                </a:highlight>
-                <a:latin typeface="Courier New" panose="02070309020205020404" pitchFamily="49" charset="0"/>
-              </a:rPr>
-              <a:t>getCause</a:t>
-            </a:r>
-            <a:r>
-              <a:rPr lang="en-US" sz="1600" b="1" dirty="0">
-                <a:solidFill>
-                  <a:srgbClr val="000080"/>
-                </a:solidFill>
-                <a:highlight>
-                  <a:srgbClr val="FFFFFF"/>
-                </a:highlight>
-                <a:latin typeface="Courier New" panose="02070309020205020404" pitchFamily="49" charset="0"/>
-              </a:rPr>
-              <a:t>());</a:t>
-            </a:r>
-            <a:endParaRPr lang="en-US" sz="1600" dirty="0">
-              <a:solidFill>
-                <a:srgbClr val="000000"/>
-              </a:solidFill>
-              <a:highlight>
-                <a:srgbClr val="FFFFFF"/>
-              </a:highlight>
-              <a:latin typeface="Courier New" panose="02070309020205020404" pitchFamily="49" charset="0"/>
-            </a:endParaRPr>
-          </a:p>
-          <a:p>
-            <a:r>
-              <a:rPr lang="en-US" sz="1600" dirty="0">
-                <a:solidFill>
-                  <a:srgbClr val="000000"/>
-                </a:solidFill>
-                <a:highlight>
-                  <a:srgbClr val="FFFFFF"/>
-                </a:highlight>
-                <a:latin typeface="Courier New" panose="02070309020205020404" pitchFamily="49" charset="0"/>
-              </a:rPr>
-              <a:t>	</a:t>
-            </a:r>
-            <a:r>
-              <a:rPr lang="en-US" sz="1600" dirty="0" smtClean="0">
-                <a:solidFill>
-                  <a:srgbClr val="000000"/>
-                </a:solidFill>
-                <a:highlight>
-                  <a:srgbClr val="FFFFFF"/>
-                </a:highlight>
-                <a:latin typeface="Courier New" panose="02070309020205020404" pitchFamily="49" charset="0"/>
-              </a:rPr>
-              <a:t>   </a:t>
-            </a:r>
-            <a:r>
-              <a:rPr lang="en-US" sz="1600" b="1" dirty="0" smtClean="0">
-                <a:solidFill>
-                  <a:srgbClr val="000080"/>
-                </a:solidFill>
-                <a:highlight>
-                  <a:srgbClr val="FFFFFF"/>
-                </a:highlight>
-                <a:latin typeface="Courier New" panose="02070309020205020404" pitchFamily="49" charset="0"/>
-              </a:rPr>
-              <a:t>}</a:t>
-            </a:r>
-            <a:endParaRPr lang="en-US" sz="1600" dirty="0">
-              <a:solidFill>
-                <a:srgbClr val="000000"/>
-              </a:solidFill>
-              <a:highlight>
-                <a:srgbClr val="FFFFFF"/>
-              </a:highlight>
-              <a:latin typeface="Courier New" panose="02070309020205020404" pitchFamily="49" charset="0"/>
-            </a:endParaRPr>
-          </a:p>
-          <a:p>
-            <a:r>
-              <a:rPr lang="en-US" sz="1600" b="1" dirty="0">
-                <a:solidFill>
-                  <a:srgbClr val="000080"/>
-                </a:solidFill>
-                <a:highlight>
-                  <a:srgbClr val="FFFFFF"/>
-                </a:highlight>
-                <a:latin typeface="Courier New" panose="02070309020205020404" pitchFamily="49" charset="0"/>
-              </a:rPr>
-              <a:t>}</a:t>
-            </a:r>
-            <a:r>
-              <a:rPr lang="en-US" sz="1600" dirty="0">
-                <a:solidFill>
-                  <a:srgbClr val="000000"/>
-                </a:solidFill>
-                <a:highlight>
-                  <a:srgbClr val="FFFFFF"/>
-                </a:highlight>
-                <a:latin typeface="Courier New" panose="02070309020205020404" pitchFamily="49" charset="0"/>
-              </a:rPr>
-              <a:t>    </a:t>
-            </a:r>
-          </a:p>
-          <a:p>
-            <a:r>
-              <a:rPr lang="en-US" dirty="0" smtClean="0"/>
-              <a:t>The first time I explained this idea, I got a lot of questions about it.</a:t>
-            </a:r>
-          </a:p>
-          <a:p>
-            <a:r>
-              <a:rPr lang="en-US" dirty="0" smtClean="0"/>
-              <a:t>So, I have published a library on Maven Central called “</a:t>
-            </a:r>
-            <a:r>
-              <a:rPr lang="en-US" dirty="0" err="1" smtClean="0"/>
-              <a:t>CloseIt</a:t>
-            </a:r>
-            <a:r>
-              <a:rPr lang="en-US" dirty="0" smtClean="0"/>
-              <a:t>” that does all of this with </a:t>
-            </a:r>
-            <a:r>
-              <a:rPr lang="en-US" dirty="0" err="1" smtClean="0"/>
-              <a:t>AutoClosable</a:t>
-            </a:r>
-            <a:r>
-              <a:rPr lang="en-US" dirty="0" smtClean="0"/>
-              <a:t> and more.</a:t>
-            </a:r>
-          </a:p>
-          <a:p>
-            <a:r>
-              <a:rPr lang="en-US" dirty="0" smtClean="0"/>
-              <a:t>It uses generics to allow the </a:t>
-            </a:r>
-            <a:r>
-              <a:rPr lang="en-US" dirty="0">
-                <a:solidFill>
-                  <a:srgbClr val="000000"/>
-                </a:solidFill>
-                <a:highlight>
-                  <a:srgbClr val="FFFFFF"/>
-                </a:highlight>
-                <a:latin typeface="Courier New" panose="02070309020205020404" pitchFamily="49" charset="0"/>
-              </a:rPr>
-              <a:t>close</a:t>
-            </a:r>
-            <a:r>
-              <a:rPr lang="en-US" b="1" dirty="0" smtClean="0">
-                <a:solidFill>
-                  <a:srgbClr val="000080"/>
-                </a:solidFill>
-                <a:highlight>
-                  <a:srgbClr val="FFFFFF"/>
-                </a:highlight>
-                <a:latin typeface="Courier New" panose="02070309020205020404" pitchFamily="49" charset="0"/>
-              </a:rPr>
-              <a:t>()</a:t>
-            </a:r>
-            <a:r>
-              <a:rPr lang="en-US" dirty="0" smtClean="0"/>
-              <a:t> exceptions to be parameterized.</a:t>
-            </a:r>
-          </a:p>
-        </p:txBody>
-      </p:sp>
-    </p:spTree>
-    <p:extLst>
-      <p:ext uri="{BB962C8B-B14F-4D97-AF65-F5344CB8AC3E}">
-        <p14:creationId xmlns:p14="http://schemas.microsoft.com/office/powerpoint/2010/main" val="2500553836"/>
-      </p:ext>
-    </p:extLst>
-  </p:cSld>
-  <p:clrMapOvr>
-    <a:masterClrMapping/>
-  </p:clrMapOvr>
-</p:sld>
-</file>
-
-<file path=ppt/slides/slide47.xml><?xml version="1.0" encoding="utf-8"?>
+<file path=ppt/slides/slide45.xml><?xml version="1.0" encoding="utf-8"?>
 <p:sld xmlns:a="http://schemas.openxmlformats.org/drawingml/2006/main" xmlns:r="http://schemas.openxmlformats.org/officeDocument/2006/relationships" xmlns:p="http://schemas.openxmlformats.org/presentationml/2006/main">
   <p:cSld>
     <p:spTree>

</xml_diff>

<commit_message>
Create .pdf of changes made today.  Further cleanup of slides.
</commit_message>
<xml_diff>
--- a/Learning to Love the Lambda in the Stream.pptx
+++ b/Learning to Love the Lambda in the Stream.pptx
@@ -2093,14 +2093,22 @@
           <a:lstStyle/>
           <a:p>
             <a:r>
-              <a:rPr lang="en-US"/>
+              <a:rPr lang="en-US" dirty="0"/>
               <a:t>The match family of operations is not considered a reduction because it doesn’t always process all of the elements.</a:t>
             </a:r>
           </a:p>
           <a:p>
             <a:r>
-              <a:rPr lang="en-US"/>
-              <a:t>Never use any reduction in an infinite stream.  By definition, a reduction processes all of the elements.</a:t>
+              <a:rPr lang="en-US" dirty="0"/>
+              <a:t>Never use any reduction </a:t>
+            </a:r>
+            <a:r>
+              <a:rPr lang="en-US" dirty="0" smtClean="0"/>
+              <a:t>on </a:t>
+            </a:r>
+            <a:r>
+              <a:rPr lang="en-US" dirty="0"/>
+              <a:t>an infinite stream.  By definition, a reduction processes all of the elements.</a:t>
             </a:r>
           </a:p>
         </p:txBody>
@@ -2534,16 +2542,12 @@
             </a:r>
             <a:r>
               <a:rPr lang="en-US" baseline="0" dirty="0"/>
-              <a:t> of each </a:t>
-            </a:r>
-            <a:r>
-              <a:rPr lang="en-US" baseline="0"/>
-              <a:t>word.</a:t>
-            </a:r>
-          </a:p>
-          <a:p>
-            <a:r>
-              <a:rPr lang="en-US" baseline="0"/>
+              <a:t> of each word.</a:t>
+            </a:r>
+          </a:p>
+          <a:p>
+            <a:r>
+              <a:rPr lang="en-US" baseline="0" dirty="0"/>
               <a:t>This is not necessarily faster than the sequential stream.  The concurrent skip list set and map introduce their own overhead.</a:t>
             </a:r>
             <a:endParaRPr lang="en-US" dirty="0"/>
@@ -2915,12 +2919,12 @@
           <a:lstStyle/>
           <a:p>
             <a:r>
-              <a:rPr lang="en-US" dirty="0"/>
-              <a:t>The close method of the context forms the lambda with the CloseIt1 interface.  The try-with-resources feature in Java does the rest,</a:t>
-            </a:r>
-            <a:r>
-              <a:rPr lang="en-US" baseline="0" dirty="0"/>
-              <a:t> including the heavy lifting of handling any exception thrown in the close method as either a suppressed exception if an exception occurred in the body, or its own first class exception if no exception occurred in the body.</a:t>
+              <a:rPr lang="en-US" dirty="0" smtClean="0"/>
+              <a:t>However, this method of doing this requires creating</a:t>
+            </a:r>
+            <a:r>
+              <a:rPr lang="en-US" baseline="0" dirty="0" smtClean="0"/>
+              <a:t> a new interface for each set of exceptions that are needed in the throws clause.</a:t>
             </a:r>
             <a:endParaRPr lang="en-US" dirty="0"/>
           </a:p>
@@ -2943,7 +2947,7 @@
           <a:p>
             <a:fld id="{9B9A5078-34A5-4200-8953-1FDEE337BA82}" type="slidenum">
               <a:rPr lang="en-US" smtClean="0"/>
-              <a:t>48</a:t>
+              <a:t>46</a:t>
             </a:fld>
             <a:endParaRPr lang="en-US"/>
           </a:p>
@@ -2952,7 +2956,7 @@
     </p:spTree>
     <p:extLst>
       <p:ext uri="{BB962C8B-B14F-4D97-AF65-F5344CB8AC3E}">
-        <p14:creationId xmlns:p14="http://schemas.microsoft.com/office/powerpoint/2010/main" val="1544996753"/>
+        <p14:creationId xmlns:p14="http://schemas.microsoft.com/office/powerpoint/2010/main" val="3102549053"/>
       </p:ext>
     </p:extLst>
   </p:cSld>
@@ -3007,28 +3011,8 @@
           <a:lstStyle/>
           <a:p>
             <a:r>
-              <a:rPr lang="en-US" dirty="0"/>
-              <a:t>The</a:t>
-            </a:r>
-            <a:r>
-              <a:rPr lang="en-US" baseline="0" dirty="0"/>
-              <a:t> returned lambda will call the close method of the original </a:t>
-            </a:r>
-            <a:r>
-              <a:rPr lang="en-US" baseline="0" dirty="0" err="1"/>
-              <a:t>autoClosable</a:t>
-            </a:r>
-            <a:r>
-              <a:rPr lang="en-US" baseline="0" dirty="0"/>
-              <a:t>.  If it throws an Exception, it will decorate it by wrapping the exception within a </a:t>
-            </a:r>
-            <a:r>
-              <a:rPr lang="en-US" baseline="0" dirty="0" err="1"/>
-              <a:t>NotClosedException</a:t>
-            </a:r>
-            <a:r>
-              <a:rPr lang="en-US" baseline="0" dirty="0"/>
-              <a:t>.</a:t>
+              <a:rPr lang="en-US" dirty="0" smtClean="0"/>
+              <a:t>It is no longer necessary to create a new interface to change out the exception that are thrown.</a:t>
             </a:r>
             <a:endParaRPr lang="en-US" dirty="0"/>
           </a:p>
@@ -3051,7 +3035,7 @@
           <a:p>
             <a:fld id="{9B9A5078-34A5-4200-8953-1FDEE337BA82}" type="slidenum">
               <a:rPr lang="en-US" smtClean="0"/>
-              <a:t>50</a:t>
+              <a:t>47</a:t>
             </a:fld>
             <a:endParaRPr lang="en-US"/>
           </a:p>
@@ -3060,7 +3044,7 @@
     </p:spTree>
     <p:extLst>
       <p:ext uri="{BB962C8B-B14F-4D97-AF65-F5344CB8AC3E}">
-        <p14:creationId xmlns:p14="http://schemas.microsoft.com/office/powerpoint/2010/main" val="2137428540"/>
+        <p14:creationId xmlns:p14="http://schemas.microsoft.com/office/powerpoint/2010/main" val="1909135802"/>
       </p:ext>
     </p:extLst>
   </p:cSld>
@@ -3116,27 +3100,11 @@
           <a:p>
             <a:r>
               <a:rPr lang="en-US" dirty="0"/>
-              <a:t>The logger here is using </a:t>
-            </a:r>
-            <a:r>
-              <a:rPr lang="en-US" dirty="0" err="1"/>
-              <a:t>getCause</a:t>
-            </a:r>
-            <a:r>
-              <a:rPr lang="en-US" dirty="0"/>
-              <a:t>() because it knows that this exception</a:t>
+              <a:t>The close method of the context forms the lambda with the CloseIt1 interface.  The try-with-resources feature in Java does the rest,</a:t>
             </a:r>
             <a:r>
               <a:rPr lang="en-US" baseline="0" dirty="0"/>
-              <a:t> will always be wrapped.  It is printing the actual exception thrown by the close() method, not the exception decorator.  The </a:t>
-            </a:r>
-            <a:r>
-              <a:rPr lang="en-US" baseline="0" dirty="0" err="1"/>
-              <a:t>NotClosedException</a:t>
-            </a:r>
-            <a:r>
-              <a:rPr lang="en-US" baseline="0" dirty="0"/>
-              <a:t> won’t be caught if an exception occurs in the body because it will be a suppressed exception.</a:t>
+              <a:t> including the heavy lifting of handling any exception thrown in the close method as either a suppressed exception if an exception occurred in the body, or its own first class exception if no exception occurred in the body.</a:t>
             </a:r>
             <a:endParaRPr lang="en-US" dirty="0"/>
           </a:p>
@@ -3159,7 +3127,7 @@
           <a:p>
             <a:fld id="{9B9A5078-34A5-4200-8953-1FDEE337BA82}" type="slidenum">
               <a:rPr lang="en-US" smtClean="0"/>
-              <a:t>51</a:t>
+              <a:t>48</a:t>
             </a:fld>
             <a:endParaRPr lang="en-US"/>
           </a:p>
@@ -3168,7 +3136,7 @@
     </p:spTree>
     <p:extLst>
       <p:ext uri="{BB962C8B-B14F-4D97-AF65-F5344CB8AC3E}">
-        <p14:creationId xmlns:p14="http://schemas.microsoft.com/office/powerpoint/2010/main" val="734209670"/>
+        <p14:creationId xmlns:p14="http://schemas.microsoft.com/office/powerpoint/2010/main" val="1544996753"/>
       </p:ext>
     </p:extLst>
   </p:cSld>
@@ -3224,11 +3192,27 @@
           <a:p>
             <a:r>
               <a:rPr lang="en-US" dirty="0"/>
-              <a:t>Wrap is the example shown on the previous two slides.  The difference between</a:t>
+              <a:t>The</a:t>
             </a:r>
             <a:r>
               <a:rPr lang="en-US" baseline="0" dirty="0"/>
-              <a:t> consume and wrap + catch is consume always processes exceptions from the close method, but wrapped exceptions are only caught if no exception occurs in the try-with-resources body.</a:t>
+              <a:t> returned lambda will call the close method of the original </a:t>
+            </a:r>
+            <a:r>
+              <a:rPr lang="en-US" baseline="0" dirty="0" err="1"/>
+              <a:t>autoClosable</a:t>
+            </a:r>
+            <a:r>
+              <a:rPr lang="en-US" baseline="0" dirty="0"/>
+              <a:t>.  If it throws an Exception, it will decorate it by wrapping the exception within a </a:t>
+            </a:r>
+            <a:r>
+              <a:rPr lang="en-US" baseline="0" dirty="0" err="1"/>
+              <a:t>NotClosedException</a:t>
+            </a:r>
+            <a:r>
+              <a:rPr lang="en-US" baseline="0" dirty="0"/>
+              <a:t>.</a:t>
             </a:r>
             <a:endParaRPr lang="en-US" dirty="0"/>
           </a:p>
@@ -3251,6 +3235,206 @@
           <a:p>
             <a:fld id="{9B9A5078-34A5-4200-8953-1FDEE337BA82}" type="slidenum">
               <a:rPr lang="en-US" smtClean="0"/>
+              <a:t>50</a:t>
+            </a:fld>
+            <a:endParaRPr lang="en-US"/>
+          </a:p>
+        </p:txBody>
+      </p:sp>
+    </p:spTree>
+    <p:extLst>
+      <p:ext uri="{BB962C8B-B14F-4D97-AF65-F5344CB8AC3E}">
+        <p14:creationId xmlns:p14="http://schemas.microsoft.com/office/powerpoint/2010/main" val="2137428540"/>
+      </p:ext>
+    </p:extLst>
+  </p:cSld>
+  <p:clrMapOvr>
+    <a:masterClrMapping/>
+  </p:clrMapOvr>
+</p:notes>
+</file>
+
+<file path=ppt/notesSlides/notesSlide34.xml><?xml version="1.0" encoding="utf-8"?>
+<p:notes xmlns:a="http://schemas.openxmlformats.org/drawingml/2006/main" xmlns:r="http://schemas.openxmlformats.org/officeDocument/2006/relationships" xmlns:p="http://schemas.openxmlformats.org/presentationml/2006/main">
+  <p:cSld>
+    <p:spTree>
+      <p:nvGrpSpPr>
+        <p:cNvPr id="1" name=""/>
+        <p:cNvGrpSpPr/>
+        <p:nvPr/>
+      </p:nvGrpSpPr>
+      <p:grpSpPr>
+        <a:xfrm>
+          <a:off x="0" y="0"/>
+          <a:ext cx="0" cy="0"/>
+          <a:chOff x="0" y="0"/>
+          <a:chExt cx="0" cy="0"/>
+        </a:xfrm>
+      </p:grpSpPr>
+      <p:sp>
+        <p:nvSpPr>
+          <p:cNvPr id="2" name="Slide Image Placeholder 1"/>
+          <p:cNvSpPr>
+            <a:spLocks noGrp="1" noRot="1" noChangeAspect="1"/>
+          </p:cNvSpPr>
+          <p:nvPr>
+            <p:ph type="sldImg"/>
+          </p:nvPr>
+        </p:nvSpPr>
+        <p:spPr/>
+      </p:sp>
+      <p:sp>
+        <p:nvSpPr>
+          <p:cNvPr id="3" name="Notes Placeholder 2"/>
+          <p:cNvSpPr>
+            <a:spLocks noGrp="1"/>
+          </p:cNvSpPr>
+          <p:nvPr>
+            <p:ph type="body" idx="1"/>
+          </p:nvPr>
+        </p:nvSpPr>
+        <p:spPr/>
+        <p:txBody>
+          <a:bodyPr/>
+          <a:lstStyle/>
+          <a:p>
+            <a:r>
+              <a:rPr lang="en-US" dirty="0"/>
+              <a:t>The logger here is using </a:t>
+            </a:r>
+            <a:r>
+              <a:rPr lang="en-US" dirty="0" err="1"/>
+              <a:t>getCause</a:t>
+            </a:r>
+            <a:r>
+              <a:rPr lang="en-US" dirty="0"/>
+              <a:t>() because it knows that this exception</a:t>
+            </a:r>
+            <a:r>
+              <a:rPr lang="en-US" baseline="0" dirty="0"/>
+              <a:t> will always be wrapped.  It is printing the actual exception thrown by the close() method, not the exception decorator.  The </a:t>
+            </a:r>
+            <a:r>
+              <a:rPr lang="en-US" baseline="0" dirty="0" err="1"/>
+              <a:t>NotClosedException</a:t>
+            </a:r>
+            <a:r>
+              <a:rPr lang="en-US" baseline="0" dirty="0"/>
+              <a:t> won’t be caught if an exception occurs in the body because it will be a suppressed exception.</a:t>
+            </a:r>
+            <a:endParaRPr lang="en-US" dirty="0"/>
+          </a:p>
+        </p:txBody>
+      </p:sp>
+      <p:sp>
+        <p:nvSpPr>
+          <p:cNvPr id="4" name="Slide Number Placeholder 3"/>
+          <p:cNvSpPr>
+            <a:spLocks noGrp="1"/>
+          </p:cNvSpPr>
+          <p:nvPr>
+            <p:ph type="sldNum" sz="quarter" idx="10"/>
+          </p:nvPr>
+        </p:nvSpPr>
+        <p:spPr/>
+        <p:txBody>
+          <a:bodyPr/>
+          <a:lstStyle/>
+          <a:p>
+            <a:fld id="{9B9A5078-34A5-4200-8953-1FDEE337BA82}" type="slidenum">
+              <a:rPr lang="en-US" smtClean="0"/>
+              <a:t>51</a:t>
+            </a:fld>
+            <a:endParaRPr lang="en-US"/>
+          </a:p>
+        </p:txBody>
+      </p:sp>
+    </p:spTree>
+    <p:extLst>
+      <p:ext uri="{BB962C8B-B14F-4D97-AF65-F5344CB8AC3E}">
+        <p14:creationId xmlns:p14="http://schemas.microsoft.com/office/powerpoint/2010/main" val="734209670"/>
+      </p:ext>
+    </p:extLst>
+  </p:cSld>
+  <p:clrMapOvr>
+    <a:masterClrMapping/>
+  </p:clrMapOvr>
+</p:notes>
+</file>
+
+<file path=ppt/notesSlides/notesSlide35.xml><?xml version="1.0" encoding="utf-8"?>
+<p:notes xmlns:a="http://schemas.openxmlformats.org/drawingml/2006/main" xmlns:r="http://schemas.openxmlformats.org/officeDocument/2006/relationships" xmlns:p="http://schemas.openxmlformats.org/presentationml/2006/main">
+  <p:cSld>
+    <p:spTree>
+      <p:nvGrpSpPr>
+        <p:cNvPr id="1" name=""/>
+        <p:cNvGrpSpPr/>
+        <p:nvPr/>
+      </p:nvGrpSpPr>
+      <p:grpSpPr>
+        <a:xfrm>
+          <a:off x="0" y="0"/>
+          <a:ext cx="0" cy="0"/>
+          <a:chOff x="0" y="0"/>
+          <a:chExt cx="0" cy="0"/>
+        </a:xfrm>
+      </p:grpSpPr>
+      <p:sp>
+        <p:nvSpPr>
+          <p:cNvPr id="2" name="Slide Image Placeholder 1"/>
+          <p:cNvSpPr>
+            <a:spLocks noGrp="1" noRot="1" noChangeAspect="1"/>
+          </p:cNvSpPr>
+          <p:nvPr>
+            <p:ph type="sldImg"/>
+          </p:nvPr>
+        </p:nvSpPr>
+        <p:spPr/>
+      </p:sp>
+      <p:sp>
+        <p:nvSpPr>
+          <p:cNvPr id="3" name="Notes Placeholder 2"/>
+          <p:cNvSpPr>
+            <a:spLocks noGrp="1"/>
+          </p:cNvSpPr>
+          <p:nvPr>
+            <p:ph type="body" idx="1"/>
+          </p:nvPr>
+        </p:nvSpPr>
+        <p:spPr/>
+        <p:txBody>
+          <a:bodyPr/>
+          <a:lstStyle/>
+          <a:p>
+            <a:r>
+              <a:rPr lang="en-US" dirty="0"/>
+              <a:t>Wrap is the example shown on the previous two slides.  The difference between</a:t>
+            </a:r>
+            <a:r>
+              <a:rPr lang="en-US" baseline="0" dirty="0"/>
+              <a:t> consume and wrap + catch is consume always processes exceptions from the close method, but wrapped exceptions are only caught if no exception occurs in the try-with-resources body.</a:t>
+            </a:r>
+            <a:endParaRPr lang="en-US" dirty="0"/>
+          </a:p>
+        </p:txBody>
+      </p:sp>
+      <p:sp>
+        <p:nvSpPr>
+          <p:cNvPr id="4" name="Slide Number Placeholder 3"/>
+          <p:cNvSpPr>
+            <a:spLocks noGrp="1"/>
+          </p:cNvSpPr>
+          <p:nvPr>
+            <p:ph type="sldNum" sz="quarter" idx="10"/>
+          </p:nvPr>
+        </p:nvSpPr>
+        <p:spPr/>
+        <p:txBody>
+          <a:bodyPr/>
+          <a:lstStyle/>
+          <a:p>
+            <a:fld id="{9B9A5078-34A5-4200-8953-1FDEE337BA82}" type="slidenum">
+              <a:rPr lang="en-US" smtClean="0"/>
               <a:t>52</a:t>
             </a:fld>
             <a:endParaRPr lang="en-US"/>
@@ -3270,7 +3454,7 @@
 </p:notes>
 </file>
 
-<file path=ppt/notesSlides/notesSlide34.xml><?xml version="1.0" encoding="utf-8"?>
+<file path=ppt/notesSlides/notesSlide36.xml><?xml version="1.0" encoding="utf-8"?>
 <p:notes xmlns:a="http://schemas.openxmlformats.org/drawingml/2006/main" xmlns:r="http://schemas.openxmlformats.org/officeDocument/2006/relationships" xmlns:p="http://schemas.openxmlformats.org/presentationml/2006/main">
   <p:cSld>
     <p:spTree>
@@ -19057,7 +19241,7 @@
           <p:cNvPr id="2" name="Title 1">
             <a:extLst>
               <a:ext uri="{FF2B5EF4-FFF2-40B4-BE49-F238E27FC236}">
-                <a16:creationId xmlns:a16="http://schemas.microsoft.com/office/drawing/2014/main" id="{4BF41A3A-9BA9-D948-8BBC-74A05D841F3C}"/>
+                <a16:creationId xmlns:a16="http://schemas.microsoft.com/office/drawing/2014/main" xmlns="" id="{4BF41A3A-9BA9-D948-8BBC-74A05D841F3C}"/>
               </a:ext>
             </a:extLst>
           </p:cNvPr>
@@ -19085,7 +19269,7 @@
           <p:cNvPr id="3" name="Content Placeholder 2">
             <a:extLst>
               <a:ext uri="{FF2B5EF4-FFF2-40B4-BE49-F238E27FC236}">
-                <a16:creationId xmlns:a16="http://schemas.microsoft.com/office/drawing/2014/main" id="{767751D2-324B-034A-A6DB-931966979B81}"/>
+                <a16:creationId xmlns:a16="http://schemas.microsoft.com/office/drawing/2014/main" xmlns="" id="{767751D2-324B-034A-A6DB-931966979B81}"/>
               </a:ext>
             </a:extLst>
           </p:cNvPr>
@@ -19302,7 +19486,7 @@
         </p:spPr>
         <p:txBody>
           <a:bodyPr>
-            <a:normAutofit fontScale="92500" lnSpcReduction="10000"/>
+            <a:normAutofit lnSpcReduction="10000"/>
           </a:bodyPr>
           <a:lstStyle/>
           <a:p>
@@ -19326,14 +19510,12 @@
           </a:p>
           <a:p>
             <a:r>
+              <a:rPr lang="en-US" sz="2400" dirty="0" smtClean="0"/>
+              <a:t>Apply </a:t>
+            </a:r>
+            <a:r>
               <a:rPr lang="en-US" sz="2400" dirty="0"/>
-              <a:t>Intermediate operation</a:t>
-            </a:r>
-          </a:p>
-          <a:p>
-            <a:r>
-              <a:rPr lang="en-US" sz="2400" dirty="0"/>
-              <a:t>Apply a computation on stream elements.</a:t>
+              <a:t>a computation on stream elements.</a:t>
             </a:r>
           </a:p>
           <a:p>
@@ -21511,7 +21693,7 @@
           <p:cNvPr id="2" name="Title 1">
             <a:extLst>
               <a:ext uri="{FF2B5EF4-FFF2-40B4-BE49-F238E27FC236}">
-                <a16:creationId xmlns:a16="http://schemas.microsoft.com/office/drawing/2014/main" id="{187600CA-ED49-8A42-8AAC-B8CED9B598F6}"/>
+                <a16:creationId xmlns:a16="http://schemas.microsoft.com/office/drawing/2014/main" xmlns="" id="{187600CA-ED49-8A42-8AAC-B8CED9B598F6}"/>
               </a:ext>
             </a:extLst>
           </p:cNvPr>
@@ -21539,7 +21721,7 @@
           <p:cNvPr id="3" name="Content Placeholder 2">
             <a:extLst>
               <a:ext uri="{FF2B5EF4-FFF2-40B4-BE49-F238E27FC236}">
-                <a16:creationId xmlns:a16="http://schemas.microsoft.com/office/drawing/2014/main" id="{095A9095-A831-4445-8971-55AE4AD7D768}"/>
+                <a16:creationId xmlns:a16="http://schemas.microsoft.com/office/drawing/2014/main" xmlns="" id="{095A9095-A831-4445-8971-55AE4AD7D768}"/>
               </a:ext>
             </a:extLst>
           </p:cNvPr>
@@ -21597,7 +21779,7 @@
           <p:cNvPr id="2" name="Title 1">
             <a:extLst>
               <a:ext uri="{FF2B5EF4-FFF2-40B4-BE49-F238E27FC236}">
-                <a16:creationId xmlns:a16="http://schemas.microsoft.com/office/drawing/2014/main" id="{8F1FC55F-B025-1646-8698-4E547B39859F}"/>
+                <a16:creationId xmlns:a16="http://schemas.microsoft.com/office/drawing/2014/main" xmlns="" id="{8F1FC55F-B025-1646-8698-4E547B39859F}"/>
               </a:ext>
             </a:extLst>
           </p:cNvPr>
@@ -21625,7 +21807,7 @@
           <p:cNvPr id="3" name="Content Placeholder 2">
             <a:extLst>
               <a:ext uri="{FF2B5EF4-FFF2-40B4-BE49-F238E27FC236}">
-                <a16:creationId xmlns:a16="http://schemas.microsoft.com/office/drawing/2014/main" id="{212DEAB1-CB9C-0443-A7F4-896B0EDCEF7F}"/>
+                <a16:creationId xmlns:a16="http://schemas.microsoft.com/office/drawing/2014/main" xmlns="" id="{212DEAB1-CB9C-0443-A7F4-896B0EDCEF7F}"/>
               </a:ext>
             </a:extLst>
           </p:cNvPr>
@@ -21644,55 +21826,59 @@
         </p:spPr>
         <p:txBody>
           <a:bodyPr>
-            <a:normAutofit lnSpcReduction="10000"/>
+            <a:normAutofit/>
           </a:bodyPr>
           <a:lstStyle/>
           <a:p>
             <a:r>
-              <a:rPr lang="en-US" sz="2000"/>
+              <a:rPr lang="en-US" sz="2000" dirty="0"/>
               <a:t>count – A </a:t>
             </a:r>
             <a:r>
-              <a:rPr lang="en-US" sz="2000" i="1"/>
+              <a:rPr lang="en-US" sz="2000" i="1" dirty="0"/>
               <a:t>reduction </a:t>
             </a:r>
             <a:r>
-              <a:rPr lang="en-US" sz="2000"/>
+              <a:rPr lang="en-US" sz="2000" dirty="0"/>
               <a:t>that returns the number of elements in the stream.  Never use on an infinite stream.</a:t>
             </a:r>
           </a:p>
           <a:p>
             <a:r>
-              <a:rPr lang="en-US" sz="2000"/>
+              <a:rPr lang="en-US" sz="2000" dirty="0"/>
               <a:t>reduce – Perform a </a:t>
             </a:r>
             <a:r>
-              <a:rPr lang="en-US" sz="2000" i="1"/>
+              <a:rPr lang="en-US" sz="2000" i="1" dirty="0"/>
               <a:t>reduction </a:t>
             </a:r>
             <a:r>
-              <a:rPr lang="en-US" sz="2000"/>
+              <a:rPr lang="en-US" sz="2000" dirty="0"/>
               <a:t>of the stream using a </a:t>
             </a:r>
             <a:r>
-              <a:rPr lang="en-US" sz="2000">
+              <a:rPr lang="en-US" sz="2000" dirty="0" err="1">
                 <a:latin typeface="Courier New" panose="02070309020205020404" pitchFamily="49" charset="0"/>
                 <a:cs typeface="Courier New" panose="02070309020205020404" pitchFamily="49" charset="0"/>
               </a:rPr>
               <a:t>BinaryOperator</a:t>
             </a:r>
             <a:r>
-              <a:rPr lang="en-US" sz="2000"/>
+              <a:rPr lang="en-US" sz="2000" dirty="0"/>
               <a:t> to accumulate the elements.  Never use on an infinite stream.</a:t>
             </a:r>
           </a:p>
           <a:p>
             <a:r>
-              <a:rPr lang="en-US" sz="2000"/>
-              <a:t>anyMatch – Returns </a:t>
-            </a:r>
-            <a:r>
-              <a:rPr lang="en-US" sz="2000" b="1">
+              <a:rPr lang="en-US" sz="2000" dirty="0" err="1"/>
+              <a:t>anyMatch</a:t>
+            </a:r>
+            <a:r>
+              <a:rPr lang="en-US" sz="2000" dirty="0"/>
+              <a:t> – Returns </a:t>
+            </a:r>
+            <a:r>
+              <a:rPr lang="en-US" sz="2000" b="1" dirty="0">
                 <a:solidFill>
                   <a:srgbClr val="0000FF"/>
                 </a:solidFill>
@@ -21701,22 +21887,30 @@
               <a:t>true</a:t>
             </a:r>
             <a:r>
-              <a:rPr lang="en-US" sz="2000"/>
-              <a:t> and stops processing if any elements matches the supplied </a:t>
-            </a:r>
-            <a:r>
-              <a:rPr lang="en-US" sz="2000">
+              <a:rPr lang="en-US" sz="2000" dirty="0"/>
+              <a:t> and stops processing if any </a:t>
+            </a:r>
+            <a:r>
+              <a:rPr lang="en-US" sz="2000" dirty="0" smtClean="0"/>
+              <a:t>element </a:t>
+            </a:r>
+            <a:r>
+              <a:rPr lang="en-US" sz="2000" dirty="0"/>
+              <a:t>matches the supplied </a:t>
+            </a:r>
+            <a:r>
+              <a:rPr lang="en-US" sz="2000" dirty="0">
                 <a:latin typeface="Courier New" panose="02070309020205020404" pitchFamily="49" charset="0"/>
                 <a:cs typeface="Courier New" panose="02070309020205020404" pitchFamily="49" charset="0"/>
               </a:rPr>
               <a:t>Predicate</a:t>
             </a:r>
             <a:r>
-              <a:rPr lang="en-US" sz="2000"/>
+              <a:rPr lang="en-US" sz="2000" dirty="0"/>
               <a:t>, </a:t>
             </a:r>
             <a:r>
-              <a:rPr lang="en-US" sz="2000" b="1">
+              <a:rPr lang="en-US" sz="2000" b="1" dirty="0">
                 <a:solidFill>
                   <a:srgbClr val="0000FF"/>
                 </a:solidFill>
@@ -21725,11 +21919,11 @@
               <a:t>false</a:t>
             </a:r>
             <a:r>
-              <a:rPr lang="en-US" sz="2000"/>
+              <a:rPr lang="en-US" sz="2000" dirty="0"/>
               <a:t> otherwise.  Empty Stream is </a:t>
             </a:r>
             <a:r>
-              <a:rPr lang="en-US" sz="2000" b="1">
+              <a:rPr lang="en-US" sz="2000" b="1" dirty="0">
                 <a:solidFill>
                   <a:srgbClr val="0000FF"/>
                 </a:solidFill>
@@ -21738,17 +21932,21 @@
               <a:t>false</a:t>
             </a:r>
             <a:r>
-              <a:rPr lang="en-US" sz="2000"/>
+              <a:rPr lang="en-US" sz="2000" dirty="0"/>
               <a:t>.</a:t>
             </a:r>
           </a:p>
           <a:p>
             <a:r>
-              <a:rPr lang="en-US" sz="2000"/>
-              <a:t>allMatch – Returns </a:t>
-            </a:r>
-            <a:r>
-              <a:rPr lang="en-US" sz="2000" b="1">
+              <a:rPr lang="en-US" sz="2000" dirty="0" err="1"/>
+              <a:t>allMatch</a:t>
+            </a:r>
+            <a:r>
+              <a:rPr lang="en-US" sz="2000" dirty="0"/>
+              <a:t> – Returns </a:t>
+            </a:r>
+            <a:r>
+              <a:rPr lang="en-US" sz="2000" b="1" dirty="0">
                 <a:solidFill>
                   <a:srgbClr val="0000FF"/>
                 </a:solidFill>
@@ -21757,22 +21955,38 @@
               <a:t>false</a:t>
             </a:r>
             <a:r>
-              <a:rPr lang="en-US" sz="2000"/>
-              <a:t> and stops processing if any elements fail to match the supplied </a:t>
-            </a:r>
-            <a:r>
-              <a:rPr lang="en-US" sz="2000">
+              <a:rPr lang="en-US" sz="2000" dirty="0"/>
+              <a:t> and stops processing if any </a:t>
+            </a:r>
+            <a:r>
+              <a:rPr lang="en-US" sz="2000" dirty="0" smtClean="0"/>
+              <a:t>element does </a:t>
+            </a:r>
+            <a:r>
+              <a:rPr lang="en-US" sz="2000" b="1" dirty="0" smtClean="0"/>
+              <a:t>not</a:t>
+            </a:r>
+            <a:r>
+              <a:rPr lang="en-US" sz="2000" dirty="0" smtClean="0"/>
+              <a:t> match </a:t>
+            </a:r>
+            <a:r>
+              <a:rPr lang="en-US" sz="2000" dirty="0"/>
+              <a:t>the supplied </a:t>
+            </a:r>
+            <a:r>
+              <a:rPr lang="en-US" sz="2000" dirty="0">
                 <a:latin typeface="Courier New" panose="02070309020205020404" pitchFamily="49" charset="0"/>
                 <a:cs typeface="Courier New" panose="02070309020205020404" pitchFamily="49" charset="0"/>
               </a:rPr>
               <a:t>Predicate</a:t>
             </a:r>
             <a:r>
-              <a:rPr lang="en-US" sz="2000"/>
+              <a:rPr lang="en-US" sz="2000" dirty="0"/>
               <a:t>, </a:t>
             </a:r>
             <a:r>
-              <a:rPr lang="en-US" sz="2000" b="1">
+              <a:rPr lang="en-US" sz="2000" b="1" dirty="0">
                 <a:solidFill>
                   <a:srgbClr val="0000FF"/>
                 </a:solidFill>
@@ -21781,11 +21995,11 @@
               <a:t>true</a:t>
             </a:r>
             <a:r>
-              <a:rPr lang="en-US" sz="2000"/>
+              <a:rPr lang="en-US" sz="2000" dirty="0"/>
               <a:t> otherwise. Empty Stream is </a:t>
             </a:r>
             <a:r>
-              <a:rPr lang="en-US" sz="2000" b="1">
+              <a:rPr lang="en-US" sz="2000" b="1" dirty="0">
                 <a:solidFill>
                   <a:srgbClr val="0000FF"/>
                 </a:solidFill>
@@ -21796,11 +22010,15 @@
           </a:p>
           <a:p>
             <a:r>
-              <a:rPr lang="en-US" sz="2000"/>
-              <a:t>noneMatch – Returns </a:t>
-            </a:r>
-            <a:r>
-              <a:rPr lang="en-US" sz="2000" b="1">
+              <a:rPr lang="en-US" sz="2000" dirty="0" err="1"/>
+              <a:t>noneMatch</a:t>
+            </a:r>
+            <a:r>
+              <a:rPr lang="en-US" sz="2000" dirty="0"/>
+              <a:t> – Returns </a:t>
+            </a:r>
+            <a:r>
+              <a:rPr lang="en-US" sz="2000" b="1" dirty="0">
                 <a:solidFill>
                   <a:srgbClr val="0000FF"/>
                 </a:solidFill>
@@ -21809,28 +22027,54 @@
               <a:t>false</a:t>
             </a:r>
             <a:r>
-              <a:rPr lang="en-US" sz="2000"/>
-              <a:t> and stops processing if any elements match the supplied </a:t>
-            </a:r>
-            <a:r>
-              <a:rPr lang="en-US" sz="2000">
+              <a:rPr lang="en-US" sz="2000" dirty="0"/>
+              <a:t> and stops processing if any </a:t>
+            </a:r>
+            <a:r>
+              <a:rPr lang="en-US" sz="2000" dirty="0" smtClean="0"/>
+              <a:t>element matches </a:t>
+            </a:r>
+            <a:r>
+              <a:rPr lang="en-US" sz="2000" dirty="0"/>
+              <a:t>the supplied </a:t>
+            </a:r>
+            <a:r>
+              <a:rPr lang="en-US" sz="2000" dirty="0">
                 <a:latin typeface="Courier New" panose="02070309020205020404" pitchFamily="49" charset="0"/>
                 <a:cs typeface="Courier New" panose="02070309020205020404" pitchFamily="49" charset="0"/>
               </a:rPr>
               <a:t>Predicate</a:t>
             </a:r>
             <a:r>
-              <a:rPr lang="en-US" sz="2000"/>
-              <a:t>. Empty Stream is true.</a:t>
-            </a:r>
-          </a:p>
-          <a:p>
-            <a:r>
-              <a:rPr lang="en-US" sz="2000"/>
-              <a:t>forEach – A </a:t>
-            </a:r>
-            <a:r>
-              <a:rPr lang="en-US" sz="2000">
+              <a:rPr lang="en-US" sz="2000" dirty="0"/>
+              <a:t>. Empty Stream is </a:t>
+            </a:r>
+            <a:r>
+              <a:rPr lang="en-US" sz="2000" b="1" dirty="0">
+                <a:solidFill>
+                  <a:srgbClr val="0000FF"/>
+                </a:solidFill>
+                <a:latin typeface="Courier New" panose="02070309020205020404" pitchFamily="49" charset="0"/>
+              </a:rPr>
+              <a:t>true</a:t>
+            </a:r>
+            <a:r>
+              <a:rPr lang="en-US" sz="2000" dirty="0" smtClean="0"/>
+              <a:t>.</a:t>
+            </a:r>
+            <a:endParaRPr lang="en-US" sz="2000" dirty="0"/>
+          </a:p>
+          <a:p>
+            <a:r>
+              <a:rPr lang="en-US" sz="2000" dirty="0" err="1"/>
+              <a:t>forEach</a:t>
+            </a:r>
+            <a:r>
+              <a:rPr lang="en-US" sz="2000" dirty="0"/>
+              <a:t> – A </a:t>
+            </a:r>
+            <a:r>
+              <a:rPr lang="en-US" sz="2000" dirty="0">
                 <a:solidFill>
                   <a:srgbClr val="8000FF"/>
                 </a:solidFill>
@@ -21839,18 +22083,18 @@
               <a:t>void</a:t>
             </a:r>
             <a:r>
-              <a:rPr lang="en-US" sz="2000"/>
+              <a:rPr lang="en-US" sz="2000" dirty="0"/>
               <a:t> operation that presents each element to a </a:t>
             </a:r>
             <a:r>
-              <a:rPr lang="en-US" sz="2000">
+              <a:rPr lang="en-US" sz="2000" dirty="0">
                 <a:latin typeface="Courier New" panose="02070309020205020404" pitchFamily="49" charset="0"/>
                 <a:cs typeface="Courier New" panose="02070309020205020404" pitchFamily="49" charset="0"/>
               </a:rPr>
               <a:t>Consumer</a:t>
             </a:r>
             <a:r>
-              <a:rPr lang="en-US" sz="2000"/>
+              <a:rPr lang="en-US" sz="2000" dirty="0"/>
               <a:t> for processing.</a:t>
             </a:r>
           </a:p>
@@ -22066,7 +22310,7 @@
           <p:cNvPr id="2" name="Title 1">
             <a:extLst>
               <a:ext uri="{FF2B5EF4-FFF2-40B4-BE49-F238E27FC236}">
-                <a16:creationId xmlns:a16="http://schemas.microsoft.com/office/drawing/2014/main" id="{9D575015-E9F6-854A-84D4-7FAAE040C19B}"/>
+                <a16:creationId xmlns:a16="http://schemas.microsoft.com/office/drawing/2014/main" xmlns="" id="{9D575015-E9F6-854A-84D4-7FAAE040C19B}"/>
               </a:ext>
             </a:extLst>
           </p:cNvPr>
@@ -22099,7 +22343,7 @@
           <p:cNvPr id="3" name="Content Placeholder 2">
             <a:extLst>
               <a:ext uri="{FF2B5EF4-FFF2-40B4-BE49-F238E27FC236}">
-                <a16:creationId xmlns:a16="http://schemas.microsoft.com/office/drawing/2014/main" id="{D2856061-7E40-AE42-8E8F-D10F98FC1DD5}"/>
+                <a16:creationId xmlns:a16="http://schemas.microsoft.com/office/drawing/2014/main" xmlns="" id="{D2856061-7E40-AE42-8E8F-D10F98FC1DD5}"/>
               </a:ext>
             </a:extLst>
           </p:cNvPr>
@@ -22214,17 +22458,44 @@
           <a:lstStyle/>
           <a:p>
             <a:r>
-              <a:rPr lang="en-US"/>
-              <a:t>These collectors take the elements and add them to a stream.</a:t>
+              <a:rPr lang="en-US" dirty="0"/>
+              <a:t>These collectors take the elements and add them to a </a:t>
+            </a:r>
+            <a:r>
+              <a:rPr lang="en-US" dirty="0" smtClean="0"/>
+              <a:t>collection.</a:t>
             </a:r>
             <a:endParaRPr lang="en-US" dirty="0"/>
           </a:p>
           <a:p>
             <a:r>
-              <a:rPr lang="en-US"/>
-              <a:t>There are toList(), toSet(), and toCollection() collectors.</a:t>
-            </a:r>
-            <a:endParaRPr lang="en-US" dirty="0"/>
+              <a:rPr lang="en-US" dirty="0"/>
+              <a:t>There are </a:t>
+            </a:r>
+            <a:r>
+              <a:rPr lang="en-US" dirty="0" err="1"/>
+              <a:t>toList</a:t>
+            </a:r>
+            <a:r>
+              <a:rPr lang="en-US" dirty="0"/>
+              <a:t>(), </a:t>
+            </a:r>
+            <a:r>
+              <a:rPr lang="en-US" dirty="0" err="1"/>
+              <a:t>toSet</a:t>
+            </a:r>
+            <a:r>
+              <a:rPr lang="en-US" dirty="0"/>
+              <a:t>(), and </a:t>
+            </a:r>
+            <a:r>
+              <a:rPr lang="en-US" dirty="0" err="1"/>
+              <a:t>toCollection</a:t>
+            </a:r>
+            <a:r>
+              <a:rPr lang="en-US" dirty="0"/>
+              <a:t>() collectors.</a:t>
+            </a:r>
           </a:p>
           <a:p>
             <a:r>
@@ -28628,19 +28899,35 @@
           <a:p>
             <a:r>
               <a:rPr lang="en-US" sz="2400" dirty="0"/>
-              <a:t>The Functional Method is </a:t>
+              <a:t>The Functional Method </a:t>
+            </a:r>
+            <a:r>
+              <a:rPr lang="en-US" sz="2400" dirty="0" smtClean="0"/>
+              <a:t>is: </a:t>
             </a:r>
             <a:r>
               <a:rPr lang="en-US" sz="2400" dirty="0">
                 <a:solidFill>
-                  <a:srgbClr val="000000"/>
-                </a:solidFill>
-                <a:highlight>
-                  <a:srgbClr val="FFFFFF"/>
-                </a:highlight>
-                <a:latin typeface="Courier New" panose="02070309020205020404" pitchFamily="49" charset="0"/>
-              </a:rPr>
-              <a:t>close</a:t>
+                  <a:srgbClr val="8000FF"/>
+                </a:solidFill>
+                <a:highlight>
+                  <a:srgbClr val="FFFFFF"/>
+                </a:highlight>
+                <a:latin typeface="Courier New" panose="02070309020205020404" pitchFamily="49" charset="0"/>
+              </a:rPr>
+              <a:t>void</a:t>
+            </a:r>
+            <a:r>
+              <a:rPr lang="en-US" sz="2400" dirty="0">
+                <a:solidFill>
+                  <a:srgbClr val="000000"/>
+                </a:solidFill>
+                <a:highlight>
+                  <a:srgbClr val="FFFFFF"/>
+                </a:highlight>
+                <a:latin typeface="Courier New" panose="02070309020205020404" pitchFamily="49" charset="0"/>
+              </a:rPr>
+              <a:t> close</a:t>
             </a:r>
             <a:r>
               <a:rPr lang="en-US" sz="2400" b="1" dirty="0">
@@ -30866,8 +31153,12 @@
           <a:lstStyle/>
           <a:p>
             <a:r>
-              <a:rPr lang="en-US" sz="2400" dirty="0"/>
-              <a:t>If we use </a:t>
+              <a:rPr lang="en-US" sz="2400" dirty="0" smtClean="0"/>
+              <a:t>Using</a:t>
+            </a:r>
+            <a:r>
+              <a:rPr lang="en-US" sz="2400" dirty="0" smtClean="0"/>
+              <a:t> </a:t>
             </a:r>
             <a:r>
               <a:rPr lang="en-US" sz="2400" dirty="0">

</xml_diff>

<commit_message>
Add example of assigning a lambda expression directly to a Java 10+ var typed variable as an error.  Seperate min and max Optional returning terminal operations as each on their own line.
</commit_message>
<xml_diff>
--- a/Learning to Love the Lambda in the Stream.pptx
+++ b/Learning to Love the Lambda in the Stream.pptx
@@ -366,7 +366,7 @@
           <a:p>
             <a:fld id="{00F927AF-B093-4AD4-B894-C7B744C95185}" type="datetimeFigureOut">
               <a:rPr lang="en-US" smtClean="0"/>
-              <a:t>8/20/2019</a:t>
+              <a:t>8/21/2019</a:t>
             </a:fld>
             <a:endParaRPr lang="en-US"/>
           </a:p>
@@ -2000,23 +2000,11 @@
             </a:r>
             <a:r>
               <a:rPr lang="en-US" baseline="0" dirty="0" smtClean="0"/>
-              <a:t> functional interface that takes an </a:t>
-            </a:r>
-            <a:r>
-              <a:rPr lang="en-US" baseline="0" dirty="0" err="1" smtClean="0"/>
-              <a:t>int</a:t>
+              <a:t> functional interface that takes an int primitive argument and returns an int result.  </a:t>
             </a:r>
             <a:r>
               <a:rPr lang="en-US" baseline="0" dirty="0" smtClean="0"/>
-              <a:t> primitive argument and returns an </a:t>
-            </a:r>
-            <a:r>
-              <a:rPr lang="en-US" baseline="0" dirty="0" err="1" smtClean="0"/>
-              <a:t>int</a:t>
-            </a:r>
-            <a:r>
-              <a:rPr lang="en-US" baseline="0" dirty="0" smtClean="0"/>
-              <a:t> result.  </a:t>
+              <a:t>Iterate repeatedly applies a unary operator on the seed value to start with and then the previous value to generate the next value.  </a:t>
             </a:r>
             <a:r>
               <a:rPr lang="en-US" dirty="0" smtClean="0"/>
@@ -2132,8 +2120,25 @@
           <a:p>
             <a:r>
               <a:rPr lang="en-US" dirty="0"/>
-              <a:t>The match family of operations is not considered a reduction because it doesn’t always process all of the elements.</a:t>
-            </a:r>
+              <a:t>The match family of operations is not considered a reduction because it doesn’t always process all of the elements</a:t>
+            </a:r>
+            <a:r>
+              <a:rPr lang="en-US" dirty="0" smtClean="0"/>
+              <a:t>.  </a:t>
+            </a:r>
+            <a:r>
+              <a:rPr lang="en-US" dirty="0" err="1" smtClean="0"/>
+              <a:t>forEach</a:t>
+            </a:r>
+            <a:r>
+              <a:rPr lang="en-US" baseline="0" dirty="0" smtClean="0"/>
+              <a:t> processes all the values but isn’t considered a reduction </a:t>
+            </a:r>
+            <a:r>
+              <a:rPr lang="en-US" baseline="0" smtClean="0"/>
+              <a:t>because </a:t>
+            </a:r>
+            <a:endParaRPr lang="en-US" dirty="0"/>
           </a:p>
           <a:p>
             <a:r>
@@ -2870,11 +2875,27 @@
             </a:r>
             <a:r>
               <a:rPr lang="en-US" baseline="0" dirty="0"/>
-              <a:t> operator is =&gt; is most other languages, but Oracle decided on -&gt; apparently to confuse people.  Their documentation suggests that programmers might get =&gt; confused with &gt;= .  That doesn’t happen in other languages, but here we are</a:t>
+              <a:t> operator is =&gt; is most other languages, but Oracle decided on </a:t>
             </a:r>
             <a:r>
               <a:rPr lang="en-US" baseline="0" dirty="0" smtClean="0"/>
-              <a:t>.</a:t>
+              <a:t>-&gt;.  </a:t>
+            </a:r>
+            <a:r>
+              <a:rPr lang="en-US" baseline="0" dirty="0"/>
+              <a:t>Their documentation suggests that programmers might get =&gt; confused with &gt;= .  That doesn’t happen in other languages, but here we are</a:t>
+            </a:r>
+            <a:r>
+              <a:rPr lang="en-US" baseline="0" dirty="0" smtClean="0"/>
+              <a:t>.   The </a:t>
+            </a:r>
+            <a:r>
+              <a:rPr lang="en-US" baseline="0" dirty="0" err="1" smtClean="0"/>
+              <a:t>var</a:t>
+            </a:r>
+            <a:r>
+              <a:rPr lang="en-US" baseline="0" dirty="0" smtClean="0"/>
+              <a:t> type inference declaration was introduced in Java 10.  It doesn’t work because a lambda without a target FI is not valid and compiler has no way of knowing what the intended FI for unknownType is.</a:t>
             </a:r>
             <a:endParaRPr lang="en-US" dirty="0"/>
           </a:p>
@@ -3458,7 +3479,11 @@
             </a:r>
             <a:r>
               <a:rPr lang="en-US" baseline="0" dirty="0"/>
-              <a:t> consume and wrap + catch is consume always processes exceptions from the close method, but wrapped exceptions are only caught if no exception occurs in the try-with-resources body.</a:t>
+              <a:t> consume and wrap + catch is consume always processes exceptions from the close method, but wrapped exceptions are only caught if no exception occurs in the try-with-resources body</a:t>
+            </a:r>
+            <a:r>
+              <a:rPr lang="en-US" baseline="0" dirty="0" smtClean="0"/>
+              <a:t>.  It is a form of the adapter design pattern because you are adapting an exception from an unwanted type into the type you want to handle.</a:t>
             </a:r>
             <a:endParaRPr lang="en-US" dirty="0"/>
           </a:p>
@@ -4038,15 +4063,7 @@
             </a:r>
             <a:r>
               <a:rPr lang="en-US" baseline="0" dirty="0"/>
-              <a:t> for true/false, yes/no answers.  Primitive FIs are like their generic counterparts except that they either accept or return a primitive value of double, </a:t>
-            </a:r>
-            <a:r>
-              <a:rPr lang="en-US" baseline="0" dirty="0" err="1"/>
-              <a:t>int</a:t>
-            </a:r>
-            <a:r>
-              <a:rPr lang="en-US" baseline="0" dirty="0"/>
-              <a:t> or long.</a:t>
+              <a:t> for true/false, yes/no answers.  Primitive FIs are like their generic counterparts except that they either accept or return a primitive value of double, int or long.</a:t>
             </a:r>
             <a:endParaRPr lang="en-US" dirty="0"/>
           </a:p>
@@ -4936,7 +4953,7 @@
             <a:fld id="{B61BEF0D-F0BB-DE4B-95CE-6DB70DBA9567}" type="datetimeFigureOut">
               <a:rPr lang="en-US" dirty="0"/>
               <a:pPr/>
-              <a:t>8/20/2019</a:t>
+              <a:t>8/21/2019</a:t>
             </a:fld>
             <a:endParaRPr lang="en-US" dirty="0"/>
           </a:p>
@@ -5184,7 +5201,7 @@
             <a:fld id="{B61BEF0D-F0BB-DE4B-95CE-6DB70DBA9567}" type="datetimeFigureOut">
               <a:rPr lang="en-US" dirty="0"/>
               <a:pPr/>
-              <a:t>8/20/2019</a:t>
+              <a:t>8/21/2019</a:t>
             </a:fld>
             <a:endParaRPr lang="en-US" dirty="0"/>
           </a:p>
@@ -5495,7 +5512,7 @@
             <a:fld id="{B61BEF0D-F0BB-DE4B-95CE-6DB70DBA9567}" type="datetimeFigureOut">
               <a:rPr lang="en-US" dirty="0"/>
               <a:pPr/>
-              <a:t>8/20/2019</a:t>
+              <a:t>8/21/2019</a:t>
             </a:fld>
             <a:endParaRPr lang="en-US" dirty="0"/>
           </a:p>
@@ -5833,7 +5850,7 @@
             <a:fld id="{B61BEF0D-F0BB-DE4B-95CE-6DB70DBA9567}" type="datetimeFigureOut">
               <a:rPr lang="en-US" dirty="0"/>
               <a:pPr/>
-              <a:t>8/20/2019</a:t>
+              <a:t>8/21/2019</a:t>
             </a:fld>
             <a:endParaRPr lang="en-US" dirty="0"/>
           </a:p>
@@ -6144,7 +6161,7 @@
             <a:fld id="{B61BEF0D-F0BB-DE4B-95CE-6DB70DBA9567}" type="datetimeFigureOut">
               <a:rPr lang="en-US" dirty="0"/>
               <a:pPr/>
-              <a:t>8/20/2019</a:t>
+              <a:t>8/21/2019</a:t>
             </a:fld>
             <a:endParaRPr lang="en-US" dirty="0"/>
           </a:p>
@@ -6534,7 +6551,7 @@
             <a:fld id="{B61BEF0D-F0BB-DE4B-95CE-6DB70DBA9567}" type="datetimeFigureOut">
               <a:rPr lang="en-US" dirty="0"/>
               <a:pPr/>
-              <a:t>8/20/2019</a:t>
+              <a:t>8/21/2019</a:t>
             </a:fld>
             <a:endParaRPr lang="en-US" dirty="0"/>
           </a:p>
@@ -6700,7 +6717,7 @@
           <a:p>
             <a:fld id="{55C6B4A9-1611-4792-9094-5F34BCA07E0B}" type="datetimeFigureOut">
               <a:rPr lang="en-US" dirty="0"/>
-              <a:t>8/20/2019</a:t>
+              <a:t>8/21/2019</a:t>
             </a:fld>
             <a:endParaRPr lang="en-US" dirty="0"/>
           </a:p>
@@ -6876,7 +6893,7 @@
             <a:fld id="{B61BEF0D-F0BB-DE4B-95CE-6DB70DBA9567}" type="datetimeFigureOut">
               <a:rPr lang="en-US" dirty="0"/>
               <a:pPr/>
-              <a:t>8/20/2019</a:t>
+              <a:t>8/21/2019</a:t>
             </a:fld>
             <a:endParaRPr lang="en-US" dirty="0"/>
           </a:p>
@@ -7049,7 +7066,7 @@
             <a:fld id="{B61BEF0D-F0BB-DE4B-95CE-6DB70DBA9567}" type="datetimeFigureOut">
               <a:rPr lang="en-US" dirty="0"/>
               <a:pPr/>
-              <a:t>8/20/2019</a:t>
+              <a:t>8/21/2019</a:t>
             </a:fld>
             <a:endParaRPr lang="en-US" dirty="0"/>
           </a:p>
@@ -7293,7 +7310,7 @@
             <a:fld id="{B61BEF0D-F0BB-DE4B-95CE-6DB70DBA9567}" type="datetimeFigureOut">
               <a:rPr lang="en-US" dirty="0"/>
               <a:pPr/>
-              <a:t>8/20/2019</a:t>
+              <a:t>8/21/2019</a:t>
             </a:fld>
             <a:endParaRPr lang="en-US" dirty="0"/>
           </a:p>
@@ -7521,7 +7538,7 @@
           <a:p>
             <a:fld id="{EB712588-04B1-427B-82EE-E8DB90309F08}" type="datetimeFigureOut">
               <a:rPr lang="en-US" dirty="0"/>
-              <a:t>8/20/2019</a:t>
+              <a:t>8/21/2019</a:t>
             </a:fld>
             <a:endParaRPr lang="en-US" dirty="0"/>
           </a:p>
@@ -7891,7 +7908,7 @@
             <a:fld id="{B61BEF0D-F0BB-DE4B-95CE-6DB70DBA9567}" type="datetimeFigureOut">
               <a:rPr lang="en-US" dirty="0"/>
               <a:pPr/>
-              <a:t>8/20/2019</a:t>
+              <a:t>8/21/2019</a:t>
             </a:fld>
             <a:endParaRPr lang="en-US" dirty="0"/>
           </a:p>
@@ -8011,7 +8028,7 @@
             <a:fld id="{B61BEF0D-F0BB-DE4B-95CE-6DB70DBA9567}" type="datetimeFigureOut">
               <a:rPr lang="en-US" dirty="0"/>
               <a:pPr/>
-              <a:t>8/20/2019</a:t>
+              <a:t>8/21/2019</a:t>
             </a:fld>
             <a:endParaRPr lang="en-US" dirty="0"/>
           </a:p>
@@ -8103,7 +8120,7 @@
             <a:fld id="{B61BEF0D-F0BB-DE4B-95CE-6DB70DBA9567}" type="datetimeFigureOut">
               <a:rPr lang="en-US" dirty="0"/>
               <a:pPr/>
-              <a:t>8/20/2019</a:t>
+              <a:t>8/21/2019</a:t>
             </a:fld>
             <a:endParaRPr lang="en-US" dirty="0"/>
           </a:p>
@@ -8354,7 +8371,7 @@
           <a:p>
             <a:fld id="{42A54C80-263E-416B-A8E0-580EDEADCBDC}" type="datetimeFigureOut">
               <a:rPr lang="en-US" dirty="0"/>
-              <a:t>8/20/2019</a:t>
+              <a:t>8/21/2019</a:t>
             </a:fld>
             <a:endParaRPr lang="en-US" dirty="0"/>
           </a:p>
@@ -8613,7 +8630,7 @@
             <a:fld id="{B61BEF0D-F0BB-DE4B-95CE-6DB70DBA9567}" type="datetimeFigureOut">
               <a:rPr lang="en-US" dirty="0"/>
               <a:pPr/>
-              <a:t>8/20/2019</a:t>
+              <a:t>8/21/2019</a:t>
             </a:fld>
             <a:endParaRPr lang="en-US" dirty="0"/>
           </a:p>
@@ -9353,7 +9370,7 @@
             <a:fld id="{B61BEF0D-F0BB-DE4B-95CE-6DB70DBA9567}" type="datetimeFigureOut">
               <a:rPr lang="en-US" dirty="0"/>
               <a:pPr/>
-              <a:t>8/20/2019</a:t>
+              <a:t>8/21/2019</a:t>
             </a:fld>
             <a:endParaRPr lang="en-US" dirty="0"/>
           </a:p>
@@ -12012,7 +12029,15 @@
           <a:p>
             <a:r>
               <a:rPr lang="en-US" sz="2400" dirty="0"/>
-              <a:t>Functional Interface: </a:t>
+              <a:t>Functional </a:t>
+            </a:r>
+            <a:r>
+              <a:rPr lang="en-US" sz="2400" dirty="0" smtClean="0"/>
+              <a:t>Method</a:t>
+            </a:r>
+            <a:r>
+              <a:rPr lang="en-US" sz="2400" dirty="0" smtClean="0"/>
+              <a:t>: </a:t>
             </a:r>
             <a:r>
               <a:rPr lang="fr-FR" sz="2400" dirty="0" err="1">
@@ -15567,7 +15592,23 @@
             </a:r>
             <a:r>
               <a:rPr lang="en-US" sz="2000" dirty="0"/>
-              <a:t> are used for constructors with arguments.</a:t>
+              <a:t> </a:t>
+            </a:r>
+            <a:r>
+              <a:rPr lang="en-US" sz="2000" dirty="0" smtClean="0"/>
+              <a:t>may </a:t>
+            </a:r>
+            <a:r>
+              <a:rPr lang="en-US" sz="2000" dirty="0" smtClean="0"/>
+              <a:t>be </a:t>
+            </a:r>
+            <a:r>
+              <a:rPr lang="en-US" sz="2000" dirty="0" smtClean="0"/>
+              <a:t>used </a:t>
+            </a:r>
+            <a:r>
+              <a:rPr lang="en-US" sz="2000" dirty="0"/>
+              <a:t>for constructors with arguments.</a:t>
             </a:r>
           </a:p>
         </p:txBody>
@@ -16542,7 +16583,7 @@
               <a:buNone/>
             </a:pPr>
             <a:r>
-              <a:rPr lang="en-US" sz="1600" dirty="0" err="1">
+              <a:rPr lang="en-US" sz="1600" dirty="0">
                 <a:solidFill>
                   <a:srgbClr val="8000FF"/>
                 </a:solidFill>
@@ -19265,7 +19306,7 @@
           <p:cNvPr id="2" name="Title 1">
             <a:extLst>
               <a:ext uri="{FF2B5EF4-FFF2-40B4-BE49-F238E27FC236}">
-                <a16:creationId xmlns:a16="http://schemas.microsoft.com/office/drawing/2014/main" xmlns="" id="{4BF41A3A-9BA9-D948-8BBC-74A05D841F3C}"/>
+                <a16:creationId xmlns="" xmlns:a16="http://schemas.microsoft.com/office/drawing/2014/main" id="{4BF41A3A-9BA9-D948-8BBC-74A05D841F3C}"/>
               </a:ext>
             </a:extLst>
           </p:cNvPr>
@@ -19293,7 +19334,7 @@
           <p:cNvPr id="3" name="Content Placeholder 2">
             <a:extLst>
               <a:ext uri="{FF2B5EF4-FFF2-40B4-BE49-F238E27FC236}">
-                <a16:creationId xmlns:a16="http://schemas.microsoft.com/office/drawing/2014/main" xmlns="" id="{767751D2-324B-034A-A6DB-931966979B81}"/>
+                <a16:creationId xmlns="" xmlns:a16="http://schemas.microsoft.com/office/drawing/2014/main" id="{767751D2-324B-034A-A6DB-931966979B81}"/>
               </a:ext>
             </a:extLst>
           </p:cNvPr>
@@ -19798,15 +19839,7 @@
           <a:p>
             <a:r>
               <a:rPr lang="en-US" sz="2400" dirty="0"/>
-              <a:t>Change values, but keep data type (</a:t>
-            </a:r>
-            <a:r>
-              <a:rPr lang="en-US" sz="2400" dirty="0" err="1"/>
-              <a:t>int</a:t>
-            </a:r>
-            <a:r>
-              <a:rPr lang="en-US" sz="2400" dirty="0"/>
-              <a:t>).</a:t>
+              <a:t>Change values, but keep data type (int).</a:t>
             </a:r>
           </a:p>
           <a:p>
@@ -20837,8 +20870,13 @@
           <a:p>
             <a:r>
               <a:rPr lang="en-US" dirty="0"/>
-              <a:t>Limit and Skip</a:t>
-            </a:r>
+              <a:t>Limit and </a:t>
+            </a:r>
+            <a:r>
+              <a:rPr lang="en-US" dirty="0" smtClean="0"/>
+              <a:t>Skip – Infinite Streams</a:t>
+            </a:r>
+            <a:endParaRPr lang="en-US" dirty="0"/>
           </a:p>
         </p:txBody>
       </p:sp>
@@ -21687,7 +21725,7 @@
           <p:cNvPr id="2" name="Title 1">
             <a:extLst>
               <a:ext uri="{FF2B5EF4-FFF2-40B4-BE49-F238E27FC236}">
-                <a16:creationId xmlns:a16="http://schemas.microsoft.com/office/drawing/2014/main" xmlns="" id="{187600CA-ED49-8A42-8AAC-B8CED9B598F6}"/>
+                <a16:creationId xmlns="" xmlns:a16="http://schemas.microsoft.com/office/drawing/2014/main" id="{187600CA-ED49-8A42-8AAC-B8CED9B598F6}"/>
               </a:ext>
             </a:extLst>
           </p:cNvPr>
@@ -21715,7 +21753,7 @@
           <p:cNvPr id="3" name="Content Placeholder 2">
             <a:extLst>
               <a:ext uri="{FF2B5EF4-FFF2-40B4-BE49-F238E27FC236}">
-                <a16:creationId xmlns:a16="http://schemas.microsoft.com/office/drawing/2014/main" xmlns="" id="{095A9095-A831-4445-8971-55AE4AD7D768}"/>
+                <a16:creationId xmlns="" xmlns:a16="http://schemas.microsoft.com/office/drawing/2014/main" id="{095A9095-A831-4445-8971-55AE4AD7D768}"/>
               </a:ext>
             </a:extLst>
           </p:cNvPr>
@@ -21773,7 +21811,7 @@
           <p:cNvPr id="2" name="Title 1">
             <a:extLst>
               <a:ext uri="{FF2B5EF4-FFF2-40B4-BE49-F238E27FC236}">
-                <a16:creationId xmlns:a16="http://schemas.microsoft.com/office/drawing/2014/main" xmlns="" id="{8F1FC55F-B025-1646-8698-4E547B39859F}"/>
+                <a16:creationId xmlns="" xmlns:a16="http://schemas.microsoft.com/office/drawing/2014/main" id="{8F1FC55F-B025-1646-8698-4E547B39859F}"/>
               </a:ext>
             </a:extLst>
           </p:cNvPr>
@@ -21801,7 +21839,7 @@
           <p:cNvPr id="3" name="Content Placeholder 2">
             <a:extLst>
               <a:ext uri="{FF2B5EF4-FFF2-40B4-BE49-F238E27FC236}">
-                <a16:creationId xmlns:a16="http://schemas.microsoft.com/office/drawing/2014/main" xmlns="" id="{212DEAB1-CB9C-0443-A7F4-896B0EDCEF7F}"/>
+                <a16:creationId xmlns="" xmlns:a16="http://schemas.microsoft.com/office/drawing/2014/main" id="{212DEAB1-CB9C-0443-A7F4-896B0EDCEF7F}"/>
               </a:ext>
             </a:extLst>
           </p:cNvPr>
@@ -22137,7 +22175,7 @@
         <p:spPr>
           <a:xfrm>
             <a:off x="677334" y="609600"/>
-            <a:ext cx="8596668" cy="1185863"/>
+            <a:ext cx="8676216" cy="1185863"/>
           </a:xfrm>
         </p:spPr>
         <p:txBody>
@@ -22148,13 +22186,8 @@
           <a:p>
             <a:r>
               <a:rPr lang="en-US" dirty="0"/>
-              <a:t>Terminal Operations that return Optional&lt;</a:t>
-            </a:r>
-            <a:r>
-              <a:rPr lang="en-US"/>
-              <a:t>T&gt;</a:t>
-            </a:r>
-            <a:endParaRPr lang="en-US" dirty="0"/>
+              <a:t>Terminal Operations that return Optional&lt;T&gt;</a:t>
+            </a:r>
           </a:p>
         </p:txBody>
       </p:sp>
@@ -22170,8 +22203,8 @@
         </p:nvSpPr>
         <p:spPr>
           <a:xfrm>
-            <a:off x="636865" y="1588163"/>
-            <a:ext cx="8596668" cy="4660237"/>
+            <a:off x="636865" y="1381125"/>
+            <a:ext cx="8596668" cy="4867275"/>
           </a:xfrm>
         </p:spPr>
         <p:txBody>
@@ -22235,36 +22268,50 @@
           </a:p>
           <a:p>
             <a:r>
-              <a:rPr lang="en-US" sz="2400"/>
-              <a:t>findFirst - </a:t>
+              <a:rPr lang="en-US" sz="2400" dirty="0" err="1"/>
+              <a:t>findFirst</a:t>
             </a:r>
             <a:r>
               <a:rPr lang="en-US" sz="2400" dirty="0"/>
-              <a:t>produces the first element in a stream.  Because this implies ordering of the elements, any parallel stream is transformed into a sequential stream to guarantee element encounter order</a:t>
-            </a:r>
-          </a:p>
-          <a:p>
-            <a:r>
-              <a:rPr lang="en-US" sz="2400" err="1"/>
+              <a:t> - produces the first element in a stream.  Because this implies ordering of the elements, any parallel stream is transformed into a sequential stream to guarantee element encounter order</a:t>
+            </a:r>
+          </a:p>
+          <a:p>
+            <a:r>
+              <a:rPr lang="en-US" sz="2400" dirty="0" err="1"/>
               <a:t>findAny</a:t>
             </a:r>
             <a:r>
-              <a:rPr lang="en-US" sz="2400"/>
-              <a:t> - produces </a:t>
-            </a:r>
-            <a:r>
               <a:rPr lang="en-US" sz="2400" dirty="0"/>
-              <a:t>any element on the stream.  It does not impose any overhead on parallel stream, but may produce differing values on invocation of the same stream.</a:t>
-            </a:r>
-          </a:p>
-          <a:p>
-            <a:r>
-              <a:rPr lang="en-US" sz="2400"/>
-              <a:t>Min - produces </a:t>
-            </a:r>
+              <a:t> - produces any element on the stream.  It does not impose any overhead on parallel stream, but may produce differing values on invocation of the same stream.</a:t>
+            </a:r>
+          </a:p>
+          <a:p>
             <a:r>
               <a:rPr lang="en-US" sz="2400" dirty="0"/>
-              <a:t>the minimal element, and max produces the maximum element.</a:t>
+              <a:t>m</a:t>
+            </a:r>
+            <a:r>
+              <a:rPr lang="en-US" sz="2400" dirty="0" smtClean="0"/>
+              <a:t>in </a:t>
+            </a:r>
+            <a:r>
+              <a:rPr lang="en-US" sz="2400" dirty="0"/>
+              <a:t>- produces the </a:t>
+            </a:r>
+            <a:r>
+              <a:rPr lang="en-US" sz="2400" dirty="0" smtClean="0"/>
+              <a:t>minimum element</a:t>
+            </a:r>
+          </a:p>
+          <a:p>
+            <a:r>
+              <a:rPr lang="en-US" sz="2400" dirty="0" smtClean="0"/>
+              <a:t>max - produces </a:t>
+            </a:r>
+            <a:r>
+              <a:rPr lang="en-US" sz="2400" dirty="0"/>
+              <a:t>the maximum element.</a:t>
             </a:r>
           </a:p>
         </p:txBody>
@@ -22304,7 +22351,7 @@
           <p:cNvPr id="2" name="Title 1">
             <a:extLst>
               <a:ext uri="{FF2B5EF4-FFF2-40B4-BE49-F238E27FC236}">
-                <a16:creationId xmlns:a16="http://schemas.microsoft.com/office/drawing/2014/main" xmlns="" id="{9D575015-E9F6-854A-84D4-7FAAE040C19B}"/>
+                <a16:creationId xmlns="" xmlns:a16="http://schemas.microsoft.com/office/drawing/2014/main" id="{9D575015-E9F6-854A-84D4-7FAAE040C19B}"/>
               </a:ext>
             </a:extLst>
           </p:cNvPr>
@@ -22337,7 +22384,7 @@
           <p:cNvPr id="3" name="Content Placeholder 2">
             <a:extLst>
               <a:ext uri="{FF2B5EF4-FFF2-40B4-BE49-F238E27FC236}">
-                <a16:creationId xmlns:a16="http://schemas.microsoft.com/office/drawing/2014/main" xmlns="" id="{D2856061-7E40-AE42-8E8F-D10F98FC1DD5}"/>
+                <a16:creationId xmlns="" xmlns:a16="http://schemas.microsoft.com/office/drawing/2014/main" id="{D2856061-7E40-AE42-8E8F-D10F98FC1DD5}"/>
               </a:ext>
             </a:extLst>
           </p:cNvPr>
@@ -27659,31 +27706,7 @@
                 </a:highlight>
                 <a:latin typeface="Courier New" panose="02070309020205020404" pitchFamily="49" charset="0"/>
               </a:rPr>
-              <a:t> </a:t>
-            </a:r>
-            <a:r>
-              <a:rPr lang="en-US" dirty="0" err="1">
-                <a:solidFill>
-                  <a:srgbClr val="000000"/>
-                </a:solidFill>
-                <a:highlight>
-                  <a:srgbClr val="FFFFFF"/>
-                </a:highlight>
-                <a:latin typeface="Courier New" panose="02070309020205020404" pitchFamily="49" charset="0"/>
-              </a:rPr>
-              <a:t>AutoCloseable</a:t>
-            </a:r>
-            <a:r>
-              <a:rPr lang="en-US" dirty="0">
-                <a:solidFill>
-                  <a:srgbClr val="000000"/>
-                </a:solidFill>
-                <a:highlight>
-                  <a:srgbClr val="FFFFFF"/>
-                </a:highlight>
-                <a:latin typeface="Courier New" panose="02070309020205020404" pitchFamily="49" charset="0"/>
-              </a:rPr>
-              <a:t> </a:t>
+              <a:t> AutoCloseable </a:t>
             </a:r>
             <a:r>
               <a:rPr lang="en-US" b="1" dirty="0">
@@ -28791,31 +28814,7 @@
                 </a:highlight>
                 <a:latin typeface="Courier New" panose="02070309020205020404" pitchFamily="49" charset="0"/>
               </a:rPr>
-              <a:t> </a:t>
-            </a:r>
-            <a:r>
-              <a:rPr lang="en-US" dirty="0" err="1">
-                <a:solidFill>
-                  <a:srgbClr val="000000"/>
-                </a:solidFill>
-                <a:highlight>
-                  <a:srgbClr val="FFFFFF"/>
-                </a:highlight>
-                <a:latin typeface="Courier New" panose="02070309020205020404" pitchFamily="49" charset="0"/>
-              </a:rPr>
-              <a:t>AutoCloseable</a:t>
-            </a:r>
-            <a:r>
-              <a:rPr lang="en-US" dirty="0">
-                <a:solidFill>
-                  <a:srgbClr val="000000"/>
-                </a:solidFill>
-                <a:highlight>
-                  <a:srgbClr val="FFFFFF"/>
-                </a:highlight>
-                <a:latin typeface="Courier New" panose="02070309020205020404" pitchFamily="49" charset="0"/>
-              </a:rPr>
-              <a:t> </a:t>
+              <a:t> AutoCloseable </a:t>
             </a:r>
             <a:r>
               <a:rPr lang="en-US" b="1" dirty="0">
@@ -29679,25 +29678,7 @@
                 </a:solidFill>
                 <a:latin typeface="Courier New" panose="02070309020205020404" pitchFamily="49" charset="0"/>
               </a:rPr>
-              <a:t> </a:t>
-            </a:r>
-            <a:r>
-              <a:rPr lang="en-US" sz="2000" dirty="0" err="1">
-                <a:solidFill>
-                  <a:srgbClr val="000000"/>
-                </a:solidFill>
-                <a:latin typeface="Courier New" panose="02070309020205020404" pitchFamily="49" charset="0"/>
-              </a:rPr>
-              <a:t>AutoCloseable</a:t>
-            </a:r>
-            <a:r>
-              <a:rPr lang="en-US" sz="2000" dirty="0">
-                <a:solidFill>
-                  <a:srgbClr val="000000"/>
-                </a:solidFill>
-                <a:latin typeface="Courier New" panose="02070309020205020404" pitchFamily="49" charset="0"/>
-              </a:rPr>
-              <a:t> </a:t>
+              <a:t> AutoCloseable </a:t>
             </a:r>
             <a:r>
               <a:rPr lang="en-US" sz="2000" b="1" dirty="0">
@@ -30684,8 +30665,8 @@
         </p:nvSpPr>
         <p:spPr>
           <a:xfrm>
-            <a:off x="677334" y="609600"/>
-            <a:ext cx="8596668" cy="945776"/>
+            <a:off x="677334" y="509588"/>
+            <a:ext cx="8596668" cy="1045788"/>
           </a:xfrm>
         </p:spPr>
         <p:txBody>
@@ -30711,12 +30692,14 @@
         </p:nvSpPr>
         <p:spPr>
           <a:xfrm>
-            <a:off x="677334" y="1815352"/>
-            <a:ext cx="8596668" cy="4513729"/>
+            <a:off x="677334" y="1404938"/>
+            <a:ext cx="8596668" cy="4924144"/>
           </a:xfrm>
         </p:spPr>
         <p:txBody>
-          <a:bodyPr/>
+          <a:bodyPr>
+            <a:normAutofit/>
+          </a:bodyPr>
           <a:lstStyle/>
           <a:p>
             <a:r>
@@ -31067,19 +31050,7 @@
                 </a:highlight>
                 <a:latin typeface="Courier New" panose="02070309020205020404" pitchFamily="49" charset="0"/>
               </a:rPr>
-              <a:t> </a:t>
-            </a:r>
-            <a:r>
-              <a:rPr lang="en-US" sz="2000" dirty="0" err="1">
-                <a:solidFill>
-                  <a:srgbClr val="000000"/>
-                </a:solidFill>
-                <a:highlight>
-                  <a:srgbClr val="FFFFFF"/>
-                </a:highlight>
-                <a:latin typeface="Courier New" panose="02070309020205020404" pitchFamily="49" charset="0"/>
-              </a:rPr>
-              <a:t>mkTestFunc</a:t>
+              <a:t> mkTestFunc</a:t>
             </a:r>
             <a:r>
               <a:rPr lang="en-US" sz="2000" b="1" dirty="0">
@@ -31094,7 +31065,7 @@
               <a:t>(</a:t>
             </a:r>
             <a:r>
-              <a:rPr lang="en-US" sz="2000" dirty="0" err="1">
+              <a:rPr lang="en-US" sz="2000" dirty="0">
                 <a:solidFill>
                   <a:srgbClr val="8000FF"/>
                 </a:solidFill>
@@ -31410,19 +31381,7 @@
                 </a:highlight>
                 <a:latin typeface="Courier New" panose="02070309020205020404" pitchFamily="49" charset="0"/>
               </a:rPr>
-              <a:t> </a:t>
-            </a:r>
-            <a:r>
-              <a:rPr lang="en-US" sz="2000" dirty="0" err="1">
-                <a:solidFill>
-                  <a:srgbClr val="000000"/>
-                </a:solidFill>
-                <a:highlight>
-                  <a:srgbClr val="FFFFFF"/>
-                </a:highlight>
-                <a:latin typeface="Courier New" panose="02070309020205020404" pitchFamily="49" charset="0"/>
-              </a:rPr>
-              <a:t>mkTestFunc</a:t>
+              <a:t> mkTestFunc</a:t>
             </a:r>
             <a:r>
               <a:rPr lang="en-US" sz="2000" b="1" dirty="0">
@@ -31799,8 +31758,180 @@
                 </a:highlight>
                 <a:latin typeface="Courier New" panose="02070309020205020404" pitchFamily="49" charset="0"/>
               </a:rPr>
+              <a:t>// Does not </a:t>
+            </a:r>
+            <a:r>
+              <a:rPr lang="en-US" sz="2000" dirty="0" smtClean="0">
+                <a:solidFill>
+                  <a:srgbClr val="008000"/>
+                </a:solidFill>
+                <a:highlight>
+                  <a:srgbClr val="FFFFFF"/>
+                </a:highlight>
+                <a:latin typeface="Courier New" panose="02070309020205020404" pitchFamily="49" charset="0"/>
+              </a:rPr>
+              <a:t>compile</a:t>
+            </a:r>
+          </a:p>
+          <a:p>
+            <a:r>
+              <a:rPr lang="en-US" sz="2000" dirty="0" err="1">
+                <a:solidFill>
+                  <a:srgbClr val="8000FF"/>
+                </a:solidFill>
+                <a:highlight>
+                  <a:srgbClr val="FFFFFF"/>
+                </a:highlight>
+                <a:latin typeface="Courier New" panose="02070309020205020404" pitchFamily="49" charset="0"/>
+              </a:rPr>
+              <a:t>v</a:t>
+            </a:r>
+            <a:r>
+              <a:rPr lang="en-US" sz="2000" dirty="0" err="1" smtClean="0">
+                <a:solidFill>
+                  <a:srgbClr val="8000FF"/>
+                </a:solidFill>
+                <a:highlight>
+                  <a:srgbClr val="FFFFFF"/>
+                </a:highlight>
+                <a:latin typeface="Courier New" panose="02070309020205020404" pitchFamily="49" charset="0"/>
+              </a:rPr>
+              <a:t>ar</a:t>
+            </a:r>
+            <a:r>
+              <a:rPr lang="en-US" sz="2000" dirty="0" smtClean="0">
+                <a:solidFill>
+                  <a:srgbClr val="8000FF"/>
+                </a:solidFill>
+                <a:highlight>
+                  <a:srgbClr val="FFFFFF"/>
+                </a:highlight>
+                <a:latin typeface="Courier New" panose="02070309020205020404" pitchFamily="49" charset="0"/>
+              </a:rPr>
+              <a:t> </a:t>
+            </a:r>
+            <a:r>
+              <a:rPr lang="en-US" sz="2000" dirty="0" smtClean="0">
+                <a:solidFill>
+                  <a:srgbClr val="000000"/>
+                </a:solidFill>
+                <a:highlight>
+                  <a:srgbClr val="FFFFFF"/>
+                </a:highlight>
+                <a:latin typeface="Courier New" panose="02070309020205020404" pitchFamily="49" charset="0"/>
+              </a:rPr>
+              <a:t>unknown</a:t>
+            </a:r>
+            <a:r>
+              <a:rPr lang="en-US" sz="2000" dirty="0" smtClean="0">
+                <a:solidFill>
+                  <a:srgbClr val="000000"/>
+                </a:solidFill>
+                <a:latin typeface="Courier New" panose="02070309020205020404" pitchFamily="49" charset="0"/>
+              </a:rPr>
+              <a:t>Type </a:t>
+            </a:r>
+            <a:r>
+              <a:rPr lang="en-US" sz="2000" b="1" dirty="0" smtClean="0">
+                <a:solidFill>
+                  <a:srgbClr val="000080"/>
+                </a:solidFill>
+                <a:latin typeface="Courier New" panose="02070309020205020404" pitchFamily="49" charset="0"/>
+              </a:rPr>
+              <a:t>= </a:t>
+            </a:r>
+            <a:r>
+              <a:rPr lang="en-US" sz="2000" dirty="0">
+                <a:solidFill>
+                  <a:srgbClr val="000000"/>
+                </a:solidFill>
+                <a:latin typeface="Courier New" panose="02070309020205020404" pitchFamily="49" charset="0"/>
+              </a:rPr>
+              <a:t>n </a:t>
+            </a:r>
+            <a:r>
+              <a:rPr lang="en-US" sz="2000" b="1" dirty="0">
+                <a:solidFill>
+                  <a:srgbClr val="000080"/>
+                </a:solidFill>
+                <a:latin typeface="Courier New" panose="02070309020205020404" pitchFamily="49" charset="0"/>
+              </a:rPr>
+              <a:t>-&gt;</a:t>
+            </a:r>
+            <a:r>
+              <a:rPr lang="en-US" sz="2000" dirty="0">
+                <a:solidFill>
+                  <a:srgbClr val="000000"/>
+                </a:solidFill>
+                <a:latin typeface="Courier New" panose="02070309020205020404" pitchFamily="49" charset="0"/>
+              </a:rPr>
+              <a:t> n </a:t>
+            </a:r>
+            <a:r>
+              <a:rPr lang="en-US" sz="2000" b="1" dirty="0">
+                <a:solidFill>
+                  <a:srgbClr val="000080"/>
+                </a:solidFill>
+                <a:latin typeface="Courier New" panose="02070309020205020404" pitchFamily="49" charset="0"/>
+              </a:rPr>
+              <a:t>==</a:t>
+            </a:r>
+            <a:r>
+              <a:rPr lang="en-US" sz="2000" dirty="0">
+                <a:solidFill>
+                  <a:srgbClr val="000000"/>
+                </a:solidFill>
+                <a:latin typeface="Courier New" panose="02070309020205020404" pitchFamily="49" charset="0"/>
+              </a:rPr>
+              <a:t> </a:t>
+            </a:r>
+            <a:r>
+              <a:rPr lang="en-US" sz="2000" dirty="0" smtClean="0">
+                <a:solidFill>
+                  <a:srgbClr val="FF8000"/>
+                </a:solidFill>
+                <a:latin typeface="Courier New" panose="02070309020205020404" pitchFamily="49" charset="0"/>
+              </a:rPr>
+              <a:t>5</a:t>
+            </a:r>
+            <a:r>
+              <a:rPr lang="en-US" sz="2000" b="1" dirty="0" smtClean="0">
+                <a:solidFill>
+                  <a:srgbClr val="000080"/>
+                </a:solidFill>
+                <a:highlight>
+                  <a:srgbClr val="FFFFFF"/>
+                </a:highlight>
+                <a:latin typeface="Courier New" panose="02070309020205020404" pitchFamily="49" charset="0"/>
+              </a:rPr>
+              <a:t>;</a:t>
+            </a:r>
+            <a:r>
+              <a:rPr lang="en-US" sz="2000" dirty="0" smtClean="0">
+                <a:solidFill>
+                  <a:srgbClr val="000000"/>
+                </a:solidFill>
+                <a:highlight>
+                  <a:srgbClr val="FFFFFF"/>
+                </a:highlight>
+                <a:latin typeface="Courier New" panose="02070309020205020404" pitchFamily="49" charset="0"/>
+              </a:rPr>
+              <a:t> </a:t>
+            </a:r>
+            <a:r>
+              <a:rPr lang="en-US" sz="2000" dirty="0">
+                <a:solidFill>
+                  <a:srgbClr val="008000"/>
+                </a:solidFill>
+                <a:highlight>
+                  <a:srgbClr val="FFFFFF"/>
+                </a:highlight>
+                <a:latin typeface="Courier New" panose="02070309020205020404" pitchFamily="49" charset="0"/>
+              </a:rPr>
               <a:t>// Does not compile</a:t>
             </a:r>
+          </a:p>
+          <a:p>
             <a:endParaRPr lang="en-US" sz="2000" dirty="0"/>
           </a:p>
           <a:p>
@@ -32139,25 +32270,7 @@
                 </a:solidFill>
                 <a:latin typeface="Courier New" panose="02070309020205020404" pitchFamily="49" charset="0"/>
               </a:rPr>
-              <a:t> </a:t>
-            </a:r>
-            <a:r>
-              <a:rPr lang="en-US" dirty="0" err="1">
-                <a:solidFill>
-                  <a:srgbClr val="000000"/>
-                </a:solidFill>
-                <a:latin typeface="Courier New" panose="02070309020205020404" pitchFamily="49" charset="0"/>
-              </a:rPr>
-              <a:t>AutoCloseable</a:t>
-            </a:r>
-            <a:r>
-              <a:rPr lang="en-US" dirty="0">
-                <a:solidFill>
-                  <a:srgbClr val="000000"/>
-                </a:solidFill>
-                <a:latin typeface="Courier New" panose="02070309020205020404" pitchFamily="49" charset="0"/>
-              </a:rPr>
-              <a:t> </a:t>
+              <a:t> AutoCloseable </a:t>
             </a:r>
             <a:r>
               <a:rPr lang="en-US" b="1" dirty="0">
@@ -32350,22 +32463,13 @@
               <a:t>(</a:t>
             </a:r>
             <a:r>
-              <a:rPr lang="en-US" dirty="0" err="1">
-                <a:solidFill>
-                  <a:srgbClr val="000000"/>
-                </a:solidFill>
-                <a:latin typeface="Courier New" panose="02070309020205020404" pitchFamily="49" charset="0"/>
-              </a:rPr>
-              <a:t>AutoCloseable</a:t>
-            </a:r>
-            <a:r>
-              <a:rPr lang="en-US" dirty="0">
-                <a:solidFill>
-                  <a:srgbClr val="000000"/>
-                </a:solidFill>
-                <a:latin typeface="Courier New" panose="02070309020205020404" pitchFamily="49" charset="0"/>
-              </a:rPr>
-              <a:t> 	</a:t>
+              <a:rPr lang="en-US" dirty="0">
+                <a:solidFill>
+                  <a:srgbClr val="000000"/>
+                </a:solidFill>
+                <a:latin typeface="Courier New" panose="02070309020205020404" pitchFamily="49" charset="0"/>
+              </a:rPr>
+              <a:t>AutoCloseable 	</a:t>
             </a:r>
             <a:r>
               <a:rPr lang="en-US" dirty="0" err="1">
@@ -33717,7 +33821,51 @@
           <a:p>
             <a:r>
               <a:rPr lang="en-US" sz="2400" dirty="0"/>
-              <a:t>Provides generic functional interfaces to use as the target of try-with-resources statements.  Supports 0-5 checked exceptions.</a:t>
+              <a:t>Provides generic functional interfaces </a:t>
+            </a:r>
+            <a:r>
+              <a:rPr lang="en-US" sz="2400" dirty="0" smtClean="0"/>
+              <a:t>extending </a:t>
+            </a:r>
+            <a:r>
+              <a:rPr lang="en-US" sz="2400" dirty="0" smtClean="0">
+                <a:solidFill>
+                  <a:srgbClr val="000000"/>
+                </a:solidFill>
+                <a:highlight>
+                  <a:srgbClr val="FFFFFF"/>
+                </a:highlight>
+                <a:latin typeface="Courier New" panose="02070309020205020404" pitchFamily="49" charset="0"/>
+              </a:rPr>
+              <a:t>AutoCloseable</a:t>
+            </a:r>
+            <a:r>
+              <a:rPr lang="en-US" sz="2400" dirty="0" smtClean="0"/>
+              <a:t> </a:t>
+            </a:r>
+            <a:r>
+              <a:rPr lang="en-US" sz="2400" dirty="0"/>
+              <a:t>to </a:t>
+            </a:r>
+            <a:r>
+              <a:rPr lang="en-US" sz="2400" dirty="0"/>
+              <a:t>use as </a:t>
+            </a:r>
+            <a:r>
+              <a:rPr lang="en-US" sz="2400" dirty="0" smtClean="0"/>
+              <a:t>the </a:t>
+            </a:r>
+            <a:r>
+              <a:rPr lang="en-US" sz="2400" dirty="0"/>
+              <a:t>target of try-with-resources </a:t>
+            </a:r>
+            <a:r>
+              <a:rPr lang="en-US" sz="2400" dirty="0" smtClean="0"/>
+              <a:t>lambdas.  </a:t>
+            </a:r>
+            <a:r>
+              <a:rPr lang="en-US" sz="2400" dirty="0"/>
+              <a:t>Supports 0-5 checked exceptions.</a:t>
             </a:r>
           </a:p>
           <a:p>
@@ -34542,7 +34690,7 @@
               <a:t>    </a:t>
             </a:r>
             <a:r>
-              <a:rPr lang="en-US" sz="2800" b="1" dirty="0" err="1">
+              <a:rPr lang="en-US" sz="2800" b="1" dirty="0">
                 <a:solidFill>
                   <a:srgbClr val="8000FF"/>
                 </a:solidFill>
@@ -34732,7 +34880,7 @@
               <a:t>    </a:t>
             </a:r>
             <a:r>
-              <a:rPr lang="en-US" dirty="0" err="1">
+              <a:rPr lang="en-US" dirty="0">
                 <a:solidFill>
                   <a:srgbClr val="8000FF"/>
                 </a:solidFill>
@@ -34845,7 +34993,7 @@
               <a:t> </a:t>
             </a:r>
             <a:r>
-              <a:rPr lang="en-US" dirty="0" err="1">
+              <a:rPr lang="en-US" dirty="0">
                 <a:solidFill>
                   <a:srgbClr val="8000FF"/>
                 </a:solidFill>
@@ -35003,7 +35151,7 @@
               <a:t> </a:t>
             </a:r>
             <a:r>
-              <a:rPr lang="en-US" dirty="0" err="1">
+              <a:rPr lang="en-US" dirty="0">
                 <a:solidFill>
                   <a:srgbClr val="8000FF"/>
                 </a:solidFill>
@@ -35832,7 +35980,7 @@
               <a:t> </a:t>
             </a:r>
             <a:r>
-              <a:rPr lang="en-US" sz="2400" dirty="0" err="1">
+              <a:rPr lang="en-US" sz="2400" dirty="0">
                 <a:solidFill>
                   <a:srgbClr val="8000FF"/>
                 </a:solidFill>

</xml_diff>

<commit_message>
Add definition of reduction to the first slide the word is mentioned.
</commit_message>
<xml_diff>
--- a/Learning to Love the Lambda in the Stream.pptx
+++ b/Learning to Love the Lambda in the Stream.pptx
@@ -364,7 +364,7 @@
           <a:p>
             <a:fld id="{00F927AF-B093-4AD4-B894-C7B744C95185}" type="datetimeFigureOut">
               <a:rPr lang="en-US" smtClean="0"/>
-              <a:t>8/23/2019</a:t>
+              <a:t>8/16/2020</a:t>
             </a:fld>
             <a:endParaRPr lang="en-US"/>
           </a:p>
@@ -2126,18 +2126,27 @@
             </a:r>
             <a:r>
               <a:rPr lang="en-US" baseline="0" dirty="0" smtClean="0"/>
-              <a:t> processes all the values but isn’t considered a reduction </a:t>
-            </a:r>
-            <a:r>
-              <a:rPr lang="en-US" baseline="0" smtClean="0"/>
-              <a:t>because </a:t>
-            </a:r>
-            <a:endParaRPr lang="en-US" dirty="0"/>
-          </a:p>
-          <a:p>
+              <a:t> processes all the values but isn’t considered a reduction because </a:t>
+            </a:r>
+            <a:r>
+              <a:rPr lang="en-US" baseline="0" dirty="0" smtClean="0"/>
+              <a:t>it does not return a value.</a:t>
+            </a:r>
+            <a:r>
+              <a:rPr lang="en-US" baseline="0" dirty="0"/>
+              <a:t> </a:t>
+            </a:r>
+            <a:r>
+              <a:rPr lang="en-US" baseline="0" dirty="0" smtClean="0"/>
+              <a:t> </a:t>
+            </a:r>
+            <a:r>
+              <a:rPr lang="en-US" dirty="0" smtClean="0"/>
+              <a:t>Never </a:t>
+            </a:r>
             <a:r>
               <a:rPr lang="en-US" dirty="0"/>
-              <a:t>Never use any reduction </a:t>
+              <a:t>use any reduction </a:t>
             </a:r>
             <a:r>
               <a:rPr lang="en-US" dirty="0" smtClean="0"/>
@@ -4931,7 +4940,7 @@
             <a:fld id="{B61BEF0D-F0BB-DE4B-95CE-6DB70DBA9567}" type="datetimeFigureOut">
               <a:rPr lang="en-US" dirty="0"/>
               <a:pPr/>
-              <a:t>8/23/2019</a:t>
+              <a:t>8/16/2020</a:t>
             </a:fld>
             <a:endParaRPr lang="en-US" dirty="0"/>
           </a:p>
@@ -5179,7 +5188,7 @@
             <a:fld id="{B61BEF0D-F0BB-DE4B-95CE-6DB70DBA9567}" type="datetimeFigureOut">
               <a:rPr lang="en-US" dirty="0"/>
               <a:pPr/>
-              <a:t>8/23/2019</a:t>
+              <a:t>8/16/2020</a:t>
             </a:fld>
             <a:endParaRPr lang="en-US" dirty="0"/>
           </a:p>
@@ -5490,7 +5499,7 @@
             <a:fld id="{B61BEF0D-F0BB-DE4B-95CE-6DB70DBA9567}" type="datetimeFigureOut">
               <a:rPr lang="en-US" dirty="0"/>
               <a:pPr/>
-              <a:t>8/23/2019</a:t>
+              <a:t>8/16/2020</a:t>
             </a:fld>
             <a:endParaRPr lang="en-US" dirty="0"/>
           </a:p>
@@ -5828,7 +5837,7 @@
             <a:fld id="{B61BEF0D-F0BB-DE4B-95CE-6DB70DBA9567}" type="datetimeFigureOut">
               <a:rPr lang="en-US" dirty="0"/>
               <a:pPr/>
-              <a:t>8/23/2019</a:t>
+              <a:t>8/16/2020</a:t>
             </a:fld>
             <a:endParaRPr lang="en-US" dirty="0"/>
           </a:p>
@@ -6139,7 +6148,7 @@
             <a:fld id="{B61BEF0D-F0BB-DE4B-95CE-6DB70DBA9567}" type="datetimeFigureOut">
               <a:rPr lang="en-US" dirty="0"/>
               <a:pPr/>
-              <a:t>8/23/2019</a:t>
+              <a:t>8/16/2020</a:t>
             </a:fld>
             <a:endParaRPr lang="en-US" dirty="0"/>
           </a:p>
@@ -6529,7 +6538,7 @@
             <a:fld id="{B61BEF0D-F0BB-DE4B-95CE-6DB70DBA9567}" type="datetimeFigureOut">
               <a:rPr lang="en-US" dirty="0"/>
               <a:pPr/>
-              <a:t>8/23/2019</a:t>
+              <a:t>8/16/2020</a:t>
             </a:fld>
             <a:endParaRPr lang="en-US" dirty="0"/>
           </a:p>
@@ -6695,7 +6704,7 @@
           <a:p>
             <a:fld id="{55C6B4A9-1611-4792-9094-5F34BCA07E0B}" type="datetimeFigureOut">
               <a:rPr lang="en-US" dirty="0"/>
-              <a:t>8/23/2019</a:t>
+              <a:t>8/16/2020</a:t>
             </a:fld>
             <a:endParaRPr lang="en-US" dirty="0"/>
           </a:p>
@@ -6871,7 +6880,7 @@
             <a:fld id="{B61BEF0D-F0BB-DE4B-95CE-6DB70DBA9567}" type="datetimeFigureOut">
               <a:rPr lang="en-US" dirty="0"/>
               <a:pPr/>
-              <a:t>8/23/2019</a:t>
+              <a:t>8/16/2020</a:t>
             </a:fld>
             <a:endParaRPr lang="en-US" dirty="0"/>
           </a:p>
@@ -7044,7 +7053,7 @@
             <a:fld id="{B61BEF0D-F0BB-DE4B-95CE-6DB70DBA9567}" type="datetimeFigureOut">
               <a:rPr lang="en-US" dirty="0"/>
               <a:pPr/>
-              <a:t>8/23/2019</a:t>
+              <a:t>8/16/2020</a:t>
             </a:fld>
             <a:endParaRPr lang="en-US" dirty="0"/>
           </a:p>
@@ -7288,7 +7297,7 @@
             <a:fld id="{B61BEF0D-F0BB-DE4B-95CE-6DB70DBA9567}" type="datetimeFigureOut">
               <a:rPr lang="en-US" dirty="0"/>
               <a:pPr/>
-              <a:t>8/23/2019</a:t>
+              <a:t>8/16/2020</a:t>
             </a:fld>
             <a:endParaRPr lang="en-US" dirty="0"/>
           </a:p>
@@ -7516,7 +7525,7 @@
           <a:p>
             <a:fld id="{EB712588-04B1-427B-82EE-E8DB90309F08}" type="datetimeFigureOut">
               <a:rPr lang="en-US" dirty="0"/>
-              <a:t>8/23/2019</a:t>
+              <a:t>8/16/2020</a:t>
             </a:fld>
             <a:endParaRPr lang="en-US" dirty="0"/>
           </a:p>
@@ -7886,7 +7895,7 @@
             <a:fld id="{B61BEF0D-F0BB-DE4B-95CE-6DB70DBA9567}" type="datetimeFigureOut">
               <a:rPr lang="en-US" dirty="0"/>
               <a:pPr/>
-              <a:t>8/23/2019</a:t>
+              <a:t>8/16/2020</a:t>
             </a:fld>
             <a:endParaRPr lang="en-US" dirty="0"/>
           </a:p>
@@ -8006,7 +8015,7 @@
             <a:fld id="{B61BEF0D-F0BB-DE4B-95CE-6DB70DBA9567}" type="datetimeFigureOut">
               <a:rPr lang="en-US" dirty="0"/>
               <a:pPr/>
-              <a:t>8/23/2019</a:t>
+              <a:t>8/16/2020</a:t>
             </a:fld>
             <a:endParaRPr lang="en-US" dirty="0"/>
           </a:p>
@@ -8098,7 +8107,7 @@
             <a:fld id="{B61BEF0D-F0BB-DE4B-95CE-6DB70DBA9567}" type="datetimeFigureOut">
               <a:rPr lang="en-US" dirty="0"/>
               <a:pPr/>
-              <a:t>8/23/2019</a:t>
+              <a:t>8/16/2020</a:t>
             </a:fld>
             <a:endParaRPr lang="en-US" dirty="0"/>
           </a:p>
@@ -8349,7 +8358,7 @@
           <a:p>
             <a:fld id="{42A54C80-263E-416B-A8E0-580EDEADCBDC}" type="datetimeFigureOut">
               <a:rPr lang="en-US" dirty="0"/>
-              <a:t>8/23/2019</a:t>
+              <a:t>8/16/2020</a:t>
             </a:fld>
             <a:endParaRPr lang="en-US" dirty="0"/>
           </a:p>
@@ -8608,7 +8617,7 @@
             <a:fld id="{B61BEF0D-F0BB-DE4B-95CE-6DB70DBA9567}" type="datetimeFigureOut">
               <a:rPr lang="en-US" dirty="0"/>
               <a:pPr/>
-              <a:t>8/23/2019</a:t>
+              <a:t>8/16/2020</a:t>
             </a:fld>
             <a:endParaRPr lang="en-US" dirty="0"/>
           </a:p>
@@ -9348,7 +9357,7 @@
             <a:fld id="{B61BEF0D-F0BB-DE4B-95CE-6DB70DBA9567}" type="datetimeFigureOut">
               <a:rPr lang="en-US" dirty="0"/>
               <a:pPr/>
-              <a:t>8/23/2019</a:t>
+              <a:t>8/16/2020</a:t>
             </a:fld>
             <a:endParaRPr lang="en-US" dirty="0"/>
           </a:p>
@@ -19079,7 +19088,7 @@
           <p:cNvPr id="2" name="Title 1">
             <a:extLst>
               <a:ext uri="{FF2B5EF4-FFF2-40B4-BE49-F238E27FC236}">
-                <a16:creationId xmlns:a16="http://schemas.microsoft.com/office/drawing/2014/main" xmlns="" id="{4BF41A3A-9BA9-D948-8BBC-74A05D841F3C}"/>
+                <a16:creationId xmlns="" xmlns:a16="http://schemas.microsoft.com/office/drawing/2014/main" id="{4BF41A3A-9BA9-D948-8BBC-74A05D841F3C}"/>
               </a:ext>
             </a:extLst>
           </p:cNvPr>
@@ -19107,7 +19116,7 @@
           <p:cNvPr id="3" name="Content Placeholder 2">
             <a:extLst>
               <a:ext uri="{FF2B5EF4-FFF2-40B4-BE49-F238E27FC236}">
-                <a16:creationId xmlns:a16="http://schemas.microsoft.com/office/drawing/2014/main" xmlns="" id="{767751D2-324B-034A-A6DB-931966979B81}"/>
+                <a16:creationId xmlns="" xmlns:a16="http://schemas.microsoft.com/office/drawing/2014/main" id="{767751D2-324B-034A-A6DB-931966979B81}"/>
               </a:ext>
             </a:extLst>
           </p:cNvPr>
@@ -21617,7 +21626,7 @@
           <p:cNvPr id="2" name="Title 1">
             <a:extLst>
               <a:ext uri="{FF2B5EF4-FFF2-40B4-BE49-F238E27FC236}">
-                <a16:creationId xmlns:a16="http://schemas.microsoft.com/office/drawing/2014/main" xmlns="" id="{187600CA-ED49-8A42-8AAC-B8CED9B598F6}"/>
+                <a16:creationId xmlns="" xmlns:a16="http://schemas.microsoft.com/office/drawing/2014/main" id="{187600CA-ED49-8A42-8AAC-B8CED9B598F6}"/>
               </a:ext>
             </a:extLst>
           </p:cNvPr>
@@ -21645,7 +21654,7 @@
           <p:cNvPr id="3" name="Content Placeholder 2">
             <a:extLst>
               <a:ext uri="{FF2B5EF4-FFF2-40B4-BE49-F238E27FC236}">
-                <a16:creationId xmlns:a16="http://schemas.microsoft.com/office/drawing/2014/main" xmlns="" id="{095A9095-A831-4445-8971-55AE4AD7D768}"/>
+                <a16:creationId xmlns="" xmlns:a16="http://schemas.microsoft.com/office/drawing/2014/main" id="{095A9095-A831-4445-8971-55AE4AD7D768}"/>
               </a:ext>
             </a:extLst>
           </p:cNvPr>
@@ -21703,7 +21712,7 @@
           <p:cNvPr id="2" name="Title 1">
             <a:extLst>
               <a:ext uri="{FF2B5EF4-FFF2-40B4-BE49-F238E27FC236}">
-                <a16:creationId xmlns:a16="http://schemas.microsoft.com/office/drawing/2014/main" xmlns="" id="{8F1FC55F-B025-1646-8698-4E547B39859F}"/>
+                <a16:creationId xmlns="" xmlns:a16="http://schemas.microsoft.com/office/drawing/2014/main" id="{8F1FC55F-B025-1646-8698-4E547B39859F}"/>
               </a:ext>
             </a:extLst>
           </p:cNvPr>
@@ -21714,13 +21723,20 @@
             <p:ph type="title"/>
           </p:nvPr>
         </p:nvSpPr>
-        <p:spPr/>
+        <p:spPr>
+          <a:xfrm>
+            <a:off x="677334" y="328246"/>
+            <a:ext cx="8596668" cy="696686"/>
+          </a:xfrm>
+        </p:spPr>
         <p:txBody>
-          <a:bodyPr/>
+          <a:bodyPr>
+            <a:normAutofit/>
+          </a:bodyPr>
           <a:lstStyle/>
           <a:p>
             <a:r>
-              <a:rPr lang="en-US"/>
+              <a:rPr lang="en-US" dirty="0"/>
               <a:t>Terminal Operations</a:t>
             </a:r>
           </a:p>
@@ -21731,7 +21747,7 @@
           <p:cNvPr id="3" name="Content Placeholder 2">
             <a:extLst>
               <a:ext uri="{FF2B5EF4-FFF2-40B4-BE49-F238E27FC236}">
-                <a16:creationId xmlns:a16="http://schemas.microsoft.com/office/drawing/2014/main" xmlns="" id="{212DEAB1-CB9C-0443-A7F4-896B0EDCEF7F}"/>
+                <a16:creationId xmlns="" xmlns:a16="http://schemas.microsoft.com/office/drawing/2014/main" id="{212DEAB1-CB9C-0443-A7F4-896B0EDCEF7F}"/>
               </a:ext>
             </a:extLst>
           </p:cNvPr>
@@ -21744,8 +21760,8 @@
         </p:nvSpPr>
         <p:spPr>
           <a:xfrm>
-            <a:off x="677334" y="1433423"/>
-            <a:ext cx="8596668" cy="4727891"/>
+            <a:off x="677333" y="949570"/>
+            <a:ext cx="8596669" cy="5481376"/>
           </a:xfrm>
         </p:spPr>
         <p:txBody>
@@ -21755,8 +21771,12 @@
           <a:lstStyle/>
           <a:p>
             <a:r>
+              <a:rPr lang="en-US" sz="2000" dirty="0" smtClean="0"/>
+              <a:t>count </a:t>
+            </a:r>
+            <a:r>
               <a:rPr lang="en-US" sz="2000" dirty="0"/>
-              <a:t>count – A </a:t>
+              <a:t>– A </a:t>
             </a:r>
             <a:r>
               <a:rPr lang="en-US" sz="2000" i="1" dirty="0"/>
@@ -22019,8 +22039,19 @@
             </a:r>
             <a:r>
               <a:rPr lang="en-US" sz="2000" dirty="0"/>
-              <a:t> for processing.</a:t>
-            </a:r>
+              <a:t> for processing</a:t>
+            </a:r>
+            <a:r>
+              <a:rPr lang="en-US" sz="2000" dirty="0" smtClean="0"/>
+              <a:t>.</a:t>
+            </a:r>
+          </a:p>
+          <a:p>
+            <a:r>
+              <a:rPr lang="en-US" sz="2000" dirty="0" smtClean="0"/>
+              <a:t>A reduction is an operation that computes a single value by processing all the values on the stream. Never use on an infinite stream.</a:t>
+            </a:r>
+            <a:endParaRPr lang="en-US" sz="2000" dirty="0"/>
           </a:p>
         </p:txBody>
       </p:sp>
@@ -22243,7 +22274,7 @@
           <p:cNvPr id="2" name="Title 1">
             <a:extLst>
               <a:ext uri="{FF2B5EF4-FFF2-40B4-BE49-F238E27FC236}">
-                <a16:creationId xmlns:a16="http://schemas.microsoft.com/office/drawing/2014/main" xmlns="" id="{9D575015-E9F6-854A-84D4-7FAAE040C19B}"/>
+                <a16:creationId xmlns="" xmlns:a16="http://schemas.microsoft.com/office/drawing/2014/main" id="{9D575015-E9F6-854A-84D4-7FAAE040C19B}"/>
               </a:ext>
             </a:extLst>
           </p:cNvPr>
@@ -22276,7 +22307,7 @@
           <p:cNvPr id="3" name="Content Placeholder 2">
             <a:extLst>
               <a:ext uri="{FF2B5EF4-FFF2-40B4-BE49-F238E27FC236}">
-                <a16:creationId xmlns:a16="http://schemas.microsoft.com/office/drawing/2014/main" xmlns="" id="{D2856061-7E40-AE42-8E8F-D10F98FC1DD5}"/>
+                <a16:creationId xmlns="" xmlns:a16="http://schemas.microsoft.com/office/drawing/2014/main" id="{D2856061-7E40-AE42-8E8F-D10F98FC1DD5}"/>
               </a:ext>
             </a:extLst>
           </p:cNvPr>

</xml_diff>

<commit_message>
Finish updating the speaker notes.
</commit_message>
<xml_diff>
--- a/Learning to Love the Lambda in the Stream.pptx
+++ b/Learning to Love the Lambda in the Stream.pptx
@@ -364,7 +364,7 @@
           <a:p>
             <a:fld id="{00F927AF-B093-4AD4-B894-C7B744C95185}" type="datetimeFigureOut">
               <a:rPr lang="en-US" smtClean="0"/>
-              <a:t>8/17/2020</a:t>
+              <a:t>8/18/2020</a:t>
             </a:fld>
             <a:endParaRPr lang="en-US"/>
           </a:p>
@@ -778,7 +778,15 @@
             </a:pPr>
             <a:r>
               <a:rPr lang="en-US" dirty="0" smtClean="0"/>
-              <a:t>The consumer is typically used to “do something” to a value.  The </a:t>
+              <a:t>The consumer is typically used to “do something” </a:t>
+            </a:r>
+            <a:r>
+              <a:rPr lang="en-US" dirty="0" smtClean="0"/>
+              <a:t>with </a:t>
+            </a:r>
+            <a:r>
+              <a:rPr lang="en-US" dirty="0" smtClean="0"/>
+              <a:t>a value.  The </a:t>
             </a:r>
             <a:r>
               <a:rPr lang="en-US" dirty="0" err="1"/>
@@ -1010,7 +1018,15 @@
             </a:r>
             <a:r>
               <a:rPr lang="en-US" baseline="0" dirty="0"/>
-              <a:t> Functions because the cross product of going to and from each primitive are supported.</a:t>
+              <a:t> Functions because the </a:t>
+            </a:r>
+            <a:r>
+              <a:rPr lang="en-US" baseline="0" dirty="0" smtClean="0"/>
+              <a:t>all combinations </a:t>
+            </a:r>
+            <a:r>
+              <a:rPr lang="en-US" baseline="0" dirty="0"/>
+              <a:t>of going to and from each primitive are supported.</a:t>
             </a:r>
             <a:endParaRPr lang="en-US" dirty="0"/>
           </a:p>
@@ -1346,7 +1362,11 @@
             </a:r>
             <a:r>
               <a:rPr lang="en-US" baseline="0" dirty="0" smtClean="0"/>
-              <a:t> which executes a Consumer when a value exists, and various get methods that obtain the value if it exists or perform another action if the value doesn’t exist.  In the first example, </a:t>
+              <a:t> which executes a Consumer when a value exists, and various get methods that obtain the value if it exists or perform another action if the value doesn’t exist.  In the first </a:t>
+            </a:r>
+            <a:r>
+              <a:rPr lang="en-US" baseline="0" dirty="0" smtClean="0"/>
+              <a:t>example below, </a:t>
             </a:r>
             <a:r>
               <a:rPr lang="en-US" baseline="0" dirty="0" err="1" smtClean="0"/>
@@ -1554,7 +1574,15 @@
             </a:r>
             <a:r>
               <a:rPr lang="en-US" baseline="0" dirty="0" smtClean="0"/>
-              <a:t> most straightforward method reference to understand is the static method reference.  The static method is bound to the functional interface, with the arguments in the static method bound in the same order they occur in the functional interface.</a:t>
+              <a:t> most straightforward method reference to understand is the static method reference</a:t>
+            </a:r>
+            <a:r>
+              <a:rPr lang="en-US" baseline="0" dirty="0" smtClean="0"/>
+              <a:t>.  The   </a:t>
+            </a:r>
+            <a:r>
+              <a:rPr lang="en-US" baseline="0" dirty="0" smtClean="0"/>
+              <a:t>The static method is bound to the functional interface, with the arguments in the static method bound in the same order they occur in the functional interface.</a:t>
             </a:r>
             <a:endParaRPr lang="en-US" dirty="0"/>
           </a:p>
@@ -1882,23 +1910,35 @@
             </a:r>
             <a:r>
               <a:rPr lang="en-US" dirty="0" smtClean="0"/>
-              <a:t>.  Members of the class where a lambda instance is declared,</a:t>
+              <a:t>.  Members of the class where a lambda </a:t>
+            </a:r>
+            <a:r>
+              <a:rPr lang="en-US" dirty="0" smtClean="0"/>
+              <a:t>is </a:t>
+            </a:r>
+            <a:r>
+              <a:rPr lang="en-US" dirty="0" smtClean="0"/>
+              <a:t>declared,</a:t>
             </a:r>
             <a:r>
               <a:rPr lang="en-US" baseline="0" dirty="0" smtClean="0"/>
-              <a:t> arguments and local variables that are effectively final may be referenced by a lambda.</a:t>
+              <a:t> arguments and local variables that are effectively final may be referenced by a lambda</a:t>
+            </a:r>
+            <a:r>
+              <a:rPr lang="en-US" baseline="0" dirty="0" smtClean="0"/>
+              <a:t>.  In Java, a lambda must be assigned to a functional interface.</a:t>
             </a:r>
             <a:r>
               <a:rPr lang="en-US" dirty="0" smtClean="0"/>
-              <a:t>  </a:t>
-            </a:r>
-            <a:r>
-              <a:rPr lang="en-US" dirty="0"/>
-              <a:t>If</a:t>
+              <a:t>  Effectively final means If</a:t>
+            </a:r>
+            <a:r>
+              <a:rPr lang="en-US" baseline="0" dirty="0" smtClean="0"/>
+              <a:t> </a:t>
             </a:r>
             <a:r>
               <a:rPr lang="en-US" baseline="0" dirty="0"/>
-              <a:t> you can take a local variable or argument, and add the keyword “final” without breaking compilation, it is effectively final.  The compiler infers that the variable is final even if it is not declared as such.</a:t>
+              <a:t>you can take a local variable or argument, and add the keyword “final” without breaking compilation, it is effectively final.  The compiler infers that the variable is final even if it is not declared as such.</a:t>
             </a:r>
             <a:endParaRPr lang="en-US" dirty="0"/>
           </a:p>
@@ -1985,8 +2025,28 @@
           <a:lstStyle/>
           <a:p>
             <a:r>
+              <a:rPr lang="en-US" dirty="0" smtClean="0"/>
+              <a:t>Recall that the </a:t>
+            </a:r>
+            <a:r>
+              <a:rPr lang="en-US" dirty="0" err="1" smtClean="0"/>
+              <a:t>UnaryOperator</a:t>
+            </a:r>
+            <a:r>
+              <a:rPr lang="en-US" dirty="0" smtClean="0"/>
+              <a:t> is a specialized</a:t>
+            </a:r>
+            <a:r>
+              <a:rPr lang="en-US" baseline="0" dirty="0" smtClean="0"/>
+              <a:t> function that returns the same type as its argument.  </a:t>
+            </a:r>
+            <a:r>
+              <a:rPr lang="en-US" dirty="0" smtClean="0"/>
+              <a:t>The </a:t>
+            </a:r>
+            <a:r>
               <a:rPr lang="en-US" dirty="0"/>
-              <a:t>The instance method reference can be the most difficult to understand.  Although the reference is named against the class, it is applied to an instance of the class by using the first argument of the lambda as the object instance to apply the method </a:t>
+              <a:t>instance method reference can be the most difficult to understand.  Although the reference is named against the class, it is applied to an instance of the class by using the first argument of the lambda as the object instance to apply the method </a:t>
             </a:r>
             <a:r>
               <a:rPr lang="en-US" dirty="0" smtClean="0"/>
@@ -2090,7 +2150,15 @@
             </a:r>
             <a:r>
               <a:rPr lang="en-US" baseline="0" dirty="0" smtClean="0"/>
-              <a:t> you are familiar with monads in functional programming, the Java stream shares many similarities with them.  The Java Stream framework has nothing to do with the IO Streams framework.</a:t>
+              <a:t> you are familiar with monads in functional programming, the Java stream shares many similarities with them</a:t>
+            </a:r>
+            <a:r>
+              <a:rPr lang="en-US" baseline="0" dirty="0" smtClean="0"/>
+              <a:t>.  </a:t>
+            </a:r>
+            <a:r>
+              <a:rPr lang="en-US" baseline="0" dirty="0" smtClean="0"/>
+              <a:t>The Java Stream framework has nothing to do with the IO Streams framework.</a:t>
             </a:r>
             <a:endParaRPr lang="en-US" dirty="0"/>
           </a:p>
@@ -2392,29 +2460,34 @@
           <a:bodyPr/>
           <a:lstStyle/>
           <a:p>
+            <a:pPr marL="0" marR="0" lvl="0" indent="0" algn="l" defTabSz="914400" rtl="0" eaLnBrk="1" fontAlgn="auto" latinLnBrk="0" hangingPunct="1">
+              <a:lnSpc>
+                <a:spcPct val="100000"/>
+              </a:lnSpc>
+              <a:spcBef>
+                <a:spcPts val="0"/>
+              </a:spcBef>
+              <a:spcAft>
+                <a:spcPts val="0"/>
+              </a:spcAft>
+              <a:buClrTx/>
+              <a:buSzTx/>
+              <a:buFontTx/>
+              <a:buNone/>
+              <a:tabLst/>
+              <a:defRPr/>
+            </a:pPr>
             <a:r>
               <a:rPr lang="en-US" i="1" dirty="0" smtClean="0"/>
               <a:t>Go over the slide as-is.  </a:t>
             </a:r>
             <a:r>
-              <a:rPr lang="en-US" dirty="0" smtClean="0"/>
-              <a:t>It is an exception to the pure</a:t>
-            </a:r>
-            <a:r>
-              <a:rPr lang="en-US" baseline="0" dirty="0" smtClean="0"/>
-              <a:t> function rule</a:t>
-            </a:r>
-            <a:r>
-              <a:rPr lang="en-US" dirty="0" smtClean="0"/>
-              <a:t> because it is usually used to do</a:t>
-            </a:r>
-            <a:r>
-              <a:rPr lang="en-US" baseline="0" dirty="0" smtClean="0"/>
-              <a:t> something with the elements, such as print them out. </a:t>
-            </a:r>
-            <a:r>
-              <a:rPr lang="en-US" dirty="0" smtClean="0"/>
-              <a:t>Next slide breaks this down. </a:t>
+              <a:rPr lang="en-US" i="0" dirty="0" smtClean="0"/>
+              <a:t>Consumers</a:t>
+            </a:r>
+            <a:r>
+              <a:rPr lang="en-US" i="0" baseline="0" dirty="0" smtClean="0"/>
+              <a:t> and Suppliers are exceptions to the pure function rule.  Consumers typically “do something” with a value such as print it to an external source. Only a Consumer that does nothing is a pure function.  Since that’s not useful, Consumers are generally never pure functions.  Suppliers that create a new instance with each call are not pure functions because they return a different value for the same void argument.   Suppliers that return a constant value are pure functions.</a:t>
             </a:r>
             <a:endParaRPr lang="en-US" dirty="0"/>
           </a:p>
@@ -2526,7 +2599,15 @@
             </a:r>
             <a:r>
               <a:rPr lang="en-US" baseline="0" dirty="0" smtClean="0"/>
-              <a:t>.</a:t>
+              <a:t>.  The identify property is passed as the second argument to the </a:t>
+            </a:r>
+            <a:r>
+              <a:rPr lang="en-US" baseline="0" dirty="0" err="1" smtClean="0"/>
+              <a:t>BinaryOperator</a:t>
+            </a:r>
+            <a:r>
+              <a:rPr lang="en-US" baseline="0" dirty="0" smtClean="0"/>
+              <a:t> the first time it is called.</a:t>
             </a:r>
             <a:endParaRPr lang="en-US" dirty="0"/>
           </a:p>
@@ -2714,15 +2795,23 @@
             </a:r>
             <a:r>
               <a:rPr lang="en-US" baseline="0" dirty="0" smtClean="0"/>
-              <a:t>.  Pure functions should be used if possible.</a:t>
-            </a:r>
-            <a:r>
-              <a:rPr lang="en-US" baseline="0" dirty="0"/>
-              <a:t> </a:t>
+              <a:t>.  Pure functions should be used if </a:t>
             </a:r>
             <a:r>
               <a:rPr lang="en-US" baseline="0" dirty="0" smtClean="0"/>
-              <a:t> In these examples it </a:t>
+              <a:t>possible.  The </a:t>
+            </a:r>
+            <a:r>
+              <a:rPr lang="en-US" baseline="0" dirty="0" err="1" smtClean="0"/>
+              <a:t>mapToObj</a:t>
+            </a:r>
+            <a:r>
+              <a:rPr lang="en-US" baseline="0" dirty="0" smtClean="0"/>
+              <a:t> lambda is a pure function because it returns its integer argument as a character.  </a:t>
+            </a:r>
+            <a:r>
+              <a:rPr lang="en-US" baseline="0" dirty="0" smtClean="0"/>
+              <a:t>In these examples it </a:t>
             </a:r>
             <a:r>
               <a:rPr lang="en-US" baseline="0" dirty="0"/>
@@ -2733,11 +2822,11 @@
               <a:t>operation for </a:t>
             </a:r>
             <a:r>
-              <a:rPr lang="en-US" baseline="0"/>
+              <a:rPr lang="en-US" baseline="0" dirty="0"/>
               <a:t>each </a:t>
             </a:r>
             <a:r>
-              <a:rPr lang="en-US" baseline="0" smtClean="0"/>
+              <a:rPr lang="en-US" baseline="0" dirty="0" smtClean="0"/>
               <a:t>stream that </a:t>
             </a:r>
             <a:r>
@@ -2830,47 +2919,27 @@
           <a:p>
             <a:r>
               <a:rPr lang="en-US" dirty="0" smtClean="0"/>
-              <a:t>Recall that </a:t>
-            </a:r>
-            <a:r>
-              <a:rPr lang="en-US" dirty="0" err="1" smtClean="0"/>
-              <a:t>IntUnaryOperator</a:t>
-            </a:r>
-            <a:r>
-              <a:rPr lang="en-US" dirty="0" smtClean="0"/>
-              <a:t> is a</a:t>
+              <a:t>This filter allows</a:t>
             </a:r>
             <a:r>
               <a:rPr lang="en-US" baseline="0" dirty="0" smtClean="0"/>
-              <a:t> functional interface that takes an int primitive argument and returns an int result.  Iterate repeatedly applies a unary operator on the seed value to start with and then the previous value to generate the next value.  </a:t>
-            </a:r>
-            <a:r>
-              <a:rPr lang="en-US" dirty="0" smtClean="0"/>
-              <a:t>You </a:t>
-            </a:r>
-            <a:r>
-              <a:rPr lang="en-US" dirty="0"/>
-              <a:t>will see the skip</a:t>
-            </a:r>
-            <a:r>
-              <a:rPr lang="en-US" baseline="0" dirty="0"/>
-              <a:t> - </a:t>
-            </a:r>
-            <a:r>
-              <a:rPr lang="en-US" dirty="0"/>
-              <a:t>limit or limit</a:t>
-            </a:r>
-            <a:r>
-              <a:rPr lang="en-US" baseline="0" dirty="0"/>
-              <a:t> - </a:t>
-            </a:r>
-            <a:r>
-              <a:rPr lang="en-US" dirty="0"/>
-              <a:t>skip on the</a:t>
-            </a:r>
-            <a:r>
-              <a:rPr lang="en-US" baseline="0" dirty="0"/>
-              <a:t> OCP.</a:t>
+              <a:t> integers that are divisible by four to pass through.  The other integers are discarded from the stream.  The output of the summary statistics shows a count of 250 which is the number of integers that are evenly divisible by four between 0 and 999.  The </a:t>
+            </a:r>
+            <a:r>
+              <a:rPr lang="en-US" baseline="0" dirty="0" err="1" smtClean="0"/>
+              <a:t>IntStream.range</a:t>
+            </a:r>
+            <a:r>
+              <a:rPr lang="en-US" baseline="0" dirty="0" smtClean="0"/>
+              <a:t> method includes the starting number but excludes the ending number.  There is an </a:t>
+            </a:r>
+            <a:r>
+              <a:rPr lang="en-US" baseline="0" dirty="0" err="1" smtClean="0"/>
+              <a:t>IntStream.rangeClosed</a:t>
+            </a:r>
+            <a:r>
+              <a:rPr lang="en-US" baseline="0" dirty="0" smtClean="0"/>
+              <a:t> method that includes the beginning and end of the range.</a:t>
             </a:r>
             <a:endParaRPr lang="en-US" dirty="0"/>
           </a:p>
@@ -2893,7 +2962,7 @@
           <a:p>
             <a:fld id="{9B9A5078-34A5-4200-8953-1FDEE337BA82}" type="slidenum">
               <a:rPr lang="en-US" smtClean="0"/>
-              <a:t>32</a:t>
+              <a:t>31</a:t>
             </a:fld>
             <a:endParaRPr lang="en-US"/>
           </a:p>
@@ -2902,7 +2971,7 @@
     </p:spTree>
     <p:extLst>
       <p:ext uri="{BB962C8B-B14F-4D97-AF65-F5344CB8AC3E}">
-        <p14:creationId xmlns:p14="http://schemas.microsoft.com/office/powerpoint/2010/main" val="2967174973"/>
+        <p14:creationId xmlns:p14="http://schemas.microsoft.com/office/powerpoint/2010/main" val="3751733035"/>
       </p:ext>
     </p:extLst>
   </p:cSld>
@@ -2957,20 +3026,52 @@
           <a:lstStyle/>
           <a:p>
             <a:r>
+              <a:rPr lang="en-US" i="1" dirty="0" smtClean="0"/>
+              <a:t>Go over slide.  </a:t>
+            </a:r>
+            <a:r>
+              <a:rPr lang="en-US" dirty="0" smtClean="0"/>
+              <a:t>Recall </a:t>
+            </a:r>
+            <a:r>
+              <a:rPr lang="en-US" dirty="0" smtClean="0"/>
+              <a:t>that </a:t>
+            </a:r>
+            <a:r>
+              <a:rPr lang="en-US" dirty="0" err="1" smtClean="0"/>
+              <a:t>IntUnaryOperator</a:t>
+            </a:r>
+            <a:r>
+              <a:rPr lang="en-US" dirty="0" smtClean="0"/>
+              <a:t> is a</a:t>
+            </a:r>
+            <a:r>
+              <a:rPr lang="en-US" baseline="0" dirty="0" smtClean="0"/>
+              <a:t> functional interface that takes an int primitive argument and returns an int result.  Iterate repeatedly applies a unary operator on the seed value to start with and then the previous value to generate the next value.  </a:t>
+            </a:r>
+            <a:r>
+              <a:rPr lang="en-US" dirty="0" smtClean="0"/>
+              <a:t>You </a:t>
+            </a:r>
+            <a:r>
               <a:rPr lang="en-US" dirty="0"/>
-              <a:t>The match family of operations is not considered a reduction because it doesn’t always process all of the elements</a:t>
-            </a:r>
-            <a:r>
-              <a:rPr lang="en-US" dirty="0" smtClean="0"/>
-              <a:t>.  </a:t>
-            </a:r>
-            <a:r>
-              <a:rPr lang="en-US" dirty="0" err="1" smtClean="0"/>
-              <a:t>forEach</a:t>
-            </a:r>
-            <a:r>
-              <a:rPr lang="en-US" baseline="0" dirty="0" smtClean="0"/>
-              <a:t> processes all the values but isn’t considered a reduction because it does not return a value.</a:t>
+              <a:t>will see the skip</a:t>
+            </a:r>
+            <a:r>
+              <a:rPr lang="en-US" baseline="0" dirty="0"/>
+              <a:t> - </a:t>
+            </a:r>
+            <a:r>
+              <a:rPr lang="en-US" dirty="0"/>
+              <a:t>limit or limit</a:t>
+            </a:r>
+            <a:r>
+              <a:rPr lang="en-US" baseline="0" dirty="0"/>
+              <a:t> - </a:t>
+            </a:r>
+            <a:r>
+              <a:rPr lang="en-US" dirty="0"/>
+              <a:t>skip on the</a:t>
             </a:r>
             <a:r>
               <a:rPr lang="en-US" baseline="0" dirty="0"/>
@@ -2978,24 +3079,9 @@
             </a:r>
             <a:r>
               <a:rPr lang="en-US" baseline="0" dirty="0" smtClean="0"/>
-              <a:t> </a:t>
-            </a:r>
-            <a:r>
-              <a:rPr lang="en-US" dirty="0" smtClean="0"/>
-              <a:t>Never </a:t>
-            </a:r>
-            <a:r>
-              <a:rPr lang="en-US" dirty="0"/>
-              <a:t>use any reduction </a:t>
-            </a:r>
-            <a:r>
-              <a:rPr lang="en-US" dirty="0" smtClean="0"/>
-              <a:t>on </a:t>
-            </a:r>
-            <a:r>
-              <a:rPr lang="en-US" dirty="0"/>
-              <a:t>an infinite stream.  By definition, a reduction processes all of the elements.</a:t>
-            </a:r>
+              <a:t>OCP exam.</a:t>
+            </a:r>
+            <a:endParaRPr lang="en-US" dirty="0"/>
           </a:p>
         </p:txBody>
       </p:sp>
@@ -3006,7 +3092,7 @@
             <a:spLocks noGrp="1"/>
           </p:cNvSpPr>
           <p:nvPr>
-            <p:ph type="sldNum" sz="quarter" idx="5"/>
+            <p:ph type="sldNum" sz="quarter" idx="10"/>
           </p:nvPr>
         </p:nvSpPr>
         <p:spPr/>
@@ -3016,7 +3102,7 @@
           <a:p>
             <a:fld id="{9B9A5078-34A5-4200-8953-1FDEE337BA82}" type="slidenum">
               <a:rPr lang="en-US" smtClean="0"/>
-              <a:t>34</a:t>
+              <a:t>32</a:t>
             </a:fld>
             <a:endParaRPr lang="en-US"/>
           </a:p>
@@ -3025,7 +3111,7 @@
     </p:spTree>
     <p:extLst>
       <p:ext uri="{BB962C8B-B14F-4D97-AF65-F5344CB8AC3E}">
-        <p14:creationId xmlns:p14="http://schemas.microsoft.com/office/powerpoint/2010/main" val="3825424556"/>
+        <p14:creationId xmlns:p14="http://schemas.microsoft.com/office/powerpoint/2010/main" val="2967174973"/>
       </p:ext>
     </p:extLst>
   </p:cSld>
@@ -3121,7 +3207,15 @@
             </a:r>
             <a:r>
               <a:rPr lang="en-US" baseline="0" dirty="0" smtClean="0"/>
-              <a:t> declaration doesn’t work because there is no type information available to the compiler.  The second </a:t>
+              <a:t> declaration doesn’t work because there is </a:t>
+            </a:r>
+            <a:r>
+              <a:rPr lang="en-US" baseline="0" dirty="0" smtClean="0"/>
+              <a:t>no functional interface.  </a:t>
+            </a:r>
+            <a:r>
+              <a:rPr lang="en-US" baseline="0" dirty="0" smtClean="0"/>
+              <a:t>The second </a:t>
             </a:r>
             <a:r>
               <a:rPr lang="en-US" baseline="0" dirty="0" err="1" smtClean="0"/>
@@ -3224,44 +3318,68 @@
           <a:lstStyle/>
           <a:p>
             <a:r>
+              <a:rPr lang="en-US" i="1" dirty="0" smtClean="0"/>
+              <a:t>Go over</a:t>
+            </a:r>
+            <a:r>
+              <a:rPr lang="en-US" i="1" baseline="0" dirty="0" smtClean="0"/>
+              <a:t> slide</a:t>
+            </a:r>
+            <a:r>
+              <a:rPr lang="en-US" i="1" dirty="0" smtClean="0"/>
+              <a:t>.  </a:t>
+            </a:r>
+            <a:r>
+              <a:rPr lang="en-US" dirty="0" smtClean="0"/>
+              <a:t>The </a:t>
+            </a:r>
+            <a:r>
               <a:rPr lang="en-US" dirty="0"/>
-              <a:t>The</a:t>
+              <a:t>match family of operations is not considered a reduction because it doesn’t always process all of the elements</a:t>
+            </a:r>
+            <a:r>
+              <a:rPr lang="en-US" dirty="0" smtClean="0"/>
+              <a:t>.  </a:t>
+            </a:r>
+            <a:r>
+              <a:rPr lang="en-US" dirty="0" err="1" smtClean="0"/>
+              <a:t>forEach</a:t>
+            </a:r>
+            <a:r>
+              <a:rPr lang="en-US" baseline="0" dirty="0" smtClean="0"/>
+              <a:t> processes all the values but isn’t considered a reduction because </a:t>
+            </a:r>
+            <a:r>
+              <a:rPr lang="en-US" baseline="0" dirty="0" smtClean="0"/>
+              <a:t>it </a:t>
+            </a:r>
+            <a:r>
+              <a:rPr lang="en-US" baseline="0" dirty="0" smtClean="0"/>
+              <a:t>does not return a value.</a:t>
             </a:r>
             <a:r>
               <a:rPr lang="en-US" baseline="0" dirty="0"/>
               <a:t> </a:t>
             </a:r>
             <a:r>
-              <a:rPr lang="en-US" baseline="0" dirty="0" err="1"/>
-              <a:t>Collections.toCollection</a:t>
-            </a:r>
-            <a:r>
-              <a:rPr lang="en-US" baseline="0" dirty="0"/>
-              <a:t> allows full control over the collection type provided and how it is created by using a Supplier lambda.  In the last example a </a:t>
-            </a:r>
-            <a:r>
               <a:rPr lang="en-US" baseline="0" dirty="0" smtClean="0"/>
-              <a:t>constructor reference </a:t>
-            </a:r>
-            <a:r>
-              <a:rPr lang="en-US" baseline="0" dirty="0"/>
-              <a:t>to </a:t>
-            </a:r>
-            <a:r>
-              <a:rPr lang="en-US" baseline="0" dirty="0" err="1"/>
-              <a:t>LinkedHashSet’s</a:t>
-            </a:r>
-            <a:r>
-              <a:rPr lang="en-US" baseline="0" dirty="0"/>
               <a:t> </a:t>
             </a:r>
             <a:r>
-              <a:rPr lang="en-US" baseline="0" dirty="0" smtClean="0"/>
-              <a:t>no-argument constructor </a:t>
-            </a:r>
-            <a:r>
-              <a:rPr lang="en-US" baseline="0" dirty="0"/>
-              <a:t>was used as the supplier.</a:t>
+              <a:rPr lang="en-US" dirty="0" smtClean="0"/>
+              <a:t>Never </a:t>
+            </a:r>
+            <a:r>
+              <a:rPr lang="en-US" dirty="0"/>
+              <a:t>use any reduction </a:t>
+            </a:r>
+            <a:r>
+              <a:rPr lang="en-US" dirty="0" smtClean="0"/>
+              <a:t>on </a:t>
+            </a:r>
+            <a:r>
+              <a:rPr lang="en-US" dirty="0"/>
+              <a:t>an infinite stream.  By definition, a reduction processes all of the elements.</a:t>
             </a:r>
           </a:p>
         </p:txBody>
@@ -3273,7 +3391,7 @@
             <a:spLocks noGrp="1"/>
           </p:cNvSpPr>
           <p:nvPr>
-            <p:ph type="sldNum" sz="quarter" idx="10"/>
+            <p:ph type="sldNum" sz="quarter" idx="5"/>
           </p:nvPr>
         </p:nvSpPr>
         <p:spPr/>
@@ -3283,7 +3401,7 @@
           <a:p>
             <a:fld id="{9B9A5078-34A5-4200-8953-1FDEE337BA82}" type="slidenum">
               <a:rPr lang="en-US" smtClean="0"/>
-              <a:t>37</a:t>
+              <a:t>34</a:t>
             </a:fld>
             <a:endParaRPr lang="en-US"/>
           </a:p>
@@ -3292,7 +3410,7 @@
     </p:spTree>
     <p:extLst>
       <p:ext uri="{BB962C8B-B14F-4D97-AF65-F5344CB8AC3E}">
-        <p14:creationId xmlns:p14="http://schemas.microsoft.com/office/powerpoint/2010/main" val="3625490707"/>
+        <p14:creationId xmlns:p14="http://schemas.microsoft.com/office/powerpoint/2010/main" val="3825424556"/>
       </p:ext>
     </p:extLst>
   </p:cSld>
@@ -3347,22 +3465,58 @@
           <a:lstStyle/>
           <a:p>
             <a:r>
-              <a:rPr lang="en-US" dirty="0"/>
-              <a:t>Downstream collectors are collectors that</a:t>
+              <a:rPr lang="en-US" dirty="0" smtClean="0"/>
+              <a:t>The Collection collectors provide pre-packaged collectors to create a list or a set.  It also provides a </a:t>
+            </a:r>
+            <a:r>
+              <a:rPr lang="en-US" dirty="0" err="1" smtClean="0"/>
+              <a:t>toCollection</a:t>
+            </a:r>
+            <a:r>
+              <a:rPr lang="en-US" dirty="0" smtClean="0"/>
+              <a:t> collection which allows the use of a Supplier to create</a:t>
+            </a:r>
+            <a:r>
+              <a:rPr lang="en-US" baseline="0" dirty="0" smtClean="0"/>
+              <a:t> the collection to use.  In this example, t</a:t>
+            </a:r>
+            <a:r>
+              <a:rPr lang="en-US" dirty="0" smtClean="0"/>
+              <a:t>he</a:t>
+            </a:r>
+            <a:r>
+              <a:rPr lang="en-US" baseline="0" dirty="0" smtClean="0"/>
+              <a:t> </a:t>
+            </a:r>
+            <a:r>
+              <a:rPr lang="en-US" baseline="0" dirty="0" err="1"/>
+              <a:t>Collections.toCollection</a:t>
             </a:r>
             <a:r>
               <a:rPr lang="en-US" baseline="0" dirty="0"/>
-              <a:t> are called from other collectors to process or reduce the values.  In this case, we produce a map with the keys and sum of the values, instead of a map with </a:t>
+              <a:t> </a:t>
             </a:r>
             <a:r>
               <a:rPr lang="en-US" baseline="0" dirty="0" smtClean="0"/>
-              <a:t>the values </a:t>
+              <a:t>constructor </a:t>
+            </a:r>
+            <a:r>
+              <a:rPr lang="en-US" baseline="0" dirty="0" smtClean="0"/>
+              <a:t>reference </a:t>
             </a:r>
             <a:r>
               <a:rPr lang="en-US" baseline="0" dirty="0"/>
-              <a:t>as a collection.</a:t>
-            </a:r>
-            <a:endParaRPr lang="en-US" dirty="0"/>
+              <a:t>to </a:t>
+            </a:r>
+            <a:r>
+              <a:rPr lang="en-US" baseline="0" dirty="0" err="1" smtClean="0"/>
+              <a:t>LinkedHashSet’s</a:t>
+            </a:r>
+            <a:r>
+              <a:rPr lang="en-US" baseline="0" dirty="0" smtClean="0"/>
+              <a:t> is used to create a Set that only allows one copy of each element, and also retains the sort ordering imposed by the sorted intermediate operation.</a:t>
+            </a:r>
+            <a:endParaRPr lang="en-US" baseline="0" dirty="0"/>
           </a:p>
         </p:txBody>
       </p:sp>
@@ -3383,7 +3537,7 @@
           <a:p>
             <a:fld id="{9B9A5078-34A5-4200-8953-1FDEE337BA82}" type="slidenum">
               <a:rPr lang="en-US" smtClean="0"/>
-              <a:t>38</a:t>
+              <a:t>37</a:t>
             </a:fld>
             <a:endParaRPr lang="en-US"/>
           </a:p>
@@ -3392,7 +3546,7 @@
     </p:spTree>
     <p:extLst>
       <p:ext uri="{BB962C8B-B14F-4D97-AF65-F5344CB8AC3E}">
-        <p14:creationId xmlns:p14="http://schemas.microsoft.com/office/powerpoint/2010/main" val="756589879"/>
+        <p14:creationId xmlns:p14="http://schemas.microsoft.com/office/powerpoint/2010/main" val="3625490707"/>
       </p:ext>
     </p:extLst>
   </p:cSld>
@@ -3447,28 +3601,28 @@
           <a:lstStyle/>
           <a:p>
             <a:r>
+              <a:rPr lang="en-US" i="1" dirty="0" smtClean="0"/>
+              <a:t>Go over first two points of slide.  </a:t>
+            </a:r>
+            <a:r>
+              <a:rPr lang="en-US" dirty="0" smtClean="0"/>
+              <a:t>Downstream </a:t>
+            </a:r>
+            <a:r>
               <a:rPr lang="en-US" dirty="0"/>
-              <a:t>This example groups the</a:t>
+              <a:t>collectors are collectors that</a:t>
             </a:r>
             <a:r>
               <a:rPr lang="en-US" baseline="0" dirty="0"/>
-              <a:t> words by their starting letter, listing each word with its letter.  In another twist, we use a </a:t>
-            </a:r>
-            <a:r>
-              <a:rPr lang="en-US" baseline="0" dirty="0" err="1"/>
-              <a:t>TreeMap</a:t>
+              <a:t> are called from other collectors to process or reduce the values.  In this case, we produce a map with the keys and sum of the values, instead of a map with </a:t>
+            </a:r>
+            <a:r>
+              <a:rPr lang="en-US" baseline="0" dirty="0" smtClean="0"/>
+              <a:t>the values </a:t>
             </a:r>
             <a:r>
               <a:rPr lang="en-US" baseline="0" dirty="0"/>
-              <a:t> and </a:t>
-            </a:r>
-            <a:r>
-              <a:rPr lang="en-US" baseline="0" dirty="0" err="1"/>
-              <a:t>TreeSet</a:t>
-            </a:r>
-            <a:r>
-              <a:rPr lang="en-US" baseline="0" dirty="0"/>
-              <a:t> to demonstrate the flexibility offered by specifying the collection implementation: with very little effort on our part, we have produced an ordered map with a set of ordered values for each letter.</a:t>
+              <a:t>as a collection.</a:t>
             </a:r>
             <a:endParaRPr lang="en-US" dirty="0"/>
           </a:p>
@@ -3491,7 +3645,7 @@
           <a:p>
             <a:fld id="{9B9A5078-34A5-4200-8953-1FDEE337BA82}" type="slidenum">
               <a:rPr lang="en-US" smtClean="0"/>
-              <a:t>39</a:t>
+              <a:t>38</a:t>
             </a:fld>
             <a:endParaRPr lang="en-US"/>
           </a:p>
@@ -3500,7 +3654,7 @@
     </p:spTree>
     <p:extLst>
       <p:ext uri="{BB962C8B-B14F-4D97-AF65-F5344CB8AC3E}">
-        <p14:creationId xmlns:p14="http://schemas.microsoft.com/office/powerpoint/2010/main" val="3867908227"/>
+        <p14:creationId xmlns:p14="http://schemas.microsoft.com/office/powerpoint/2010/main" val="756589879"/>
       </p:ext>
     </p:extLst>
   </p:cSld>
@@ -3556,11 +3710,11 @@
           <a:p>
             <a:r>
               <a:rPr lang="en-US" dirty="0"/>
-              <a:t>This</a:t>
+              <a:t>This example groups the</a:t>
             </a:r>
             <a:r>
               <a:rPr lang="en-US" baseline="0" dirty="0"/>
-              <a:t> is a rewrite of the Grouping By to work with concurrent processing.  Note that we had to switch out the </a:t>
+              <a:t> words by their starting letter, listing each word with its letter.  In another twist, we use a </a:t>
             </a:r>
             <a:r>
               <a:rPr lang="en-US" baseline="0" dirty="0" err="1"/>
@@ -3576,29 +3730,7 @@
             </a:r>
             <a:r>
               <a:rPr lang="en-US" baseline="0" dirty="0"/>
-              <a:t> with the “</a:t>
-            </a:r>
-            <a:r>
-              <a:rPr lang="en-US" baseline="0" dirty="0" err="1"/>
-              <a:t>ConcurrentSkipList</a:t>
-            </a:r>
-            <a:r>
-              <a:rPr lang="en-US" baseline="0" dirty="0"/>
-              <a:t>” versions to support the concurrent processing.  We also have a version using a downstream collector to count the number of </a:t>
-            </a:r>
-            <a:r>
-              <a:rPr lang="en-US" baseline="0" dirty="0" smtClean="0"/>
-              <a:t>occurrences </a:t>
-            </a:r>
-            <a:r>
-              <a:rPr lang="en-US" baseline="0" dirty="0"/>
-              <a:t>of each word.</a:t>
-            </a:r>
-          </a:p>
-          <a:p>
-            <a:r>
-              <a:rPr lang="en-US" baseline="0" dirty="0"/>
-              <a:t>This is not necessarily faster than the sequential stream.  The concurrent skip list set and map introduce their own overhead.</a:t>
+              <a:t> to demonstrate the flexibility offered by specifying the collection implementation: with very little effort on our part, we have produced an ordered map with a set of ordered values for each letter.</a:t>
             </a:r>
             <a:endParaRPr lang="en-US" dirty="0"/>
           </a:p>
@@ -3621,7 +3753,7 @@
           <a:p>
             <a:fld id="{9B9A5078-34A5-4200-8953-1FDEE337BA82}" type="slidenum">
               <a:rPr lang="en-US" smtClean="0"/>
-              <a:t>40</a:t>
+              <a:t>39</a:t>
             </a:fld>
             <a:endParaRPr lang="en-US"/>
           </a:p>
@@ -3630,7 +3762,7 @@
     </p:spTree>
     <p:extLst>
       <p:ext uri="{BB962C8B-B14F-4D97-AF65-F5344CB8AC3E}">
-        <p14:creationId xmlns:p14="http://schemas.microsoft.com/office/powerpoint/2010/main" val="1393649253"/>
+        <p14:creationId xmlns:p14="http://schemas.microsoft.com/office/powerpoint/2010/main" val="3867908227"/>
       </p:ext>
     </p:extLst>
   </p:cSld>
@@ -3686,23 +3818,49 @@
           <a:p>
             <a:r>
               <a:rPr lang="en-US" dirty="0"/>
-              <a:t>The</a:t>
+              <a:t>This</a:t>
             </a:r>
             <a:r>
               <a:rPr lang="en-US" baseline="0" dirty="0"/>
-              <a:t> argument to </a:t>
+              <a:t> is a rewrite of the Grouping By to work with concurrent processing.  Note that we had to switch out the </a:t>
             </a:r>
             <a:r>
               <a:rPr lang="en-US" baseline="0" dirty="0" err="1"/>
-              <a:t>Collectors.joining</a:t>
+              <a:t>TreeMap</a:t>
             </a:r>
             <a:r>
               <a:rPr lang="en-US" baseline="0" dirty="0"/>
-              <a:t> is the character to separate each part of the string.  In this case it is a space</a:t>
+              <a:t> and </a:t>
+            </a:r>
+            <a:r>
+              <a:rPr lang="en-US" baseline="0" dirty="0" err="1"/>
+              <a:t>TreeSet</a:t>
+            </a:r>
+            <a:r>
+              <a:rPr lang="en-US" baseline="0" dirty="0"/>
+              <a:t> with the “</a:t>
+            </a:r>
+            <a:r>
+              <a:rPr lang="en-US" baseline="0" dirty="0" err="1"/>
+              <a:t>ConcurrentSkipList</a:t>
+            </a:r>
+            <a:r>
+              <a:rPr lang="en-US" baseline="0" dirty="0"/>
+              <a:t>” versions to support the concurrent processing.  We also have a version using a downstream collector to count the number of </a:t>
             </a:r>
             <a:r>
               <a:rPr lang="en-US" baseline="0" dirty="0" smtClean="0"/>
-              <a:t>.  Other characters, such as a comma, semicolon, and colon could be used.</a:t>
+              <a:t>occurrences </a:t>
+            </a:r>
+            <a:r>
+              <a:rPr lang="en-US" baseline="0" dirty="0"/>
+              <a:t>of each word.</a:t>
+            </a:r>
+          </a:p>
+          <a:p>
+            <a:r>
+              <a:rPr lang="en-US" baseline="0" dirty="0"/>
+              <a:t>This is not necessarily faster than the sequential stream.  The concurrent skip list set and map introduce their own overhead.</a:t>
             </a:r>
             <a:endParaRPr lang="en-US" dirty="0"/>
           </a:p>
@@ -3725,7 +3883,7 @@
           <a:p>
             <a:fld id="{9B9A5078-34A5-4200-8953-1FDEE337BA82}" type="slidenum">
               <a:rPr lang="en-US" smtClean="0"/>
-              <a:t>41</a:t>
+              <a:t>40</a:t>
             </a:fld>
             <a:endParaRPr lang="en-US"/>
           </a:p>
@@ -3734,7 +3892,7 @@
     </p:spTree>
     <p:extLst>
       <p:ext uri="{BB962C8B-B14F-4D97-AF65-F5344CB8AC3E}">
-        <p14:creationId xmlns:p14="http://schemas.microsoft.com/office/powerpoint/2010/main" val="963626535"/>
+        <p14:creationId xmlns:p14="http://schemas.microsoft.com/office/powerpoint/2010/main" val="1393649253"/>
       </p:ext>
     </p:extLst>
   </p:cSld>
@@ -3788,6 +3946,26 @@
           <a:bodyPr/>
           <a:lstStyle/>
           <a:p>
+            <a:r>
+              <a:rPr lang="en-US" dirty="0"/>
+              <a:t>The</a:t>
+            </a:r>
+            <a:r>
+              <a:rPr lang="en-US" baseline="0" dirty="0"/>
+              <a:t> argument to </a:t>
+            </a:r>
+            <a:r>
+              <a:rPr lang="en-US" baseline="0" dirty="0" err="1"/>
+              <a:t>Collectors.joining</a:t>
+            </a:r>
+            <a:r>
+              <a:rPr lang="en-US" baseline="0" dirty="0"/>
+              <a:t> is the character to separate each part of the string.  In this case it is a space</a:t>
+            </a:r>
+            <a:r>
+              <a:rPr lang="en-US" baseline="0" dirty="0" smtClean="0"/>
+              <a:t>.  Other characters, such as a comma, semicolon, and colon could be used.</a:t>
+            </a:r>
             <a:endParaRPr lang="en-US" dirty="0"/>
           </a:p>
         </p:txBody>
@@ -3809,7 +3987,7 @@
           <a:p>
             <a:fld id="{9B9A5078-34A5-4200-8953-1FDEE337BA82}" type="slidenum">
               <a:rPr lang="en-US" smtClean="0"/>
-              <a:t>42</a:t>
+              <a:t>41</a:t>
             </a:fld>
             <a:endParaRPr lang="en-US"/>
           </a:p>
@@ -3818,7 +3996,7 @@
     </p:spTree>
     <p:extLst>
       <p:ext uri="{BB962C8B-B14F-4D97-AF65-F5344CB8AC3E}">
-        <p14:creationId xmlns:p14="http://schemas.microsoft.com/office/powerpoint/2010/main" val="1349366280"/>
+        <p14:creationId xmlns:p14="http://schemas.microsoft.com/office/powerpoint/2010/main" val="963626535"/>
       </p:ext>
     </p:extLst>
   </p:cSld>
@@ -3872,14 +4050,6 @@
           <a:bodyPr/>
           <a:lstStyle/>
           <a:p>
-            <a:r>
-              <a:rPr lang="en-US" dirty="0"/>
-              <a:t>The Functional Interface that the</a:t>
-            </a:r>
-            <a:r>
-              <a:rPr lang="en-US" baseline="0" dirty="0"/>
-              <a:t> Java Books fail to mention.</a:t>
-            </a:r>
             <a:endParaRPr lang="en-US" dirty="0"/>
           </a:p>
         </p:txBody>
@@ -3901,7 +4071,7 @@
           <a:p>
             <a:fld id="{9B9A5078-34A5-4200-8953-1FDEE337BA82}" type="slidenum">
               <a:rPr lang="en-US" smtClean="0"/>
-              <a:t>43</a:t>
+              <a:t>42</a:t>
             </a:fld>
             <a:endParaRPr lang="en-US"/>
           </a:p>
@@ -3910,7 +4080,7 @@
     </p:spTree>
     <p:extLst>
       <p:ext uri="{BB962C8B-B14F-4D97-AF65-F5344CB8AC3E}">
-        <p14:creationId xmlns:p14="http://schemas.microsoft.com/office/powerpoint/2010/main" val="970417925"/>
+        <p14:creationId xmlns:p14="http://schemas.microsoft.com/office/powerpoint/2010/main" val="1349366280"/>
       </p:ext>
     </p:extLst>
   </p:cSld>
@@ -3965,14 +4135,22 @@
           <a:lstStyle/>
           <a:p>
             <a:r>
-              <a:rPr lang="en-US" dirty="0" smtClean="0"/>
-              <a:t>However, this method of doing this requires creating</a:t>
+              <a:rPr lang="en-US" dirty="0"/>
+              <a:t>The Functional Interface that the</a:t>
+            </a:r>
+            <a:r>
+              <a:rPr lang="en-US" baseline="0" dirty="0"/>
+              <a:t> Java Books fail to mention</a:t>
             </a:r>
             <a:r>
               <a:rPr lang="en-US" baseline="0" dirty="0" smtClean="0"/>
-              <a:t> a new interface for each set of exceptions that are needed in the throws clause.</a:t>
-            </a:r>
-            <a:endParaRPr lang="en-US" dirty="0"/>
+              <a:t>.</a:t>
+            </a:r>
+            <a:r>
+              <a:rPr lang="en-US" i="1" baseline="0" dirty="0" smtClean="0"/>
+              <a:t>  Go over slide</a:t>
+            </a:r>
+            <a:endParaRPr lang="en-US" i="1" dirty="0"/>
           </a:p>
         </p:txBody>
       </p:sp>
@@ -3993,7 +4171,7 @@
           <a:p>
             <a:fld id="{9B9A5078-34A5-4200-8953-1FDEE337BA82}" type="slidenum">
               <a:rPr lang="en-US" smtClean="0"/>
-              <a:t>46</a:t>
+              <a:t>43</a:t>
             </a:fld>
             <a:endParaRPr lang="en-US"/>
           </a:p>
@@ -4002,7 +4180,7 @@
     </p:spTree>
     <p:extLst>
       <p:ext uri="{BB962C8B-B14F-4D97-AF65-F5344CB8AC3E}">
-        <p14:creationId xmlns:p14="http://schemas.microsoft.com/office/powerpoint/2010/main" val="3102549053"/>
+        <p14:creationId xmlns:p14="http://schemas.microsoft.com/office/powerpoint/2010/main" val="970417925"/>
       </p:ext>
     </p:extLst>
   </p:cSld>
@@ -4057,18 +4235,10 @@
           <a:lstStyle/>
           <a:p>
             <a:r>
-              <a:rPr lang="en-US" dirty="0" smtClean="0"/>
-              <a:t>It is no longer necessary to create a new interface to change out the exception that </a:t>
-            </a:r>
-            <a:r>
-              <a:rPr lang="en-US" dirty="0" smtClean="0"/>
-              <a:t>is </a:t>
-            </a:r>
-            <a:r>
-              <a:rPr lang="en-US" dirty="0" smtClean="0"/>
-              <a:t>thrown.</a:t>
-            </a:r>
-            <a:endParaRPr lang="en-US" dirty="0"/>
+              <a:rPr lang="en-US" i="1" dirty="0" smtClean="0"/>
+              <a:t>Go over slide</a:t>
+            </a:r>
+            <a:endParaRPr lang="en-US" i="1" dirty="0"/>
           </a:p>
         </p:txBody>
       </p:sp>
@@ -4089,7 +4259,7 @@
           <a:p>
             <a:fld id="{9B9A5078-34A5-4200-8953-1FDEE337BA82}" type="slidenum">
               <a:rPr lang="en-US" smtClean="0"/>
-              <a:t>47</a:t>
+              <a:t>44</a:t>
             </a:fld>
             <a:endParaRPr lang="en-US"/>
           </a:p>
@@ -4098,7 +4268,7 @@
     </p:spTree>
     <p:extLst>
       <p:ext uri="{BB962C8B-B14F-4D97-AF65-F5344CB8AC3E}">
-        <p14:creationId xmlns:p14="http://schemas.microsoft.com/office/powerpoint/2010/main" val="1909135802"/>
+        <p14:creationId xmlns:p14="http://schemas.microsoft.com/office/powerpoint/2010/main" val="3656213457"/>
       </p:ext>
     </p:extLst>
   </p:cSld>
@@ -4153,14 +4323,10 @@
           <a:lstStyle/>
           <a:p>
             <a:r>
-              <a:rPr lang="en-US" dirty="0"/>
-              <a:t>The close method of the context forms the lambda with the CloseIt1 interface.  The try-with-resources feature in Java does the rest,</a:t>
-            </a:r>
-            <a:r>
-              <a:rPr lang="en-US" baseline="0" dirty="0"/>
-              <a:t> including the heavy lifting of handling any exception thrown in the close method as either a suppressed exception if an exception occurred in the body, or its own first class exception if no exception occurred in the body.</a:t>
-            </a:r>
-            <a:endParaRPr lang="en-US" dirty="0"/>
+              <a:rPr lang="en-US" i="1" dirty="0" smtClean="0"/>
+              <a:t>Go over slide</a:t>
+            </a:r>
+            <a:endParaRPr lang="en-US" i="1" dirty="0"/>
           </a:p>
         </p:txBody>
       </p:sp>
@@ -4181,7 +4347,7 @@
           <a:p>
             <a:fld id="{9B9A5078-34A5-4200-8953-1FDEE337BA82}" type="slidenum">
               <a:rPr lang="en-US" smtClean="0"/>
-              <a:t>48</a:t>
+              <a:t>45</a:t>
             </a:fld>
             <a:endParaRPr lang="en-US"/>
           </a:p>
@@ -4190,7 +4356,7 @@
     </p:spTree>
     <p:extLst>
       <p:ext uri="{BB962C8B-B14F-4D97-AF65-F5344CB8AC3E}">
-        <p14:creationId xmlns:p14="http://schemas.microsoft.com/office/powerpoint/2010/main" val="1544996753"/>
+        <p14:creationId xmlns:p14="http://schemas.microsoft.com/office/powerpoint/2010/main" val="4142547669"/>
       </p:ext>
     </p:extLst>
   </p:cSld>
@@ -4282,11 +4448,15 @@
             </a:r>
             <a:r>
               <a:rPr lang="en-US" baseline="0" dirty="0" smtClean="0"/>
-              <a:t>used or the return type is void.  The argument </a:t>
+              <a:t>used or the return type is </a:t>
+            </a:r>
+            <a:r>
+              <a:rPr lang="en-US" baseline="0" dirty="0" smtClean="0"/>
+              <a:t>void.  Only a single argument is valid without parentheses, but an argument list is always valid with them.  The argument type </a:t>
             </a:r>
             <a:r>
               <a:rPr lang="en-US" baseline="0" dirty="0"/>
-              <a:t>forms with argument type names can be useful to resolve ambiguous lambda expressions.  These </a:t>
+              <a:t>names can be useful to resolve ambiguous lambda expressions.  These </a:t>
             </a:r>
             <a:r>
               <a:rPr lang="en-US" baseline="0" dirty="0" smtClean="0"/>
@@ -4381,36 +4551,20 @@
           <a:lstStyle/>
           <a:p>
             <a:r>
+              <a:rPr lang="en-US" i="1" dirty="0" smtClean="0"/>
+              <a:t>Go over slide.  </a:t>
+            </a:r>
+            <a:r>
               <a:rPr lang="en-US" dirty="0" smtClean="0"/>
-              <a:t>The higher order function </a:t>
-            </a:r>
-            <a:r>
-              <a:rPr lang="en-US" dirty="0" err="1" smtClean="0"/>
-              <a:t>wrapAllException</a:t>
+              <a:t>However</a:t>
+            </a:r>
+            <a:r>
+              <a:rPr lang="en-US" dirty="0" smtClean="0"/>
+              <a:t>, this method of doing this requires creating</a:t>
             </a:r>
             <a:r>
               <a:rPr lang="en-US" baseline="0" dirty="0" smtClean="0"/>
-              <a:t> returns a lambda </a:t>
-            </a:r>
-            <a:r>
-              <a:rPr lang="en-US" baseline="0" dirty="0"/>
-              <a:t>will call the close method of the original </a:t>
-            </a:r>
-            <a:r>
-              <a:rPr lang="en-US" baseline="0" dirty="0" err="1"/>
-              <a:t>autoClosable</a:t>
-            </a:r>
-            <a:r>
-              <a:rPr lang="en-US" baseline="0" dirty="0"/>
-              <a:t>.  If it throws an Exception, it will decorate it by wrapping the exception within a </a:t>
-            </a:r>
-            <a:r>
-              <a:rPr lang="en-US" baseline="0" dirty="0" err="1"/>
-              <a:t>NotClosedException</a:t>
-            </a:r>
-            <a:r>
-              <a:rPr lang="en-US" baseline="0" dirty="0"/>
-              <a:t>.</a:t>
+              <a:t> a new interface for each set of exceptions that are needed in the throws clause.</a:t>
             </a:r>
             <a:endParaRPr lang="en-US" dirty="0"/>
           </a:p>
@@ -4433,7 +4587,7 @@
           <a:p>
             <a:fld id="{9B9A5078-34A5-4200-8953-1FDEE337BA82}" type="slidenum">
               <a:rPr lang="en-US" smtClean="0"/>
-              <a:t>50</a:t>
+              <a:t>46</a:t>
             </a:fld>
             <a:endParaRPr lang="en-US"/>
           </a:p>
@@ -4442,7 +4596,7 @@
     </p:spTree>
     <p:extLst>
       <p:ext uri="{BB962C8B-B14F-4D97-AF65-F5344CB8AC3E}">
-        <p14:creationId xmlns:p14="http://schemas.microsoft.com/office/powerpoint/2010/main" val="2137428540"/>
+        <p14:creationId xmlns:p14="http://schemas.microsoft.com/office/powerpoint/2010/main" val="3102549053"/>
       </p:ext>
     </p:extLst>
   </p:cSld>
@@ -4497,32 +4651,16 @@
           <a:lstStyle/>
           <a:p>
             <a:r>
-              <a:rPr lang="en-US" dirty="0"/>
-              <a:t>The logger here is using </a:t>
-            </a:r>
-            <a:r>
-              <a:rPr lang="en-US" dirty="0" err="1"/>
-              <a:t>getCause</a:t>
-            </a:r>
-            <a:r>
-              <a:rPr lang="en-US" dirty="0"/>
-              <a:t>() because it knows that this exception</a:t>
-            </a:r>
-            <a:r>
-              <a:rPr lang="en-US" baseline="0" dirty="0"/>
-              <a:t> will always be wrapped.  It is printing the actual exception thrown by the close() method, not the exception decorator.  The </a:t>
-            </a:r>
-            <a:r>
-              <a:rPr lang="en-US" baseline="0" dirty="0" err="1"/>
-              <a:t>NotClosedException</a:t>
-            </a:r>
-            <a:r>
-              <a:rPr lang="en-US" baseline="0" dirty="0"/>
-              <a:t> won’t be caught if an exception occurs in the body because it will be a suppressed exception</a:t>
-            </a:r>
-            <a:r>
-              <a:rPr lang="en-US" baseline="0" dirty="0" smtClean="0"/>
-              <a:t>.  This allow exception handlers to handle the case where no exception is thrown in the body but an exception is thrown in the close() method differently than if the exception is thrown in the body.</a:t>
+              <a:rPr lang="en-US" i="1" dirty="0" smtClean="0"/>
+              <a:t>Go over slide.  </a:t>
+            </a:r>
+            <a:r>
+              <a:rPr lang="en-US" dirty="0" smtClean="0"/>
+              <a:t>It </a:t>
+            </a:r>
+            <a:r>
+              <a:rPr lang="en-US" dirty="0" smtClean="0"/>
+              <a:t>is no longer necessary to create a new interface to change out the exception that is thrown.</a:t>
             </a:r>
             <a:endParaRPr lang="en-US" dirty="0"/>
           </a:p>
@@ -4545,7 +4683,7 @@
           <a:p>
             <a:fld id="{9B9A5078-34A5-4200-8953-1FDEE337BA82}" type="slidenum">
               <a:rPr lang="en-US" smtClean="0"/>
-              <a:t>51</a:t>
+              <a:t>47</a:t>
             </a:fld>
             <a:endParaRPr lang="en-US"/>
           </a:p>
@@ -4554,7 +4692,7 @@
     </p:spTree>
     <p:extLst>
       <p:ext uri="{BB962C8B-B14F-4D97-AF65-F5344CB8AC3E}">
-        <p14:creationId xmlns:p14="http://schemas.microsoft.com/office/powerpoint/2010/main" val="734209670"/>
+        <p14:creationId xmlns:p14="http://schemas.microsoft.com/office/powerpoint/2010/main" val="1909135802"/>
       </p:ext>
     </p:extLst>
   </p:cSld>
@@ -4610,15 +4748,11 @@
           <a:p>
             <a:r>
               <a:rPr lang="en-US" dirty="0"/>
-              <a:t>Wrap is the example shown on the previous two slides.  The difference between</a:t>
+              <a:t>The close method of the context forms the lambda with the CloseIt1 interface.  The try-with-resources feature in Java does the rest,</a:t>
             </a:r>
             <a:r>
               <a:rPr lang="en-US" baseline="0" dirty="0"/>
-              <a:t> consume and wrap + catch is consume always processes exceptions from the close method, but wrapped exceptions are only caught if no exception occurs in the try-with-resources body</a:t>
-            </a:r>
-            <a:r>
-              <a:rPr lang="en-US" baseline="0" dirty="0" smtClean="0"/>
-              <a:t>.  It is a form of the adapter design pattern because you are adapting an exception from an unwanted type into the type you want to handle.</a:t>
+              <a:t> including the heavy lifting of handling any exception thrown in the close method as either a suppressed exception if an exception occurred in the body, or its own first class exception if no exception occurred in the body.</a:t>
             </a:r>
             <a:endParaRPr lang="en-US" dirty="0"/>
           </a:p>
@@ -4641,6 +4775,427 @@
           <a:p>
             <a:fld id="{9B9A5078-34A5-4200-8953-1FDEE337BA82}" type="slidenum">
               <a:rPr lang="en-US" smtClean="0"/>
+              <a:t>48</a:t>
+            </a:fld>
+            <a:endParaRPr lang="en-US"/>
+          </a:p>
+        </p:txBody>
+      </p:sp>
+    </p:spTree>
+    <p:extLst>
+      <p:ext uri="{BB962C8B-B14F-4D97-AF65-F5344CB8AC3E}">
+        <p14:creationId xmlns:p14="http://schemas.microsoft.com/office/powerpoint/2010/main" val="1544996753"/>
+      </p:ext>
+    </p:extLst>
+  </p:cSld>
+  <p:clrMapOvr>
+    <a:masterClrMapping/>
+  </p:clrMapOvr>
+</p:notes>
+</file>
+
+<file path=ppt/notesSlides/notesSlide43.xml><?xml version="1.0" encoding="utf-8"?>
+<p:notes xmlns:a="http://schemas.openxmlformats.org/drawingml/2006/main" xmlns:r="http://schemas.openxmlformats.org/officeDocument/2006/relationships" xmlns:p="http://schemas.openxmlformats.org/presentationml/2006/main">
+  <p:cSld>
+    <p:spTree>
+      <p:nvGrpSpPr>
+        <p:cNvPr id="1" name=""/>
+        <p:cNvGrpSpPr/>
+        <p:nvPr/>
+      </p:nvGrpSpPr>
+      <p:grpSpPr>
+        <a:xfrm>
+          <a:off x="0" y="0"/>
+          <a:ext cx="0" cy="0"/>
+          <a:chOff x="0" y="0"/>
+          <a:chExt cx="0" cy="0"/>
+        </a:xfrm>
+      </p:grpSpPr>
+      <p:sp>
+        <p:nvSpPr>
+          <p:cNvPr id="2" name="Slide Image Placeholder 1"/>
+          <p:cNvSpPr>
+            <a:spLocks noGrp="1" noRot="1" noChangeAspect="1"/>
+          </p:cNvSpPr>
+          <p:nvPr>
+            <p:ph type="sldImg"/>
+          </p:nvPr>
+        </p:nvSpPr>
+        <p:spPr/>
+      </p:sp>
+      <p:sp>
+        <p:nvSpPr>
+          <p:cNvPr id="3" name="Notes Placeholder 2"/>
+          <p:cNvSpPr>
+            <a:spLocks noGrp="1"/>
+          </p:cNvSpPr>
+          <p:nvPr>
+            <p:ph type="body" idx="1"/>
+          </p:nvPr>
+        </p:nvSpPr>
+        <p:spPr/>
+        <p:txBody>
+          <a:bodyPr/>
+          <a:lstStyle/>
+          <a:p>
+            <a:r>
+              <a:rPr lang="en-US" i="1" dirty="0" smtClean="0"/>
+              <a:t>Go over slide.</a:t>
+            </a:r>
+            <a:endParaRPr lang="en-US" i="1" dirty="0"/>
+          </a:p>
+        </p:txBody>
+      </p:sp>
+      <p:sp>
+        <p:nvSpPr>
+          <p:cNvPr id="4" name="Slide Number Placeholder 3"/>
+          <p:cNvSpPr>
+            <a:spLocks noGrp="1"/>
+          </p:cNvSpPr>
+          <p:nvPr>
+            <p:ph type="sldNum" sz="quarter" idx="10"/>
+          </p:nvPr>
+        </p:nvSpPr>
+        <p:spPr/>
+        <p:txBody>
+          <a:bodyPr/>
+          <a:lstStyle/>
+          <a:p>
+            <a:fld id="{9B9A5078-34A5-4200-8953-1FDEE337BA82}" type="slidenum">
+              <a:rPr lang="en-US" smtClean="0"/>
+              <a:t>49</a:t>
+            </a:fld>
+            <a:endParaRPr lang="en-US"/>
+          </a:p>
+        </p:txBody>
+      </p:sp>
+    </p:spTree>
+    <p:extLst>
+      <p:ext uri="{BB962C8B-B14F-4D97-AF65-F5344CB8AC3E}">
+        <p14:creationId xmlns:p14="http://schemas.microsoft.com/office/powerpoint/2010/main" val="30888258"/>
+      </p:ext>
+    </p:extLst>
+  </p:cSld>
+  <p:clrMapOvr>
+    <a:masterClrMapping/>
+  </p:clrMapOvr>
+</p:notes>
+</file>
+
+<file path=ppt/notesSlides/notesSlide44.xml><?xml version="1.0" encoding="utf-8"?>
+<p:notes xmlns:a="http://schemas.openxmlformats.org/drawingml/2006/main" xmlns:r="http://schemas.openxmlformats.org/officeDocument/2006/relationships" xmlns:p="http://schemas.openxmlformats.org/presentationml/2006/main">
+  <p:cSld>
+    <p:spTree>
+      <p:nvGrpSpPr>
+        <p:cNvPr id="1" name=""/>
+        <p:cNvGrpSpPr/>
+        <p:nvPr/>
+      </p:nvGrpSpPr>
+      <p:grpSpPr>
+        <a:xfrm>
+          <a:off x="0" y="0"/>
+          <a:ext cx="0" cy="0"/>
+          <a:chOff x="0" y="0"/>
+          <a:chExt cx="0" cy="0"/>
+        </a:xfrm>
+      </p:grpSpPr>
+      <p:sp>
+        <p:nvSpPr>
+          <p:cNvPr id="2" name="Slide Image Placeholder 1"/>
+          <p:cNvSpPr>
+            <a:spLocks noGrp="1" noRot="1" noChangeAspect="1"/>
+          </p:cNvSpPr>
+          <p:nvPr>
+            <p:ph type="sldImg"/>
+          </p:nvPr>
+        </p:nvSpPr>
+        <p:spPr/>
+      </p:sp>
+      <p:sp>
+        <p:nvSpPr>
+          <p:cNvPr id="3" name="Notes Placeholder 2"/>
+          <p:cNvSpPr>
+            <a:spLocks noGrp="1"/>
+          </p:cNvSpPr>
+          <p:nvPr>
+            <p:ph type="body" idx="1"/>
+          </p:nvPr>
+        </p:nvSpPr>
+        <p:spPr/>
+        <p:txBody>
+          <a:bodyPr/>
+          <a:lstStyle/>
+          <a:p>
+            <a:r>
+              <a:rPr lang="en-US" dirty="0" smtClean="0"/>
+              <a:t>The higher order function </a:t>
+            </a:r>
+            <a:r>
+              <a:rPr lang="en-US" dirty="0" err="1" smtClean="0"/>
+              <a:t>wrapAllException</a:t>
+            </a:r>
+            <a:r>
+              <a:rPr lang="en-US" baseline="0" dirty="0" smtClean="0"/>
+              <a:t> returns a lambda </a:t>
+            </a:r>
+            <a:r>
+              <a:rPr lang="en-US" baseline="0" dirty="0"/>
+              <a:t>will call the close method of the original </a:t>
+            </a:r>
+            <a:r>
+              <a:rPr lang="en-US" baseline="0" dirty="0" err="1"/>
+              <a:t>autoClosable</a:t>
+            </a:r>
+            <a:r>
+              <a:rPr lang="en-US" baseline="0" dirty="0"/>
+              <a:t>.  If it throws an Exception, it will decorate it by wrapping the exception within a </a:t>
+            </a:r>
+            <a:r>
+              <a:rPr lang="en-US" baseline="0" dirty="0" err="1"/>
+              <a:t>NotClosedException</a:t>
+            </a:r>
+            <a:r>
+              <a:rPr lang="en-US" baseline="0" dirty="0"/>
+              <a:t>.</a:t>
+            </a:r>
+            <a:endParaRPr lang="en-US" dirty="0"/>
+          </a:p>
+        </p:txBody>
+      </p:sp>
+      <p:sp>
+        <p:nvSpPr>
+          <p:cNvPr id="4" name="Slide Number Placeholder 3"/>
+          <p:cNvSpPr>
+            <a:spLocks noGrp="1"/>
+          </p:cNvSpPr>
+          <p:nvPr>
+            <p:ph type="sldNum" sz="quarter" idx="10"/>
+          </p:nvPr>
+        </p:nvSpPr>
+        <p:spPr/>
+        <p:txBody>
+          <a:bodyPr/>
+          <a:lstStyle/>
+          <a:p>
+            <a:fld id="{9B9A5078-34A5-4200-8953-1FDEE337BA82}" type="slidenum">
+              <a:rPr lang="en-US" smtClean="0"/>
+              <a:t>50</a:t>
+            </a:fld>
+            <a:endParaRPr lang="en-US"/>
+          </a:p>
+        </p:txBody>
+      </p:sp>
+    </p:spTree>
+    <p:extLst>
+      <p:ext uri="{BB962C8B-B14F-4D97-AF65-F5344CB8AC3E}">
+        <p14:creationId xmlns:p14="http://schemas.microsoft.com/office/powerpoint/2010/main" val="2137428540"/>
+      </p:ext>
+    </p:extLst>
+  </p:cSld>
+  <p:clrMapOvr>
+    <a:masterClrMapping/>
+  </p:clrMapOvr>
+</p:notes>
+</file>
+
+<file path=ppt/notesSlides/notesSlide45.xml><?xml version="1.0" encoding="utf-8"?>
+<p:notes xmlns:a="http://schemas.openxmlformats.org/drawingml/2006/main" xmlns:r="http://schemas.openxmlformats.org/officeDocument/2006/relationships" xmlns:p="http://schemas.openxmlformats.org/presentationml/2006/main">
+  <p:cSld>
+    <p:spTree>
+      <p:nvGrpSpPr>
+        <p:cNvPr id="1" name=""/>
+        <p:cNvGrpSpPr/>
+        <p:nvPr/>
+      </p:nvGrpSpPr>
+      <p:grpSpPr>
+        <a:xfrm>
+          <a:off x="0" y="0"/>
+          <a:ext cx="0" cy="0"/>
+          <a:chOff x="0" y="0"/>
+          <a:chExt cx="0" cy="0"/>
+        </a:xfrm>
+      </p:grpSpPr>
+      <p:sp>
+        <p:nvSpPr>
+          <p:cNvPr id="2" name="Slide Image Placeholder 1"/>
+          <p:cNvSpPr>
+            <a:spLocks noGrp="1" noRot="1" noChangeAspect="1"/>
+          </p:cNvSpPr>
+          <p:nvPr>
+            <p:ph type="sldImg"/>
+          </p:nvPr>
+        </p:nvSpPr>
+        <p:spPr/>
+      </p:sp>
+      <p:sp>
+        <p:nvSpPr>
+          <p:cNvPr id="3" name="Notes Placeholder 2"/>
+          <p:cNvSpPr>
+            <a:spLocks noGrp="1"/>
+          </p:cNvSpPr>
+          <p:nvPr>
+            <p:ph type="body" idx="1"/>
+          </p:nvPr>
+        </p:nvSpPr>
+        <p:spPr/>
+        <p:txBody>
+          <a:bodyPr/>
+          <a:lstStyle/>
+          <a:p>
+            <a:r>
+              <a:rPr lang="en-US" dirty="0"/>
+              <a:t>The logger here is using </a:t>
+            </a:r>
+            <a:r>
+              <a:rPr lang="en-US" dirty="0" err="1"/>
+              <a:t>getCause</a:t>
+            </a:r>
+            <a:r>
+              <a:rPr lang="en-US" dirty="0"/>
+              <a:t>() because it knows that this exception</a:t>
+            </a:r>
+            <a:r>
+              <a:rPr lang="en-US" baseline="0" dirty="0"/>
+              <a:t> will always be wrapped.  It is printing the actual exception thrown by the close() method, not the exception decorator.  The </a:t>
+            </a:r>
+            <a:r>
+              <a:rPr lang="en-US" baseline="0" dirty="0" err="1"/>
+              <a:t>NotClosedException</a:t>
+            </a:r>
+            <a:r>
+              <a:rPr lang="en-US" baseline="0" dirty="0"/>
+              <a:t> won’t be caught if an exception occurs in the body because it will be a suppressed exception</a:t>
+            </a:r>
+            <a:r>
+              <a:rPr lang="en-US" baseline="0" dirty="0" smtClean="0"/>
+              <a:t>.  This allow exception handlers to handle the case where no exception is thrown in the body but an exception is thrown in the close() method differently than if the exception is thrown in the body.</a:t>
+            </a:r>
+            <a:endParaRPr lang="en-US" dirty="0"/>
+          </a:p>
+        </p:txBody>
+      </p:sp>
+      <p:sp>
+        <p:nvSpPr>
+          <p:cNvPr id="4" name="Slide Number Placeholder 3"/>
+          <p:cNvSpPr>
+            <a:spLocks noGrp="1"/>
+          </p:cNvSpPr>
+          <p:nvPr>
+            <p:ph type="sldNum" sz="quarter" idx="10"/>
+          </p:nvPr>
+        </p:nvSpPr>
+        <p:spPr/>
+        <p:txBody>
+          <a:bodyPr/>
+          <a:lstStyle/>
+          <a:p>
+            <a:fld id="{9B9A5078-34A5-4200-8953-1FDEE337BA82}" type="slidenum">
+              <a:rPr lang="en-US" smtClean="0"/>
+              <a:t>51</a:t>
+            </a:fld>
+            <a:endParaRPr lang="en-US"/>
+          </a:p>
+        </p:txBody>
+      </p:sp>
+    </p:spTree>
+    <p:extLst>
+      <p:ext uri="{BB962C8B-B14F-4D97-AF65-F5344CB8AC3E}">
+        <p14:creationId xmlns:p14="http://schemas.microsoft.com/office/powerpoint/2010/main" val="734209670"/>
+      </p:ext>
+    </p:extLst>
+  </p:cSld>
+  <p:clrMapOvr>
+    <a:masterClrMapping/>
+  </p:clrMapOvr>
+</p:notes>
+</file>
+
+<file path=ppt/notesSlides/notesSlide46.xml><?xml version="1.0" encoding="utf-8"?>
+<p:notes xmlns:a="http://schemas.openxmlformats.org/drawingml/2006/main" xmlns:r="http://schemas.openxmlformats.org/officeDocument/2006/relationships" xmlns:p="http://schemas.openxmlformats.org/presentationml/2006/main">
+  <p:cSld>
+    <p:spTree>
+      <p:nvGrpSpPr>
+        <p:cNvPr id="1" name=""/>
+        <p:cNvGrpSpPr/>
+        <p:nvPr/>
+      </p:nvGrpSpPr>
+      <p:grpSpPr>
+        <a:xfrm>
+          <a:off x="0" y="0"/>
+          <a:ext cx="0" cy="0"/>
+          <a:chOff x="0" y="0"/>
+          <a:chExt cx="0" cy="0"/>
+        </a:xfrm>
+      </p:grpSpPr>
+      <p:sp>
+        <p:nvSpPr>
+          <p:cNvPr id="2" name="Slide Image Placeholder 1"/>
+          <p:cNvSpPr>
+            <a:spLocks noGrp="1" noRot="1" noChangeAspect="1"/>
+          </p:cNvSpPr>
+          <p:nvPr>
+            <p:ph type="sldImg"/>
+          </p:nvPr>
+        </p:nvSpPr>
+        <p:spPr/>
+      </p:sp>
+      <p:sp>
+        <p:nvSpPr>
+          <p:cNvPr id="3" name="Notes Placeholder 2"/>
+          <p:cNvSpPr>
+            <a:spLocks noGrp="1"/>
+          </p:cNvSpPr>
+          <p:nvPr>
+            <p:ph type="body" idx="1"/>
+          </p:nvPr>
+        </p:nvSpPr>
+        <p:spPr/>
+        <p:txBody>
+          <a:bodyPr/>
+          <a:lstStyle/>
+          <a:p>
+            <a:pPr algn="l"/>
+            <a:r>
+              <a:rPr lang="en-US" i="1" dirty="0" smtClean="0"/>
+              <a:t>Go over slide.  </a:t>
+            </a:r>
+            <a:r>
+              <a:rPr lang="en-US" dirty="0" smtClean="0"/>
+              <a:t>Wrap </a:t>
+            </a:r>
+            <a:r>
+              <a:rPr lang="en-US" dirty="0"/>
+              <a:t>is the example shown on the previous two slides.  The difference between</a:t>
+            </a:r>
+            <a:r>
+              <a:rPr lang="en-US" baseline="0" dirty="0"/>
+              <a:t> consume and wrap + catch is consume always processes exceptions from the close method, but wrapped exceptions are only caught if no exception occurs in the try-with-resources body</a:t>
+            </a:r>
+            <a:r>
+              <a:rPr lang="en-US" baseline="0" dirty="0" smtClean="0"/>
+              <a:t>.  It is a form of the adapter design pattern because you are adapting an exception from an unwanted type into the type you want to handle.</a:t>
+            </a:r>
+            <a:endParaRPr lang="en-US" dirty="0"/>
+          </a:p>
+        </p:txBody>
+      </p:sp>
+      <p:sp>
+        <p:nvSpPr>
+          <p:cNvPr id="4" name="Slide Number Placeholder 3"/>
+          <p:cNvSpPr>
+            <a:spLocks noGrp="1"/>
+          </p:cNvSpPr>
+          <p:nvPr>
+            <p:ph type="sldNum" sz="quarter" idx="10"/>
+          </p:nvPr>
+        </p:nvSpPr>
+        <p:spPr/>
+        <p:txBody>
+          <a:bodyPr/>
+          <a:lstStyle/>
+          <a:p>
+            <a:fld id="{9B9A5078-34A5-4200-8953-1FDEE337BA82}" type="slidenum">
+              <a:rPr lang="en-US" smtClean="0"/>
               <a:t>52</a:t>
             </a:fld>
             <a:endParaRPr lang="en-US"/>
@@ -4660,7 +5215,7 @@
 </p:notes>
 </file>
 
-<file path=ppt/notesSlides/notesSlide43.xml><?xml version="1.0" encoding="utf-8"?>
+<file path=ppt/notesSlides/notesSlide47.xml><?xml version="1.0" encoding="utf-8"?>
 <p:notes xmlns:a="http://schemas.openxmlformats.org/drawingml/2006/main" xmlns:r="http://schemas.openxmlformats.org/officeDocument/2006/relationships" xmlns:p="http://schemas.openxmlformats.org/presentationml/2006/main">
   <p:cSld>
     <p:spTree>
@@ -4917,12 +5472,40 @@
           <a:lstStyle/>
           <a:p>
             <a:r>
+              <a:rPr lang="en-US" dirty="0" smtClean="0"/>
+              <a:t>This illustrates the difference in using a lambda expression vs an anonymous</a:t>
+            </a:r>
+            <a:r>
+              <a:rPr lang="en-US" baseline="0" dirty="0" smtClean="0"/>
+              <a:t> inner class.  Note that the lambda expression is 8 characters.  </a:t>
+            </a:r>
+            <a:r>
+              <a:rPr lang="en-US" dirty="0" smtClean="0"/>
+              <a:t>Java </a:t>
+            </a:r>
+            <a:r>
               <a:rPr lang="en-US" dirty="0"/>
-              <a:t>Java 8 uses type inference</a:t>
+              <a:t>8 uses type </a:t>
+            </a:r>
+            <a:r>
+              <a:rPr lang="en-US" dirty="0" smtClean="0"/>
+              <a:t>inference from the FI</a:t>
+            </a:r>
+            <a:r>
+              <a:rPr lang="en-US" baseline="0" dirty="0" smtClean="0"/>
+              <a:t> </a:t>
             </a:r>
             <a:r>
               <a:rPr lang="en-US" baseline="0" dirty="0"/>
-              <a:t> to produce a lambda with the correct return value and argument.  Saves much code.  Note how much more </a:t>
+              <a:t>to produce a lambda with the correct return value and argument.  Saves much code.  </a:t>
+            </a:r>
+            <a:r>
+              <a:rPr lang="en-US" baseline="0" dirty="0" smtClean="0"/>
+              <a:t>Notice how </a:t>
+            </a:r>
+            <a:r>
+              <a:rPr lang="en-US" baseline="0" dirty="0"/>
+              <a:t>much more </a:t>
             </a:r>
             <a:r>
               <a:rPr lang="en-US" baseline="0" dirty="0" smtClean="0"/>
@@ -4938,7 +5521,15 @@
             </a:r>
             <a:r>
               <a:rPr lang="en-US" baseline="0" dirty="0"/>
-              <a:t>.  Java 8 also optimizes lambdas.  Since that lambda does not reference any “outside” variables, Java 8 will automatically create a single constant instance of it and reuse it.</a:t>
+              <a:t>.  Java 8 also optimizes lambdas.  Since that lambda </a:t>
+            </a:r>
+            <a:r>
+              <a:rPr lang="en-US" baseline="0" dirty="0" smtClean="0"/>
+              <a:t>does </a:t>
+            </a:r>
+            <a:r>
+              <a:rPr lang="en-US" baseline="0" dirty="0"/>
+              <a:t>not reference any “outside” variables, Java 8 will automatically create a single constant instance of it and reuse it.</a:t>
             </a:r>
             <a:endParaRPr lang="en-US" dirty="0"/>
           </a:p>
@@ -5158,7 +5749,11 @@
             </a:r>
             <a:r>
               <a:rPr lang="en-US" baseline="0" dirty="0" smtClean="0"/>
-              <a:t> conventions are consistently used by the Java Functional Interfaces.  Awareness of them will help in understanding declarations that use them.</a:t>
+              <a:t> conventions are consistently used by the Java Functional Interfaces.  Awareness of them will help in understanding declarations that use them</a:t>
+            </a:r>
+            <a:r>
+              <a:rPr lang="en-US" baseline="0" dirty="0" smtClean="0"/>
+              <a:t>.  These conventions are worthwhile to use in your own code.  They will help any developer who is familiar with the built-in FIs and Stream classes to understand your code.</a:t>
             </a:r>
             <a:endParaRPr lang="en-US" dirty="0"/>
           </a:p>
@@ -6023,7 +6618,7 @@
             <a:fld id="{B61BEF0D-F0BB-DE4B-95CE-6DB70DBA9567}" type="datetimeFigureOut">
               <a:rPr lang="en-US" dirty="0"/>
               <a:pPr/>
-              <a:t>8/17/2020</a:t>
+              <a:t>8/18/2020</a:t>
             </a:fld>
             <a:endParaRPr lang="en-US" dirty="0"/>
           </a:p>
@@ -6271,7 +6866,7 @@
             <a:fld id="{B61BEF0D-F0BB-DE4B-95CE-6DB70DBA9567}" type="datetimeFigureOut">
               <a:rPr lang="en-US" dirty="0"/>
               <a:pPr/>
-              <a:t>8/17/2020</a:t>
+              <a:t>8/18/2020</a:t>
             </a:fld>
             <a:endParaRPr lang="en-US" dirty="0"/>
           </a:p>
@@ -6582,7 +7177,7 @@
             <a:fld id="{B61BEF0D-F0BB-DE4B-95CE-6DB70DBA9567}" type="datetimeFigureOut">
               <a:rPr lang="en-US" dirty="0"/>
               <a:pPr/>
-              <a:t>8/17/2020</a:t>
+              <a:t>8/18/2020</a:t>
             </a:fld>
             <a:endParaRPr lang="en-US" dirty="0"/>
           </a:p>
@@ -6920,7 +7515,7 @@
             <a:fld id="{B61BEF0D-F0BB-DE4B-95CE-6DB70DBA9567}" type="datetimeFigureOut">
               <a:rPr lang="en-US" dirty="0"/>
               <a:pPr/>
-              <a:t>8/17/2020</a:t>
+              <a:t>8/18/2020</a:t>
             </a:fld>
             <a:endParaRPr lang="en-US" dirty="0"/>
           </a:p>
@@ -7231,7 +7826,7 @@
             <a:fld id="{B61BEF0D-F0BB-DE4B-95CE-6DB70DBA9567}" type="datetimeFigureOut">
               <a:rPr lang="en-US" dirty="0"/>
               <a:pPr/>
-              <a:t>8/17/2020</a:t>
+              <a:t>8/18/2020</a:t>
             </a:fld>
             <a:endParaRPr lang="en-US" dirty="0"/>
           </a:p>
@@ -7621,7 +8216,7 @@
             <a:fld id="{B61BEF0D-F0BB-DE4B-95CE-6DB70DBA9567}" type="datetimeFigureOut">
               <a:rPr lang="en-US" dirty="0"/>
               <a:pPr/>
-              <a:t>8/17/2020</a:t>
+              <a:t>8/18/2020</a:t>
             </a:fld>
             <a:endParaRPr lang="en-US" dirty="0"/>
           </a:p>
@@ -7787,7 +8382,7 @@
           <a:p>
             <a:fld id="{55C6B4A9-1611-4792-9094-5F34BCA07E0B}" type="datetimeFigureOut">
               <a:rPr lang="en-US" dirty="0"/>
-              <a:t>8/17/2020</a:t>
+              <a:t>8/18/2020</a:t>
             </a:fld>
             <a:endParaRPr lang="en-US" dirty="0"/>
           </a:p>
@@ -7963,7 +8558,7 @@
             <a:fld id="{B61BEF0D-F0BB-DE4B-95CE-6DB70DBA9567}" type="datetimeFigureOut">
               <a:rPr lang="en-US" dirty="0"/>
               <a:pPr/>
-              <a:t>8/17/2020</a:t>
+              <a:t>8/18/2020</a:t>
             </a:fld>
             <a:endParaRPr lang="en-US" dirty="0"/>
           </a:p>
@@ -8136,7 +8731,7 @@
             <a:fld id="{B61BEF0D-F0BB-DE4B-95CE-6DB70DBA9567}" type="datetimeFigureOut">
               <a:rPr lang="en-US" dirty="0"/>
               <a:pPr/>
-              <a:t>8/17/2020</a:t>
+              <a:t>8/18/2020</a:t>
             </a:fld>
             <a:endParaRPr lang="en-US" dirty="0"/>
           </a:p>
@@ -8380,7 +8975,7 @@
             <a:fld id="{B61BEF0D-F0BB-DE4B-95CE-6DB70DBA9567}" type="datetimeFigureOut">
               <a:rPr lang="en-US" dirty="0"/>
               <a:pPr/>
-              <a:t>8/17/2020</a:t>
+              <a:t>8/18/2020</a:t>
             </a:fld>
             <a:endParaRPr lang="en-US" dirty="0"/>
           </a:p>
@@ -8608,7 +9203,7 @@
           <a:p>
             <a:fld id="{EB712588-04B1-427B-82EE-E8DB90309F08}" type="datetimeFigureOut">
               <a:rPr lang="en-US" dirty="0"/>
-              <a:t>8/17/2020</a:t>
+              <a:t>8/18/2020</a:t>
             </a:fld>
             <a:endParaRPr lang="en-US" dirty="0"/>
           </a:p>
@@ -8978,7 +9573,7 @@
             <a:fld id="{B61BEF0D-F0BB-DE4B-95CE-6DB70DBA9567}" type="datetimeFigureOut">
               <a:rPr lang="en-US" dirty="0"/>
               <a:pPr/>
-              <a:t>8/17/2020</a:t>
+              <a:t>8/18/2020</a:t>
             </a:fld>
             <a:endParaRPr lang="en-US" dirty="0"/>
           </a:p>
@@ -9098,7 +9693,7 @@
             <a:fld id="{B61BEF0D-F0BB-DE4B-95CE-6DB70DBA9567}" type="datetimeFigureOut">
               <a:rPr lang="en-US" dirty="0"/>
               <a:pPr/>
-              <a:t>8/17/2020</a:t>
+              <a:t>8/18/2020</a:t>
             </a:fld>
             <a:endParaRPr lang="en-US" dirty="0"/>
           </a:p>
@@ -9190,7 +9785,7 @@
             <a:fld id="{B61BEF0D-F0BB-DE4B-95CE-6DB70DBA9567}" type="datetimeFigureOut">
               <a:rPr lang="en-US" dirty="0"/>
               <a:pPr/>
-              <a:t>8/17/2020</a:t>
+              <a:t>8/18/2020</a:t>
             </a:fld>
             <a:endParaRPr lang="en-US" dirty="0"/>
           </a:p>
@@ -9441,7 +10036,7 @@
           <a:p>
             <a:fld id="{42A54C80-263E-416B-A8E0-580EDEADCBDC}" type="datetimeFigureOut">
               <a:rPr lang="en-US" dirty="0"/>
-              <a:t>8/17/2020</a:t>
+              <a:t>8/18/2020</a:t>
             </a:fld>
             <a:endParaRPr lang="en-US" dirty="0"/>
           </a:p>
@@ -9700,7 +10295,7 @@
             <a:fld id="{B61BEF0D-F0BB-DE4B-95CE-6DB70DBA9567}" type="datetimeFigureOut">
               <a:rPr lang="en-US" dirty="0"/>
               <a:pPr/>
-              <a:t>8/17/2020</a:t>
+              <a:t>8/18/2020</a:t>
             </a:fld>
             <a:endParaRPr lang="en-US" dirty="0"/>
           </a:p>
@@ -10440,7 +11035,7 @@
             <a:fld id="{B61BEF0D-F0BB-DE4B-95CE-6DB70DBA9567}" type="datetimeFigureOut">
               <a:rPr lang="en-US" dirty="0"/>
               <a:pPr/>
-              <a:t>8/17/2020</a:t>
+              <a:t>8/18/2020</a:t>
             </a:fld>
             <a:endParaRPr lang="en-US" dirty="0"/>
           </a:p>
@@ -12508,15 +13103,7 @@
           <a:p>
             <a:r>
               <a:rPr lang="en-US" sz="2400" dirty="0" smtClean="0"/>
-              <a:t>A specialization of </a:t>
-            </a:r>
-            <a:r>
-              <a:rPr lang="en-US" sz="2400" dirty="0" smtClean="0"/>
-              <a:t>function: </a:t>
-            </a:r>
-            <a:r>
-              <a:rPr lang="en-US" sz="2400" dirty="0" smtClean="0"/>
-              <a:t>Accepts </a:t>
+              <a:t>A specialization of function: Accepts </a:t>
             </a:r>
             <a:r>
               <a:rPr lang="en-US" sz="2400" dirty="0"/>
@@ -13228,11 +13815,7 @@
             </a:r>
             <a:r>
               <a:rPr lang="en-US" sz="2200" dirty="0" smtClean="0"/>
-              <a:t>lhs</a:t>
-            </a:r>
-            <a:r>
-              <a:rPr lang="en-US" sz="2200" dirty="0" smtClean="0"/>
-              <a:t> </a:t>
+              <a:t>lhs </a:t>
             </a:r>
             <a:r>
               <a:rPr lang="en-US" sz="2200" dirty="0"/>
@@ -13259,11 +13842,7 @@
             </a:r>
             <a:r>
               <a:rPr lang="en-US" sz="2200" dirty="0" smtClean="0"/>
-              <a:t>lhs</a:t>
-            </a:r>
-            <a:r>
-              <a:rPr lang="en-US" sz="2200" dirty="0" smtClean="0"/>
-              <a:t> </a:t>
+              <a:t>lhs </a:t>
             </a:r>
             <a:r>
               <a:rPr lang="en-US" sz="2200" dirty="0"/>
@@ -13289,7 +13868,6 @@
               <a:rPr lang="en-US" sz="2200" dirty="0"/>
               <a:t>0</a:t>
             </a:r>
-            <a:endParaRPr lang="en-US" sz="2200" dirty="0"/>
           </a:p>
           <a:p>
             <a:r>
@@ -13590,18 +14168,7 @@
                   </a:prstClr>
                 </a:solidFill>
               </a:rPr>
-              <a:t> if does not exist, </a:t>
-            </a:r>
-            <a:r>
-              <a:rPr lang="en-US" sz="2400" dirty="0" smtClean="0">
-                <a:solidFill>
-                  <a:prstClr val="black">
-                    <a:lumMod val="75000"/>
-                    <a:lumOff val="25000"/>
-                  </a:prstClr>
-                </a:solidFill>
-              </a:rPr>
-              <a:t>and </a:t>
+              <a:t> if does not exist, and </a:t>
             </a:r>
             <a:r>
               <a:rPr lang="en-US" sz="2400" dirty="0" smtClean="0">
@@ -15160,8 +15727,55 @@
               <a:buNone/>
             </a:pPr>
             <a:r>
+              <a:rPr lang="en-US" sz="2000" dirty="0" smtClean="0">
+                <a:solidFill>
+                  <a:srgbClr val="008000"/>
+                </a:solidFill>
+                <a:latin typeface="Courier New" panose="02070309020205020404" pitchFamily="49" charset="0"/>
+              </a:rPr>
+              <a:t>// public </a:t>
+            </a:r>
+            <a:r>
               <a:rPr lang="en-US" sz="2000" dirty="0">
                 <a:solidFill>
+                  <a:srgbClr val="008000"/>
+                </a:solidFill>
+                <a:latin typeface="Courier New" panose="02070309020205020404" pitchFamily="49" charset="0"/>
+              </a:rPr>
+              <a:t>static </a:t>
+            </a:r>
+            <a:r>
+              <a:rPr lang="en-US" sz="2000" dirty="0" err="1">
+                <a:solidFill>
+                  <a:srgbClr val="008000"/>
+                </a:solidFill>
+                <a:latin typeface="Courier New" panose="02070309020205020404" pitchFamily="49" charset="0"/>
+              </a:rPr>
+              <a:t>valueOf</a:t>
+            </a:r>
+            <a:r>
+              <a:rPr lang="en-US" sz="2000" dirty="0">
+                <a:solidFill>
+                  <a:srgbClr val="008000"/>
+                </a:solidFill>
+                <a:latin typeface="Courier New" panose="02070309020205020404" pitchFamily="49" charset="0"/>
+              </a:rPr>
+              <a:t>(char[] data)</a:t>
+            </a:r>
+            <a:endParaRPr lang="en-US" sz="2000" dirty="0" smtClean="0">
+              <a:solidFill>
+                <a:srgbClr val="000000"/>
+              </a:solidFill>
+              <a:latin typeface="Courier New" panose="02070309020205020404" pitchFamily="49" charset="0"/>
+            </a:endParaRPr>
+          </a:p>
+          <a:p>
+            <a:pPr marL="0" indent="0">
+              <a:buNone/>
+            </a:pPr>
+            <a:r>
+              <a:rPr lang="en-US" sz="2000" dirty="0" smtClean="0">
+                <a:solidFill>
                   <a:srgbClr val="000000"/>
                 </a:solidFill>
                 <a:latin typeface="Courier New" panose="02070309020205020404" pitchFamily="49" charset="0"/>
@@ -15169,7 +15783,7 @@
               <a:t>Function</a:t>
             </a:r>
             <a:r>
-              <a:rPr lang="en-US" sz="2000" b="1" dirty="0">
+              <a:rPr lang="en-US" sz="2000" b="1" dirty="0" smtClean="0">
                 <a:solidFill>
                   <a:srgbClr val="000080"/>
                 </a:solidFill>
@@ -15178,7 +15792,7 @@
               <a:t>&lt;</a:t>
             </a:r>
             <a:r>
-              <a:rPr lang="en-US" sz="2000" dirty="0">
+              <a:rPr lang="en-US" sz="2000" dirty="0" smtClean="0">
                 <a:solidFill>
                   <a:srgbClr val="8000FF"/>
                 </a:solidFill>
@@ -15945,6 +16559,44 @@
             <a:r>
               <a:rPr lang="en-US" sz="2000" dirty="0">
                 <a:solidFill>
+                  <a:srgbClr val="008000"/>
+                </a:solidFill>
+                <a:latin typeface="Courier New" panose="02070309020205020404" pitchFamily="49" charset="0"/>
+              </a:rPr>
+              <a:t>// public void </a:t>
+            </a:r>
+            <a:r>
+              <a:rPr lang="en-US" sz="2000" dirty="0" smtClean="0">
+                <a:solidFill>
+                  <a:srgbClr val="008000"/>
+                </a:solidFill>
+                <a:latin typeface="Courier New" panose="02070309020205020404" pitchFamily="49" charset="0"/>
+              </a:rPr>
+              <a:t>print(Object </a:t>
+            </a:r>
+            <a:r>
+              <a:rPr lang="en-US" sz="2000" dirty="0">
+                <a:solidFill>
+                  <a:srgbClr val="008000"/>
+                </a:solidFill>
+                <a:latin typeface="Courier New" panose="02070309020205020404" pitchFamily="49" charset="0"/>
+              </a:rPr>
+              <a:t>x)</a:t>
+            </a:r>
+            <a:endParaRPr lang="en-US" sz="2000" dirty="0" smtClean="0">
+              <a:solidFill>
+                <a:srgbClr val="000000"/>
+              </a:solidFill>
+              <a:latin typeface="Courier New" panose="02070309020205020404" pitchFamily="49" charset="0"/>
+            </a:endParaRPr>
+          </a:p>
+          <a:p>
+            <a:pPr marL="0" indent="0">
+              <a:buNone/>
+            </a:pPr>
+            <a:r>
+              <a:rPr lang="en-US" sz="2000" dirty="0" smtClean="0">
+                <a:solidFill>
                   <a:srgbClr val="000000"/>
                 </a:solidFill>
                 <a:latin typeface="Courier New" panose="02070309020205020404" pitchFamily="49" charset="0"/>
@@ -15952,7 +16604,7 @@
               <a:t>Consumer</a:t>
             </a:r>
             <a:r>
-              <a:rPr lang="en-US" sz="2000" b="1" dirty="0">
+              <a:rPr lang="en-US" sz="2000" b="1" dirty="0" smtClean="0">
                 <a:solidFill>
                   <a:srgbClr val="000080"/>
                 </a:solidFill>
@@ -15961,7 +16613,7 @@
               <a:t>&lt;</a:t>
             </a:r>
             <a:r>
-              <a:rPr lang="en-US" sz="2000" dirty="0">
+              <a:rPr lang="en-US" sz="2000" dirty="0" smtClean="0">
                 <a:solidFill>
                   <a:srgbClr val="000000"/>
                 </a:solidFill>
@@ -16471,6 +17123,44 @@
             <a:r>
               <a:rPr lang="en-US" sz="2000" dirty="0">
                 <a:solidFill>
+                  <a:srgbClr val="008000"/>
+                </a:solidFill>
+                <a:latin typeface="Courier New" panose="02070309020205020404" pitchFamily="49" charset="0"/>
+              </a:rPr>
+              <a:t>// public </a:t>
+            </a:r>
+            <a:r>
+              <a:rPr lang="en-US" sz="2000" dirty="0" err="1">
+                <a:solidFill>
+                  <a:srgbClr val="008000"/>
+                </a:solidFill>
+                <a:latin typeface="Courier New" panose="02070309020205020404" pitchFamily="49" charset="0"/>
+              </a:rPr>
+              <a:t>StringBuilder</a:t>
+            </a:r>
+            <a:r>
+              <a:rPr lang="en-US" sz="2000" dirty="0">
+                <a:solidFill>
+                  <a:srgbClr val="008000"/>
+                </a:solidFill>
+                <a:latin typeface="Courier New" panose="02070309020205020404" pitchFamily="49" charset="0"/>
+              </a:rPr>
+              <a:t>()</a:t>
+            </a:r>
+            <a:endParaRPr lang="en-US" sz="2000" dirty="0" smtClean="0">
+              <a:solidFill>
+                <a:srgbClr val="000000"/>
+              </a:solidFill>
+              <a:latin typeface="Courier New" panose="02070309020205020404" pitchFamily="49" charset="0"/>
+            </a:endParaRPr>
+          </a:p>
+          <a:p>
+            <a:pPr marL="0" indent="0">
+              <a:buNone/>
+            </a:pPr>
+            <a:r>
+              <a:rPr lang="en-US" sz="2000" dirty="0" smtClean="0">
+                <a:solidFill>
                   <a:srgbClr val="000000"/>
                 </a:solidFill>
                 <a:latin typeface="Courier New" panose="02070309020205020404" pitchFamily="49" charset="0"/>
@@ -16478,7 +17168,7 @@
               <a:t>Supplier</a:t>
             </a:r>
             <a:r>
-              <a:rPr lang="en-US" sz="2000" b="1" dirty="0">
+              <a:rPr lang="en-US" sz="2000" b="1" dirty="0" smtClean="0">
                 <a:solidFill>
                   <a:srgbClr val="000080"/>
                 </a:solidFill>
@@ -16487,7 +17177,7 @@
               <a:t>&lt;</a:t>
             </a:r>
             <a:r>
-              <a:rPr lang="en-US" sz="2000" dirty="0" err="1">
+              <a:rPr lang="en-US" sz="2000" dirty="0" err="1" smtClean="0">
                 <a:solidFill>
                   <a:srgbClr val="000000"/>
                 </a:solidFill>
@@ -16852,11 +17542,7 @@
             </a:r>
             <a:r>
               <a:rPr lang="en-US" sz="2000" dirty="0" smtClean="0"/>
-              <a:t>non-void</a:t>
-            </a:r>
-            <a:r>
-              <a:rPr lang="en-US" sz="2000" dirty="0" smtClean="0"/>
-              <a:t> </a:t>
+              <a:t>non-void </a:t>
             </a:r>
             <a:r>
               <a:rPr lang="en-US" sz="2000" dirty="0"/>
@@ -16884,11 +17570,7 @@
             </a:r>
             <a:r>
               <a:rPr lang="en-US" sz="2000" dirty="0" smtClean="0"/>
-              <a:t>may </a:t>
-            </a:r>
-            <a:r>
-              <a:rPr lang="en-US" sz="2000" dirty="0" smtClean="0"/>
-              <a:t>be used </a:t>
+              <a:t>may be used </a:t>
             </a:r>
             <a:r>
               <a:rPr lang="en-US" sz="2000" dirty="0"/>
@@ -16993,8 +17675,46 @@
               <a:buNone/>
             </a:pPr>
             <a:r>
+              <a:rPr lang="en-US" sz="2000" dirty="0">
+                <a:solidFill>
+                  <a:srgbClr val="008000"/>
+                </a:solidFill>
+                <a:latin typeface="Courier New" panose="02070309020205020404" pitchFamily="49" charset="0"/>
+              </a:rPr>
+              <a:t>// public String </a:t>
+            </a:r>
+            <a:r>
               <a:rPr lang="en-US" sz="2000" dirty="0" err="1">
                 <a:solidFill>
+                  <a:srgbClr val="008000"/>
+                </a:solidFill>
+                <a:latin typeface="Courier New" panose="02070309020205020404" pitchFamily="49" charset="0"/>
+              </a:rPr>
+              <a:t>toUpperCase</a:t>
+            </a:r>
+            <a:r>
+              <a:rPr lang="en-US" sz="2000" dirty="0">
+                <a:solidFill>
+                  <a:srgbClr val="008000"/>
+                </a:solidFill>
+                <a:latin typeface="Courier New" panose="02070309020205020404" pitchFamily="49" charset="0"/>
+              </a:rPr>
+              <a:t>()</a:t>
+            </a:r>
+            <a:endParaRPr lang="en-US" sz="2000" dirty="0" smtClean="0">
+              <a:solidFill>
+                <a:srgbClr val="000000"/>
+              </a:solidFill>
+              <a:latin typeface="Courier New" panose="02070309020205020404" pitchFamily="49" charset="0"/>
+            </a:endParaRPr>
+          </a:p>
+          <a:p>
+            <a:pPr marL="0" indent="0">
+              <a:buNone/>
+            </a:pPr>
+            <a:r>
+              <a:rPr lang="en-US" sz="2000" dirty="0" err="1" smtClean="0">
+                <a:solidFill>
                   <a:srgbClr val="000000"/>
                 </a:solidFill>
                 <a:latin typeface="Courier New" panose="02070309020205020404" pitchFamily="49" charset="0"/>
@@ -17002,7 +17722,7 @@
               <a:t>UnaryOperator</a:t>
             </a:r>
             <a:r>
-              <a:rPr lang="en-US" sz="2000" b="1" dirty="0">
+              <a:rPr lang="en-US" sz="2000" b="1" dirty="0" smtClean="0">
                 <a:solidFill>
                   <a:srgbClr val="000080"/>
                 </a:solidFill>
@@ -17011,7 +17731,7 @@
               <a:t>&lt;</a:t>
             </a:r>
             <a:r>
-              <a:rPr lang="en-US" sz="2000" dirty="0">
+              <a:rPr lang="en-US" sz="2000" dirty="0" smtClean="0">
                 <a:solidFill>
                   <a:srgbClr val="000000"/>
                 </a:solidFill>
@@ -17758,11 +18478,7 @@
             </a:r>
             <a:r>
               <a:rPr lang="en-US" sz="2400" dirty="0" smtClean="0"/>
-              <a:t>place.  </a:t>
-            </a:r>
-            <a:r>
-              <a:rPr lang="en-US" sz="2400" dirty="0" smtClean="0"/>
-              <a:t>The terminal operation is like the worker who packages the finished product.</a:t>
+              <a:t>place.  The terminal operation is like the worker who packages the finished product.</a:t>
             </a:r>
             <a:endParaRPr lang="en-US" sz="2400" dirty="0"/>
           </a:p>
@@ -17773,7 +18489,15 @@
             </a:r>
             <a:r>
               <a:rPr lang="en-US" sz="2400" dirty="0" smtClean="0"/>
-              <a:t>the data source or previous </a:t>
+              <a:t>the data </a:t>
+            </a:r>
+            <a:r>
+              <a:rPr lang="en-US" sz="2400" dirty="0" smtClean="0"/>
+              <a:t>source output </a:t>
+            </a:r>
+            <a:r>
+              <a:rPr lang="en-US" sz="2400" dirty="0" smtClean="0"/>
+              <a:t>or previous </a:t>
             </a:r>
             <a:r>
               <a:rPr lang="en-US" sz="2400" dirty="0"/>
@@ -17801,11 +18525,7 @@
             </a:r>
             <a:r>
               <a:rPr lang="en-US" sz="2400" dirty="0" smtClean="0"/>
-              <a:t>it</a:t>
-            </a:r>
-            <a:r>
-              <a:rPr lang="en-US" sz="2400" dirty="0" smtClean="0"/>
-              <a:t> </a:t>
+              <a:t>it </a:t>
             </a:r>
             <a:r>
               <a:rPr lang="en-US" sz="2400" dirty="0"/>
@@ -18891,8 +19611,38 @@
             </a:r>
             <a:r>
               <a:rPr lang="en-US" sz="1600" dirty="0" smtClean="0"/>
-              <a:t> because it only reads its arguments, and does not change any internal state.</a:t>
-            </a:r>
+              <a:t> because it only reads its arguments, </a:t>
+            </a:r>
+            <a:r>
+              <a:rPr lang="en-US" sz="1600" dirty="0" smtClean="0"/>
+              <a:t>does </a:t>
+            </a:r>
+            <a:r>
+              <a:rPr lang="en-US" sz="1600" dirty="0" smtClean="0"/>
+              <a:t>not change any </a:t>
+            </a:r>
+            <a:r>
+              <a:rPr lang="en-US" sz="1600" dirty="0" smtClean="0"/>
+              <a:t>external state (no side-effects), and always returns the same value for the same arguments.  For example: </a:t>
+            </a:r>
+            <a:r>
+              <a:rPr lang="en-US" sz="1600" dirty="0" smtClean="0">
+                <a:solidFill>
+                  <a:srgbClr val="000000"/>
+                </a:solidFill>
+                <a:highlight>
+                  <a:srgbClr val="FFFFFF"/>
+                </a:highlight>
+                <a:latin typeface="Courier New" panose="02070309020205020404" pitchFamily="49" charset="0"/>
+                <a:cs typeface="Courier New" panose="02070309020205020404" pitchFamily="49" charset="0"/>
+              </a:rPr>
+              <a:t>apply(3,4)</a:t>
+            </a:r>
+            <a:r>
+              <a:rPr lang="en-US" sz="1600" dirty="0" smtClean="0"/>
+              <a:t> always returns 7.</a:t>
+            </a:r>
+            <a:endParaRPr lang="en-US" sz="1600" dirty="0" smtClean="0"/>
           </a:p>
           <a:p>
             <a:r>
@@ -18905,7 +19655,7 @@
                   <a:srgbClr val="FFFFFF"/>
                 </a:highlight>
               </a:rPr>
-              <a:t>b</a:t>
+              <a:t>behavior may occur.  </a:t>
             </a:r>
             <a:r>
               <a:rPr lang="en-US" sz="1600" dirty="0" smtClean="0">
@@ -18913,23 +19663,7 @@
                   <a:srgbClr val="FFFFFF"/>
                 </a:highlight>
               </a:rPr>
-              <a:t>ehavior may occur.  The </a:t>
-            </a:r>
-            <a:r>
-              <a:rPr lang="en-US" sz="1600" dirty="0" err="1" smtClean="0">
-                <a:highlight>
-                  <a:srgbClr val="FFFFFF"/>
-                </a:highlight>
-              </a:rPr>
-              <a:t>forEach</a:t>
-            </a:r>
-            <a:r>
-              <a:rPr lang="en-US" sz="1600" dirty="0" smtClean="0">
-                <a:highlight>
-                  <a:srgbClr val="FFFFFF"/>
-                </a:highlight>
-              </a:rPr>
-              <a:t> terminal operation is a notable exception.</a:t>
+              <a:t>Consumers and Suppliers are notable exceptions to this rule.</a:t>
             </a:r>
             <a:endParaRPr lang="en-US" sz="1600" dirty="0" smtClean="0">
               <a:solidFill>
@@ -20908,7 +21642,7 @@
           <p:cNvPr id="2" name="Title 1">
             <a:extLst>
               <a:ext uri="{FF2B5EF4-FFF2-40B4-BE49-F238E27FC236}">
-                <a16:creationId xmlns:a16="http://schemas.microsoft.com/office/drawing/2014/main" xmlns="" id="{4BF41A3A-9BA9-D948-8BBC-74A05D841F3C}"/>
+                <a16:creationId xmlns="" xmlns:a16="http://schemas.microsoft.com/office/drawing/2014/main" id="{4BF41A3A-9BA9-D948-8BBC-74A05D841F3C}"/>
               </a:ext>
             </a:extLst>
           </p:cNvPr>
@@ -20936,7 +21670,7 @@
           <p:cNvPr id="3" name="Content Placeholder 2">
             <a:extLst>
               <a:ext uri="{FF2B5EF4-FFF2-40B4-BE49-F238E27FC236}">
-                <a16:creationId xmlns:a16="http://schemas.microsoft.com/office/drawing/2014/main" xmlns="" id="{767751D2-324B-034A-A6DB-931966979B81}"/>
+                <a16:creationId xmlns="" xmlns:a16="http://schemas.microsoft.com/office/drawing/2014/main" id="{767751D2-324B-034A-A6DB-931966979B81}"/>
               </a:ext>
             </a:extLst>
           </p:cNvPr>
@@ -21242,15 +21976,7 @@
             </a:r>
             <a:r>
               <a:rPr lang="en-US" sz="2400" dirty="0" smtClean="0"/>
-              <a:t> or </a:t>
-            </a:r>
-            <a:r>
-              <a:rPr lang="en-US" sz="2400" dirty="0" smtClean="0"/>
-              <a:t>related Primitive FIs </a:t>
-            </a:r>
-            <a:r>
-              <a:rPr lang="en-US" sz="2400" dirty="0" smtClean="0"/>
-              <a:t>to apply </a:t>
+              <a:t> or related Primitive FIs to apply </a:t>
             </a:r>
             <a:r>
               <a:rPr lang="en-US" sz="2400" dirty="0"/>
@@ -22377,7 +23103,7 @@
               <a:t> </a:t>
             </a:r>
             <a:r>
-              <a:rPr lang="en-US" sz="2400" dirty="0" err="1">
+              <a:rPr lang="en-US" sz="2400" dirty="0" smtClean="0">
                 <a:solidFill>
                   <a:srgbClr val="000000"/>
                 </a:solidFill>
@@ -22386,16 +23112,7 @@
               <a:t>i</a:t>
             </a:r>
             <a:r>
-              <a:rPr lang="en-US" sz="2400" dirty="0">
-                <a:solidFill>
-                  <a:srgbClr val="000000"/>
-                </a:solidFill>
-                <a:latin typeface="Courier New" panose="02070309020205020404" pitchFamily="49" charset="0"/>
-              </a:rPr>
-              <a:t> </a:t>
-            </a:r>
-            <a:r>
-              <a:rPr lang="en-US" sz="2400" b="1" dirty="0">
+              <a:rPr lang="en-US" sz="2400" b="1" dirty="0" smtClean="0">
                 <a:solidFill>
                   <a:srgbClr val="000080"/>
                 </a:solidFill>
@@ -22404,7 +23121,7 @@
               <a:t>%</a:t>
             </a:r>
             <a:r>
-              <a:rPr lang="en-US" sz="2400" dirty="0">
+              <a:rPr lang="en-US" sz="2400" dirty="0" smtClean="0">
                 <a:solidFill>
                   <a:srgbClr val="FF8000"/>
                 </a:solidFill>
@@ -22413,7 +23130,7 @@
               <a:t>4</a:t>
             </a:r>
             <a:r>
-              <a:rPr lang="en-US" sz="2400" dirty="0">
+              <a:rPr lang="en-US" sz="2400" dirty="0" smtClean="0">
                 <a:solidFill>
                   <a:srgbClr val="000000"/>
                 </a:solidFill>
@@ -23566,7 +24283,7 @@
           <p:cNvPr id="2" name="Title 1">
             <a:extLst>
               <a:ext uri="{FF2B5EF4-FFF2-40B4-BE49-F238E27FC236}">
-                <a16:creationId xmlns:a16="http://schemas.microsoft.com/office/drawing/2014/main" xmlns="" id="{187600CA-ED49-8A42-8AAC-B8CED9B598F6}"/>
+                <a16:creationId xmlns="" xmlns:a16="http://schemas.microsoft.com/office/drawing/2014/main" id="{187600CA-ED49-8A42-8AAC-B8CED9B598F6}"/>
               </a:ext>
             </a:extLst>
           </p:cNvPr>
@@ -23594,7 +24311,7 @@
           <p:cNvPr id="3" name="Content Placeholder 2">
             <a:extLst>
               <a:ext uri="{FF2B5EF4-FFF2-40B4-BE49-F238E27FC236}">
-                <a16:creationId xmlns:a16="http://schemas.microsoft.com/office/drawing/2014/main" xmlns="" id="{095A9095-A831-4445-8971-55AE4AD7D768}"/>
+                <a16:creationId xmlns="" xmlns:a16="http://schemas.microsoft.com/office/drawing/2014/main" id="{095A9095-A831-4445-8971-55AE4AD7D768}"/>
               </a:ext>
             </a:extLst>
           </p:cNvPr>
@@ -23659,7 +24376,7 @@
           <p:cNvPr id="2" name="Title 1">
             <a:extLst>
               <a:ext uri="{FF2B5EF4-FFF2-40B4-BE49-F238E27FC236}">
-                <a16:creationId xmlns:a16="http://schemas.microsoft.com/office/drawing/2014/main" xmlns="" id="{8F1FC55F-B025-1646-8698-4E547B39859F}"/>
+                <a16:creationId xmlns="" xmlns:a16="http://schemas.microsoft.com/office/drawing/2014/main" id="{8F1FC55F-B025-1646-8698-4E547B39859F}"/>
               </a:ext>
             </a:extLst>
           </p:cNvPr>
@@ -23694,7 +24411,7 @@
           <p:cNvPr id="3" name="Content Placeholder 2">
             <a:extLst>
               <a:ext uri="{FF2B5EF4-FFF2-40B4-BE49-F238E27FC236}">
-                <a16:creationId xmlns:a16="http://schemas.microsoft.com/office/drawing/2014/main" xmlns="" id="{212DEAB1-CB9C-0443-A7F4-896B0EDCEF7F}"/>
+                <a16:creationId xmlns="" xmlns:a16="http://schemas.microsoft.com/office/drawing/2014/main" id="{212DEAB1-CB9C-0443-A7F4-896B0EDCEF7F}"/>
               </a:ext>
             </a:extLst>
           </p:cNvPr>
@@ -23996,19 +24713,7 @@
           <a:p>
             <a:r>
               <a:rPr lang="en-US" sz="2000" dirty="0" smtClean="0"/>
-              <a:t>A reduction is an operation that computes a single value by processing all the values on the stream. Never </a:t>
-            </a:r>
-            <a:r>
-              <a:rPr lang="en-US" sz="2000" dirty="0" smtClean="0"/>
-              <a:t>reduce</a:t>
-            </a:r>
-            <a:r>
-              <a:rPr lang="en-US" sz="2000" dirty="0" smtClean="0"/>
-              <a:t> </a:t>
-            </a:r>
-            <a:r>
-              <a:rPr lang="en-US" sz="2000" dirty="0" smtClean="0"/>
-              <a:t>an infinite stream.</a:t>
+              <a:t>A reduction is an operation that computes a single value by processing all the values on the stream. Never reduce an infinite stream.</a:t>
             </a:r>
             <a:endParaRPr lang="en-US" sz="2000" dirty="0"/>
           </a:p>
@@ -24247,7 +24952,7 @@
           <p:cNvPr id="2" name="Title 1">
             <a:extLst>
               <a:ext uri="{FF2B5EF4-FFF2-40B4-BE49-F238E27FC236}">
-                <a16:creationId xmlns:a16="http://schemas.microsoft.com/office/drawing/2014/main" xmlns="" id="{9D575015-E9F6-854A-84D4-7FAAE040C19B}"/>
+                <a16:creationId xmlns="" xmlns:a16="http://schemas.microsoft.com/office/drawing/2014/main" id="{9D575015-E9F6-854A-84D4-7FAAE040C19B}"/>
               </a:ext>
             </a:extLst>
           </p:cNvPr>
@@ -24280,7 +24985,7 @@
           <p:cNvPr id="3" name="Content Placeholder 2">
             <a:extLst>
               <a:ext uri="{FF2B5EF4-FFF2-40B4-BE49-F238E27FC236}">
-                <a16:creationId xmlns:a16="http://schemas.microsoft.com/office/drawing/2014/main" xmlns="" id="{D2856061-7E40-AE42-8E8F-D10F98FC1DD5}"/>
+                <a16:creationId xmlns="" xmlns:a16="http://schemas.microsoft.com/office/drawing/2014/main" id="{D2856061-7E40-AE42-8E8F-D10F98FC1DD5}"/>
               </a:ext>
             </a:extLst>
           </p:cNvPr>
@@ -34039,7 +34744,7 @@
           <a:p>
             <a:r>
               <a:rPr lang="en-US" sz="2400" dirty="0">
-                <a:hlinkClick r:id="rId2"/>
+                <a:hlinkClick r:id="rId3"/>
               </a:rPr>
               <a:t>https://en.wikipedia.org/wiki/Decorator_pattern</a:t>
             </a:r>

</xml_diff>

<commit_message>
More notes and changes.
</commit_message>
<xml_diff>
--- a/Learning to Love the Lambda in the Stream.pptx
+++ b/Learning to Love the Lambda in the Stream.pptx
@@ -778,15 +778,7 @@
             </a:pPr>
             <a:r>
               <a:rPr lang="en-US" dirty="0" smtClean="0"/>
-              <a:t>The consumer is typically used to “do something” </a:t>
-            </a:r>
-            <a:r>
-              <a:rPr lang="en-US" dirty="0" smtClean="0"/>
-              <a:t>with </a:t>
-            </a:r>
-            <a:r>
-              <a:rPr lang="en-US" dirty="0" smtClean="0"/>
-              <a:t>a value.  The </a:t>
+              <a:t>The consumer is typically used to “do something” with a value.  The </a:t>
             </a:r>
             <a:r>
               <a:rPr lang="en-US" dirty="0" err="1"/>
@@ -1138,7 +1130,15 @@
             </a:r>
             <a:r>
               <a:rPr lang="en-US" baseline="0" dirty="0" smtClean="0"/>
-              <a:t>  Unlike functions, they do not follow the “Bi” convention to distinguish the one and two operator versions.  Instead there are the </a:t>
+              <a:t>  Unlike functions, they do not follow the “Bi” convention to distinguish the one and two operator versions.  Instead there </a:t>
+            </a:r>
+            <a:r>
+              <a:rPr lang="en-US" baseline="0" dirty="0" smtClean="0"/>
+              <a:t>is </a:t>
+            </a:r>
+            <a:r>
+              <a:rPr lang="en-US" baseline="0" dirty="0" smtClean="0"/>
+              <a:t>the </a:t>
             </a:r>
             <a:r>
               <a:rPr lang="en-US" baseline="0" dirty="0" err="1" smtClean="0"/>
@@ -1146,7 +1146,15 @@
             </a:r>
             <a:r>
               <a:rPr lang="en-US" baseline="0" dirty="0" smtClean="0"/>
-              <a:t> that take a single argument, and the </a:t>
+              <a:t> that </a:t>
+            </a:r>
+            <a:r>
+              <a:rPr lang="en-US" baseline="0" dirty="0" smtClean="0"/>
+              <a:t>takes </a:t>
+            </a:r>
+            <a:r>
+              <a:rPr lang="en-US" baseline="0" dirty="0" smtClean="0"/>
+              <a:t>a single argument, and the </a:t>
             </a:r>
             <a:r>
               <a:rPr lang="en-US" baseline="0" dirty="0" err="1" smtClean="0"/>
@@ -1154,7 +1162,15 @@
             </a:r>
             <a:r>
               <a:rPr lang="en-US" baseline="0" dirty="0" smtClean="0"/>
-              <a:t> that take two arguments.</a:t>
+              <a:t> that </a:t>
+            </a:r>
+            <a:r>
+              <a:rPr lang="en-US" baseline="0" dirty="0" smtClean="0"/>
+              <a:t>takes </a:t>
+            </a:r>
+            <a:r>
+              <a:rPr lang="en-US" baseline="0" dirty="0" smtClean="0"/>
+              <a:t>two arguments.</a:t>
             </a:r>
             <a:endParaRPr lang="en-US" dirty="0"/>
           </a:p>
@@ -1362,11 +1378,7 @@
             </a:r>
             <a:r>
               <a:rPr lang="en-US" baseline="0" dirty="0" smtClean="0"/>
-              <a:t> which executes a Consumer when a value exists, and various get methods that obtain the value if it exists or perform another action if the value doesn’t exist.  In the first </a:t>
-            </a:r>
-            <a:r>
-              <a:rPr lang="en-US" baseline="0" dirty="0" smtClean="0"/>
-              <a:t>example below, </a:t>
+              <a:t> which executes a Consumer when a value exists, and various get methods that obtain the value if it exists or perform another action if the value doesn’t exist.  In the first example below, </a:t>
             </a:r>
             <a:r>
               <a:rPr lang="en-US" baseline="0" dirty="0" err="1" smtClean="0"/>
@@ -1482,7 +1494,15 @@
             </a:r>
             <a:r>
               <a:rPr lang="en-US" baseline="0" dirty="0" smtClean="0"/>
-              <a:t> a lambda that only calls a single method.  The specification also guarantees that method references are folded into a single instance.  As a practical matter, any lambda that is a pure function – that is it doesn’t use anything except the arguments that are passed into it – gets folded into a single instance.</a:t>
+              <a:t> a lambda that only calls a single method.  The specification also guarantees that method references are folded into a single instance.  As a practical matter, any lambda that </a:t>
+            </a:r>
+            <a:r>
+              <a:rPr lang="en-US" baseline="0" dirty="0" smtClean="0"/>
+              <a:t>doesn’t use anything except the arguments that are passed into it gets </a:t>
+            </a:r>
+            <a:r>
+              <a:rPr lang="en-US" baseline="0" dirty="0" smtClean="0"/>
+              <a:t>folded into a single instance.</a:t>
             </a:r>
             <a:endParaRPr lang="en-US" dirty="0"/>
           </a:p>
@@ -1574,15 +1594,15 @@
             </a:r>
             <a:r>
               <a:rPr lang="en-US" baseline="0" dirty="0" smtClean="0"/>
-              <a:t> most straightforward method reference to understand is the static method reference</a:t>
+              <a:t> most straightforward method reference to understand is the static method reference. </a:t>
             </a:r>
             <a:r>
               <a:rPr lang="en-US" baseline="0" dirty="0" smtClean="0"/>
-              <a:t>.  The   </a:t>
+              <a:t> The </a:t>
             </a:r>
             <a:r>
               <a:rPr lang="en-US" baseline="0" dirty="0" smtClean="0"/>
-              <a:t>The static method is bound to the functional interface, with the arguments in the static method bound in the same order they occur in the functional interface.</a:t>
+              <a:t>static method is bound to the functional interface, with the arguments in the static method bound in the same order they occur in the functional interface.</a:t>
             </a:r>
             <a:endParaRPr lang="en-US" dirty="0"/>
           </a:p>
@@ -1801,16 +1821,24 @@
               <a:t>OCP exam, </a:t>
             </a:r>
             <a:r>
-              <a:rPr lang="en-US" dirty="0"/>
-              <a:t>a constructor method reference with</a:t>
+              <a:rPr lang="en-US" dirty="0" smtClean="0"/>
+              <a:t>anything</a:t>
+            </a:r>
+            <a:r>
+              <a:rPr lang="en-US" baseline="0" dirty="0" smtClean="0"/>
+              <a:t> that asks which </a:t>
             </a:r>
             <a:r>
               <a:rPr lang="en-US" baseline="0" dirty="0"/>
-              <a:t> choices for which FI to </a:t>
+              <a:t>FI to </a:t>
             </a:r>
             <a:r>
               <a:rPr lang="en-US" baseline="0" dirty="0" smtClean="0"/>
-              <a:t>use, the right answer </a:t>
+              <a:t>use for a lambda involving a constructor, </a:t>
+            </a:r>
+            <a:r>
+              <a:rPr lang="en-US" baseline="0" dirty="0" smtClean="0"/>
+              <a:t>the right answer </a:t>
             </a:r>
             <a:r>
               <a:rPr lang="en-US" baseline="0" dirty="0"/>
@@ -1910,23 +1938,19 @@
             </a:r>
             <a:r>
               <a:rPr lang="en-US" dirty="0" smtClean="0"/>
-              <a:t>.  Members of the class where a lambda </a:t>
-            </a:r>
-            <a:r>
-              <a:rPr lang="en-US" dirty="0" smtClean="0"/>
-              <a:t>is </a:t>
-            </a:r>
-            <a:r>
-              <a:rPr lang="en-US" dirty="0" smtClean="0"/>
-              <a:t>declared,</a:t>
+              <a:t>.  Members of the class where a lambda is declared,</a:t>
             </a:r>
             <a:r>
               <a:rPr lang="en-US" baseline="0" dirty="0" smtClean="0"/>
-              <a:t> arguments and local variables that are effectively final may be referenced by a lambda</a:t>
+              <a:t> </a:t>
             </a:r>
             <a:r>
               <a:rPr lang="en-US" baseline="0" dirty="0" smtClean="0"/>
-              <a:t>.  In Java, a lambda must be assigned to a functional interface.</a:t>
+              <a:t>and arguments </a:t>
+            </a:r>
+            <a:r>
+              <a:rPr lang="en-US" baseline="0" dirty="0" smtClean="0"/>
+              <a:t>and local variables that are effectively final may be referenced by a lambda.  In Java, a lambda must be assigned to a functional interface.</a:t>
             </a:r>
             <a:r>
               <a:rPr lang="en-US" dirty="0" smtClean="0"/>
@@ -2154,7 +2178,7 @@
             </a:r>
             <a:r>
               <a:rPr lang="en-US" baseline="0" dirty="0" smtClean="0"/>
-              <a:t>.  </a:t>
+              <a:t>.  If you google this, there is debate if Java Streams are really monads.  For getting work done, it doesn’t matter.  If you are familiar with monads you will feel right at home with streams.  </a:t>
             </a:r>
             <a:r>
               <a:rPr lang="en-US" baseline="0" dirty="0" smtClean="0"/>
@@ -2282,11 +2306,11 @@
             </a:r>
             <a:r>
               <a:rPr lang="en-US" baseline="0" dirty="0" smtClean="0"/>
-              <a:t>.  </a:t>
-            </a:r>
-            <a:r>
-              <a:rPr lang="en-US" i="1" baseline="0" dirty="0" smtClean="0"/>
-              <a:t>Go over the slide starting at “A stream consists of”</a:t>
+              <a:t>. </a:t>
+            </a:r>
+            <a:r>
+              <a:rPr lang="en-US" baseline="0" dirty="0" smtClean="0"/>
+              <a:t> A stream consists of a data source which provides the values for processing.  Zero or more intermediate operations that transform or discard values.  The intermediate operations are lazy and only executed when a terminal operation is added.  A terminal operation returns a result or processes the stream elements.  It is eager.  Applying a terminal operation to a stream starts the processing and closes the stream.  Any further operations result in an exception.</a:t>
             </a:r>
             <a:endParaRPr lang="en-US" i="1" dirty="0"/>
           </a:p>
@@ -2479,15 +2503,19 @@
             </a:pPr>
             <a:r>
               <a:rPr lang="en-US" i="1" dirty="0" smtClean="0"/>
-              <a:t>Go over the slide as-is.  </a:t>
-            </a:r>
-            <a:r>
-              <a:rPr lang="en-US" i="0" dirty="0" smtClean="0"/>
-              <a:t>Consumers</a:t>
+              <a:t>Go over the slide as-is. </a:t>
+            </a:r>
+            <a:r>
+              <a:rPr lang="en-US" i="1" baseline="0" dirty="0" smtClean="0"/>
+              <a:t> </a:t>
             </a:r>
             <a:r>
               <a:rPr lang="en-US" i="0" baseline="0" dirty="0" smtClean="0"/>
-              <a:t> and Suppliers are exceptions to the pure function rule.  Consumers typically “do something” with a value such as print it to an external source. Only a Consumer that does nothing is a pure function.  Since that’s not useful, Consumers are generally never pure functions.  Suppliers that create a new instance with each call are not pure functions because they return a different value for the same void argument.   Suppliers that return a constant value are pure functions.</a:t>
+              <a:t>Consumers </a:t>
+            </a:r>
+            <a:r>
+              <a:rPr lang="en-US" i="0" baseline="0" dirty="0" smtClean="0"/>
+              <a:t>typically “do something” with a value such as print it to an external source. Only a Consumer that does nothing is a pure function.  Since that’s not useful, Consumers are generally never pure functions.  Suppliers that create a new instance with each call are not pure functions because they return a different value for the same void argument.   Suppliers that return a constant value are pure functions.</a:t>
             </a:r>
             <a:endParaRPr lang="en-US" dirty="0"/>
           </a:p>
@@ -2607,7 +2635,11 @@
             </a:r>
             <a:r>
               <a:rPr lang="en-US" baseline="0" dirty="0" smtClean="0"/>
-              <a:t> the first time it is called.</a:t>
+              <a:t> the first time it is called</a:t>
+            </a:r>
+            <a:r>
+              <a:rPr lang="en-US" baseline="0" dirty="0" smtClean="0"/>
+              <a:t>.  It is also what is returned if the stream is empty.</a:t>
             </a:r>
             <a:endParaRPr lang="en-US" dirty="0"/>
           </a:p>
@@ -2795,11 +2827,7 @@
             </a:r>
             <a:r>
               <a:rPr lang="en-US" baseline="0" dirty="0" smtClean="0"/>
-              <a:t>.  Pure functions should be used if </a:t>
-            </a:r>
-            <a:r>
-              <a:rPr lang="en-US" baseline="0" dirty="0" smtClean="0"/>
-              <a:t>possible.  The </a:t>
+              <a:t>.  Pure functions should be used if possible.  The </a:t>
             </a:r>
             <a:r>
               <a:rPr lang="en-US" baseline="0" dirty="0" err="1" smtClean="0"/>
@@ -2807,11 +2835,7 @@
             </a:r>
             <a:r>
               <a:rPr lang="en-US" baseline="0" dirty="0" smtClean="0"/>
-              <a:t> lambda is a pure function because it returns its integer argument as a character.  </a:t>
-            </a:r>
-            <a:r>
-              <a:rPr lang="en-US" baseline="0" dirty="0" smtClean="0"/>
-              <a:t>In these examples it </a:t>
+              <a:t> lambda is a pure function because it returns its integer argument as a character.  In these examples it </a:t>
             </a:r>
             <a:r>
               <a:rPr lang="en-US" baseline="0" dirty="0"/>
@@ -2918,8 +2942,20 @@
           <a:lstStyle/>
           <a:p>
             <a:r>
+              <a:rPr lang="en-US" i="1" dirty="0" smtClean="0"/>
+              <a:t>Go over first</a:t>
+            </a:r>
+            <a:r>
+              <a:rPr lang="en-US" i="1" baseline="0" dirty="0" smtClean="0"/>
+              <a:t> sentence.  </a:t>
+            </a:r>
+            <a:r>
               <a:rPr lang="en-US" dirty="0" smtClean="0"/>
-              <a:t>This filter allows</a:t>
+              <a:t>This </a:t>
+            </a:r>
+            <a:r>
+              <a:rPr lang="en-US" dirty="0" smtClean="0"/>
+              <a:t>filter allows</a:t>
             </a:r>
             <a:r>
               <a:rPr lang="en-US" baseline="0" dirty="0" smtClean="0"/>
@@ -3027,27 +3063,31 @@
           <a:p>
             <a:r>
               <a:rPr lang="en-US" i="1" dirty="0" smtClean="0"/>
-              <a:t>Go over slide.  </a:t>
-            </a:r>
-            <a:r>
-              <a:rPr lang="en-US" dirty="0" smtClean="0"/>
-              <a:t>Recall </a:t>
-            </a:r>
-            <a:r>
-              <a:rPr lang="en-US" dirty="0" smtClean="0"/>
-              <a:t>that </a:t>
-            </a:r>
-            <a:r>
-              <a:rPr lang="en-US" dirty="0" err="1" smtClean="0"/>
+              <a:t>Go over slide. </a:t>
+            </a:r>
+            <a:r>
+              <a:rPr lang="en-US" baseline="0" dirty="0" smtClean="0"/>
+              <a:t>Iterate </a:t>
+            </a:r>
+            <a:r>
+              <a:rPr lang="en-US" baseline="0" dirty="0" smtClean="0"/>
+              <a:t>repeatedly applies </a:t>
+            </a:r>
+            <a:r>
+              <a:rPr lang="en-US" baseline="0" dirty="0" smtClean="0"/>
+              <a:t>an </a:t>
+            </a:r>
+            <a:r>
+              <a:rPr lang="en-US" baseline="0" dirty="0" err="1" smtClean="0"/>
               <a:t>IntUnaryOperator</a:t>
             </a:r>
             <a:r>
-              <a:rPr lang="en-US" dirty="0" smtClean="0"/>
-              <a:t> is a</a:t>
-            </a:r>
-            <a:r>
               <a:rPr lang="en-US" baseline="0" dirty="0" smtClean="0"/>
-              <a:t> functional interface that takes an int primitive argument and returns an int result.  Iterate repeatedly applies a unary operator on the seed value to start with and then the previous value to generate the next value.  </a:t>
+              <a:t> </a:t>
+            </a:r>
+            <a:r>
+              <a:rPr lang="en-US" baseline="0" dirty="0" smtClean="0"/>
+              <a:t>on the seed value to start with and then the previous value to generate the next value.  </a:t>
             </a:r>
             <a:r>
               <a:rPr lang="en-US" dirty="0" smtClean="0"/>
@@ -3207,15 +3247,7 @@
             </a:r>
             <a:r>
               <a:rPr lang="en-US" baseline="0" dirty="0" smtClean="0"/>
-              <a:t> declaration doesn’t work because there is </a:t>
-            </a:r>
-            <a:r>
-              <a:rPr lang="en-US" baseline="0" dirty="0" smtClean="0"/>
-              <a:t>no functional interface.  </a:t>
-            </a:r>
-            <a:r>
-              <a:rPr lang="en-US" baseline="0" dirty="0" smtClean="0"/>
-              <a:t>The second </a:t>
+              <a:t> declaration doesn’t work because there is no functional interface.  The second </a:t>
             </a:r>
             <a:r>
               <a:rPr lang="en-US" baseline="0" dirty="0" err="1" smtClean="0"/>
@@ -3347,15 +3379,7 @@
             </a:r>
             <a:r>
               <a:rPr lang="en-US" baseline="0" dirty="0" smtClean="0"/>
-              <a:t> processes all the values but isn’t considered a reduction because </a:t>
-            </a:r>
-            <a:r>
-              <a:rPr lang="en-US" baseline="0" dirty="0" smtClean="0"/>
-              <a:t>it </a:t>
-            </a:r>
-            <a:r>
-              <a:rPr lang="en-US" baseline="0" dirty="0" smtClean="0"/>
-              <a:t>does not return a value.</a:t>
+              <a:t> processes all the values but isn’t considered a reduction because it does not return a value.</a:t>
             </a:r>
             <a:r>
               <a:rPr lang="en-US" baseline="0" dirty="0"/>
@@ -3465,58 +3489,14 @@
           <a:lstStyle/>
           <a:p>
             <a:r>
-              <a:rPr lang="en-US" dirty="0" smtClean="0"/>
-              <a:t>The Collection collectors provide pre-packaged collectors to create a list or a set.  It also provides a </a:t>
-            </a:r>
-            <a:r>
-              <a:rPr lang="en-US" dirty="0" err="1" smtClean="0"/>
-              <a:t>toCollection</a:t>
-            </a:r>
-            <a:r>
-              <a:rPr lang="en-US" dirty="0" smtClean="0"/>
-              <a:t> collection which allows the use of a Supplier to create</a:t>
-            </a:r>
-            <a:r>
-              <a:rPr lang="en-US" baseline="0" dirty="0" smtClean="0"/>
-              <a:t> the collection to use.  In this example, t</a:t>
-            </a:r>
-            <a:r>
-              <a:rPr lang="en-US" dirty="0" smtClean="0"/>
-              <a:t>he</a:t>
-            </a:r>
-            <a:r>
-              <a:rPr lang="en-US" baseline="0" dirty="0" smtClean="0"/>
-              <a:t> </a:t>
-            </a:r>
-            <a:r>
-              <a:rPr lang="en-US" baseline="0" dirty="0" err="1"/>
-              <a:t>Collections.toCollection</a:t>
-            </a:r>
-            <a:r>
-              <a:rPr lang="en-US" baseline="0" dirty="0"/>
-              <a:t> </a:t>
-            </a:r>
-            <a:r>
-              <a:rPr lang="en-US" baseline="0" dirty="0" smtClean="0"/>
-              <a:t>constructor </a:t>
-            </a:r>
-            <a:r>
-              <a:rPr lang="en-US" baseline="0" dirty="0" smtClean="0"/>
-              <a:t>reference </a:t>
-            </a:r>
-            <a:r>
-              <a:rPr lang="en-US" baseline="0" dirty="0"/>
-              <a:t>to </a:t>
-            </a:r>
-            <a:r>
-              <a:rPr lang="en-US" baseline="0" dirty="0" err="1" smtClean="0"/>
-              <a:t>LinkedHashSet’s</a:t>
-            </a:r>
-            <a:r>
-              <a:rPr lang="en-US" baseline="0" dirty="0" smtClean="0"/>
-              <a:t> is used to create a Set that only allows one copy of each element, and also retains the sort ordering imposed by the sorted intermediate operation.</a:t>
-            </a:r>
-            <a:endParaRPr lang="en-US" baseline="0" dirty="0"/>
+              <a:rPr lang="en-US" i="1" dirty="0" smtClean="0"/>
+              <a:t>Go</a:t>
+            </a:r>
+            <a:r>
+              <a:rPr lang="en-US" i="1" baseline="0" dirty="0" smtClean="0"/>
+              <a:t> over slide as-is.</a:t>
+            </a:r>
+            <a:endParaRPr lang="en-US" i="1" dirty="0"/>
           </a:p>
         </p:txBody>
       </p:sp>
@@ -3537,7 +3517,7 @@
           <a:p>
             <a:fld id="{9B9A5078-34A5-4200-8953-1FDEE337BA82}" type="slidenum">
               <a:rPr lang="en-US" smtClean="0"/>
-              <a:t>37</a:t>
+              <a:t>35</a:t>
             </a:fld>
             <a:endParaRPr lang="en-US"/>
           </a:p>
@@ -3546,7 +3526,7 @@
     </p:spTree>
     <p:extLst>
       <p:ext uri="{BB962C8B-B14F-4D97-AF65-F5344CB8AC3E}">
-        <p14:creationId xmlns:p14="http://schemas.microsoft.com/office/powerpoint/2010/main" val="3625490707"/>
+        <p14:creationId xmlns:p14="http://schemas.microsoft.com/office/powerpoint/2010/main" val="2912480768"/>
       </p:ext>
     </p:extLst>
   </p:cSld>
@@ -3601,30 +3581,58 @@
           <a:lstStyle/>
           <a:p>
             <a:r>
-              <a:rPr lang="en-US" i="1" dirty="0" smtClean="0"/>
-              <a:t>Go over first two points of slide.  </a:t>
-            </a:r>
-            <a:r>
               <a:rPr lang="en-US" dirty="0" smtClean="0"/>
-              <a:t>Downstream </a:t>
-            </a:r>
-            <a:r>
-              <a:rPr lang="en-US" dirty="0"/>
-              <a:t>collectors are collectors that</a:t>
+              <a:t>The Collection collectors provide pre-packaged collectors to create a list or a set.  It also provides a </a:t>
+            </a:r>
+            <a:r>
+              <a:rPr lang="en-US" dirty="0" err="1" smtClean="0"/>
+              <a:t>toCollection</a:t>
+            </a:r>
+            <a:r>
+              <a:rPr lang="en-US" dirty="0" smtClean="0"/>
+              <a:t> collection which allows the use of a Supplier to create</a:t>
+            </a:r>
+            <a:r>
+              <a:rPr lang="en-US" baseline="0" dirty="0" smtClean="0"/>
+              <a:t> the collection to use.  In this example, t</a:t>
+            </a:r>
+            <a:r>
+              <a:rPr lang="en-US" dirty="0" smtClean="0"/>
+              <a:t>he</a:t>
+            </a:r>
+            <a:r>
+              <a:rPr lang="en-US" baseline="0" dirty="0" smtClean="0"/>
+              <a:t> </a:t>
+            </a:r>
+            <a:r>
+              <a:rPr lang="en-US" baseline="0" dirty="0" err="1" smtClean="0"/>
+              <a:t>Collections.toCollection</a:t>
+            </a:r>
+            <a:r>
+              <a:rPr lang="en-US" baseline="0" dirty="0" smtClean="0"/>
+              <a:t> uses a </a:t>
+            </a:r>
+            <a:r>
+              <a:rPr lang="en-US" baseline="0" dirty="0" smtClean="0"/>
+              <a:t>constructor reference </a:t>
             </a:r>
             <a:r>
               <a:rPr lang="en-US" baseline="0" dirty="0"/>
-              <a:t> are called from other collectors to process or reduce the values.  In this case, we produce a map with the keys and sum of the values, instead of a map with </a:t>
+              <a:t>to </a:t>
+            </a:r>
+            <a:r>
+              <a:rPr lang="en-US" baseline="0" dirty="0" err="1" smtClean="0"/>
+              <a:t>LinkedHashSet</a:t>
             </a:r>
             <a:r>
               <a:rPr lang="en-US" baseline="0" dirty="0" smtClean="0"/>
-              <a:t>the values </a:t>
-            </a:r>
-            <a:r>
-              <a:rPr lang="en-US" baseline="0" dirty="0"/>
-              <a:t>as a collection.</a:t>
-            </a:r>
-            <a:endParaRPr lang="en-US" dirty="0"/>
+              <a:t>  </a:t>
+            </a:r>
+            <a:r>
+              <a:rPr lang="en-US" baseline="0" dirty="0" smtClean="0"/>
+              <a:t>to create a Set that only allows one copy of each element, and also retains the sort ordering imposed by the sorted intermediate operation.</a:t>
+            </a:r>
+            <a:endParaRPr lang="en-US" baseline="0" dirty="0"/>
           </a:p>
         </p:txBody>
       </p:sp>
@@ -3645,7 +3653,7 @@
           <a:p>
             <a:fld id="{9B9A5078-34A5-4200-8953-1FDEE337BA82}" type="slidenum">
               <a:rPr lang="en-US" smtClean="0"/>
-              <a:t>38</a:t>
+              <a:t>37</a:t>
             </a:fld>
             <a:endParaRPr lang="en-US"/>
           </a:p>
@@ -3654,7 +3662,7 @@
     </p:spTree>
     <p:extLst>
       <p:ext uri="{BB962C8B-B14F-4D97-AF65-F5344CB8AC3E}">
-        <p14:creationId xmlns:p14="http://schemas.microsoft.com/office/powerpoint/2010/main" val="756589879"/>
+        <p14:creationId xmlns:p14="http://schemas.microsoft.com/office/powerpoint/2010/main" val="3625490707"/>
       </p:ext>
     </p:extLst>
   </p:cSld>
@@ -3709,28 +3717,36 @@
           <a:lstStyle/>
           <a:p>
             <a:r>
+              <a:rPr lang="en-US" i="1" dirty="0" smtClean="0"/>
+              <a:t>Go over </a:t>
+            </a:r>
+            <a:r>
+              <a:rPr lang="en-US" i="1" dirty="0" smtClean="0"/>
+              <a:t>slide</a:t>
+            </a:r>
+            <a:r>
+              <a:rPr lang="en-US" i="1" dirty="0" smtClean="0"/>
+              <a:t>.  </a:t>
+            </a:r>
+            <a:r>
+              <a:rPr lang="en-US" dirty="0" smtClean="0"/>
+              <a:t>Downstream </a:t>
+            </a:r>
+            <a:r>
               <a:rPr lang="en-US" dirty="0"/>
-              <a:t>This example groups the</a:t>
+              <a:t>collectors are collectors that</a:t>
             </a:r>
             <a:r>
               <a:rPr lang="en-US" baseline="0" dirty="0"/>
-              <a:t> words by their starting letter, listing each word with its letter.  In another twist, we use a </a:t>
-            </a:r>
-            <a:r>
-              <a:rPr lang="en-US" baseline="0" dirty="0" err="1"/>
-              <a:t>TreeMap</a:t>
+              <a:t> are called from other collectors to process or reduce the values.  In this case, we produce a map with the keys and sum of the values, instead of a map with </a:t>
+            </a:r>
+            <a:r>
+              <a:rPr lang="en-US" baseline="0" dirty="0" smtClean="0"/>
+              <a:t>the values </a:t>
             </a:r>
             <a:r>
               <a:rPr lang="en-US" baseline="0" dirty="0"/>
-              <a:t> and </a:t>
-            </a:r>
-            <a:r>
-              <a:rPr lang="en-US" baseline="0" dirty="0" err="1"/>
-              <a:t>TreeSet</a:t>
-            </a:r>
-            <a:r>
-              <a:rPr lang="en-US" baseline="0" dirty="0"/>
-              <a:t> to demonstrate the flexibility offered by specifying the collection implementation: with very little effort on our part, we have produced an ordered map with a set of ordered values for each letter.</a:t>
+              <a:t>as a collection.</a:t>
             </a:r>
             <a:endParaRPr lang="en-US" dirty="0"/>
           </a:p>
@@ -3753,7 +3769,7 @@
           <a:p>
             <a:fld id="{9B9A5078-34A5-4200-8953-1FDEE337BA82}" type="slidenum">
               <a:rPr lang="en-US" smtClean="0"/>
-              <a:t>39</a:t>
+              <a:t>38</a:t>
             </a:fld>
             <a:endParaRPr lang="en-US"/>
           </a:p>
@@ -3762,7 +3778,7 @@
     </p:spTree>
     <p:extLst>
       <p:ext uri="{BB962C8B-B14F-4D97-AF65-F5344CB8AC3E}">
-        <p14:creationId xmlns:p14="http://schemas.microsoft.com/office/powerpoint/2010/main" val="3867908227"/>
+        <p14:creationId xmlns:p14="http://schemas.microsoft.com/office/powerpoint/2010/main" val="756589879"/>
       </p:ext>
     </p:extLst>
   </p:cSld>
@@ -3818,11 +3834,11 @@
           <a:p>
             <a:r>
               <a:rPr lang="en-US" dirty="0"/>
-              <a:t>This</a:t>
+              <a:t>This example groups the</a:t>
             </a:r>
             <a:r>
               <a:rPr lang="en-US" baseline="0" dirty="0"/>
-              <a:t> is a rewrite of the Grouping By to work with concurrent processing.  Note that we had to switch out the </a:t>
+              <a:t> words by their starting letter, listing each word with its letter.  In another twist, we use a </a:t>
             </a:r>
             <a:r>
               <a:rPr lang="en-US" baseline="0" dirty="0" err="1"/>
@@ -3838,29 +3854,23 @@
             </a:r>
             <a:r>
               <a:rPr lang="en-US" baseline="0" dirty="0"/>
-              <a:t> with the “</a:t>
-            </a:r>
-            <a:r>
-              <a:rPr lang="en-US" baseline="0" dirty="0" err="1"/>
-              <a:t>ConcurrentSkipList</a:t>
+              <a:t> to demonstrate the flexibility offered by specifying the collection implementation: with very little effort on our part, we have produced an </a:t>
+            </a:r>
+            <a:r>
+              <a:rPr lang="en-US" baseline="0" dirty="0" smtClean="0"/>
+              <a:t>sorted </a:t>
             </a:r>
             <a:r>
               <a:rPr lang="en-US" baseline="0" dirty="0"/>
-              <a:t>” versions to support the concurrent processing.  We also have a version using a downstream collector to count the number of </a:t>
+              <a:t>map with a set of </a:t>
             </a:r>
             <a:r>
               <a:rPr lang="en-US" baseline="0" dirty="0" smtClean="0"/>
-              <a:t>occurrences </a:t>
+              <a:t>sorted </a:t>
             </a:r>
             <a:r>
               <a:rPr lang="en-US" baseline="0" dirty="0"/>
-              <a:t>of each word.</a:t>
-            </a:r>
-          </a:p>
-          <a:p>
-            <a:r>
-              <a:rPr lang="en-US" baseline="0" dirty="0"/>
-              <a:t>This is not necessarily faster than the sequential stream.  The concurrent skip list set and map introduce their own overhead.</a:t>
+              <a:t>values for each letter.</a:t>
             </a:r>
             <a:endParaRPr lang="en-US" dirty="0"/>
           </a:p>
@@ -3883,7 +3893,7 @@
           <a:p>
             <a:fld id="{9B9A5078-34A5-4200-8953-1FDEE337BA82}" type="slidenum">
               <a:rPr lang="en-US" smtClean="0"/>
-              <a:t>40</a:t>
+              <a:t>39</a:t>
             </a:fld>
             <a:endParaRPr lang="en-US"/>
           </a:p>
@@ -3892,7 +3902,7 @@
     </p:spTree>
     <p:extLst>
       <p:ext uri="{BB962C8B-B14F-4D97-AF65-F5344CB8AC3E}">
-        <p14:creationId xmlns:p14="http://schemas.microsoft.com/office/powerpoint/2010/main" val="1393649253"/>
+        <p14:creationId xmlns:p14="http://schemas.microsoft.com/office/powerpoint/2010/main" val="3867908227"/>
       </p:ext>
     </p:extLst>
   </p:cSld>
@@ -3948,23 +3958,49 @@
           <a:p>
             <a:r>
               <a:rPr lang="en-US" dirty="0"/>
-              <a:t>The</a:t>
+              <a:t>This</a:t>
             </a:r>
             <a:r>
               <a:rPr lang="en-US" baseline="0" dirty="0"/>
-              <a:t> argument to </a:t>
+              <a:t> is a rewrite of the Grouping By to work with concurrent processing.  Note that we had to switch out the </a:t>
             </a:r>
             <a:r>
               <a:rPr lang="en-US" baseline="0" dirty="0" err="1"/>
-              <a:t>Collectors.joining</a:t>
+              <a:t>TreeMap</a:t>
             </a:r>
             <a:r>
               <a:rPr lang="en-US" baseline="0" dirty="0"/>
-              <a:t> is the character to separate each part of the string.  In this case it is a space</a:t>
+              <a:t> and </a:t>
+            </a:r>
+            <a:r>
+              <a:rPr lang="en-US" baseline="0" dirty="0" err="1"/>
+              <a:t>TreeSet</a:t>
+            </a:r>
+            <a:r>
+              <a:rPr lang="en-US" baseline="0" dirty="0"/>
+              <a:t> with the “</a:t>
+            </a:r>
+            <a:r>
+              <a:rPr lang="en-US" baseline="0" dirty="0" err="1"/>
+              <a:t>ConcurrentSkipList</a:t>
+            </a:r>
+            <a:r>
+              <a:rPr lang="en-US" baseline="0" dirty="0"/>
+              <a:t>” versions to support the concurrent processing.  We also have a version using a downstream collector to count the number of </a:t>
             </a:r>
             <a:r>
               <a:rPr lang="en-US" baseline="0" dirty="0" smtClean="0"/>
-              <a:t>.  Other characters, such as a comma, semicolon, and colon could be used.</a:t>
+              <a:t>occurrences </a:t>
+            </a:r>
+            <a:r>
+              <a:rPr lang="en-US" baseline="0" dirty="0"/>
+              <a:t>of each word.</a:t>
+            </a:r>
+          </a:p>
+          <a:p>
+            <a:r>
+              <a:rPr lang="en-US" baseline="0" dirty="0"/>
+              <a:t>This is not necessarily faster than the sequential stream.  The concurrent skip list set and map introduce their own overhead.</a:t>
             </a:r>
             <a:endParaRPr lang="en-US" dirty="0"/>
           </a:p>
@@ -3987,7 +4023,7 @@
           <a:p>
             <a:fld id="{9B9A5078-34A5-4200-8953-1FDEE337BA82}" type="slidenum">
               <a:rPr lang="en-US" smtClean="0"/>
-              <a:t>41</a:t>
+              <a:t>40</a:t>
             </a:fld>
             <a:endParaRPr lang="en-US"/>
           </a:p>
@@ -3996,7 +4032,7 @@
     </p:spTree>
     <p:extLst>
       <p:ext uri="{BB962C8B-B14F-4D97-AF65-F5344CB8AC3E}">
-        <p14:creationId xmlns:p14="http://schemas.microsoft.com/office/powerpoint/2010/main" val="963626535"/>
+        <p14:creationId xmlns:p14="http://schemas.microsoft.com/office/powerpoint/2010/main" val="1393649253"/>
       </p:ext>
     </p:extLst>
   </p:cSld>
@@ -4050,6 +4086,26 @@
           <a:bodyPr/>
           <a:lstStyle/>
           <a:p>
+            <a:r>
+              <a:rPr lang="en-US" dirty="0"/>
+              <a:t>The</a:t>
+            </a:r>
+            <a:r>
+              <a:rPr lang="en-US" baseline="0" dirty="0"/>
+              <a:t> argument to </a:t>
+            </a:r>
+            <a:r>
+              <a:rPr lang="en-US" baseline="0" dirty="0" err="1"/>
+              <a:t>Collectors.joining</a:t>
+            </a:r>
+            <a:r>
+              <a:rPr lang="en-US" baseline="0" dirty="0"/>
+              <a:t> is the character to separate each part of the string.  In this case it is a space</a:t>
+            </a:r>
+            <a:r>
+              <a:rPr lang="en-US" baseline="0" dirty="0" smtClean="0"/>
+              <a:t>.  Other characters, such as a comma, semicolon, and colon could be used.</a:t>
+            </a:r>
             <a:endParaRPr lang="en-US" dirty="0"/>
           </a:p>
         </p:txBody>
@@ -4071,7 +4127,7 @@
           <a:p>
             <a:fld id="{9B9A5078-34A5-4200-8953-1FDEE337BA82}" type="slidenum">
               <a:rPr lang="en-US" smtClean="0"/>
-              <a:t>42</a:t>
+              <a:t>41</a:t>
             </a:fld>
             <a:endParaRPr lang="en-US"/>
           </a:p>
@@ -4080,7 +4136,7 @@
     </p:spTree>
     <p:extLst>
       <p:ext uri="{BB962C8B-B14F-4D97-AF65-F5344CB8AC3E}">
-        <p14:creationId xmlns:p14="http://schemas.microsoft.com/office/powerpoint/2010/main" val="1349366280"/>
+        <p14:creationId xmlns:p14="http://schemas.microsoft.com/office/powerpoint/2010/main" val="963626535"/>
       </p:ext>
     </p:extLst>
   </p:cSld>
@@ -4134,23 +4190,7 @@
           <a:bodyPr/>
           <a:lstStyle/>
           <a:p>
-            <a:r>
-              <a:rPr lang="en-US" dirty="0"/>
-              <a:t>The Functional Interface that the</a:t>
-            </a:r>
-            <a:r>
-              <a:rPr lang="en-US" baseline="0" dirty="0"/>
-              <a:t> Java Books fail to mention</a:t>
-            </a:r>
-            <a:r>
-              <a:rPr lang="en-US" baseline="0" dirty="0" smtClean="0"/>
-              <a:t>.</a:t>
-            </a:r>
-            <a:r>
-              <a:rPr lang="en-US" i="1" baseline="0" dirty="0" smtClean="0"/>
-              <a:t>  Go over slide</a:t>
-            </a:r>
-            <a:endParaRPr lang="en-US" i="1" dirty="0"/>
+            <a:endParaRPr lang="en-US" dirty="0"/>
           </a:p>
         </p:txBody>
       </p:sp>
@@ -4171,7 +4211,7 @@
           <a:p>
             <a:fld id="{9B9A5078-34A5-4200-8953-1FDEE337BA82}" type="slidenum">
               <a:rPr lang="en-US" smtClean="0"/>
-              <a:t>43</a:t>
+              <a:t>42</a:t>
             </a:fld>
             <a:endParaRPr lang="en-US"/>
           </a:p>
@@ -4180,7 +4220,7 @@
     </p:spTree>
     <p:extLst>
       <p:ext uri="{BB962C8B-B14F-4D97-AF65-F5344CB8AC3E}">
-        <p14:creationId xmlns:p14="http://schemas.microsoft.com/office/powerpoint/2010/main" val="970417925"/>
+        <p14:creationId xmlns:p14="http://schemas.microsoft.com/office/powerpoint/2010/main" val="1349366280"/>
       </p:ext>
     </p:extLst>
   </p:cSld>
@@ -4235,8 +4275,20 @@
           <a:lstStyle/>
           <a:p>
             <a:r>
-              <a:rPr lang="en-US" i="1" dirty="0" smtClean="0"/>
-              <a:t>Go over slide</a:t>
+              <a:rPr lang="en-US" dirty="0"/>
+              <a:t>The Functional Interface that the</a:t>
+            </a:r>
+            <a:r>
+              <a:rPr lang="en-US" baseline="0" dirty="0"/>
+              <a:t> Java Books fail to mention</a:t>
+            </a:r>
+            <a:r>
+              <a:rPr lang="en-US" baseline="0" dirty="0" smtClean="0"/>
+              <a:t>.</a:t>
+            </a:r>
+            <a:r>
+              <a:rPr lang="en-US" i="1" baseline="0" dirty="0" smtClean="0"/>
+              <a:t>  Go over slide</a:t>
             </a:r>
             <a:endParaRPr lang="en-US" i="1" dirty="0"/>
           </a:p>
@@ -4259,7 +4311,7 @@
           <a:p>
             <a:fld id="{9B9A5078-34A5-4200-8953-1FDEE337BA82}" type="slidenum">
               <a:rPr lang="en-US" smtClean="0"/>
-              <a:t>44</a:t>
+              <a:t>43</a:t>
             </a:fld>
             <a:endParaRPr lang="en-US"/>
           </a:p>
@@ -4268,7 +4320,7 @@
     </p:spTree>
     <p:extLst>
       <p:ext uri="{BB962C8B-B14F-4D97-AF65-F5344CB8AC3E}">
-        <p14:creationId xmlns:p14="http://schemas.microsoft.com/office/powerpoint/2010/main" val="3656213457"/>
+        <p14:creationId xmlns:p14="http://schemas.microsoft.com/office/powerpoint/2010/main" val="970417925"/>
       </p:ext>
     </p:extLst>
   </p:cSld>
@@ -4347,7 +4399,7 @@
           <a:p>
             <a:fld id="{9B9A5078-34A5-4200-8953-1FDEE337BA82}" type="slidenum">
               <a:rPr lang="en-US" smtClean="0"/>
-              <a:t>45</a:t>
+              <a:t>44</a:t>
             </a:fld>
             <a:endParaRPr lang="en-US"/>
           </a:p>
@@ -4356,7 +4408,7 @@
     </p:spTree>
     <p:extLst>
       <p:ext uri="{BB962C8B-B14F-4D97-AF65-F5344CB8AC3E}">
-        <p14:creationId xmlns:p14="http://schemas.microsoft.com/office/powerpoint/2010/main" val="4142547669"/>
+        <p14:creationId xmlns:p14="http://schemas.microsoft.com/office/powerpoint/2010/main" val="3656213457"/>
       </p:ext>
     </p:extLst>
   </p:cSld>
@@ -4448,11 +4500,7 @@
             </a:r>
             <a:r>
               <a:rPr lang="en-US" baseline="0" dirty="0" smtClean="0"/>
-              <a:t>used or the return type is </a:t>
-            </a:r>
-            <a:r>
-              <a:rPr lang="en-US" baseline="0" dirty="0" smtClean="0"/>
-              <a:t>void.  Only a single argument is valid without parentheses, but an argument list is always valid with them.  The argument type </a:t>
+              <a:t>used or the return type is void.  Only a single argument is valid without parentheses, but an argument list is always valid with them.  The argument type </a:t>
             </a:r>
             <a:r>
               <a:rPr lang="en-US" baseline="0" dirty="0"/>
@@ -4552,21 +4600,9 @@
           <a:p>
             <a:r>
               <a:rPr lang="en-US" i="1" dirty="0" smtClean="0"/>
-              <a:t>Go over slide.  </a:t>
-            </a:r>
-            <a:r>
-              <a:rPr lang="en-US" dirty="0" smtClean="0"/>
-              <a:t>However</a:t>
-            </a:r>
-            <a:r>
-              <a:rPr lang="en-US" dirty="0" smtClean="0"/>
-              <a:t>, this method of doing this requires creating</a:t>
-            </a:r>
-            <a:r>
-              <a:rPr lang="en-US" baseline="0" dirty="0" smtClean="0"/>
-              <a:t> a new interface for each set of exceptions that are needed in the throws clause.</a:t>
-            </a:r>
-            <a:endParaRPr lang="en-US" dirty="0"/>
+              <a:t>Go over slide</a:t>
+            </a:r>
+            <a:endParaRPr lang="en-US" i="1" dirty="0"/>
           </a:p>
         </p:txBody>
       </p:sp>
@@ -4587,7 +4623,7 @@
           <a:p>
             <a:fld id="{9B9A5078-34A5-4200-8953-1FDEE337BA82}" type="slidenum">
               <a:rPr lang="en-US" smtClean="0"/>
-              <a:t>46</a:t>
+              <a:t>45</a:t>
             </a:fld>
             <a:endParaRPr lang="en-US"/>
           </a:p>
@@ -4596,7 +4632,7 @@
     </p:spTree>
     <p:extLst>
       <p:ext uri="{BB962C8B-B14F-4D97-AF65-F5344CB8AC3E}">
-        <p14:creationId xmlns:p14="http://schemas.microsoft.com/office/powerpoint/2010/main" val="3102549053"/>
+        <p14:creationId xmlns:p14="http://schemas.microsoft.com/office/powerpoint/2010/main" val="4142547669"/>
       </p:ext>
     </p:extLst>
   </p:cSld>
@@ -4656,11 +4692,19 @@
             </a:r>
             <a:r>
               <a:rPr lang="en-US" dirty="0" smtClean="0"/>
-              <a:t>It </a:t>
+              <a:t>However, this </a:t>
             </a:r>
             <a:r>
               <a:rPr lang="en-US" dirty="0" smtClean="0"/>
-              <a:t>is no longer necessary to create a new interface to change out the exception that is thrown.</a:t>
+              <a:t>way </a:t>
+            </a:r>
+            <a:r>
+              <a:rPr lang="en-US" dirty="0" smtClean="0"/>
+              <a:t>of doing this requires creating</a:t>
+            </a:r>
+            <a:r>
+              <a:rPr lang="en-US" baseline="0" dirty="0" smtClean="0"/>
+              <a:t> a new interface for each set of exceptions that are needed in the throws clause.</a:t>
             </a:r>
             <a:endParaRPr lang="en-US" dirty="0"/>
           </a:p>
@@ -4683,7 +4727,7 @@
           <a:p>
             <a:fld id="{9B9A5078-34A5-4200-8953-1FDEE337BA82}" type="slidenum">
               <a:rPr lang="en-US" smtClean="0"/>
-              <a:t>47</a:t>
+              <a:t>46</a:t>
             </a:fld>
             <a:endParaRPr lang="en-US"/>
           </a:p>
@@ -4692,7 +4736,7 @@
     </p:spTree>
     <p:extLst>
       <p:ext uri="{BB962C8B-B14F-4D97-AF65-F5344CB8AC3E}">
-        <p14:creationId xmlns:p14="http://schemas.microsoft.com/office/powerpoint/2010/main" val="1909135802"/>
+        <p14:creationId xmlns:p14="http://schemas.microsoft.com/office/powerpoint/2010/main" val="3102549053"/>
       </p:ext>
     </p:extLst>
   </p:cSld>
@@ -4747,12 +4791,12 @@
           <a:lstStyle/>
           <a:p>
             <a:r>
-              <a:rPr lang="en-US" dirty="0"/>
-              <a:t>The close method of the context forms the lambda with the CloseIt1 interface.  The try-with-resources feature in Java does the rest,</a:t>
-            </a:r>
-            <a:r>
-              <a:rPr lang="en-US" baseline="0" dirty="0"/>
-              <a:t> including the heavy lifting of handling any exception thrown in the close method as either a suppressed exception if an exception occurred in the body, or its own first class exception if no exception occurred in the body.</a:t>
+              <a:rPr lang="en-US" i="1" dirty="0" smtClean="0"/>
+              <a:t>Go over slide.  </a:t>
+            </a:r>
+            <a:r>
+              <a:rPr lang="en-US" dirty="0" smtClean="0"/>
+              <a:t>It is no longer necessary to create a new interface to change out the exception that is thrown.</a:t>
             </a:r>
             <a:endParaRPr lang="en-US" dirty="0"/>
           </a:p>
@@ -4775,7 +4819,7 @@
           <a:p>
             <a:fld id="{9B9A5078-34A5-4200-8953-1FDEE337BA82}" type="slidenum">
               <a:rPr lang="en-US" smtClean="0"/>
-              <a:t>48</a:t>
+              <a:t>47</a:t>
             </a:fld>
             <a:endParaRPr lang="en-US"/>
           </a:p>
@@ -4784,7 +4828,7 @@
     </p:spTree>
     <p:extLst>
       <p:ext uri="{BB962C8B-B14F-4D97-AF65-F5344CB8AC3E}">
-        <p14:creationId xmlns:p14="http://schemas.microsoft.com/office/powerpoint/2010/main" val="1544996753"/>
+        <p14:creationId xmlns:p14="http://schemas.microsoft.com/office/powerpoint/2010/main" val="1909135802"/>
       </p:ext>
     </p:extLst>
   </p:cSld>
@@ -4839,10 +4883,14 @@
           <a:lstStyle/>
           <a:p>
             <a:r>
-              <a:rPr lang="en-US" i="1" dirty="0" smtClean="0"/>
-              <a:t>Go over slide.</a:t>
-            </a:r>
-            <a:endParaRPr lang="en-US" i="1" dirty="0"/>
+              <a:rPr lang="en-US" dirty="0"/>
+              <a:t>The close method of the context forms the lambda with the CloseIt1 interface.  The try-with-resources feature in Java does the rest,</a:t>
+            </a:r>
+            <a:r>
+              <a:rPr lang="en-US" baseline="0" dirty="0"/>
+              <a:t> including the heavy lifting of handling any exception thrown in the close method as either a suppressed exception if an exception occurred in the body, or its own first class exception if no exception occurred in the body.</a:t>
+            </a:r>
+            <a:endParaRPr lang="en-US" dirty="0"/>
           </a:p>
         </p:txBody>
       </p:sp>
@@ -4863,7 +4911,7 @@
           <a:p>
             <a:fld id="{9B9A5078-34A5-4200-8953-1FDEE337BA82}" type="slidenum">
               <a:rPr lang="en-US" smtClean="0"/>
-              <a:t>49</a:t>
+              <a:t>48</a:t>
             </a:fld>
             <a:endParaRPr lang="en-US"/>
           </a:p>
@@ -4872,7 +4920,7 @@
     </p:spTree>
     <p:extLst>
       <p:ext uri="{BB962C8B-B14F-4D97-AF65-F5344CB8AC3E}">
-        <p14:creationId xmlns:p14="http://schemas.microsoft.com/office/powerpoint/2010/main" val="30888258"/>
+        <p14:creationId xmlns:p14="http://schemas.microsoft.com/office/powerpoint/2010/main" val="1544996753"/>
       </p:ext>
     </p:extLst>
   </p:cSld>
@@ -4927,38 +4975,30 @@
           <a:lstStyle/>
           <a:p>
             <a:r>
-              <a:rPr lang="en-US" dirty="0" smtClean="0"/>
-              <a:t>The higher order function </a:t>
-            </a:r>
-            <a:r>
-              <a:rPr lang="en-US" dirty="0" err="1" smtClean="0"/>
-              <a:t>wrapAllException</a:t>
-            </a:r>
-            <a:r>
-              <a:rPr lang="en-US" baseline="0" dirty="0" smtClean="0"/>
-              <a:t> returns a lambda </a:t>
-            </a:r>
-            <a:r>
-              <a:rPr lang="en-US" baseline="0" dirty="0"/>
-              <a:t>will call the close method of the original </a:t>
-            </a:r>
-            <a:r>
-              <a:rPr lang="en-US" baseline="0" dirty="0" err="1"/>
-              <a:t>autoClosable</a:t>
-            </a:r>
-            <a:r>
-              <a:rPr lang="en-US" baseline="0" dirty="0"/>
-              <a:t>.  If it throws an Exception, it will decorate it by wrapping the exception within a </a:t>
-            </a:r>
-            <a:r>
-              <a:rPr lang="en-US" baseline="0" dirty="0" err="1"/>
-              <a:t>NotClosedException</a:t>
-            </a:r>
-            <a:r>
-              <a:rPr lang="en-US" baseline="0" dirty="0"/>
-              <a:t>.</a:t>
-            </a:r>
-            <a:endParaRPr lang="en-US" dirty="0"/>
+              <a:rPr lang="en-US" i="1" dirty="0" smtClean="0"/>
+              <a:t>Go over slide</a:t>
+            </a:r>
+            <a:r>
+              <a:rPr lang="en-US" i="1" dirty="0" smtClean="0"/>
+              <a:t>. </a:t>
+            </a:r>
+            <a:r>
+              <a:rPr lang="en-US" i="0" dirty="0" smtClean="0"/>
+              <a:t>The</a:t>
+            </a:r>
+            <a:r>
+              <a:rPr lang="en-US" i="0" baseline="0" dirty="0" smtClean="0"/>
+              <a:t> decorated lambda is created using a higher order function that accepts the </a:t>
+            </a:r>
+            <a:r>
+              <a:rPr lang="en-US" i="0" baseline="0" dirty="0" err="1" smtClean="0"/>
+              <a:t>AutoClosable</a:t>
+            </a:r>
+            <a:r>
+              <a:rPr lang="en-US" i="0" baseline="0" dirty="0" smtClean="0"/>
+              <a:t> as an argument and returns the decorated lambda object.</a:t>
+            </a:r>
+            <a:endParaRPr lang="en-US" i="1" dirty="0"/>
           </a:p>
         </p:txBody>
       </p:sp>
@@ -4979,7 +5019,7 @@
           <a:p>
             <a:fld id="{9B9A5078-34A5-4200-8953-1FDEE337BA82}" type="slidenum">
               <a:rPr lang="en-US" smtClean="0"/>
-              <a:t>50</a:t>
+              <a:t>49</a:t>
             </a:fld>
             <a:endParaRPr lang="en-US"/>
           </a:p>
@@ -4988,7 +5028,7 @@
     </p:spTree>
     <p:extLst>
       <p:ext uri="{BB962C8B-B14F-4D97-AF65-F5344CB8AC3E}">
-        <p14:creationId xmlns:p14="http://schemas.microsoft.com/office/powerpoint/2010/main" val="2137428540"/>
+        <p14:creationId xmlns:p14="http://schemas.microsoft.com/office/powerpoint/2010/main" val="30888258"/>
       </p:ext>
     </p:extLst>
   </p:cSld>
@@ -5043,20 +5083,32 @@
           <a:lstStyle/>
           <a:p>
             <a:r>
-              <a:rPr lang="en-US" dirty="0"/>
-              <a:t>The logger here is using </a:t>
-            </a:r>
-            <a:r>
-              <a:rPr lang="en-US" dirty="0" err="1"/>
-              <a:t>getCause</a:t>
-            </a:r>
-            <a:r>
-              <a:rPr lang="en-US" dirty="0"/>
-              <a:t>() because it knows that this exception</a:t>
+              <a:rPr lang="en-US" dirty="0" smtClean="0"/>
+              <a:t>The higher order function </a:t>
+            </a:r>
+            <a:r>
+              <a:rPr lang="en-US" dirty="0" err="1" smtClean="0"/>
+              <a:t>wrapAllException</a:t>
+            </a:r>
+            <a:r>
+              <a:rPr lang="en-US" baseline="0" dirty="0" smtClean="0"/>
+              <a:t> returns a lambda </a:t>
+            </a:r>
+            <a:r>
+              <a:rPr lang="en-US" baseline="0" dirty="0" smtClean="0"/>
+              <a:t>that will </a:t>
             </a:r>
             <a:r>
               <a:rPr lang="en-US" baseline="0" dirty="0"/>
-              <a:t> will always be wrapped.  It is printing the actual exception thrown by the close() method, not the exception decorator.  The </a:t>
+              <a:t>call the close method of the original </a:t>
+            </a:r>
+            <a:r>
+              <a:rPr lang="en-US" baseline="0" dirty="0" err="1"/>
+              <a:t>autoClosable</a:t>
+            </a:r>
+            <a:r>
+              <a:rPr lang="en-US" baseline="0" dirty="0"/>
+              <a:t>.  If it throws an Exception, it will decorate it by wrapping the exception within a </a:t>
             </a:r>
             <a:r>
               <a:rPr lang="en-US" baseline="0" dirty="0" err="1"/>
@@ -5064,11 +5116,7 @@
             </a:r>
             <a:r>
               <a:rPr lang="en-US" baseline="0" dirty="0"/>
-              <a:t> won’t be caught if an exception occurs in the body because it will be a suppressed exception</a:t>
-            </a:r>
-            <a:r>
-              <a:rPr lang="en-US" baseline="0" dirty="0" smtClean="0"/>
-              <a:t>.  This allow exception handlers to handle the case where no exception is thrown in the body but an exception is thrown in the close() method differently than if the exception is thrown in the body.</a:t>
+              <a:t>.</a:t>
             </a:r>
             <a:endParaRPr lang="en-US" dirty="0"/>
           </a:p>
@@ -5091,7 +5139,7 @@
           <a:p>
             <a:fld id="{9B9A5078-34A5-4200-8953-1FDEE337BA82}" type="slidenum">
               <a:rPr lang="en-US" smtClean="0"/>
-              <a:t>51</a:t>
+              <a:t>50</a:t>
             </a:fld>
             <a:endParaRPr lang="en-US"/>
           </a:p>
@@ -5100,7 +5148,7 @@
     </p:spTree>
     <p:extLst>
       <p:ext uri="{BB962C8B-B14F-4D97-AF65-F5344CB8AC3E}">
-        <p14:creationId xmlns:p14="http://schemas.microsoft.com/office/powerpoint/2010/main" val="734209670"/>
+        <p14:creationId xmlns:p14="http://schemas.microsoft.com/office/powerpoint/2010/main" val="2137428540"/>
       </p:ext>
     </p:extLst>
   </p:cSld>
@@ -5154,26 +5202,41 @@
           <a:bodyPr/>
           <a:lstStyle/>
           <a:p>
-            <a:pPr algn="l"/>
-            <a:r>
-              <a:rPr lang="en-US" i="1" dirty="0" smtClean="0"/>
-              <a:t>Go over slide.  </a:t>
-            </a:r>
-            <a:r>
-              <a:rPr lang="en-US" dirty="0" smtClean="0"/>
-              <a:t>Wrap </a:t>
-            </a:r>
             <a:r>
               <a:rPr lang="en-US" dirty="0"/>
-              <a:t>is the example shown on the previous two slides.  The difference between</a:t>
+              <a:t>The logger here is using </a:t>
+            </a:r>
+            <a:r>
+              <a:rPr lang="en-US" dirty="0" err="1"/>
+              <a:t>getCause</a:t>
+            </a:r>
+            <a:r>
+              <a:rPr lang="en-US" dirty="0"/>
+              <a:t>() because it knows that this exception</a:t>
             </a:r>
             <a:r>
               <a:rPr lang="en-US" baseline="0" dirty="0"/>
-              <a:t> consume and wrap + catch is consume always processes exceptions from the close method, but wrapped exceptions are only caught if no exception occurs in the try-with-resources body</a:t>
+              <a:t> will always be wrapped.  It is printing the actual exception thrown by the close() method, not the exception decorator.  The </a:t>
+            </a:r>
+            <a:r>
+              <a:rPr lang="en-US" baseline="0" dirty="0" err="1"/>
+              <a:t>NotClosedException</a:t>
+            </a:r>
+            <a:r>
+              <a:rPr lang="en-US" baseline="0" dirty="0"/>
+              <a:t> won’t be caught if an exception occurs in the body because it will be a suppressed exception</a:t>
             </a:r>
             <a:r>
               <a:rPr lang="en-US" baseline="0" dirty="0" smtClean="0"/>
-              <a:t>.  It is a form of the adapter design pattern because you are adapting an exception from an unwanted type into the type you want to handle.</a:t>
+              <a:t>.  This </a:t>
+            </a:r>
+            <a:r>
+              <a:rPr lang="en-US" baseline="0" dirty="0" smtClean="0"/>
+              <a:t>allows </a:t>
+            </a:r>
+            <a:r>
+              <a:rPr lang="en-US" baseline="0" dirty="0" smtClean="0"/>
+              <a:t>exception handlers to handle the case where no exception is thrown in the body but an exception is thrown in the close() method differently than if the exception is thrown in the body.</a:t>
             </a:r>
             <a:endParaRPr lang="en-US" dirty="0"/>
           </a:p>
@@ -5196,6 +5259,102 @@
           <a:p>
             <a:fld id="{9B9A5078-34A5-4200-8953-1FDEE337BA82}" type="slidenum">
               <a:rPr lang="en-US" smtClean="0"/>
+              <a:t>51</a:t>
+            </a:fld>
+            <a:endParaRPr lang="en-US"/>
+          </a:p>
+        </p:txBody>
+      </p:sp>
+    </p:spTree>
+    <p:extLst>
+      <p:ext uri="{BB962C8B-B14F-4D97-AF65-F5344CB8AC3E}">
+        <p14:creationId xmlns:p14="http://schemas.microsoft.com/office/powerpoint/2010/main" val="734209670"/>
+      </p:ext>
+    </p:extLst>
+  </p:cSld>
+  <p:clrMapOvr>
+    <a:masterClrMapping/>
+  </p:clrMapOvr>
+</p:notes>
+</file>
+
+<file path=ppt/notesSlides/notesSlide47.xml><?xml version="1.0" encoding="utf-8"?>
+<p:notes xmlns:a="http://schemas.openxmlformats.org/drawingml/2006/main" xmlns:r="http://schemas.openxmlformats.org/officeDocument/2006/relationships" xmlns:p="http://schemas.openxmlformats.org/presentationml/2006/main">
+  <p:cSld>
+    <p:spTree>
+      <p:nvGrpSpPr>
+        <p:cNvPr id="1" name=""/>
+        <p:cNvGrpSpPr/>
+        <p:nvPr/>
+      </p:nvGrpSpPr>
+      <p:grpSpPr>
+        <a:xfrm>
+          <a:off x="0" y="0"/>
+          <a:ext cx="0" cy="0"/>
+          <a:chOff x="0" y="0"/>
+          <a:chExt cx="0" cy="0"/>
+        </a:xfrm>
+      </p:grpSpPr>
+      <p:sp>
+        <p:nvSpPr>
+          <p:cNvPr id="2" name="Slide Image Placeholder 1"/>
+          <p:cNvSpPr>
+            <a:spLocks noGrp="1" noRot="1" noChangeAspect="1"/>
+          </p:cNvSpPr>
+          <p:nvPr>
+            <p:ph type="sldImg"/>
+          </p:nvPr>
+        </p:nvSpPr>
+        <p:spPr/>
+      </p:sp>
+      <p:sp>
+        <p:nvSpPr>
+          <p:cNvPr id="3" name="Notes Placeholder 2"/>
+          <p:cNvSpPr>
+            <a:spLocks noGrp="1"/>
+          </p:cNvSpPr>
+          <p:nvPr>
+            <p:ph type="body" idx="1"/>
+          </p:nvPr>
+        </p:nvSpPr>
+        <p:spPr/>
+        <p:txBody>
+          <a:bodyPr/>
+          <a:lstStyle/>
+          <a:p>
+            <a:pPr algn="l"/>
+            <a:r>
+              <a:rPr lang="en-US" i="1" dirty="0" smtClean="0"/>
+              <a:t>Go over slide.  </a:t>
+            </a:r>
+            <a:r>
+              <a:rPr lang="en-US" dirty="0" smtClean="0"/>
+              <a:t>Wrap </a:t>
+            </a:r>
+            <a:r>
+              <a:rPr lang="en-US" dirty="0"/>
+              <a:t>is the example shown on the previous two slides. </a:t>
+            </a:r>
+          </a:p>
+        </p:txBody>
+      </p:sp>
+      <p:sp>
+        <p:nvSpPr>
+          <p:cNvPr id="4" name="Slide Number Placeholder 3"/>
+          <p:cNvSpPr>
+            <a:spLocks noGrp="1"/>
+          </p:cNvSpPr>
+          <p:nvPr>
+            <p:ph type="sldNum" sz="quarter" idx="10"/>
+          </p:nvPr>
+        </p:nvSpPr>
+        <p:spPr/>
+        <p:txBody>
+          <a:bodyPr/>
+          <a:lstStyle/>
+          <a:p>
+            <a:fld id="{9B9A5078-34A5-4200-8953-1FDEE337BA82}" type="slidenum">
+              <a:rPr lang="en-US" smtClean="0"/>
               <a:t>52</a:t>
             </a:fld>
             <a:endParaRPr lang="en-US"/>
@@ -5215,7 +5374,7 @@
 </p:notes>
 </file>
 
-<file path=ppt/notesSlides/notesSlide47.xml><?xml version="1.0" encoding="utf-8"?>
+<file path=ppt/notesSlides/notesSlide48.xml><?xml version="1.0" encoding="utf-8"?>
 <p:notes xmlns:a="http://schemas.openxmlformats.org/drawingml/2006/main" xmlns:r="http://schemas.openxmlformats.org/officeDocument/2006/relationships" xmlns:p="http://schemas.openxmlformats.org/presentationml/2006/main">
   <p:cSld>
     <p:spTree>
@@ -5749,11 +5908,7 @@
             </a:r>
             <a:r>
               <a:rPr lang="en-US" baseline="0" dirty="0" smtClean="0"/>
-              <a:t> conventions are consistently used by the Java Functional Interfaces.  Awareness of them will help in understanding declarations that use them</a:t>
-            </a:r>
-            <a:r>
-              <a:rPr lang="en-US" baseline="0" dirty="0" smtClean="0"/>
-              <a:t>.  These conventions are worthwhile to use in your own code.  They will help any developer who is familiar with the built-in FIs and Stream classes to understand your code.</a:t>
+              <a:t> conventions are consistently used by the Java Functional Interfaces.  Awareness of them will help in understanding declarations that use them.  These conventions are worthwhile to use in your own code.  They will help any developer who is familiar with the built-in FIs and Stream classes to understand your code.</a:t>
             </a:r>
             <a:endParaRPr lang="en-US" dirty="0"/>
           </a:p>
@@ -18489,15 +18644,7 @@
             </a:r>
             <a:r>
               <a:rPr lang="en-US" sz="2400" dirty="0" smtClean="0"/>
-              <a:t>the data </a:t>
-            </a:r>
-            <a:r>
-              <a:rPr lang="en-US" sz="2400" dirty="0" smtClean="0"/>
-              <a:t>source output </a:t>
-            </a:r>
-            <a:r>
-              <a:rPr lang="en-US" sz="2400" dirty="0" smtClean="0"/>
-              <a:t>or previous </a:t>
+              <a:t>the data source output or previous </a:t>
             </a:r>
             <a:r>
               <a:rPr lang="en-US" sz="2400" dirty="0"/>
@@ -19611,19 +19758,7 @@
             </a:r>
             <a:r>
               <a:rPr lang="en-US" sz="1600" dirty="0" smtClean="0"/>
-              <a:t> because it only reads its arguments, </a:t>
-            </a:r>
-            <a:r>
-              <a:rPr lang="en-US" sz="1600" dirty="0" smtClean="0"/>
-              <a:t>does </a:t>
-            </a:r>
-            <a:r>
-              <a:rPr lang="en-US" sz="1600" dirty="0" smtClean="0"/>
-              <a:t>not change any </a:t>
-            </a:r>
-            <a:r>
-              <a:rPr lang="en-US" sz="1600" dirty="0" smtClean="0"/>
-              <a:t>external state (no side-effects), and always returns the same value for the same arguments.  For example: </a:t>
+              <a:t> because it only reads its arguments, does not change any external state (no side-effects), and always returns the same value for the same arguments.  For example: </a:t>
             </a:r>
             <a:r>
               <a:rPr lang="en-US" sz="1600" dirty="0" smtClean="0">
@@ -19642,7 +19777,6 @@
               <a:rPr lang="en-US" sz="1600" dirty="0" smtClean="0"/>
               <a:t> always returns 7.</a:t>
             </a:r>
-            <a:endParaRPr lang="en-US" sz="1600" dirty="0" smtClean="0"/>
           </a:p>
           <a:p>
             <a:r>
@@ -19655,15 +19789,7 @@
                   <a:srgbClr val="FFFFFF"/>
                 </a:highlight>
               </a:rPr>
-              <a:t>behavior may occur.  </a:t>
-            </a:r>
-            <a:r>
-              <a:rPr lang="en-US" sz="1600" dirty="0" smtClean="0">
-                <a:highlight>
-                  <a:srgbClr val="FFFFFF"/>
-                </a:highlight>
-              </a:rPr>
-              <a:t>Consumers and Suppliers are notable exceptions to this rule.</a:t>
+              <a:t>behavior may occur.  Consumers and Suppliers are notable exceptions to this rule.</a:t>
             </a:r>
             <a:endParaRPr lang="en-US" sz="1600" dirty="0" smtClean="0">
               <a:solidFill>
@@ -20700,8 +20826,12 @@
               <a:t>They offer </a:t>
             </a:r>
             <a:r>
+              <a:rPr lang="en-US" dirty="0" smtClean="0"/>
+              <a:t>additional terminal operations, </a:t>
+            </a:r>
+            <a:r>
               <a:rPr lang="en-US" dirty="0"/>
-              <a:t>additional methods, such as </a:t>
+              <a:t>such as </a:t>
             </a:r>
             <a:r>
               <a:rPr lang="en-US" dirty="0">
@@ -21642,7 +21772,7 @@
           <p:cNvPr id="2" name="Title 1">
             <a:extLst>
               <a:ext uri="{FF2B5EF4-FFF2-40B4-BE49-F238E27FC236}">
-                <a16:creationId xmlns="" xmlns:a16="http://schemas.microsoft.com/office/drawing/2014/main" id="{4BF41A3A-9BA9-D948-8BBC-74A05D841F3C}"/>
+                <a16:creationId xmlns:a16="http://schemas.microsoft.com/office/drawing/2014/main" xmlns="" id="{4BF41A3A-9BA9-D948-8BBC-74A05D841F3C}"/>
               </a:ext>
             </a:extLst>
           </p:cNvPr>
@@ -21670,7 +21800,7 @@
           <p:cNvPr id="3" name="Content Placeholder 2">
             <a:extLst>
               <a:ext uri="{FF2B5EF4-FFF2-40B4-BE49-F238E27FC236}">
-                <a16:creationId xmlns="" xmlns:a16="http://schemas.microsoft.com/office/drawing/2014/main" id="{767751D2-324B-034A-A6DB-931966979B81}"/>
+                <a16:creationId xmlns:a16="http://schemas.microsoft.com/office/drawing/2014/main" xmlns="" id="{767751D2-324B-034A-A6DB-931966979B81}"/>
               </a:ext>
             </a:extLst>
           </p:cNvPr>
@@ -24283,7 +24413,7 @@
           <p:cNvPr id="2" name="Title 1">
             <a:extLst>
               <a:ext uri="{FF2B5EF4-FFF2-40B4-BE49-F238E27FC236}">
-                <a16:creationId xmlns="" xmlns:a16="http://schemas.microsoft.com/office/drawing/2014/main" id="{187600CA-ED49-8A42-8AAC-B8CED9B598F6}"/>
+                <a16:creationId xmlns:a16="http://schemas.microsoft.com/office/drawing/2014/main" xmlns="" id="{187600CA-ED49-8A42-8AAC-B8CED9B598F6}"/>
               </a:ext>
             </a:extLst>
           </p:cNvPr>
@@ -24311,7 +24441,7 @@
           <p:cNvPr id="3" name="Content Placeholder 2">
             <a:extLst>
               <a:ext uri="{FF2B5EF4-FFF2-40B4-BE49-F238E27FC236}">
-                <a16:creationId xmlns="" xmlns:a16="http://schemas.microsoft.com/office/drawing/2014/main" id="{095A9095-A831-4445-8971-55AE4AD7D768}"/>
+                <a16:creationId xmlns:a16="http://schemas.microsoft.com/office/drawing/2014/main" xmlns="" id="{095A9095-A831-4445-8971-55AE4AD7D768}"/>
               </a:ext>
             </a:extLst>
           </p:cNvPr>
@@ -24376,7 +24506,7 @@
           <p:cNvPr id="2" name="Title 1">
             <a:extLst>
               <a:ext uri="{FF2B5EF4-FFF2-40B4-BE49-F238E27FC236}">
-                <a16:creationId xmlns="" xmlns:a16="http://schemas.microsoft.com/office/drawing/2014/main" id="{8F1FC55F-B025-1646-8698-4E547B39859F}"/>
+                <a16:creationId xmlns:a16="http://schemas.microsoft.com/office/drawing/2014/main" xmlns="" id="{8F1FC55F-B025-1646-8698-4E547B39859F}"/>
               </a:ext>
             </a:extLst>
           </p:cNvPr>
@@ -24411,7 +24541,7 @@
           <p:cNvPr id="3" name="Content Placeholder 2">
             <a:extLst>
               <a:ext uri="{FF2B5EF4-FFF2-40B4-BE49-F238E27FC236}">
-                <a16:creationId xmlns="" xmlns:a16="http://schemas.microsoft.com/office/drawing/2014/main" id="{212DEAB1-CB9C-0443-A7F4-896B0EDCEF7F}"/>
+                <a16:creationId xmlns:a16="http://schemas.microsoft.com/office/drawing/2014/main" xmlns="" id="{212DEAB1-CB9C-0443-A7F4-896B0EDCEF7F}"/>
               </a:ext>
             </a:extLst>
           </p:cNvPr>
@@ -24952,7 +25082,7 @@
           <p:cNvPr id="2" name="Title 1">
             <a:extLst>
               <a:ext uri="{FF2B5EF4-FFF2-40B4-BE49-F238E27FC236}">
-                <a16:creationId xmlns="" xmlns:a16="http://schemas.microsoft.com/office/drawing/2014/main" id="{9D575015-E9F6-854A-84D4-7FAAE040C19B}"/>
+                <a16:creationId xmlns:a16="http://schemas.microsoft.com/office/drawing/2014/main" xmlns="" id="{9D575015-E9F6-854A-84D4-7FAAE040C19B}"/>
               </a:ext>
             </a:extLst>
           </p:cNvPr>
@@ -24985,7 +25115,7 @@
           <p:cNvPr id="3" name="Content Placeholder 2">
             <a:extLst>
               <a:ext uri="{FF2B5EF4-FFF2-40B4-BE49-F238E27FC236}">
-                <a16:creationId xmlns="" xmlns:a16="http://schemas.microsoft.com/office/drawing/2014/main" id="{D2856061-7E40-AE42-8E8F-D10F98FC1DD5}"/>
+                <a16:creationId xmlns:a16="http://schemas.microsoft.com/office/drawing/2014/main" xmlns="" id="{D2856061-7E40-AE42-8E8F-D10F98FC1DD5}"/>
               </a:ext>
             </a:extLst>
           </p:cNvPr>
@@ -34738,8 +34868,13 @@
             </a:r>
             <a:r>
               <a:rPr lang="en-US" sz="2400" dirty="0"/>
-              <a:t> is a Functional Interface, the decorator may be expressed as a lambda.</a:t>
-            </a:r>
+              <a:t> is a Functional Interface, the decorator may be expressed as a </a:t>
+            </a:r>
+            <a:r>
+              <a:rPr lang="en-US" sz="2400" dirty="0" smtClean="0"/>
+              <a:t>lambda.</a:t>
+            </a:r>
+            <a:endParaRPr lang="en-US" sz="2400" dirty="0"/>
           </a:p>
           <a:p>
             <a:r>

</xml_diff>

<commit_message>
Update employer to USANA Health Sciences and Code PaLOUsa date to 2021.
</commit_message>
<xml_diff>
--- a/Learning to Love the Lambda in the Stream.pptx
+++ b/Learning to Love the Lambda in the Stream.pptx
@@ -364,7 +364,7 @@
           <a:p>
             <a:fld id="{00F927AF-B093-4AD4-B894-C7B744C95185}" type="datetimeFigureOut">
               <a:rPr lang="en-US" smtClean="0"/>
-              <a:t>8/18/2020</a:t>
+              <a:t>6/7/2021</a:t>
             </a:fld>
             <a:endParaRPr lang="en-US"/>
           </a:p>
@@ -1130,15 +1130,7 @@
             </a:r>
             <a:r>
               <a:rPr lang="en-US" baseline="0" dirty="0" smtClean="0"/>
-              <a:t>  Unlike functions, they do not follow the “Bi” convention to distinguish the one and two operator versions.  Instead there </a:t>
-            </a:r>
-            <a:r>
-              <a:rPr lang="en-US" baseline="0" dirty="0" smtClean="0"/>
-              <a:t>is </a:t>
-            </a:r>
-            <a:r>
-              <a:rPr lang="en-US" baseline="0" dirty="0" smtClean="0"/>
-              <a:t>the </a:t>
+              <a:t>  Unlike functions, they do not follow the “Bi” convention to distinguish the one and two operator versions.  Instead there is the </a:t>
             </a:r>
             <a:r>
               <a:rPr lang="en-US" baseline="0" dirty="0" err="1" smtClean="0"/>
@@ -1146,15 +1138,7 @@
             </a:r>
             <a:r>
               <a:rPr lang="en-US" baseline="0" dirty="0" smtClean="0"/>
-              <a:t> that </a:t>
-            </a:r>
-            <a:r>
-              <a:rPr lang="en-US" baseline="0" dirty="0" smtClean="0"/>
-              <a:t>takes </a:t>
-            </a:r>
-            <a:r>
-              <a:rPr lang="en-US" baseline="0" dirty="0" smtClean="0"/>
-              <a:t>a single argument, and the </a:t>
+              <a:t> that takes a single argument, and the </a:t>
             </a:r>
             <a:r>
               <a:rPr lang="en-US" baseline="0" dirty="0" err="1" smtClean="0"/>
@@ -1162,15 +1146,7 @@
             </a:r>
             <a:r>
               <a:rPr lang="en-US" baseline="0" dirty="0" smtClean="0"/>
-              <a:t> that </a:t>
-            </a:r>
-            <a:r>
-              <a:rPr lang="en-US" baseline="0" dirty="0" smtClean="0"/>
-              <a:t>takes </a:t>
-            </a:r>
-            <a:r>
-              <a:rPr lang="en-US" baseline="0" dirty="0" smtClean="0"/>
-              <a:t>two arguments.</a:t>
+              <a:t> that takes two arguments.</a:t>
             </a:r>
             <a:endParaRPr lang="en-US" dirty="0"/>
           </a:p>
@@ -1494,15 +1470,7 @@
             </a:r>
             <a:r>
               <a:rPr lang="en-US" baseline="0" dirty="0" smtClean="0"/>
-              <a:t> a lambda that only calls a single method.  The specification also guarantees that method references are folded into a single instance.  As a practical matter, any lambda that </a:t>
-            </a:r>
-            <a:r>
-              <a:rPr lang="en-US" baseline="0" dirty="0" smtClean="0"/>
-              <a:t>doesn’t use anything except the arguments that are passed into it gets </a:t>
-            </a:r>
-            <a:r>
-              <a:rPr lang="en-US" baseline="0" dirty="0" smtClean="0"/>
-              <a:t>folded into a single instance.</a:t>
+              <a:t> a lambda that only calls a single method.  The specification also guarantees that method references are folded into a single instance.  As a practical matter, any lambda that doesn’t use anything except the arguments that are passed into it gets folded into a single instance.</a:t>
             </a:r>
             <a:endParaRPr lang="en-US" dirty="0"/>
           </a:p>
@@ -1594,15 +1562,7 @@
             </a:r>
             <a:r>
               <a:rPr lang="en-US" baseline="0" dirty="0" smtClean="0"/>
-              <a:t> most straightforward method reference to understand is the static method reference. </a:t>
-            </a:r>
-            <a:r>
-              <a:rPr lang="en-US" baseline="0" dirty="0" smtClean="0"/>
-              <a:t> The </a:t>
-            </a:r>
-            <a:r>
-              <a:rPr lang="en-US" baseline="0" dirty="0" smtClean="0"/>
-              <a:t>static method is bound to the functional interface, with the arguments in the static method bound in the same order they occur in the functional interface.</a:t>
+              <a:t> most straightforward method reference to understand is the static method reference.  The static method is bound to the functional interface, with the arguments in the static method bound in the same order they occur in the functional interface.</a:t>
             </a:r>
             <a:endParaRPr lang="en-US" dirty="0"/>
           </a:p>
@@ -1818,11 +1778,7 @@
             </a:r>
             <a:r>
               <a:rPr lang="en-US" dirty="0" smtClean="0"/>
-              <a:t>OCP exam, </a:t>
-            </a:r>
-            <a:r>
-              <a:rPr lang="en-US" dirty="0" smtClean="0"/>
-              <a:t>anything</a:t>
+              <a:t>OCP exam, anything</a:t>
             </a:r>
             <a:r>
               <a:rPr lang="en-US" baseline="0" dirty="0" smtClean="0"/>
@@ -1834,11 +1790,7 @@
             </a:r>
             <a:r>
               <a:rPr lang="en-US" baseline="0" dirty="0" smtClean="0"/>
-              <a:t>use for a lambda involving a constructor, </a:t>
-            </a:r>
-            <a:r>
-              <a:rPr lang="en-US" baseline="0" dirty="0" smtClean="0"/>
-              <a:t>the right answer </a:t>
+              <a:t>use for a lambda involving a constructor, the right answer </a:t>
             </a:r>
             <a:r>
               <a:rPr lang="en-US" baseline="0" dirty="0"/>
@@ -1942,15 +1894,7 @@
             </a:r>
             <a:r>
               <a:rPr lang="en-US" baseline="0" dirty="0" smtClean="0"/>
-              <a:t> </a:t>
-            </a:r>
-            <a:r>
-              <a:rPr lang="en-US" baseline="0" dirty="0" smtClean="0"/>
-              <a:t>and arguments </a:t>
-            </a:r>
-            <a:r>
-              <a:rPr lang="en-US" baseline="0" dirty="0" smtClean="0"/>
-              <a:t>and local variables that are effectively final may be referenced by a lambda.  In Java, a lambda must be assigned to a functional interface.</a:t>
+              <a:t> and arguments and local variables that are effectively final may be referenced by a lambda.  In Java, a lambda must be assigned to a functional interface.</a:t>
             </a:r>
             <a:r>
               <a:rPr lang="en-US" dirty="0" smtClean="0"/>
@@ -2174,15 +2118,7 @@
             </a:r>
             <a:r>
               <a:rPr lang="en-US" baseline="0" dirty="0" smtClean="0"/>
-              <a:t> you are familiar with monads in functional programming, the Java stream shares many similarities with them</a:t>
-            </a:r>
-            <a:r>
-              <a:rPr lang="en-US" baseline="0" dirty="0" smtClean="0"/>
-              <a:t>.  If you google this, there is debate if Java Streams are really monads.  For getting work done, it doesn’t matter.  If you are familiar with monads you will feel right at home with streams.  </a:t>
-            </a:r>
-            <a:r>
-              <a:rPr lang="en-US" baseline="0" dirty="0" smtClean="0"/>
-              <a:t>The Java Stream framework has nothing to do with the IO Streams framework.</a:t>
+              <a:t> you are familiar with monads in functional programming, the Java stream shares many similarities with them.  If you google this, there is debate if Java Streams are really monads.  For getting work done, it doesn’t matter.  If you are familiar with monads you will feel right at home with streams.  The Java Stream framework has nothing to do with the IO Streams framework.</a:t>
             </a:r>
             <a:endParaRPr lang="en-US" dirty="0"/>
           </a:p>
@@ -2306,11 +2242,7 @@
             </a:r>
             <a:r>
               <a:rPr lang="en-US" baseline="0" dirty="0" smtClean="0"/>
-              <a:t>. </a:t>
-            </a:r>
-            <a:r>
-              <a:rPr lang="en-US" baseline="0" dirty="0" smtClean="0"/>
-              <a:t> A stream consists of a data source which provides the values for processing.  Zero or more intermediate operations that transform or discard values.  The intermediate operations are lazy and only executed when a terminal operation is added.  A terminal operation returns a result or processes the stream elements.  It is eager.  Applying a terminal operation to a stream starts the processing and closes the stream.  Any further operations result in an exception.</a:t>
+              <a:t>.  A stream consists of a data source which provides the values for processing.  Zero or more intermediate operations that transform or discard values.  The intermediate operations are lazy and only executed when a terminal operation is added.  A terminal operation returns a result or processes the stream elements.  It is eager.  Applying a terminal operation to a stream starts the processing and closes the stream.  Any further operations result in an exception.</a:t>
             </a:r>
             <a:endParaRPr lang="en-US" i="1" dirty="0"/>
           </a:p>
@@ -2511,11 +2443,7 @@
             </a:r>
             <a:r>
               <a:rPr lang="en-US" i="0" baseline="0" dirty="0" smtClean="0"/>
-              <a:t>Consumers </a:t>
-            </a:r>
-            <a:r>
-              <a:rPr lang="en-US" i="0" baseline="0" dirty="0" smtClean="0"/>
-              <a:t>typically “do something” with a value such as print it to an external source. Only a Consumer that does nothing is a pure function.  Since that’s not useful, Consumers are generally never pure functions.  Suppliers that create a new instance with each call are not pure functions because they return a different value for the same void argument.   Suppliers that return a constant value are pure functions.</a:t>
+              <a:t>Consumers typically “do something” with a value such as print it to an external source. Only a Consumer that does nothing is a pure function.  Since that’s not useful, Consumers are generally never pure functions.  Suppliers that create a new instance with each call are not pure functions because they return a different value for the same void argument.   Suppliers that return a constant value are pure functions.</a:t>
             </a:r>
             <a:endParaRPr lang="en-US" dirty="0"/>
           </a:p>
@@ -2635,11 +2563,7 @@
             </a:r>
             <a:r>
               <a:rPr lang="en-US" baseline="0" dirty="0" smtClean="0"/>
-              <a:t> the first time it is called</a:t>
-            </a:r>
-            <a:r>
-              <a:rPr lang="en-US" baseline="0" dirty="0" smtClean="0"/>
-              <a:t>.  It is also what is returned if the stream is empty.</a:t>
+              <a:t> the first time it is called.  It is also what is returned if the stream is empty.</a:t>
             </a:r>
             <a:endParaRPr lang="en-US" dirty="0"/>
           </a:p>
@@ -2951,11 +2875,7 @@
             </a:r>
             <a:r>
               <a:rPr lang="en-US" dirty="0" smtClean="0"/>
-              <a:t>This </a:t>
-            </a:r>
-            <a:r>
-              <a:rPr lang="en-US" dirty="0" smtClean="0"/>
-              <a:t>filter allows</a:t>
+              <a:t>This filter allows</a:t>
             </a:r>
             <a:r>
               <a:rPr lang="en-US" baseline="0" dirty="0" smtClean="0"/>
@@ -3067,15 +2987,7 @@
             </a:r>
             <a:r>
               <a:rPr lang="en-US" baseline="0" dirty="0" smtClean="0"/>
-              <a:t>Iterate </a:t>
-            </a:r>
-            <a:r>
-              <a:rPr lang="en-US" baseline="0" dirty="0" smtClean="0"/>
-              <a:t>repeatedly applies </a:t>
-            </a:r>
-            <a:r>
-              <a:rPr lang="en-US" baseline="0" dirty="0" smtClean="0"/>
-              <a:t>an </a:t>
+              <a:t>Iterate repeatedly applies an </a:t>
             </a:r>
             <a:r>
               <a:rPr lang="en-US" baseline="0" dirty="0" err="1" smtClean="0"/>
@@ -3083,11 +2995,7 @@
             </a:r>
             <a:r>
               <a:rPr lang="en-US" baseline="0" dirty="0" smtClean="0"/>
-              <a:t> </a:t>
-            </a:r>
-            <a:r>
-              <a:rPr lang="en-US" baseline="0" dirty="0" smtClean="0"/>
-              <a:t>on the seed value to start with and then the previous value to generate the next value.  </a:t>
+              <a:t> on the seed value to start with and then the previous value to generate the next value.  </a:t>
             </a:r>
             <a:r>
               <a:rPr lang="en-US" dirty="0" smtClean="0"/>
@@ -3610,11 +3518,7 @@
             </a:r>
             <a:r>
               <a:rPr lang="en-US" baseline="0" dirty="0" smtClean="0"/>
-              <a:t> uses a </a:t>
-            </a:r>
-            <a:r>
-              <a:rPr lang="en-US" baseline="0" dirty="0" smtClean="0"/>
-              <a:t>constructor reference </a:t>
+              <a:t> uses a constructor reference </a:t>
             </a:r>
             <a:r>
               <a:rPr lang="en-US" baseline="0" dirty="0"/>
@@ -3626,11 +3530,7 @@
             </a:r>
             <a:r>
               <a:rPr lang="en-US" baseline="0" dirty="0" smtClean="0"/>
-              <a:t>  </a:t>
-            </a:r>
-            <a:r>
-              <a:rPr lang="en-US" baseline="0" dirty="0" smtClean="0"/>
-              <a:t>to create a Set that only allows one copy of each element, and also retains the sort ordering imposed by the sorted intermediate operation.</a:t>
+              <a:t>  to create a Set that only allows one copy of each element, and also retains the sort ordering imposed by the sorted intermediate operation.</a:t>
             </a:r>
             <a:endParaRPr lang="en-US" baseline="0" dirty="0"/>
           </a:p>
@@ -3718,15 +3618,7 @@
           <a:p>
             <a:r>
               <a:rPr lang="en-US" i="1" dirty="0" smtClean="0"/>
-              <a:t>Go over </a:t>
-            </a:r>
-            <a:r>
-              <a:rPr lang="en-US" i="1" dirty="0" smtClean="0"/>
-              <a:t>slide</a:t>
-            </a:r>
-            <a:r>
-              <a:rPr lang="en-US" i="1" dirty="0" smtClean="0"/>
-              <a:t>.  </a:t>
+              <a:t>Go over slide.  </a:t>
             </a:r>
             <a:r>
               <a:rPr lang="en-US" dirty="0" smtClean="0"/>
@@ -4692,15 +4584,7 @@
             </a:r>
             <a:r>
               <a:rPr lang="en-US" dirty="0" smtClean="0"/>
-              <a:t>However, this </a:t>
-            </a:r>
-            <a:r>
-              <a:rPr lang="en-US" dirty="0" smtClean="0"/>
-              <a:t>way </a:t>
-            </a:r>
-            <a:r>
-              <a:rPr lang="en-US" dirty="0" smtClean="0"/>
-              <a:t>of doing this requires creating</a:t>
+              <a:t>However, this way of doing this requires creating</a:t>
             </a:r>
             <a:r>
               <a:rPr lang="en-US" baseline="0" dirty="0" smtClean="0"/>
@@ -4976,11 +4860,7 @@
           <a:p>
             <a:r>
               <a:rPr lang="en-US" i="1" dirty="0" smtClean="0"/>
-              <a:t>Go over slide</a:t>
-            </a:r>
-            <a:r>
-              <a:rPr lang="en-US" i="1" dirty="0" smtClean="0"/>
-              <a:t>. </a:t>
+              <a:t>Go over slide. </a:t>
             </a:r>
             <a:r>
               <a:rPr lang="en-US" i="0" dirty="0" smtClean="0"/>
@@ -5092,11 +4972,7 @@
             </a:r>
             <a:r>
               <a:rPr lang="en-US" baseline="0" dirty="0" smtClean="0"/>
-              <a:t> returns a lambda </a:t>
-            </a:r>
-            <a:r>
-              <a:rPr lang="en-US" baseline="0" dirty="0" smtClean="0"/>
-              <a:t>that will </a:t>
+              <a:t> returns a lambda that will </a:t>
             </a:r>
             <a:r>
               <a:rPr lang="en-US" baseline="0" dirty="0"/>
@@ -5228,15 +5104,7 @@
             </a:r>
             <a:r>
               <a:rPr lang="en-US" baseline="0" dirty="0" smtClean="0"/>
-              <a:t>.  This </a:t>
-            </a:r>
-            <a:r>
-              <a:rPr lang="en-US" baseline="0" dirty="0" smtClean="0"/>
-              <a:t>allows </a:t>
-            </a:r>
-            <a:r>
-              <a:rPr lang="en-US" baseline="0" dirty="0" smtClean="0"/>
-              <a:t>exception handlers to handle the case where no exception is thrown in the body but an exception is thrown in the close() method differently than if the exception is thrown in the body.</a:t>
+              <a:t>.  This allows exception handlers to handle the case where no exception is thrown in the body but an exception is thrown in the close() method differently than if the exception is thrown in the body.</a:t>
             </a:r>
             <a:endParaRPr lang="en-US" dirty="0"/>
           </a:p>
@@ -6773,7 +6641,7 @@
             <a:fld id="{B61BEF0D-F0BB-DE4B-95CE-6DB70DBA9567}" type="datetimeFigureOut">
               <a:rPr lang="en-US" dirty="0"/>
               <a:pPr/>
-              <a:t>8/18/2020</a:t>
+              <a:t>6/7/2021</a:t>
             </a:fld>
             <a:endParaRPr lang="en-US" dirty="0"/>
           </a:p>
@@ -7021,7 +6889,7 @@
             <a:fld id="{B61BEF0D-F0BB-DE4B-95CE-6DB70DBA9567}" type="datetimeFigureOut">
               <a:rPr lang="en-US" dirty="0"/>
               <a:pPr/>
-              <a:t>8/18/2020</a:t>
+              <a:t>6/7/2021</a:t>
             </a:fld>
             <a:endParaRPr lang="en-US" dirty="0"/>
           </a:p>
@@ -7332,7 +7200,7 @@
             <a:fld id="{B61BEF0D-F0BB-DE4B-95CE-6DB70DBA9567}" type="datetimeFigureOut">
               <a:rPr lang="en-US" dirty="0"/>
               <a:pPr/>
-              <a:t>8/18/2020</a:t>
+              <a:t>6/7/2021</a:t>
             </a:fld>
             <a:endParaRPr lang="en-US" dirty="0"/>
           </a:p>
@@ -7670,7 +7538,7 @@
             <a:fld id="{B61BEF0D-F0BB-DE4B-95CE-6DB70DBA9567}" type="datetimeFigureOut">
               <a:rPr lang="en-US" dirty="0"/>
               <a:pPr/>
-              <a:t>8/18/2020</a:t>
+              <a:t>6/7/2021</a:t>
             </a:fld>
             <a:endParaRPr lang="en-US" dirty="0"/>
           </a:p>
@@ -7981,7 +7849,7 @@
             <a:fld id="{B61BEF0D-F0BB-DE4B-95CE-6DB70DBA9567}" type="datetimeFigureOut">
               <a:rPr lang="en-US" dirty="0"/>
               <a:pPr/>
-              <a:t>8/18/2020</a:t>
+              <a:t>6/7/2021</a:t>
             </a:fld>
             <a:endParaRPr lang="en-US" dirty="0"/>
           </a:p>
@@ -8371,7 +8239,7 @@
             <a:fld id="{B61BEF0D-F0BB-DE4B-95CE-6DB70DBA9567}" type="datetimeFigureOut">
               <a:rPr lang="en-US" dirty="0"/>
               <a:pPr/>
-              <a:t>8/18/2020</a:t>
+              <a:t>6/7/2021</a:t>
             </a:fld>
             <a:endParaRPr lang="en-US" dirty="0"/>
           </a:p>
@@ -8537,7 +8405,7 @@
           <a:p>
             <a:fld id="{55C6B4A9-1611-4792-9094-5F34BCA07E0B}" type="datetimeFigureOut">
               <a:rPr lang="en-US" dirty="0"/>
-              <a:t>8/18/2020</a:t>
+              <a:t>6/7/2021</a:t>
             </a:fld>
             <a:endParaRPr lang="en-US" dirty="0"/>
           </a:p>
@@ -8713,7 +8581,7 @@
             <a:fld id="{B61BEF0D-F0BB-DE4B-95CE-6DB70DBA9567}" type="datetimeFigureOut">
               <a:rPr lang="en-US" dirty="0"/>
               <a:pPr/>
-              <a:t>8/18/2020</a:t>
+              <a:t>6/7/2021</a:t>
             </a:fld>
             <a:endParaRPr lang="en-US" dirty="0"/>
           </a:p>
@@ -8886,7 +8754,7 @@
             <a:fld id="{B61BEF0D-F0BB-DE4B-95CE-6DB70DBA9567}" type="datetimeFigureOut">
               <a:rPr lang="en-US" dirty="0"/>
               <a:pPr/>
-              <a:t>8/18/2020</a:t>
+              <a:t>6/7/2021</a:t>
             </a:fld>
             <a:endParaRPr lang="en-US" dirty="0"/>
           </a:p>
@@ -9130,7 +8998,7 @@
             <a:fld id="{B61BEF0D-F0BB-DE4B-95CE-6DB70DBA9567}" type="datetimeFigureOut">
               <a:rPr lang="en-US" dirty="0"/>
               <a:pPr/>
-              <a:t>8/18/2020</a:t>
+              <a:t>6/7/2021</a:t>
             </a:fld>
             <a:endParaRPr lang="en-US" dirty="0"/>
           </a:p>
@@ -9358,7 +9226,7 @@
           <a:p>
             <a:fld id="{EB712588-04B1-427B-82EE-E8DB90309F08}" type="datetimeFigureOut">
               <a:rPr lang="en-US" dirty="0"/>
-              <a:t>8/18/2020</a:t>
+              <a:t>6/7/2021</a:t>
             </a:fld>
             <a:endParaRPr lang="en-US" dirty="0"/>
           </a:p>
@@ -9728,7 +9596,7 @@
             <a:fld id="{B61BEF0D-F0BB-DE4B-95CE-6DB70DBA9567}" type="datetimeFigureOut">
               <a:rPr lang="en-US" dirty="0"/>
               <a:pPr/>
-              <a:t>8/18/2020</a:t>
+              <a:t>6/7/2021</a:t>
             </a:fld>
             <a:endParaRPr lang="en-US" dirty="0"/>
           </a:p>
@@ -9848,7 +9716,7 @@
             <a:fld id="{B61BEF0D-F0BB-DE4B-95CE-6DB70DBA9567}" type="datetimeFigureOut">
               <a:rPr lang="en-US" dirty="0"/>
               <a:pPr/>
-              <a:t>8/18/2020</a:t>
+              <a:t>6/7/2021</a:t>
             </a:fld>
             <a:endParaRPr lang="en-US" dirty="0"/>
           </a:p>
@@ -9940,7 +9808,7 @@
             <a:fld id="{B61BEF0D-F0BB-DE4B-95CE-6DB70DBA9567}" type="datetimeFigureOut">
               <a:rPr lang="en-US" dirty="0"/>
               <a:pPr/>
-              <a:t>8/18/2020</a:t>
+              <a:t>6/7/2021</a:t>
             </a:fld>
             <a:endParaRPr lang="en-US" dirty="0"/>
           </a:p>
@@ -10191,7 +10059,7 @@
           <a:p>
             <a:fld id="{42A54C80-263E-416B-A8E0-580EDEADCBDC}" type="datetimeFigureOut">
               <a:rPr lang="en-US" dirty="0"/>
-              <a:t>8/18/2020</a:t>
+              <a:t>6/7/2021</a:t>
             </a:fld>
             <a:endParaRPr lang="en-US" dirty="0"/>
           </a:p>
@@ -10450,7 +10318,7 @@
             <a:fld id="{B61BEF0D-F0BB-DE4B-95CE-6DB70DBA9567}" type="datetimeFigureOut">
               <a:rPr lang="en-US" dirty="0"/>
               <a:pPr/>
-              <a:t>8/18/2020</a:t>
+              <a:t>6/7/2021</a:t>
             </a:fld>
             <a:endParaRPr lang="en-US" dirty="0"/>
           </a:p>
@@ -11190,7 +11058,7 @@
             <a:fld id="{B61BEF0D-F0BB-DE4B-95CE-6DB70DBA9567}" type="datetimeFigureOut">
               <a:rPr lang="en-US" dirty="0"/>
               <a:pPr/>
-              <a:t>8/18/2020</a:t>
+              <a:t>6/7/2021</a:t>
             </a:fld>
             <a:endParaRPr lang="en-US" dirty="0"/>
           </a:p>
@@ -16545,11 +16413,15 @@
           <a:p>
             <a:r>
               <a:rPr lang="en-US" sz="2600" dirty="0"/>
-              <a:t>Sr. Technical Lead at </a:t>
-            </a:r>
-            <a:r>
-              <a:rPr lang="en-US" sz="2600" dirty="0" err="1"/>
-              <a:t>Perspecta</a:t>
+              <a:t>Sr. </a:t>
+            </a:r>
+            <a:r>
+              <a:rPr lang="en-US" sz="2600" dirty="0" smtClean="0"/>
+              <a:t>Developer </a:t>
+            </a:r>
+            <a:r>
+              <a:rPr lang="en-US" sz="2600" dirty="0"/>
+              <a:t>at USANA Health Sciences</a:t>
             </a:r>
             <a:endParaRPr lang="en-US" sz="2600" dirty="0"/>
           </a:p>
@@ -20823,11 +20695,7 @@
           <a:p>
             <a:r>
               <a:rPr lang="en-US" dirty="0" smtClean="0"/>
-              <a:t>They offer </a:t>
-            </a:r>
-            <a:r>
-              <a:rPr lang="en-US" dirty="0" smtClean="0"/>
-              <a:t>additional terminal operations, </a:t>
+              <a:t>They offer additional terminal operations, </a:t>
             </a:r>
             <a:r>
               <a:rPr lang="en-US" dirty="0"/>
@@ -21772,7 +21640,7 @@
           <p:cNvPr id="2" name="Title 1">
             <a:extLst>
               <a:ext uri="{FF2B5EF4-FFF2-40B4-BE49-F238E27FC236}">
-                <a16:creationId xmlns:a16="http://schemas.microsoft.com/office/drawing/2014/main" xmlns="" id="{4BF41A3A-9BA9-D948-8BBC-74A05D841F3C}"/>
+                <a16:creationId xmlns="" xmlns:a16="http://schemas.microsoft.com/office/drawing/2014/main" id="{4BF41A3A-9BA9-D948-8BBC-74A05D841F3C}"/>
               </a:ext>
             </a:extLst>
           </p:cNvPr>
@@ -21800,7 +21668,7 @@
           <p:cNvPr id="3" name="Content Placeholder 2">
             <a:extLst>
               <a:ext uri="{FF2B5EF4-FFF2-40B4-BE49-F238E27FC236}">
-                <a16:creationId xmlns:a16="http://schemas.microsoft.com/office/drawing/2014/main" xmlns="" id="{767751D2-324B-034A-A6DB-931966979B81}"/>
+                <a16:creationId xmlns="" xmlns:a16="http://schemas.microsoft.com/office/drawing/2014/main" id="{767751D2-324B-034A-A6DB-931966979B81}"/>
               </a:ext>
             </a:extLst>
           </p:cNvPr>
@@ -24413,7 +24281,7 @@
           <p:cNvPr id="2" name="Title 1">
             <a:extLst>
               <a:ext uri="{FF2B5EF4-FFF2-40B4-BE49-F238E27FC236}">
-                <a16:creationId xmlns:a16="http://schemas.microsoft.com/office/drawing/2014/main" xmlns="" id="{187600CA-ED49-8A42-8AAC-B8CED9B598F6}"/>
+                <a16:creationId xmlns="" xmlns:a16="http://schemas.microsoft.com/office/drawing/2014/main" id="{187600CA-ED49-8A42-8AAC-B8CED9B598F6}"/>
               </a:ext>
             </a:extLst>
           </p:cNvPr>
@@ -24441,7 +24309,7 @@
           <p:cNvPr id="3" name="Content Placeholder 2">
             <a:extLst>
               <a:ext uri="{FF2B5EF4-FFF2-40B4-BE49-F238E27FC236}">
-                <a16:creationId xmlns:a16="http://schemas.microsoft.com/office/drawing/2014/main" xmlns="" id="{095A9095-A831-4445-8971-55AE4AD7D768}"/>
+                <a16:creationId xmlns="" xmlns:a16="http://schemas.microsoft.com/office/drawing/2014/main" id="{095A9095-A831-4445-8971-55AE4AD7D768}"/>
               </a:ext>
             </a:extLst>
           </p:cNvPr>
@@ -24506,7 +24374,7 @@
           <p:cNvPr id="2" name="Title 1">
             <a:extLst>
               <a:ext uri="{FF2B5EF4-FFF2-40B4-BE49-F238E27FC236}">
-                <a16:creationId xmlns:a16="http://schemas.microsoft.com/office/drawing/2014/main" xmlns="" id="{8F1FC55F-B025-1646-8698-4E547B39859F}"/>
+                <a16:creationId xmlns="" xmlns:a16="http://schemas.microsoft.com/office/drawing/2014/main" id="{8F1FC55F-B025-1646-8698-4E547B39859F}"/>
               </a:ext>
             </a:extLst>
           </p:cNvPr>
@@ -24541,7 +24409,7 @@
           <p:cNvPr id="3" name="Content Placeholder 2">
             <a:extLst>
               <a:ext uri="{FF2B5EF4-FFF2-40B4-BE49-F238E27FC236}">
-                <a16:creationId xmlns:a16="http://schemas.microsoft.com/office/drawing/2014/main" xmlns="" id="{212DEAB1-CB9C-0443-A7F4-896B0EDCEF7F}"/>
+                <a16:creationId xmlns="" xmlns:a16="http://schemas.microsoft.com/office/drawing/2014/main" id="{212DEAB1-CB9C-0443-A7F4-896B0EDCEF7F}"/>
               </a:ext>
             </a:extLst>
           </p:cNvPr>
@@ -25082,7 +24950,7 @@
           <p:cNvPr id="2" name="Title 1">
             <a:extLst>
               <a:ext uri="{FF2B5EF4-FFF2-40B4-BE49-F238E27FC236}">
-                <a16:creationId xmlns:a16="http://schemas.microsoft.com/office/drawing/2014/main" xmlns="" id="{9D575015-E9F6-854A-84D4-7FAAE040C19B}"/>
+                <a16:creationId xmlns="" xmlns:a16="http://schemas.microsoft.com/office/drawing/2014/main" id="{9D575015-E9F6-854A-84D4-7FAAE040C19B}"/>
               </a:ext>
             </a:extLst>
           </p:cNvPr>
@@ -25115,7 +24983,7 @@
           <p:cNvPr id="3" name="Content Placeholder 2">
             <a:extLst>
               <a:ext uri="{FF2B5EF4-FFF2-40B4-BE49-F238E27FC236}">
-                <a16:creationId xmlns:a16="http://schemas.microsoft.com/office/drawing/2014/main" xmlns="" id="{D2856061-7E40-AE42-8E8F-D10F98FC1DD5}"/>
+                <a16:creationId xmlns="" xmlns:a16="http://schemas.microsoft.com/office/drawing/2014/main" id="{D2856061-7E40-AE42-8E8F-D10F98FC1DD5}"/>
               </a:ext>
             </a:extLst>
           </p:cNvPr>
@@ -37204,7 +37072,7 @@
             </a:r>
             <a:r>
               <a:rPr lang="en-US" sz="2400" dirty="0" smtClean="0"/>
-              <a:t>com.github.richardroda.util:closeit:1.5</a:t>
+              <a:t>com.github.richardroda.util:closeit:1.6</a:t>
             </a:r>
             <a:endParaRPr lang="en-US" sz="2400" dirty="0"/>
           </a:p>

</xml_diff>

<commit_message>
Make role of the stream close operation clearer by explicitly listing it as an optional fourth operation after the terminal operation.
</commit_message>
<xml_diff>
--- a/Learning to Love the Lambda in the Stream.pptx
+++ b/Learning to Love the Lambda in the Stream.pptx
@@ -566,7 +566,7 @@
           <a:p>
             <a:fld id="{00F927AF-B093-4AD4-B894-C7B744C95185}" type="datetimeFigureOut">
               <a:rPr lang="en-US" smtClean="0"/>
-              <a:t>5/14/2022</a:t>
+              <a:t>5/15/2022</a:t>
             </a:fld>
             <a:endParaRPr lang="en-US"/>
           </a:p>
@@ -4127,15 +4127,7 @@
             </a:r>
             <a:r>
               <a:rPr lang="en-US" baseline="0" dirty="0" smtClean="0"/>
-              <a:t> filter isn’t used at all and the numbers are directly summed.  When modulo is not null the filter no longer has to include the check against it for </a:t>
-            </a:r>
-            <a:r>
-              <a:rPr lang="en-US" baseline="0" dirty="0" smtClean="0"/>
-              <a:t>null and the </a:t>
-            </a:r>
-            <a:r>
-              <a:rPr lang="en-US" baseline="0" dirty="0" smtClean="0"/>
-              <a:t>unboxing of modulo has been factored out by assigning it to an </a:t>
+              <a:t> filter isn’t used at all and the numbers are directly summed.  When modulo is not null the filter no longer has to include the check against it for null and the unboxing of modulo has been factored out by assigning it to an </a:t>
             </a:r>
             <a:r>
               <a:rPr lang="en-US" baseline="0" dirty="0" err="1" smtClean="0"/>
@@ -4414,11 +4406,7 @@
             </a:r>
             <a:r>
               <a:rPr lang="en-US" i="0" baseline="0" dirty="0" smtClean="0"/>
-              <a:t>This is an example of how to add numbers using a reduction. </a:t>
-            </a:r>
-            <a:r>
-              <a:rPr lang="en-US" i="0" baseline="0" dirty="0" smtClean="0"/>
-              <a:t>  The </a:t>
+              <a:t>This is an example of how to add numbers using a reduction.   The </a:t>
             </a:r>
             <a:r>
               <a:rPr lang="en-US" i="0" baseline="0" dirty="0" err="1" smtClean="0"/>
@@ -4514,11 +4502,7 @@
           <a:p>
             <a:r>
               <a:rPr lang="en-US" baseline="0" dirty="0" smtClean="0"/>
-              <a:t>For lambda argument </a:t>
-            </a:r>
-            <a:r>
-              <a:rPr lang="en-US" baseline="0" dirty="0" smtClean="0"/>
-              <a:t>lists, only </a:t>
+              <a:t>For lambda argument lists, only </a:t>
             </a:r>
             <a:r>
               <a:rPr lang="en-US" baseline="0" dirty="0"/>
@@ -5576,11 +5560,7 @@
             </a:r>
             <a:r>
               <a:rPr lang="en-US" baseline="0" dirty="0" smtClean="0"/>
-              <a:t> argument.  The loan pattern is a pattern in its own right because a common use case of the execute around pattern is to provide a resource.  So it makes sense to talk about a “loan pattern” instead of an “execute around pattern that provides a resource</a:t>
-            </a:r>
-            <a:r>
-              <a:rPr lang="en-US" baseline="0" dirty="0" smtClean="0"/>
-              <a:t>”.  The </a:t>
+              <a:t> argument.  The loan pattern is a pattern in its own right because a common use case of the execute around pattern is to provide a resource.  So it makes sense to talk about a “loan pattern” instead of an “execute around pattern that provides a resource”.  The </a:t>
             </a:r>
             <a:r>
               <a:rPr lang="en-US" baseline="0" dirty="0" err="1" smtClean="0"/>
@@ -8087,7 +8067,7 @@
             <a:fld id="{B61BEF0D-F0BB-DE4B-95CE-6DB70DBA9567}" type="datetimeFigureOut">
               <a:rPr lang="en-US" dirty="0"/>
               <a:pPr/>
-              <a:t>5/14/2022</a:t>
+              <a:t>5/15/2022</a:t>
             </a:fld>
             <a:endParaRPr lang="en-US" dirty="0"/>
           </a:p>
@@ -8335,7 +8315,7 @@
             <a:fld id="{B61BEF0D-F0BB-DE4B-95CE-6DB70DBA9567}" type="datetimeFigureOut">
               <a:rPr lang="en-US" dirty="0"/>
               <a:pPr/>
-              <a:t>5/14/2022</a:t>
+              <a:t>5/15/2022</a:t>
             </a:fld>
             <a:endParaRPr lang="en-US" dirty="0"/>
           </a:p>
@@ -8646,7 +8626,7 @@
             <a:fld id="{B61BEF0D-F0BB-DE4B-95CE-6DB70DBA9567}" type="datetimeFigureOut">
               <a:rPr lang="en-US" dirty="0"/>
               <a:pPr/>
-              <a:t>5/14/2022</a:t>
+              <a:t>5/15/2022</a:t>
             </a:fld>
             <a:endParaRPr lang="en-US" dirty="0"/>
           </a:p>
@@ -8984,7 +8964,7 @@
             <a:fld id="{B61BEF0D-F0BB-DE4B-95CE-6DB70DBA9567}" type="datetimeFigureOut">
               <a:rPr lang="en-US" dirty="0"/>
               <a:pPr/>
-              <a:t>5/14/2022</a:t>
+              <a:t>5/15/2022</a:t>
             </a:fld>
             <a:endParaRPr lang="en-US" dirty="0"/>
           </a:p>
@@ -9295,7 +9275,7 @@
             <a:fld id="{B61BEF0D-F0BB-DE4B-95CE-6DB70DBA9567}" type="datetimeFigureOut">
               <a:rPr lang="en-US" dirty="0"/>
               <a:pPr/>
-              <a:t>5/14/2022</a:t>
+              <a:t>5/15/2022</a:t>
             </a:fld>
             <a:endParaRPr lang="en-US" dirty="0"/>
           </a:p>
@@ -9685,7 +9665,7 @@
             <a:fld id="{B61BEF0D-F0BB-DE4B-95CE-6DB70DBA9567}" type="datetimeFigureOut">
               <a:rPr lang="en-US" dirty="0"/>
               <a:pPr/>
-              <a:t>5/14/2022</a:t>
+              <a:t>5/15/2022</a:t>
             </a:fld>
             <a:endParaRPr lang="en-US" dirty="0"/>
           </a:p>
@@ -9851,7 +9831,7 @@
           <a:p>
             <a:fld id="{55C6B4A9-1611-4792-9094-5F34BCA07E0B}" type="datetimeFigureOut">
               <a:rPr lang="en-US" dirty="0"/>
-              <a:t>5/14/2022</a:t>
+              <a:t>5/15/2022</a:t>
             </a:fld>
             <a:endParaRPr lang="en-US" dirty="0"/>
           </a:p>
@@ -10027,7 +10007,7 @@
             <a:fld id="{B61BEF0D-F0BB-DE4B-95CE-6DB70DBA9567}" type="datetimeFigureOut">
               <a:rPr lang="en-US" dirty="0"/>
               <a:pPr/>
-              <a:t>5/14/2022</a:t>
+              <a:t>5/15/2022</a:t>
             </a:fld>
             <a:endParaRPr lang="en-US" dirty="0"/>
           </a:p>
@@ -10200,7 +10180,7 @@
             <a:fld id="{B61BEF0D-F0BB-DE4B-95CE-6DB70DBA9567}" type="datetimeFigureOut">
               <a:rPr lang="en-US" dirty="0"/>
               <a:pPr/>
-              <a:t>5/14/2022</a:t>
+              <a:t>5/15/2022</a:t>
             </a:fld>
             <a:endParaRPr lang="en-US" dirty="0"/>
           </a:p>
@@ -10444,7 +10424,7 @@
             <a:fld id="{B61BEF0D-F0BB-DE4B-95CE-6DB70DBA9567}" type="datetimeFigureOut">
               <a:rPr lang="en-US" dirty="0"/>
               <a:pPr/>
-              <a:t>5/14/2022</a:t>
+              <a:t>5/15/2022</a:t>
             </a:fld>
             <a:endParaRPr lang="en-US" dirty="0"/>
           </a:p>
@@ -10672,7 +10652,7 @@
           <a:p>
             <a:fld id="{EB712588-04B1-427B-82EE-E8DB90309F08}" type="datetimeFigureOut">
               <a:rPr lang="en-US" dirty="0"/>
-              <a:t>5/14/2022</a:t>
+              <a:t>5/15/2022</a:t>
             </a:fld>
             <a:endParaRPr lang="en-US" dirty="0"/>
           </a:p>
@@ -11042,7 +11022,7 @@
             <a:fld id="{B61BEF0D-F0BB-DE4B-95CE-6DB70DBA9567}" type="datetimeFigureOut">
               <a:rPr lang="en-US" dirty="0"/>
               <a:pPr/>
-              <a:t>5/14/2022</a:t>
+              <a:t>5/15/2022</a:t>
             </a:fld>
             <a:endParaRPr lang="en-US" dirty="0"/>
           </a:p>
@@ -11162,7 +11142,7 @@
             <a:fld id="{B61BEF0D-F0BB-DE4B-95CE-6DB70DBA9567}" type="datetimeFigureOut">
               <a:rPr lang="en-US" dirty="0"/>
               <a:pPr/>
-              <a:t>5/14/2022</a:t>
+              <a:t>5/15/2022</a:t>
             </a:fld>
             <a:endParaRPr lang="en-US" dirty="0"/>
           </a:p>
@@ -11254,7 +11234,7 @@
             <a:fld id="{B61BEF0D-F0BB-DE4B-95CE-6DB70DBA9567}" type="datetimeFigureOut">
               <a:rPr lang="en-US" dirty="0"/>
               <a:pPr/>
-              <a:t>5/14/2022</a:t>
+              <a:t>5/15/2022</a:t>
             </a:fld>
             <a:endParaRPr lang="en-US" dirty="0"/>
           </a:p>
@@ -11505,7 +11485,7 @@
           <a:p>
             <a:fld id="{42A54C80-263E-416B-A8E0-580EDEADCBDC}" type="datetimeFigureOut">
               <a:rPr lang="en-US" dirty="0"/>
-              <a:t>5/14/2022</a:t>
+              <a:t>5/15/2022</a:t>
             </a:fld>
             <a:endParaRPr lang="en-US" dirty="0"/>
           </a:p>
@@ -11764,7 +11744,7 @@
             <a:fld id="{B61BEF0D-F0BB-DE4B-95CE-6DB70DBA9567}" type="datetimeFigureOut">
               <a:rPr lang="en-US" dirty="0"/>
               <a:pPr/>
-              <a:t>5/14/2022</a:t>
+              <a:t>5/15/2022</a:t>
             </a:fld>
             <a:endParaRPr lang="en-US" dirty="0"/>
           </a:p>
@@ -12504,7 +12484,7 @@
             <a:fld id="{B61BEF0D-F0BB-DE4B-95CE-6DB70DBA9567}" type="datetimeFigureOut">
               <a:rPr lang="en-US" dirty="0"/>
               <a:pPr/>
-              <a:t>5/14/2022</a:t>
+              <a:t>5/15/2022</a:t>
             </a:fld>
             <a:endParaRPr lang="en-US" dirty="0"/>
           </a:p>
@@ -13471,6 +13451,13 @@
   <p:clrMapOvr>
     <a:masterClrMapping/>
   </p:clrMapOvr>
+  <p:timing>
+    <p:tnLst>
+      <p:par>
+        <p:cTn id="1" dur="indefinite" restart="never" nodeType="tmRoot"/>
+      </p:par>
+    </p:tnLst>
+  </p:timing>
 </p:sld>
 </file>
 
@@ -13662,6 +13649,13 @@
   <p:clrMapOvr>
     <a:masterClrMapping/>
   </p:clrMapOvr>
+  <p:timing>
+    <p:tnLst>
+      <p:par>
+        <p:cTn id="1" dur="indefinite" restart="never" nodeType="tmRoot"/>
+      </p:par>
+    </p:tnLst>
+  </p:timing>
 </p:sld>
 </file>
 
@@ -13738,11 +13732,7 @@
             </a:r>
             <a:r>
               <a:rPr lang="en-US" sz="2400" dirty="0"/>
-              <a:t>one value to another </a:t>
-            </a:r>
-            <a:r>
-              <a:rPr lang="en-US" sz="2400" dirty="0"/>
-              <a:t>value, or compute a </a:t>
+              <a:t>one value to another value, or compute a </a:t>
             </a:r>
             <a:r>
               <a:rPr lang="en-US" sz="2400" dirty="0" smtClean="0"/>
@@ -13752,7 +13742,6 @@
               <a:rPr lang="en-US" sz="2400" dirty="0"/>
               <a:t>.</a:t>
             </a:r>
-            <a:endParaRPr lang="en-US" sz="2400" dirty="0"/>
           </a:p>
           <a:p>
             <a:r>
@@ -14122,6 +14111,13 @@
   <p:clrMapOvr>
     <a:masterClrMapping/>
   </p:clrMapOvr>
+  <p:timing>
+    <p:tnLst>
+      <p:par>
+        <p:cTn id="1" dur="indefinite" restart="never" nodeType="tmRoot"/>
+      </p:par>
+    </p:tnLst>
+  </p:timing>
 </p:sld>
 </file>
 
@@ -14639,6 +14635,13 @@
   <p:clrMapOvr>
     <a:masterClrMapping/>
   </p:clrMapOvr>
+  <p:timing>
+    <p:tnLst>
+      <p:par>
+        <p:cTn id="1" dur="indefinite" restart="never" nodeType="tmRoot"/>
+      </p:par>
+    </p:tnLst>
+  </p:timing>
 </p:sld>
 </file>
 
@@ -14913,6 +14916,13 @@
   <p:clrMapOvr>
     <a:masterClrMapping/>
   </p:clrMapOvr>
+  <p:timing>
+    <p:tnLst>
+      <p:par>
+        <p:cTn id="1" dur="indefinite" restart="never" nodeType="tmRoot"/>
+      </p:par>
+    </p:tnLst>
+  </p:timing>
 </p:sld>
 </file>
 
@@ -15102,15 +15112,7 @@
             <a:pPr lvl="1"/>
             <a:r>
               <a:rPr lang="en-US" sz="2200" dirty="0" smtClean="0"/>
-              <a:t>map – Apply a Function mapping on a present value, returning the result of the mapping or empty </a:t>
-            </a:r>
-            <a:r>
-              <a:rPr lang="en-US" sz="2200" dirty="0" smtClean="0"/>
-              <a:t>when empty</a:t>
-            </a:r>
-            <a:r>
-              <a:rPr lang="en-US" sz="2200" dirty="0" smtClean="0"/>
-              <a:t>.</a:t>
+              <a:t>map – Apply a Function mapping on a present value, returning the result of the mapping or empty when empty.</a:t>
             </a:r>
           </a:p>
           <a:p>
@@ -15145,6 +15147,13 @@
   <p:clrMapOvr>
     <a:masterClrMapping/>
   </p:clrMapOvr>
+  <p:timing>
+    <p:tnLst>
+      <p:par>
+        <p:cTn id="1" dur="indefinite" restart="never" nodeType="tmRoot"/>
+      </p:par>
+    </p:tnLst>
+  </p:timing>
 </p:sld>
 </file>
 
@@ -15347,34 +15356,20 @@
             </a:r>
             <a:r>
               <a:rPr lang="en-US" sz="2400" dirty="0" smtClean="0"/>
-              <a:t>(X1, X)) are always true</a:t>
-            </a:r>
+              <a:t>(X1, X)) are always true.</a:t>
+            </a:r>
+          </a:p>
+          <a:p>
             <a:r>
               <a:rPr lang="en-US" sz="2400" dirty="0" smtClean="0"/>
-              <a:t>.</a:t>
+              <a:t>Sometimes simply referred to as “Pure Functions”.</a:t>
             </a:r>
           </a:p>
           <a:p>
             <a:r>
               <a:rPr lang="en-US" sz="2400" dirty="0" smtClean="0"/>
-              <a:t>Sometimes simply referred to as “Pure Functions”</a:t>
-            </a:r>
-            <a:r>
-              <a:rPr lang="en-US" sz="2400" dirty="0" smtClean="0"/>
-              <a:t>.</a:t>
-            </a:r>
-            <a:endParaRPr lang="en-US" sz="2400" dirty="0" smtClean="0"/>
-          </a:p>
-          <a:p>
-            <a:r>
-              <a:rPr lang="en-US" sz="2400" dirty="0" smtClean="0"/>
-              <a:t>Such functions are inherently </a:t>
-            </a:r>
-            <a:r>
-              <a:rPr lang="en-US" sz="2400" dirty="0" smtClean="0"/>
-              <a:t>safe.</a:t>
-            </a:r>
-            <a:endParaRPr lang="en-US" sz="2400" dirty="0" smtClean="0"/>
+              <a:t>Such functions are inherently safe.</a:t>
+            </a:r>
           </a:p>
           <a:p>
             <a:endParaRPr lang="en-US" sz="2400" dirty="0" smtClean="0"/>
@@ -15391,6 +15386,13 @@
   <p:clrMapOvr>
     <a:masterClrMapping/>
   </p:clrMapOvr>
+  <p:timing>
+    <p:tnLst>
+      <p:par>
+        <p:cTn id="1" dur="indefinite" restart="never" nodeType="tmRoot"/>
+      </p:par>
+    </p:tnLst>
+  </p:timing>
 </p:sld>
 </file>
 
@@ -16697,6 +16699,13 @@
   <p:clrMapOvr>
     <a:masterClrMapping/>
   </p:clrMapOvr>
+  <p:timing>
+    <p:tnLst>
+      <p:par>
+        <p:cTn id="1" dur="indefinite" restart="never" nodeType="tmRoot"/>
+      </p:par>
+    </p:tnLst>
+  </p:timing>
 </p:sld>
 </file>
 
@@ -16771,6 +16780,13 @@
   <p:clrMapOvr>
     <a:masterClrMapping/>
   </p:clrMapOvr>
+  <p:timing>
+    <p:tnLst>
+      <p:par>
+        <p:cTn id="1" dur="indefinite" restart="never" nodeType="tmRoot"/>
+      </p:par>
+    </p:tnLst>
+  </p:timing>
 </p:sld>
 </file>
 
@@ -17090,6 +17106,13 @@
   <p:clrMapOvr>
     <a:masterClrMapping/>
   </p:clrMapOvr>
+  <p:timing>
+    <p:tnLst>
+      <p:par>
+        <p:cTn id="1" dur="indefinite" restart="never" nodeType="tmRoot"/>
+      </p:par>
+    </p:tnLst>
+  </p:timing>
 </p:sld>
 </file>
 
@@ -17922,6 +17945,13 @@
   <p:clrMapOvr>
     <a:masterClrMapping/>
   </p:clrMapOvr>
+  <p:timing>
+    <p:tnLst>
+      <p:par>
+        <p:cTn id="1" dur="indefinite" restart="never" nodeType="tmRoot"/>
+      </p:par>
+    </p:tnLst>
+  </p:timing>
 </p:sld>
 </file>
 
@@ -18458,6 +18488,13 @@
   <p:clrMapOvr>
     <a:masterClrMapping/>
   </p:clrMapOvr>
+  <p:timing>
+    <p:tnLst>
+      <p:par>
+        <p:cTn id="1" dur="indefinite" restart="never" nodeType="tmRoot"/>
+      </p:par>
+    </p:tnLst>
+  </p:timing>
 </p:sld>
 </file>
 
@@ -18989,6 +19026,13 @@
   <p:clrMapOvr>
     <a:masterClrMapping/>
   </p:clrMapOvr>
+  <p:timing>
+    <p:tnLst>
+      <p:par>
+        <p:cTn id="1" dur="indefinite" restart="never" nodeType="tmRoot"/>
+      </p:par>
+    </p:tnLst>
+  </p:timing>
 </p:sld>
 </file>
 
@@ -19452,6 +19496,13 @@
   <p:clrMapOvr>
     <a:masterClrMapping/>
   </p:clrMapOvr>
+  <p:timing>
+    <p:tnLst>
+      <p:par>
+        <p:cTn id="1" dur="indefinite" restart="never" nodeType="tmRoot"/>
+      </p:par>
+    </p:tnLst>
+  </p:timing>
 </p:sld>
 </file>
 
@@ -19650,7 +19701,21 @@
             </a:r>
             <a:r>
               <a:rPr lang="en-US" sz="2000" dirty="0" smtClean="0"/>
-              <a:t>operation, which starts the processing.</a:t>
+              <a:t>operation, which starts the processing</a:t>
+            </a:r>
+            <a:r>
+              <a:rPr lang="en-US" sz="2000" dirty="0" smtClean="0"/>
+              <a:t>.</a:t>
+            </a:r>
+          </a:p>
+          <a:p>
+            <a:pPr marL="800100" lvl="1" indent="-342900">
+              <a:buFont typeface="+mj-lt"/>
+              <a:buAutoNum type="arabicPeriod"/>
+            </a:pPr>
+            <a:r>
+              <a:rPr lang="en-US" sz="2000" dirty="0" smtClean="0"/>
+              <a:t>(Optional) A close operation, to release any resources such a files.</a:t>
             </a:r>
             <a:endParaRPr lang="en-US" sz="2000" dirty="0"/>
           </a:p>
@@ -19698,7 +19763,7 @@
           <p:cNvPr id="2" name="Title 1">
             <a:extLst>
               <a:ext uri="{FF2B5EF4-FFF2-40B4-BE49-F238E27FC236}">
-                <a16:creationId xmlns:a16="http://schemas.microsoft.com/office/drawing/2014/main" xmlns="" id="{731099A7-8879-B141-9237-C66AEAD5F6B7}"/>
+                <a16:creationId xmlns="" xmlns:a16="http://schemas.microsoft.com/office/drawing/2014/main" id="{731099A7-8879-B141-9237-C66AEAD5F6B7}"/>
               </a:ext>
             </a:extLst>
           </p:cNvPr>
@@ -19726,7 +19791,7 @@
           <p:cNvPr id="3" name="Content Placeholder 2">
             <a:extLst>
               <a:ext uri="{FF2B5EF4-FFF2-40B4-BE49-F238E27FC236}">
-                <a16:creationId xmlns:a16="http://schemas.microsoft.com/office/drawing/2014/main" xmlns="" id="{DE647D84-AA56-C24E-9DC5-D393CBE4ABED}"/>
+                <a16:creationId xmlns="" xmlns:a16="http://schemas.microsoft.com/office/drawing/2014/main" id="{DE647D84-AA56-C24E-9DC5-D393CBE4ABED}"/>
               </a:ext>
             </a:extLst>
           </p:cNvPr>
@@ -19823,12 +19888,12 @@
           <a:p>
             <a:r>
               <a:rPr lang="en-US" sz="2400" dirty="0" smtClean="0"/>
-              <a:t>Close Streams created from resources such as files</a:t>
-            </a:r>
-          </a:p>
-          <a:p>
-            <a:r>
-              <a:rPr lang="en-US" sz="2400" dirty="0">
+              <a:t>Streams created from resources such as files should be closed</a:t>
+            </a:r>
+          </a:p>
+          <a:p>
+            <a:r>
+              <a:rPr lang="en-US" sz="2400" dirty="0" smtClean="0">
                 <a:solidFill>
                   <a:srgbClr val="000000"/>
                 </a:solidFill>
@@ -19839,7 +19904,7 @@
               <a:t> </a:t>
             </a:r>
             <a:r>
-              <a:rPr lang="en-US" sz="2300" dirty="0" err="1">
+              <a:rPr lang="en-US" sz="2300" dirty="0" err="1" smtClean="0">
                 <a:solidFill>
                   <a:srgbClr val="8000FF"/>
                 </a:solidFill>
@@ -19852,7 +19917,7 @@
               <a:t>int</a:t>
             </a:r>
             <a:r>
-              <a:rPr lang="en-US" sz="2300" dirty="0">
+              <a:rPr lang="en-US" sz="2300" dirty="0" smtClean="0">
                 <a:solidFill>
                   <a:srgbClr val="000000"/>
                 </a:solidFill>
@@ -19865,7 +19930,7 @@
               <a:t> </a:t>
             </a:r>
             <a:r>
-              <a:rPr lang="en-US" sz="2300" dirty="0" err="1">
+              <a:rPr lang="en-US" sz="2300" dirty="0" err="1" smtClean="0">
                 <a:solidFill>
                   <a:srgbClr val="000000"/>
                 </a:solidFill>
@@ -19878,7 +19943,7 @@
               <a:t>processFileStream</a:t>
             </a:r>
             <a:r>
-              <a:rPr lang="en-US" sz="2300" b="1" dirty="0">
+              <a:rPr lang="en-US" sz="2300" b="1" dirty="0" smtClean="0">
                 <a:solidFill>
                   <a:srgbClr val="000080"/>
                 </a:solidFill>
@@ -19891,7 +19956,7 @@
               <a:t>()</a:t>
             </a:r>
             <a:r>
-              <a:rPr lang="en-US" sz="2300" dirty="0">
+              <a:rPr lang="en-US" sz="2300" dirty="0" smtClean="0">
                 <a:solidFill>
                   <a:srgbClr val="000000"/>
                 </a:solidFill>
@@ -19904,7 +19969,7 @@
               <a:t> </a:t>
             </a:r>
             <a:r>
-              <a:rPr lang="en-US" sz="2300" b="1" dirty="0">
+              <a:rPr lang="en-US" sz="2300" b="1" dirty="0" smtClean="0">
                 <a:solidFill>
                   <a:srgbClr val="000080"/>
                 </a:solidFill>
@@ -19916,7 +19981,7 @@
               </a:rPr>
               <a:t>{</a:t>
             </a:r>
-            <a:endParaRPr lang="en-US" sz="2300" dirty="0">
+            <a:endParaRPr lang="en-US" sz="2300" dirty="0" smtClean="0">
               <a:solidFill>
                 <a:srgbClr val="000000"/>
               </a:solidFill>
@@ -19932,7 +19997,7 @@
               <a:buNone/>
             </a:pPr>
             <a:r>
-              <a:rPr lang="en-US" sz="2300" dirty="0">
+              <a:rPr lang="en-US" sz="2300" dirty="0" smtClean="0">
                 <a:solidFill>
                   <a:srgbClr val="000000"/>
                 </a:solidFill>
@@ -20441,7 +20506,7 @@
           <p:cNvPr id="2" name="Title 1">
             <a:extLst>
               <a:ext uri="{FF2B5EF4-FFF2-40B4-BE49-F238E27FC236}">
-                <a16:creationId xmlns:a16="http://schemas.microsoft.com/office/drawing/2014/main" xmlns="" id="{BB44DCEE-D719-EA48-B6D6-E5B949E302CA}"/>
+                <a16:creationId xmlns="" xmlns:a16="http://schemas.microsoft.com/office/drawing/2014/main" id="{BB44DCEE-D719-EA48-B6D6-E5B949E302CA}"/>
               </a:ext>
             </a:extLst>
           </p:cNvPr>
@@ -20469,7 +20534,7 @@
           <p:cNvPr id="3" name="Content Placeholder 2">
             <a:extLst>
               <a:ext uri="{FF2B5EF4-FFF2-40B4-BE49-F238E27FC236}">
-                <a16:creationId xmlns:a16="http://schemas.microsoft.com/office/drawing/2014/main" xmlns="" id="{596B04A5-F913-8D47-8FAA-B2EFD0A141E5}"/>
+                <a16:creationId xmlns="" xmlns:a16="http://schemas.microsoft.com/office/drawing/2014/main" id="{596B04A5-F913-8D47-8FAA-B2EFD0A141E5}"/>
               </a:ext>
             </a:extLst>
           </p:cNvPr>
@@ -20575,6 +20640,13 @@
   <p:clrMapOvr>
     <a:masterClrMapping/>
   </p:clrMapOvr>
+  <p:timing>
+    <p:tnLst>
+      <p:par>
+        <p:cTn id="1" dur="indefinite" restart="never" nodeType="tmRoot"/>
+      </p:par>
+    </p:tnLst>
+  </p:timing>
 </p:sld>
 </file>
 
@@ -20600,7 +20672,7 @@
           <p:cNvPr id="2" name="Title 1">
             <a:extLst>
               <a:ext uri="{FF2B5EF4-FFF2-40B4-BE49-F238E27FC236}">
-                <a16:creationId xmlns:a16="http://schemas.microsoft.com/office/drawing/2014/main" xmlns="" id="{E58574D1-A136-CC47-84C9-9427079EC3D4}"/>
+                <a16:creationId xmlns="" xmlns:a16="http://schemas.microsoft.com/office/drawing/2014/main" id="{E58574D1-A136-CC47-84C9-9427079EC3D4}"/>
               </a:ext>
             </a:extLst>
           </p:cNvPr>
@@ -20628,7 +20700,7 @@
           <p:cNvPr id="3" name="Content Placeholder 2">
             <a:extLst>
               <a:ext uri="{FF2B5EF4-FFF2-40B4-BE49-F238E27FC236}">
-                <a16:creationId xmlns:a16="http://schemas.microsoft.com/office/drawing/2014/main" xmlns="" id="{A293779C-293F-5945-9EF3-990D36829D17}"/>
+                <a16:creationId xmlns="" xmlns:a16="http://schemas.microsoft.com/office/drawing/2014/main" id="{A293779C-293F-5945-9EF3-990D36829D17}"/>
               </a:ext>
             </a:extLst>
           </p:cNvPr>
@@ -20691,15 +20763,27 @@
               <a:t> </a:t>
             </a:r>
             <a:r>
+              <a:rPr lang="en-US" sz="2400" dirty="0" smtClean="0"/>
+              <a:t>Commits the </a:t>
+            </a:r>
+            <a:r>
               <a:rPr lang="en-US" sz="2400" dirty="0"/>
-              <a:t>Closes the stream </a:t>
+              <a:t>stream </a:t>
             </a:r>
           </a:p>
           <a:p>
             <a:pPr lvl="1"/>
             <a:r>
               <a:rPr lang="en-US" sz="1800" dirty="0"/>
-              <a:t>Any further operations result in an </a:t>
+              <a:t>Any further </a:t>
+            </a:r>
+            <a:r>
+              <a:rPr lang="en-US" sz="1800" dirty="0" smtClean="0"/>
+              <a:t>operations </a:t>
+            </a:r>
+            <a:r>
+              <a:rPr lang="en-US" sz="1800" dirty="0"/>
+              <a:t>result in an </a:t>
             </a:r>
             <a:r>
               <a:rPr lang="en-US" sz="1800" dirty="0" err="1"/>
@@ -20722,6 +20806,13 @@
   <p:clrMapOvr>
     <a:masterClrMapping/>
   </p:clrMapOvr>
+  <p:timing>
+    <p:tnLst>
+      <p:par>
+        <p:cTn id="1" dur="indefinite" restart="never" nodeType="tmRoot"/>
+      </p:par>
+    </p:tnLst>
+  </p:timing>
 </p:sld>
 </file>
 
@@ -20832,6 +20923,13 @@
   <p:clrMapOvr>
     <a:masterClrMapping/>
   </p:clrMapOvr>
+  <p:timing>
+    <p:tnLst>
+      <p:par>
+        <p:cTn id="1" dur="indefinite" restart="never" nodeType="tmRoot"/>
+      </p:par>
+    </p:tnLst>
+  </p:timing>
 </p:sld>
 </file>
 
@@ -21885,6 +21983,13 @@
   <p:clrMapOvr>
     <a:masterClrMapping/>
   </p:clrMapOvr>
+  <p:timing>
+    <p:tnLst>
+      <p:par>
+        <p:cTn id="1" dur="indefinite" restart="never" nodeType="tmRoot"/>
+      </p:par>
+    </p:tnLst>
+  </p:timing>
 </p:sld>
 </file>
 
@@ -22926,7 +23031,7 @@
           <p:cNvPr id="2" name="Title 1">
             <a:extLst>
               <a:ext uri="{FF2B5EF4-FFF2-40B4-BE49-F238E27FC236}">
-                <a16:creationId xmlns:a16="http://schemas.microsoft.com/office/drawing/2014/main" xmlns="" id="{4BF41A3A-9BA9-D948-8BBC-74A05D841F3C}"/>
+                <a16:creationId xmlns="" xmlns:a16="http://schemas.microsoft.com/office/drawing/2014/main" id="{4BF41A3A-9BA9-D948-8BBC-74A05D841F3C}"/>
               </a:ext>
             </a:extLst>
           </p:cNvPr>
@@ -22954,7 +23059,7 @@
           <p:cNvPr id="3" name="Content Placeholder 2">
             <a:extLst>
               <a:ext uri="{FF2B5EF4-FFF2-40B4-BE49-F238E27FC236}">
-                <a16:creationId xmlns:a16="http://schemas.microsoft.com/office/drawing/2014/main" xmlns="" id="{767751D2-324B-034A-A6DB-931966979B81}"/>
+                <a16:creationId xmlns="" xmlns:a16="http://schemas.microsoft.com/office/drawing/2014/main" id="{767751D2-324B-034A-A6DB-931966979B81}"/>
               </a:ext>
             </a:extLst>
           </p:cNvPr>
@@ -24813,15 +24918,7 @@
           <a:p>
             <a:r>
               <a:rPr lang="en-US" dirty="0" smtClean="0"/>
-              <a:t>Dangerous </a:t>
-            </a:r>
-            <a:r>
-              <a:rPr lang="en-US" dirty="0" smtClean="0"/>
-              <a:t>Unbounded </a:t>
-            </a:r>
-            <a:r>
-              <a:rPr lang="en-US" dirty="0" smtClean="0"/>
-              <a:t>Processing</a:t>
+              <a:t>Dangerous Unbounded Processing</a:t>
             </a:r>
             <a:endParaRPr lang="en-US" dirty="0"/>
           </a:p>
@@ -25022,59 +25119,7 @@
                 <a:latin typeface="Courier New" panose="02070309020205020404" pitchFamily="49" charset="0"/>
                 <a:cs typeface="Courier New" panose="02070309020205020404" pitchFamily="49" charset="0"/>
               </a:rPr>
-              <a:t>   // </a:t>
-            </a:r>
-            <a:r>
-              <a:rPr lang="en-US" sz="2000" dirty="0" smtClean="0">
-                <a:solidFill>
-                  <a:srgbClr val="008000"/>
-                </a:solidFill>
-                <a:highlight>
-                  <a:srgbClr val="FFFFFF"/>
-                </a:highlight>
-                <a:latin typeface="Courier New" panose="02070309020205020404" pitchFamily="49" charset="0"/>
-                <a:cs typeface="Courier New" panose="02070309020205020404" pitchFamily="49" charset="0"/>
-              </a:rPr>
-              <a:t>May never get to the end </a:t>
-            </a:r>
-            <a:r>
-              <a:rPr lang="en-US" sz="2000" dirty="0" smtClean="0">
-                <a:solidFill>
-                  <a:srgbClr val="008000"/>
-                </a:solidFill>
-                <a:highlight>
-                  <a:srgbClr val="FFFFFF"/>
-                </a:highlight>
-                <a:latin typeface="Courier New" panose="02070309020205020404" pitchFamily="49" charset="0"/>
-                <a:cs typeface="Courier New" panose="02070309020205020404" pitchFamily="49" charset="0"/>
-              </a:rPr>
-              <a:t>nor </a:t>
-            </a:r>
-            <a:r>
-              <a:rPr lang="en-US" sz="2000" dirty="0" smtClean="0">
-                <a:solidFill>
-                  <a:srgbClr val="008000"/>
-                </a:solidFill>
-                <a:highlight>
-                  <a:srgbClr val="FFFFFF"/>
-                </a:highlight>
-                <a:latin typeface="Courier New" panose="02070309020205020404" pitchFamily="49" charset="0"/>
-                <a:cs typeface="Courier New" panose="02070309020205020404" pitchFamily="49" charset="0"/>
-              </a:rPr>
-              <a:t>find a blue </a:t>
-            </a:r>
-            <a:r>
-              <a:rPr lang="en-US" sz="2000" dirty="0" smtClean="0">
-                <a:solidFill>
-                  <a:srgbClr val="008000"/>
-                </a:solidFill>
-                <a:highlight>
-                  <a:srgbClr val="FFFFFF"/>
-                </a:highlight>
-                <a:latin typeface="Courier New" panose="02070309020205020404" pitchFamily="49" charset="0"/>
-                <a:cs typeface="Courier New" panose="02070309020205020404" pitchFamily="49" charset="0"/>
-              </a:rPr>
-              <a:t>widget</a:t>
+              <a:t>   // May never get to the end nor find a blue widget</a:t>
             </a:r>
           </a:p>
           <a:p>
@@ -25198,20 +25243,7 @@
                 <a:latin typeface="Courier New" panose="02070309020205020404" pitchFamily="49" charset="0"/>
                 <a:cs typeface="Courier New" panose="02070309020205020404" pitchFamily="49" charset="0"/>
               </a:rPr>
-              <a:t>()</a:t>
-            </a:r>
-            <a:r>
-              <a:rPr lang="en-US" sz="2000" b="1" dirty="0" smtClean="0">
-                <a:solidFill>
-                  <a:srgbClr val="000080"/>
-                </a:solidFill>
-                <a:highlight>
-                  <a:srgbClr val="FFFFFF"/>
-                </a:highlight>
-                <a:latin typeface="Courier New" panose="02070309020205020404" pitchFamily="49" charset="0"/>
-                <a:cs typeface="Courier New" panose="02070309020205020404" pitchFamily="49" charset="0"/>
-              </a:rPr>
-              <a:t>.</a:t>
+              <a:t>().</a:t>
             </a:r>
             <a:r>
               <a:rPr lang="en-US" sz="2000" dirty="0">
@@ -25567,11 +25599,7 @@
           <a:p>
             <a:r>
               <a:rPr lang="en-US" dirty="0" smtClean="0"/>
-              <a:t>Safe Unbounded </a:t>
-            </a:r>
-            <a:r>
-              <a:rPr lang="en-US" dirty="0" smtClean="0"/>
-              <a:t>Processing</a:t>
+              <a:t>Safe Unbounded Processing</a:t>
             </a:r>
             <a:endParaRPr lang="en-US" dirty="0"/>
           </a:p>
@@ -25603,7 +25631,6 @@
               <a:rPr lang="en-US" sz="2800" dirty="0" smtClean="0"/>
               <a:t>Safe</a:t>
             </a:r>
-            <a:endParaRPr lang="en-US" sz="2800" dirty="0" smtClean="0"/>
           </a:p>
           <a:p>
             <a:r>
@@ -29551,6 +29578,13 @@
   <p:clrMapOvr>
     <a:masterClrMapping/>
   </p:clrMapOvr>
+  <p:timing>
+    <p:tnLst>
+      <p:par>
+        <p:cTn id="1" dur="indefinite" restart="never" nodeType="tmRoot"/>
+      </p:par>
+    </p:tnLst>
+  </p:timing>
 </p:sld>
 </file>
 
@@ -30809,7 +30843,7 @@
           <p:cNvPr id="2" name="Title 1">
             <a:extLst>
               <a:ext uri="{FF2B5EF4-FFF2-40B4-BE49-F238E27FC236}">
-                <a16:creationId xmlns:a16="http://schemas.microsoft.com/office/drawing/2014/main" xmlns="" id="{187600CA-ED49-8A42-8AAC-B8CED9B598F6}"/>
+                <a16:creationId xmlns="" xmlns:a16="http://schemas.microsoft.com/office/drawing/2014/main" id="{187600CA-ED49-8A42-8AAC-B8CED9B598F6}"/>
               </a:ext>
             </a:extLst>
           </p:cNvPr>
@@ -30837,7 +30871,7 @@
           <p:cNvPr id="3" name="Content Placeholder 2">
             <a:extLst>
               <a:ext uri="{FF2B5EF4-FFF2-40B4-BE49-F238E27FC236}">
-                <a16:creationId xmlns:a16="http://schemas.microsoft.com/office/drawing/2014/main" xmlns="" id="{095A9095-A831-4445-8971-55AE4AD7D768}"/>
+                <a16:creationId xmlns="" xmlns:a16="http://schemas.microsoft.com/office/drawing/2014/main" id="{095A9095-A831-4445-8971-55AE4AD7D768}"/>
               </a:ext>
             </a:extLst>
           </p:cNvPr>
@@ -30895,7 +30929,7 @@
           <p:cNvPr id="2" name="Title 1">
             <a:extLst>
               <a:ext uri="{FF2B5EF4-FFF2-40B4-BE49-F238E27FC236}">
-                <a16:creationId xmlns:a16="http://schemas.microsoft.com/office/drawing/2014/main" xmlns="" id="{8F1FC55F-B025-1646-8698-4E547B39859F}"/>
+                <a16:creationId xmlns="" xmlns:a16="http://schemas.microsoft.com/office/drawing/2014/main" id="{8F1FC55F-B025-1646-8698-4E547B39859F}"/>
               </a:ext>
             </a:extLst>
           </p:cNvPr>
@@ -30930,7 +30964,7 @@
           <p:cNvPr id="3" name="Content Placeholder 2">
             <a:extLst>
               <a:ext uri="{FF2B5EF4-FFF2-40B4-BE49-F238E27FC236}">
-                <a16:creationId xmlns:a16="http://schemas.microsoft.com/office/drawing/2014/main" xmlns="" id="{212DEAB1-CB9C-0443-A7F4-896B0EDCEF7F}"/>
+                <a16:creationId xmlns="" xmlns:a16="http://schemas.microsoft.com/office/drawing/2014/main" id="{212DEAB1-CB9C-0443-A7F4-896B0EDCEF7F}"/>
               </a:ext>
             </a:extLst>
           </p:cNvPr>
@@ -32618,8 +32652,8 @@
         </p:nvSpPr>
         <p:spPr>
           <a:xfrm>
-            <a:off x="677334" y="1062318"/>
-            <a:ext cx="8596668" cy="4527496"/>
+            <a:off x="633791" y="1126671"/>
+            <a:ext cx="8596668" cy="4806043"/>
           </a:xfrm>
         </p:spPr>
         <p:txBody>
@@ -33701,10 +33735,10 @@
           </a:p>
           <a:p>
             <a:r>
-              <a:rPr lang="en-US" sz="1600" dirty="0" smtClean="0"/>
+              <a:rPr lang="en-US" dirty="0" smtClean="0"/>
               <a:t>How can this function be changed to support an operation argument that can be “count” if the numbers should be counted, or “sum” if the numbers should be summed?</a:t>
             </a:r>
-            <a:endParaRPr lang="en-US" sz="1700" dirty="0"/>
+            <a:endParaRPr lang="en-US" dirty="0"/>
           </a:p>
         </p:txBody>
       </p:sp>
@@ -35272,7 +35306,7 @@
           <p:cNvPr id="2" name="Title 1">
             <a:extLst>
               <a:ext uri="{FF2B5EF4-FFF2-40B4-BE49-F238E27FC236}">
-                <a16:creationId xmlns:a16="http://schemas.microsoft.com/office/drawing/2014/main" xmlns="" id="{9D575015-E9F6-854A-84D4-7FAAE040C19B}"/>
+                <a16:creationId xmlns="" xmlns:a16="http://schemas.microsoft.com/office/drawing/2014/main" id="{9D575015-E9F6-854A-84D4-7FAAE040C19B}"/>
               </a:ext>
             </a:extLst>
           </p:cNvPr>
@@ -35305,7 +35339,7 @@
           <p:cNvPr id="3" name="Content Placeholder 2">
             <a:extLst>
               <a:ext uri="{FF2B5EF4-FFF2-40B4-BE49-F238E27FC236}">
-                <a16:creationId xmlns:a16="http://schemas.microsoft.com/office/drawing/2014/main" xmlns="" id="{D2856061-7E40-AE42-8E8F-D10F98FC1DD5}"/>
+                <a16:creationId xmlns="" xmlns:a16="http://schemas.microsoft.com/office/drawing/2014/main" id="{D2856061-7E40-AE42-8E8F-D10F98FC1DD5}"/>
               </a:ext>
             </a:extLst>
           </p:cNvPr>
@@ -38007,6 +38041,13 @@
   <p:clrMapOvr>
     <a:masterClrMapping/>
   </p:clrMapOvr>
+  <p:timing>
+    <p:tnLst>
+      <p:par>
+        <p:cTn id="1" dur="indefinite" restart="never" nodeType="tmRoot"/>
+      </p:par>
+    </p:tnLst>
+  </p:timing>
 </p:sld>
 </file>
 
@@ -45240,6 +45281,13 @@
   <p:clrMapOvr>
     <a:masterClrMapping/>
   </p:clrMapOvr>
+  <p:timing>
+    <p:tnLst>
+      <p:par>
+        <p:cTn id="1" dur="indefinite" restart="never" nodeType="tmRoot"/>
+      </p:par>
+    </p:tnLst>
+  </p:timing>
 </p:sld>
 </file>
 
@@ -50196,6 +50244,13 @@
   <p:clrMapOvr>
     <a:masterClrMapping/>
   </p:clrMapOvr>
+  <p:timing>
+    <p:tnLst>
+      <p:par>
+        <p:cTn id="1" dur="indefinite" restart="never" nodeType="tmRoot"/>
+      </p:par>
+    </p:tnLst>
+  </p:timing>
 </p:sld>
 </file>
 
@@ -50373,6 +50428,13 @@
   <p:clrMapOvr>
     <a:masterClrMapping/>
   </p:clrMapOvr>
+  <p:timing>
+    <p:tnLst>
+      <p:par>
+        <p:cTn id="1" dur="indefinite" restart="never" nodeType="tmRoot"/>
+      </p:par>
+    </p:tnLst>
+  </p:timing>
 </p:sld>
 </file>
 
@@ -50851,6 +50913,13 @@
   <p:clrMapOvr>
     <a:masterClrMapping/>
   </p:clrMapOvr>
+  <p:timing>
+    <p:tnLst>
+      <p:par>
+        <p:cTn id="1" dur="indefinite" restart="never" nodeType="tmRoot"/>
+      </p:par>
+    </p:tnLst>
+  </p:timing>
 </p:sld>
 </file>
 

</xml_diff>